<commit_message>
MDL4UI presentation (to continue)
</commit_message>
<xml_diff>
--- a/mdl4ui-docs/mdl4ui_cg2013.pptx
+++ b/mdl4ui-docs/mdl4ui_cg2013.pptx
@@ -210,6 +210,7 @@
           <a:p>
             <a:fld id="{9F3D9D59-C69D-478D-98BA-46DD69AE3241}" type="datetimeFigureOut">
               <a:rPr lang="en-US" smtClean="0"/>
+              <a:pPr/>
               <a:t>3/30/2013</a:t>
             </a:fld>
             <a:endParaRPr lang="en-US"/>
@@ -276,6 +277,7 @@
           <a:p>
             <a:fld id="{F1FF0778-B092-4B9F-81BC-7C174F2439A4}" type="slidenum">
               <a:rPr lang="en-US" smtClean="0"/>
+              <a:pPr/>
               <a:t>‹N°›</a:t>
             </a:fld>
             <a:endParaRPr lang="en-US"/>
@@ -285,7 +287,7 @@
     </p:spTree>
     <p:extLst>
       <p:ext uri="{BB962C8B-B14F-4D97-AF65-F5344CB8AC3E}">
-        <p14:creationId xmlns:p14="http://schemas.microsoft.com/office/powerpoint/2010/main" val="70803672"/>
+        <p14:creationId xmlns:p14="http://schemas.microsoft.com/office/powerpoint/2010/main" xmlns="" val="70803672"/>
       </p:ext>
     </p:extLst>
   </p:cSld>
@@ -474,6 +476,7 @@
           <a:p>
             <a:fld id="{1B5268FF-0D67-4269-9FD2-93B489DF800A}" type="datetimeFigureOut">
               <a:rPr lang="fr-FR" smtClean="0"/>
+              <a:pPr/>
               <a:t>30/03/2013</a:t>
             </a:fld>
             <a:endParaRPr lang="fr-FR"/>
@@ -516,6 +519,7 @@
           <a:p>
             <a:fld id="{E0EED72F-F310-45C9-905A-2569A5F74AA6}" type="slidenum">
               <a:rPr lang="fr-FR" smtClean="0"/>
+              <a:pPr/>
               <a:t>‹N°›</a:t>
             </a:fld>
             <a:endParaRPr lang="fr-FR"/>
@@ -525,7 +529,7 @@
     </p:spTree>
     <p:extLst>
       <p:ext uri="{BB962C8B-B14F-4D97-AF65-F5344CB8AC3E}">
-        <p14:creationId xmlns:p14="http://schemas.microsoft.com/office/powerpoint/2010/main" val="322609761"/>
+        <p14:creationId xmlns:p14="http://schemas.microsoft.com/office/powerpoint/2010/main" xmlns="" val="322609761"/>
       </p:ext>
     </p:extLst>
   </p:cSld>
@@ -644,6 +648,7 @@
           <a:p>
             <a:fld id="{1B5268FF-0D67-4269-9FD2-93B489DF800A}" type="datetimeFigureOut">
               <a:rPr lang="fr-FR" smtClean="0"/>
+              <a:pPr/>
               <a:t>30/03/2013</a:t>
             </a:fld>
             <a:endParaRPr lang="fr-FR"/>
@@ -686,6 +691,7 @@
           <a:p>
             <a:fld id="{E0EED72F-F310-45C9-905A-2569A5F74AA6}" type="slidenum">
               <a:rPr lang="fr-FR" smtClean="0"/>
+              <a:pPr/>
               <a:t>‹N°›</a:t>
             </a:fld>
             <a:endParaRPr lang="fr-FR"/>
@@ -695,7 +701,7 @@
     </p:spTree>
     <p:extLst>
       <p:ext uri="{BB962C8B-B14F-4D97-AF65-F5344CB8AC3E}">
-        <p14:creationId xmlns:p14="http://schemas.microsoft.com/office/powerpoint/2010/main" val="1248456722"/>
+        <p14:creationId xmlns:p14="http://schemas.microsoft.com/office/powerpoint/2010/main" xmlns="" val="1248456722"/>
       </p:ext>
     </p:extLst>
   </p:cSld>
@@ -824,6 +830,7 @@
           <a:p>
             <a:fld id="{1B5268FF-0D67-4269-9FD2-93B489DF800A}" type="datetimeFigureOut">
               <a:rPr lang="fr-FR" smtClean="0"/>
+              <a:pPr/>
               <a:t>30/03/2013</a:t>
             </a:fld>
             <a:endParaRPr lang="fr-FR"/>
@@ -866,6 +873,7 @@
           <a:p>
             <a:fld id="{E0EED72F-F310-45C9-905A-2569A5F74AA6}" type="slidenum">
               <a:rPr lang="fr-FR" smtClean="0"/>
+              <a:pPr/>
               <a:t>‹N°›</a:t>
             </a:fld>
             <a:endParaRPr lang="fr-FR"/>
@@ -875,7 +883,7 @@
     </p:spTree>
     <p:extLst>
       <p:ext uri="{BB962C8B-B14F-4D97-AF65-F5344CB8AC3E}">
-        <p14:creationId xmlns:p14="http://schemas.microsoft.com/office/powerpoint/2010/main" val="4236232986"/>
+        <p14:creationId xmlns:p14="http://schemas.microsoft.com/office/powerpoint/2010/main" xmlns="" val="4236232986"/>
       </p:ext>
     </p:extLst>
   </p:cSld>
@@ -994,6 +1002,7 @@
           <a:p>
             <a:fld id="{1B5268FF-0D67-4269-9FD2-93B489DF800A}" type="datetimeFigureOut">
               <a:rPr lang="fr-FR" smtClean="0"/>
+              <a:pPr/>
               <a:t>30/03/2013</a:t>
             </a:fld>
             <a:endParaRPr lang="fr-FR"/>
@@ -1036,6 +1045,7 @@
           <a:p>
             <a:fld id="{E0EED72F-F310-45C9-905A-2569A5F74AA6}" type="slidenum">
               <a:rPr lang="fr-FR" smtClean="0"/>
+              <a:pPr/>
               <a:t>‹N°›</a:t>
             </a:fld>
             <a:endParaRPr lang="fr-FR"/>
@@ -1045,7 +1055,7 @@
     </p:spTree>
     <p:extLst>
       <p:ext uri="{BB962C8B-B14F-4D97-AF65-F5344CB8AC3E}">
-        <p14:creationId xmlns:p14="http://schemas.microsoft.com/office/powerpoint/2010/main" val="3454835055"/>
+        <p14:creationId xmlns:p14="http://schemas.microsoft.com/office/powerpoint/2010/main" xmlns="" val="3454835055"/>
       </p:ext>
     </p:extLst>
   </p:cSld>
@@ -1247,6 +1257,7 @@
           <a:p>
             <a:fld id="{1B5268FF-0D67-4269-9FD2-93B489DF800A}" type="datetimeFigureOut">
               <a:rPr lang="fr-FR" smtClean="0"/>
+              <a:pPr/>
               <a:t>30/03/2013</a:t>
             </a:fld>
             <a:endParaRPr lang="fr-FR"/>
@@ -1289,6 +1300,7 @@
           <a:p>
             <a:fld id="{E0EED72F-F310-45C9-905A-2569A5F74AA6}" type="slidenum">
               <a:rPr lang="fr-FR" smtClean="0"/>
+              <a:pPr/>
               <a:t>‹N°›</a:t>
             </a:fld>
             <a:endParaRPr lang="fr-FR"/>
@@ -1298,7 +1310,7 @@
     </p:spTree>
     <p:extLst>
       <p:ext uri="{BB962C8B-B14F-4D97-AF65-F5344CB8AC3E}">
-        <p14:creationId xmlns:p14="http://schemas.microsoft.com/office/powerpoint/2010/main" val="804127244"/>
+        <p14:creationId xmlns:p14="http://schemas.microsoft.com/office/powerpoint/2010/main" xmlns="" val="804127244"/>
       </p:ext>
     </p:extLst>
   </p:cSld>
@@ -1535,6 +1547,7 @@
           <a:p>
             <a:fld id="{1B5268FF-0D67-4269-9FD2-93B489DF800A}" type="datetimeFigureOut">
               <a:rPr lang="fr-FR" smtClean="0"/>
+              <a:pPr/>
               <a:t>30/03/2013</a:t>
             </a:fld>
             <a:endParaRPr lang="fr-FR"/>
@@ -1577,6 +1590,7 @@
           <a:p>
             <a:fld id="{E0EED72F-F310-45C9-905A-2569A5F74AA6}" type="slidenum">
               <a:rPr lang="fr-FR" smtClean="0"/>
+              <a:pPr/>
               <a:t>‹N°›</a:t>
             </a:fld>
             <a:endParaRPr lang="fr-FR"/>
@@ -1586,7 +1600,7 @@
     </p:spTree>
     <p:extLst>
       <p:ext uri="{BB962C8B-B14F-4D97-AF65-F5344CB8AC3E}">
-        <p14:creationId xmlns:p14="http://schemas.microsoft.com/office/powerpoint/2010/main" val="586698658"/>
+        <p14:creationId xmlns:p14="http://schemas.microsoft.com/office/powerpoint/2010/main" xmlns="" val="586698658"/>
       </p:ext>
     </p:extLst>
   </p:cSld>
@@ -1957,6 +1971,7 @@
           <a:p>
             <a:fld id="{1B5268FF-0D67-4269-9FD2-93B489DF800A}" type="datetimeFigureOut">
               <a:rPr lang="fr-FR" smtClean="0"/>
+              <a:pPr/>
               <a:t>30/03/2013</a:t>
             </a:fld>
             <a:endParaRPr lang="fr-FR"/>
@@ -1999,6 +2014,7 @@
           <a:p>
             <a:fld id="{E0EED72F-F310-45C9-905A-2569A5F74AA6}" type="slidenum">
               <a:rPr lang="fr-FR" smtClean="0"/>
+              <a:pPr/>
               <a:t>‹N°›</a:t>
             </a:fld>
             <a:endParaRPr lang="fr-FR"/>
@@ -2008,7 +2024,7 @@
     </p:spTree>
     <p:extLst>
       <p:ext uri="{BB962C8B-B14F-4D97-AF65-F5344CB8AC3E}">
-        <p14:creationId xmlns:p14="http://schemas.microsoft.com/office/powerpoint/2010/main" val="19144436"/>
+        <p14:creationId xmlns:p14="http://schemas.microsoft.com/office/powerpoint/2010/main" xmlns="" val="19144436"/>
       </p:ext>
     </p:extLst>
   </p:cSld>
@@ -2075,6 +2091,7 @@
           <a:p>
             <a:fld id="{1B5268FF-0D67-4269-9FD2-93B489DF800A}" type="datetimeFigureOut">
               <a:rPr lang="fr-FR" smtClean="0"/>
+              <a:pPr/>
               <a:t>30/03/2013</a:t>
             </a:fld>
             <a:endParaRPr lang="fr-FR"/>
@@ -2117,6 +2134,7 @@
           <a:p>
             <a:fld id="{E0EED72F-F310-45C9-905A-2569A5F74AA6}" type="slidenum">
               <a:rPr lang="fr-FR" smtClean="0"/>
+              <a:pPr/>
               <a:t>‹N°›</a:t>
             </a:fld>
             <a:endParaRPr lang="fr-FR"/>
@@ -2126,7 +2144,7 @@
     </p:spTree>
     <p:extLst>
       <p:ext uri="{BB962C8B-B14F-4D97-AF65-F5344CB8AC3E}">
-        <p14:creationId xmlns:p14="http://schemas.microsoft.com/office/powerpoint/2010/main" val="202749597"/>
+        <p14:creationId xmlns:p14="http://schemas.microsoft.com/office/powerpoint/2010/main" xmlns="" val="202749597"/>
       </p:ext>
     </p:extLst>
   </p:cSld>
@@ -2170,6 +2188,7 @@
           <a:p>
             <a:fld id="{1B5268FF-0D67-4269-9FD2-93B489DF800A}" type="datetimeFigureOut">
               <a:rPr lang="fr-FR" smtClean="0"/>
+              <a:pPr/>
               <a:t>30/03/2013</a:t>
             </a:fld>
             <a:endParaRPr lang="fr-FR"/>
@@ -2212,6 +2231,7 @@
           <a:p>
             <a:fld id="{E0EED72F-F310-45C9-905A-2569A5F74AA6}" type="slidenum">
               <a:rPr lang="fr-FR" smtClean="0"/>
+              <a:pPr/>
               <a:t>‹N°›</a:t>
             </a:fld>
             <a:endParaRPr lang="fr-FR"/>
@@ -2221,7 +2241,7 @@
     </p:spTree>
     <p:extLst>
       <p:ext uri="{BB962C8B-B14F-4D97-AF65-F5344CB8AC3E}">
-        <p14:creationId xmlns:p14="http://schemas.microsoft.com/office/powerpoint/2010/main" val="2898363528"/>
+        <p14:creationId xmlns:p14="http://schemas.microsoft.com/office/powerpoint/2010/main" xmlns="" val="2898363528"/>
       </p:ext>
     </p:extLst>
   </p:cSld>
@@ -2447,6 +2467,7 @@
           <a:p>
             <a:fld id="{1B5268FF-0D67-4269-9FD2-93B489DF800A}" type="datetimeFigureOut">
               <a:rPr lang="fr-FR" smtClean="0"/>
+              <a:pPr/>
               <a:t>30/03/2013</a:t>
             </a:fld>
             <a:endParaRPr lang="fr-FR"/>
@@ -2489,6 +2510,7 @@
           <a:p>
             <a:fld id="{E0EED72F-F310-45C9-905A-2569A5F74AA6}" type="slidenum">
               <a:rPr lang="fr-FR" smtClean="0"/>
+              <a:pPr/>
               <a:t>‹N°›</a:t>
             </a:fld>
             <a:endParaRPr lang="fr-FR"/>
@@ -2498,7 +2520,7 @@
     </p:spTree>
     <p:extLst>
       <p:ext uri="{BB962C8B-B14F-4D97-AF65-F5344CB8AC3E}">
-        <p14:creationId xmlns:p14="http://schemas.microsoft.com/office/powerpoint/2010/main" val="4010598191"/>
+        <p14:creationId xmlns:p14="http://schemas.microsoft.com/office/powerpoint/2010/main" xmlns="" val="4010598191"/>
       </p:ext>
     </p:extLst>
   </p:cSld>
@@ -2700,6 +2722,7 @@
           <a:p>
             <a:fld id="{1B5268FF-0D67-4269-9FD2-93B489DF800A}" type="datetimeFigureOut">
               <a:rPr lang="fr-FR" smtClean="0"/>
+              <a:pPr/>
               <a:t>30/03/2013</a:t>
             </a:fld>
             <a:endParaRPr lang="fr-FR"/>
@@ -2742,6 +2765,7 @@
           <a:p>
             <a:fld id="{E0EED72F-F310-45C9-905A-2569A5F74AA6}" type="slidenum">
               <a:rPr lang="fr-FR" smtClean="0"/>
+              <a:pPr/>
               <a:t>‹N°›</a:t>
             </a:fld>
             <a:endParaRPr lang="fr-FR"/>
@@ -2751,7 +2775,7 @@
     </p:spTree>
     <p:extLst>
       <p:ext uri="{BB962C8B-B14F-4D97-AF65-F5344CB8AC3E}">
-        <p14:creationId xmlns:p14="http://schemas.microsoft.com/office/powerpoint/2010/main" val="1433498939"/>
+        <p14:creationId xmlns:p14="http://schemas.microsoft.com/office/powerpoint/2010/main" xmlns="" val="1433498939"/>
       </p:ext>
     </p:extLst>
   </p:cSld>
@@ -2913,6 +2937,7 @@
           <a:p>
             <a:fld id="{1B5268FF-0D67-4269-9FD2-93B489DF800A}" type="datetimeFigureOut">
               <a:rPr lang="fr-FR" smtClean="0"/>
+              <a:pPr/>
               <a:t>30/03/2013</a:t>
             </a:fld>
             <a:endParaRPr lang="fr-FR"/>
@@ -2991,6 +3016,7 @@
           <a:p>
             <a:fld id="{E0EED72F-F310-45C9-905A-2569A5F74AA6}" type="slidenum">
               <a:rPr lang="fr-FR" smtClean="0"/>
+              <a:pPr/>
               <a:t>‹N°›</a:t>
             </a:fld>
             <a:endParaRPr lang="fr-FR"/>
@@ -3000,7 +3026,7 @@
     </p:spTree>
     <p:extLst>
       <p:ext uri="{BB962C8B-B14F-4D97-AF65-F5344CB8AC3E}">
-        <p14:creationId xmlns:p14="http://schemas.microsoft.com/office/powerpoint/2010/main" val="2684825788"/>
+        <p14:creationId xmlns:p14="http://schemas.microsoft.com/office/powerpoint/2010/main" xmlns="" val="2684825788"/>
       </p:ext>
     </p:extLst>
   </p:cSld>
@@ -3371,18 +3397,18 @@
     </p:spTree>
     <p:extLst>
       <p:ext uri="{BB962C8B-B14F-4D97-AF65-F5344CB8AC3E}">
-        <p14:creationId xmlns:p14="http://schemas.microsoft.com/office/powerpoint/2010/main" val="3955344790"/>
+        <p14:creationId xmlns:p14="http://schemas.microsoft.com/office/powerpoint/2010/main" xmlns="" val="3955344790"/>
       </p:ext>
     </p:extLst>
   </p:cSld>
   <p:clrMapOvr>
     <a:masterClrMapping/>
   </p:clrMapOvr>
-  <mc:AlternateContent xmlns:mc="http://schemas.openxmlformats.org/markup-compatibility/2006" xmlns:p14="http://schemas.microsoft.com/office/powerpoint/2010/main">
-    <mc:Choice Requires="p14">
+  <mc:AlternateContent xmlns:mc="http://schemas.openxmlformats.org/markup-compatibility/2006">
+    <mc:Choice xmlns:p14="http://schemas.microsoft.com/office/powerpoint/2010/main" xmlns="" Requires="p14">
       <p:transition spd="slow" p14:dur="2000"/>
     </mc:Choice>
-    <mc:Fallback xmlns="">
+    <mc:Fallback>
       <p:transition spd="slow"/>
     </mc:Fallback>
   </mc:AlternateContent>
@@ -3462,7 +3488,7 @@
     </p:spTree>
     <p:extLst>
       <p:ext uri="{BB962C8B-B14F-4D97-AF65-F5344CB8AC3E}">
-        <p14:creationId xmlns:p14="http://schemas.microsoft.com/office/powerpoint/2010/main" val="3139881919"/>
+        <p14:creationId xmlns:p14="http://schemas.microsoft.com/office/powerpoint/2010/main" xmlns="" val="3139881919"/>
       </p:ext>
     </p:extLst>
   </p:cSld>
@@ -3840,7 +3866,7 @@
     </p:spTree>
     <p:extLst>
       <p:ext uri="{BB962C8B-B14F-4D97-AF65-F5344CB8AC3E}">
-        <p14:creationId xmlns:p14="http://schemas.microsoft.com/office/powerpoint/2010/main" val="1728169033"/>
+        <p14:creationId xmlns:p14="http://schemas.microsoft.com/office/powerpoint/2010/main" xmlns="" val="1728169033"/>
       </p:ext>
     </p:extLst>
   </p:cSld>
@@ -3883,10 +3909,10 @@
           <p:nvPr/>
         </p:nvPicPr>
         <p:blipFill>
-          <a:blip r:embed="rId2">
+          <a:blip r:embed="rId2" cstate="print">
             <a:extLst>
               <a:ext uri="{28A0092B-C50C-407E-A947-70E740481C1C}">
-                <a14:useLocalDpi xmlns:a14="http://schemas.microsoft.com/office/drawing/2010/main" val="0"/>
+                <a14:useLocalDpi xmlns:a14="http://schemas.microsoft.com/office/drawing/2010/main" xmlns="" val="0"/>
               </a:ext>
             </a:extLst>
           </a:blip>
@@ -3913,10 +3939,10 @@
           <p:nvPr/>
         </p:nvPicPr>
         <p:blipFill>
-          <a:blip r:embed="rId3">
+          <a:blip r:embed="rId3" cstate="print">
             <a:extLst>
               <a:ext uri="{28A0092B-C50C-407E-A947-70E740481C1C}">
-                <a14:useLocalDpi xmlns:a14="http://schemas.microsoft.com/office/drawing/2010/main" val="0"/>
+                <a14:useLocalDpi xmlns:a14="http://schemas.microsoft.com/office/drawing/2010/main" xmlns="" val="0"/>
               </a:ext>
             </a:extLst>
           </a:blip>
@@ -4233,7 +4259,7 @@
     </p:spTree>
     <p:extLst>
       <p:ext uri="{BB962C8B-B14F-4D97-AF65-F5344CB8AC3E}">
-        <p14:creationId xmlns:p14="http://schemas.microsoft.com/office/powerpoint/2010/main" val="2819423520"/>
+        <p14:creationId xmlns:p14="http://schemas.microsoft.com/office/powerpoint/2010/main" xmlns="" val="2819423520"/>
       </p:ext>
     </p:extLst>
   </p:cSld>
@@ -4419,7 +4445,7 @@
             <a:p>
               <a:pPr algn="ctr"/>
               <a:r>
-                <a:rPr lang="en-US" dirty="0" err="1" smtClean="0"/>
+                <a:rPr lang="en-US" dirty="0" smtClean="0"/>
                 <a:t>MetaModel</a:t>
               </a:r>
               <a:endParaRPr lang="en-US" dirty="0"/>
@@ -4829,7 +4855,7 @@
     </p:spTree>
     <p:extLst>
       <p:ext uri="{BB962C8B-B14F-4D97-AF65-F5344CB8AC3E}">
-        <p14:creationId xmlns:p14="http://schemas.microsoft.com/office/powerpoint/2010/main" val="3627640579"/>
+        <p14:creationId xmlns:p14="http://schemas.microsoft.com/office/powerpoint/2010/main" xmlns="" val="3627640579"/>
       </p:ext>
     </p:extLst>
   </p:cSld>
@@ -4976,7 +5002,7 @@
           <a:p>
             <a:pPr algn="ctr"/>
             <a:r>
-              <a:rPr lang="en-US" dirty="0" err="1" smtClean="0"/>
+              <a:rPr lang="en-US" dirty="0" smtClean="0"/>
               <a:t>MetaModel</a:t>
             </a:r>
             <a:endParaRPr lang="en-US" dirty="0"/>
@@ -4992,10 +5018,10 @@
           <p:nvPr/>
         </p:nvPicPr>
         <p:blipFill>
-          <a:blip r:embed="rId2">
+          <a:blip r:embed="rId2" cstate="print">
             <a:extLst>
               <a:ext uri="{28A0092B-C50C-407E-A947-70E740481C1C}">
-                <a14:useLocalDpi xmlns:a14="http://schemas.microsoft.com/office/drawing/2010/main" val="0"/>
+                <a14:useLocalDpi xmlns:a14="http://schemas.microsoft.com/office/drawing/2010/main" xmlns="" val="0"/>
               </a:ext>
             </a:extLst>
           </a:blip>
@@ -5013,10 +5039,73 @@
           </a:prstGeom>
         </p:spPr>
       </p:pic>
+      <p:sp>
+        <p:nvSpPr>
+          <p:cNvPr id="8" name="Rectangle à coins arrondis 7"/>
+          <p:cNvSpPr/>
+          <p:nvPr/>
+        </p:nvSpPr>
+        <p:spPr>
+          <a:xfrm>
+            <a:off x="5715000" y="1828800"/>
+            <a:ext cx="3048000" cy="838200"/>
+          </a:xfrm>
+          <a:prstGeom prst="roundRect">
+            <a:avLst/>
+          </a:prstGeom>
+          <a:solidFill>
+            <a:schemeClr val="bg1"/>
+          </a:solidFill>
+        </p:spPr>
+        <p:style>
+          <a:lnRef idx="2">
+            <a:schemeClr val="accent1">
+              <a:shade val="50000"/>
+            </a:schemeClr>
+          </a:lnRef>
+          <a:fillRef idx="1">
+            <a:schemeClr val="accent1"/>
+          </a:fillRef>
+          <a:effectRef idx="0">
+            <a:schemeClr val="accent1"/>
+          </a:effectRef>
+          <a:fontRef idx="minor">
+            <a:schemeClr val="lt1"/>
+          </a:fontRef>
+        </p:style>
+        <p:txBody>
+          <a:bodyPr rtlCol="0" anchor="ctr"/>
+          <a:lstStyle/>
+          <a:p>
+            <a:pPr algn="ctr"/>
+            <a:r>
+              <a:rPr lang="en-US" sz="1600" dirty="0" smtClean="0">
+                <a:solidFill>
+                  <a:schemeClr val="tx1"/>
+                </a:solidFill>
+              </a:rPr>
+              <a:t>We define a UI MetaModel</a:t>
+            </a:r>
+            <a:r>
+              <a:rPr lang="en-US" sz="1600" dirty="0" smtClean="0">
+                <a:solidFill>
+                  <a:schemeClr val="tx1"/>
+                </a:solidFill>
+              </a:rPr>
+              <a:t>, and all concept for other layers.</a:t>
+            </a:r>
+            <a:endParaRPr lang="en-US" sz="1600" dirty="0">
+              <a:solidFill>
+                <a:schemeClr val="tx1"/>
+              </a:solidFill>
+            </a:endParaRPr>
+          </a:p>
+        </p:txBody>
+      </p:sp>
     </p:spTree>
     <p:extLst>
       <p:ext uri="{BB962C8B-B14F-4D97-AF65-F5344CB8AC3E}">
-        <p14:creationId xmlns:p14="http://schemas.microsoft.com/office/powerpoint/2010/main" val="171061288"/>
+        <p14:creationId xmlns:p14="http://schemas.microsoft.com/office/powerpoint/2010/main" xmlns="" val="171061288"/>
       </p:ext>
     </p:extLst>
   </p:cSld>
@@ -5059,10 +5148,10 @@
           <p:nvPr/>
         </p:nvPicPr>
         <p:blipFill>
-          <a:blip r:embed="rId2">
+          <a:blip r:embed="rId2" cstate="print">
             <a:extLst>
               <a:ext uri="{28A0092B-C50C-407E-A947-70E740481C1C}">
-                <a14:useLocalDpi xmlns:a14="http://schemas.microsoft.com/office/drawing/2010/main" val="0"/>
+                <a14:useLocalDpi xmlns:a14="http://schemas.microsoft.com/office/drawing/2010/main" xmlns="" val="0"/>
               </a:ext>
             </a:extLst>
           </a:blip>
@@ -5234,10 +5323,70 @@
           </a:p>
         </p:txBody>
       </p:sp>
+      <p:sp>
+        <p:nvSpPr>
+          <p:cNvPr id="7" name="Rectangle à coins arrondis 6"/>
+          <p:cNvSpPr/>
+          <p:nvPr/>
+        </p:nvSpPr>
+        <p:spPr>
+          <a:xfrm>
+            <a:off x="5410200" y="1828800"/>
+            <a:ext cx="3352800" cy="914400"/>
+          </a:xfrm>
+          <a:prstGeom prst="roundRect">
+            <a:avLst/>
+          </a:prstGeom>
+          <a:solidFill>
+            <a:schemeClr val="bg1"/>
+          </a:solidFill>
+          <a:ln>
+            <a:solidFill>
+              <a:schemeClr val="accent3"/>
+            </a:solidFill>
+          </a:ln>
+        </p:spPr>
+        <p:style>
+          <a:lnRef idx="2">
+            <a:schemeClr val="accent1">
+              <a:shade val="50000"/>
+            </a:schemeClr>
+          </a:lnRef>
+          <a:fillRef idx="1">
+            <a:schemeClr val="accent1"/>
+          </a:fillRef>
+          <a:effectRef idx="0">
+            <a:schemeClr val="accent1"/>
+          </a:effectRef>
+          <a:fontRef idx="minor">
+            <a:schemeClr val="lt1"/>
+          </a:fontRef>
+        </p:style>
+        <p:txBody>
+          <a:bodyPr rtlCol="0" anchor="ctr"/>
+          <a:lstStyle/>
+          <a:p>
+            <a:pPr algn="ctr"/>
+            <a:r>
+              <a:rPr lang="en-US" sz="1600" dirty="0" smtClean="0">
+                <a:solidFill>
+                  <a:schemeClr val="tx1"/>
+                </a:solidFill>
+              </a:rPr>
+              <a:t>We define our UI model (screens, fields, etc.), only using enumerations.</a:t>
+            </a:r>
+            <a:endParaRPr lang="en-US" sz="1600" dirty="0">
+              <a:solidFill>
+                <a:schemeClr val="tx1"/>
+              </a:solidFill>
+            </a:endParaRPr>
+          </a:p>
+        </p:txBody>
+      </p:sp>
     </p:spTree>
     <p:extLst>
       <p:ext uri="{BB962C8B-B14F-4D97-AF65-F5344CB8AC3E}">
-        <p14:creationId xmlns:p14="http://schemas.microsoft.com/office/powerpoint/2010/main" val="394514968"/>
+        <p14:creationId xmlns:p14="http://schemas.microsoft.com/office/powerpoint/2010/main" xmlns="" val="394514968"/>
       </p:ext>
     </p:extLst>
   </p:cSld>
@@ -5368,10 +5517,10 @@
           <p:nvPr/>
         </p:nvPicPr>
         <p:blipFill>
-          <a:blip r:embed="rId2">
+          <a:blip r:embed="rId2" cstate="print">
             <a:extLst>
               <a:ext uri="{28A0092B-C50C-407E-A947-70E740481C1C}">
-                <a14:useLocalDpi xmlns:a14="http://schemas.microsoft.com/office/drawing/2010/main" val="0"/>
+                <a14:useLocalDpi xmlns:a14="http://schemas.microsoft.com/office/drawing/2010/main" xmlns="" val="0"/>
               </a:ext>
             </a:extLst>
           </a:blip>
@@ -5392,7 +5541,7 @@
     </p:spTree>
     <p:extLst>
       <p:ext uri="{BB962C8B-B14F-4D97-AF65-F5344CB8AC3E}">
-        <p14:creationId xmlns:p14="http://schemas.microsoft.com/office/powerpoint/2010/main" val="3593113261"/>
+        <p14:creationId xmlns:p14="http://schemas.microsoft.com/office/powerpoint/2010/main" xmlns="" val="3593113261"/>
       </p:ext>
     </p:extLst>
   </p:cSld>
@@ -5547,10 +5696,10 @@
           <p:nvPr/>
         </p:nvPicPr>
         <p:blipFill>
-          <a:blip r:embed="rId2">
+          <a:blip r:embed="rId2" cstate="print">
             <a:extLst>
               <a:ext uri="{28A0092B-C50C-407E-A947-70E740481C1C}">
-                <a14:useLocalDpi xmlns:a14="http://schemas.microsoft.com/office/drawing/2010/main" val="0"/>
+                <a14:useLocalDpi xmlns:a14="http://schemas.microsoft.com/office/drawing/2010/main" xmlns="" val="0"/>
               </a:ext>
             </a:extLst>
           </a:blip>
@@ -5571,7 +5720,7 @@
     </p:spTree>
     <p:extLst>
       <p:ext uri="{BB962C8B-B14F-4D97-AF65-F5344CB8AC3E}">
-        <p14:creationId xmlns:p14="http://schemas.microsoft.com/office/powerpoint/2010/main" val="451913240"/>
+        <p14:creationId xmlns:p14="http://schemas.microsoft.com/office/powerpoint/2010/main" xmlns="" val="451913240"/>
       </p:ext>
     </p:extLst>
   </p:cSld>
@@ -5637,10 +5786,10 @@
           <p:nvPr/>
         </p:nvPicPr>
         <p:blipFill>
-          <a:blip r:embed="rId2">
+          <a:blip r:embed="rId2" cstate="print">
             <a:extLst>
               <a:ext uri="{28A0092B-C50C-407E-A947-70E740481C1C}">
-                <a14:useLocalDpi xmlns:a14="http://schemas.microsoft.com/office/drawing/2010/main" val="0"/>
+                <a14:useLocalDpi xmlns:a14="http://schemas.microsoft.com/office/drawing/2010/main" xmlns="" val="0"/>
               </a:ext>
             </a:extLst>
           </a:blip>
@@ -5661,7 +5810,7 @@
     </p:spTree>
     <p:extLst>
       <p:ext uri="{BB962C8B-B14F-4D97-AF65-F5344CB8AC3E}">
-        <p14:creationId xmlns:p14="http://schemas.microsoft.com/office/powerpoint/2010/main" val="2009636028"/>
+        <p14:creationId xmlns:p14="http://schemas.microsoft.com/office/powerpoint/2010/main" xmlns="" val="2009636028"/>
       </p:ext>
     </p:extLst>
   </p:cSld>
@@ -5727,10 +5876,10 @@
           <p:nvPr/>
         </p:nvPicPr>
         <p:blipFill>
-          <a:blip r:embed="rId2">
+          <a:blip r:embed="rId2" cstate="print">
             <a:extLst>
               <a:ext uri="{28A0092B-C50C-407E-A947-70E740481C1C}">
-                <a14:useLocalDpi xmlns:a14="http://schemas.microsoft.com/office/drawing/2010/main" val="0"/>
+                <a14:useLocalDpi xmlns:a14="http://schemas.microsoft.com/office/drawing/2010/main" xmlns="" val="0"/>
               </a:ext>
             </a:extLst>
           </a:blip>
@@ -5751,7 +5900,7 @@
     </p:spTree>
     <p:extLst>
       <p:ext uri="{BB962C8B-B14F-4D97-AF65-F5344CB8AC3E}">
-        <p14:creationId xmlns:p14="http://schemas.microsoft.com/office/powerpoint/2010/main" val="1131833659"/>
+        <p14:creationId xmlns:p14="http://schemas.microsoft.com/office/powerpoint/2010/main" xmlns="" val="1131833659"/>
       </p:ext>
     </p:extLst>
   </p:cSld>
@@ -5930,7 +6079,87 @@
           </a:bodyPr>
           <a:lstStyle/>
           <a:p>
-            <a:endParaRPr lang="en-US" dirty="0"/>
+            <a:r>
+              <a:rPr lang="en-US" sz="2000" dirty="0" smtClean="0"/>
+              <a:t>@</a:t>
+            </a:r>
+            <a:r>
+              <a:rPr lang="en-US" sz="2000" dirty="0" err="1" smtClean="0"/>
+              <a:t>jubaudry</a:t>
+            </a:r>
+            <a:r>
+              <a:rPr lang="en-US" sz="2000" dirty="0" smtClean="0"/>
+              <a:t> – </a:t>
+            </a:r>
+            <a:r>
+              <a:rPr lang="en-US" sz="2000" dirty="0" err="1" smtClean="0"/>
+              <a:t>Julien</a:t>
+            </a:r>
+            <a:r>
+              <a:rPr lang="en-US" sz="2000" dirty="0" smtClean="0"/>
+              <a:t> </a:t>
+            </a:r>
+            <a:r>
+              <a:rPr lang="en-US" sz="2000" dirty="0" err="1" smtClean="0"/>
+              <a:t>Baudry</a:t>
+            </a:r>
+            <a:endParaRPr lang="en-US" sz="2000" dirty="0" smtClean="0"/>
+          </a:p>
+          <a:p>
+            <a:r>
+              <a:rPr lang="en-US" sz="2000" dirty="0" smtClean="0"/>
+              <a:t>Java Developer since 2007</a:t>
+            </a:r>
+          </a:p>
+          <a:p>
+            <a:r>
+              <a:rPr lang="en-US" sz="2000" dirty="0" smtClean="0"/>
+              <a:t>Senior developer at</a:t>
+            </a:r>
+          </a:p>
+          <a:p>
+            <a:endParaRPr lang="en-US" sz="2000" dirty="0" smtClean="0"/>
+          </a:p>
+          <a:p>
+            <a:endParaRPr lang="en-US" sz="2000" dirty="0" smtClean="0"/>
+          </a:p>
+          <a:p>
+            <a:endParaRPr lang="en-US" sz="2000" dirty="0" smtClean="0"/>
+          </a:p>
+          <a:p>
+            <a:r>
+              <a:rPr lang="en-US" sz="2000" dirty="0" smtClean="0"/>
+              <a:t>Prima-Solutions</a:t>
+            </a:r>
+          </a:p>
+          <a:p>
+            <a:pPr lvl="1"/>
+            <a:r>
+              <a:rPr lang="en-US" sz="1800" dirty="0" smtClean="0"/>
+              <a:t>Services Platform for J2EE</a:t>
+            </a:r>
+          </a:p>
+          <a:p>
+            <a:pPr lvl="1"/>
+            <a:r>
+              <a:rPr lang="en-US" sz="1800" dirty="0" smtClean="0"/>
+              <a:t>Domain models code </a:t>
+            </a:r>
+            <a:r>
+              <a:rPr lang="en-US" sz="1800" dirty="0" smtClean="0"/>
+              <a:t>generators</a:t>
+            </a:r>
+          </a:p>
+          <a:p>
+            <a:pPr lvl="1"/>
+            <a:r>
+              <a:rPr lang="en-US" sz="1800" dirty="0" smtClean="0"/>
+              <a:t>Reinsurance software</a:t>
+            </a:r>
+            <a:endParaRPr lang="en-US" sz="1800" dirty="0" smtClean="0"/>
+          </a:p>
+          <a:p>
+            <a:endParaRPr lang="en-US" sz="2000" dirty="0"/>
           </a:p>
         </p:txBody>
       </p:sp>
@@ -5946,7 +6175,7 @@
           <a:blip r:embed="rId2" cstate="print">
             <a:extLst>
               <a:ext uri="{28A0092B-C50C-407E-A947-70E740481C1C}">
-                <a14:useLocalDpi xmlns:a14="http://schemas.microsoft.com/office/drawing/2010/main"/>
+                <a14:useLocalDpi xmlns:a14="http://schemas.microsoft.com/office/drawing/2010/main" xmlns=""/>
               </a:ext>
             </a:extLst>
           </a:blip>
@@ -5956,8 +6185,8 @@
         </p:blipFill>
         <p:spPr>
           <a:xfrm>
-            <a:off x="1371600" y="2895600"/>
-            <a:ext cx="2336800" cy="436021"/>
+            <a:off x="2649141" y="2819400"/>
+            <a:ext cx="3675459" cy="685800"/>
           </a:xfrm>
           <a:prstGeom prst="rect">
             <a:avLst/>
@@ -5971,7 +6200,7 @@
     </p:spTree>
     <p:extLst>
       <p:ext uri="{BB962C8B-B14F-4D97-AF65-F5344CB8AC3E}">
-        <p14:creationId xmlns:p14="http://schemas.microsoft.com/office/powerpoint/2010/main" val="1630604182"/>
+        <p14:creationId xmlns:p14="http://schemas.microsoft.com/office/powerpoint/2010/main" xmlns="" val="1630604182"/>
       </p:ext>
     </p:extLst>
   </p:cSld>
@@ -6112,7 +6341,7 @@
     </p:spTree>
     <p:extLst>
       <p:ext uri="{BB962C8B-B14F-4D97-AF65-F5344CB8AC3E}">
-        <p14:creationId xmlns:p14="http://schemas.microsoft.com/office/powerpoint/2010/main" val="3312784383"/>
+        <p14:creationId xmlns:p14="http://schemas.microsoft.com/office/powerpoint/2010/main" xmlns="" val="3312784383"/>
       </p:ext>
     </p:extLst>
   </p:cSld>
@@ -6181,7 +6410,7 @@
           <p:nvPr/>
         </p:nvPicPr>
         <p:blipFill>
-          <a:blip r:embed="rId2"/>
+          <a:blip r:embed="rId2" cstate="print"/>
           <a:stretch>
             <a:fillRect/>
           </a:stretch>
@@ -6210,7 +6439,7 @@
           <p:nvPr/>
         </p:nvPicPr>
         <p:blipFill>
-          <a:blip r:embed="rId3"/>
+          <a:blip r:embed="rId3" cstate="print"/>
           <a:stretch>
             <a:fillRect/>
           </a:stretch>
@@ -6237,7 +6466,7 @@
           <p:nvPr/>
         </p:nvPicPr>
         <p:blipFill>
-          <a:blip r:embed="rId4"/>
+          <a:blip r:embed="rId4" cstate="print"/>
           <a:stretch>
             <a:fillRect/>
           </a:stretch>
@@ -6266,7 +6495,7 @@
           <p:nvPr/>
         </p:nvPicPr>
         <p:blipFill>
-          <a:blip r:embed="rId5"/>
+          <a:blip r:embed="rId5" cstate="print"/>
           <a:stretch>
             <a:fillRect/>
           </a:stretch>
@@ -6295,7 +6524,7 @@
           <p:nvPr/>
         </p:nvPicPr>
         <p:blipFill>
-          <a:blip r:embed="rId6"/>
+          <a:blip r:embed="rId6" cstate="print"/>
           <a:stretch>
             <a:fillRect/>
           </a:stretch>
@@ -6322,7 +6551,7 @@
           <p:nvPr/>
         </p:nvPicPr>
         <p:blipFill>
-          <a:blip r:embed="rId7"/>
+          <a:blip r:embed="rId7" cstate="print"/>
           <a:stretch>
             <a:fillRect/>
           </a:stretch>
@@ -6345,7 +6574,7 @@
     </p:spTree>
     <p:extLst>
       <p:ext uri="{BB962C8B-B14F-4D97-AF65-F5344CB8AC3E}">
-        <p14:creationId xmlns:p14="http://schemas.microsoft.com/office/powerpoint/2010/main" val="2834344091"/>
+        <p14:creationId xmlns:p14="http://schemas.microsoft.com/office/powerpoint/2010/main" xmlns="" val="2834344091"/>
       </p:ext>
     </p:extLst>
   </p:cSld>
@@ -6796,7 +7025,7 @@
     </p:spTree>
     <p:extLst>
       <p:ext uri="{BB962C8B-B14F-4D97-AF65-F5344CB8AC3E}">
-        <p14:creationId xmlns:p14="http://schemas.microsoft.com/office/powerpoint/2010/main" val="13878138"/>
+        <p14:creationId xmlns:p14="http://schemas.microsoft.com/office/powerpoint/2010/main" xmlns="" val="13878138"/>
       </p:ext>
     </p:extLst>
   </p:cSld>
@@ -6983,7 +7212,7 @@
     </p:spTree>
     <p:extLst>
       <p:ext uri="{BB962C8B-B14F-4D97-AF65-F5344CB8AC3E}">
-        <p14:creationId xmlns:p14="http://schemas.microsoft.com/office/powerpoint/2010/main" val="4255503392"/>
+        <p14:creationId xmlns:p14="http://schemas.microsoft.com/office/powerpoint/2010/main" xmlns="" val="4255503392"/>
       </p:ext>
     </p:extLst>
   </p:cSld>
@@ -7132,7 +7361,7 @@
     </p:spTree>
     <p:extLst>
       <p:ext uri="{BB962C8B-B14F-4D97-AF65-F5344CB8AC3E}">
-        <p14:creationId xmlns:p14="http://schemas.microsoft.com/office/powerpoint/2010/main" val="2375505937"/>
+        <p14:creationId xmlns:p14="http://schemas.microsoft.com/office/powerpoint/2010/main" xmlns="" val="2375505937"/>
       </p:ext>
     </p:extLst>
   </p:cSld>
@@ -7263,18 +7492,18 @@
     </p:spTree>
     <p:extLst>
       <p:ext uri="{BB962C8B-B14F-4D97-AF65-F5344CB8AC3E}">
-        <p14:creationId xmlns:p14="http://schemas.microsoft.com/office/powerpoint/2010/main" val="1618189430"/>
+        <p14:creationId xmlns:p14="http://schemas.microsoft.com/office/powerpoint/2010/main" xmlns="" val="1618189430"/>
       </p:ext>
     </p:extLst>
   </p:cSld>
   <p:clrMapOvr>
     <a:masterClrMapping/>
   </p:clrMapOvr>
-  <mc:AlternateContent xmlns:mc="http://schemas.openxmlformats.org/markup-compatibility/2006" xmlns:p14="http://schemas.microsoft.com/office/powerpoint/2010/main">
-    <mc:Choice Requires="p14">
+  <mc:AlternateContent xmlns:mc="http://schemas.openxmlformats.org/markup-compatibility/2006">
+    <mc:Choice xmlns:p14="http://schemas.microsoft.com/office/powerpoint/2010/main" xmlns="" Requires="p14">
       <p:transition spd="slow" p14:dur="2000"/>
     </mc:Choice>
-    <mc:Fallback xmlns="">
+    <mc:Fallback>
       <p:transition spd="slow"/>
     </mc:Fallback>
   </mc:AlternateContent>
@@ -7439,7 +7668,7 @@
     </p:spTree>
     <p:extLst>
       <p:ext uri="{BB962C8B-B14F-4D97-AF65-F5344CB8AC3E}">
-        <p14:creationId xmlns:p14="http://schemas.microsoft.com/office/powerpoint/2010/main" val="3644490438"/>
+        <p14:creationId xmlns:p14="http://schemas.microsoft.com/office/powerpoint/2010/main" xmlns="" val="3644490438"/>
       </p:ext>
     </p:extLst>
   </p:cSld>

</xml_diff>

<commit_message>
fixing spelling issues on MDL4UI presentation (to continue)
</commit_message>
<xml_diff>
--- a/mdl4ui-docs/mdl4ui_cg2013.pptx
+++ b/mdl4ui-docs/mdl4ui_cg2013.pptx
@@ -287,7 +287,7 @@
     </p:spTree>
     <p:extLst>
       <p:ext uri="{BB962C8B-B14F-4D97-AF65-F5344CB8AC3E}">
-        <p14:creationId xmlns:p14="http://schemas.microsoft.com/office/powerpoint/2010/main" xmlns="" val="70803672"/>
+        <p14:creationId xmlns="" xmlns:p14="http://schemas.microsoft.com/office/powerpoint/2010/main" val="70803672"/>
       </p:ext>
     </p:extLst>
   </p:cSld>
@@ -529,7 +529,7 @@
     </p:spTree>
     <p:extLst>
       <p:ext uri="{BB962C8B-B14F-4D97-AF65-F5344CB8AC3E}">
-        <p14:creationId xmlns:p14="http://schemas.microsoft.com/office/powerpoint/2010/main" xmlns="" val="322609761"/>
+        <p14:creationId xmlns="" xmlns:p14="http://schemas.microsoft.com/office/powerpoint/2010/main" val="322609761"/>
       </p:ext>
     </p:extLst>
   </p:cSld>
@@ -701,7 +701,7 @@
     </p:spTree>
     <p:extLst>
       <p:ext uri="{BB962C8B-B14F-4D97-AF65-F5344CB8AC3E}">
-        <p14:creationId xmlns:p14="http://schemas.microsoft.com/office/powerpoint/2010/main" xmlns="" val="1248456722"/>
+        <p14:creationId xmlns="" xmlns:p14="http://schemas.microsoft.com/office/powerpoint/2010/main" val="1248456722"/>
       </p:ext>
     </p:extLst>
   </p:cSld>
@@ -883,7 +883,7 @@
     </p:spTree>
     <p:extLst>
       <p:ext uri="{BB962C8B-B14F-4D97-AF65-F5344CB8AC3E}">
-        <p14:creationId xmlns:p14="http://schemas.microsoft.com/office/powerpoint/2010/main" xmlns="" val="4236232986"/>
+        <p14:creationId xmlns="" xmlns:p14="http://schemas.microsoft.com/office/powerpoint/2010/main" val="4236232986"/>
       </p:ext>
     </p:extLst>
   </p:cSld>
@@ -1055,7 +1055,7 @@
     </p:spTree>
     <p:extLst>
       <p:ext uri="{BB962C8B-B14F-4D97-AF65-F5344CB8AC3E}">
-        <p14:creationId xmlns:p14="http://schemas.microsoft.com/office/powerpoint/2010/main" xmlns="" val="3454835055"/>
+        <p14:creationId xmlns="" xmlns:p14="http://schemas.microsoft.com/office/powerpoint/2010/main" val="3454835055"/>
       </p:ext>
     </p:extLst>
   </p:cSld>
@@ -1310,7 +1310,7 @@
     </p:spTree>
     <p:extLst>
       <p:ext uri="{BB962C8B-B14F-4D97-AF65-F5344CB8AC3E}">
-        <p14:creationId xmlns:p14="http://schemas.microsoft.com/office/powerpoint/2010/main" xmlns="" val="804127244"/>
+        <p14:creationId xmlns="" xmlns:p14="http://schemas.microsoft.com/office/powerpoint/2010/main" val="804127244"/>
       </p:ext>
     </p:extLst>
   </p:cSld>
@@ -1600,7 +1600,7 @@
     </p:spTree>
     <p:extLst>
       <p:ext uri="{BB962C8B-B14F-4D97-AF65-F5344CB8AC3E}">
-        <p14:creationId xmlns:p14="http://schemas.microsoft.com/office/powerpoint/2010/main" xmlns="" val="586698658"/>
+        <p14:creationId xmlns="" xmlns:p14="http://schemas.microsoft.com/office/powerpoint/2010/main" val="586698658"/>
       </p:ext>
     </p:extLst>
   </p:cSld>
@@ -2024,7 +2024,7 @@
     </p:spTree>
     <p:extLst>
       <p:ext uri="{BB962C8B-B14F-4D97-AF65-F5344CB8AC3E}">
-        <p14:creationId xmlns:p14="http://schemas.microsoft.com/office/powerpoint/2010/main" xmlns="" val="19144436"/>
+        <p14:creationId xmlns="" xmlns:p14="http://schemas.microsoft.com/office/powerpoint/2010/main" val="19144436"/>
       </p:ext>
     </p:extLst>
   </p:cSld>
@@ -2144,7 +2144,7 @@
     </p:spTree>
     <p:extLst>
       <p:ext uri="{BB962C8B-B14F-4D97-AF65-F5344CB8AC3E}">
-        <p14:creationId xmlns:p14="http://schemas.microsoft.com/office/powerpoint/2010/main" xmlns="" val="202749597"/>
+        <p14:creationId xmlns="" xmlns:p14="http://schemas.microsoft.com/office/powerpoint/2010/main" val="202749597"/>
       </p:ext>
     </p:extLst>
   </p:cSld>
@@ -2241,7 +2241,7 @@
     </p:spTree>
     <p:extLst>
       <p:ext uri="{BB962C8B-B14F-4D97-AF65-F5344CB8AC3E}">
-        <p14:creationId xmlns:p14="http://schemas.microsoft.com/office/powerpoint/2010/main" xmlns="" val="2898363528"/>
+        <p14:creationId xmlns="" xmlns:p14="http://schemas.microsoft.com/office/powerpoint/2010/main" val="2898363528"/>
       </p:ext>
     </p:extLst>
   </p:cSld>
@@ -2520,7 +2520,7 @@
     </p:spTree>
     <p:extLst>
       <p:ext uri="{BB962C8B-B14F-4D97-AF65-F5344CB8AC3E}">
-        <p14:creationId xmlns:p14="http://schemas.microsoft.com/office/powerpoint/2010/main" xmlns="" val="4010598191"/>
+        <p14:creationId xmlns="" xmlns:p14="http://schemas.microsoft.com/office/powerpoint/2010/main" val="4010598191"/>
       </p:ext>
     </p:extLst>
   </p:cSld>
@@ -2775,7 +2775,7 @@
     </p:spTree>
     <p:extLst>
       <p:ext uri="{BB962C8B-B14F-4D97-AF65-F5344CB8AC3E}">
-        <p14:creationId xmlns:p14="http://schemas.microsoft.com/office/powerpoint/2010/main" xmlns="" val="1433498939"/>
+        <p14:creationId xmlns="" xmlns:p14="http://schemas.microsoft.com/office/powerpoint/2010/main" val="1433498939"/>
       </p:ext>
     </p:extLst>
   </p:cSld>
@@ -3026,7 +3026,7 @@
     </p:spTree>
     <p:extLst>
       <p:ext uri="{BB962C8B-B14F-4D97-AF65-F5344CB8AC3E}">
-        <p14:creationId xmlns:p14="http://schemas.microsoft.com/office/powerpoint/2010/main" xmlns="" val="2684825788"/>
+        <p14:creationId xmlns="" xmlns:p14="http://schemas.microsoft.com/office/powerpoint/2010/main" val="2684825788"/>
       </p:ext>
     </p:extLst>
   </p:cSld>
@@ -3397,7 +3397,7 @@
     </p:spTree>
     <p:extLst>
       <p:ext uri="{BB962C8B-B14F-4D97-AF65-F5344CB8AC3E}">
-        <p14:creationId xmlns:p14="http://schemas.microsoft.com/office/powerpoint/2010/main" xmlns="" val="3955344790"/>
+        <p14:creationId xmlns="" xmlns:p14="http://schemas.microsoft.com/office/powerpoint/2010/main" val="3955344790"/>
       </p:ext>
     </p:extLst>
   </p:cSld>
@@ -3405,7 +3405,7 @@
     <a:masterClrMapping/>
   </p:clrMapOvr>
   <mc:AlternateContent xmlns:mc="http://schemas.openxmlformats.org/markup-compatibility/2006">
-    <mc:Choice xmlns:p14="http://schemas.microsoft.com/office/powerpoint/2010/main" xmlns="" Requires="p14">
+    <mc:Choice xmlns="" xmlns:p14="http://schemas.microsoft.com/office/powerpoint/2010/main" Requires="p14">
       <p:transition spd="slow" p14:dur="2000"/>
     </mc:Choice>
     <mc:Fallback>
@@ -3488,7 +3488,7 @@
     </p:spTree>
     <p:extLst>
       <p:ext uri="{BB962C8B-B14F-4D97-AF65-F5344CB8AC3E}">
-        <p14:creationId xmlns:p14="http://schemas.microsoft.com/office/powerpoint/2010/main" xmlns="" val="3139881919"/>
+        <p14:creationId xmlns="" xmlns:p14="http://schemas.microsoft.com/office/powerpoint/2010/main" val="3139881919"/>
       </p:ext>
     </p:extLst>
   </p:cSld>
@@ -3739,7 +3739,7 @@
         <p:spPr>
           <a:xfrm>
             <a:off x="228600" y="1295400"/>
-            <a:ext cx="8655612" cy="3477875"/>
+            <a:ext cx="8655612" cy="3170099"/>
           </a:xfrm>
           <a:prstGeom prst="rect">
             <a:avLst/>
@@ -3762,7 +3762,15 @@
             </a:r>
             <a:r>
               <a:rPr lang="en-US" sz="2000" dirty="0" smtClean="0"/>
-              <a:t> : foundation framework for text resource injection containing APT processors and annotations</a:t>
+              <a:t> : foundation framework for text resource </a:t>
+            </a:r>
+            <a:r>
+              <a:rPr lang="en-US" sz="2000" dirty="0" smtClean="0"/>
+              <a:t>injection, </a:t>
+            </a:r>
+            <a:r>
+              <a:rPr lang="en-US" sz="2000" dirty="0" smtClean="0"/>
+              <a:t>containing APT processors and annotations</a:t>
             </a:r>
           </a:p>
           <a:p>
@@ -3790,7 +3798,23 @@
             </a:r>
             <a:r>
               <a:rPr lang="en-US" sz="2000" dirty="0" smtClean="0"/>
-              <a:t>: the model instance for our code sample including fields and dependencies</a:t>
+              <a:t>: </a:t>
+            </a:r>
+            <a:r>
+              <a:rPr lang="en-US" sz="2000" dirty="0" smtClean="0"/>
+              <a:t>model </a:t>
+            </a:r>
+            <a:r>
+              <a:rPr lang="en-US" sz="2000" dirty="0" smtClean="0"/>
+              <a:t>instance for our code </a:t>
+            </a:r>
+            <a:r>
+              <a:rPr lang="en-US" sz="2000" dirty="0" smtClean="0"/>
+              <a:t>sample, </a:t>
+            </a:r>
+            <a:r>
+              <a:rPr lang="en-US" sz="2000" dirty="0" smtClean="0"/>
+              <a:t>including fields and dependencies</a:t>
             </a:r>
           </a:p>
           <a:p>
@@ -3804,7 +3828,15 @@
             </a:r>
             <a:r>
               <a:rPr lang="en-US" sz="2000" dirty="0" smtClean="0"/>
-              <a:t>: a maven plugin part of the foundation framework that generate and check the dependency graph between the fields, export the model in XMI</a:t>
+              <a:t>: </a:t>
+            </a:r>
+            <a:r>
+              <a:rPr lang="en-US" sz="2000" dirty="0" smtClean="0"/>
+              <a:t>maven </a:t>
+            </a:r>
+            <a:r>
+              <a:rPr lang="en-US" sz="2000" dirty="0" smtClean="0"/>
+              <a:t>plugin part of the foundation framework that generate and check the dependency graph between the fields, export the model in XMI</a:t>
             </a:r>
           </a:p>
           <a:p>
@@ -3818,7 +3850,15 @@
             </a:r>
             <a:r>
               <a:rPr lang="en-US" sz="2000" dirty="0" smtClean="0"/>
-              <a:t>:  the business rules, validation and field editors (MVC pattern) for our sample</a:t>
+              <a:t>:  </a:t>
+            </a:r>
+            <a:r>
+              <a:rPr lang="en-US" sz="2000" dirty="0" smtClean="0"/>
+              <a:t>business </a:t>
+            </a:r>
+            <a:r>
+              <a:rPr lang="en-US" sz="2000" dirty="0" smtClean="0"/>
+              <a:t>rules, validation and field editors (MVC pattern) for our sample</a:t>
             </a:r>
           </a:p>
         </p:txBody>
@@ -3866,7 +3906,7 @@
     </p:spTree>
     <p:extLst>
       <p:ext uri="{BB962C8B-B14F-4D97-AF65-F5344CB8AC3E}">
-        <p14:creationId xmlns:p14="http://schemas.microsoft.com/office/powerpoint/2010/main" xmlns="" val="1728169033"/>
+        <p14:creationId xmlns="" xmlns:p14="http://schemas.microsoft.com/office/powerpoint/2010/main" val="1728169033"/>
       </p:ext>
     </p:extLst>
   </p:cSld>
@@ -3912,7 +3952,7 @@
           <a:blip r:embed="rId2" cstate="print">
             <a:extLst>
               <a:ext uri="{28A0092B-C50C-407E-A947-70E740481C1C}">
-                <a14:useLocalDpi xmlns:a14="http://schemas.microsoft.com/office/drawing/2010/main" xmlns="" val="0"/>
+                <a14:useLocalDpi xmlns="" xmlns:a14="http://schemas.microsoft.com/office/drawing/2010/main" val="0"/>
               </a:ext>
             </a:extLst>
           </a:blip>
@@ -3942,7 +3982,7 @@
           <a:blip r:embed="rId3" cstate="print">
             <a:extLst>
               <a:ext uri="{28A0092B-C50C-407E-A947-70E740481C1C}">
-                <a14:useLocalDpi xmlns:a14="http://schemas.microsoft.com/office/drawing/2010/main" xmlns="" val="0"/>
+                <a14:useLocalDpi xmlns="" xmlns:a14="http://schemas.microsoft.com/office/drawing/2010/main" val="0"/>
               </a:ext>
             </a:extLst>
           </a:blip>
@@ -4259,7 +4299,7 @@
     </p:spTree>
     <p:extLst>
       <p:ext uri="{BB962C8B-B14F-4D97-AF65-F5344CB8AC3E}">
-        <p14:creationId xmlns:p14="http://schemas.microsoft.com/office/powerpoint/2010/main" xmlns="" val="2819423520"/>
+        <p14:creationId xmlns="" xmlns:p14="http://schemas.microsoft.com/office/powerpoint/2010/main" val="2819423520"/>
       </p:ext>
     </p:extLst>
   </p:cSld>
@@ -4855,7 +4895,7 @@
     </p:spTree>
     <p:extLst>
       <p:ext uri="{BB962C8B-B14F-4D97-AF65-F5344CB8AC3E}">
-        <p14:creationId xmlns:p14="http://schemas.microsoft.com/office/powerpoint/2010/main" xmlns="" val="3627640579"/>
+        <p14:creationId xmlns="" xmlns:p14="http://schemas.microsoft.com/office/powerpoint/2010/main" val="3627640579"/>
       </p:ext>
     </p:extLst>
   </p:cSld>
@@ -5021,7 +5061,7 @@
           <a:blip r:embed="rId2" cstate="print">
             <a:extLst>
               <a:ext uri="{28A0092B-C50C-407E-A947-70E740481C1C}">
-                <a14:useLocalDpi xmlns:a14="http://schemas.microsoft.com/office/drawing/2010/main" xmlns="" val="0"/>
+                <a14:useLocalDpi xmlns="" xmlns:a14="http://schemas.microsoft.com/office/drawing/2010/main" val="0"/>
               </a:ext>
             </a:extLst>
           </a:blip>
@@ -5084,15 +5124,7 @@
                   <a:schemeClr val="tx1"/>
                 </a:solidFill>
               </a:rPr>
-              <a:t>We define a UI MetaModel</a:t>
-            </a:r>
-            <a:r>
-              <a:rPr lang="en-US" sz="1600" dirty="0" smtClean="0">
-                <a:solidFill>
-                  <a:schemeClr val="tx1"/>
-                </a:solidFill>
-              </a:rPr>
-              <a:t>, and all concept for other layers.</a:t>
+              <a:t>We define a UI MetaModel, and all concept for other layers.</a:t>
             </a:r>
             <a:endParaRPr lang="en-US" sz="1600" dirty="0">
               <a:solidFill>
@@ -5105,7 +5137,7 @@
     </p:spTree>
     <p:extLst>
       <p:ext uri="{BB962C8B-B14F-4D97-AF65-F5344CB8AC3E}">
-        <p14:creationId xmlns:p14="http://schemas.microsoft.com/office/powerpoint/2010/main" xmlns="" val="171061288"/>
+        <p14:creationId xmlns="" xmlns:p14="http://schemas.microsoft.com/office/powerpoint/2010/main" val="171061288"/>
       </p:ext>
     </p:extLst>
   </p:cSld>
@@ -5151,7 +5183,7 @@
           <a:blip r:embed="rId2" cstate="print">
             <a:extLst>
               <a:ext uri="{28A0092B-C50C-407E-A947-70E740481C1C}">
-                <a14:useLocalDpi xmlns:a14="http://schemas.microsoft.com/office/drawing/2010/main" xmlns="" val="0"/>
+                <a14:useLocalDpi xmlns="" xmlns:a14="http://schemas.microsoft.com/office/drawing/2010/main" val="0"/>
               </a:ext>
             </a:extLst>
           </a:blip>
@@ -5386,7 +5418,7 @@
     </p:spTree>
     <p:extLst>
       <p:ext uri="{BB962C8B-B14F-4D97-AF65-F5344CB8AC3E}">
-        <p14:creationId xmlns:p14="http://schemas.microsoft.com/office/powerpoint/2010/main" xmlns="" val="394514968"/>
+        <p14:creationId xmlns="" xmlns:p14="http://schemas.microsoft.com/office/powerpoint/2010/main" val="394514968"/>
       </p:ext>
     </p:extLst>
   </p:cSld>
@@ -5520,7 +5552,7 @@
           <a:blip r:embed="rId2" cstate="print">
             <a:extLst>
               <a:ext uri="{28A0092B-C50C-407E-A947-70E740481C1C}">
-                <a14:useLocalDpi xmlns:a14="http://schemas.microsoft.com/office/drawing/2010/main" xmlns="" val="0"/>
+                <a14:useLocalDpi xmlns="" xmlns:a14="http://schemas.microsoft.com/office/drawing/2010/main" val="0"/>
               </a:ext>
             </a:extLst>
           </a:blip>
@@ -5530,7 +5562,7 @@
         </p:blipFill>
         <p:spPr>
           <a:xfrm>
-            <a:off x="838200" y="1371600"/>
+            <a:off x="533400" y="1371600"/>
             <a:ext cx="7543800" cy="5386211"/>
           </a:xfrm>
           <a:prstGeom prst="rect">
@@ -5538,10 +5570,70 @@
           </a:prstGeom>
         </p:spPr>
       </p:pic>
+      <p:sp>
+        <p:nvSpPr>
+          <p:cNvPr id="6" name="Rectangle à coins arrondis 5"/>
+          <p:cNvSpPr/>
+          <p:nvPr/>
+        </p:nvSpPr>
+        <p:spPr>
+          <a:xfrm>
+            <a:off x="6096000" y="1676400"/>
+            <a:ext cx="2895600" cy="1066800"/>
+          </a:xfrm>
+          <a:prstGeom prst="roundRect">
+            <a:avLst/>
+          </a:prstGeom>
+          <a:solidFill>
+            <a:schemeClr val="bg1"/>
+          </a:solidFill>
+          <a:ln>
+            <a:solidFill>
+              <a:schemeClr val="accent2"/>
+            </a:solidFill>
+          </a:ln>
+        </p:spPr>
+        <p:style>
+          <a:lnRef idx="2">
+            <a:schemeClr val="accent1">
+              <a:shade val="50000"/>
+            </a:schemeClr>
+          </a:lnRef>
+          <a:fillRef idx="1">
+            <a:schemeClr val="accent1"/>
+          </a:fillRef>
+          <a:effectRef idx="0">
+            <a:schemeClr val="accent1"/>
+          </a:effectRef>
+          <a:fontRef idx="minor">
+            <a:schemeClr val="lt1"/>
+          </a:fontRef>
+        </p:style>
+        <p:txBody>
+          <a:bodyPr rtlCol="0" anchor="ctr"/>
+          <a:lstStyle/>
+          <a:p>
+            <a:pPr algn="ctr"/>
+            <a:r>
+              <a:rPr lang="en-US" sz="1600" dirty="0" smtClean="0">
+                <a:solidFill>
+                  <a:schemeClr val="tx1"/>
+                </a:solidFill>
+              </a:rPr>
+              <a:t>We instantiate our UI model, with i18n resources injected. </a:t>
+            </a:r>
+            <a:endParaRPr lang="en-US" sz="1600" dirty="0">
+              <a:solidFill>
+                <a:schemeClr val="tx1"/>
+              </a:solidFill>
+            </a:endParaRPr>
+          </a:p>
+        </p:txBody>
+      </p:sp>
     </p:spTree>
     <p:extLst>
       <p:ext uri="{BB962C8B-B14F-4D97-AF65-F5344CB8AC3E}">
-        <p14:creationId xmlns:p14="http://schemas.microsoft.com/office/powerpoint/2010/main" xmlns="" val="3593113261"/>
+        <p14:creationId xmlns="" xmlns:p14="http://schemas.microsoft.com/office/powerpoint/2010/main" val="3593113261"/>
       </p:ext>
     </p:extLst>
   </p:cSld>
@@ -5699,7 +5791,7 @@
           <a:blip r:embed="rId2" cstate="print">
             <a:extLst>
               <a:ext uri="{28A0092B-C50C-407E-A947-70E740481C1C}">
-                <a14:useLocalDpi xmlns:a14="http://schemas.microsoft.com/office/drawing/2010/main" xmlns="" val="0"/>
+                <a14:useLocalDpi xmlns="" xmlns:a14="http://schemas.microsoft.com/office/drawing/2010/main" val="0"/>
               </a:ext>
             </a:extLst>
           </a:blip>
@@ -5709,7 +5801,7 @@
         </p:blipFill>
         <p:spPr>
           <a:xfrm>
-            <a:off x="304800" y="1371600"/>
+            <a:off x="0" y="1524000"/>
             <a:ext cx="8588644" cy="5334000"/>
           </a:xfrm>
           <a:prstGeom prst="rect">
@@ -5717,10 +5809,81 @@
           </a:prstGeom>
         </p:spPr>
       </p:pic>
+      <p:sp>
+        <p:nvSpPr>
+          <p:cNvPr id="6" name="Rectangle à coins arrondis 5"/>
+          <p:cNvSpPr/>
+          <p:nvPr/>
+        </p:nvSpPr>
+        <p:spPr>
+          <a:xfrm>
+            <a:off x="6019800" y="1600200"/>
+            <a:ext cx="2971800" cy="1447800"/>
+          </a:xfrm>
+          <a:prstGeom prst="roundRect">
+            <a:avLst/>
+          </a:prstGeom>
+          <a:solidFill>
+            <a:schemeClr val="bg1"/>
+          </a:solidFill>
+          <a:ln>
+            <a:solidFill>
+              <a:schemeClr val="accent6"/>
+            </a:solidFill>
+          </a:ln>
+        </p:spPr>
+        <p:style>
+          <a:lnRef idx="2">
+            <a:schemeClr val="accent1">
+              <a:shade val="50000"/>
+            </a:schemeClr>
+          </a:lnRef>
+          <a:fillRef idx="1">
+            <a:schemeClr val="accent1"/>
+          </a:fillRef>
+          <a:effectRef idx="0">
+            <a:schemeClr val="accent1"/>
+          </a:effectRef>
+          <a:fontRef idx="minor">
+            <a:schemeClr val="lt1"/>
+          </a:fontRef>
+        </p:style>
+        <p:txBody>
+          <a:bodyPr rtlCol="0" anchor="ctr"/>
+          <a:lstStyle/>
+          <a:p>
+            <a:pPr algn="ctr"/>
+            <a:r>
+              <a:rPr lang="en-US" sz="1600" dirty="0" smtClean="0">
+                <a:solidFill>
+                  <a:schemeClr val="tx1"/>
+                </a:solidFill>
+              </a:rPr>
+              <a:t>We </a:t>
+            </a:r>
+            <a:r>
+              <a:rPr lang="en-US" sz="1600" dirty="0" smtClean="0">
+                <a:solidFill>
+                  <a:schemeClr val="tx1"/>
+                </a:solidFill>
+              </a:rPr>
+              <a:t>instantiate all HTML widgets from </a:t>
+            </a:r>
+            <a:r>
+              <a:rPr lang="en-US" sz="1600" dirty="0" smtClean="0">
+                <a:solidFill>
+                  <a:schemeClr val="tx1"/>
+                </a:solidFill>
+              </a:rPr>
+              <a:t>a UI model instance, using GWT and twitter bootstrap frameworks.</a:t>
+            </a:r>
+          </a:p>
+        </p:txBody>
+      </p:sp>
     </p:spTree>
     <p:extLst>
       <p:ext uri="{BB962C8B-B14F-4D97-AF65-F5344CB8AC3E}">
-        <p14:creationId xmlns:p14="http://schemas.microsoft.com/office/powerpoint/2010/main" xmlns="" val="451913240"/>
+        <p14:creationId xmlns="" xmlns:p14="http://schemas.microsoft.com/office/powerpoint/2010/main" val="451913240"/>
       </p:ext>
     </p:extLst>
   </p:cSld>
@@ -5789,7 +5952,7 @@
           <a:blip r:embed="rId2" cstate="print">
             <a:extLst>
               <a:ext uri="{28A0092B-C50C-407E-A947-70E740481C1C}">
-                <a14:useLocalDpi xmlns:a14="http://schemas.microsoft.com/office/drawing/2010/main" xmlns="" val="0"/>
+                <a14:useLocalDpi xmlns="" xmlns:a14="http://schemas.microsoft.com/office/drawing/2010/main" val="0"/>
               </a:ext>
             </a:extLst>
           </a:blip>
@@ -5810,7 +5973,7 @@
     </p:spTree>
     <p:extLst>
       <p:ext uri="{BB962C8B-B14F-4D97-AF65-F5344CB8AC3E}">
-        <p14:creationId xmlns:p14="http://schemas.microsoft.com/office/powerpoint/2010/main" xmlns="" val="2009636028"/>
+        <p14:creationId xmlns="" xmlns:p14="http://schemas.microsoft.com/office/powerpoint/2010/main" val="2009636028"/>
       </p:ext>
     </p:extLst>
   </p:cSld>
@@ -5879,7 +6042,7 @@
           <a:blip r:embed="rId2" cstate="print">
             <a:extLst>
               <a:ext uri="{28A0092B-C50C-407E-A947-70E740481C1C}">
-                <a14:useLocalDpi xmlns:a14="http://schemas.microsoft.com/office/drawing/2010/main" xmlns="" val="0"/>
+                <a14:useLocalDpi xmlns="" xmlns:a14="http://schemas.microsoft.com/office/drawing/2010/main" val="0"/>
               </a:ext>
             </a:extLst>
           </a:blip>
@@ -5900,7 +6063,7 @@
     </p:spTree>
     <p:extLst>
       <p:ext uri="{BB962C8B-B14F-4D97-AF65-F5344CB8AC3E}">
-        <p14:creationId xmlns:p14="http://schemas.microsoft.com/office/powerpoint/2010/main" xmlns="" val="1131833659"/>
+        <p14:creationId xmlns="" xmlns:p14="http://schemas.microsoft.com/office/powerpoint/2010/main" val="1131833659"/>
       </p:ext>
     </p:extLst>
   </p:cSld>
@@ -6143,11 +6306,7 @@
             <a:pPr lvl="1"/>
             <a:r>
               <a:rPr lang="en-US" sz="1800" dirty="0" smtClean="0"/>
-              <a:t>Domain models code </a:t>
-            </a:r>
-            <a:r>
-              <a:rPr lang="en-US" sz="1800" dirty="0" smtClean="0"/>
-              <a:t>generators</a:t>
+              <a:t>Domain models code generators</a:t>
             </a:r>
           </a:p>
           <a:p>
@@ -6156,7 +6315,6 @@
               <a:rPr lang="en-US" sz="1800" dirty="0" smtClean="0"/>
               <a:t>Reinsurance software</a:t>
             </a:r>
-            <a:endParaRPr lang="en-US" sz="1800" dirty="0" smtClean="0"/>
           </a:p>
           <a:p>
             <a:endParaRPr lang="en-US" sz="2000" dirty="0"/>
@@ -6175,7 +6333,7 @@
           <a:blip r:embed="rId2" cstate="print">
             <a:extLst>
               <a:ext uri="{28A0092B-C50C-407E-A947-70E740481C1C}">
-                <a14:useLocalDpi xmlns:a14="http://schemas.microsoft.com/office/drawing/2010/main" xmlns=""/>
+                <a14:useLocalDpi xmlns="" xmlns:a14="http://schemas.microsoft.com/office/drawing/2010/main"/>
               </a:ext>
             </a:extLst>
           </a:blip>
@@ -6185,7 +6343,7 @@
         </p:blipFill>
         <p:spPr>
           <a:xfrm>
-            <a:off x="2649141" y="2819400"/>
+            <a:off x="2362200" y="2895600"/>
             <a:ext cx="3675459" cy="685800"/>
           </a:xfrm>
           <a:prstGeom prst="rect">
@@ -6200,7 +6358,7 @@
     </p:spTree>
     <p:extLst>
       <p:ext uri="{BB962C8B-B14F-4D97-AF65-F5344CB8AC3E}">
-        <p14:creationId xmlns:p14="http://schemas.microsoft.com/office/powerpoint/2010/main" xmlns="" val="1630604182"/>
+        <p14:creationId xmlns="" xmlns:p14="http://schemas.microsoft.com/office/powerpoint/2010/main" val="1630604182"/>
       </p:ext>
     </p:extLst>
   </p:cSld>
@@ -6294,7 +6452,11 @@
             </a:pPr>
             <a:r>
               <a:rPr lang="en-US" dirty="0" smtClean="0"/>
-              <a:t>Bike journey (180 questions)</a:t>
+              <a:t>Motorbike </a:t>
+            </a:r>
+            <a:r>
+              <a:rPr lang="en-US" dirty="0" smtClean="0"/>
+              <a:t>journey (180 questions)</a:t>
             </a:r>
           </a:p>
           <a:p>
@@ -6314,7 +6476,11 @@
             </a:pPr>
             <a:r>
               <a:rPr lang="en-US" dirty="0" smtClean="0"/>
-              <a:t>House journey (70 questions)</a:t>
+              <a:t>Home </a:t>
+            </a:r>
+            <a:r>
+              <a:rPr lang="en-US" dirty="0" smtClean="0"/>
+              <a:t>journey (70 questions)</a:t>
             </a:r>
           </a:p>
           <a:p>
@@ -6341,7 +6507,7 @@
     </p:spTree>
     <p:extLst>
       <p:ext uri="{BB962C8B-B14F-4D97-AF65-F5344CB8AC3E}">
-        <p14:creationId xmlns:p14="http://schemas.microsoft.com/office/powerpoint/2010/main" xmlns="" val="3312784383"/>
+        <p14:creationId xmlns="" xmlns:p14="http://schemas.microsoft.com/office/powerpoint/2010/main" val="3312784383"/>
       </p:ext>
     </p:extLst>
   </p:cSld>
@@ -6385,9 +6551,16 @@
             <p:ph type="title"/>
           </p:nvPr>
         </p:nvSpPr>
-        <p:spPr/>
-        <p:txBody>
-          <a:bodyPr/>
+        <p:spPr>
+          <a:xfrm>
+            <a:off x="457200" y="0"/>
+            <a:ext cx="8382000" cy="1143000"/>
+          </a:xfrm>
+        </p:spPr>
+        <p:txBody>
+          <a:bodyPr>
+            <a:normAutofit fontScale="90000"/>
+          </a:bodyPr>
           <a:lstStyle/>
           <a:p>
             <a:r>
@@ -6396,8 +6569,13 @@
             </a:r>
             <a:r>
               <a:rPr lang="en-US" dirty="0"/>
-              <a:t>for bike</a:t>
-            </a:r>
+              <a:t>for </a:t>
+            </a:r>
+            <a:r>
+              <a:rPr lang="en-US" dirty="0" smtClean="0"/>
+              <a:t>motorbike</a:t>
+            </a:r>
+            <a:endParaRPr lang="en-US" dirty="0"/>
           </a:p>
         </p:txBody>
       </p:sp>
@@ -6574,7 +6752,7 @@
     </p:spTree>
     <p:extLst>
       <p:ext uri="{BB962C8B-B14F-4D97-AF65-F5344CB8AC3E}">
-        <p14:creationId xmlns:p14="http://schemas.microsoft.com/office/powerpoint/2010/main" xmlns="" val="2834344091"/>
+        <p14:creationId xmlns="" xmlns:p14="http://schemas.microsoft.com/office/powerpoint/2010/main" val="2834344091"/>
       </p:ext>
     </p:extLst>
   </p:cSld>
@@ -6953,7 +7131,15 @@
             </a:pPr>
             <a:r>
               <a:rPr lang="en-US" dirty="0" smtClean="0"/>
-              <a:t>I declare a child -&gt; question set for child appears</a:t>
+              <a:t>I declare a child -&gt; question set for </a:t>
+            </a:r>
+            <a:r>
+              <a:rPr lang="en-US" dirty="0" smtClean="0"/>
+              <a:t>this child </a:t>
+            </a:r>
+            <a:r>
+              <a:rPr lang="en-US" dirty="0" smtClean="0"/>
+              <a:t>appears</a:t>
             </a:r>
           </a:p>
           <a:p>
@@ -6961,6 +7147,37 @@
               <a:rPr lang="en-US" dirty="0" smtClean="0"/>
               <a:t>Value range</a:t>
             </a:r>
+          </a:p>
+          <a:p>
+            <a:pPr lvl="1"/>
+            <a:r>
+              <a:rPr lang="en-US" dirty="0" smtClean="0"/>
+              <a:t>I’ve been owning </a:t>
+            </a:r>
+            <a:r>
+              <a:rPr lang="en-US" dirty="0" smtClean="0"/>
+              <a:t>a car since one year -&gt; </a:t>
+            </a:r>
+            <a:r>
+              <a:rPr lang="en-US" dirty="0" smtClean="0"/>
+              <a:t>the date selected for </a:t>
+            </a:r>
+            <a:r>
+              <a:rPr lang="en-US" dirty="0" smtClean="0"/>
+              <a:t>a claim should </a:t>
+            </a:r>
+            <a:r>
+              <a:rPr lang="en-US" dirty="0" smtClean="0"/>
+              <a:t>be later than the car’s purchase</a:t>
+            </a:r>
+            <a:endParaRPr lang="en-US" dirty="0" smtClean="0"/>
+          </a:p>
+          <a:p>
+            <a:r>
+              <a:rPr lang="en-US" dirty="0" smtClean="0"/>
+              <a:t>Reset</a:t>
+            </a:r>
+            <a:endParaRPr lang="en-US" dirty="0" smtClean="0"/>
           </a:p>
           <a:p>
             <a:pPr lvl="1">
@@ -6969,13 +7186,21 @@
             </a:pPr>
             <a:r>
               <a:rPr lang="en-US" dirty="0" smtClean="0"/>
-              <a:t>I own a car since one year -&gt; date chooser for a claim should after the car’s buy</a:t>
-            </a:r>
-          </a:p>
-          <a:p>
-            <a:r>
-              <a:rPr lang="en-US" dirty="0" smtClean="0"/>
-              <a:t>Reset</a:t>
+              <a:t>I change the number of occurred claims -&gt; previous details </a:t>
+            </a:r>
+            <a:r>
+              <a:rPr lang="en-US" dirty="0" smtClean="0"/>
+              <a:t>of claims </a:t>
+            </a:r>
+            <a:r>
+              <a:rPr lang="en-US" dirty="0" smtClean="0"/>
+              <a:t>should be dropped</a:t>
+            </a:r>
+          </a:p>
+          <a:p>
+            <a:r>
+              <a:rPr lang="en-US" dirty="0" smtClean="0"/>
+              <a:t>Validation</a:t>
             </a:r>
           </a:p>
           <a:p>
@@ -6985,13 +7210,21 @@
             </a:pPr>
             <a:r>
               <a:rPr lang="en-US" dirty="0" smtClean="0"/>
-              <a:t>I change the number of occurred claims -&gt; previous details for claims should be dropped</a:t>
-            </a:r>
-          </a:p>
-          <a:p>
-            <a:r>
-              <a:rPr lang="en-US" dirty="0" smtClean="0"/>
-              <a:t>Validation</a:t>
+              <a:t>I change my date of birth -&gt; I could not obtain my car </a:t>
+            </a:r>
+            <a:r>
+              <a:rPr lang="en-US" dirty="0" smtClean="0"/>
+              <a:t>license </a:t>
+            </a:r>
+            <a:r>
+              <a:rPr lang="en-US" dirty="0" smtClean="0"/>
+              <a:t>before 18 years old</a:t>
+            </a:r>
+          </a:p>
+          <a:p>
+            <a:r>
+              <a:rPr lang="en-US" dirty="0" smtClean="0"/>
+              <a:t>MVC</a:t>
             </a:r>
           </a:p>
           <a:p>
@@ -7001,22 +7234,6 @@
             </a:pPr>
             <a:r>
               <a:rPr lang="en-US" dirty="0" smtClean="0"/>
-              <a:t>I change my date of birth -&gt; I could not obtain my car license before 18 years old</a:t>
-            </a:r>
-          </a:p>
-          <a:p>
-            <a:r>
-              <a:rPr lang="en-US" dirty="0" smtClean="0"/>
-              <a:t>MVC</a:t>
-            </a:r>
-          </a:p>
-          <a:p>
-            <a:pPr lvl="1">
-              <a:buFont typeface="Wingdings" pitchFamily="2" charset="2"/>
-              <a:buChar char="§"/>
-            </a:pPr>
-            <a:r>
-              <a:rPr lang="en-US" dirty="0" smtClean="0"/>
               <a:t>Reset from dependencies should update the data model and the view</a:t>
             </a:r>
           </a:p>
@@ -7025,7 +7242,7 @@
     </p:spTree>
     <p:extLst>
       <p:ext uri="{BB962C8B-B14F-4D97-AF65-F5344CB8AC3E}">
-        <p14:creationId xmlns:p14="http://schemas.microsoft.com/office/powerpoint/2010/main" xmlns="" val="13878138"/>
+        <p14:creationId xmlns="" xmlns:p14="http://schemas.microsoft.com/office/powerpoint/2010/main" val="13878138"/>
       </p:ext>
     </p:extLst>
   </p:cSld>
@@ -7112,19 +7329,43 @@
           <a:p>
             <a:r>
               <a:rPr lang="en-US" dirty="0" smtClean="0"/>
-              <a:t>All the rules between fields was embedded in each page code</a:t>
-            </a:r>
-          </a:p>
-          <a:p>
-            <a:r>
-              <a:rPr lang="en-US" dirty="0" smtClean="0"/>
-              <a:t>Business rules directly written on the widget values without MVC pattern</a:t>
-            </a:r>
-          </a:p>
-          <a:p>
-            <a:r>
-              <a:rPr lang="en-US" dirty="0" smtClean="0"/>
-              <a:t>Page navigation was triggering model updates and post the contents to the server</a:t>
+              <a:t>All the rules between fields </a:t>
+            </a:r>
+            <a:r>
+              <a:rPr lang="en-US" dirty="0" smtClean="0"/>
+              <a:t>were </a:t>
+            </a:r>
+            <a:r>
+              <a:rPr lang="en-US" dirty="0" smtClean="0"/>
+              <a:t>embedded in each page code</a:t>
+            </a:r>
+          </a:p>
+          <a:p>
+            <a:r>
+              <a:rPr lang="en-US" dirty="0" smtClean="0"/>
+              <a:t>Business rules </a:t>
+            </a:r>
+            <a:r>
+              <a:rPr lang="en-US" dirty="0" smtClean="0"/>
+              <a:t>were directly </a:t>
+            </a:r>
+            <a:r>
+              <a:rPr lang="en-US" dirty="0" smtClean="0"/>
+              <a:t>written on the widget values without MVC pattern</a:t>
+            </a:r>
+          </a:p>
+          <a:p>
+            <a:r>
+              <a:rPr lang="en-US" dirty="0" smtClean="0"/>
+              <a:t>Page navigation was triggering model updates </a:t>
+            </a:r>
+            <a:r>
+              <a:rPr lang="en-US" dirty="0" smtClean="0"/>
+              <a:t>and sent </a:t>
+            </a:r>
+            <a:r>
+              <a:rPr lang="en-US" dirty="0" smtClean="0"/>
+              <a:t>the contents to the server</a:t>
             </a:r>
             <a:endParaRPr lang="en-US" dirty="0"/>
           </a:p>
@@ -7173,7 +7414,19 @@
             </a:pPr>
             <a:r>
               <a:rPr lang="en-US" sz="2400" dirty="0" smtClean="0"/>
-              <a:t>A lot of side effect between rules</a:t>
+              <a:t>Lots </a:t>
+            </a:r>
+            <a:r>
+              <a:rPr lang="en-US" sz="2400" dirty="0" smtClean="0"/>
+              <a:t>of side </a:t>
+            </a:r>
+            <a:r>
+              <a:rPr lang="en-US" sz="2400" dirty="0" smtClean="0"/>
+              <a:t>effects </a:t>
+            </a:r>
+            <a:r>
+              <a:rPr lang="en-US" sz="2400" dirty="0" smtClean="0"/>
+              <a:t>between rules</a:t>
             </a:r>
           </a:p>
           <a:p>
@@ -7183,7 +7436,15 @@
             </a:pPr>
             <a:r>
               <a:rPr lang="en-US" sz="2400" dirty="0" smtClean="0"/>
-              <a:t>Improving or adding new rules provide a lot of regressions</a:t>
+              <a:t>Improving or adding new rules </a:t>
+            </a:r>
+            <a:r>
+              <a:rPr lang="en-US" sz="2400" dirty="0" smtClean="0"/>
+              <a:t>provided </a:t>
+            </a:r>
+            <a:r>
+              <a:rPr lang="en-US" sz="2400" dirty="0" smtClean="0"/>
+              <a:t>a lot of regressions</a:t>
             </a:r>
           </a:p>
           <a:p>
@@ -7193,7 +7454,15 @@
             </a:pPr>
             <a:r>
               <a:rPr lang="en-US" sz="2400" dirty="0" smtClean="0"/>
-              <a:t>Dependencies between fields not documented</a:t>
+              <a:t>Dependencies between fields </a:t>
+            </a:r>
+            <a:r>
+              <a:rPr lang="en-US" sz="2400" dirty="0" smtClean="0"/>
+              <a:t>not </a:t>
+            </a:r>
+            <a:r>
+              <a:rPr lang="en-US" sz="2400" dirty="0" smtClean="0"/>
+              <a:t>documented</a:t>
             </a:r>
           </a:p>
           <a:p>
@@ -7203,7 +7472,15 @@
             </a:pPr>
             <a:r>
               <a:rPr lang="en-US" sz="2400" dirty="0" smtClean="0"/>
-              <a:t>Adding new fields or shuffling the fields order require a lot of testing</a:t>
+              <a:t>Adding new fields or shuffling the fields order </a:t>
+            </a:r>
+            <a:r>
+              <a:rPr lang="en-US" sz="2400" dirty="0" smtClean="0"/>
+              <a:t>required </a:t>
+            </a:r>
+            <a:r>
+              <a:rPr lang="en-US" sz="2400" dirty="0" smtClean="0"/>
+              <a:t>a lot of testing</a:t>
             </a:r>
             <a:endParaRPr lang="en-US" sz="2400" dirty="0"/>
           </a:p>
@@ -7212,7 +7489,7 @@
     </p:spTree>
     <p:extLst>
       <p:ext uri="{BB962C8B-B14F-4D97-AF65-F5344CB8AC3E}">
-        <p14:creationId xmlns:p14="http://schemas.microsoft.com/office/powerpoint/2010/main" xmlns="" val="4255503392"/>
+        <p14:creationId xmlns="" xmlns:p14="http://schemas.microsoft.com/office/powerpoint/2010/main" val="4255503392"/>
       </p:ext>
     </p:extLst>
   </p:cSld>
@@ -7263,7 +7540,15 @@
           <a:p>
             <a:r>
               <a:rPr lang="en-US" dirty="0" smtClean="0"/>
-              <a:t>Leverage the CSS IDs</a:t>
+              <a:t>Leverage </a:t>
+            </a:r>
+            <a:r>
+              <a:rPr lang="en-US" dirty="0" smtClean="0"/>
+              <a:t>the </a:t>
+            </a:r>
+            <a:r>
+              <a:rPr lang="en-US" dirty="0" smtClean="0"/>
+              <a:t>CSS IDs</a:t>
             </a:r>
             <a:endParaRPr lang="en-US" dirty="0"/>
           </a:p>
@@ -7361,7 +7646,7 @@
     </p:spTree>
     <p:extLst>
       <p:ext uri="{BB962C8B-B14F-4D97-AF65-F5344CB8AC3E}">
-        <p14:creationId xmlns:p14="http://schemas.microsoft.com/office/powerpoint/2010/main" xmlns="" val="2375505937"/>
+        <p14:creationId xmlns="" xmlns:p14="http://schemas.microsoft.com/office/powerpoint/2010/main" val="2375505937"/>
       </p:ext>
     </p:extLst>
   </p:cSld>
@@ -7437,7 +7722,11 @@
           <a:p>
             <a:r>
               <a:rPr lang="en-US" dirty="0" smtClean="0"/>
-              <a:t>Provide stability during the evolutions of the forms</a:t>
+              <a:t>Providing </a:t>
+            </a:r>
+            <a:r>
+              <a:rPr lang="en-US" dirty="0" smtClean="0"/>
+              <a:t>stability during the evolutions of the forms</a:t>
             </a:r>
           </a:p>
           <a:p>
@@ -7457,13 +7746,29 @@
           <a:p>
             <a:r>
               <a:rPr lang="en-US" dirty="0" smtClean="0"/>
-              <a:t>Ensure a fast and up to date understanding of the form complexity</a:t>
-            </a:r>
-          </a:p>
-          <a:p>
-            <a:r>
-              <a:rPr lang="en-US" dirty="0" smtClean="0"/>
-              <a:t>Minimize the maintenance effort</a:t>
+              <a:t>Ensuring </a:t>
+            </a:r>
+            <a:r>
+              <a:rPr lang="en-US" dirty="0" smtClean="0"/>
+              <a:t>a fast and </a:t>
+            </a:r>
+            <a:r>
+              <a:rPr lang="en-US" dirty="0" smtClean="0"/>
+              <a:t>up-to-date </a:t>
+            </a:r>
+            <a:r>
+              <a:rPr lang="en-US" dirty="0" smtClean="0"/>
+              <a:t>understanding of the form complexity</a:t>
+            </a:r>
+          </a:p>
+          <a:p>
+            <a:r>
+              <a:rPr lang="en-US" dirty="0" smtClean="0"/>
+              <a:t>Minimizing </a:t>
+            </a:r>
+            <a:r>
+              <a:rPr lang="en-US" dirty="0" smtClean="0"/>
+              <a:t>the maintenance effort</a:t>
             </a:r>
           </a:p>
           <a:p>
@@ -7492,7 +7797,7 @@
     </p:spTree>
     <p:extLst>
       <p:ext uri="{BB962C8B-B14F-4D97-AF65-F5344CB8AC3E}">
-        <p14:creationId xmlns:p14="http://schemas.microsoft.com/office/powerpoint/2010/main" xmlns="" val="1618189430"/>
+        <p14:creationId xmlns="" xmlns:p14="http://schemas.microsoft.com/office/powerpoint/2010/main" val="1618189430"/>
       </p:ext>
     </p:extLst>
   </p:cSld>
@@ -7500,7 +7805,7 @@
     <a:masterClrMapping/>
   </p:clrMapOvr>
   <mc:AlternateContent xmlns:mc="http://schemas.openxmlformats.org/markup-compatibility/2006">
-    <mc:Choice xmlns:p14="http://schemas.microsoft.com/office/powerpoint/2010/main" xmlns="" Requires="p14">
+    <mc:Choice xmlns="" xmlns:p14="http://schemas.microsoft.com/office/powerpoint/2010/main" Requires="p14">
       <p:transition spd="slow" p14:dur="2000"/>
     </mc:Choice>
     <mc:Fallback>
@@ -7668,7 +7973,7 @@
     </p:spTree>
     <p:extLst>
       <p:ext uri="{BB962C8B-B14F-4D97-AF65-F5344CB8AC3E}">
-        <p14:creationId xmlns:p14="http://schemas.microsoft.com/office/powerpoint/2010/main" xmlns="" val="3644490438"/>
+        <p14:creationId xmlns="" xmlns:p14="http://schemas.microsoft.com/office/powerpoint/2010/main" val="3644490438"/>
       </p:ext>
     </p:extLst>
   </p:cSld>

</xml_diff>

<commit_message>
blanck slides for the end of the prez
</commit_message>
<xml_diff>
--- a/mdl4ui-docs/mdl4ui_cg2013.pptx
+++ b/mdl4ui-docs/mdl4ui_cg2013.pptx
@@ -5,10 +5,10 @@
     <p:sldMasterId id="2147483648" r:id="rId1"/>
   </p:sldMasterIdLst>
   <p:notesMasterIdLst>
-    <p:notesMasterId r:id="rId41"/>
+    <p:notesMasterId r:id="rId46"/>
   </p:notesMasterIdLst>
   <p:handoutMasterIdLst>
-    <p:handoutMasterId r:id="rId42"/>
+    <p:handoutMasterId r:id="rId47"/>
   </p:handoutMasterIdLst>
   <p:sldIdLst>
     <p:sldId id="256" r:id="rId2"/>
@@ -50,6 +50,11 @@
     <p:sldId id="292" r:id="rId38"/>
     <p:sldId id="296" r:id="rId39"/>
     <p:sldId id="297" r:id="rId40"/>
+    <p:sldId id="300" r:id="rId41"/>
+    <p:sldId id="299" r:id="rId42"/>
+    <p:sldId id="298" r:id="rId43"/>
+    <p:sldId id="301" r:id="rId44"/>
+    <p:sldId id="302" r:id="rId45"/>
   </p:sldIdLst>
   <p:sldSz cx="9144000" cy="6858000" type="screen4x3"/>
   <p:notesSz cx="6858000" cy="9144000"/>
@@ -11302,11 +11307,7 @@
             </a:r>
             <a:r>
               <a:rPr lang="en-US" sz="1800" dirty="0"/>
-              <a:t>(Field </a:t>
-            </a:r>
-            <a:r>
-              <a:rPr lang="en-US" sz="1800" dirty="0"/>
-              <a:t>field</a:t>
+              <a:t>(Field field</a:t>
             </a:r>
             <a:r>
               <a:rPr lang="en-US" sz="1800" dirty="0" smtClean="0"/>
@@ -11364,11 +11365,7 @@
             </a:r>
             <a:r>
               <a:rPr lang="en-US" sz="1800" dirty="0"/>
-              <a:t>(Field </a:t>
-            </a:r>
-            <a:r>
-              <a:rPr lang="en-US" sz="1800" dirty="0"/>
-              <a:t>field</a:t>
+              <a:t>(Field field</a:t>
             </a:r>
             <a:r>
               <a:rPr lang="en-US" sz="1800" dirty="0" smtClean="0"/>
@@ -11426,11 +11423,7 @@
             </a:r>
             <a:r>
               <a:rPr lang="en-US" sz="1800" dirty="0"/>
-              <a:t>(Field </a:t>
-            </a:r>
-            <a:r>
-              <a:rPr lang="en-US" sz="1800" dirty="0"/>
-              <a:t>field</a:t>
+              <a:t>(Field field</a:t>
             </a:r>
             <a:r>
               <a:rPr lang="en-US" sz="1800" dirty="0" smtClean="0"/>
@@ -11474,11 +11467,7 @@
             </a:r>
             <a:r>
               <a:rPr lang="en-US" sz="1800" dirty="0"/>
-              <a:t>(Field </a:t>
-            </a:r>
-            <a:r>
-              <a:rPr lang="en-US" sz="1800" dirty="0"/>
-              <a:t>field</a:t>
+              <a:t>(Field field</a:t>
             </a:r>
             <a:r>
               <a:rPr lang="en-US" sz="1800" dirty="0" smtClean="0"/>
@@ -11825,11 +11814,7 @@
             </a:r>
             <a:r>
               <a:rPr lang="en-US" sz="2000" dirty="0" smtClean="0"/>
-              <a:t>field</a:t>
-            </a:r>
-            <a:r>
-              <a:rPr lang="en-US" sz="2000" dirty="0" smtClean="0"/>
-              <a:t>,</a:t>
+              <a:t>field,</a:t>
             </a:r>
           </a:p>
           <a:p>
@@ -12169,11 +12154,7 @@
             </a:r>
             <a:r>
               <a:rPr lang="en-US" sz="2000" dirty="0" smtClean="0"/>
-              <a:t>field</a:t>
-            </a:r>
-            <a:r>
-              <a:rPr lang="en-US" sz="2000" dirty="0" smtClean="0"/>
-              <a:t>,                 </a:t>
+              <a:t>field,                 </a:t>
             </a:r>
           </a:p>
           <a:p>
@@ -13614,7 +13595,6 @@
               <a:rPr lang="en-US" sz="2000" dirty="0"/>
               <a:t>}</a:t>
             </a:r>
-            <a:endParaRPr lang="en-US" sz="2000" dirty="0"/>
           </a:p>
         </p:txBody>
       </p:sp>
@@ -14272,6 +14252,370 @@
       </p:par>
     </p:tnLst>
   </p:timing>
+</p:sld>
+</file>
+
+<file path=ppt/slides/slide40.xml><?xml version="1.0" encoding="utf-8"?>
+<p:sld xmlns:a="http://schemas.openxmlformats.org/drawingml/2006/main" xmlns:r="http://schemas.openxmlformats.org/officeDocument/2006/relationships" xmlns:p="http://schemas.openxmlformats.org/presentationml/2006/main">
+  <p:cSld>
+    <p:spTree>
+      <p:nvGrpSpPr>
+        <p:cNvPr id="1" name=""/>
+        <p:cNvGrpSpPr/>
+        <p:nvPr/>
+      </p:nvGrpSpPr>
+      <p:grpSpPr>
+        <a:xfrm>
+          <a:off x="0" y="0"/>
+          <a:ext cx="0" cy="0"/>
+          <a:chOff x="0" y="0"/>
+          <a:chExt cx="0" cy="0"/>
+        </a:xfrm>
+      </p:grpSpPr>
+      <p:sp>
+        <p:nvSpPr>
+          <p:cNvPr id="2" name="Titre 1"/>
+          <p:cNvSpPr>
+            <a:spLocks noGrp="1"/>
+          </p:cNvSpPr>
+          <p:nvPr>
+            <p:ph type="title"/>
+          </p:nvPr>
+        </p:nvSpPr>
+        <p:spPr/>
+        <p:txBody>
+          <a:bodyPr/>
+          <a:lstStyle/>
+          <a:p>
+            <a:r>
+              <a:rPr lang="en-US" dirty="0" smtClean="0"/>
+              <a:t>Field tracking</a:t>
+            </a:r>
+            <a:endParaRPr lang="en-US" dirty="0"/>
+          </a:p>
+        </p:txBody>
+      </p:sp>
+      <p:sp>
+        <p:nvSpPr>
+          <p:cNvPr id="3" name="Espace réservé du contenu 2"/>
+          <p:cNvSpPr>
+            <a:spLocks noGrp="1"/>
+          </p:cNvSpPr>
+          <p:nvPr>
+            <p:ph idx="1"/>
+          </p:nvPr>
+        </p:nvSpPr>
+        <p:spPr/>
+        <p:txBody>
+          <a:bodyPr/>
+          <a:lstStyle/>
+          <a:p>
+            <a:endParaRPr lang="en-US"/>
+          </a:p>
+        </p:txBody>
+      </p:sp>
+    </p:spTree>
+    <p:extLst>
+      <p:ext uri="{BB962C8B-B14F-4D97-AF65-F5344CB8AC3E}">
+        <p14:creationId xmlns:p14="http://schemas.microsoft.com/office/powerpoint/2010/main" val="2674396190"/>
+      </p:ext>
+    </p:extLst>
+  </p:cSld>
+  <p:clrMapOvr>
+    <a:masterClrMapping/>
+  </p:clrMapOvr>
+</p:sld>
+</file>
+
+<file path=ppt/slides/slide41.xml><?xml version="1.0" encoding="utf-8"?>
+<p:sld xmlns:a="http://schemas.openxmlformats.org/drawingml/2006/main" xmlns:r="http://schemas.openxmlformats.org/officeDocument/2006/relationships" xmlns:p="http://schemas.openxmlformats.org/presentationml/2006/main">
+  <p:cSld>
+    <p:spTree>
+      <p:nvGrpSpPr>
+        <p:cNvPr id="1" name=""/>
+        <p:cNvGrpSpPr/>
+        <p:nvPr/>
+      </p:nvGrpSpPr>
+      <p:grpSpPr>
+        <a:xfrm>
+          <a:off x="0" y="0"/>
+          <a:ext cx="0" cy="0"/>
+          <a:chOff x="0" y="0"/>
+          <a:chExt cx="0" cy="0"/>
+        </a:xfrm>
+      </p:grpSpPr>
+      <p:sp>
+        <p:nvSpPr>
+          <p:cNvPr id="2" name="Titre 1"/>
+          <p:cNvSpPr>
+            <a:spLocks noGrp="1"/>
+          </p:cNvSpPr>
+          <p:nvPr>
+            <p:ph type="title"/>
+          </p:nvPr>
+        </p:nvSpPr>
+        <p:spPr/>
+        <p:txBody>
+          <a:bodyPr/>
+          <a:lstStyle/>
+          <a:p>
+            <a:r>
+              <a:rPr lang="en-US" dirty="0" smtClean="0"/>
+              <a:t>AB testing and shuffling the fields</a:t>
+            </a:r>
+            <a:endParaRPr lang="en-US" dirty="0"/>
+          </a:p>
+        </p:txBody>
+      </p:sp>
+      <p:sp>
+        <p:nvSpPr>
+          <p:cNvPr id="3" name="Espace réservé du contenu 2"/>
+          <p:cNvSpPr>
+            <a:spLocks noGrp="1"/>
+          </p:cNvSpPr>
+          <p:nvPr>
+            <p:ph idx="1"/>
+          </p:nvPr>
+        </p:nvSpPr>
+        <p:spPr/>
+        <p:txBody>
+          <a:bodyPr/>
+          <a:lstStyle/>
+          <a:p>
+            <a:endParaRPr lang="en-US"/>
+          </a:p>
+        </p:txBody>
+      </p:sp>
+    </p:spTree>
+    <p:extLst>
+      <p:ext uri="{BB962C8B-B14F-4D97-AF65-F5344CB8AC3E}">
+        <p14:creationId xmlns:p14="http://schemas.microsoft.com/office/powerpoint/2010/main" val="2713826086"/>
+      </p:ext>
+    </p:extLst>
+  </p:cSld>
+  <p:clrMapOvr>
+    <a:masterClrMapping/>
+  </p:clrMapOvr>
+</p:sld>
+</file>
+
+<file path=ppt/slides/slide42.xml><?xml version="1.0" encoding="utf-8"?>
+<p:sld xmlns:a="http://schemas.openxmlformats.org/drawingml/2006/main" xmlns:r="http://schemas.openxmlformats.org/officeDocument/2006/relationships" xmlns:p="http://schemas.openxmlformats.org/presentationml/2006/main">
+  <p:cSld>
+    <p:spTree>
+      <p:nvGrpSpPr>
+        <p:cNvPr id="1" name=""/>
+        <p:cNvGrpSpPr/>
+        <p:nvPr/>
+      </p:nvGrpSpPr>
+      <p:grpSpPr>
+        <a:xfrm>
+          <a:off x="0" y="0"/>
+          <a:ext cx="0" cy="0"/>
+          <a:chOff x="0" y="0"/>
+          <a:chExt cx="0" cy="0"/>
+        </a:xfrm>
+      </p:grpSpPr>
+      <p:sp>
+        <p:nvSpPr>
+          <p:cNvPr id="2" name="Titre 1"/>
+          <p:cNvSpPr>
+            <a:spLocks noGrp="1"/>
+          </p:cNvSpPr>
+          <p:nvPr>
+            <p:ph type="title"/>
+          </p:nvPr>
+        </p:nvSpPr>
+        <p:spPr/>
+        <p:txBody>
+          <a:bodyPr/>
+          <a:lstStyle/>
+          <a:p>
+            <a:r>
+              <a:rPr lang="en-US" dirty="0" smtClean="0"/>
+              <a:t>Unit testing</a:t>
+            </a:r>
+            <a:endParaRPr lang="en-US" dirty="0"/>
+          </a:p>
+        </p:txBody>
+      </p:sp>
+      <p:sp>
+        <p:nvSpPr>
+          <p:cNvPr id="3" name="Espace réservé du contenu 2"/>
+          <p:cNvSpPr>
+            <a:spLocks noGrp="1"/>
+          </p:cNvSpPr>
+          <p:nvPr>
+            <p:ph idx="1"/>
+          </p:nvPr>
+        </p:nvSpPr>
+        <p:spPr/>
+        <p:txBody>
+          <a:bodyPr/>
+          <a:lstStyle/>
+          <a:p>
+            <a:endParaRPr lang="en-US"/>
+          </a:p>
+        </p:txBody>
+      </p:sp>
+    </p:spTree>
+    <p:extLst>
+      <p:ext uri="{BB962C8B-B14F-4D97-AF65-F5344CB8AC3E}">
+        <p14:creationId xmlns:p14="http://schemas.microsoft.com/office/powerpoint/2010/main" val="714747940"/>
+      </p:ext>
+    </p:extLst>
+  </p:cSld>
+  <p:clrMapOvr>
+    <a:masterClrMapping/>
+  </p:clrMapOvr>
+</p:sld>
+</file>
+
+<file path=ppt/slides/slide43.xml><?xml version="1.0" encoding="utf-8"?>
+<p:sld xmlns:a="http://schemas.openxmlformats.org/drawingml/2006/main" xmlns:r="http://schemas.openxmlformats.org/officeDocument/2006/relationships" xmlns:p="http://schemas.openxmlformats.org/presentationml/2006/main">
+  <p:cSld>
+    <p:spTree>
+      <p:nvGrpSpPr>
+        <p:cNvPr id="1" name=""/>
+        <p:cNvGrpSpPr/>
+        <p:nvPr/>
+      </p:nvGrpSpPr>
+      <p:grpSpPr>
+        <a:xfrm>
+          <a:off x="0" y="0"/>
+          <a:ext cx="0" cy="0"/>
+          <a:chOff x="0" y="0"/>
+          <a:chExt cx="0" cy="0"/>
+        </a:xfrm>
+      </p:grpSpPr>
+      <p:sp>
+        <p:nvSpPr>
+          <p:cNvPr id="2" name="Titre 1"/>
+          <p:cNvSpPr>
+            <a:spLocks noGrp="1"/>
+          </p:cNvSpPr>
+          <p:nvPr>
+            <p:ph type="title"/>
+          </p:nvPr>
+        </p:nvSpPr>
+        <p:spPr/>
+        <p:txBody>
+          <a:bodyPr/>
+          <a:lstStyle/>
+          <a:p>
+            <a:r>
+              <a:rPr lang="en-US" dirty="0" smtClean="0"/>
+              <a:t>Selenium and integration testing</a:t>
+            </a:r>
+            <a:endParaRPr lang="en-US" dirty="0"/>
+          </a:p>
+        </p:txBody>
+      </p:sp>
+      <p:sp>
+        <p:nvSpPr>
+          <p:cNvPr id="3" name="Espace réservé du contenu 2"/>
+          <p:cNvSpPr>
+            <a:spLocks noGrp="1"/>
+          </p:cNvSpPr>
+          <p:nvPr>
+            <p:ph idx="1"/>
+          </p:nvPr>
+        </p:nvSpPr>
+        <p:spPr/>
+        <p:txBody>
+          <a:bodyPr/>
+          <a:lstStyle/>
+          <a:p>
+            <a:endParaRPr lang="en-US"/>
+          </a:p>
+        </p:txBody>
+      </p:sp>
+    </p:spTree>
+    <p:extLst>
+      <p:ext uri="{BB962C8B-B14F-4D97-AF65-F5344CB8AC3E}">
+        <p14:creationId xmlns:p14="http://schemas.microsoft.com/office/powerpoint/2010/main" val="2654585083"/>
+      </p:ext>
+    </p:extLst>
+  </p:cSld>
+  <p:clrMapOvr>
+    <a:masterClrMapping/>
+  </p:clrMapOvr>
+</p:sld>
+</file>
+
+<file path=ppt/slides/slide44.xml><?xml version="1.0" encoding="utf-8"?>
+<p:sld xmlns:a="http://schemas.openxmlformats.org/drawingml/2006/main" xmlns:r="http://schemas.openxmlformats.org/officeDocument/2006/relationships" xmlns:p="http://schemas.openxmlformats.org/presentationml/2006/main">
+  <p:cSld>
+    <p:spTree>
+      <p:nvGrpSpPr>
+        <p:cNvPr id="1" name=""/>
+        <p:cNvGrpSpPr/>
+        <p:nvPr/>
+      </p:nvGrpSpPr>
+      <p:grpSpPr>
+        <a:xfrm>
+          <a:off x="0" y="0"/>
+          <a:ext cx="0" cy="0"/>
+          <a:chOff x="0" y="0"/>
+          <a:chExt cx="0" cy="0"/>
+        </a:xfrm>
+      </p:grpSpPr>
+      <p:sp>
+        <p:nvSpPr>
+          <p:cNvPr id="2" name="Titre 1"/>
+          <p:cNvSpPr>
+            <a:spLocks noGrp="1"/>
+          </p:cNvSpPr>
+          <p:nvPr>
+            <p:ph type="title"/>
+          </p:nvPr>
+        </p:nvSpPr>
+        <p:spPr/>
+        <p:txBody>
+          <a:bodyPr/>
+          <a:lstStyle/>
+          <a:p>
+            <a:r>
+              <a:rPr lang="en-US" dirty="0" smtClean="0"/>
+              <a:t>Refactoring and </a:t>
+            </a:r>
+            <a:r>
+              <a:rPr lang="en-US" smtClean="0"/>
+              <a:t>Agile practice</a:t>
+            </a:r>
+            <a:endParaRPr lang="en-US"/>
+          </a:p>
+        </p:txBody>
+      </p:sp>
+      <p:sp>
+        <p:nvSpPr>
+          <p:cNvPr id="3" name="Espace réservé du contenu 2"/>
+          <p:cNvSpPr>
+            <a:spLocks noGrp="1"/>
+          </p:cNvSpPr>
+          <p:nvPr>
+            <p:ph idx="1"/>
+          </p:nvPr>
+        </p:nvSpPr>
+        <p:spPr/>
+        <p:txBody>
+          <a:bodyPr/>
+          <a:lstStyle/>
+          <a:p>
+            <a:endParaRPr lang="en-US"/>
+          </a:p>
+        </p:txBody>
+      </p:sp>
+    </p:spTree>
+    <p:extLst>
+      <p:ext uri="{BB962C8B-B14F-4D97-AF65-F5344CB8AC3E}">
+        <p14:creationId xmlns:p14="http://schemas.microsoft.com/office/powerpoint/2010/main" val="40929930"/>
+      </p:ext>
+    </p:extLst>
+  </p:cSld>
+  <p:clrMapOvr>
+    <a:masterClrMapping/>
+  </p:clrMapOvr>
 </p:sld>
 </file>
 

</xml_diff>

<commit_message>
added injection pattern slides
</commit_message>
<xml_diff>
--- a/mdl4ui-docs/mdl4ui_cg2013.pptx
+++ b/mdl4ui-docs/mdl4ui_cg2013.pptx
@@ -5,10 +5,10 @@
     <p:sldMasterId id="2147483648" r:id="rId1"/>
   </p:sldMasterIdLst>
   <p:notesMasterIdLst>
-    <p:notesMasterId r:id="rId47"/>
+    <p:notesMasterId r:id="rId49"/>
   </p:notesMasterIdLst>
   <p:handoutMasterIdLst>
-    <p:handoutMasterId r:id="rId48"/>
+    <p:handoutMasterId r:id="rId50"/>
   </p:handoutMasterIdLst>
   <p:sldIdLst>
     <p:sldId id="256" r:id="rId2"/>
@@ -50,15 +50,17 @@
     <p:sldId id="292" r:id="rId38"/>
     <p:sldId id="296" r:id="rId39"/>
     <p:sldId id="297" r:id="rId40"/>
-    <p:sldId id="300" r:id="rId41"/>
-    <p:sldId id="299" r:id="rId42"/>
-    <p:sldId id="298" r:id="rId43"/>
-    <p:sldId id="301" r:id="rId44"/>
-    <p:sldId id="302" r:id="rId45"/>
-    <p:sldId id="303" r:id="rId46"/>
+    <p:sldId id="304" r:id="rId41"/>
+    <p:sldId id="305" r:id="rId42"/>
+    <p:sldId id="300" r:id="rId43"/>
+    <p:sldId id="299" r:id="rId44"/>
+    <p:sldId id="298" r:id="rId45"/>
+    <p:sldId id="301" r:id="rId46"/>
+    <p:sldId id="302" r:id="rId47"/>
+    <p:sldId id="303" r:id="rId48"/>
   </p:sldIdLst>
   <p:sldSz cx="9144000" cy="6858000" type="screen4x3"/>
-  <p:notesSz cx="6858000" cy="9144000"/>
+  <p:notesSz cx="6807200" cy="9939338"/>
   <p:defaultTextStyle>
     <a:defPPr>
       <a:defRPr lang="fr-FR"/>
@@ -192,7 +194,7 @@
         <p:spPr>
           <a:xfrm>
             <a:off x="0" y="0"/>
-            <a:ext cx="2971800" cy="457200"/>
+            <a:ext cx="2949787" cy="496967"/>
           </a:xfrm>
           <a:prstGeom prst="rect">
             <a:avLst/>
@@ -222,8 +224,8 @@
         </p:nvSpPr>
         <p:spPr>
           <a:xfrm>
-            <a:off x="3884613" y="0"/>
-            <a:ext cx="2971800" cy="457200"/>
+            <a:off x="3855838" y="0"/>
+            <a:ext cx="2949787" cy="496967"/>
           </a:xfrm>
           <a:prstGeom prst="rect">
             <a:avLst/>
@@ -258,8 +260,8 @@
         </p:nvSpPr>
         <p:spPr>
           <a:xfrm>
-            <a:off x="0" y="8685213"/>
-            <a:ext cx="2971800" cy="457200"/>
+            <a:off x="0" y="9440646"/>
+            <a:ext cx="2949787" cy="496967"/>
           </a:xfrm>
           <a:prstGeom prst="rect">
             <a:avLst/>
@@ -289,8 +291,8 @@
         </p:nvSpPr>
         <p:spPr>
           <a:xfrm>
-            <a:off x="3884613" y="8685213"/>
-            <a:ext cx="2971800" cy="457200"/>
+            <a:off x="3855838" y="9440646"/>
+            <a:ext cx="2949787" cy="496967"/>
           </a:xfrm>
           <a:prstGeom prst="rect">
             <a:avLst/>
@@ -359,7 +361,7 @@
         <p:spPr>
           <a:xfrm>
             <a:off x="0" y="0"/>
-            <a:ext cx="2971800" cy="457200"/>
+            <a:ext cx="2949787" cy="496967"/>
           </a:xfrm>
           <a:prstGeom prst="rect">
             <a:avLst/>
@@ -389,8 +391,8 @@
         </p:nvSpPr>
         <p:spPr>
           <a:xfrm>
-            <a:off x="3884613" y="0"/>
-            <a:ext cx="2971800" cy="457200"/>
+            <a:off x="3855838" y="0"/>
+            <a:ext cx="2949787" cy="496967"/>
           </a:xfrm>
           <a:prstGeom prst="rect">
             <a:avLst/>
@@ -424,8 +426,8 @@
         </p:nvSpPr>
         <p:spPr>
           <a:xfrm>
-            <a:off x="1143000" y="685800"/>
-            <a:ext cx="4572000" cy="3429000"/>
+            <a:off x="920750" y="746125"/>
+            <a:ext cx="4965700" cy="3725863"/>
           </a:xfrm>
           <a:prstGeom prst="rect">
             <a:avLst/>
@@ -457,8 +459,8 @@
         </p:nvSpPr>
         <p:spPr>
           <a:xfrm>
-            <a:off x="685800" y="4343400"/>
-            <a:ext cx="5486400" cy="4114800"/>
+            <a:off x="680720" y="4721186"/>
+            <a:ext cx="5445760" cy="4472702"/>
           </a:xfrm>
           <a:prstGeom prst="rect">
             <a:avLst/>
@@ -517,8 +519,8 @@
         </p:nvSpPr>
         <p:spPr>
           <a:xfrm>
-            <a:off x="0" y="8685213"/>
-            <a:ext cx="2971800" cy="457200"/>
+            <a:off x="0" y="9440646"/>
+            <a:ext cx="2949787" cy="496967"/>
           </a:xfrm>
           <a:prstGeom prst="rect">
             <a:avLst/>
@@ -548,8 +550,8 @@
         </p:nvSpPr>
         <p:spPr>
           <a:xfrm>
-            <a:off x="3884613" y="8685213"/>
-            <a:ext cx="2971800" cy="457200"/>
+            <a:off x="3855838" y="9440646"/>
+            <a:ext cx="2949787" cy="496967"/>
           </a:xfrm>
           <a:prstGeom prst="rect">
             <a:avLst/>
@@ -833,6 +835,90 @@
     <p:extLst>
       <p:ext uri="{BB962C8B-B14F-4D97-AF65-F5344CB8AC3E}">
         <p14:creationId xmlns:p14="http://schemas.microsoft.com/office/powerpoint/2010/main" val="3280979232"/>
+      </p:ext>
+    </p:extLst>
+  </p:cSld>
+  <p:clrMapOvr>
+    <a:masterClrMapping/>
+  </p:clrMapOvr>
+</p:notes>
+</file>
+
+<file path=ppt/notesSlides/notesSlide3.xml><?xml version="1.0" encoding="utf-8"?>
+<p:notes xmlns:a="http://schemas.openxmlformats.org/drawingml/2006/main" xmlns:r="http://schemas.openxmlformats.org/officeDocument/2006/relationships" xmlns:p="http://schemas.openxmlformats.org/presentationml/2006/main">
+  <p:cSld>
+    <p:spTree>
+      <p:nvGrpSpPr>
+        <p:cNvPr id="1" name=""/>
+        <p:cNvGrpSpPr/>
+        <p:nvPr/>
+      </p:nvGrpSpPr>
+      <p:grpSpPr>
+        <a:xfrm>
+          <a:off x="0" y="0"/>
+          <a:ext cx="0" cy="0"/>
+          <a:chOff x="0" y="0"/>
+          <a:chExt cx="0" cy="0"/>
+        </a:xfrm>
+      </p:grpSpPr>
+      <p:sp>
+        <p:nvSpPr>
+          <p:cNvPr id="2" name="Espace réservé de l'image des diapositives 1"/>
+          <p:cNvSpPr>
+            <a:spLocks noGrp="1" noRot="1" noChangeAspect="1"/>
+          </p:cNvSpPr>
+          <p:nvPr>
+            <p:ph type="sldImg"/>
+          </p:nvPr>
+        </p:nvSpPr>
+        <p:spPr/>
+      </p:sp>
+      <p:sp>
+        <p:nvSpPr>
+          <p:cNvPr id="3" name="Espace réservé des commentaires 2"/>
+          <p:cNvSpPr>
+            <a:spLocks noGrp="1"/>
+          </p:cNvSpPr>
+          <p:nvPr>
+            <p:ph type="body" idx="1"/>
+          </p:nvPr>
+        </p:nvSpPr>
+        <p:spPr/>
+        <p:txBody>
+          <a:bodyPr/>
+          <a:lstStyle/>
+          <a:p>
+            <a:endParaRPr lang="en-US" dirty="0"/>
+          </a:p>
+        </p:txBody>
+      </p:sp>
+      <p:sp>
+        <p:nvSpPr>
+          <p:cNvPr id="4" name="Espace réservé du numéro de diapositive 3"/>
+          <p:cNvSpPr>
+            <a:spLocks noGrp="1"/>
+          </p:cNvSpPr>
+          <p:nvPr>
+            <p:ph type="sldNum" sz="quarter" idx="10"/>
+          </p:nvPr>
+        </p:nvSpPr>
+        <p:spPr/>
+        <p:txBody>
+          <a:bodyPr/>
+          <a:lstStyle/>
+          <a:p>
+            <a:fld id="{1C995A55-B5EF-47FB-BCEC-1018828F2E10}" type="slidenum">
+              <a:rPr lang="en-US" smtClean="0"/>
+              <a:t>41</a:t>
+            </a:fld>
+            <a:endParaRPr lang="en-US"/>
+          </a:p>
+        </p:txBody>
+      </p:sp>
+    </p:spTree>
+    <p:extLst>
+      <p:ext uri="{BB962C8B-B14F-4D97-AF65-F5344CB8AC3E}">
+        <p14:creationId xmlns:p14="http://schemas.microsoft.com/office/powerpoint/2010/main" val="1987381696"/>
       </p:ext>
     </p:extLst>
   </p:cSld>
@@ -11947,6 +12033,13 @@
   <p:clrMapOvr>
     <a:masterClrMapping/>
   </p:clrMapOvr>
+  <p:timing>
+    <p:tnLst>
+      <p:par>
+        <p:cTn id="1" dur="indefinite" restart="never" nodeType="tmRoot"/>
+      </p:par>
+    </p:tnLst>
+  </p:timing>
 </p:sld>
 </file>
 
@@ -13671,26 +13764,83 @@
         </p:nvSpPr>
         <p:spPr/>
         <p:txBody>
-          <a:bodyPr/>
+          <a:bodyPr>
+            <a:normAutofit fontScale="85000" lnSpcReduction="10000"/>
+          </a:bodyPr>
           <a:lstStyle/>
           <a:p>
+            <a:pPr marL="0" indent="0">
+              <a:buNone/>
+            </a:pPr>
             <a:r>
               <a:rPr lang="en-US" dirty="0" smtClean="0"/>
-              <a:t>use Annotation </a:t>
-            </a:r>
-            <a:r>
-              <a:rPr lang="en-US" dirty="0"/>
-              <a:t>P</a:t>
+              <a:t>We use </a:t>
+            </a:r>
+            <a:r>
+              <a:rPr lang="en-US" b="1" dirty="0" smtClean="0"/>
+              <a:t>Annotation Processing Tool </a:t>
             </a:r>
             <a:r>
               <a:rPr lang="en-US" dirty="0" smtClean="0"/>
-              <a:t>rocessing Tool to linked together the various field features and the fields</a:t>
+              <a:t>to linked together the various field features and the fields</a:t>
             </a:r>
           </a:p>
           <a:p>
             <a:r>
               <a:rPr lang="en-US" dirty="0" smtClean="0"/>
-              <a:t>APT is a standard tooling embedded in the JDK since Java 6</a:t>
+              <a:t>APT is a </a:t>
+            </a:r>
+            <a:r>
+              <a:rPr lang="en-US" b="1" dirty="0" smtClean="0"/>
+              <a:t>standard tooling </a:t>
+            </a:r>
+            <a:r>
+              <a:rPr lang="en-US" dirty="0" smtClean="0"/>
+              <a:t>embedded in the JDK since Java 6</a:t>
+            </a:r>
+          </a:p>
+          <a:p>
+            <a:r>
+              <a:rPr lang="en-US" dirty="0" smtClean="0"/>
+              <a:t>Allows to </a:t>
+            </a:r>
+            <a:r>
+              <a:rPr lang="en-US" b="1" dirty="0" smtClean="0"/>
+              <a:t>generate source code </a:t>
+            </a:r>
+            <a:r>
+              <a:rPr lang="en-US" dirty="0" smtClean="0"/>
+              <a:t>and resources in the source path of the compiler during the early stage of the </a:t>
+            </a:r>
+            <a:r>
+              <a:rPr lang="en-US" b="1" dirty="0" smtClean="0"/>
+              <a:t>compilation process</a:t>
+            </a:r>
+          </a:p>
+          <a:p>
+            <a:r>
+              <a:rPr lang="en-US" dirty="0" smtClean="0"/>
+              <a:t>Browse the source code based on </a:t>
+            </a:r>
+            <a:r>
+              <a:rPr lang="en-US" b="1" dirty="0" smtClean="0"/>
+              <a:t>javax.lang.model</a:t>
+            </a:r>
+          </a:p>
+          <a:p>
+            <a:r>
+              <a:rPr lang="en-US" dirty="0" smtClean="0"/>
+              <a:t>Code processing is </a:t>
+            </a:r>
+            <a:r>
+              <a:rPr lang="en-US" b="1" dirty="0" smtClean="0"/>
+              <a:t>triggered by annotation</a:t>
+            </a:r>
+          </a:p>
+          <a:p>
+            <a:r>
+              <a:rPr lang="en-US" dirty="0" smtClean="0"/>
+              <a:t>No build in code generator</a:t>
             </a:r>
           </a:p>
           <a:p>
@@ -13711,6 +13861,13 @@
   <p:clrMapOvr>
     <a:masterClrMapping/>
   </p:clrMapOvr>
+  <p:timing>
+    <p:tnLst>
+      <p:par>
+        <p:cTn id="1" dur="indefinite" restart="never" nodeType="tmRoot"/>
+      </p:par>
+    </p:tnLst>
+  </p:timing>
 </p:sld>
 </file>
 
@@ -14281,46 +14438,176 @@
         </p:nvSpPr>
         <p:spPr/>
         <p:txBody>
-          <a:bodyPr/>
+          <a:bodyPr>
+            <a:normAutofit/>
+          </a:bodyPr>
           <a:lstStyle/>
           <a:p>
             <a:r>
               <a:rPr lang="en-US" dirty="0" smtClean="0"/>
-              <a:t>Field tracking</a:t>
+              <a:t>Generated pattern to glue</a:t>
             </a:r>
             <a:endParaRPr lang="en-US" dirty="0"/>
           </a:p>
         </p:txBody>
       </p:sp>
-      <p:sp>
-        <p:nvSpPr>
-          <p:cNvPr id="3" name="Espace réservé du contenu 2"/>
-          <p:cNvSpPr>
-            <a:spLocks noGrp="1"/>
-          </p:cNvSpPr>
-          <p:nvPr>
-            <p:ph idx="1"/>
-          </p:nvPr>
-        </p:nvSpPr>
-        <p:spPr/>
-        <p:txBody>
-          <a:bodyPr/>
+      <p:pic>
+        <p:nvPicPr>
+          <p:cNvPr id="4" name="Image 3"/>
+          <p:cNvPicPr>
+            <a:picLocks noChangeAspect="1"/>
+          </p:cNvPicPr>
+          <p:nvPr/>
+        </p:nvPicPr>
+        <p:blipFill>
+          <a:blip r:embed="rId2">
+            <a:extLst>
+              <a:ext uri="{28A0092B-C50C-407E-A947-70E740481C1C}">
+                <a14:useLocalDpi xmlns:a14="http://schemas.microsoft.com/office/drawing/2010/main" val="0"/>
+              </a:ext>
+            </a:extLst>
+          </a:blip>
+          <a:stretch>
+            <a:fillRect/>
+          </a:stretch>
+        </p:blipFill>
+        <p:spPr>
+          <a:xfrm>
+            <a:off x="228600" y="1447800"/>
+            <a:ext cx="5074022" cy="5053807"/>
+          </a:xfrm>
+          <a:prstGeom prst="rect">
+            <a:avLst/>
+          </a:prstGeom>
+        </p:spPr>
+      </p:pic>
+      <p:sp>
+        <p:nvSpPr>
+          <p:cNvPr id="6" name="ZoneTexte 5"/>
+          <p:cNvSpPr txBox="1"/>
+          <p:nvPr/>
+        </p:nvSpPr>
+        <p:spPr>
+          <a:xfrm>
+            <a:off x="5486400" y="1447800"/>
+            <a:ext cx="3352800" cy="4093428"/>
+          </a:xfrm>
+          <a:prstGeom prst="rect">
+            <a:avLst/>
+          </a:prstGeom>
+          <a:noFill/>
+        </p:spPr>
+        <p:txBody>
+          <a:bodyPr wrap="square" rtlCol="0">
+            <a:spAutoFit/>
+          </a:bodyPr>
           <a:lstStyle/>
           <a:p>
-            <a:endParaRPr lang="en-US"/>
+            <a:pPr marL="285750" indent="-285750">
+              <a:buFont typeface="Wingdings" pitchFamily="2" charset="2"/>
+              <a:buChar char="§"/>
+            </a:pPr>
+            <a:r>
+              <a:rPr lang="en-US" sz="2000" dirty="0" smtClean="0"/>
+              <a:t>Code generation is triggered by </a:t>
+            </a:r>
+            <a:r>
+              <a:rPr lang="en-US" sz="2000" b="1" dirty="0" smtClean="0"/>
+              <a:t>@InjectBehaviour</a:t>
+            </a:r>
+          </a:p>
+          <a:p>
+            <a:pPr marL="285750" indent="-285750">
+              <a:buFont typeface="Wingdings" pitchFamily="2" charset="2"/>
+              <a:buChar char="§"/>
+            </a:pPr>
+            <a:r>
+              <a:rPr lang="en-US" sz="2000" b="1" dirty="0" smtClean="0"/>
+              <a:t>APT processor </a:t>
+            </a:r>
+            <a:r>
+              <a:rPr lang="en-US" sz="2000" dirty="0" smtClean="0"/>
+              <a:t>is execute during the compilation of </a:t>
+            </a:r>
+            <a:r>
+              <a:rPr lang="en-US" sz="2000" b="1" dirty="0" smtClean="0"/>
+              <a:t>Mdl4ui-field </a:t>
+            </a:r>
+            <a:r>
+              <a:rPr lang="en-US" sz="2000" dirty="0" smtClean="0"/>
+              <a:t>project</a:t>
+            </a:r>
+          </a:p>
+          <a:p>
+            <a:pPr marL="285750" indent="-285750">
+              <a:buFont typeface="Wingdings" pitchFamily="2" charset="2"/>
+              <a:buChar char="§"/>
+            </a:pPr>
+            <a:r>
+              <a:rPr lang="en-US" sz="2000" dirty="0" smtClean="0"/>
+              <a:t>We use a </a:t>
+            </a:r>
+            <a:r>
+              <a:rPr lang="en-US" sz="2000" b="1" dirty="0" smtClean="0"/>
+              <a:t>factory pattern </a:t>
+            </a:r>
+            <a:r>
+              <a:rPr lang="en-US" sz="2000" dirty="0" smtClean="0"/>
+              <a:t>returning the right instance for each field</a:t>
+            </a:r>
+          </a:p>
+          <a:p>
+            <a:pPr marL="285750" indent="-285750">
+              <a:buFont typeface="Wingdings" pitchFamily="2" charset="2"/>
+              <a:buChar char="§"/>
+            </a:pPr>
+            <a:r>
+              <a:rPr lang="en-US" sz="2000" dirty="0" smtClean="0"/>
+              <a:t>An implementation for </a:t>
+            </a:r>
+            <a:r>
+              <a:rPr lang="en-US" sz="2000" b="1" dirty="0" smtClean="0"/>
+              <a:t>GWT client runtime</a:t>
+            </a:r>
+          </a:p>
+          <a:p>
+            <a:pPr marL="285750" indent="-285750">
+              <a:buFont typeface="Wingdings" pitchFamily="2" charset="2"/>
+              <a:buChar char="§"/>
+            </a:pPr>
+            <a:r>
+              <a:rPr lang="en-US" sz="2000" dirty="0" smtClean="0"/>
+              <a:t>A </a:t>
+            </a:r>
+            <a:r>
+              <a:rPr lang="en-US" sz="2000" b="1" dirty="0" smtClean="0"/>
+              <a:t>mock implementation </a:t>
+            </a:r>
+            <a:r>
+              <a:rPr lang="en-US" sz="2000" dirty="0" smtClean="0"/>
+              <a:t>for unit testing</a:t>
+            </a:r>
+            <a:endParaRPr lang="en-US" sz="2000" dirty="0"/>
           </a:p>
         </p:txBody>
       </p:sp>
     </p:spTree>
     <p:extLst>
       <p:ext uri="{BB962C8B-B14F-4D97-AF65-F5344CB8AC3E}">
-        <p14:creationId xmlns:p14="http://schemas.microsoft.com/office/powerpoint/2010/main" val="2674396190"/>
+        <p14:creationId xmlns:p14="http://schemas.microsoft.com/office/powerpoint/2010/main" val="318706902"/>
       </p:ext>
     </p:extLst>
   </p:cSld>
   <p:clrMapOvr>
     <a:masterClrMapping/>
   </p:clrMapOvr>
+  <p:timing>
+    <p:tnLst>
+      <p:par>
+        <p:cTn id="1" dur="indefinite" restart="never" nodeType="tmRoot"/>
+      </p:par>
+    </p:tnLst>
+  </p:timing>
 </p:sld>
 </file>
 
@@ -14353,46 +14640,587 @@
         </p:nvSpPr>
         <p:spPr/>
         <p:txBody>
-          <a:bodyPr/>
+          <a:bodyPr>
+            <a:normAutofit fontScale="90000"/>
+          </a:bodyPr>
           <a:lstStyle/>
           <a:p>
             <a:r>
               <a:rPr lang="en-US" dirty="0" smtClean="0"/>
-              <a:t>AB testing and shuffling the fields</a:t>
+              <a:t>Replicate the </a:t>
+            </a:r>
+            <a:r>
+              <a:rPr lang="en-US" dirty="0" smtClean="0"/>
+              <a:t>factory pattern</a:t>
+            </a:r>
+            <a:br>
+              <a:rPr lang="en-US" dirty="0" smtClean="0"/>
+            </a:br>
+            <a:r>
+              <a:rPr lang="en-US" dirty="0" smtClean="0"/>
+              <a:t>for </a:t>
+            </a:r>
+            <a:r>
+              <a:rPr lang="en-US" dirty="0" smtClean="0"/>
+              <a:t>each </a:t>
+            </a:r>
+            <a:r>
+              <a:rPr lang="en-US" dirty="0" err="1" smtClean="0"/>
+              <a:t>feald</a:t>
+            </a:r>
+            <a:r>
+              <a:rPr lang="en-US" dirty="0" smtClean="0"/>
+              <a:t> feature</a:t>
             </a:r>
             <a:endParaRPr lang="en-US" dirty="0"/>
           </a:p>
         </p:txBody>
       </p:sp>
-      <p:sp>
-        <p:nvSpPr>
-          <p:cNvPr id="3" name="Espace réservé du contenu 2"/>
-          <p:cNvSpPr>
-            <a:spLocks noGrp="1"/>
-          </p:cNvSpPr>
+      <p:graphicFrame>
+        <p:nvGraphicFramePr>
+          <p:cNvPr id="4" name="Tableau 3"/>
+          <p:cNvGraphicFramePr>
+            <a:graphicFrameLocks noGrp="1"/>
+          </p:cNvGraphicFramePr>
           <p:nvPr>
-            <p:ph idx="1"/>
+            <p:extLst>
+              <p:ext uri="{D42A27DB-BD31-4B8C-83A1-F6EECF244321}">
+                <p14:modId xmlns:p14="http://schemas.microsoft.com/office/powerpoint/2010/main" val="3075550189"/>
+              </p:ext>
+            </p:extLst>
           </p:nvPr>
-        </p:nvSpPr>
-        <p:spPr/>
-        <p:txBody>
-          <a:bodyPr/>
-          <a:lstStyle/>
-          <a:p>
-            <a:endParaRPr lang="en-US"/>
-          </a:p>
-        </p:txBody>
-      </p:sp>
+        </p:nvGraphicFramePr>
+        <p:xfrm>
+          <a:off x="457200" y="1600200"/>
+          <a:ext cx="8229600" cy="4952999"/>
+        </p:xfrm>
+        <a:graphic>
+          <a:graphicData uri="http://schemas.openxmlformats.org/drawingml/2006/table">
+            <a:tbl>
+              <a:tblPr firstRow="1" bandRow="1">
+                <a:tableStyleId>{5C22544A-7EE6-4342-B048-85BDC9FD1C3A}</a:tableStyleId>
+              </a:tblPr>
+              <a:tblGrid>
+                <a:gridCol w="2362200"/>
+                <a:gridCol w="5867400"/>
+              </a:tblGrid>
+              <a:tr h="386643">
+                <a:tc>
+                  <a:txBody>
+                    <a:bodyPr/>
+                    <a:lstStyle/>
+                    <a:p>
+                      <a:r>
+                        <a:rPr lang="en-US" sz="1600" dirty="0" smtClean="0"/>
+                        <a:t>Meta annotation</a:t>
+                      </a:r>
+                      <a:endParaRPr lang="en-US" sz="1600" dirty="0"/>
+                    </a:p>
+                  </a:txBody>
+                  <a:tcPr/>
+                </a:tc>
+                <a:tc>
+                  <a:txBody>
+                    <a:bodyPr/>
+                    <a:lstStyle/>
+                    <a:p>
+                      <a:r>
+                        <a:rPr lang="en-US" sz="1600" dirty="0" smtClean="0"/>
+                        <a:t>Feature factory</a:t>
+                      </a:r>
+                      <a:endParaRPr lang="en-US" sz="1600" dirty="0"/>
+                    </a:p>
+                  </a:txBody>
+                  <a:tcPr/>
+                </a:tc>
+              </a:tr>
+              <a:tr h="678670">
+                <a:tc>
+                  <a:txBody>
+                    <a:bodyPr/>
+                    <a:lstStyle/>
+                    <a:p>
+                      <a:pPr marL="0" marR="0" indent="0" algn="l" defTabSz="914400" rtl="0" eaLnBrk="1" fontAlgn="auto" latinLnBrk="0" hangingPunct="1">
+                        <a:lnSpc>
+                          <a:spcPct val="100000"/>
+                        </a:lnSpc>
+                        <a:spcBef>
+                          <a:spcPts val="0"/>
+                        </a:spcBef>
+                        <a:spcAft>
+                          <a:spcPts val="0"/>
+                        </a:spcAft>
+                        <a:buClrTx/>
+                        <a:buSzTx/>
+                        <a:buFontTx/>
+                        <a:buNone/>
+                        <a:tabLst/>
+                        <a:defRPr/>
+                      </a:pPr>
+                      <a:r>
+                        <a:rPr lang="en-US" sz="1600" b="1" dirty="0" smtClean="0"/>
+                        <a:t>@InjectBehaviour</a:t>
+                      </a:r>
+                    </a:p>
+                  </a:txBody>
+                  <a:tcPr anchor="ctr"/>
+                </a:tc>
+                <a:tc>
+                  <a:txBody>
+                    <a:bodyPr/>
+                    <a:lstStyle/>
+                    <a:p>
+                      <a:endParaRPr lang="en-US" sz="1600" b="1" dirty="0"/>
+                    </a:p>
+                  </a:txBody>
+                  <a:tcPr/>
+                </a:tc>
+              </a:tr>
+              <a:tr h="665820">
+                <a:tc>
+                  <a:txBody>
+                    <a:bodyPr/>
+                    <a:lstStyle/>
+                    <a:p>
+                      <a:pPr marL="0" marR="0" indent="0" algn="l" defTabSz="914400" rtl="0" eaLnBrk="1" fontAlgn="auto" latinLnBrk="0" hangingPunct="1">
+                        <a:lnSpc>
+                          <a:spcPct val="100000"/>
+                        </a:lnSpc>
+                        <a:spcBef>
+                          <a:spcPts val="0"/>
+                        </a:spcBef>
+                        <a:spcAft>
+                          <a:spcPts val="0"/>
+                        </a:spcAft>
+                        <a:buClrTx/>
+                        <a:buSzTx/>
+                        <a:buFontTx/>
+                        <a:buNone/>
+                        <a:tabLst/>
+                        <a:defRPr/>
+                      </a:pPr>
+                      <a:r>
+                        <a:rPr lang="en-US" sz="1600" b="1" dirty="0" smtClean="0"/>
+                        <a:t>@InjectEditor</a:t>
+                      </a:r>
+                    </a:p>
+                  </a:txBody>
+                  <a:tcPr anchor="ctr"/>
+                </a:tc>
+                <a:tc>
+                  <a:txBody>
+                    <a:bodyPr/>
+                    <a:lstStyle/>
+                    <a:p>
+                      <a:endParaRPr lang="en-US" sz="1600" b="1" dirty="0" smtClean="0"/>
+                    </a:p>
+                  </a:txBody>
+                  <a:tcPr/>
+                </a:tc>
+              </a:tr>
+              <a:tr h="811949">
+                <a:tc>
+                  <a:txBody>
+                    <a:bodyPr/>
+                    <a:lstStyle/>
+                    <a:p>
+                      <a:pPr marL="0" marR="0" indent="0" algn="l" defTabSz="914400" rtl="0" eaLnBrk="1" fontAlgn="auto" latinLnBrk="0" hangingPunct="1">
+                        <a:lnSpc>
+                          <a:spcPct val="100000"/>
+                        </a:lnSpc>
+                        <a:spcBef>
+                          <a:spcPts val="0"/>
+                        </a:spcBef>
+                        <a:spcAft>
+                          <a:spcPts val="0"/>
+                        </a:spcAft>
+                        <a:buClrTx/>
+                        <a:buSzTx/>
+                        <a:buFontTx/>
+                        <a:buNone/>
+                        <a:tabLst/>
+                        <a:defRPr/>
+                      </a:pPr>
+                      <a:r>
+                        <a:rPr lang="en-US" sz="1600" b="1" dirty="0" smtClean="0"/>
+                        <a:t>@InjectHelp</a:t>
+                      </a:r>
+                    </a:p>
+                  </a:txBody>
+                  <a:tcPr anchor="ctr"/>
+                </a:tc>
+                <a:tc>
+                  <a:txBody>
+                    <a:bodyPr/>
+                    <a:lstStyle/>
+                    <a:p>
+                      <a:pPr marL="0" marR="0" indent="0" algn="l" defTabSz="914400" rtl="0" eaLnBrk="1" fontAlgn="auto" latinLnBrk="0" hangingPunct="1">
+                        <a:lnSpc>
+                          <a:spcPct val="100000"/>
+                        </a:lnSpc>
+                        <a:spcBef>
+                          <a:spcPts val="0"/>
+                        </a:spcBef>
+                        <a:spcAft>
+                          <a:spcPts val="0"/>
+                        </a:spcAft>
+                        <a:buClrTx/>
+                        <a:buSzTx/>
+                        <a:buFontTx/>
+                        <a:buNone/>
+                        <a:tabLst/>
+                        <a:defRPr/>
+                      </a:pPr>
+                      <a:endParaRPr lang="en-US" sz="1600" dirty="0" smtClean="0"/>
+                    </a:p>
+                  </a:txBody>
+                  <a:tcPr/>
+                </a:tc>
+              </a:tr>
+              <a:tr h="786019">
+                <a:tc>
+                  <a:txBody>
+                    <a:bodyPr/>
+                    <a:lstStyle/>
+                    <a:p>
+                      <a:pPr marL="0" marR="0" indent="0" algn="l" defTabSz="914400" rtl="0" eaLnBrk="1" fontAlgn="auto" latinLnBrk="0" hangingPunct="1">
+                        <a:lnSpc>
+                          <a:spcPct val="100000"/>
+                        </a:lnSpc>
+                        <a:spcBef>
+                          <a:spcPts val="0"/>
+                        </a:spcBef>
+                        <a:spcAft>
+                          <a:spcPts val="0"/>
+                        </a:spcAft>
+                        <a:buClrTx/>
+                        <a:buSzTx/>
+                        <a:buFontTx/>
+                        <a:buNone/>
+                        <a:tabLst/>
+                        <a:defRPr/>
+                      </a:pPr>
+                      <a:r>
+                        <a:rPr lang="en-US" sz="1600" b="1" dirty="0" smtClean="0"/>
+                        <a:t>@InjectInit</a:t>
+                      </a:r>
+                    </a:p>
+                  </a:txBody>
+                  <a:tcPr anchor="ctr"/>
+                </a:tc>
+                <a:tc>
+                  <a:txBody>
+                    <a:bodyPr/>
+                    <a:lstStyle/>
+                    <a:p>
+                      <a:endParaRPr lang="en-US" sz="1600" b="1" dirty="0" smtClean="0"/>
+                    </a:p>
+                  </a:txBody>
+                  <a:tcPr/>
+                </a:tc>
+              </a:tr>
+              <a:tr h="811949">
+                <a:tc>
+                  <a:txBody>
+                    <a:bodyPr/>
+                    <a:lstStyle/>
+                    <a:p>
+                      <a:pPr marL="0" marR="0" indent="0" algn="l" defTabSz="914400" rtl="0" eaLnBrk="1" fontAlgn="auto" latinLnBrk="0" hangingPunct="1">
+                        <a:lnSpc>
+                          <a:spcPct val="100000"/>
+                        </a:lnSpc>
+                        <a:spcBef>
+                          <a:spcPts val="0"/>
+                        </a:spcBef>
+                        <a:spcAft>
+                          <a:spcPts val="0"/>
+                        </a:spcAft>
+                        <a:buClrTx/>
+                        <a:buSzTx/>
+                        <a:buFontTx/>
+                        <a:buNone/>
+                        <a:tabLst/>
+                        <a:defRPr/>
+                      </a:pPr>
+                      <a:r>
+                        <a:rPr lang="en-US" sz="1600" b="1" dirty="0" smtClean="0"/>
+                        <a:t>@InjectLabel</a:t>
+                      </a:r>
+                    </a:p>
+                  </a:txBody>
+                  <a:tcPr anchor="ctr"/>
+                </a:tc>
+                <a:tc>
+                  <a:txBody>
+                    <a:bodyPr/>
+                    <a:lstStyle/>
+                    <a:p>
+                      <a:pPr marL="0" marR="0" indent="0" algn="l" defTabSz="914400" rtl="0" eaLnBrk="1" fontAlgn="auto" latinLnBrk="0" hangingPunct="1">
+                        <a:lnSpc>
+                          <a:spcPct val="100000"/>
+                        </a:lnSpc>
+                        <a:spcBef>
+                          <a:spcPts val="0"/>
+                        </a:spcBef>
+                        <a:spcAft>
+                          <a:spcPts val="0"/>
+                        </a:spcAft>
+                        <a:buClrTx/>
+                        <a:buSzTx/>
+                        <a:buFontTx/>
+                        <a:buNone/>
+                        <a:tabLst/>
+                        <a:defRPr/>
+                      </a:pPr>
+                      <a:endParaRPr lang="en-US" sz="1600" dirty="0" smtClean="0"/>
+                    </a:p>
+                  </a:txBody>
+                  <a:tcPr/>
+                </a:tc>
+              </a:tr>
+              <a:tr h="811949">
+                <a:tc>
+                  <a:txBody>
+                    <a:bodyPr/>
+                    <a:lstStyle/>
+                    <a:p>
+                      <a:pPr marL="0" marR="0" indent="0" algn="l" defTabSz="914400" rtl="0" eaLnBrk="1" fontAlgn="auto" latinLnBrk="0" hangingPunct="1">
+                        <a:lnSpc>
+                          <a:spcPct val="100000"/>
+                        </a:lnSpc>
+                        <a:spcBef>
+                          <a:spcPts val="0"/>
+                        </a:spcBef>
+                        <a:spcAft>
+                          <a:spcPts val="0"/>
+                        </a:spcAft>
+                        <a:buClrTx/>
+                        <a:buSzTx/>
+                        <a:buFontTx/>
+                        <a:buNone/>
+                        <a:tabLst/>
+                        <a:defRPr/>
+                      </a:pPr>
+                      <a:r>
+                        <a:rPr lang="en-US" sz="1600" b="1" dirty="0" smtClean="0"/>
+                        <a:t>@InjectPlaceHolder</a:t>
+                      </a:r>
+                    </a:p>
+                  </a:txBody>
+                  <a:tcPr anchor="ctr"/>
+                </a:tc>
+                <a:tc>
+                  <a:txBody>
+                    <a:bodyPr/>
+                    <a:lstStyle/>
+                    <a:p>
+                      <a:endParaRPr lang="en-US" sz="1600" dirty="0"/>
+                    </a:p>
+                  </a:txBody>
+                  <a:tcPr/>
+                </a:tc>
+              </a:tr>
+            </a:tbl>
+          </a:graphicData>
+        </a:graphic>
+      </p:graphicFrame>
+      <p:pic>
+        <p:nvPicPr>
+          <p:cNvPr id="3" name="Image 2"/>
+          <p:cNvPicPr>
+            <a:picLocks noChangeAspect="1"/>
+          </p:cNvPicPr>
+          <p:nvPr/>
+        </p:nvPicPr>
+        <p:blipFill>
+          <a:blip r:embed="rId3" cstate="print">
+            <a:extLst>
+              <a:ext uri="{28A0092B-C50C-407E-A947-70E740481C1C}">
+                <a14:useLocalDpi xmlns:a14="http://schemas.microsoft.com/office/drawing/2010/main" val="0"/>
+              </a:ext>
+            </a:extLst>
+          </a:blip>
+          <a:stretch>
+            <a:fillRect/>
+          </a:stretch>
+        </p:blipFill>
+        <p:spPr>
+          <a:xfrm>
+            <a:off x="3048000" y="2057400"/>
+            <a:ext cx="2518258" cy="494873"/>
+          </a:xfrm>
+          <a:prstGeom prst="rect">
+            <a:avLst/>
+          </a:prstGeom>
+        </p:spPr>
+      </p:pic>
+      <p:pic>
+        <p:nvPicPr>
+          <p:cNvPr id="5" name="Image 4"/>
+          <p:cNvPicPr>
+            <a:picLocks noChangeAspect="1"/>
+          </p:cNvPicPr>
+          <p:nvPr/>
+        </p:nvPicPr>
+        <p:blipFill>
+          <a:blip r:embed="rId4" cstate="print">
+            <a:extLst>
+              <a:ext uri="{28A0092B-C50C-407E-A947-70E740481C1C}">
+                <a14:useLocalDpi xmlns:a14="http://schemas.microsoft.com/office/drawing/2010/main" val="0"/>
+              </a:ext>
+            </a:extLst>
+          </a:blip>
+          <a:stretch>
+            <a:fillRect/>
+          </a:stretch>
+        </p:blipFill>
+        <p:spPr>
+          <a:xfrm>
+            <a:off x="3029415" y="2744297"/>
+            <a:ext cx="2271370" cy="493776"/>
+          </a:xfrm>
+          <a:prstGeom prst="rect">
+            <a:avLst/>
+          </a:prstGeom>
+        </p:spPr>
+      </p:pic>
+      <p:pic>
+        <p:nvPicPr>
+          <p:cNvPr id="6" name="Image 5"/>
+          <p:cNvPicPr>
+            <a:picLocks noChangeAspect="1"/>
+          </p:cNvPicPr>
+          <p:nvPr/>
+        </p:nvPicPr>
+        <p:blipFill>
+          <a:blip r:embed="rId5" cstate="print">
+            <a:extLst>
+              <a:ext uri="{28A0092B-C50C-407E-A947-70E740481C1C}">
+                <a14:useLocalDpi xmlns:a14="http://schemas.microsoft.com/office/drawing/2010/main" val="0"/>
+              </a:ext>
+            </a:extLst>
+          </a:blip>
+          <a:stretch>
+            <a:fillRect/>
+          </a:stretch>
+        </p:blipFill>
+        <p:spPr>
+          <a:xfrm>
+            <a:off x="3048000" y="3505200"/>
+            <a:ext cx="4451665" cy="494873"/>
+          </a:xfrm>
+          <a:prstGeom prst="rect">
+            <a:avLst/>
+          </a:prstGeom>
+        </p:spPr>
+      </p:pic>
+      <p:pic>
+        <p:nvPicPr>
+          <p:cNvPr id="7" name="Image 6"/>
+          <p:cNvPicPr>
+            <a:picLocks noChangeAspect="1"/>
+          </p:cNvPicPr>
+          <p:nvPr/>
+        </p:nvPicPr>
+        <p:blipFill>
+          <a:blip r:embed="rId6" cstate="print">
+            <a:extLst>
+              <a:ext uri="{28A0092B-C50C-407E-A947-70E740481C1C}">
+                <a14:useLocalDpi xmlns:a14="http://schemas.microsoft.com/office/drawing/2010/main" val="0"/>
+              </a:ext>
+            </a:extLst>
+          </a:blip>
+          <a:stretch>
+            <a:fillRect/>
+          </a:stretch>
+        </p:blipFill>
+        <p:spPr>
+          <a:xfrm>
+            <a:off x="3048000" y="4381073"/>
+            <a:ext cx="2429378" cy="494873"/>
+          </a:xfrm>
+          <a:prstGeom prst="rect">
+            <a:avLst/>
+          </a:prstGeom>
+        </p:spPr>
+      </p:pic>
+      <p:pic>
+        <p:nvPicPr>
+          <p:cNvPr id="8" name="Image 7"/>
+          <p:cNvPicPr>
+            <a:picLocks noChangeAspect="1"/>
+          </p:cNvPicPr>
+          <p:nvPr/>
+        </p:nvPicPr>
+        <p:blipFill>
+          <a:blip r:embed="rId7" cstate="print">
+            <a:extLst>
+              <a:ext uri="{28A0092B-C50C-407E-A947-70E740481C1C}">
+                <a14:useLocalDpi xmlns:a14="http://schemas.microsoft.com/office/drawing/2010/main" val="0"/>
+              </a:ext>
+            </a:extLst>
+          </a:blip>
+          <a:stretch>
+            <a:fillRect/>
+          </a:stretch>
+        </p:blipFill>
+        <p:spPr>
+          <a:xfrm>
+            <a:off x="3029415" y="5067727"/>
+            <a:ext cx="4497751" cy="494873"/>
+          </a:xfrm>
+          <a:prstGeom prst="rect">
+            <a:avLst/>
+          </a:prstGeom>
+        </p:spPr>
+      </p:pic>
+      <p:pic>
+        <p:nvPicPr>
+          <p:cNvPr id="9" name="Image 8"/>
+          <p:cNvPicPr>
+            <a:picLocks noChangeAspect="1"/>
+          </p:cNvPicPr>
+          <p:nvPr/>
+        </p:nvPicPr>
+        <p:blipFill>
+          <a:blip r:embed="rId8" cstate="print">
+            <a:extLst>
+              <a:ext uri="{28A0092B-C50C-407E-A947-70E740481C1C}">
+                <a14:useLocalDpi xmlns:a14="http://schemas.microsoft.com/office/drawing/2010/main" val="0"/>
+              </a:ext>
+            </a:extLst>
+          </a:blip>
+          <a:stretch>
+            <a:fillRect/>
+          </a:stretch>
+        </p:blipFill>
+        <p:spPr>
+          <a:xfrm>
+            <a:off x="3029415" y="5905927"/>
+            <a:ext cx="4811573" cy="494873"/>
+          </a:xfrm>
+          <a:prstGeom prst="rect">
+            <a:avLst/>
+          </a:prstGeom>
+        </p:spPr>
+      </p:pic>
     </p:spTree>
     <p:extLst>
       <p:ext uri="{BB962C8B-B14F-4D97-AF65-F5344CB8AC3E}">
-        <p14:creationId xmlns:p14="http://schemas.microsoft.com/office/powerpoint/2010/main" val="2713826086"/>
+        <p14:creationId xmlns:p14="http://schemas.microsoft.com/office/powerpoint/2010/main" val="949325302"/>
       </p:ext>
     </p:extLst>
   </p:cSld>
   <p:clrMapOvr>
     <a:masterClrMapping/>
   </p:clrMapOvr>
+  <p:timing>
+    <p:tnLst>
+      <p:par>
+        <p:cTn id="1" dur="indefinite" restart="never" nodeType="tmRoot"/>
+      </p:par>
+    </p:tnLst>
+  </p:timing>
 </p:sld>
 </file>
 
@@ -14430,7 +15258,7 @@
           <a:p>
             <a:r>
               <a:rPr lang="en-US" dirty="0" smtClean="0"/>
-              <a:t>Unit testing</a:t>
+              <a:t>Field tracking</a:t>
             </a:r>
             <a:endParaRPr lang="en-US" dirty="0"/>
           </a:p>
@@ -14458,13 +15286,20 @@
     </p:spTree>
     <p:extLst>
       <p:ext uri="{BB962C8B-B14F-4D97-AF65-F5344CB8AC3E}">
-        <p14:creationId xmlns:p14="http://schemas.microsoft.com/office/powerpoint/2010/main" val="714747940"/>
+        <p14:creationId xmlns:p14="http://schemas.microsoft.com/office/powerpoint/2010/main" val="2674396190"/>
       </p:ext>
     </p:extLst>
   </p:cSld>
   <p:clrMapOvr>
     <a:masterClrMapping/>
   </p:clrMapOvr>
+  <p:timing>
+    <p:tnLst>
+      <p:par>
+        <p:cTn id="1" dur="indefinite" restart="never" nodeType="tmRoot"/>
+      </p:par>
+    </p:tnLst>
+  </p:timing>
 </p:sld>
 </file>
 
@@ -14502,7 +15337,7 @@
           <a:p>
             <a:r>
               <a:rPr lang="en-US" dirty="0" smtClean="0"/>
-              <a:t>Selenium and integration testing</a:t>
+              <a:t>AB testing and shuffling the fields</a:t>
             </a:r>
             <a:endParaRPr lang="en-US" dirty="0"/>
           </a:p>
@@ -14530,13 +15365,20 @@
     </p:spTree>
     <p:extLst>
       <p:ext uri="{BB962C8B-B14F-4D97-AF65-F5344CB8AC3E}">
-        <p14:creationId xmlns:p14="http://schemas.microsoft.com/office/powerpoint/2010/main" val="2654585083"/>
+        <p14:creationId xmlns:p14="http://schemas.microsoft.com/office/powerpoint/2010/main" val="2713826086"/>
       </p:ext>
     </p:extLst>
   </p:cSld>
   <p:clrMapOvr>
     <a:masterClrMapping/>
   </p:clrMapOvr>
+  <p:timing>
+    <p:tnLst>
+      <p:par>
+        <p:cTn id="1" dur="indefinite" restart="never" nodeType="tmRoot"/>
+      </p:par>
+    </p:tnLst>
+  </p:timing>
 </p:sld>
 </file>
 
@@ -14574,7 +15416,7 @@
           <a:p>
             <a:r>
               <a:rPr lang="en-US" dirty="0" smtClean="0"/>
-              <a:t>Refactoring and Agile practice</a:t>
+              <a:t>Unit testing</a:t>
             </a:r>
             <a:endParaRPr lang="en-US" dirty="0"/>
           </a:p>
@@ -14602,13 +15444,20 @@
     </p:spTree>
     <p:extLst>
       <p:ext uri="{BB962C8B-B14F-4D97-AF65-F5344CB8AC3E}">
-        <p14:creationId xmlns:p14="http://schemas.microsoft.com/office/powerpoint/2010/main" val="40929930"/>
+        <p14:creationId xmlns:p14="http://schemas.microsoft.com/office/powerpoint/2010/main" val="714747940"/>
       </p:ext>
     </p:extLst>
   </p:cSld>
   <p:clrMapOvr>
     <a:masterClrMapping/>
   </p:clrMapOvr>
+  <p:timing>
+    <p:tnLst>
+      <p:par>
+        <p:cTn id="1" dur="indefinite" restart="never" nodeType="tmRoot"/>
+      </p:par>
+    </p:tnLst>
+  </p:timing>
 </p:sld>
 </file>
 
@@ -14646,6 +15495,164 @@
           <a:p>
             <a:r>
               <a:rPr lang="en-US" dirty="0" smtClean="0"/>
+              <a:t>Selenium and integration testing</a:t>
+            </a:r>
+            <a:endParaRPr lang="en-US" dirty="0"/>
+          </a:p>
+        </p:txBody>
+      </p:sp>
+      <p:sp>
+        <p:nvSpPr>
+          <p:cNvPr id="3" name="Espace réservé du contenu 2"/>
+          <p:cNvSpPr>
+            <a:spLocks noGrp="1"/>
+          </p:cNvSpPr>
+          <p:nvPr>
+            <p:ph idx="1"/>
+          </p:nvPr>
+        </p:nvSpPr>
+        <p:spPr/>
+        <p:txBody>
+          <a:bodyPr/>
+          <a:lstStyle/>
+          <a:p>
+            <a:endParaRPr lang="en-US"/>
+          </a:p>
+        </p:txBody>
+      </p:sp>
+    </p:spTree>
+    <p:extLst>
+      <p:ext uri="{BB962C8B-B14F-4D97-AF65-F5344CB8AC3E}">
+        <p14:creationId xmlns:p14="http://schemas.microsoft.com/office/powerpoint/2010/main" val="2654585083"/>
+      </p:ext>
+    </p:extLst>
+  </p:cSld>
+  <p:clrMapOvr>
+    <a:masterClrMapping/>
+  </p:clrMapOvr>
+  <p:timing>
+    <p:tnLst>
+      <p:par>
+        <p:cTn id="1" dur="indefinite" restart="never" nodeType="tmRoot"/>
+      </p:par>
+    </p:tnLst>
+  </p:timing>
+</p:sld>
+</file>
+
+<file path=ppt/slides/slide46.xml><?xml version="1.0" encoding="utf-8"?>
+<p:sld xmlns:a="http://schemas.openxmlformats.org/drawingml/2006/main" xmlns:r="http://schemas.openxmlformats.org/officeDocument/2006/relationships" xmlns:p="http://schemas.openxmlformats.org/presentationml/2006/main">
+  <p:cSld>
+    <p:spTree>
+      <p:nvGrpSpPr>
+        <p:cNvPr id="1" name=""/>
+        <p:cNvGrpSpPr/>
+        <p:nvPr/>
+      </p:nvGrpSpPr>
+      <p:grpSpPr>
+        <a:xfrm>
+          <a:off x="0" y="0"/>
+          <a:ext cx="0" cy="0"/>
+          <a:chOff x="0" y="0"/>
+          <a:chExt cx="0" cy="0"/>
+        </a:xfrm>
+      </p:grpSpPr>
+      <p:sp>
+        <p:nvSpPr>
+          <p:cNvPr id="2" name="Titre 1"/>
+          <p:cNvSpPr>
+            <a:spLocks noGrp="1"/>
+          </p:cNvSpPr>
+          <p:nvPr>
+            <p:ph type="title"/>
+          </p:nvPr>
+        </p:nvSpPr>
+        <p:spPr/>
+        <p:txBody>
+          <a:bodyPr/>
+          <a:lstStyle/>
+          <a:p>
+            <a:r>
+              <a:rPr lang="en-US" dirty="0" smtClean="0"/>
+              <a:t>Refactoring and Agile practice</a:t>
+            </a:r>
+            <a:endParaRPr lang="en-US" dirty="0"/>
+          </a:p>
+        </p:txBody>
+      </p:sp>
+      <p:sp>
+        <p:nvSpPr>
+          <p:cNvPr id="3" name="Espace réservé du contenu 2"/>
+          <p:cNvSpPr>
+            <a:spLocks noGrp="1"/>
+          </p:cNvSpPr>
+          <p:nvPr>
+            <p:ph idx="1"/>
+          </p:nvPr>
+        </p:nvSpPr>
+        <p:spPr/>
+        <p:txBody>
+          <a:bodyPr/>
+          <a:lstStyle/>
+          <a:p>
+            <a:endParaRPr lang="en-US"/>
+          </a:p>
+        </p:txBody>
+      </p:sp>
+    </p:spTree>
+    <p:extLst>
+      <p:ext uri="{BB962C8B-B14F-4D97-AF65-F5344CB8AC3E}">
+        <p14:creationId xmlns:p14="http://schemas.microsoft.com/office/powerpoint/2010/main" val="40929930"/>
+      </p:ext>
+    </p:extLst>
+  </p:cSld>
+  <p:clrMapOvr>
+    <a:masterClrMapping/>
+  </p:clrMapOvr>
+  <p:timing>
+    <p:tnLst>
+      <p:par>
+        <p:cTn id="1" dur="indefinite" restart="never" nodeType="tmRoot"/>
+      </p:par>
+    </p:tnLst>
+  </p:timing>
+</p:sld>
+</file>
+
+<file path=ppt/slides/slide47.xml><?xml version="1.0" encoding="utf-8"?>
+<p:sld xmlns:a="http://schemas.openxmlformats.org/drawingml/2006/main" xmlns:r="http://schemas.openxmlformats.org/officeDocument/2006/relationships" xmlns:p="http://schemas.openxmlformats.org/presentationml/2006/main">
+  <p:cSld>
+    <p:spTree>
+      <p:nvGrpSpPr>
+        <p:cNvPr id="1" name=""/>
+        <p:cNvGrpSpPr/>
+        <p:nvPr/>
+      </p:nvGrpSpPr>
+      <p:grpSpPr>
+        <a:xfrm>
+          <a:off x="0" y="0"/>
+          <a:ext cx="0" cy="0"/>
+          <a:chOff x="0" y="0"/>
+          <a:chExt cx="0" cy="0"/>
+        </a:xfrm>
+      </p:grpSpPr>
+      <p:sp>
+        <p:nvSpPr>
+          <p:cNvPr id="2" name="Titre 1"/>
+          <p:cNvSpPr>
+            <a:spLocks noGrp="1"/>
+          </p:cNvSpPr>
+          <p:nvPr>
+            <p:ph type="title"/>
+          </p:nvPr>
+        </p:nvSpPr>
+        <p:spPr/>
+        <p:txBody>
+          <a:bodyPr/>
+          <a:lstStyle/>
+          <a:p>
+            <a:r>
+              <a:rPr lang="en-US" dirty="0" smtClean="0"/>
               <a:t>Not yet presented</a:t>
             </a:r>
             <a:endParaRPr lang="en-US" dirty="0"/>
@@ -14681,6 +15688,13 @@
   <p:clrMapOvr>
     <a:masterClrMapping/>
   </p:clrMapOvr>
+  <p:timing>
+    <p:tnLst>
+      <p:par>
+        <p:cTn id="1" dur="indefinite" restart="never" nodeType="tmRoot"/>
+      </p:par>
+    </p:tnLst>
+  </p:timing>
 </p:sld>
 </file>
 

</xml_diff>

<commit_message>
split unit test slides
minor renaming in tests
</commit_message>
<xml_diff>
--- a/mdl4ui-docs/mdl4ui_cg2013.pptx
+++ b/mdl4ui-docs/mdl4ui_cg2013.pptx
@@ -5,10 +5,10 @@
     <p:sldMasterId id="2147483648" r:id="rId1"/>
   </p:sldMasterIdLst>
   <p:notesMasterIdLst>
-    <p:notesMasterId r:id="rId52"/>
+    <p:notesMasterId r:id="rId53"/>
   </p:notesMasterIdLst>
   <p:handoutMasterIdLst>
-    <p:handoutMasterId r:id="rId53"/>
+    <p:handoutMasterId r:id="rId54"/>
   </p:handoutMasterIdLst>
   <p:sldIdLst>
     <p:sldId id="256" r:id="rId2"/>
@@ -55,12 +55,13 @@
     <p:sldId id="300" r:id="rId43"/>
     <p:sldId id="299" r:id="rId44"/>
     <p:sldId id="298" r:id="rId45"/>
-    <p:sldId id="306" r:id="rId46"/>
-    <p:sldId id="301" r:id="rId47"/>
-    <p:sldId id="307" r:id="rId48"/>
-    <p:sldId id="309" r:id="rId49"/>
-    <p:sldId id="302" r:id="rId50"/>
-    <p:sldId id="303" r:id="rId51"/>
+    <p:sldId id="310" r:id="rId46"/>
+    <p:sldId id="311" r:id="rId47"/>
+    <p:sldId id="301" r:id="rId48"/>
+    <p:sldId id="307" r:id="rId49"/>
+    <p:sldId id="309" r:id="rId50"/>
+    <p:sldId id="302" r:id="rId51"/>
+    <p:sldId id="303" r:id="rId52"/>
   </p:sldIdLst>
   <p:sldSz cx="9144000" cy="6858000" type="screen4x3"/>
   <p:notesSz cx="6807200" cy="9939338"/>
@@ -245,7 +246,7 @@
             <a:fld id="{9F3D9D59-C69D-478D-98BA-46DD69AE3241}" type="datetimeFigureOut">
               <a:rPr lang="en-US" smtClean="0"/>
               <a:pPr/>
-              <a:t>4/2/2013</a:t>
+              <a:t>4/3/2013</a:t>
             </a:fld>
             <a:endParaRPr lang="en-US"/>
           </a:p>
@@ -411,7 +412,7 @@
           <a:p>
             <a:fld id="{724035F6-A10F-4A2D-A4E3-1D4F59E0F1A1}" type="datetimeFigureOut">
               <a:rPr lang="en-US" smtClean="0"/>
-              <a:t>4/2/2013</a:t>
+              <a:t>4/3/2013</a:t>
             </a:fld>
             <a:endParaRPr lang="en-US"/>
           </a:p>
@@ -1113,7 +1114,7 @@
             <a:fld id="{1B5268FF-0D67-4269-9FD2-93B489DF800A}" type="datetimeFigureOut">
               <a:rPr lang="fr-FR" smtClean="0"/>
               <a:pPr/>
-              <a:t>02/04/2013</a:t>
+              <a:t>03/04/2013</a:t>
             </a:fld>
             <a:endParaRPr lang="fr-FR"/>
           </a:p>
@@ -1285,7 +1286,7 @@
             <a:fld id="{1B5268FF-0D67-4269-9FD2-93B489DF800A}" type="datetimeFigureOut">
               <a:rPr lang="fr-FR" smtClean="0"/>
               <a:pPr/>
-              <a:t>02/04/2013</a:t>
+              <a:t>03/04/2013</a:t>
             </a:fld>
             <a:endParaRPr lang="fr-FR"/>
           </a:p>
@@ -1467,7 +1468,7 @@
             <a:fld id="{1B5268FF-0D67-4269-9FD2-93B489DF800A}" type="datetimeFigureOut">
               <a:rPr lang="fr-FR" smtClean="0"/>
               <a:pPr/>
-              <a:t>02/04/2013</a:t>
+              <a:t>03/04/2013</a:t>
             </a:fld>
             <a:endParaRPr lang="fr-FR"/>
           </a:p>
@@ -1639,7 +1640,7 @@
             <a:fld id="{1B5268FF-0D67-4269-9FD2-93B489DF800A}" type="datetimeFigureOut">
               <a:rPr lang="fr-FR" smtClean="0"/>
               <a:pPr/>
-              <a:t>02/04/2013</a:t>
+              <a:t>03/04/2013</a:t>
             </a:fld>
             <a:endParaRPr lang="fr-FR"/>
           </a:p>
@@ -1894,7 +1895,7 @@
             <a:fld id="{1B5268FF-0D67-4269-9FD2-93B489DF800A}" type="datetimeFigureOut">
               <a:rPr lang="fr-FR" smtClean="0"/>
               <a:pPr/>
-              <a:t>02/04/2013</a:t>
+              <a:t>03/04/2013</a:t>
             </a:fld>
             <a:endParaRPr lang="fr-FR"/>
           </a:p>
@@ -2184,7 +2185,7 @@
             <a:fld id="{1B5268FF-0D67-4269-9FD2-93B489DF800A}" type="datetimeFigureOut">
               <a:rPr lang="fr-FR" smtClean="0"/>
               <a:pPr/>
-              <a:t>02/04/2013</a:t>
+              <a:t>03/04/2013</a:t>
             </a:fld>
             <a:endParaRPr lang="fr-FR"/>
           </a:p>
@@ -2608,7 +2609,7 @@
             <a:fld id="{1B5268FF-0D67-4269-9FD2-93B489DF800A}" type="datetimeFigureOut">
               <a:rPr lang="fr-FR" smtClean="0"/>
               <a:pPr/>
-              <a:t>02/04/2013</a:t>
+              <a:t>03/04/2013</a:t>
             </a:fld>
             <a:endParaRPr lang="fr-FR"/>
           </a:p>
@@ -2728,7 +2729,7 @@
             <a:fld id="{1B5268FF-0D67-4269-9FD2-93B489DF800A}" type="datetimeFigureOut">
               <a:rPr lang="fr-FR" smtClean="0"/>
               <a:pPr/>
-              <a:t>02/04/2013</a:t>
+              <a:t>03/04/2013</a:t>
             </a:fld>
             <a:endParaRPr lang="fr-FR"/>
           </a:p>
@@ -2825,7 +2826,7 @@
             <a:fld id="{1B5268FF-0D67-4269-9FD2-93B489DF800A}" type="datetimeFigureOut">
               <a:rPr lang="fr-FR" smtClean="0"/>
               <a:pPr/>
-              <a:t>02/04/2013</a:t>
+              <a:t>03/04/2013</a:t>
             </a:fld>
             <a:endParaRPr lang="fr-FR"/>
           </a:p>
@@ -3104,7 +3105,7 @@
             <a:fld id="{1B5268FF-0D67-4269-9FD2-93B489DF800A}" type="datetimeFigureOut">
               <a:rPr lang="fr-FR" smtClean="0"/>
               <a:pPr/>
-              <a:t>02/04/2013</a:t>
+              <a:t>03/04/2013</a:t>
             </a:fld>
             <a:endParaRPr lang="fr-FR"/>
           </a:p>
@@ -3359,7 +3360,7 @@
             <a:fld id="{1B5268FF-0D67-4269-9FD2-93B489DF800A}" type="datetimeFigureOut">
               <a:rPr lang="fr-FR" smtClean="0"/>
               <a:pPr/>
-              <a:t>02/04/2013</a:t>
+              <a:t>03/04/2013</a:t>
             </a:fld>
             <a:endParaRPr lang="fr-FR"/>
           </a:p>
@@ -3574,7 +3575,7 @@
             <a:fld id="{1B5268FF-0D67-4269-9FD2-93B489DF800A}" type="datetimeFigureOut">
               <a:rPr lang="fr-FR" smtClean="0"/>
               <a:pPr/>
-              <a:t>02/04/2013</a:t>
+              <a:t>03/04/2013</a:t>
             </a:fld>
             <a:endParaRPr lang="fr-FR"/>
           </a:p>
@@ -15558,11 +15559,7 @@
           <a:p>
             <a:r>
               <a:rPr lang="en-US" dirty="0"/>
-              <a:t>Unit </a:t>
-            </a:r>
-            <a:r>
-              <a:rPr lang="en-US" dirty="0" smtClean="0"/>
-              <a:t>testing</a:t>
+              <a:t>Unit testing</a:t>
             </a:r>
             <a:endParaRPr lang="fr-FR" dirty="0"/>
           </a:p>
@@ -15580,13 +15577,13 @@
         </p:nvSpPr>
         <p:spPr>
           <a:xfrm>
-            <a:off x="-152400" y="1295400"/>
-            <a:ext cx="9448800" cy="6096000"/>
+            <a:off x="0" y="1600200"/>
+            <a:ext cx="9144000" cy="4525963"/>
           </a:xfrm>
         </p:spPr>
         <p:txBody>
           <a:bodyPr>
-            <a:normAutofit fontScale="55000" lnSpcReduction="20000"/>
+            <a:normAutofit fontScale="70000" lnSpcReduction="20000"/>
           </a:bodyPr>
           <a:lstStyle/>
           <a:p>
@@ -15657,28 +15654,12 @@
               <a:t>        </a:t>
             </a:r>
             <a:r>
-              <a:rPr lang="fr-FR" dirty="0">
+              <a:rPr lang="fr-FR" dirty="0" err="1">
                 <a:solidFill>
                   <a:srgbClr val="333333"/>
                 </a:solidFill>
               </a:rPr>
-              <a:t>Collection</a:t>
-            </a:r>
-            <a:r>
-              <a:rPr lang="fr-FR" b="1" dirty="0"/>
-              <a:t>&lt;</a:t>
-            </a:r>
-            <a:r>
-              <a:rPr lang="fr-FR" dirty="0" err="1">
-                <a:solidFill>
-                  <a:srgbClr val="333333"/>
-                </a:solidFill>
-              </a:rPr>
-              <a:t>FieldID</a:t>
-            </a:r>
-            <a:r>
-              <a:rPr lang="fr-FR" b="1" dirty="0"/>
-              <a:t>&gt;</a:t>
+              <a:t>FieldDependencyFactory</a:t>
             </a:r>
             <a:r>
               <a:rPr lang="fr-FR" dirty="0"/>
@@ -15690,7 +15671,7 @@
                   <a:srgbClr val="333333"/>
                 </a:solidFill>
               </a:rPr>
-              <a:t>dependencies</a:t>
+              <a:t>dependencyFactory</a:t>
             </a:r>
             <a:r>
               <a:rPr lang="fr-FR" dirty="0"/>
@@ -15705,52 +15686,28 @@
               <a:t> </a:t>
             </a:r>
             <a:r>
+              <a:rPr lang="fr-FR" b="1" dirty="0"/>
+              <a:t>new</a:t>
+            </a:r>
+            <a:r>
+              <a:rPr lang="fr-FR" dirty="0"/>
+              <a:t> </a:t>
+            </a:r>
+            <a:r>
+              <a:rPr lang="fr-FR" dirty="0" smtClean="0"/>
+              <a:t>							</a:t>
+            </a:r>
+            <a:r>
               <a:rPr lang="fr-FR" dirty="0" err="1" smtClean="0">
                 <a:solidFill>
-                  <a:srgbClr val="008080"/>
-                </a:solidFill>
-              </a:rPr>
-              <a:t>asList</a:t>
-            </a:r>
-            <a:r>
-              <a:rPr lang="fr-FR" b="1" dirty="0" smtClean="0"/>
-              <a:t>(</a:t>
-            </a:r>
-            <a:r>
-              <a:rPr lang="fr-FR" dirty="0" err="1" smtClean="0">
-                <a:solidFill>
                   <a:srgbClr val="333333"/>
                 </a:solidFill>
               </a:rPr>
-              <a:t>dependencyFactory</a:t>
-            </a:r>
-            <a:r>
-              <a:rPr lang="fr-FR" b="1" dirty="0" err="1" smtClean="0"/>
-              <a:t>.</a:t>
-            </a:r>
-            <a:r>
-              <a:rPr lang="fr-FR" dirty="0" err="1" smtClean="0">
-                <a:solidFill>
-                  <a:srgbClr val="008080"/>
-                </a:solidFill>
-              </a:rPr>
-              <a:t>get</a:t>
-            </a:r>
-            <a:r>
-              <a:rPr lang="fr-FR" b="1" dirty="0" smtClean="0"/>
-              <a:t>(</a:t>
-            </a:r>
-            <a:r>
-              <a:rPr lang="fr-FR" dirty="0" smtClean="0">
-                <a:solidFill>
-                  <a:srgbClr val="333333"/>
-                </a:solidFill>
-              </a:rPr>
-              <a:t>EMAIL_ACCEPTED</a:t>
+              <a:t>FieldDependencySampleFactory</a:t>
             </a:r>
             <a:r>
               <a:rPr lang="fr-FR" b="1" dirty="0"/>
-              <a:t>));</a:t>
+              <a:t>();</a:t>
             </a:r>
             <a:endParaRPr lang="fr-FR" dirty="0"/>
           </a:p>
@@ -15758,39 +15715,33 @@
             <a:pPr marL="0" indent="0">
               <a:buNone/>
             </a:pPr>
-            <a:endParaRPr lang="fr-FR" sz="1100" dirty="0"/>
-          </a:p>
-          <a:p>
-            <a:pPr marL="0" indent="0">
-              <a:buNone/>
-            </a:pPr>
             <a:r>
               <a:rPr lang="fr-FR" dirty="0"/>
               <a:t>        </a:t>
             </a:r>
             <a:r>
+              <a:rPr lang="fr-FR" dirty="0">
+                <a:solidFill>
+                  <a:srgbClr val="333333"/>
+                </a:solidFill>
+              </a:rPr>
+              <a:t>Collection</a:t>
+            </a:r>
+            <a:r>
+              <a:rPr lang="fr-FR" b="1" dirty="0"/>
+              <a:t>&lt;</a:t>
+            </a:r>
+            <a:r>
               <a:rPr lang="fr-FR" dirty="0" err="1">
                 <a:solidFill>
                   <a:srgbClr val="333333"/>
                 </a:solidFill>
               </a:rPr>
-              <a:t>assertEquals</a:t>
+              <a:t>FieldID</a:t>
             </a:r>
             <a:r>
               <a:rPr lang="fr-FR" b="1" dirty="0"/>
-              <a:t>(</a:t>
-            </a:r>
-            <a:r>
-              <a:rPr lang="fr-FR" dirty="0">
-                <a:solidFill>
-                  <a:srgbClr val="009999"/>
-                </a:solidFill>
-              </a:rPr>
-              <a:t>2</a:t>
-            </a:r>
-            <a:r>
-              <a:rPr lang="fr-FR" b="1" dirty="0"/>
-              <a:t>,</a:t>
+              <a:t>&gt;</a:t>
             </a:r>
             <a:r>
               <a:rPr lang="fr-FR" dirty="0"/>
@@ -15805,150 +15756,80 @@
               <a:t>dependencies</a:t>
             </a:r>
             <a:r>
-              <a:rPr lang="fr-FR" b="1" dirty="0" err="1"/>
+              <a:rPr lang="fr-FR" dirty="0"/>
+              <a:t> </a:t>
+            </a:r>
+            <a:r>
+              <a:rPr lang="fr-FR" b="1" dirty="0"/>
+              <a:t>=</a:t>
+            </a:r>
+            <a:r>
+              <a:rPr lang="fr-FR" dirty="0"/>
+              <a:t> </a:t>
+            </a:r>
+            <a:r>
+              <a:rPr lang="fr-FR" dirty="0" smtClean="0"/>
+              <a:t>						</a:t>
+            </a:r>
+            <a:r>
+              <a:rPr lang="fr-FR" dirty="0" err="1" smtClean="0">
+                <a:solidFill>
+                  <a:srgbClr val="333333"/>
+                </a:solidFill>
+              </a:rPr>
+              <a:t>Arrays</a:t>
+            </a:r>
+            <a:r>
+              <a:rPr lang="fr-FR" b="1" dirty="0" err="1" smtClean="0"/>
               <a:t>.</a:t>
             </a:r>
             <a:r>
-              <a:rPr lang="fr-FR" dirty="0" err="1">
+              <a:rPr lang="fr-FR" dirty="0" err="1" smtClean="0">
                 <a:solidFill>
                   <a:srgbClr val="008080"/>
                 </a:solidFill>
               </a:rPr>
-              <a:t>size</a:t>
-            </a:r>
-            <a:r>
-              <a:rPr lang="fr-FR" b="1" dirty="0"/>
-              <a:t>());</a:t>
-            </a:r>
-            <a:endParaRPr lang="fr-FR" dirty="0"/>
-          </a:p>
-          <a:p>
-            <a:pPr marL="0" indent="0">
-              <a:buNone/>
-            </a:pPr>
-            <a:r>
-              <a:rPr lang="fr-FR" dirty="0"/>
-              <a:t>        </a:t>
-            </a:r>
-            <a:r>
-              <a:rPr lang="fr-FR" dirty="0" err="1">
+              <a:t>asList</a:t>
+            </a:r>
+            <a:r>
+              <a:rPr lang="fr-FR" b="1" dirty="0" smtClean="0"/>
+              <a:t>(</a:t>
+            </a:r>
+            <a:r>
+              <a:rPr lang="fr-FR" dirty="0" err="1" smtClean="0">
                 <a:solidFill>
                   <a:srgbClr val="333333"/>
                 </a:solidFill>
               </a:rPr>
-              <a:t>assertTrue</a:t>
-            </a:r>
-            <a:r>
-              <a:rPr lang="fr-FR" b="1" dirty="0"/>
+              <a:t>dependencyFactory</a:t>
+            </a:r>
+            <a:r>
+              <a:rPr lang="fr-FR" b="1" dirty="0" err="1" smtClean="0"/>
+              <a:t>.</a:t>
+            </a:r>
+            <a:r>
+              <a:rPr lang="fr-FR" dirty="0" err="1" smtClean="0">
+                <a:solidFill>
+                  <a:srgbClr val="008080"/>
+                </a:solidFill>
+              </a:rPr>
+              <a:t>get</a:t>
+            </a:r>
+            <a:r>
+              <a:rPr lang="fr-FR" b="1" dirty="0" smtClean="0"/>
               <a:t>(</a:t>
             </a:r>
             <a:r>
-              <a:rPr lang="fr-FR" dirty="0" err="1">
+              <a:rPr lang="fr-FR" dirty="0" smtClean="0">
                 <a:solidFill>
                   <a:srgbClr val="333333"/>
                 </a:solidFill>
               </a:rPr>
-              <a:t>dependencies</a:t>
-            </a:r>
-            <a:r>
-              <a:rPr lang="fr-FR" b="1" dirty="0" err="1"/>
-              <a:t>.</a:t>
-            </a:r>
-            <a:r>
-              <a:rPr lang="fr-FR" dirty="0" err="1">
-                <a:solidFill>
-                  <a:srgbClr val="008080"/>
-                </a:solidFill>
-              </a:rPr>
-              <a:t>contains</a:t>
-            </a:r>
-            <a:r>
-              <a:rPr lang="fr-FR" b="1" dirty="0"/>
-              <a:t>(</a:t>
-            </a:r>
-            <a:r>
-              <a:rPr lang="fr-FR" dirty="0">
-                <a:solidFill>
-                  <a:srgbClr val="333333"/>
-                </a:solidFill>
-              </a:rPr>
-              <a:t>EMAILS_PREFERENCES</a:t>
-            </a:r>
-            <a:r>
-              <a:rPr lang="fr-FR" b="1" dirty="0"/>
+              <a:t>EMAIL_ACCEPTED</a:t>
+            </a:r>
+            <a:r>
+              <a:rPr lang="fr-FR" b="1" dirty="0" smtClean="0"/>
               <a:t>));</a:t>
-            </a:r>
-            <a:endParaRPr lang="fr-FR" dirty="0"/>
-          </a:p>
-          <a:p>
-            <a:pPr marL="0" indent="0">
-              <a:buNone/>
-            </a:pPr>
-            <a:r>
-              <a:rPr lang="fr-FR" dirty="0"/>
-              <a:t>        </a:t>
-            </a:r>
-            <a:r>
-              <a:rPr lang="fr-FR" dirty="0" err="1">
-                <a:solidFill>
-                  <a:srgbClr val="333333"/>
-                </a:solidFill>
-              </a:rPr>
-              <a:t>assertTrue</a:t>
-            </a:r>
-            <a:r>
-              <a:rPr lang="fr-FR" b="1" dirty="0"/>
-              <a:t>(</a:t>
-            </a:r>
-            <a:r>
-              <a:rPr lang="fr-FR" dirty="0" err="1">
-                <a:solidFill>
-                  <a:srgbClr val="333333"/>
-                </a:solidFill>
-              </a:rPr>
-              <a:t>dependencies</a:t>
-            </a:r>
-            <a:r>
-              <a:rPr lang="fr-FR" b="1" dirty="0" err="1"/>
-              <a:t>.</a:t>
-            </a:r>
-            <a:r>
-              <a:rPr lang="fr-FR" dirty="0" err="1">
-                <a:solidFill>
-                  <a:srgbClr val="008080"/>
-                </a:solidFill>
-              </a:rPr>
-              <a:t>contains</a:t>
-            </a:r>
-            <a:r>
-              <a:rPr lang="fr-FR" b="1" dirty="0"/>
-              <a:t>(</a:t>
-            </a:r>
-            <a:r>
-              <a:rPr lang="fr-FR" dirty="0">
-                <a:solidFill>
-                  <a:srgbClr val="333333"/>
-                </a:solidFill>
-              </a:rPr>
-              <a:t>MAX_WEEKLY_EMAILS</a:t>
-            </a:r>
-            <a:r>
-              <a:rPr lang="fr-FR" b="1" dirty="0"/>
-              <a:t>));</a:t>
-            </a:r>
-            <a:endParaRPr lang="fr-FR" dirty="0"/>
-          </a:p>
-          <a:p>
-            <a:pPr marL="0" indent="0">
-              <a:buNone/>
-            </a:pPr>
-            <a:r>
-              <a:rPr lang="fr-FR" dirty="0"/>
-              <a:t>    </a:t>
-            </a:r>
-            <a:r>
-              <a:rPr lang="fr-FR" b="1" dirty="0"/>
-              <a:t>}</a:t>
             </a:r>
             <a:r>
               <a:rPr lang="fr-FR" dirty="0"/>
@@ -15965,8 +15846,61 @@
             </a:pPr>
             <a:r>
               <a:rPr lang="fr-FR" dirty="0"/>
-              <a:t>    @Test</a:t>
-            </a:r>
+              <a:t>        </a:t>
+            </a:r>
+            <a:r>
+              <a:rPr lang="fr-FR" dirty="0" err="1">
+                <a:solidFill>
+                  <a:srgbClr val="333333"/>
+                </a:solidFill>
+              </a:rPr>
+              <a:t>assertEquals</a:t>
+            </a:r>
+            <a:r>
+              <a:rPr lang="fr-FR" b="1" dirty="0"/>
+              <a:t>(</a:t>
+            </a:r>
+            <a:r>
+              <a:rPr lang="fr-FR" dirty="0">
+                <a:solidFill>
+                  <a:srgbClr val="009999"/>
+                </a:solidFill>
+              </a:rPr>
+              <a:t>2</a:t>
+            </a:r>
+            <a:r>
+              <a:rPr lang="fr-FR" b="1" dirty="0"/>
+              <a:t>,</a:t>
+            </a:r>
+            <a:r>
+              <a:rPr lang="fr-FR" dirty="0"/>
+              <a:t> </a:t>
+            </a:r>
+            <a:r>
+              <a:rPr lang="fr-FR" dirty="0" err="1">
+                <a:solidFill>
+                  <a:srgbClr val="333333"/>
+                </a:solidFill>
+              </a:rPr>
+              <a:t>dependencies</a:t>
+            </a:r>
+            <a:r>
+              <a:rPr lang="fr-FR" b="1" dirty="0" err="1"/>
+              <a:t>.</a:t>
+            </a:r>
+            <a:r>
+              <a:rPr lang="fr-FR" dirty="0" err="1">
+                <a:solidFill>
+                  <a:srgbClr val="008080"/>
+                </a:solidFill>
+              </a:rPr>
+              <a:t>size</a:t>
+            </a:r>
+            <a:r>
+              <a:rPr lang="fr-FR" b="1" dirty="0"/>
+              <a:t>());</a:t>
+            </a:r>
+            <a:endParaRPr lang="fr-FR" dirty="0"/>
           </a:p>
           <a:p>
             <a:pPr marL="0" indent="0">
@@ -15974,47 +15908,55 @@
             </a:pPr>
             <a:r>
               <a:rPr lang="fr-FR" dirty="0"/>
-              <a:t>    </a:t>
+              <a:t>        </a:t>
+            </a:r>
+            <a:r>
+              <a:rPr lang="fr-FR" dirty="0" err="1">
+                <a:solidFill>
+                  <a:srgbClr val="333333"/>
+                </a:solidFill>
+              </a:rPr>
+              <a:t>assertTrue</a:t>
             </a:r>
             <a:r>
               <a:rPr lang="fr-FR" b="1" dirty="0"/>
-              <a:t>public</a:t>
-            </a:r>
-            <a:r>
-              <a:rPr lang="fr-FR" dirty="0"/>
-              <a:t> </a:t>
-            </a:r>
-            <a:r>
-              <a:rPr lang="fr-FR" b="1" dirty="0" err="1">
-                <a:solidFill>
-                  <a:srgbClr val="445588"/>
-                </a:solidFill>
-              </a:rPr>
-              <a:t>void</a:t>
-            </a:r>
-            <a:r>
-              <a:rPr lang="fr-FR" dirty="0"/>
-              <a:t> </a:t>
-            </a:r>
-            <a:r>
-              <a:rPr lang="fr-FR" b="1" dirty="0" err="1">
-                <a:solidFill>
-                  <a:srgbClr val="990000"/>
-                </a:solidFill>
-              </a:rPr>
-              <a:t>visibility</a:t>
+              <a:t>(</a:t>
+            </a:r>
+            <a:r>
+              <a:rPr lang="fr-FR" dirty="0" err="1">
+                <a:solidFill>
+                  <a:srgbClr val="333333"/>
+                </a:solidFill>
+              </a:rPr>
+              <a:t>dependencies</a:t>
+            </a:r>
+            <a:r>
+              <a:rPr lang="fr-FR" b="1" dirty="0" err="1"/>
+              <a:t>.</a:t>
+            </a:r>
+            <a:r>
+              <a:rPr lang="fr-FR" dirty="0" err="1">
+                <a:solidFill>
+                  <a:srgbClr val="008080"/>
+                </a:solidFill>
+              </a:rPr>
+              <a:t>contains</a:t>
             </a:r>
             <a:r>
               <a:rPr lang="fr-FR" b="1" dirty="0"/>
-              <a:t>()</a:t>
-            </a:r>
-            <a:r>
-              <a:rPr lang="fr-FR" dirty="0"/>
-              <a:t> </a:t>
+              <a:t>(</a:t>
+            </a:r>
+            <a:r>
+              <a:rPr lang="fr-FR" dirty="0">
+                <a:solidFill>
+                  <a:srgbClr val="333333"/>
+                </a:solidFill>
+              </a:rPr>
+              <a:t>EMAILS_PREFERENCES</a:t>
             </a:r>
             <a:r>
               <a:rPr lang="fr-FR" b="1" dirty="0"/>
-              <a:t>{</a:t>
+              <a:t>));</a:t>
             </a:r>
             <a:endParaRPr lang="fr-FR" dirty="0"/>
           </a:p>
@@ -16032,76 +15974,7 @@
                   <a:srgbClr val="333333"/>
                 </a:solidFill>
               </a:rPr>
-              <a:t>SampleContext</a:t>
-            </a:r>
-            <a:r>
-              <a:rPr lang="fr-FR" dirty="0"/>
-              <a:t> </a:t>
-            </a:r>
-            <a:r>
-              <a:rPr lang="fr-FR" dirty="0" err="1">
-                <a:solidFill>
-                  <a:srgbClr val="333333"/>
-                </a:solidFill>
-              </a:rPr>
-              <a:t>context</a:t>
-            </a:r>
-            <a:r>
-              <a:rPr lang="fr-FR" dirty="0"/>
-              <a:t> </a:t>
-            </a:r>
-            <a:r>
-              <a:rPr lang="fr-FR" b="1" dirty="0"/>
-              <a:t>=</a:t>
-            </a:r>
-            <a:r>
-              <a:rPr lang="fr-FR" dirty="0"/>
-              <a:t> </a:t>
-            </a:r>
-            <a:r>
-              <a:rPr lang="fr-FR" b="1" dirty="0"/>
-              <a:t>new</a:t>
-            </a:r>
-            <a:r>
-              <a:rPr lang="fr-FR" dirty="0"/>
-              <a:t> </a:t>
-            </a:r>
-            <a:r>
-              <a:rPr lang="fr-FR" dirty="0" err="1">
-                <a:solidFill>
-                  <a:srgbClr val="333333"/>
-                </a:solidFill>
-              </a:rPr>
-              <a:t>SampleContext</a:t>
-            </a:r>
-            <a:r>
-              <a:rPr lang="fr-FR" b="1" dirty="0"/>
-              <a:t>();</a:t>
-            </a:r>
-            <a:r>
-              <a:rPr lang="fr-FR" dirty="0"/>
-              <a:t/>
-            </a:r>
-            <a:br>
-              <a:rPr lang="fr-FR" dirty="0"/>
-            </a:br>
-            <a:endParaRPr lang="fr-FR" sz="1100" dirty="0"/>
-          </a:p>
-          <a:p>
-            <a:pPr marL="0" indent="0">
-              <a:buNone/>
-            </a:pPr>
-            <a:r>
-              <a:rPr lang="fr-FR" dirty="0"/>
-              <a:t>        </a:t>
-            </a:r>
-            <a:r>
-              <a:rPr lang="fr-FR" b="1" dirty="0"/>
-              <a:t>for</a:t>
-            </a:r>
-            <a:r>
-              <a:rPr lang="fr-FR" dirty="0"/>
-              <a:t> </a:t>
+              <a:t>assertTrue</a:t>
             </a:r>
             <a:r>
               <a:rPr lang="fr-FR" b="1" dirty="0"/>
@@ -16113,39 +15986,7 @@
                   <a:srgbClr val="333333"/>
                 </a:solidFill>
               </a:rPr>
-              <a:t>FieldID</a:t>
-            </a:r>
-            <a:r>
-              <a:rPr lang="fr-FR" dirty="0"/>
-              <a:t> </a:t>
-            </a:r>
-            <a:r>
-              <a:rPr lang="fr-FR" dirty="0" err="1">
-                <a:solidFill>
-                  <a:srgbClr val="333333"/>
-                </a:solidFill>
-              </a:rPr>
-              <a:t>dependency</a:t>
-            </a:r>
-            <a:r>
-              <a:rPr lang="fr-FR" dirty="0"/>
-              <a:t> </a:t>
-            </a:r>
-            <a:r>
-              <a:rPr lang="fr-FR" b="1" dirty="0"/>
-              <a:t>:</a:t>
-            </a:r>
-            <a:r>
-              <a:rPr lang="fr-FR" dirty="0"/>
-              <a:t> </a:t>
-            </a:r>
-            <a:r>
-              <a:rPr lang="fr-FR" dirty="0" err="1">
-                <a:solidFill>
-                  <a:srgbClr val="333333"/>
-                </a:solidFill>
-              </a:rPr>
-              <a:t>dependencyFactory</a:t>
+              <a:t>dependencies</a:t>
             </a:r>
             <a:r>
               <a:rPr lang="fr-FR" b="1" dirty="0" err="1"/>
@@ -16157,7 +15998,7 @@
                   <a:srgbClr val="008080"/>
                 </a:solidFill>
               </a:rPr>
-              <a:t>get</a:t>
+              <a:t>contains</a:t>
             </a:r>
             <a:r>
               <a:rPr lang="fr-FR" b="1" dirty="0"/>
@@ -16169,395 +16010,11 @@
                   <a:srgbClr val="333333"/>
                 </a:solidFill>
               </a:rPr>
-              <a:t>EMAIL_ACCEPTED</a:t>
-            </a:r>
-            <a:r>
-              <a:rPr lang="fr-FR" b="1" dirty="0"/>
-              <a:t>))</a:t>
-            </a:r>
-            <a:r>
-              <a:rPr lang="fr-FR" dirty="0"/>
-              <a:t> </a:t>
-            </a:r>
-            <a:r>
-              <a:rPr lang="fr-FR" b="1" dirty="0"/>
-              <a:t>{</a:t>
-            </a:r>
-            <a:endParaRPr lang="fr-FR" dirty="0"/>
-          </a:p>
-          <a:p>
-            <a:pPr marL="0" indent="0">
-              <a:buNone/>
-            </a:pPr>
-            <a:r>
-              <a:rPr lang="fr-FR" dirty="0"/>
-              <a:t>            </a:t>
-            </a:r>
-            <a:r>
-              <a:rPr lang="fr-FR" dirty="0" err="1">
-                <a:solidFill>
-                  <a:srgbClr val="333333"/>
-                </a:solidFill>
-              </a:rPr>
-              <a:t>FieldBehaviour</a:t>
-            </a:r>
-            <a:r>
-              <a:rPr lang="fr-FR" dirty="0"/>
-              <a:t> </a:t>
-            </a:r>
-            <a:r>
-              <a:rPr lang="fr-FR" dirty="0" err="1">
-                <a:solidFill>
-                  <a:srgbClr val="333333"/>
-                </a:solidFill>
-              </a:rPr>
-              <a:t>behaviour</a:t>
-            </a:r>
-            <a:r>
-              <a:rPr lang="fr-FR" dirty="0"/>
-              <a:t> </a:t>
-            </a:r>
-            <a:r>
-              <a:rPr lang="fr-FR" b="1" dirty="0"/>
-              <a:t>=</a:t>
-            </a:r>
-            <a:r>
-              <a:rPr lang="fr-FR" dirty="0"/>
-              <a:t> </a:t>
-            </a:r>
-            <a:r>
-              <a:rPr lang="fr-FR" dirty="0" err="1">
-                <a:solidFill>
-                  <a:srgbClr val="333333"/>
-                </a:solidFill>
-              </a:rPr>
-              <a:t>behaviourFactory</a:t>
-            </a:r>
-            <a:r>
-              <a:rPr lang="fr-FR" b="1" dirty="0" err="1"/>
-              <a:t>.</a:t>
-            </a:r>
-            <a:r>
-              <a:rPr lang="fr-FR" dirty="0" err="1">
-                <a:solidFill>
-                  <a:srgbClr val="008080"/>
-                </a:solidFill>
-              </a:rPr>
-              <a:t>get</a:t>
-            </a:r>
-            <a:r>
-              <a:rPr lang="fr-FR" b="1" dirty="0"/>
-              <a:t>(</a:t>
-            </a:r>
-            <a:r>
-              <a:rPr lang="fr-FR" dirty="0" err="1">
-                <a:solidFill>
-                  <a:srgbClr val="333333"/>
-                </a:solidFill>
-              </a:rPr>
-              <a:t>dependency</a:t>
-            </a:r>
-            <a:r>
-              <a:rPr lang="fr-FR" b="1" dirty="0"/>
-              <a:t>);</a:t>
-            </a:r>
-            <a:endParaRPr lang="fr-FR" dirty="0"/>
-          </a:p>
-          <a:p>
-            <a:pPr marL="0" indent="0">
-              <a:buNone/>
-            </a:pPr>
-            <a:endParaRPr lang="fr-FR" sz="1100" dirty="0"/>
-          </a:p>
-          <a:p>
-            <a:pPr marL="0" indent="0">
-              <a:buNone/>
-            </a:pPr>
-            <a:r>
-              <a:rPr lang="fr-FR" dirty="0"/>
-              <a:t>            </a:t>
-            </a:r>
-            <a:r>
-              <a:rPr lang="fr-FR" dirty="0" err="1">
-                <a:solidFill>
-                  <a:srgbClr val="333333"/>
-                </a:solidFill>
-              </a:rPr>
-              <a:t>context</a:t>
-            </a:r>
-            <a:r>
-              <a:rPr lang="fr-FR" b="1" dirty="0" err="1"/>
-              <a:t>.</a:t>
-            </a:r>
-            <a:r>
-              <a:rPr lang="fr-FR" dirty="0" err="1">
-                <a:solidFill>
-                  <a:srgbClr val="008080"/>
-                </a:solidFill>
-              </a:rPr>
-              <a:t>getUserAccount</a:t>
-            </a:r>
-            <a:r>
-              <a:rPr lang="fr-FR" b="1" dirty="0"/>
-              <a:t>().</a:t>
-            </a:r>
-            <a:r>
-              <a:rPr lang="fr-FR" dirty="0" err="1">
-                <a:solidFill>
-                  <a:srgbClr val="008080"/>
-                </a:solidFill>
-              </a:rPr>
-              <a:t>setAcceptEmail</a:t>
-            </a:r>
-            <a:r>
-              <a:rPr lang="fr-FR" b="1" dirty="0"/>
-              <a:t>(false);</a:t>
-            </a:r>
-            <a:endParaRPr lang="fr-FR" dirty="0"/>
-          </a:p>
-          <a:p>
-            <a:pPr marL="0" indent="0">
-              <a:buNone/>
-            </a:pPr>
-            <a:r>
-              <a:rPr lang="fr-FR" dirty="0"/>
-              <a:t>            </a:t>
-            </a:r>
-            <a:r>
-              <a:rPr lang="fr-FR" dirty="0" err="1">
-                <a:solidFill>
-                  <a:srgbClr val="333333"/>
-                </a:solidFill>
-              </a:rPr>
-              <a:t>assertFalse</a:t>
-            </a:r>
-            <a:r>
-              <a:rPr lang="fr-FR" b="1" dirty="0"/>
-              <a:t>(</a:t>
-            </a:r>
-            <a:r>
-              <a:rPr lang="fr-FR" dirty="0" err="1">
-                <a:solidFill>
-                  <a:srgbClr val="333333"/>
-                </a:solidFill>
-              </a:rPr>
-              <a:t>behaviour</a:t>
-            </a:r>
-            <a:r>
-              <a:rPr lang="fr-FR" b="1" dirty="0" err="1"/>
-              <a:t>.</a:t>
-            </a:r>
-            <a:r>
-              <a:rPr lang="fr-FR" dirty="0" err="1">
-                <a:solidFill>
-                  <a:srgbClr val="008080"/>
-                </a:solidFill>
-              </a:rPr>
-              <a:t>isVisible</a:t>
-            </a:r>
-            <a:r>
-              <a:rPr lang="fr-FR" b="1" dirty="0"/>
-              <a:t>(</a:t>
-            </a:r>
-            <a:r>
-              <a:rPr lang="fr-FR" dirty="0" err="1">
-                <a:solidFill>
-                  <a:srgbClr val="333333"/>
-                </a:solidFill>
-              </a:rPr>
-              <a:t>dependency</a:t>
-            </a:r>
-            <a:r>
-              <a:rPr lang="fr-FR" b="1" dirty="0"/>
-              <a:t>,</a:t>
-            </a:r>
-            <a:r>
-              <a:rPr lang="fr-FR" dirty="0"/>
-              <a:t> </a:t>
-            </a:r>
-            <a:r>
-              <a:rPr lang="fr-FR" dirty="0" err="1">
-                <a:solidFill>
-                  <a:srgbClr val="333333"/>
-                </a:solidFill>
-              </a:rPr>
-              <a:t>context</a:t>
-            </a:r>
-            <a:r>
-              <a:rPr lang="fr-FR" b="1" dirty="0"/>
-              <a:t>,</a:t>
-            </a:r>
-            <a:r>
-              <a:rPr lang="fr-FR" dirty="0"/>
-              <a:t> </a:t>
-            </a:r>
-            <a:r>
-              <a:rPr lang="fr-FR" b="1" dirty="0" err="1"/>
-              <a:t>null</a:t>
+              <a:t>MAX_WEEKLY_EMAILS</a:t>
             </a:r>
             <a:r>
               <a:rPr lang="fr-FR" b="1" dirty="0"/>
               <a:t>));</a:t>
-            </a:r>
-            <a:endParaRPr lang="fr-FR" dirty="0"/>
-          </a:p>
-          <a:p>
-            <a:pPr marL="0" indent="0">
-              <a:buNone/>
-            </a:pPr>
-            <a:endParaRPr lang="fr-FR" sz="900" dirty="0"/>
-          </a:p>
-          <a:p>
-            <a:pPr marL="0" indent="0">
-              <a:buNone/>
-            </a:pPr>
-            <a:r>
-              <a:rPr lang="fr-FR" dirty="0"/>
-              <a:t>            </a:t>
-            </a:r>
-            <a:r>
-              <a:rPr lang="fr-FR" dirty="0" err="1">
-                <a:solidFill>
-                  <a:srgbClr val="333333"/>
-                </a:solidFill>
-              </a:rPr>
-              <a:t>context</a:t>
-            </a:r>
-            <a:r>
-              <a:rPr lang="fr-FR" b="1" dirty="0" err="1"/>
-              <a:t>.</a:t>
-            </a:r>
-            <a:r>
-              <a:rPr lang="fr-FR" dirty="0" err="1">
-                <a:solidFill>
-                  <a:srgbClr val="008080"/>
-                </a:solidFill>
-              </a:rPr>
-              <a:t>getUserAccount</a:t>
-            </a:r>
-            <a:r>
-              <a:rPr lang="fr-FR" b="1" dirty="0"/>
-              <a:t>().</a:t>
-            </a:r>
-            <a:r>
-              <a:rPr lang="fr-FR" dirty="0" err="1">
-                <a:solidFill>
-                  <a:srgbClr val="008080"/>
-                </a:solidFill>
-              </a:rPr>
-              <a:t>setAcceptEmail</a:t>
-            </a:r>
-            <a:r>
-              <a:rPr lang="fr-FR" b="1" dirty="0"/>
-              <a:t>(</a:t>
-            </a:r>
-            <a:r>
-              <a:rPr lang="fr-FR" b="1" dirty="0" err="1"/>
-              <a:t>true</a:t>
-            </a:r>
-            <a:r>
-              <a:rPr lang="fr-FR" b="1" dirty="0"/>
-              <a:t>);</a:t>
-            </a:r>
-            <a:endParaRPr lang="fr-FR" dirty="0"/>
-          </a:p>
-          <a:p>
-            <a:pPr marL="0" indent="0">
-              <a:buNone/>
-            </a:pPr>
-            <a:r>
-              <a:rPr lang="fr-FR" dirty="0"/>
-              <a:t>            </a:t>
-            </a:r>
-            <a:r>
-              <a:rPr lang="fr-FR" dirty="0" err="1">
-                <a:solidFill>
-                  <a:srgbClr val="333333"/>
-                </a:solidFill>
-              </a:rPr>
-              <a:t>assertTrue</a:t>
-            </a:r>
-            <a:r>
-              <a:rPr lang="fr-FR" b="1" dirty="0"/>
-              <a:t>(</a:t>
-            </a:r>
-            <a:r>
-              <a:rPr lang="fr-FR" dirty="0" err="1">
-                <a:solidFill>
-                  <a:srgbClr val="333333"/>
-                </a:solidFill>
-              </a:rPr>
-              <a:t>behaviour</a:t>
-            </a:r>
-            <a:r>
-              <a:rPr lang="fr-FR" b="1" dirty="0" err="1"/>
-              <a:t>.</a:t>
-            </a:r>
-            <a:r>
-              <a:rPr lang="fr-FR" dirty="0" err="1">
-                <a:solidFill>
-                  <a:srgbClr val="008080"/>
-                </a:solidFill>
-              </a:rPr>
-              <a:t>isVisible</a:t>
-            </a:r>
-            <a:r>
-              <a:rPr lang="fr-FR" b="1" dirty="0"/>
-              <a:t>(</a:t>
-            </a:r>
-            <a:r>
-              <a:rPr lang="fr-FR" dirty="0" err="1">
-                <a:solidFill>
-                  <a:srgbClr val="333333"/>
-                </a:solidFill>
-              </a:rPr>
-              <a:t>dependency</a:t>
-            </a:r>
-            <a:r>
-              <a:rPr lang="fr-FR" b="1" dirty="0"/>
-              <a:t>,</a:t>
-            </a:r>
-            <a:r>
-              <a:rPr lang="fr-FR" dirty="0"/>
-              <a:t> </a:t>
-            </a:r>
-            <a:r>
-              <a:rPr lang="fr-FR" dirty="0" err="1">
-                <a:solidFill>
-                  <a:srgbClr val="333333"/>
-                </a:solidFill>
-              </a:rPr>
-              <a:t>context</a:t>
-            </a:r>
-            <a:r>
-              <a:rPr lang="fr-FR" b="1" dirty="0"/>
-              <a:t>,</a:t>
-            </a:r>
-            <a:r>
-              <a:rPr lang="fr-FR" dirty="0"/>
-              <a:t> </a:t>
-            </a:r>
-            <a:r>
-              <a:rPr lang="fr-FR" b="1" dirty="0" err="1"/>
-              <a:t>null</a:t>
-            </a:r>
-            <a:r>
-              <a:rPr lang="fr-FR" b="1" dirty="0"/>
-              <a:t>));</a:t>
-            </a:r>
-            <a:endParaRPr lang="fr-FR" dirty="0"/>
-          </a:p>
-          <a:p>
-            <a:pPr marL="0" indent="0">
-              <a:buNone/>
-            </a:pPr>
-            <a:r>
-              <a:rPr lang="fr-FR" dirty="0"/>
-              <a:t>        </a:t>
-            </a:r>
-            <a:r>
-              <a:rPr lang="fr-FR" b="1" dirty="0"/>
-              <a:t>}</a:t>
             </a:r>
             <a:endParaRPr lang="fr-FR" dirty="0"/>
           </a:p>
@@ -16581,15 +16038,12 @@
             </a:pPr>
             <a:endParaRPr lang="fr-FR" dirty="0"/>
           </a:p>
-          <a:p>
-            <a:endParaRPr lang="fr-FR" dirty="0"/>
-          </a:p>
         </p:txBody>
       </p:sp>
     </p:spTree>
     <p:extLst>
       <p:ext uri="{BB962C8B-B14F-4D97-AF65-F5344CB8AC3E}">
-        <p14:creationId xmlns:p14="http://schemas.microsoft.com/office/powerpoint/2010/main" val="856155110"/>
+        <p14:creationId xmlns:p14="http://schemas.microsoft.com/office/powerpoint/2010/main" val="3760395846"/>
       </p:ext>
     </p:extLst>
   </p:cSld>
@@ -16639,10 +16093,10 @@
           <a:lstStyle/>
           <a:p>
             <a:r>
-              <a:rPr lang="en-US" dirty="0" smtClean="0"/>
-              <a:t>Selenium and integration testing</a:t>
-            </a:r>
-            <a:endParaRPr lang="en-US" dirty="0"/>
+              <a:rPr lang="en-US" dirty="0"/>
+              <a:t>Unit testing</a:t>
+            </a:r>
+            <a:endParaRPr lang="fr-FR" dirty="0"/>
           </a:p>
         </p:txBody>
       </p:sp>
@@ -16656,86 +16110,773 @@
             <p:ph idx="1"/>
           </p:nvPr>
         </p:nvSpPr>
-        <p:spPr/>
-        <p:txBody>
-          <a:bodyPr/>
+        <p:spPr>
+          <a:xfrm>
+            <a:off x="0" y="1600200"/>
+            <a:ext cx="9144000" cy="5257800"/>
+          </a:xfrm>
+        </p:spPr>
+        <p:txBody>
+          <a:bodyPr>
+            <a:normAutofit fontScale="55000" lnSpcReduction="20000"/>
+          </a:bodyPr>
           <a:lstStyle/>
           <a:p>
-            <a:r>
-              <a:rPr lang="en-US" dirty="0"/>
-              <a:t>Selenium is a </a:t>
-            </a:r>
-            <a:r>
-              <a:rPr lang="en-US" b="1" dirty="0"/>
-              <a:t>test automation</a:t>
-            </a:r>
-            <a:r>
-              <a:rPr lang="en-US" dirty="0"/>
-              <a:t> framework for </a:t>
-            </a:r>
-            <a:r>
-              <a:rPr lang="en-US" b="1" dirty="0"/>
-              <a:t>web applications</a:t>
-            </a:r>
-          </a:p>
-          <a:p>
-            <a:pPr lvl="1"/>
-            <a:r>
-              <a:rPr lang="en-US" dirty="0"/>
-              <a:t>sends commands to a browser</a:t>
-            </a:r>
-          </a:p>
-          <a:p>
-            <a:pPr lvl="1"/>
-            <a:r>
-              <a:rPr lang="en-US" dirty="0"/>
-              <a:t>retrieves results</a:t>
-            </a:r>
-          </a:p>
-          <a:p>
-            <a:pPr lvl="1"/>
-            <a:endParaRPr lang="en-US" dirty="0"/>
-          </a:p>
-          <a:p>
-            <a:r>
-              <a:rPr lang="en-US" dirty="0"/>
-              <a:t>Supports: </a:t>
-            </a:r>
-          </a:p>
-          <a:p>
-            <a:pPr lvl="1"/>
-            <a:r>
-              <a:rPr lang="en-US" b="1" dirty="0"/>
-              <a:t>Java</a:t>
-            </a:r>
-            <a:r>
-              <a:rPr lang="en-US" dirty="0"/>
-              <a:t>, Ruby, Python, C#, etc.</a:t>
-            </a:r>
-          </a:p>
-          <a:p>
-            <a:pPr lvl="1"/>
-            <a:r>
-              <a:rPr lang="en-US" b="1" dirty="0"/>
-              <a:t>Firefox</a:t>
-            </a:r>
-            <a:r>
-              <a:rPr lang="en-US" dirty="0"/>
-              <a:t>, Chrome, IE, iOS &amp; Android browsers, etc.</a:t>
-            </a:r>
-          </a:p>
-          <a:p>
+            <a:pPr marL="0" indent="0">
+              <a:buNone/>
+            </a:pPr>
+            <a:r>
+              <a:rPr lang="fr-FR" dirty="0"/>
+              <a:t>    @Test</a:t>
+            </a:r>
+          </a:p>
+          <a:p>
+            <a:pPr marL="0" indent="0">
+              <a:buNone/>
+            </a:pPr>
+            <a:r>
+              <a:rPr lang="fr-FR" dirty="0"/>
+              <a:t>    </a:t>
+            </a:r>
+            <a:r>
+              <a:rPr lang="fr-FR" b="1" dirty="0"/>
+              <a:t>public</a:t>
+            </a:r>
+            <a:r>
+              <a:rPr lang="fr-FR" dirty="0"/>
+              <a:t> </a:t>
+            </a:r>
+            <a:r>
+              <a:rPr lang="fr-FR" b="1" dirty="0" err="1">
+                <a:solidFill>
+                  <a:srgbClr val="445588"/>
+                </a:solidFill>
+              </a:rPr>
+              <a:t>void</a:t>
+            </a:r>
+            <a:r>
+              <a:rPr lang="fr-FR" dirty="0"/>
+              <a:t> </a:t>
+            </a:r>
+            <a:r>
+              <a:rPr lang="fr-FR" b="1" dirty="0" err="1" smtClean="0">
+                <a:solidFill>
+                  <a:srgbClr val="990000"/>
+                </a:solidFill>
+              </a:rPr>
+              <a:t>visibility</a:t>
+            </a:r>
+            <a:r>
+              <a:rPr lang="fr-FR" b="1" dirty="0"/>
+              <a:t>()</a:t>
+            </a:r>
+            <a:r>
+              <a:rPr lang="fr-FR" dirty="0"/>
+              <a:t> </a:t>
+            </a:r>
+            <a:r>
+              <a:rPr lang="fr-FR" b="1" dirty="0"/>
+              <a:t>{</a:t>
+            </a:r>
             <a:endParaRPr lang="fr-FR" dirty="0"/>
           </a:p>
           <a:p>
-            <a:endParaRPr lang="en-US" dirty="0"/>
+            <a:pPr marL="0" indent="0">
+              <a:buNone/>
+            </a:pPr>
+            <a:r>
+              <a:rPr lang="fr-FR" dirty="0"/>
+              <a:t>        </a:t>
+            </a:r>
+            <a:r>
+              <a:rPr lang="fr-FR" dirty="0" err="1">
+                <a:solidFill>
+                  <a:srgbClr val="333333"/>
+                </a:solidFill>
+              </a:rPr>
+              <a:t>FieldDependencyFactory</a:t>
+            </a:r>
+            <a:r>
+              <a:rPr lang="fr-FR" dirty="0"/>
+              <a:t> </a:t>
+            </a:r>
+            <a:r>
+              <a:rPr lang="fr-FR" dirty="0" err="1">
+                <a:solidFill>
+                  <a:srgbClr val="333333"/>
+                </a:solidFill>
+              </a:rPr>
+              <a:t>dependencyFactory</a:t>
+            </a:r>
+            <a:r>
+              <a:rPr lang="fr-FR" dirty="0"/>
+              <a:t> </a:t>
+            </a:r>
+            <a:r>
+              <a:rPr lang="fr-FR" b="1" dirty="0"/>
+              <a:t>=</a:t>
+            </a:r>
+            <a:r>
+              <a:rPr lang="fr-FR" dirty="0"/>
+              <a:t> </a:t>
+            </a:r>
+            <a:r>
+              <a:rPr lang="fr-FR" b="1" dirty="0"/>
+              <a:t>new</a:t>
+            </a:r>
+            <a:r>
+              <a:rPr lang="fr-FR" dirty="0"/>
+              <a:t> </a:t>
+            </a:r>
+            <a:r>
+              <a:rPr lang="fr-FR" dirty="0" err="1">
+                <a:solidFill>
+                  <a:srgbClr val="333333"/>
+                </a:solidFill>
+              </a:rPr>
+              <a:t>FieldDependencySampleFactory</a:t>
+            </a:r>
+            <a:r>
+              <a:rPr lang="fr-FR" b="1" dirty="0"/>
+              <a:t>();</a:t>
+            </a:r>
+            <a:endParaRPr lang="fr-FR" dirty="0"/>
+          </a:p>
+          <a:p>
+            <a:pPr marL="0" indent="0">
+              <a:buNone/>
+            </a:pPr>
+            <a:r>
+              <a:rPr lang="fr-FR" dirty="0"/>
+              <a:t>        </a:t>
+            </a:r>
+            <a:r>
+              <a:rPr lang="fr-FR" dirty="0" err="1">
+                <a:solidFill>
+                  <a:srgbClr val="333333"/>
+                </a:solidFill>
+              </a:rPr>
+              <a:t>MockFieldBehaviourFactory</a:t>
+            </a:r>
+            <a:r>
+              <a:rPr lang="fr-FR" dirty="0"/>
+              <a:t> </a:t>
+            </a:r>
+            <a:r>
+              <a:rPr lang="fr-FR" dirty="0" err="1">
+                <a:solidFill>
+                  <a:srgbClr val="333333"/>
+                </a:solidFill>
+              </a:rPr>
+              <a:t>behaviourFactory</a:t>
+            </a:r>
+            <a:r>
+              <a:rPr lang="fr-FR" dirty="0"/>
+              <a:t> </a:t>
+            </a:r>
+            <a:r>
+              <a:rPr lang="fr-FR" b="1" dirty="0"/>
+              <a:t>=</a:t>
+            </a:r>
+            <a:r>
+              <a:rPr lang="fr-FR" dirty="0"/>
+              <a:t> </a:t>
+            </a:r>
+            <a:r>
+              <a:rPr lang="fr-FR" b="1" dirty="0"/>
+              <a:t>new</a:t>
+            </a:r>
+            <a:r>
+              <a:rPr lang="fr-FR" dirty="0"/>
+              <a:t> </a:t>
+            </a:r>
+            <a:r>
+              <a:rPr lang="fr-FR" dirty="0" err="1">
+                <a:solidFill>
+                  <a:srgbClr val="333333"/>
+                </a:solidFill>
+              </a:rPr>
+              <a:t>MockFieldBehaviourFactory</a:t>
+            </a:r>
+            <a:r>
+              <a:rPr lang="fr-FR" b="1" dirty="0" smtClean="0"/>
+              <a:t>();</a:t>
+            </a:r>
+            <a:r>
+              <a:rPr lang="fr-FR" dirty="0"/>
+              <a:t/>
+            </a:r>
+            <a:br>
+              <a:rPr lang="fr-FR" dirty="0"/>
+            </a:br>
+            <a:endParaRPr lang="fr-FR" dirty="0"/>
+          </a:p>
+          <a:p>
+            <a:pPr marL="0" indent="0">
+              <a:buNone/>
+            </a:pPr>
+            <a:r>
+              <a:rPr lang="fr-FR" dirty="0"/>
+              <a:t>        </a:t>
+            </a:r>
+            <a:r>
+              <a:rPr lang="fr-FR" dirty="0" err="1">
+                <a:solidFill>
+                  <a:srgbClr val="333333"/>
+                </a:solidFill>
+              </a:rPr>
+              <a:t>SampleContext</a:t>
+            </a:r>
+            <a:r>
+              <a:rPr lang="fr-FR" dirty="0"/>
+              <a:t> </a:t>
+            </a:r>
+            <a:r>
+              <a:rPr lang="fr-FR" dirty="0" err="1">
+                <a:solidFill>
+                  <a:srgbClr val="333333"/>
+                </a:solidFill>
+              </a:rPr>
+              <a:t>context</a:t>
+            </a:r>
+            <a:r>
+              <a:rPr lang="fr-FR" dirty="0"/>
+              <a:t> </a:t>
+            </a:r>
+            <a:r>
+              <a:rPr lang="fr-FR" b="1" dirty="0"/>
+              <a:t>=</a:t>
+            </a:r>
+            <a:r>
+              <a:rPr lang="fr-FR" dirty="0"/>
+              <a:t> </a:t>
+            </a:r>
+            <a:r>
+              <a:rPr lang="fr-FR" b="1" dirty="0"/>
+              <a:t>new</a:t>
+            </a:r>
+            <a:r>
+              <a:rPr lang="fr-FR" dirty="0"/>
+              <a:t> </a:t>
+            </a:r>
+            <a:r>
+              <a:rPr lang="fr-FR" dirty="0" err="1">
+                <a:solidFill>
+                  <a:srgbClr val="333333"/>
+                </a:solidFill>
+              </a:rPr>
+              <a:t>SampleContext</a:t>
+            </a:r>
+            <a:r>
+              <a:rPr lang="fr-FR" b="1" dirty="0"/>
+              <a:t>();</a:t>
+            </a:r>
+            <a:endParaRPr lang="fr-FR" dirty="0"/>
+          </a:p>
+          <a:p>
+            <a:pPr marL="0" indent="0">
+              <a:buNone/>
+            </a:pPr>
+            <a:endParaRPr lang="fr-FR" dirty="0"/>
+          </a:p>
+          <a:p>
+            <a:pPr marL="0" indent="0">
+              <a:buNone/>
+            </a:pPr>
+            <a:r>
+              <a:rPr lang="fr-FR" dirty="0"/>
+              <a:t>        </a:t>
+            </a:r>
+            <a:r>
+              <a:rPr lang="fr-FR" b="1" dirty="0"/>
+              <a:t>for</a:t>
+            </a:r>
+            <a:r>
+              <a:rPr lang="fr-FR" dirty="0"/>
+              <a:t> </a:t>
+            </a:r>
+            <a:r>
+              <a:rPr lang="fr-FR" b="1" dirty="0"/>
+              <a:t>(</a:t>
+            </a:r>
+            <a:r>
+              <a:rPr lang="fr-FR" dirty="0" err="1">
+                <a:solidFill>
+                  <a:srgbClr val="333333"/>
+                </a:solidFill>
+              </a:rPr>
+              <a:t>FieldID</a:t>
+            </a:r>
+            <a:r>
+              <a:rPr lang="fr-FR" dirty="0"/>
+              <a:t> </a:t>
+            </a:r>
+            <a:r>
+              <a:rPr lang="fr-FR" dirty="0" err="1">
+                <a:solidFill>
+                  <a:srgbClr val="333333"/>
+                </a:solidFill>
+              </a:rPr>
+              <a:t>dependency</a:t>
+            </a:r>
+            <a:r>
+              <a:rPr lang="fr-FR" dirty="0"/>
+              <a:t> </a:t>
+            </a:r>
+            <a:r>
+              <a:rPr lang="fr-FR" b="1" dirty="0"/>
+              <a:t>:</a:t>
+            </a:r>
+            <a:r>
+              <a:rPr lang="fr-FR" dirty="0"/>
+              <a:t> </a:t>
+            </a:r>
+            <a:r>
+              <a:rPr lang="fr-FR" dirty="0" err="1">
+                <a:solidFill>
+                  <a:srgbClr val="333333"/>
+                </a:solidFill>
+              </a:rPr>
+              <a:t>dependencyFactory</a:t>
+            </a:r>
+            <a:r>
+              <a:rPr lang="fr-FR" b="1" dirty="0" err="1"/>
+              <a:t>.</a:t>
+            </a:r>
+            <a:r>
+              <a:rPr lang="fr-FR" dirty="0" err="1">
+                <a:solidFill>
+                  <a:srgbClr val="008080"/>
+                </a:solidFill>
+              </a:rPr>
+              <a:t>get</a:t>
+            </a:r>
+            <a:r>
+              <a:rPr lang="fr-FR" b="1" dirty="0"/>
+              <a:t>(</a:t>
+            </a:r>
+            <a:r>
+              <a:rPr lang="fr-FR" dirty="0">
+                <a:solidFill>
+                  <a:srgbClr val="333333"/>
+                </a:solidFill>
+              </a:rPr>
+              <a:t>EMAIL_ACCEPTED</a:t>
+            </a:r>
+            <a:r>
+              <a:rPr lang="fr-FR" b="1" dirty="0"/>
+              <a:t>))</a:t>
+            </a:r>
+            <a:r>
+              <a:rPr lang="fr-FR" dirty="0"/>
+              <a:t> </a:t>
+            </a:r>
+            <a:r>
+              <a:rPr lang="fr-FR" b="1" dirty="0"/>
+              <a:t>{</a:t>
+            </a:r>
+            <a:endParaRPr lang="fr-FR" dirty="0"/>
+          </a:p>
+          <a:p>
+            <a:pPr marL="0" indent="0">
+              <a:buNone/>
+            </a:pPr>
+            <a:r>
+              <a:rPr lang="fr-FR" dirty="0"/>
+              <a:t>            </a:t>
+            </a:r>
+            <a:r>
+              <a:rPr lang="fr-FR" dirty="0" err="1">
+                <a:solidFill>
+                  <a:srgbClr val="333333"/>
+                </a:solidFill>
+              </a:rPr>
+              <a:t>FieldBehaviour</a:t>
+            </a:r>
+            <a:r>
+              <a:rPr lang="fr-FR" dirty="0"/>
+              <a:t> </a:t>
+            </a:r>
+            <a:r>
+              <a:rPr lang="fr-FR" dirty="0" err="1">
+                <a:solidFill>
+                  <a:srgbClr val="333333"/>
+                </a:solidFill>
+              </a:rPr>
+              <a:t>behaviour</a:t>
+            </a:r>
+            <a:r>
+              <a:rPr lang="fr-FR" dirty="0"/>
+              <a:t> </a:t>
+            </a:r>
+            <a:r>
+              <a:rPr lang="fr-FR" b="1" dirty="0"/>
+              <a:t>=</a:t>
+            </a:r>
+            <a:r>
+              <a:rPr lang="fr-FR" dirty="0"/>
+              <a:t> </a:t>
+            </a:r>
+            <a:r>
+              <a:rPr lang="fr-FR" dirty="0" err="1">
+                <a:solidFill>
+                  <a:srgbClr val="333333"/>
+                </a:solidFill>
+              </a:rPr>
+              <a:t>behaviourFactory</a:t>
+            </a:r>
+            <a:r>
+              <a:rPr lang="fr-FR" b="1" dirty="0" err="1"/>
+              <a:t>.</a:t>
+            </a:r>
+            <a:r>
+              <a:rPr lang="fr-FR" dirty="0" err="1">
+                <a:solidFill>
+                  <a:srgbClr val="008080"/>
+                </a:solidFill>
+              </a:rPr>
+              <a:t>get</a:t>
+            </a:r>
+            <a:r>
+              <a:rPr lang="fr-FR" b="1" dirty="0"/>
+              <a:t>(</a:t>
+            </a:r>
+            <a:r>
+              <a:rPr lang="fr-FR" dirty="0" err="1">
+                <a:solidFill>
+                  <a:srgbClr val="333333"/>
+                </a:solidFill>
+              </a:rPr>
+              <a:t>dependency</a:t>
+            </a:r>
+            <a:r>
+              <a:rPr lang="fr-FR" b="1" dirty="0" smtClean="0"/>
+              <a:t>);</a:t>
+            </a:r>
+            <a:r>
+              <a:rPr lang="fr-FR" dirty="0"/>
+              <a:t/>
+            </a:r>
+            <a:br>
+              <a:rPr lang="fr-FR" dirty="0"/>
+            </a:br>
+            <a:endParaRPr lang="fr-FR" dirty="0"/>
+          </a:p>
+          <a:p>
+            <a:pPr marL="0" indent="0">
+              <a:buNone/>
+            </a:pPr>
+            <a:r>
+              <a:rPr lang="fr-FR" dirty="0"/>
+              <a:t>            </a:t>
+            </a:r>
+            <a:r>
+              <a:rPr lang="fr-FR" dirty="0" err="1">
+                <a:solidFill>
+                  <a:srgbClr val="333333"/>
+                </a:solidFill>
+              </a:rPr>
+              <a:t>context</a:t>
+            </a:r>
+            <a:r>
+              <a:rPr lang="fr-FR" b="1" dirty="0" err="1"/>
+              <a:t>.</a:t>
+            </a:r>
+            <a:r>
+              <a:rPr lang="fr-FR" dirty="0" err="1">
+                <a:solidFill>
+                  <a:srgbClr val="008080"/>
+                </a:solidFill>
+              </a:rPr>
+              <a:t>getUserAccount</a:t>
+            </a:r>
+            <a:r>
+              <a:rPr lang="fr-FR" b="1" dirty="0"/>
+              <a:t>().</a:t>
+            </a:r>
+            <a:r>
+              <a:rPr lang="fr-FR" dirty="0" err="1">
+                <a:solidFill>
+                  <a:srgbClr val="008080"/>
+                </a:solidFill>
+              </a:rPr>
+              <a:t>setAcceptEmail</a:t>
+            </a:r>
+            <a:r>
+              <a:rPr lang="fr-FR" b="1" dirty="0"/>
+              <a:t>(false);</a:t>
+            </a:r>
+            <a:endParaRPr lang="fr-FR" dirty="0"/>
+          </a:p>
+          <a:p>
+            <a:pPr marL="0" indent="0">
+              <a:buNone/>
+            </a:pPr>
+            <a:r>
+              <a:rPr lang="fr-FR" dirty="0"/>
+              <a:t>            </a:t>
+            </a:r>
+            <a:r>
+              <a:rPr lang="fr-FR" dirty="0" err="1">
+                <a:solidFill>
+                  <a:srgbClr val="333333"/>
+                </a:solidFill>
+              </a:rPr>
+              <a:t>assertFalse</a:t>
+            </a:r>
+            <a:r>
+              <a:rPr lang="fr-FR" b="1" dirty="0"/>
+              <a:t>(</a:t>
+            </a:r>
+            <a:r>
+              <a:rPr lang="fr-FR" dirty="0" err="1">
+                <a:solidFill>
+                  <a:srgbClr val="333333"/>
+                </a:solidFill>
+              </a:rPr>
+              <a:t>behaviour</a:t>
+            </a:r>
+            <a:r>
+              <a:rPr lang="fr-FR" b="1" dirty="0" err="1"/>
+              <a:t>.</a:t>
+            </a:r>
+            <a:r>
+              <a:rPr lang="fr-FR" dirty="0" err="1">
+                <a:solidFill>
+                  <a:srgbClr val="008080"/>
+                </a:solidFill>
+              </a:rPr>
+              <a:t>isVisible</a:t>
+            </a:r>
+            <a:r>
+              <a:rPr lang="fr-FR" b="1" dirty="0"/>
+              <a:t>(</a:t>
+            </a:r>
+            <a:r>
+              <a:rPr lang="fr-FR" dirty="0" err="1">
+                <a:solidFill>
+                  <a:srgbClr val="333333"/>
+                </a:solidFill>
+              </a:rPr>
+              <a:t>dependency</a:t>
+            </a:r>
+            <a:r>
+              <a:rPr lang="fr-FR" b="1" dirty="0"/>
+              <a:t>,</a:t>
+            </a:r>
+            <a:r>
+              <a:rPr lang="fr-FR" dirty="0"/>
+              <a:t> </a:t>
+            </a:r>
+            <a:r>
+              <a:rPr lang="fr-FR" dirty="0" err="1">
+                <a:solidFill>
+                  <a:srgbClr val="333333"/>
+                </a:solidFill>
+              </a:rPr>
+              <a:t>context</a:t>
+            </a:r>
+            <a:r>
+              <a:rPr lang="fr-FR" b="1" dirty="0"/>
+              <a:t>,</a:t>
+            </a:r>
+            <a:r>
+              <a:rPr lang="fr-FR" dirty="0"/>
+              <a:t> </a:t>
+            </a:r>
+            <a:r>
+              <a:rPr lang="fr-FR" b="1" dirty="0" err="1"/>
+              <a:t>null</a:t>
+            </a:r>
+            <a:r>
+              <a:rPr lang="fr-FR" b="1" dirty="0"/>
+              <a:t>));</a:t>
+            </a:r>
+            <a:endParaRPr lang="fr-FR" dirty="0"/>
+          </a:p>
+          <a:p>
+            <a:pPr marL="0" indent="0">
+              <a:buNone/>
+            </a:pPr>
+            <a:endParaRPr lang="fr-FR" dirty="0"/>
+          </a:p>
+          <a:p>
+            <a:pPr marL="0" indent="0">
+              <a:buNone/>
+            </a:pPr>
+            <a:r>
+              <a:rPr lang="fr-FR" dirty="0"/>
+              <a:t>            </a:t>
+            </a:r>
+            <a:r>
+              <a:rPr lang="fr-FR" dirty="0" err="1">
+                <a:solidFill>
+                  <a:srgbClr val="333333"/>
+                </a:solidFill>
+              </a:rPr>
+              <a:t>context</a:t>
+            </a:r>
+            <a:r>
+              <a:rPr lang="fr-FR" b="1" dirty="0" err="1"/>
+              <a:t>.</a:t>
+            </a:r>
+            <a:r>
+              <a:rPr lang="fr-FR" dirty="0" err="1">
+                <a:solidFill>
+                  <a:srgbClr val="008080"/>
+                </a:solidFill>
+              </a:rPr>
+              <a:t>getUserAccount</a:t>
+            </a:r>
+            <a:r>
+              <a:rPr lang="fr-FR" b="1" dirty="0"/>
+              <a:t>().</a:t>
+            </a:r>
+            <a:r>
+              <a:rPr lang="fr-FR" dirty="0" err="1">
+                <a:solidFill>
+                  <a:srgbClr val="008080"/>
+                </a:solidFill>
+              </a:rPr>
+              <a:t>setAcceptEmail</a:t>
+            </a:r>
+            <a:r>
+              <a:rPr lang="fr-FR" b="1" dirty="0"/>
+              <a:t>(</a:t>
+            </a:r>
+            <a:r>
+              <a:rPr lang="fr-FR" b="1" dirty="0" err="1"/>
+              <a:t>true</a:t>
+            </a:r>
+            <a:r>
+              <a:rPr lang="fr-FR" b="1" dirty="0"/>
+              <a:t>);</a:t>
+            </a:r>
+            <a:endParaRPr lang="fr-FR" dirty="0"/>
+          </a:p>
+          <a:p>
+            <a:pPr marL="0" indent="0">
+              <a:buNone/>
+            </a:pPr>
+            <a:r>
+              <a:rPr lang="fr-FR" dirty="0"/>
+              <a:t>            </a:t>
+            </a:r>
+            <a:r>
+              <a:rPr lang="fr-FR" dirty="0" err="1">
+                <a:solidFill>
+                  <a:srgbClr val="333333"/>
+                </a:solidFill>
+              </a:rPr>
+              <a:t>assertTrue</a:t>
+            </a:r>
+            <a:r>
+              <a:rPr lang="fr-FR" b="1" dirty="0"/>
+              <a:t>(</a:t>
+            </a:r>
+            <a:r>
+              <a:rPr lang="fr-FR" dirty="0" err="1">
+                <a:solidFill>
+                  <a:srgbClr val="333333"/>
+                </a:solidFill>
+              </a:rPr>
+              <a:t>behaviour</a:t>
+            </a:r>
+            <a:r>
+              <a:rPr lang="fr-FR" b="1" dirty="0" err="1"/>
+              <a:t>.</a:t>
+            </a:r>
+            <a:r>
+              <a:rPr lang="fr-FR" dirty="0" err="1">
+                <a:solidFill>
+                  <a:srgbClr val="008080"/>
+                </a:solidFill>
+              </a:rPr>
+              <a:t>isVisible</a:t>
+            </a:r>
+            <a:r>
+              <a:rPr lang="fr-FR" b="1" dirty="0"/>
+              <a:t>(</a:t>
+            </a:r>
+            <a:r>
+              <a:rPr lang="fr-FR" dirty="0" err="1">
+                <a:solidFill>
+                  <a:srgbClr val="333333"/>
+                </a:solidFill>
+              </a:rPr>
+              <a:t>dependency</a:t>
+            </a:r>
+            <a:r>
+              <a:rPr lang="fr-FR" b="1" dirty="0"/>
+              <a:t>,</a:t>
+            </a:r>
+            <a:r>
+              <a:rPr lang="fr-FR" dirty="0"/>
+              <a:t> </a:t>
+            </a:r>
+            <a:r>
+              <a:rPr lang="fr-FR" dirty="0" err="1">
+                <a:solidFill>
+                  <a:srgbClr val="333333"/>
+                </a:solidFill>
+              </a:rPr>
+              <a:t>context</a:t>
+            </a:r>
+            <a:r>
+              <a:rPr lang="fr-FR" b="1" dirty="0"/>
+              <a:t>,</a:t>
+            </a:r>
+            <a:r>
+              <a:rPr lang="fr-FR" dirty="0"/>
+              <a:t> </a:t>
+            </a:r>
+            <a:r>
+              <a:rPr lang="fr-FR" b="1" dirty="0" err="1"/>
+              <a:t>null</a:t>
+            </a:r>
+            <a:r>
+              <a:rPr lang="fr-FR" b="1" dirty="0"/>
+              <a:t>));</a:t>
+            </a:r>
+            <a:endParaRPr lang="fr-FR" dirty="0"/>
+          </a:p>
+          <a:p>
+            <a:pPr marL="0" indent="0">
+              <a:buNone/>
+            </a:pPr>
+            <a:r>
+              <a:rPr lang="fr-FR" dirty="0"/>
+              <a:t>        </a:t>
+            </a:r>
+            <a:r>
+              <a:rPr lang="fr-FR" b="1" dirty="0"/>
+              <a:t>}</a:t>
+            </a:r>
+            <a:endParaRPr lang="fr-FR" dirty="0"/>
+          </a:p>
+          <a:p>
+            <a:pPr marL="0" indent="0">
+              <a:buNone/>
+            </a:pPr>
+            <a:r>
+              <a:rPr lang="fr-FR" dirty="0"/>
+              <a:t>    </a:t>
+            </a:r>
+            <a:r>
+              <a:rPr lang="fr-FR" b="1" dirty="0"/>
+              <a:t>}</a:t>
+            </a:r>
+            <a:endParaRPr lang="fr-FR" dirty="0"/>
+          </a:p>
+          <a:p>
+            <a:endParaRPr lang="fr-FR" dirty="0"/>
           </a:p>
         </p:txBody>
       </p:sp>
     </p:spTree>
     <p:extLst>
       <p:ext uri="{BB962C8B-B14F-4D97-AF65-F5344CB8AC3E}">
-        <p14:creationId xmlns:p14="http://schemas.microsoft.com/office/powerpoint/2010/main" val="2654585083"/>
+        <p14:creationId xmlns:p14="http://schemas.microsoft.com/office/powerpoint/2010/main" val="1422967000"/>
       </p:ext>
     </p:extLst>
   </p:cSld>
@@ -16785,10 +16926,10 @@
           <a:lstStyle/>
           <a:p>
             <a:r>
-              <a:rPr lang="en-US" dirty="0"/>
+              <a:rPr lang="en-US" dirty="0" smtClean="0"/>
               <a:t>Selenium and integration testing</a:t>
             </a:r>
-            <a:endParaRPr lang="fr-FR" dirty="0"/>
+            <a:endParaRPr lang="en-US" dirty="0"/>
           </a:p>
         </p:txBody>
       </p:sp>
@@ -16809,29 +16950,33 @@
           <a:p>
             <a:r>
               <a:rPr lang="en-US" dirty="0"/>
-              <a:t>Generation of page objects classes</a:t>
+              <a:t>Selenium is a </a:t>
+            </a:r>
+            <a:r>
+              <a:rPr lang="en-US" b="1" dirty="0"/>
+              <a:t>test automation</a:t>
+            </a:r>
+            <a:r>
+              <a:rPr lang="en-US" dirty="0"/>
+              <a:t> framework for </a:t>
+            </a:r>
+            <a:r>
+              <a:rPr lang="en-US" b="1" dirty="0"/>
+              <a:t>web applications</a:t>
             </a:r>
           </a:p>
           <a:p>
             <a:pPr lvl="1"/>
             <a:r>
-              <a:rPr lang="en-US" b="1" dirty="0"/>
-              <a:t>representing a screen or a block </a:t>
-            </a:r>
-            <a:r>
               <a:rPr lang="en-US" dirty="0"/>
-              <a:t>with selenium framework</a:t>
+              <a:t>sends commands to a browser</a:t>
             </a:r>
           </a:p>
           <a:p>
             <a:pPr lvl="1"/>
             <a:r>
               <a:rPr lang="en-US" dirty="0"/>
-              <a:t>expose methods to </a:t>
-            </a:r>
-            <a:r>
-              <a:rPr lang="en-US" b="1" dirty="0"/>
-              <a:t>manipulate each fields</a:t>
+              <a:t>retrieves results</a:t>
             </a:r>
           </a:p>
           <a:p>
@@ -16841,45 +16986,43 @@
           <a:p>
             <a:r>
               <a:rPr lang="en-US" dirty="0"/>
-              <a:t>Make testing </a:t>
-            </a:r>
+              <a:t>Supports: </a:t>
+            </a:r>
+          </a:p>
+          <a:p>
+            <a:pPr lvl="1"/>
             <a:r>
               <a:rPr lang="en-US" b="1" dirty="0"/>
-              <a:t>easier</a:t>
+              <a:t>Java</a:t>
+            </a:r>
+            <a:r>
+              <a:rPr lang="en-US" dirty="0"/>
+              <a:t>, Ruby, Python, C#, etc.</a:t>
             </a:r>
           </a:p>
           <a:p>
             <a:pPr lvl="1"/>
             <a:r>
               <a:rPr lang="en-US" b="1" dirty="0"/>
-              <a:t>hide</a:t>
+              <a:t>Firefox</a:t>
             </a:r>
             <a:r>
               <a:rPr lang="en-US" dirty="0"/>
-              <a:t> selenium framework complexity</a:t>
-            </a:r>
-          </a:p>
-          <a:p>
-            <a:pPr lvl="1"/>
-            <a:r>
-              <a:rPr lang="en-US" b="1" dirty="0"/>
-              <a:t>minimize</a:t>
-            </a:r>
-            <a:r>
-              <a:rPr lang="en-US" dirty="0"/>
-              <a:t> the test maintenance effort</a:t>
-            </a:r>
+              <a:t>, Chrome, IE, iOS &amp; Android browsers, etc.</a:t>
+            </a:r>
+          </a:p>
+          <a:p>
             <a:endParaRPr lang="fr-FR" dirty="0"/>
           </a:p>
           <a:p>
-            <a:endParaRPr lang="fr-FR" dirty="0"/>
+            <a:endParaRPr lang="en-US" dirty="0"/>
           </a:p>
         </p:txBody>
       </p:sp>
     </p:spTree>
     <p:extLst>
       <p:ext uri="{BB962C8B-B14F-4D97-AF65-F5344CB8AC3E}">
-        <p14:creationId xmlns:p14="http://schemas.microsoft.com/office/powerpoint/2010/main" val="1683021932"/>
+        <p14:creationId xmlns:p14="http://schemas.microsoft.com/office/powerpoint/2010/main" val="2654585083"/>
       </p:ext>
     </p:extLst>
   </p:cSld>
@@ -16923,12 +17066,7 @@
             <p:ph type="title"/>
           </p:nvPr>
         </p:nvSpPr>
-        <p:spPr>
-          <a:xfrm>
-            <a:off x="457200" y="76200"/>
-            <a:ext cx="8229600" cy="1143000"/>
-          </a:xfrm>
-        </p:spPr>
+        <p:spPr/>
         <p:txBody>
           <a:bodyPr/>
           <a:lstStyle/>
@@ -16941,36 +17079,6 @@
           </a:p>
         </p:txBody>
       </p:sp>
-      <p:pic>
-        <p:nvPicPr>
-          <p:cNvPr id="8" name="Image 7"/>
-          <p:cNvPicPr>
-            <a:picLocks noChangeAspect="1"/>
-          </p:cNvPicPr>
-          <p:nvPr/>
-        </p:nvPicPr>
-        <p:blipFill>
-          <a:blip r:embed="rId2">
-            <a:extLst>
-              <a:ext uri="{28A0092B-C50C-407E-A947-70E740481C1C}">
-                <a14:useLocalDpi xmlns:a14="http://schemas.microsoft.com/office/drawing/2010/main" val="0"/>
-              </a:ext>
-            </a:extLst>
-          </a:blip>
-          <a:stretch>
-            <a:fillRect/>
-          </a:stretch>
-        </p:blipFill>
-        <p:spPr>
-          <a:xfrm>
-            <a:off x="685800" y="5181600"/>
-            <a:ext cx="7696200" cy="1676400"/>
-          </a:xfrm>
-          <a:prstGeom prst="rect">
-            <a:avLst/>
-          </a:prstGeom>
-        </p:spPr>
-      </p:pic>
       <p:sp>
         <p:nvSpPr>
           <p:cNvPr id="3" name="Espace réservé du contenu 2"/>
@@ -16981,609 +17089,76 @@
             <p:ph idx="1"/>
           </p:nvPr>
         </p:nvSpPr>
-        <p:spPr>
-          <a:xfrm>
-            <a:off x="0" y="1143000"/>
-            <a:ext cx="9448800" cy="4525963"/>
-          </a:xfrm>
-        </p:spPr>
-        <p:txBody>
-          <a:bodyPr>
-            <a:normAutofit fontScale="62500" lnSpcReduction="20000"/>
-          </a:bodyPr>
+        <p:spPr/>
+        <p:txBody>
+          <a:bodyPr/>
           <a:lstStyle/>
           <a:p>
-            <a:pPr marL="0" indent="0">
-              <a:buNone/>
-            </a:pPr>
-            <a:r>
-              <a:rPr lang="fr-FR" dirty="0"/>
-              <a:t> @Test</a:t>
-            </a:r>
-          </a:p>
-          <a:p>
-            <a:pPr marL="0" indent="0">
-              <a:buNone/>
-            </a:pPr>
-            <a:r>
-              <a:rPr lang="fr-FR" dirty="0"/>
-              <a:t>    </a:t>
-            </a:r>
-            <a:r>
-              <a:rPr lang="fr-FR" b="1" dirty="0"/>
-              <a:t>public</a:t>
-            </a:r>
-            <a:r>
-              <a:rPr lang="fr-FR" dirty="0"/>
-              <a:t> </a:t>
-            </a:r>
-            <a:r>
-              <a:rPr lang="fr-FR" b="1" dirty="0" err="1">
-                <a:solidFill>
-                  <a:srgbClr val="445588"/>
-                </a:solidFill>
-              </a:rPr>
-              <a:t>void</a:t>
-            </a:r>
-            <a:r>
-              <a:rPr lang="fr-FR" dirty="0"/>
-              <a:t> </a:t>
-            </a:r>
-            <a:r>
-              <a:rPr lang="fr-FR" b="1" dirty="0" err="1">
-                <a:solidFill>
-                  <a:srgbClr val="990000"/>
-                </a:solidFill>
-              </a:rPr>
-              <a:t>testRegistration</a:t>
-            </a:r>
-            <a:r>
-              <a:rPr lang="fr-FR" b="1" dirty="0"/>
-              <a:t>()</a:t>
-            </a:r>
-            <a:r>
-              <a:rPr lang="fr-FR" dirty="0"/>
-              <a:t> </a:t>
-            </a:r>
-            <a:r>
-              <a:rPr lang="fr-FR" b="1" dirty="0"/>
-              <a:t>{</a:t>
+            <a:r>
+              <a:rPr lang="en-US" dirty="0"/>
+              <a:t>Generation of page objects classes</a:t>
+            </a:r>
+          </a:p>
+          <a:p>
+            <a:pPr lvl="1"/>
+            <a:r>
+              <a:rPr lang="en-US" b="1" dirty="0"/>
+              <a:t>representing a screen or a block </a:t>
+            </a:r>
+            <a:r>
+              <a:rPr lang="en-US" dirty="0"/>
+              <a:t>with selenium framework</a:t>
+            </a:r>
+          </a:p>
+          <a:p>
+            <a:pPr lvl="1"/>
+            <a:r>
+              <a:rPr lang="en-US" dirty="0"/>
+              <a:t>expose methods to </a:t>
+            </a:r>
+            <a:r>
+              <a:rPr lang="en-US" b="1" dirty="0"/>
+              <a:t>manipulate each fields</a:t>
+            </a:r>
+          </a:p>
+          <a:p>
+            <a:pPr lvl="1"/>
+            <a:endParaRPr lang="en-US" dirty="0"/>
+          </a:p>
+          <a:p>
+            <a:r>
+              <a:rPr lang="en-US" dirty="0"/>
+              <a:t>Make testing </a:t>
+            </a:r>
+            <a:r>
+              <a:rPr lang="en-US" b="1" dirty="0"/>
+              <a:t>easier</a:t>
+            </a:r>
+          </a:p>
+          <a:p>
+            <a:pPr lvl="1"/>
+            <a:r>
+              <a:rPr lang="en-US" b="1" dirty="0"/>
+              <a:t>hide</a:t>
+            </a:r>
+            <a:r>
+              <a:rPr lang="en-US" dirty="0"/>
+              <a:t> selenium framework complexity</a:t>
+            </a:r>
+          </a:p>
+          <a:p>
+            <a:pPr lvl="1"/>
+            <a:r>
+              <a:rPr lang="en-US" b="1" dirty="0"/>
+              <a:t>minimize</a:t>
+            </a:r>
+            <a:r>
+              <a:rPr lang="en-US" dirty="0"/>
+              <a:t> the test maintenance effort</a:t>
             </a:r>
             <a:endParaRPr lang="fr-FR" dirty="0"/>
           </a:p>
           <a:p>
-            <a:pPr marL="0" indent="0">
-              <a:buNone/>
-            </a:pPr>
-            <a:r>
-              <a:rPr lang="fr-FR" dirty="0"/>
-              <a:t>        </a:t>
-            </a:r>
-            <a:r>
-              <a:rPr lang="fr-FR" dirty="0" err="1">
-                <a:solidFill>
-                  <a:srgbClr val="333333"/>
-                </a:solidFill>
-              </a:rPr>
-              <a:t>RegistrationByMailScreen</a:t>
-            </a:r>
-            <a:r>
-              <a:rPr lang="fr-FR" dirty="0"/>
-              <a:t> </a:t>
-            </a:r>
-            <a:r>
-              <a:rPr lang="fr-FR" dirty="0" err="1">
-                <a:solidFill>
-                  <a:srgbClr val="333333"/>
-                </a:solidFill>
-              </a:rPr>
-              <a:t>registrationScreen</a:t>
-            </a:r>
-            <a:r>
-              <a:rPr lang="fr-FR" dirty="0"/>
-              <a:t> </a:t>
-            </a:r>
-            <a:r>
-              <a:rPr lang="fr-FR" b="1" dirty="0"/>
-              <a:t>=</a:t>
-            </a:r>
-            <a:r>
-              <a:rPr lang="fr-FR" dirty="0"/>
-              <a:t> </a:t>
-            </a:r>
-            <a:r>
-              <a:rPr lang="fr-FR" b="1" dirty="0"/>
-              <a:t>new</a:t>
-            </a:r>
-            <a:r>
-              <a:rPr lang="fr-FR" dirty="0"/>
-              <a:t> </a:t>
-            </a:r>
-            <a:r>
-              <a:rPr lang="fr-FR" dirty="0" smtClean="0"/>
-              <a:t>									</a:t>
-            </a:r>
-            <a:r>
-              <a:rPr lang="fr-FR" dirty="0" err="1" smtClean="0">
-                <a:solidFill>
-                  <a:srgbClr val="333333"/>
-                </a:solidFill>
-              </a:rPr>
-              <a:t>RegistrationByMailScreen</a:t>
-            </a:r>
-            <a:r>
-              <a:rPr lang="fr-FR" b="1" dirty="0" smtClean="0"/>
-              <a:t>(</a:t>
-            </a:r>
-            <a:r>
-              <a:rPr lang="fr-FR" dirty="0" err="1" smtClean="0">
-                <a:solidFill>
-                  <a:srgbClr val="333333"/>
-                </a:solidFill>
-              </a:rPr>
-              <a:t>getDriver</a:t>
-            </a:r>
-            <a:r>
-              <a:rPr lang="fr-FR" b="1" dirty="0"/>
-              <a:t>());</a:t>
-            </a:r>
-            <a:endParaRPr lang="fr-FR" dirty="0"/>
-          </a:p>
-          <a:p>
-            <a:pPr marL="0" indent="0">
-              <a:buNone/>
-            </a:pPr>
-            <a:r>
-              <a:rPr lang="fr-FR" dirty="0"/>
-              <a:t>        </a:t>
-            </a:r>
-            <a:r>
-              <a:rPr lang="fr-FR" dirty="0" err="1">
-                <a:solidFill>
-                  <a:srgbClr val="333333"/>
-                </a:solidFill>
-              </a:rPr>
-              <a:t>registrationScreen</a:t>
-            </a:r>
-            <a:r>
-              <a:rPr lang="fr-FR" b="1" dirty="0" err="1"/>
-              <a:t>.</a:t>
-            </a:r>
-            <a:r>
-              <a:rPr lang="fr-FR" dirty="0" err="1">
-                <a:solidFill>
-                  <a:srgbClr val="008080"/>
-                </a:solidFill>
-              </a:rPr>
-              <a:t>assertDisplayed</a:t>
-            </a:r>
-            <a:r>
-              <a:rPr lang="fr-FR" b="1" dirty="0"/>
-              <a:t>();</a:t>
-            </a:r>
-            <a:r>
-              <a:rPr lang="fr-FR" dirty="0"/>
-              <a:t/>
-            </a:r>
-            <a:br>
-              <a:rPr lang="fr-FR" dirty="0"/>
-            </a:br>
-            <a:endParaRPr lang="fr-FR" sz="900" dirty="0"/>
-          </a:p>
-          <a:p>
-            <a:pPr marL="0" indent="0">
-              <a:buNone/>
-            </a:pPr>
-            <a:r>
-              <a:rPr lang="fr-FR" dirty="0"/>
-              <a:t>        </a:t>
-            </a:r>
-            <a:r>
-              <a:rPr lang="fr-FR" dirty="0" err="1">
-                <a:solidFill>
-                  <a:srgbClr val="333333"/>
-                </a:solidFill>
-              </a:rPr>
-              <a:t>registrationScreen</a:t>
-            </a:r>
-            <a:r>
-              <a:rPr lang="fr-FR" b="1" dirty="0" err="1"/>
-              <a:t>.</a:t>
-            </a:r>
-            <a:r>
-              <a:rPr lang="fr-FR" dirty="0" err="1">
-                <a:solidFill>
-                  <a:srgbClr val="008080"/>
-                </a:solidFill>
-              </a:rPr>
-              <a:t>getPersonalInformations</a:t>
-            </a:r>
-            <a:r>
-              <a:rPr lang="fr-FR" b="1" dirty="0"/>
-              <a:t>()</a:t>
-            </a:r>
-            <a:r>
-              <a:rPr lang="fr-FR" i="1" dirty="0">
-                <a:solidFill>
-                  <a:srgbClr val="999988"/>
-                </a:solidFill>
-              </a:rPr>
-              <a:t>//</a:t>
-            </a:r>
-            <a:endParaRPr lang="fr-FR" dirty="0"/>
-          </a:p>
-          <a:p>
-            <a:pPr marL="0" indent="0">
-              <a:buNone/>
-            </a:pPr>
-            <a:r>
-              <a:rPr lang="fr-FR" dirty="0"/>
-              <a:t>                        </a:t>
-            </a:r>
-            <a:r>
-              <a:rPr lang="fr-FR" b="1" dirty="0"/>
-              <a:t>.</a:t>
-            </a:r>
-            <a:r>
-              <a:rPr lang="fr-FR" dirty="0" err="1">
-                <a:solidFill>
-                  <a:srgbClr val="008080"/>
-                </a:solidFill>
-              </a:rPr>
-              <a:t>assertDisplayed</a:t>
-            </a:r>
-            <a:r>
-              <a:rPr lang="fr-FR" b="1" dirty="0"/>
-              <a:t>()</a:t>
-            </a:r>
-            <a:r>
-              <a:rPr lang="fr-FR" i="1" dirty="0">
-                <a:solidFill>
-                  <a:srgbClr val="999988"/>
-                </a:solidFill>
-              </a:rPr>
-              <a:t>//</a:t>
-            </a:r>
-            <a:endParaRPr lang="fr-FR" dirty="0"/>
-          </a:p>
-          <a:p>
-            <a:pPr marL="0" indent="0">
-              <a:buNone/>
-            </a:pPr>
-            <a:r>
-              <a:rPr lang="fr-FR" dirty="0"/>
-              <a:t>                        </a:t>
-            </a:r>
-            <a:r>
-              <a:rPr lang="fr-FR" b="1" dirty="0"/>
-              <a:t>.</a:t>
-            </a:r>
-            <a:r>
-              <a:rPr lang="fr-FR" dirty="0" err="1">
-                <a:solidFill>
-                  <a:srgbClr val="008080"/>
-                </a:solidFill>
-              </a:rPr>
-              <a:t>setFirstName</a:t>
-            </a:r>
-            <a:r>
-              <a:rPr lang="fr-FR" b="1" dirty="0"/>
-              <a:t>(</a:t>
-            </a:r>
-            <a:r>
-              <a:rPr lang="fr-FR" dirty="0">
-                <a:solidFill>
-                  <a:srgbClr val="DD1144"/>
-                </a:solidFill>
-              </a:rPr>
-              <a:t>"John"</a:t>
-            </a:r>
-            <a:r>
-              <a:rPr lang="fr-FR" b="1" dirty="0"/>
-              <a:t>)</a:t>
-            </a:r>
-            <a:r>
-              <a:rPr lang="fr-FR" i="1" dirty="0">
-                <a:solidFill>
-                  <a:srgbClr val="999988"/>
-                </a:solidFill>
-              </a:rPr>
-              <a:t>//</a:t>
-            </a:r>
-            <a:endParaRPr lang="fr-FR" dirty="0"/>
-          </a:p>
-          <a:p>
-            <a:pPr marL="0" indent="0">
-              <a:buNone/>
-            </a:pPr>
-            <a:r>
-              <a:rPr lang="fr-FR" dirty="0"/>
-              <a:t>                        </a:t>
-            </a:r>
-            <a:r>
-              <a:rPr lang="fr-FR" b="1" dirty="0"/>
-              <a:t>.</a:t>
-            </a:r>
-            <a:r>
-              <a:rPr lang="fr-FR" dirty="0" err="1">
-                <a:solidFill>
-                  <a:srgbClr val="008080"/>
-                </a:solidFill>
-              </a:rPr>
-              <a:t>setLastName</a:t>
-            </a:r>
-            <a:r>
-              <a:rPr lang="fr-FR" b="1" dirty="0"/>
-              <a:t>(</a:t>
-            </a:r>
-            <a:r>
-              <a:rPr lang="fr-FR" dirty="0">
-                <a:solidFill>
-                  <a:srgbClr val="DD1144"/>
-                </a:solidFill>
-              </a:rPr>
-              <a:t>"</a:t>
-            </a:r>
-            <a:r>
-              <a:rPr lang="fr-FR" dirty="0" err="1">
-                <a:solidFill>
-                  <a:srgbClr val="DD1144"/>
-                </a:solidFill>
-              </a:rPr>
-              <a:t>Doe</a:t>
-            </a:r>
-            <a:r>
-              <a:rPr lang="fr-FR" dirty="0">
-                <a:solidFill>
-                  <a:srgbClr val="DD1144"/>
-                </a:solidFill>
-              </a:rPr>
-              <a:t>"</a:t>
-            </a:r>
-            <a:r>
-              <a:rPr lang="fr-FR" b="1" dirty="0"/>
-              <a:t>)</a:t>
-            </a:r>
-            <a:r>
-              <a:rPr lang="fr-FR" i="1" dirty="0">
-                <a:solidFill>
-                  <a:srgbClr val="999988"/>
-                </a:solidFill>
-              </a:rPr>
-              <a:t>//</a:t>
-            </a:r>
-            <a:endParaRPr lang="fr-FR" dirty="0"/>
-          </a:p>
-          <a:p>
-            <a:pPr marL="0" indent="0">
-              <a:buNone/>
-            </a:pPr>
-            <a:r>
-              <a:rPr lang="fr-FR" dirty="0"/>
-              <a:t>                        </a:t>
-            </a:r>
-            <a:r>
-              <a:rPr lang="fr-FR" b="1" dirty="0"/>
-              <a:t>.</a:t>
-            </a:r>
-            <a:r>
-              <a:rPr lang="fr-FR" dirty="0" err="1">
-                <a:solidFill>
-                  <a:srgbClr val="008080"/>
-                </a:solidFill>
-              </a:rPr>
-              <a:t>setBirthdate</a:t>
-            </a:r>
-            <a:r>
-              <a:rPr lang="fr-FR" b="1" dirty="0"/>
-              <a:t>(new</a:t>
-            </a:r>
-            <a:r>
-              <a:rPr lang="fr-FR" dirty="0"/>
-              <a:t> </a:t>
-            </a:r>
-            <a:r>
-              <a:rPr lang="fr-FR" dirty="0" err="1">
-                <a:solidFill>
-                  <a:srgbClr val="333333"/>
-                </a:solidFill>
-              </a:rPr>
-              <a:t>DateMidnight</a:t>
-            </a:r>
-            <a:r>
-              <a:rPr lang="fr-FR" b="1" dirty="0"/>
-              <a:t>(</a:t>
-            </a:r>
-            <a:r>
-              <a:rPr lang="fr-FR" dirty="0">
-                <a:solidFill>
-                  <a:srgbClr val="009999"/>
-                </a:solidFill>
-              </a:rPr>
-              <a:t>1980</a:t>
-            </a:r>
-            <a:r>
-              <a:rPr lang="fr-FR" b="1" dirty="0"/>
-              <a:t>,</a:t>
-            </a:r>
-            <a:r>
-              <a:rPr lang="fr-FR" dirty="0"/>
-              <a:t> </a:t>
-            </a:r>
-            <a:r>
-              <a:rPr lang="fr-FR" dirty="0">
-                <a:solidFill>
-                  <a:srgbClr val="009999"/>
-                </a:solidFill>
-              </a:rPr>
-              <a:t>1</a:t>
-            </a:r>
-            <a:r>
-              <a:rPr lang="fr-FR" b="1" dirty="0"/>
-              <a:t>,</a:t>
-            </a:r>
-            <a:r>
-              <a:rPr lang="fr-FR" dirty="0"/>
-              <a:t> </a:t>
-            </a:r>
-            <a:r>
-              <a:rPr lang="fr-FR" dirty="0">
-                <a:solidFill>
-                  <a:srgbClr val="009999"/>
-                </a:solidFill>
-              </a:rPr>
-              <a:t>1</a:t>
-            </a:r>
-            <a:r>
-              <a:rPr lang="fr-FR" b="1" dirty="0"/>
-              <a:t>))</a:t>
-            </a:r>
-            <a:r>
-              <a:rPr lang="fr-FR" i="1" dirty="0">
-                <a:solidFill>
-                  <a:srgbClr val="999988"/>
-                </a:solidFill>
-              </a:rPr>
-              <a:t>//</a:t>
-            </a:r>
-            <a:endParaRPr lang="fr-FR" dirty="0"/>
-          </a:p>
-          <a:p>
-            <a:pPr marL="0" indent="0">
-              <a:buNone/>
-            </a:pPr>
-            <a:r>
-              <a:rPr lang="fr-FR" dirty="0"/>
-              <a:t>                        </a:t>
-            </a:r>
-            <a:r>
-              <a:rPr lang="fr-FR" b="1" dirty="0"/>
-              <a:t>.</a:t>
-            </a:r>
-            <a:r>
-              <a:rPr lang="fr-FR" dirty="0" err="1">
-                <a:solidFill>
-                  <a:srgbClr val="008080"/>
-                </a:solidFill>
-              </a:rPr>
-              <a:t>setEmail</a:t>
-            </a:r>
-            <a:r>
-              <a:rPr lang="fr-FR" b="1" dirty="0"/>
-              <a:t>(</a:t>
-            </a:r>
-            <a:r>
-              <a:rPr lang="fr-FR" dirty="0">
-                <a:solidFill>
-                  <a:srgbClr val="DD1144"/>
-                </a:solidFill>
-              </a:rPr>
-              <a:t>"john@doe.com"</a:t>
-            </a:r>
-            <a:r>
-              <a:rPr lang="fr-FR" b="1" dirty="0"/>
-              <a:t>)</a:t>
-            </a:r>
-            <a:r>
-              <a:rPr lang="fr-FR" i="1" dirty="0">
-                <a:solidFill>
-                  <a:srgbClr val="999988"/>
-                </a:solidFill>
-              </a:rPr>
-              <a:t>//</a:t>
-            </a:r>
-            <a:endParaRPr lang="fr-FR" dirty="0"/>
-          </a:p>
-          <a:p>
-            <a:pPr marL="0" indent="0">
-              <a:buNone/>
-            </a:pPr>
-            <a:r>
-              <a:rPr lang="fr-FR" dirty="0"/>
-              <a:t>                        </a:t>
-            </a:r>
-            <a:r>
-              <a:rPr lang="fr-FR" b="1" dirty="0"/>
-              <a:t>.</a:t>
-            </a:r>
-            <a:r>
-              <a:rPr lang="fr-FR" dirty="0" err="1">
-                <a:solidFill>
-                  <a:srgbClr val="008080"/>
-                </a:solidFill>
-              </a:rPr>
-              <a:t>submit</a:t>
-            </a:r>
-            <a:r>
-              <a:rPr lang="fr-FR" b="1" dirty="0"/>
-              <a:t>();</a:t>
-            </a:r>
-            <a:endParaRPr lang="fr-FR" dirty="0"/>
-          </a:p>
-          <a:p>
-            <a:pPr marL="0" indent="0">
-              <a:buNone/>
-            </a:pPr>
-            <a:endParaRPr lang="fr-FR" sz="900" dirty="0"/>
-          </a:p>
-          <a:p>
-            <a:pPr marL="0" indent="0">
-              <a:buNone/>
-            </a:pPr>
-            <a:r>
-              <a:rPr lang="fr-FR" dirty="0"/>
-              <a:t>        </a:t>
-            </a:r>
-            <a:r>
-              <a:rPr lang="fr-FR" dirty="0" err="1">
-                <a:solidFill>
-                  <a:srgbClr val="333333"/>
-                </a:solidFill>
-              </a:rPr>
-              <a:t>registrationScreen</a:t>
-            </a:r>
-            <a:r>
-              <a:rPr lang="fr-FR" b="1" dirty="0" err="1"/>
-              <a:t>.</a:t>
-            </a:r>
-            <a:r>
-              <a:rPr lang="fr-FR" dirty="0" err="1">
-                <a:solidFill>
-                  <a:srgbClr val="008080"/>
-                </a:solidFill>
-              </a:rPr>
-              <a:t>getMailSettings</a:t>
-            </a:r>
-            <a:r>
-              <a:rPr lang="fr-FR" b="1" dirty="0"/>
-              <a:t>().</a:t>
-            </a:r>
-            <a:r>
-              <a:rPr lang="fr-FR" dirty="0" err="1">
-                <a:solidFill>
-                  <a:srgbClr val="008080"/>
-                </a:solidFill>
-              </a:rPr>
-              <a:t>assertDisplayed</a:t>
-            </a:r>
-            <a:r>
-              <a:rPr lang="fr-FR" b="1" dirty="0"/>
-              <a:t>;</a:t>
-            </a:r>
-            <a:endParaRPr lang="fr-FR" dirty="0"/>
-          </a:p>
-          <a:p>
-            <a:pPr marL="0" indent="0">
-              <a:buNone/>
-            </a:pPr>
-            <a:r>
-              <a:rPr lang="fr-FR" dirty="0"/>
-              <a:t>    </a:t>
-            </a:r>
-            <a:r>
-              <a:rPr lang="fr-FR" b="1" dirty="0"/>
-              <a:t>}</a:t>
-            </a:r>
             <a:endParaRPr lang="fr-FR" dirty="0"/>
           </a:p>
         </p:txBody>
@@ -17591,7 +17166,7 @@
     </p:spTree>
     <p:extLst>
       <p:ext uri="{BB962C8B-B14F-4D97-AF65-F5344CB8AC3E}">
-        <p14:creationId xmlns:p14="http://schemas.microsoft.com/office/powerpoint/2010/main" val="3007787296"/>
+        <p14:creationId xmlns:p14="http://schemas.microsoft.com/office/powerpoint/2010/main" val="1683021932"/>
       </p:ext>
     </p:extLst>
   </p:cSld>
@@ -17635,19 +17210,54 @@
             <p:ph type="title"/>
           </p:nvPr>
         </p:nvSpPr>
-        <p:spPr/>
+        <p:spPr>
+          <a:xfrm>
+            <a:off x="457200" y="76200"/>
+            <a:ext cx="8229600" cy="1143000"/>
+          </a:xfrm>
+        </p:spPr>
         <p:txBody>
           <a:bodyPr/>
           <a:lstStyle/>
           <a:p>
             <a:r>
-              <a:rPr lang="en-US" dirty="0" smtClean="0"/>
-              <a:t>Refactoring and Agile practice</a:t>
-            </a:r>
-            <a:endParaRPr lang="en-US" dirty="0"/>
-          </a:p>
-        </p:txBody>
-      </p:sp>
+              <a:rPr lang="en-US" dirty="0"/>
+              <a:t>Selenium and integration testing</a:t>
+            </a:r>
+            <a:endParaRPr lang="fr-FR" dirty="0"/>
+          </a:p>
+        </p:txBody>
+      </p:sp>
+      <p:pic>
+        <p:nvPicPr>
+          <p:cNvPr id="8" name="Image 7"/>
+          <p:cNvPicPr>
+            <a:picLocks noChangeAspect="1"/>
+          </p:cNvPicPr>
+          <p:nvPr/>
+        </p:nvPicPr>
+        <p:blipFill>
+          <a:blip r:embed="rId2">
+            <a:extLst>
+              <a:ext uri="{28A0092B-C50C-407E-A947-70E740481C1C}">
+                <a14:useLocalDpi xmlns:a14="http://schemas.microsoft.com/office/drawing/2010/main" val="0"/>
+              </a:ext>
+            </a:extLst>
+          </a:blip>
+          <a:stretch>
+            <a:fillRect/>
+          </a:stretch>
+        </p:blipFill>
+        <p:spPr>
+          <a:xfrm>
+            <a:off x="685800" y="5181600"/>
+            <a:ext cx="7696200" cy="1676400"/>
+          </a:xfrm>
+          <a:prstGeom prst="rect">
+            <a:avLst/>
+          </a:prstGeom>
+        </p:spPr>
+      </p:pic>
       <p:sp>
         <p:nvSpPr>
           <p:cNvPr id="3" name="Espace réservé du contenu 2"/>
@@ -17658,19 +17268,617 @@
             <p:ph idx="1"/>
           </p:nvPr>
         </p:nvSpPr>
-        <p:spPr/>
-        <p:txBody>
-          <a:bodyPr/>
+        <p:spPr>
+          <a:xfrm>
+            <a:off x="0" y="1143000"/>
+            <a:ext cx="9448800" cy="4525963"/>
+          </a:xfrm>
+        </p:spPr>
+        <p:txBody>
+          <a:bodyPr>
+            <a:normAutofit fontScale="62500" lnSpcReduction="20000"/>
+          </a:bodyPr>
           <a:lstStyle/>
           <a:p>
-            <a:endParaRPr lang="en-US"/>
+            <a:pPr marL="0" indent="0">
+              <a:buNone/>
+            </a:pPr>
+            <a:r>
+              <a:rPr lang="fr-FR" dirty="0"/>
+              <a:t> @Test</a:t>
+            </a:r>
+          </a:p>
+          <a:p>
+            <a:pPr marL="0" indent="0">
+              <a:buNone/>
+            </a:pPr>
+            <a:r>
+              <a:rPr lang="fr-FR" dirty="0"/>
+              <a:t>    </a:t>
+            </a:r>
+            <a:r>
+              <a:rPr lang="fr-FR" b="1" dirty="0"/>
+              <a:t>public</a:t>
+            </a:r>
+            <a:r>
+              <a:rPr lang="fr-FR" dirty="0"/>
+              <a:t> </a:t>
+            </a:r>
+            <a:r>
+              <a:rPr lang="fr-FR" b="1" dirty="0" err="1">
+                <a:solidFill>
+                  <a:srgbClr val="445588"/>
+                </a:solidFill>
+              </a:rPr>
+              <a:t>void</a:t>
+            </a:r>
+            <a:r>
+              <a:rPr lang="fr-FR" dirty="0"/>
+              <a:t> </a:t>
+            </a:r>
+            <a:r>
+              <a:rPr lang="fr-FR" b="1" dirty="0" err="1">
+                <a:solidFill>
+                  <a:srgbClr val="990000"/>
+                </a:solidFill>
+              </a:rPr>
+              <a:t>testRegistration</a:t>
+            </a:r>
+            <a:r>
+              <a:rPr lang="fr-FR" b="1" dirty="0"/>
+              <a:t>()</a:t>
+            </a:r>
+            <a:r>
+              <a:rPr lang="fr-FR" dirty="0"/>
+              <a:t> </a:t>
+            </a:r>
+            <a:r>
+              <a:rPr lang="fr-FR" b="1" dirty="0"/>
+              <a:t>{</a:t>
+            </a:r>
+            <a:endParaRPr lang="fr-FR" dirty="0"/>
+          </a:p>
+          <a:p>
+            <a:pPr marL="0" indent="0">
+              <a:buNone/>
+            </a:pPr>
+            <a:r>
+              <a:rPr lang="fr-FR" dirty="0"/>
+              <a:t>        </a:t>
+            </a:r>
+            <a:r>
+              <a:rPr lang="fr-FR" dirty="0" err="1">
+                <a:solidFill>
+                  <a:srgbClr val="333333"/>
+                </a:solidFill>
+              </a:rPr>
+              <a:t>RegistrationByMailScreen</a:t>
+            </a:r>
+            <a:r>
+              <a:rPr lang="fr-FR" dirty="0"/>
+              <a:t> </a:t>
+            </a:r>
+            <a:r>
+              <a:rPr lang="fr-FR" dirty="0" err="1">
+                <a:solidFill>
+                  <a:srgbClr val="333333"/>
+                </a:solidFill>
+              </a:rPr>
+              <a:t>registrationScreen</a:t>
+            </a:r>
+            <a:r>
+              <a:rPr lang="fr-FR" dirty="0"/>
+              <a:t> </a:t>
+            </a:r>
+            <a:r>
+              <a:rPr lang="fr-FR" b="1" dirty="0"/>
+              <a:t>=</a:t>
+            </a:r>
+            <a:r>
+              <a:rPr lang="fr-FR" dirty="0"/>
+              <a:t> </a:t>
+            </a:r>
+            <a:r>
+              <a:rPr lang="fr-FR" b="1" dirty="0"/>
+              <a:t>new</a:t>
+            </a:r>
+            <a:r>
+              <a:rPr lang="fr-FR" dirty="0"/>
+              <a:t> </a:t>
+            </a:r>
+            <a:r>
+              <a:rPr lang="fr-FR" dirty="0" smtClean="0"/>
+              <a:t>									</a:t>
+            </a:r>
+            <a:r>
+              <a:rPr lang="fr-FR" dirty="0" err="1" smtClean="0">
+                <a:solidFill>
+                  <a:srgbClr val="333333"/>
+                </a:solidFill>
+              </a:rPr>
+              <a:t>RegistrationByMailScreen</a:t>
+            </a:r>
+            <a:r>
+              <a:rPr lang="fr-FR" b="1" dirty="0" smtClean="0"/>
+              <a:t>(</a:t>
+            </a:r>
+            <a:r>
+              <a:rPr lang="fr-FR" dirty="0" err="1" smtClean="0">
+                <a:solidFill>
+                  <a:srgbClr val="333333"/>
+                </a:solidFill>
+              </a:rPr>
+              <a:t>getDriver</a:t>
+            </a:r>
+            <a:r>
+              <a:rPr lang="fr-FR" b="1" dirty="0"/>
+              <a:t>());</a:t>
+            </a:r>
+            <a:endParaRPr lang="fr-FR" dirty="0"/>
+          </a:p>
+          <a:p>
+            <a:pPr marL="0" indent="0">
+              <a:buNone/>
+            </a:pPr>
+            <a:r>
+              <a:rPr lang="fr-FR" dirty="0"/>
+              <a:t>        </a:t>
+            </a:r>
+            <a:r>
+              <a:rPr lang="fr-FR" dirty="0" err="1">
+                <a:solidFill>
+                  <a:srgbClr val="333333"/>
+                </a:solidFill>
+              </a:rPr>
+              <a:t>registrationScreen</a:t>
+            </a:r>
+            <a:r>
+              <a:rPr lang="fr-FR" b="1" dirty="0" err="1"/>
+              <a:t>.</a:t>
+            </a:r>
+            <a:r>
+              <a:rPr lang="fr-FR" dirty="0" err="1">
+                <a:solidFill>
+                  <a:srgbClr val="008080"/>
+                </a:solidFill>
+              </a:rPr>
+              <a:t>assertDisplayed</a:t>
+            </a:r>
+            <a:r>
+              <a:rPr lang="fr-FR" b="1" dirty="0"/>
+              <a:t>();</a:t>
+            </a:r>
+            <a:r>
+              <a:rPr lang="fr-FR" dirty="0"/>
+              <a:t/>
+            </a:r>
+            <a:br>
+              <a:rPr lang="fr-FR" dirty="0"/>
+            </a:br>
+            <a:endParaRPr lang="fr-FR" sz="900" dirty="0"/>
+          </a:p>
+          <a:p>
+            <a:pPr marL="0" indent="0">
+              <a:buNone/>
+            </a:pPr>
+            <a:r>
+              <a:rPr lang="fr-FR" dirty="0"/>
+              <a:t>        </a:t>
+            </a:r>
+            <a:r>
+              <a:rPr lang="fr-FR" dirty="0" err="1">
+                <a:solidFill>
+                  <a:srgbClr val="333333"/>
+                </a:solidFill>
+              </a:rPr>
+              <a:t>registrationScreen</a:t>
+            </a:r>
+            <a:r>
+              <a:rPr lang="fr-FR" b="1" dirty="0" err="1"/>
+              <a:t>.</a:t>
+            </a:r>
+            <a:r>
+              <a:rPr lang="fr-FR" dirty="0" err="1">
+                <a:solidFill>
+                  <a:srgbClr val="008080"/>
+                </a:solidFill>
+              </a:rPr>
+              <a:t>getPersonalInformations</a:t>
+            </a:r>
+            <a:r>
+              <a:rPr lang="fr-FR" b="1" dirty="0"/>
+              <a:t>()</a:t>
+            </a:r>
+            <a:r>
+              <a:rPr lang="fr-FR" i="1" dirty="0">
+                <a:solidFill>
+                  <a:srgbClr val="999988"/>
+                </a:solidFill>
+              </a:rPr>
+              <a:t>//</a:t>
+            </a:r>
+            <a:endParaRPr lang="fr-FR" dirty="0"/>
+          </a:p>
+          <a:p>
+            <a:pPr marL="0" indent="0">
+              <a:buNone/>
+            </a:pPr>
+            <a:r>
+              <a:rPr lang="fr-FR" dirty="0"/>
+              <a:t>                        </a:t>
+            </a:r>
+            <a:r>
+              <a:rPr lang="fr-FR" b="1" dirty="0"/>
+              <a:t>.</a:t>
+            </a:r>
+            <a:r>
+              <a:rPr lang="fr-FR" dirty="0" err="1">
+                <a:solidFill>
+                  <a:srgbClr val="008080"/>
+                </a:solidFill>
+              </a:rPr>
+              <a:t>assertDisplayed</a:t>
+            </a:r>
+            <a:r>
+              <a:rPr lang="fr-FR" b="1" dirty="0"/>
+              <a:t>()</a:t>
+            </a:r>
+            <a:r>
+              <a:rPr lang="fr-FR" i="1" dirty="0">
+                <a:solidFill>
+                  <a:srgbClr val="999988"/>
+                </a:solidFill>
+              </a:rPr>
+              <a:t>//</a:t>
+            </a:r>
+            <a:endParaRPr lang="fr-FR" dirty="0"/>
+          </a:p>
+          <a:p>
+            <a:pPr marL="0" indent="0">
+              <a:buNone/>
+            </a:pPr>
+            <a:r>
+              <a:rPr lang="fr-FR" dirty="0"/>
+              <a:t>                        </a:t>
+            </a:r>
+            <a:r>
+              <a:rPr lang="fr-FR" b="1" dirty="0"/>
+              <a:t>.</a:t>
+            </a:r>
+            <a:r>
+              <a:rPr lang="fr-FR" dirty="0" err="1">
+                <a:solidFill>
+                  <a:srgbClr val="008080"/>
+                </a:solidFill>
+              </a:rPr>
+              <a:t>setFirstName</a:t>
+            </a:r>
+            <a:r>
+              <a:rPr lang="fr-FR" b="1" dirty="0"/>
+              <a:t>(</a:t>
+            </a:r>
+            <a:r>
+              <a:rPr lang="fr-FR" dirty="0">
+                <a:solidFill>
+                  <a:srgbClr val="DD1144"/>
+                </a:solidFill>
+              </a:rPr>
+              <a:t>"John"</a:t>
+            </a:r>
+            <a:r>
+              <a:rPr lang="fr-FR" b="1" dirty="0"/>
+              <a:t>)</a:t>
+            </a:r>
+            <a:r>
+              <a:rPr lang="fr-FR" i="1" dirty="0">
+                <a:solidFill>
+                  <a:srgbClr val="999988"/>
+                </a:solidFill>
+              </a:rPr>
+              <a:t>//</a:t>
+            </a:r>
+            <a:endParaRPr lang="fr-FR" dirty="0"/>
+          </a:p>
+          <a:p>
+            <a:pPr marL="0" indent="0">
+              <a:buNone/>
+            </a:pPr>
+            <a:r>
+              <a:rPr lang="fr-FR" dirty="0"/>
+              <a:t>                        </a:t>
+            </a:r>
+            <a:r>
+              <a:rPr lang="fr-FR" b="1" dirty="0"/>
+              <a:t>.</a:t>
+            </a:r>
+            <a:r>
+              <a:rPr lang="fr-FR" dirty="0" err="1">
+                <a:solidFill>
+                  <a:srgbClr val="008080"/>
+                </a:solidFill>
+              </a:rPr>
+              <a:t>setLastName</a:t>
+            </a:r>
+            <a:r>
+              <a:rPr lang="fr-FR" b="1" dirty="0"/>
+              <a:t>(</a:t>
+            </a:r>
+            <a:r>
+              <a:rPr lang="fr-FR" dirty="0">
+                <a:solidFill>
+                  <a:srgbClr val="DD1144"/>
+                </a:solidFill>
+              </a:rPr>
+              <a:t>"</a:t>
+            </a:r>
+            <a:r>
+              <a:rPr lang="fr-FR" dirty="0" err="1">
+                <a:solidFill>
+                  <a:srgbClr val="DD1144"/>
+                </a:solidFill>
+              </a:rPr>
+              <a:t>Doe</a:t>
+            </a:r>
+            <a:r>
+              <a:rPr lang="fr-FR" dirty="0">
+                <a:solidFill>
+                  <a:srgbClr val="DD1144"/>
+                </a:solidFill>
+              </a:rPr>
+              <a:t>"</a:t>
+            </a:r>
+            <a:r>
+              <a:rPr lang="fr-FR" b="1" dirty="0"/>
+              <a:t>)</a:t>
+            </a:r>
+            <a:r>
+              <a:rPr lang="fr-FR" i="1" dirty="0">
+                <a:solidFill>
+                  <a:srgbClr val="999988"/>
+                </a:solidFill>
+              </a:rPr>
+              <a:t>//</a:t>
+            </a:r>
+            <a:endParaRPr lang="fr-FR" dirty="0"/>
+          </a:p>
+          <a:p>
+            <a:pPr marL="0" indent="0">
+              <a:buNone/>
+            </a:pPr>
+            <a:r>
+              <a:rPr lang="fr-FR" dirty="0"/>
+              <a:t>                        </a:t>
+            </a:r>
+            <a:r>
+              <a:rPr lang="fr-FR" b="1" dirty="0"/>
+              <a:t>.</a:t>
+            </a:r>
+            <a:r>
+              <a:rPr lang="fr-FR" dirty="0" err="1">
+                <a:solidFill>
+                  <a:srgbClr val="008080"/>
+                </a:solidFill>
+              </a:rPr>
+              <a:t>setBirthdate</a:t>
+            </a:r>
+            <a:r>
+              <a:rPr lang="fr-FR" b="1" dirty="0"/>
+              <a:t>(new</a:t>
+            </a:r>
+            <a:r>
+              <a:rPr lang="fr-FR" dirty="0"/>
+              <a:t> </a:t>
+            </a:r>
+            <a:r>
+              <a:rPr lang="fr-FR" dirty="0" err="1">
+                <a:solidFill>
+                  <a:srgbClr val="333333"/>
+                </a:solidFill>
+              </a:rPr>
+              <a:t>DateMidnight</a:t>
+            </a:r>
+            <a:r>
+              <a:rPr lang="fr-FR" b="1" dirty="0"/>
+              <a:t>(</a:t>
+            </a:r>
+            <a:r>
+              <a:rPr lang="fr-FR" dirty="0">
+                <a:solidFill>
+                  <a:srgbClr val="009999"/>
+                </a:solidFill>
+              </a:rPr>
+              <a:t>1980</a:t>
+            </a:r>
+            <a:r>
+              <a:rPr lang="fr-FR" b="1" dirty="0"/>
+              <a:t>,</a:t>
+            </a:r>
+            <a:r>
+              <a:rPr lang="fr-FR" dirty="0"/>
+              <a:t> </a:t>
+            </a:r>
+            <a:r>
+              <a:rPr lang="fr-FR" dirty="0">
+                <a:solidFill>
+                  <a:srgbClr val="009999"/>
+                </a:solidFill>
+              </a:rPr>
+              <a:t>1</a:t>
+            </a:r>
+            <a:r>
+              <a:rPr lang="fr-FR" b="1" dirty="0"/>
+              <a:t>,</a:t>
+            </a:r>
+            <a:r>
+              <a:rPr lang="fr-FR" dirty="0"/>
+              <a:t> </a:t>
+            </a:r>
+            <a:r>
+              <a:rPr lang="fr-FR" dirty="0">
+                <a:solidFill>
+                  <a:srgbClr val="009999"/>
+                </a:solidFill>
+              </a:rPr>
+              <a:t>1</a:t>
+            </a:r>
+            <a:r>
+              <a:rPr lang="fr-FR" b="1" dirty="0"/>
+              <a:t>))</a:t>
+            </a:r>
+            <a:r>
+              <a:rPr lang="fr-FR" i="1" dirty="0">
+                <a:solidFill>
+                  <a:srgbClr val="999988"/>
+                </a:solidFill>
+              </a:rPr>
+              <a:t>//</a:t>
+            </a:r>
+            <a:endParaRPr lang="fr-FR" dirty="0"/>
+          </a:p>
+          <a:p>
+            <a:pPr marL="0" indent="0">
+              <a:buNone/>
+            </a:pPr>
+            <a:r>
+              <a:rPr lang="fr-FR" dirty="0"/>
+              <a:t>                        </a:t>
+            </a:r>
+            <a:r>
+              <a:rPr lang="fr-FR" b="1" dirty="0"/>
+              <a:t>.</a:t>
+            </a:r>
+            <a:r>
+              <a:rPr lang="fr-FR" dirty="0" err="1">
+                <a:solidFill>
+                  <a:srgbClr val="008080"/>
+                </a:solidFill>
+              </a:rPr>
+              <a:t>setEmail</a:t>
+            </a:r>
+            <a:r>
+              <a:rPr lang="fr-FR" b="1" dirty="0"/>
+              <a:t>(</a:t>
+            </a:r>
+            <a:r>
+              <a:rPr lang="fr-FR" dirty="0">
+                <a:solidFill>
+                  <a:srgbClr val="DD1144"/>
+                </a:solidFill>
+              </a:rPr>
+              <a:t>"john@doe.com"</a:t>
+            </a:r>
+            <a:r>
+              <a:rPr lang="fr-FR" b="1" dirty="0"/>
+              <a:t>)</a:t>
+            </a:r>
+            <a:r>
+              <a:rPr lang="fr-FR" i="1" dirty="0">
+                <a:solidFill>
+                  <a:srgbClr val="999988"/>
+                </a:solidFill>
+              </a:rPr>
+              <a:t>//</a:t>
+            </a:r>
+            <a:endParaRPr lang="fr-FR" dirty="0"/>
+          </a:p>
+          <a:p>
+            <a:pPr marL="0" indent="0">
+              <a:buNone/>
+            </a:pPr>
+            <a:r>
+              <a:rPr lang="fr-FR" dirty="0"/>
+              <a:t>                        </a:t>
+            </a:r>
+            <a:r>
+              <a:rPr lang="fr-FR" b="1" dirty="0"/>
+              <a:t>.</a:t>
+            </a:r>
+            <a:r>
+              <a:rPr lang="fr-FR" dirty="0" err="1">
+                <a:solidFill>
+                  <a:srgbClr val="008080"/>
+                </a:solidFill>
+              </a:rPr>
+              <a:t>submit</a:t>
+            </a:r>
+            <a:r>
+              <a:rPr lang="fr-FR" b="1" dirty="0"/>
+              <a:t>();</a:t>
+            </a:r>
+            <a:endParaRPr lang="fr-FR" dirty="0"/>
+          </a:p>
+          <a:p>
+            <a:pPr marL="0" indent="0">
+              <a:buNone/>
+            </a:pPr>
+            <a:endParaRPr lang="fr-FR" sz="900" dirty="0"/>
+          </a:p>
+          <a:p>
+            <a:pPr marL="0" indent="0">
+              <a:buNone/>
+            </a:pPr>
+            <a:r>
+              <a:rPr lang="fr-FR" dirty="0"/>
+              <a:t>        </a:t>
+            </a:r>
+            <a:r>
+              <a:rPr lang="fr-FR" dirty="0" err="1">
+                <a:solidFill>
+                  <a:srgbClr val="333333"/>
+                </a:solidFill>
+              </a:rPr>
+              <a:t>registrationScreen</a:t>
+            </a:r>
+            <a:r>
+              <a:rPr lang="fr-FR" b="1" dirty="0" err="1"/>
+              <a:t>.</a:t>
+            </a:r>
+            <a:r>
+              <a:rPr lang="fr-FR" dirty="0" err="1">
+                <a:solidFill>
+                  <a:srgbClr val="008080"/>
+                </a:solidFill>
+              </a:rPr>
+              <a:t>getMailSettings</a:t>
+            </a:r>
+            <a:r>
+              <a:rPr lang="fr-FR" b="1" dirty="0"/>
+              <a:t>().</a:t>
+            </a:r>
+            <a:r>
+              <a:rPr lang="fr-FR" dirty="0" err="1">
+                <a:solidFill>
+                  <a:srgbClr val="008080"/>
+                </a:solidFill>
+              </a:rPr>
+              <a:t>assertDisplayed</a:t>
+            </a:r>
+            <a:r>
+              <a:rPr lang="fr-FR" b="1" dirty="0"/>
+              <a:t>;</a:t>
+            </a:r>
+            <a:endParaRPr lang="fr-FR" dirty="0"/>
+          </a:p>
+          <a:p>
+            <a:pPr marL="0" indent="0">
+              <a:buNone/>
+            </a:pPr>
+            <a:r>
+              <a:rPr lang="fr-FR" dirty="0"/>
+              <a:t>    </a:t>
+            </a:r>
+            <a:r>
+              <a:rPr lang="fr-FR" b="1" dirty="0"/>
+              <a:t>}</a:t>
+            </a:r>
+            <a:endParaRPr lang="fr-FR" dirty="0"/>
           </a:p>
         </p:txBody>
       </p:sp>
     </p:spTree>
     <p:extLst>
       <p:ext uri="{BB962C8B-B14F-4D97-AF65-F5344CB8AC3E}">
-        <p14:creationId xmlns:p14="http://schemas.microsoft.com/office/powerpoint/2010/main" val="40929930"/>
+        <p14:creationId xmlns:p14="http://schemas.microsoft.com/office/powerpoint/2010/main" val="3007787296"/>
       </p:ext>
     </p:extLst>
   </p:cSld>
@@ -17843,6 +18051,85 @@
 </file>
 
 <file path=ppt/slides/slide50.xml><?xml version="1.0" encoding="utf-8"?>
+<p:sld xmlns:a="http://schemas.openxmlformats.org/drawingml/2006/main" xmlns:r="http://schemas.openxmlformats.org/officeDocument/2006/relationships" xmlns:p="http://schemas.openxmlformats.org/presentationml/2006/main">
+  <p:cSld>
+    <p:spTree>
+      <p:nvGrpSpPr>
+        <p:cNvPr id="1" name=""/>
+        <p:cNvGrpSpPr/>
+        <p:nvPr/>
+      </p:nvGrpSpPr>
+      <p:grpSpPr>
+        <a:xfrm>
+          <a:off x="0" y="0"/>
+          <a:ext cx="0" cy="0"/>
+          <a:chOff x="0" y="0"/>
+          <a:chExt cx="0" cy="0"/>
+        </a:xfrm>
+      </p:grpSpPr>
+      <p:sp>
+        <p:nvSpPr>
+          <p:cNvPr id="2" name="Titre 1"/>
+          <p:cNvSpPr>
+            <a:spLocks noGrp="1"/>
+          </p:cNvSpPr>
+          <p:nvPr>
+            <p:ph type="title"/>
+          </p:nvPr>
+        </p:nvSpPr>
+        <p:spPr/>
+        <p:txBody>
+          <a:bodyPr/>
+          <a:lstStyle/>
+          <a:p>
+            <a:r>
+              <a:rPr lang="en-US" dirty="0" smtClean="0"/>
+              <a:t>Refactoring and Agile practice</a:t>
+            </a:r>
+            <a:endParaRPr lang="en-US" dirty="0"/>
+          </a:p>
+        </p:txBody>
+      </p:sp>
+      <p:sp>
+        <p:nvSpPr>
+          <p:cNvPr id="3" name="Espace réservé du contenu 2"/>
+          <p:cNvSpPr>
+            <a:spLocks noGrp="1"/>
+          </p:cNvSpPr>
+          <p:nvPr>
+            <p:ph idx="1"/>
+          </p:nvPr>
+        </p:nvSpPr>
+        <p:spPr/>
+        <p:txBody>
+          <a:bodyPr/>
+          <a:lstStyle/>
+          <a:p>
+            <a:endParaRPr lang="en-US"/>
+          </a:p>
+        </p:txBody>
+      </p:sp>
+    </p:spTree>
+    <p:extLst>
+      <p:ext uri="{BB962C8B-B14F-4D97-AF65-F5344CB8AC3E}">
+        <p14:creationId xmlns:p14="http://schemas.microsoft.com/office/powerpoint/2010/main" val="40929930"/>
+      </p:ext>
+    </p:extLst>
+  </p:cSld>
+  <p:clrMapOvr>
+    <a:masterClrMapping/>
+  </p:clrMapOvr>
+  <p:timing>
+    <p:tnLst>
+      <p:par>
+        <p:cTn id="1" dur="indefinite" restart="never" nodeType="tmRoot"/>
+      </p:par>
+    </p:tnLst>
+  </p:timing>
+</p:sld>
+</file>
+
+<file path=ppt/slides/slide51.xml><?xml version="1.0" encoding="utf-8"?>
 <p:sld xmlns:a="http://schemas.openxmlformats.org/drawingml/2006/main" xmlns:r="http://schemas.openxmlformats.org/officeDocument/2006/relationships" xmlns:p="http://schemas.openxmlformats.org/presentationml/2006/main">
   <p:cSld>
     <p:spTree>

</xml_diff>

<commit_message>
integrate feedbacks (testing slides)
</commit_message>
<xml_diff>
--- a/mdl4ui-docs/mdl4ui_cg2013.pptx
+++ b/mdl4ui-docs/mdl4ui_cg2013.pptx
@@ -246,7 +246,7 @@
             <a:fld id="{9F3D9D59-C69D-478D-98BA-46DD69AE3241}" type="datetimeFigureOut">
               <a:rPr lang="en-US" smtClean="0"/>
               <a:pPr/>
-              <a:t>4/3/2013</a:t>
+              <a:t>4/4/2013</a:t>
             </a:fld>
             <a:endParaRPr lang="en-US"/>
           </a:p>
@@ -322,7 +322,7 @@
     </p:spTree>
     <p:extLst>
       <p:ext uri="{BB962C8B-B14F-4D97-AF65-F5344CB8AC3E}">
-        <p14:creationId xmlns:p14="http://schemas.microsoft.com/office/powerpoint/2010/main" val="70803672"/>
+        <p14:creationId xmlns:p14="http://schemas.microsoft.com/office/powerpoint/2010/main" xmlns="" val="70803672"/>
       </p:ext>
     </p:extLst>
   </p:cSld>
@@ -412,7 +412,8 @@
           <a:p>
             <a:fld id="{724035F6-A10F-4A2D-A4E3-1D4F59E0F1A1}" type="datetimeFigureOut">
               <a:rPr lang="en-US" smtClean="0"/>
-              <a:t>4/3/2013</a:t>
+              <a:pPr/>
+              <a:t>4/4/2013</a:t>
             </a:fld>
             <a:endParaRPr lang="en-US"/>
           </a:p>
@@ -571,6 +572,7 @@
           <a:p>
             <a:fld id="{1C995A55-B5EF-47FB-BCEC-1018828F2E10}" type="slidenum">
               <a:rPr lang="en-US" smtClean="0"/>
+              <a:pPr/>
               <a:t>‹N°›</a:t>
             </a:fld>
             <a:endParaRPr lang="en-US"/>
@@ -580,7 +582,7 @@
     </p:spTree>
     <p:extLst>
       <p:ext uri="{BB962C8B-B14F-4D97-AF65-F5344CB8AC3E}">
-        <p14:creationId xmlns:p14="http://schemas.microsoft.com/office/powerpoint/2010/main" val="1701488114"/>
+        <p14:creationId xmlns:p14="http://schemas.microsoft.com/office/powerpoint/2010/main" xmlns="" val="1701488114"/>
       </p:ext>
     </p:extLst>
   </p:cSld>
@@ -745,6 +747,7 @@
           <a:p>
             <a:fld id="{1C995A55-B5EF-47FB-BCEC-1018828F2E10}" type="slidenum">
               <a:rPr lang="en-US" smtClean="0"/>
+              <a:pPr/>
               <a:t>34</a:t>
             </a:fld>
             <a:endParaRPr lang="en-US"/>
@@ -754,7 +757,7 @@
     </p:spTree>
     <p:extLst>
       <p:ext uri="{BB962C8B-B14F-4D97-AF65-F5344CB8AC3E}">
-        <p14:creationId xmlns:p14="http://schemas.microsoft.com/office/powerpoint/2010/main" val="3047004223"/>
+        <p14:creationId xmlns:p14="http://schemas.microsoft.com/office/powerpoint/2010/main" xmlns="" val="3047004223"/>
       </p:ext>
     </p:extLst>
   </p:cSld>
@@ -829,6 +832,7 @@
           <a:p>
             <a:fld id="{1C995A55-B5EF-47FB-BCEC-1018828F2E10}" type="slidenum">
               <a:rPr lang="en-US" smtClean="0"/>
+              <a:pPr/>
               <a:t>38</a:t>
             </a:fld>
             <a:endParaRPr lang="en-US"/>
@@ -838,7 +842,7 @@
     </p:spTree>
     <p:extLst>
       <p:ext uri="{BB962C8B-B14F-4D97-AF65-F5344CB8AC3E}">
-        <p14:creationId xmlns:p14="http://schemas.microsoft.com/office/powerpoint/2010/main" val="3280979232"/>
+        <p14:creationId xmlns:p14="http://schemas.microsoft.com/office/powerpoint/2010/main" xmlns="" val="3280979232"/>
       </p:ext>
     </p:extLst>
   </p:cSld>
@@ -913,6 +917,7 @@
           <a:p>
             <a:fld id="{1C995A55-B5EF-47FB-BCEC-1018828F2E10}" type="slidenum">
               <a:rPr lang="en-US" smtClean="0"/>
+              <a:pPr/>
               <a:t>41</a:t>
             </a:fld>
             <a:endParaRPr lang="en-US"/>
@@ -922,7 +927,7 @@
     </p:spTree>
     <p:extLst>
       <p:ext uri="{BB962C8B-B14F-4D97-AF65-F5344CB8AC3E}">
-        <p14:creationId xmlns:p14="http://schemas.microsoft.com/office/powerpoint/2010/main" val="1987381696"/>
+        <p14:creationId xmlns:p14="http://schemas.microsoft.com/office/powerpoint/2010/main" xmlns="" val="1987381696"/>
       </p:ext>
     </p:extLst>
   </p:cSld>
@@ -1114,7 +1119,7 @@
             <a:fld id="{1B5268FF-0D67-4269-9FD2-93B489DF800A}" type="datetimeFigureOut">
               <a:rPr lang="fr-FR" smtClean="0"/>
               <a:pPr/>
-              <a:t>03/04/2013</a:t>
+              <a:t>04/04/2013</a:t>
             </a:fld>
             <a:endParaRPr lang="fr-FR"/>
           </a:p>
@@ -1166,7 +1171,7 @@
     </p:spTree>
     <p:extLst>
       <p:ext uri="{BB962C8B-B14F-4D97-AF65-F5344CB8AC3E}">
-        <p14:creationId xmlns:p14="http://schemas.microsoft.com/office/powerpoint/2010/main" val="322609761"/>
+        <p14:creationId xmlns:p14="http://schemas.microsoft.com/office/powerpoint/2010/main" xmlns="" val="322609761"/>
       </p:ext>
     </p:extLst>
   </p:cSld>
@@ -1286,7 +1291,7 @@
             <a:fld id="{1B5268FF-0D67-4269-9FD2-93B489DF800A}" type="datetimeFigureOut">
               <a:rPr lang="fr-FR" smtClean="0"/>
               <a:pPr/>
-              <a:t>03/04/2013</a:t>
+              <a:t>04/04/2013</a:t>
             </a:fld>
             <a:endParaRPr lang="fr-FR"/>
           </a:p>
@@ -1338,7 +1343,7 @@
     </p:spTree>
     <p:extLst>
       <p:ext uri="{BB962C8B-B14F-4D97-AF65-F5344CB8AC3E}">
-        <p14:creationId xmlns:p14="http://schemas.microsoft.com/office/powerpoint/2010/main" val="1248456722"/>
+        <p14:creationId xmlns:p14="http://schemas.microsoft.com/office/powerpoint/2010/main" xmlns="" val="1248456722"/>
       </p:ext>
     </p:extLst>
   </p:cSld>
@@ -1468,7 +1473,7 @@
             <a:fld id="{1B5268FF-0D67-4269-9FD2-93B489DF800A}" type="datetimeFigureOut">
               <a:rPr lang="fr-FR" smtClean="0"/>
               <a:pPr/>
-              <a:t>03/04/2013</a:t>
+              <a:t>04/04/2013</a:t>
             </a:fld>
             <a:endParaRPr lang="fr-FR"/>
           </a:p>
@@ -1520,7 +1525,7 @@
     </p:spTree>
     <p:extLst>
       <p:ext uri="{BB962C8B-B14F-4D97-AF65-F5344CB8AC3E}">
-        <p14:creationId xmlns:p14="http://schemas.microsoft.com/office/powerpoint/2010/main" val="4236232986"/>
+        <p14:creationId xmlns:p14="http://schemas.microsoft.com/office/powerpoint/2010/main" xmlns="" val="4236232986"/>
       </p:ext>
     </p:extLst>
   </p:cSld>
@@ -1640,7 +1645,7 @@
             <a:fld id="{1B5268FF-0D67-4269-9FD2-93B489DF800A}" type="datetimeFigureOut">
               <a:rPr lang="fr-FR" smtClean="0"/>
               <a:pPr/>
-              <a:t>03/04/2013</a:t>
+              <a:t>04/04/2013</a:t>
             </a:fld>
             <a:endParaRPr lang="fr-FR"/>
           </a:p>
@@ -1692,7 +1697,7 @@
     </p:spTree>
     <p:extLst>
       <p:ext uri="{BB962C8B-B14F-4D97-AF65-F5344CB8AC3E}">
-        <p14:creationId xmlns:p14="http://schemas.microsoft.com/office/powerpoint/2010/main" val="3454835055"/>
+        <p14:creationId xmlns:p14="http://schemas.microsoft.com/office/powerpoint/2010/main" xmlns="" val="3454835055"/>
       </p:ext>
     </p:extLst>
   </p:cSld>
@@ -1895,7 +1900,7 @@
             <a:fld id="{1B5268FF-0D67-4269-9FD2-93B489DF800A}" type="datetimeFigureOut">
               <a:rPr lang="fr-FR" smtClean="0"/>
               <a:pPr/>
-              <a:t>03/04/2013</a:t>
+              <a:t>04/04/2013</a:t>
             </a:fld>
             <a:endParaRPr lang="fr-FR"/>
           </a:p>
@@ -1947,7 +1952,7 @@
     </p:spTree>
     <p:extLst>
       <p:ext uri="{BB962C8B-B14F-4D97-AF65-F5344CB8AC3E}">
-        <p14:creationId xmlns:p14="http://schemas.microsoft.com/office/powerpoint/2010/main" val="804127244"/>
+        <p14:creationId xmlns:p14="http://schemas.microsoft.com/office/powerpoint/2010/main" xmlns="" val="804127244"/>
       </p:ext>
     </p:extLst>
   </p:cSld>
@@ -2185,7 +2190,7 @@
             <a:fld id="{1B5268FF-0D67-4269-9FD2-93B489DF800A}" type="datetimeFigureOut">
               <a:rPr lang="fr-FR" smtClean="0"/>
               <a:pPr/>
-              <a:t>03/04/2013</a:t>
+              <a:t>04/04/2013</a:t>
             </a:fld>
             <a:endParaRPr lang="fr-FR"/>
           </a:p>
@@ -2237,7 +2242,7 @@
     </p:spTree>
     <p:extLst>
       <p:ext uri="{BB962C8B-B14F-4D97-AF65-F5344CB8AC3E}">
-        <p14:creationId xmlns:p14="http://schemas.microsoft.com/office/powerpoint/2010/main" val="586698658"/>
+        <p14:creationId xmlns:p14="http://schemas.microsoft.com/office/powerpoint/2010/main" xmlns="" val="586698658"/>
       </p:ext>
     </p:extLst>
   </p:cSld>
@@ -2609,7 +2614,7 @@
             <a:fld id="{1B5268FF-0D67-4269-9FD2-93B489DF800A}" type="datetimeFigureOut">
               <a:rPr lang="fr-FR" smtClean="0"/>
               <a:pPr/>
-              <a:t>03/04/2013</a:t>
+              <a:t>04/04/2013</a:t>
             </a:fld>
             <a:endParaRPr lang="fr-FR"/>
           </a:p>
@@ -2661,7 +2666,7 @@
     </p:spTree>
     <p:extLst>
       <p:ext uri="{BB962C8B-B14F-4D97-AF65-F5344CB8AC3E}">
-        <p14:creationId xmlns:p14="http://schemas.microsoft.com/office/powerpoint/2010/main" val="19144436"/>
+        <p14:creationId xmlns:p14="http://schemas.microsoft.com/office/powerpoint/2010/main" xmlns="" val="19144436"/>
       </p:ext>
     </p:extLst>
   </p:cSld>
@@ -2729,7 +2734,7 @@
             <a:fld id="{1B5268FF-0D67-4269-9FD2-93B489DF800A}" type="datetimeFigureOut">
               <a:rPr lang="fr-FR" smtClean="0"/>
               <a:pPr/>
-              <a:t>03/04/2013</a:t>
+              <a:t>04/04/2013</a:t>
             </a:fld>
             <a:endParaRPr lang="fr-FR"/>
           </a:p>
@@ -2781,7 +2786,7 @@
     </p:spTree>
     <p:extLst>
       <p:ext uri="{BB962C8B-B14F-4D97-AF65-F5344CB8AC3E}">
-        <p14:creationId xmlns:p14="http://schemas.microsoft.com/office/powerpoint/2010/main" val="202749597"/>
+        <p14:creationId xmlns:p14="http://schemas.microsoft.com/office/powerpoint/2010/main" xmlns="" val="202749597"/>
       </p:ext>
     </p:extLst>
   </p:cSld>
@@ -2826,7 +2831,7 @@
             <a:fld id="{1B5268FF-0D67-4269-9FD2-93B489DF800A}" type="datetimeFigureOut">
               <a:rPr lang="fr-FR" smtClean="0"/>
               <a:pPr/>
-              <a:t>03/04/2013</a:t>
+              <a:t>04/04/2013</a:t>
             </a:fld>
             <a:endParaRPr lang="fr-FR"/>
           </a:p>
@@ -2878,7 +2883,7 @@
     </p:spTree>
     <p:extLst>
       <p:ext uri="{BB962C8B-B14F-4D97-AF65-F5344CB8AC3E}">
-        <p14:creationId xmlns:p14="http://schemas.microsoft.com/office/powerpoint/2010/main" val="2898363528"/>
+        <p14:creationId xmlns:p14="http://schemas.microsoft.com/office/powerpoint/2010/main" xmlns="" val="2898363528"/>
       </p:ext>
     </p:extLst>
   </p:cSld>
@@ -3105,7 +3110,7 @@
             <a:fld id="{1B5268FF-0D67-4269-9FD2-93B489DF800A}" type="datetimeFigureOut">
               <a:rPr lang="fr-FR" smtClean="0"/>
               <a:pPr/>
-              <a:t>03/04/2013</a:t>
+              <a:t>04/04/2013</a:t>
             </a:fld>
             <a:endParaRPr lang="fr-FR"/>
           </a:p>
@@ -3157,7 +3162,7 @@
     </p:spTree>
     <p:extLst>
       <p:ext uri="{BB962C8B-B14F-4D97-AF65-F5344CB8AC3E}">
-        <p14:creationId xmlns:p14="http://schemas.microsoft.com/office/powerpoint/2010/main" val="4010598191"/>
+        <p14:creationId xmlns:p14="http://schemas.microsoft.com/office/powerpoint/2010/main" xmlns="" val="4010598191"/>
       </p:ext>
     </p:extLst>
   </p:cSld>
@@ -3360,7 +3365,7 @@
             <a:fld id="{1B5268FF-0D67-4269-9FD2-93B489DF800A}" type="datetimeFigureOut">
               <a:rPr lang="fr-FR" smtClean="0"/>
               <a:pPr/>
-              <a:t>03/04/2013</a:t>
+              <a:t>04/04/2013</a:t>
             </a:fld>
             <a:endParaRPr lang="fr-FR"/>
           </a:p>
@@ -3412,7 +3417,7 @@
     </p:spTree>
     <p:extLst>
       <p:ext uri="{BB962C8B-B14F-4D97-AF65-F5344CB8AC3E}">
-        <p14:creationId xmlns:p14="http://schemas.microsoft.com/office/powerpoint/2010/main" val="1433498939"/>
+        <p14:creationId xmlns:p14="http://schemas.microsoft.com/office/powerpoint/2010/main" xmlns="" val="1433498939"/>
       </p:ext>
     </p:extLst>
   </p:cSld>
@@ -3575,7 +3580,7 @@
             <a:fld id="{1B5268FF-0D67-4269-9FD2-93B489DF800A}" type="datetimeFigureOut">
               <a:rPr lang="fr-FR" smtClean="0"/>
               <a:pPr/>
-              <a:t>03/04/2013</a:t>
+              <a:t>04/04/2013</a:t>
             </a:fld>
             <a:endParaRPr lang="fr-FR"/>
           </a:p>
@@ -3663,7 +3668,7 @@
     </p:spTree>
     <p:extLst>
       <p:ext uri="{BB962C8B-B14F-4D97-AF65-F5344CB8AC3E}">
-        <p14:creationId xmlns:p14="http://schemas.microsoft.com/office/powerpoint/2010/main" val="2684825788"/>
+        <p14:creationId xmlns:p14="http://schemas.microsoft.com/office/powerpoint/2010/main" xmlns="" val="2684825788"/>
       </p:ext>
     </p:extLst>
   </p:cSld>
@@ -4034,18 +4039,18 @@
     </p:spTree>
     <p:extLst>
       <p:ext uri="{BB962C8B-B14F-4D97-AF65-F5344CB8AC3E}">
-        <p14:creationId xmlns:p14="http://schemas.microsoft.com/office/powerpoint/2010/main" val="3955344790"/>
+        <p14:creationId xmlns:p14="http://schemas.microsoft.com/office/powerpoint/2010/main" xmlns="" val="3955344790"/>
       </p:ext>
     </p:extLst>
   </p:cSld>
   <p:clrMapOvr>
     <a:masterClrMapping/>
   </p:clrMapOvr>
-  <mc:AlternateContent xmlns:mc="http://schemas.openxmlformats.org/markup-compatibility/2006" xmlns:p14="http://schemas.microsoft.com/office/powerpoint/2010/main">
-    <mc:Choice Requires="p14">
+  <mc:AlternateContent xmlns:mc="http://schemas.openxmlformats.org/markup-compatibility/2006">
+    <mc:Choice xmlns:p14="http://schemas.microsoft.com/office/powerpoint/2010/main" xmlns="" Requires="p14">
       <p:transition spd="slow" p14:dur="2000"/>
     </mc:Choice>
-    <mc:Fallback xmlns="">
+    <mc:Fallback>
       <p:transition spd="slow"/>
     </mc:Fallback>
   </mc:AlternateContent>
@@ -4125,7 +4130,7 @@
     </p:spTree>
     <p:extLst>
       <p:ext uri="{BB962C8B-B14F-4D97-AF65-F5344CB8AC3E}">
-        <p14:creationId xmlns:p14="http://schemas.microsoft.com/office/powerpoint/2010/main" val="3139881919"/>
+        <p14:creationId xmlns:p14="http://schemas.microsoft.com/office/powerpoint/2010/main" xmlns="" val="3139881919"/>
       </p:ext>
     </p:extLst>
   </p:cSld>
@@ -4503,7 +4508,7 @@
     </p:spTree>
     <p:extLst>
       <p:ext uri="{BB962C8B-B14F-4D97-AF65-F5344CB8AC3E}">
-        <p14:creationId xmlns:p14="http://schemas.microsoft.com/office/powerpoint/2010/main" val="1728169033"/>
+        <p14:creationId xmlns:p14="http://schemas.microsoft.com/office/powerpoint/2010/main" xmlns="" val="1728169033"/>
       </p:ext>
     </p:extLst>
   </p:cSld>
@@ -4549,7 +4554,7 @@
           <a:blip r:embed="rId2" cstate="print">
             <a:extLst>
               <a:ext uri="{28A0092B-C50C-407E-A947-70E740481C1C}">
-                <a14:useLocalDpi xmlns:a14="http://schemas.microsoft.com/office/drawing/2010/main" val="0"/>
+                <a14:useLocalDpi xmlns:a14="http://schemas.microsoft.com/office/drawing/2010/main" xmlns="" val="0"/>
               </a:ext>
             </a:extLst>
           </a:blip>
@@ -4579,7 +4584,7 @@
           <a:blip r:embed="rId3" cstate="print">
             <a:extLst>
               <a:ext uri="{28A0092B-C50C-407E-A947-70E740481C1C}">
-                <a14:useLocalDpi xmlns:a14="http://schemas.microsoft.com/office/drawing/2010/main" val="0"/>
+                <a14:useLocalDpi xmlns:a14="http://schemas.microsoft.com/office/drawing/2010/main" xmlns="" val="0"/>
               </a:ext>
             </a:extLst>
           </a:blip>
@@ -4896,7 +4901,7 @@
     </p:spTree>
     <p:extLst>
       <p:ext uri="{BB962C8B-B14F-4D97-AF65-F5344CB8AC3E}">
-        <p14:creationId xmlns:p14="http://schemas.microsoft.com/office/powerpoint/2010/main" val="2819423520"/>
+        <p14:creationId xmlns:p14="http://schemas.microsoft.com/office/powerpoint/2010/main" xmlns="" val="2819423520"/>
       </p:ext>
     </p:extLst>
   </p:cSld>
@@ -5492,7 +5497,7 @@
     </p:spTree>
     <p:extLst>
       <p:ext uri="{BB962C8B-B14F-4D97-AF65-F5344CB8AC3E}">
-        <p14:creationId xmlns:p14="http://schemas.microsoft.com/office/powerpoint/2010/main" val="3627640579"/>
+        <p14:creationId xmlns:p14="http://schemas.microsoft.com/office/powerpoint/2010/main" xmlns="" val="3627640579"/>
       </p:ext>
     </p:extLst>
   </p:cSld>
@@ -5658,7 +5663,7 @@
           <a:blip r:embed="rId2" cstate="print">
             <a:extLst>
               <a:ext uri="{28A0092B-C50C-407E-A947-70E740481C1C}">
-                <a14:useLocalDpi xmlns:a14="http://schemas.microsoft.com/office/drawing/2010/main" val="0"/>
+                <a14:useLocalDpi xmlns:a14="http://schemas.microsoft.com/office/drawing/2010/main" xmlns="" val="0"/>
               </a:ext>
             </a:extLst>
           </a:blip>
@@ -5734,7 +5739,7 @@
     </p:spTree>
     <p:extLst>
       <p:ext uri="{BB962C8B-B14F-4D97-AF65-F5344CB8AC3E}">
-        <p14:creationId xmlns:p14="http://schemas.microsoft.com/office/powerpoint/2010/main" val="171061288"/>
+        <p14:creationId xmlns:p14="http://schemas.microsoft.com/office/powerpoint/2010/main" xmlns="" val="171061288"/>
       </p:ext>
     </p:extLst>
   </p:cSld>
@@ -5780,7 +5785,7 @@
           <a:blip r:embed="rId2" cstate="print">
             <a:extLst>
               <a:ext uri="{28A0092B-C50C-407E-A947-70E740481C1C}">
-                <a14:useLocalDpi xmlns:a14="http://schemas.microsoft.com/office/drawing/2010/main" val="0"/>
+                <a14:useLocalDpi xmlns:a14="http://schemas.microsoft.com/office/drawing/2010/main" xmlns="" val="0"/>
               </a:ext>
             </a:extLst>
           </a:blip>
@@ -6015,7 +6020,7 @@
     </p:spTree>
     <p:extLst>
       <p:ext uri="{BB962C8B-B14F-4D97-AF65-F5344CB8AC3E}">
-        <p14:creationId xmlns:p14="http://schemas.microsoft.com/office/powerpoint/2010/main" val="394514968"/>
+        <p14:creationId xmlns:p14="http://schemas.microsoft.com/office/powerpoint/2010/main" xmlns="" val="394514968"/>
       </p:ext>
     </p:extLst>
   </p:cSld>
@@ -6149,7 +6154,7 @@
           <a:blip r:embed="rId2" cstate="print">
             <a:extLst>
               <a:ext uri="{28A0092B-C50C-407E-A947-70E740481C1C}">
-                <a14:useLocalDpi xmlns:a14="http://schemas.microsoft.com/office/drawing/2010/main" val="0"/>
+                <a14:useLocalDpi xmlns:a14="http://schemas.microsoft.com/office/drawing/2010/main" xmlns="" val="0"/>
               </a:ext>
             </a:extLst>
           </a:blip>
@@ -6230,7 +6235,7 @@
     </p:spTree>
     <p:extLst>
       <p:ext uri="{BB962C8B-B14F-4D97-AF65-F5344CB8AC3E}">
-        <p14:creationId xmlns:p14="http://schemas.microsoft.com/office/powerpoint/2010/main" val="3593113261"/>
+        <p14:creationId xmlns:p14="http://schemas.microsoft.com/office/powerpoint/2010/main" xmlns="" val="3593113261"/>
       </p:ext>
     </p:extLst>
   </p:cSld>
@@ -6388,7 +6393,7 @@
           <a:blip r:embed="rId2" cstate="print">
             <a:extLst>
               <a:ext uri="{28A0092B-C50C-407E-A947-70E740481C1C}">
-                <a14:useLocalDpi xmlns:a14="http://schemas.microsoft.com/office/drawing/2010/main" val="0"/>
+                <a14:useLocalDpi xmlns:a14="http://schemas.microsoft.com/office/drawing/2010/main" xmlns="" val="0"/>
               </a:ext>
             </a:extLst>
           </a:blip>
@@ -6464,7 +6469,7 @@
     </p:spTree>
     <p:extLst>
       <p:ext uri="{BB962C8B-B14F-4D97-AF65-F5344CB8AC3E}">
-        <p14:creationId xmlns:p14="http://schemas.microsoft.com/office/powerpoint/2010/main" val="451913240"/>
+        <p14:creationId xmlns:p14="http://schemas.microsoft.com/office/powerpoint/2010/main" xmlns="" val="451913240"/>
       </p:ext>
     </p:extLst>
   </p:cSld>
@@ -6533,7 +6538,7 @@
           <a:blip r:embed="rId2" cstate="print">
             <a:extLst>
               <a:ext uri="{28A0092B-C50C-407E-A947-70E740481C1C}">
-                <a14:useLocalDpi xmlns:a14="http://schemas.microsoft.com/office/drawing/2010/main" val="0"/>
+                <a14:useLocalDpi xmlns:a14="http://schemas.microsoft.com/office/drawing/2010/main" xmlns="" val="0"/>
               </a:ext>
             </a:extLst>
           </a:blip>
@@ -6554,7 +6559,7 @@
     </p:spTree>
     <p:extLst>
       <p:ext uri="{BB962C8B-B14F-4D97-AF65-F5344CB8AC3E}">
-        <p14:creationId xmlns:p14="http://schemas.microsoft.com/office/powerpoint/2010/main" val="2009636028"/>
+        <p14:creationId xmlns:p14="http://schemas.microsoft.com/office/powerpoint/2010/main" xmlns="" val="2009636028"/>
       </p:ext>
     </p:extLst>
   </p:cSld>
@@ -6623,7 +6628,7 @@
           <a:blip r:embed="rId2" cstate="print">
             <a:extLst>
               <a:ext uri="{28A0092B-C50C-407E-A947-70E740481C1C}">
-                <a14:useLocalDpi xmlns:a14="http://schemas.microsoft.com/office/drawing/2010/main" val="0"/>
+                <a14:useLocalDpi xmlns:a14="http://schemas.microsoft.com/office/drawing/2010/main" xmlns="" val="0"/>
               </a:ext>
             </a:extLst>
           </a:blip>
@@ -6644,7 +6649,7 @@
     </p:spTree>
     <p:extLst>
       <p:ext uri="{BB962C8B-B14F-4D97-AF65-F5344CB8AC3E}">
-        <p14:creationId xmlns:p14="http://schemas.microsoft.com/office/powerpoint/2010/main" val="1131833659"/>
+        <p14:creationId xmlns:p14="http://schemas.microsoft.com/office/powerpoint/2010/main" xmlns="" val="1131833659"/>
       </p:ext>
     </p:extLst>
   </p:cSld>
@@ -6914,7 +6919,7 @@
           <a:blip r:embed="rId2" cstate="print">
             <a:extLst>
               <a:ext uri="{28A0092B-C50C-407E-A947-70E740481C1C}">
-                <a14:useLocalDpi xmlns:a14="http://schemas.microsoft.com/office/drawing/2010/main"/>
+                <a14:useLocalDpi xmlns:a14="http://schemas.microsoft.com/office/drawing/2010/main" xmlns=""/>
               </a:ext>
             </a:extLst>
           </a:blip>
@@ -6939,7 +6944,7 @@
     </p:spTree>
     <p:extLst>
       <p:ext uri="{BB962C8B-B14F-4D97-AF65-F5344CB8AC3E}">
-        <p14:creationId xmlns:p14="http://schemas.microsoft.com/office/powerpoint/2010/main" val="1630604182"/>
+        <p14:creationId xmlns:p14="http://schemas.microsoft.com/office/powerpoint/2010/main" xmlns="" val="1630604182"/>
       </p:ext>
     </p:extLst>
   </p:cSld>
@@ -7008,7 +7013,7 @@
           <a:blip r:embed="rId2" cstate="print">
             <a:extLst>
               <a:ext uri="{28A0092B-C50C-407E-A947-70E740481C1C}">
-                <a14:useLocalDpi xmlns:a14="http://schemas.microsoft.com/office/drawing/2010/main" val="0"/>
+                <a14:useLocalDpi xmlns:a14="http://schemas.microsoft.com/office/drawing/2010/main" xmlns="" val="0"/>
               </a:ext>
             </a:extLst>
           </a:blip>
@@ -7029,7 +7034,7 @@
     </p:spTree>
     <p:extLst>
       <p:ext uri="{BB962C8B-B14F-4D97-AF65-F5344CB8AC3E}">
-        <p14:creationId xmlns:p14="http://schemas.microsoft.com/office/powerpoint/2010/main" val="1848404178"/>
+        <p14:creationId xmlns:p14="http://schemas.microsoft.com/office/powerpoint/2010/main" xmlns="" val="1848404178"/>
       </p:ext>
     </p:extLst>
   </p:cSld>
@@ -7190,7 +7195,7 @@
     </p:spTree>
     <p:extLst>
       <p:ext uri="{BB962C8B-B14F-4D97-AF65-F5344CB8AC3E}">
-        <p14:creationId xmlns:p14="http://schemas.microsoft.com/office/powerpoint/2010/main" val="1155854373"/>
+        <p14:creationId xmlns:p14="http://schemas.microsoft.com/office/powerpoint/2010/main" xmlns="" val="1155854373"/>
       </p:ext>
     </p:extLst>
   </p:cSld>
@@ -7375,7 +7380,7 @@
     </p:spTree>
     <p:extLst>
       <p:ext uri="{BB962C8B-B14F-4D97-AF65-F5344CB8AC3E}">
-        <p14:creationId xmlns:p14="http://schemas.microsoft.com/office/powerpoint/2010/main" val="1027356186"/>
+        <p14:creationId xmlns:p14="http://schemas.microsoft.com/office/powerpoint/2010/main" xmlns="" val="1027356186"/>
       </p:ext>
     </p:extLst>
   </p:cSld>
@@ -7441,10 +7446,10 @@
           <p:nvPr/>
         </p:nvPicPr>
         <p:blipFill>
-          <a:blip r:embed="rId2">
+          <a:blip r:embed="rId2" cstate="print">
             <a:extLst>
               <a:ext uri="{28A0092B-C50C-407E-A947-70E740481C1C}">
-                <a14:useLocalDpi xmlns:a14="http://schemas.microsoft.com/office/drawing/2010/main" val="0"/>
+                <a14:useLocalDpi xmlns:a14="http://schemas.microsoft.com/office/drawing/2010/main" xmlns="" val="0"/>
               </a:ext>
             </a:extLst>
           </a:blip>
@@ -7471,10 +7476,10 @@
           <p:nvPr/>
         </p:nvPicPr>
         <p:blipFill>
-          <a:blip r:embed="rId3">
+          <a:blip r:embed="rId3" cstate="print">
             <a:extLst>
               <a:ext uri="{28A0092B-C50C-407E-A947-70E740481C1C}">
-                <a14:useLocalDpi xmlns:a14="http://schemas.microsoft.com/office/drawing/2010/main" val="0"/>
+                <a14:useLocalDpi xmlns:a14="http://schemas.microsoft.com/office/drawing/2010/main" xmlns="" val="0"/>
               </a:ext>
             </a:extLst>
           </a:blip>
@@ -7498,7 +7503,7 @@
     </p:spTree>
     <p:extLst>
       <p:ext uri="{BB962C8B-B14F-4D97-AF65-F5344CB8AC3E}">
-        <p14:creationId xmlns:p14="http://schemas.microsoft.com/office/powerpoint/2010/main" val="2369171751"/>
+        <p14:creationId xmlns:p14="http://schemas.microsoft.com/office/powerpoint/2010/main" xmlns="" val="2369171751"/>
       </p:ext>
     </p:extLst>
   </p:cSld>
@@ -7564,10 +7569,10 @@
           <p:nvPr/>
         </p:nvPicPr>
         <p:blipFill>
-          <a:blip r:embed="rId2">
+          <a:blip r:embed="rId2" cstate="print">
             <a:extLst>
               <a:ext uri="{28A0092B-C50C-407E-A947-70E740481C1C}">
-                <a14:useLocalDpi xmlns:a14="http://schemas.microsoft.com/office/drawing/2010/main" val="0"/>
+                <a14:useLocalDpi xmlns:a14="http://schemas.microsoft.com/office/drawing/2010/main" xmlns="" val="0"/>
               </a:ext>
             </a:extLst>
           </a:blip>
@@ -7594,10 +7599,10 @@
           <p:nvPr/>
         </p:nvPicPr>
         <p:blipFill>
-          <a:blip r:embed="rId3">
+          <a:blip r:embed="rId3" cstate="print">
             <a:extLst>
               <a:ext uri="{28A0092B-C50C-407E-A947-70E740481C1C}">
-                <a14:useLocalDpi xmlns:a14="http://schemas.microsoft.com/office/drawing/2010/main" val="0"/>
+                <a14:useLocalDpi xmlns:a14="http://schemas.microsoft.com/office/drawing/2010/main" xmlns="" val="0"/>
               </a:ext>
             </a:extLst>
           </a:blip>
@@ -7624,10 +7629,10 @@
           <p:nvPr/>
         </p:nvPicPr>
         <p:blipFill>
-          <a:blip r:embed="rId4">
+          <a:blip r:embed="rId4" cstate="print">
             <a:extLst>
               <a:ext uri="{28A0092B-C50C-407E-A947-70E740481C1C}">
-                <a14:useLocalDpi xmlns:a14="http://schemas.microsoft.com/office/drawing/2010/main" val="0"/>
+                <a14:useLocalDpi xmlns:a14="http://schemas.microsoft.com/office/drawing/2010/main" xmlns="" val="0"/>
               </a:ext>
             </a:extLst>
           </a:blip>
@@ -7743,7 +7748,7 @@
     </p:spTree>
     <p:extLst>
       <p:ext uri="{BB962C8B-B14F-4D97-AF65-F5344CB8AC3E}">
-        <p14:creationId xmlns:p14="http://schemas.microsoft.com/office/powerpoint/2010/main" val="3216378839"/>
+        <p14:creationId xmlns:p14="http://schemas.microsoft.com/office/powerpoint/2010/main" xmlns="" val="3216378839"/>
       </p:ext>
     </p:extLst>
   </p:cSld>
@@ -7812,7 +7817,7 @@
           <a:blip r:embed="rId2" cstate="print">
             <a:extLst>
               <a:ext uri="{28A0092B-C50C-407E-A947-70E740481C1C}">
-                <a14:useLocalDpi xmlns:a14="http://schemas.microsoft.com/office/drawing/2010/main" val="0"/>
+                <a14:useLocalDpi xmlns:a14="http://schemas.microsoft.com/office/drawing/2010/main" xmlns="" val="0"/>
               </a:ext>
             </a:extLst>
           </a:blip>
@@ -7921,7 +7926,7 @@
     </p:spTree>
     <p:extLst>
       <p:ext uri="{BB962C8B-B14F-4D97-AF65-F5344CB8AC3E}">
-        <p14:creationId xmlns:p14="http://schemas.microsoft.com/office/powerpoint/2010/main" val="2527117896"/>
+        <p14:creationId xmlns:p14="http://schemas.microsoft.com/office/powerpoint/2010/main" xmlns="" val="2527117896"/>
       </p:ext>
     </p:extLst>
   </p:cSld>
@@ -8110,7 +8115,7 @@
     </p:spTree>
     <p:extLst>
       <p:ext uri="{BB962C8B-B14F-4D97-AF65-F5344CB8AC3E}">
-        <p14:creationId xmlns:p14="http://schemas.microsoft.com/office/powerpoint/2010/main" val="3098398089"/>
+        <p14:creationId xmlns:p14="http://schemas.microsoft.com/office/powerpoint/2010/main" xmlns="" val="3098398089"/>
       </p:ext>
     </p:extLst>
   </p:cSld>
@@ -8402,7 +8407,7 @@
     </p:spTree>
     <p:extLst>
       <p:ext uri="{BB962C8B-B14F-4D97-AF65-F5344CB8AC3E}">
-        <p14:creationId xmlns:p14="http://schemas.microsoft.com/office/powerpoint/2010/main" val="3449390454"/>
+        <p14:creationId xmlns:p14="http://schemas.microsoft.com/office/powerpoint/2010/main" xmlns="" val="3449390454"/>
       </p:ext>
     </p:extLst>
   </p:cSld>
@@ -9100,7 +9105,7 @@
     </p:spTree>
     <p:extLst>
       <p:ext uri="{BB962C8B-B14F-4D97-AF65-F5344CB8AC3E}">
-        <p14:creationId xmlns:p14="http://schemas.microsoft.com/office/powerpoint/2010/main" val="4006469721"/>
+        <p14:creationId xmlns:p14="http://schemas.microsoft.com/office/powerpoint/2010/main" xmlns="" val="4006469721"/>
       </p:ext>
     </p:extLst>
   </p:cSld>
@@ -9492,7 +9497,7 @@
     </p:spTree>
     <p:extLst>
       <p:ext uri="{BB962C8B-B14F-4D97-AF65-F5344CB8AC3E}">
-        <p14:creationId xmlns:p14="http://schemas.microsoft.com/office/powerpoint/2010/main" val="1678422724"/>
+        <p14:creationId xmlns:p14="http://schemas.microsoft.com/office/powerpoint/2010/main" xmlns="" val="1678422724"/>
       </p:ext>
     </p:extLst>
   </p:cSld>
@@ -9633,7 +9638,7 @@
     </p:spTree>
     <p:extLst>
       <p:ext uri="{BB962C8B-B14F-4D97-AF65-F5344CB8AC3E}">
-        <p14:creationId xmlns:p14="http://schemas.microsoft.com/office/powerpoint/2010/main" val="3312784383"/>
+        <p14:creationId xmlns:p14="http://schemas.microsoft.com/office/powerpoint/2010/main" xmlns="" val="3312784383"/>
       </p:ext>
     </p:extLst>
   </p:cSld>
@@ -10422,7 +10427,7 @@
     </p:spTree>
     <p:extLst>
       <p:ext uri="{BB962C8B-B14F-4D97-AF65-F5344CB8AC3E}">
-        <p14:creationId xmlns:p14="http://schemas.microsoft.com/office/powerpoint/2010/main" val="2792941284"/>
+        <p14:creationId xmlns:p14="http://schemas.microsoft.com/office/powerpoint/2010/main" xmlns="" val="2792941284"/>
       </p:ext>
     </p:extLst>
   </p:cSld>
@@ -10468,7 +10473,7 @@
           <a:blip r:embed="rId2" cstate="print">
             <a:extLst>
               <a:ext uri="{28A0092B-C50C-407E-A947-70E740481C1C}">
-                <a14:useLocalDpi xmlns:a14="http://schemas.microsoft.com/office/drawing/2010/main" val="0"/>
+                <a14:useLocalDpi xmlns:a14="http://schemas.microsoft.com/office/drawing/2010/main" xmlns="" val="0"/>
               </a:ext>
             </a:extLst>
           </a:blip>
@@ -10525,7 +10530,7 @@
           <p:nvPr>
             <p:extLst>
               <p:ext uri="{D42A27DB-BD31-4B8C-83A1-F6EECF244321}">
-                <p14:modId xmlns:p14="http://schemas.microsoft.com/office/powerpoint/2010/main" val="3204736979"/>
+                <p14:modId xmlns:p14="http://schemas.microsoft.com/office/powerpoint/2010/main" xmlns="" val="3204736979"/>
               </p:ext>
             </p:extLst>
           </p:nvPr>
@@ -10859,7 +10864,7 @@
     </p:spTree>
     <p:extLst>
       <p:ext uri="{BB962C8B-B14F-4D97-AF65-F5344CB8AC3E}">
-        <p14:creationId xmlns:p14="http://schemas.microsoft.com/office/powerpoint/2010/main" val="3195513628"/>
+        <p14:creationId xmlns:p14="http://schemas.microsoft.com/office/powerpoint/2010/main" xmlns="" val="3195513628"/>
       </p:ext>
     </p:extLst>
   </p:cSld>
@@ -11050,7 +11055,7 @@
     </p:spTree>
     <p:extLst>
       <p:ext uri="{BB962C8B-B14F-4D97-AF65-F5344CB8AC3E}">
-        <p14:creationId xmlns:p14="http://schemas.microsoft.com/office/powerpoint/2010/main" val="3220083538"/>
+        <p14:creationId xmlns:p14="http://schemas.microsoft.com/office/powerpoint/2010/main" xmlns="" val="3220083538"/>
       </p:ext>
     </p:extLst>
   </p:cSld>
@@ -11262,7 +11267,7 @@
     </p:spTree>
     <p:extLst>
       <p:ext uri="{BB962C8B-B14F-4D97-AF65-F5344CB8AC3E}">
-        <p14:creationId xmlns:p14="http://schemas.microsoft.com/office/powerpoint/2010/main" val="856396653"/>
+        <p14:creationId xmlns:p14="http://schemas.microsoft.com/office/powerpoint/2010/main" xmlns="" val="856396653"/>
       </p:ext>
     </p:extLst>
   </p:cSld>
@@ -11766,7 +11771,7 @@
     </p:spTree>
     <p:extLst>
       <p:ext uri="{BB962C8B-B14F-4D97-AF65-F5344CB8AC3E}">
-        <p14:creationId xmlns:p14="http://schemas.microsoft.com/office/powerpoint/2010/main" val="1556099287"/>
+        <p14:creationId xmlns:p14="http://schemas.microsoft.com/office/powerpoint/2010/main" xmlns="" val="1556099287"/>
       </p:ext>
     </p:extLst>
   </p:cSld>
@@ -12037,7 +12042,7 @@
     </p:spTree>
     <p:extLst>
       <p:ext uri="{BB962C8B-B14F-4D97-AF65-F5344CB8AC3E}">
-        <p14:creationId xmlns:p14="http://schemas.microsoft.com/office/powerpoint/2010/main" val="3443329555"/>
+        <p14:creationId xmlns:p14="http://schemas.microsoft.com/office/powerpoint/2010/main" xmlns="" val="3443329555"/>
       </p:ext>
     </p:extLst>
   </p:cSld>
@@ -12394,7 +12399,7 @@
     </p:spTree>
     <p:extLst>
       <p:ext uri="{BB962C8B-B14F-4D97-AF65-F5344CB8AC3E}">
-        <p14:creationId xmlns:p14="http://schemas.microsoft.com/office/powerpoint/2010/main" val="2948210574"/>
+        <p14:creationId xmlns:p14="http://schemas.microsoft.com/office/powerpoint/2010/main" xmlns="" val="2948210574"/>
       </p:ext>
     </p:extLst>
   </p:cSld>
@@ -12462,7 +12467,7 @@
           <p:nvPr>
             <p:extLst>
               <p:ext uri="{D42A27DB-BD31-4B8C-83A1-F6EECF244321}">
-                <p14:modId xmlns:p14="http://schemas.microsoft.com/office/powerpoint/2010/main" val="2181104498"/>
+                <p14:modId xmlns:p14="http://schemas.microsoft.com/office/powerpoint/2010/main" xmlns="" val="2181104498"/>
               </p:ext>
             </p:extLst>
           </p:nvPr>
@@ -13248,7 +13253,7 @@
     </p:spTree>
     <p:extLst>
       <p:ext uri="{BB962C8B-B14F-4D97-AF65-F5344CB8AC3E}">
-        <p14:creationId xmlns:p14="http://schemas.microsoft.com/office/powerpoint/2010/main" val="2197364214"/>
+        <p14:creationId xmlns:p14="http://schemas.microsoft.com/office/powerpoint/2010/main" xmlns="" val="2197364214"/>
       </p:ext>
     </p:extLst>
   </p:cSld>
@@ -13706,7 +13711,7 @@
     </p:spTree>
     <p:extLst>
       <p:ext uri="{BB962C8B-B14F-4D97-AF65-F5344CB8AC3E}">
-        <p14:creationId xmlns:p14="http://schemas.microsoft.com/office/powerpoint/2010/main" val="977874982"/>
+        <p14:creationId xmlns:p14="http://schemas.microsoft.com/office/powerpoint/2010/main" xmlns="" val="977874982"/>
       </p:ext>
     </p:extLst>
   </p:cSld>
@@ -13773,7 +13778,12 @@
             <p:ph idx="1"/>
           </p:nvPr>
         </p:nvSpPr>
-        <p:spPr/>
+        <p:spPr>
+          <a:xfrm>
+            <a:off x="457200" y="1600200"/>
+            <a:ext cx="8382000" cy="4525963"/>
+          </a:xfrm>
+        </p:spPr>
         <p:txBody>
           <a:bodyPr>
             <a:normAutofit fontScale="85000" lnSpcReduction="10000"/>
@@ -13865,7 +13875,7 @@
     </p:spTree>
     <p:extLst>
       <p:ext uri="{BB962C8B-B14F-4D97-AF65-F5344CB8AC3E}">
-        <p14:creationId xmlns:p14="http://schemas.microsoft.com/office/powerpoint/2010/main" val="2092776985"/>
+        <p14:creationId xmlns:p14="http://schemas.microsoft.com/office/powerpoint/2010/main" xmlns="" val="2092776985"/>
       </p:ext>
     </p:extLst>
   </p:cSld>
@@ -14110,7 +14120,7 @@
     </p:spTree>
     <p:extLst>
       <p:ext uri="{BB962C8B-B14F-4D97-AF65-F5344CB8AC3E}">
-        <p14:creationId xmlns:p14="http://schemas.microsoft.com/office/powerpoint/2010/main" val="2834344091"/>
+        <p14:creationId xmlns:p14="http://schemas.microsoft.com/office/powerpoint/2010/main" xmlns="" val="2834344091"/>
       </p:ext>
     </p:extLst>
   </p:cSld>
@@ -14471,10 +14481,10 @@
           <p:nvPr/>
         </p:nvPicPr>
         <p:blipFill>
-          <a:blip r:embed="rId2">
+          <a:blip r:embed="rId2" cstate="print">
             <a:extLst>
               <a:ext uri="{28A0092B-C50C-407E-A947-70E740481C1C}">
-                <a14:useLocalDpi xmlns:a14="http://schemas.microsoft.com/office/drawing/2010/main" val="0"/>
+                <a14:useLocalDpi xmlns:a14="http://schemas.microsoft.com/office/drawing/2010/main" xmlns="" val="0"/>
               </a:ext>
             </a:extLst>
           </a:blip>
@@ -14605,7 +14615,7 @@
     </p:spTree>
     <p:extLst>
       <p:ext uri="{BB962C8B-B14F-4D97-AF65-F5344CB8AC3E}">
-        <p14:creationId xmlns:p14="http://schemas.microsoft.com/office/powerpoint/2010/main" val="318706902"/>
+        <p14:creationId xmlns:p14="http://schemas.microsoft.com/office/powerpoint/2010/main" xmlns="" val="318706902"/>
       </p:ext>
     </p:extLst>
   </p:cSld>
@@ -14688,7 +14698,7 @@
           <p:nvPr>
             <p:extLst>
               <p:ext uri="{D42A27DB-BD31-4B8C-83A1-F6EECF244321}">
-                <p14:modId xmlns:p14="http://schemas.microsoft.com/office/powerpoint/2010/main" val="3075550189"/>
+                <p14:modId xmlns:p14="http://schemas.microsoft.com/office/powerpoint/2010/main" xmlns="" val="3075550189"/>
               </p:ext>
             </p:extLst>
           </p:nvPr>
@@ -15039,7 +15049,7 @@
           <a:blip r:embed="rId3" cstate="print">
             <a:extLst>
               <a:ext uri="{28A0092B-C50C-407E-A947-70E740481C1C}">
-                <a14:useLocalDpi xmlns:a14="http://schemas.microsoft.com/office/drawing/2010/main" val="0"/>
+                <a14:useLocalDpi xmlns:a14="http://schemas.microsoft.com/office/drawing/2010/main" xmlns="" val="0"/>
               </a:ext>
             </a:extLst>
           </a:blip>
@@ -15069,7 +15079,7 @@
           <a:blip r:embed="rId4" cstate="print">
             <a:extLst>
               <a:ext uri="{28A0092B-C50C-407E-A947-70E740481C1C}">
-                <a14:useLocalDpi xmlns:a14="http://schemas.microsoft.com/office/drawing/2010/main" val="0"/>
+                <a14:useLocalDpi xmlns:a14="http://schemas.microsoft.com/office/drawing/2010/main" xmlns="" val="0"/>
               </a:ext>
             </a:extLst>
           </a:blip>
@@ -15099,7 +15109,7 @@
           <a:blip r:embed="rId5" cstate="print">
             <a:extLst>
               <a:ext uri="{28A0092B-C50C-407E-A947-70E740481C1C}">
-                <a14:useLocalDpi xmlns:a14="http://schemas.microsoft.com/office/drawing/2010/main" val="0"/>
+                <a14:useLocalDpi xmlns:a14="http://schemas.microsoft.com/office/drawing/2010/main" xmlns="" val="0"/>
               </a:ext>
             </a:extLst>
           </a:blip>
@@ -15129,7 +15139,7 @@
           <a:blip r:embed="rId6" cstate="print">
             <a:extLst>
               <a:ext uri="{28A0092B-C50C-407E-A947-70E740481C1C}">
-                <a14:useLocalDpi xmlns:a14="http://schemas.microsoft.com/office/drawing/2010/main" val="0"/>
+                <a14:useLocalDpi xmlns:a14="http://schemas.microsoft.com/office/drawing/2010/main" xmlns="" val="0"/>
               </a:ext>
             </a:extLst>
           </a:blip>
@@ -15159,7 +15169,7 @@
           <a:blip r:embed="rId7" cstate="print">
             <a:extLst>
               <a:ext uri="{28A0092B-C50C-407E-A947-70E740481C1C}">
-                <a14:useLocalDpi xmlns:a14="http://schemas.microsoft.com/office/drawing/2010/main" val="0"/>
+                <a14:useLocalDpi xmlns:a14="http://schemas.microsoft.com/office/drawing/2010/main" xmlns="" val="0"/>
               </a:ext>
             </a:extLst>
           </a:blip>
@@ -15189,7 +15199,7 @@
           <a:blip r:embed="rId8" cstate="print">
             <a:extLst>
               <a:ext uri="{28A0092B-C50C-407E-A947-70E740481C1C}">
-                <a14:useLocalDpi xmlns:a14="http://schemas.microsoft.com/office/drawing/2010/main" val="0"/>
+                <a14:useLocalDpi xmlns:a14="http://schemas.microsoft.com/office/drawing/2010/main" xmlns="" val="0"/>
               </a:ext>
             </a:extLst>
           </a:blip>
@@ -15210,7 +15220,7 @@
     </p:spTree>
     <p:extLst>
       <p:ext uri="{BB962C8B-B14F-4D97-AF65-F5344CB8AC3E}">
-        <p14:creationId xmlns:p14="http://schemas.microsoft.com/office/powerpoint/2010/main" val="949325302"/>
+        <p14:creationId xmlns:p14="http://schemas.microsoft.com/office/powerpoint/2010/main" xmlns="" val="949325302"/>
       </p:ext>
     </p:extLst>
   </p:cSld>
@@ -15289,7 +15299,7 @@
     </p:spTree>
     <p:extLst>
       <p:ext uri="{BB962C8B-B14F-4D97-AF65-F5344CB8AC3E}">
-        <p14:creationId xmlns:p14="http://schemas.microsoft.com/office/powerpoint/2010/main" val="2674396190"/>
+        <p14:creationId xmlns:p14="http://schemas.microsoft.com/office/powerpoint/2010/main" xmlns="" val="2674396190"/>
       </p:ext>
     </p:extLst>
   </p:cSld>
@@ -15368,7 +15378,7 @@
     </p:spTree>
     <p:extLst>
       <p:ext uri="{BB962C8B-B14F-4D97-AF65-F5344CB8AC3E}">
-        <p14:creationId xmlns:p14="http://schemas.microsoft.com/office/powerpoint/2010/main" val="2713826086"/>
+        <p14:creationId xmlns:p14="http://schemas.microsoft.com/office/powerpoint/2010/main" xmlns="" val="2713826086"/>
       </p:ext>
     </p:extLst>
   </p:cSld>
@@ -15437,7 +15447,9 @@
         </p:nvSpPr>
         <p:spPr/>
         <p:txBody>
-          <a:bodyPr/>
+          <a:bodyPr>
+            <a:normAutofit lnSpcReduction="10000"/>
+          </a:bodyPr>
           <a:lstStyle/>
           <a:p>
             <a:r>
@@ -15453,8 +15465,8 @@
               <a:t> using </a:t>
             </a:r>
             <a:r>
-              <a:rPr lang="en-US" b="1" dirty="0"/>
-              <a:t>non-regression </a:t>
+              <a:rPr lang="en-US" b="1" dirty="0" smtClean="0"/>
+              <a:t>regression </a:t>
             </a:r>
             <a:r>
               <a:rPr lang="en-US" dirty="0"/>
@@ -15467,6 +15479,26 @@
               <a:rPr lang="en-US" dirty="0"/>
               <a:t>validation </a:t>
             </a:r>
+            <a:r>
+              <a:rPr lang="en-US" dirty="0" smtClean="0"/>
+              <a:t>rules</a:t>
+            </a:r>
+          </a:p>
+          <a:p>
+            <a:pPr lvl="1"/>
+            <a:r>
+              <a:rPr lang="en-US" dirty="0" smtClean="0"/>
+              <a:t>field </a:t>
+            </a:r>
+            <a:r>
+              <a:rPr lang="en-US" dirty="0" smtClean="0"/>
+              <a:t>visibility </a:t>
+            </a:r>
+            <a:r>
+              <a:rPr lang="en-US" dirty="0" smtClean="0"/>
+              <a:t>update</a:t>
+            </a:r>
+            <a:endParaRPr lang="en-US" dirty="0"/>
           </a:p>
           <a:p>
             <a:pPr lvl="1"/>
@@ -15474,19 +15506,17 @@
               <a:rPr lang="en-US" dirty="0"/>
               <a:t>domain model read &amp; update </a:t>
             </a:r>
+            <a:endParaRPr lang="en-US" dirty="0" smtClean="0"/>
           </a:p>
           <a:p>
             <a:pPr lvl="1"/>
             <a:r>
+              <a:rPr lang="en-US" dirty="0" smtClean="0"/>
+              <a:t>domain </a:t>
+            </a:r>
+            <a:r>
               <a:rPr lang="en-US" dirty="0"/>
-              <a:t>visibility update</a:t>
-            </a:r>
-          </a:p>
-          <a:p>
-            <a:pPr lvl="1"/>
-            <a:r>
-              <a:rPr lang="en-US" dirty="0"/>
-              <a:t>domain model reset</a:t>
+              <a:t>model reset</a:t>
             </a:r>
           </a:p>
           <a:p>
@@ -15496,7 +15526,15 @@
           <a:p>
             <a:r>
               <a:rPr lang="en-US" dirty="0"/>
-              <a:t>Generated mock factories allow to execute field without a web application (GWT)</a:t>
+              <a:t>Generated mock factories allow to execute </a:t>
+            </a:r>
+            <a:r>
+              <a:rPr lang="en-US" dirty="0" smtClean="0"/>
+              <a:t>features implementation without </a:t>
+            </a:r>
+            <a:r>
+              <a:rPr lang="en-US" dirty="0"/>
+              <a:t>a web application (GWT)</a:t>
             </a:r>
             <a:endParaRPr lang="fr-FR" dirty="0"/>
           </a:p>
@@ -15508,7 +15546,7 @@
     </p:spTree>
     <p:extLst>
       <p:ext uri="{BB962C8B-B14F-4D97-AF65-F5344CB8AC3E}">
-        <p14:creationId xmlns:p14="http://schemas.microsoft.com/office/powerpoint/2010/main" val="714747940"/>
+        <p14:creationId xmlns:p14="http://schemas.microsoft.com/office/powerpoint/2010/main" xmlns="" val="714747940"/>
       </p:ext>
     </p:extLst>
   </p:cSld>
@@ -16043,7 +16081,7 @@
     </p:spTree>
     <p:extLst>
       <p:ext uri="{BB962C8B-B14F-4D97-AF65-F5344CB8AC3E}">
-        <p14:creationId xmlns:p14="http://schemas.microsoft.com/office/powerpoint/2010/main" val="3760395846"/>
+        <p14:creationId xmlns:p14="http://schemas.microsoft.com/office/powerpoint/2010/main" xmlns="" val="3760395846"/>
       </p:ext>
     </p:extLst>
   </p:cSld>
@@ -16876,7 +16914,7 @@
     </p:spTree>
     <p:extLst>
       <p:ext uri="{BB962C8B-B14F-4D97-AF65-F5344CB8AC3E}">
-        <p14:creationId xmlns:p14="http://schemas.microsoft.com/office/powerpoint/2010/main" val="1422967000"/>
+        <p14:creationId xmlns:p14="http://schemas.microsoft.com/office/powerpoint/2010/main" xmlns="" val="1422967000"/>
       </p:ext>
     </p:extLst>
   </p:cSld>
@@ -16976,8 +17014,13 @@
             <a:pPr lvl="1"/>
             <a:r>
               <a:rPr lang="en-US" dirty="0"/>
-              <a:t>retrieves results</a:t>
-            </a:r>
+              <a:t>retrieves </a:t>
+            </a:r>
+            <a:r>
+              <a:rPr lang="en-US" dirty="0" smtClean="0"/>
+              <a:t>results (parsing the DOM)</a:t>
+            </a:r>
+            <a:endParaRPr lang="en-US" dirty="0"/>
           </a:p>
           <a:p>
             <a:pPr lvl="1"/>
@@ -17022,7 +17065,7 @@
     </p:spTree>
     <p:extLst>
       <p:ext uri="{BB962C8B-B14F-4D97-AF65-F5344CB8AC3E}">
-        <p14:creationId xmlns:p14="http://schemas.microsoft.com/office/powerpoint/2010/main" val="2654585083"/>
+        <p14:creationId xmlns:p14="http://schemas.microsoft.com/office/powerpoint/2010/main" xmlns="" val="2654585083"/>
       </p:ext>
     </p:extLst>
   </p:cSld>
@@ -17096,7 +17139,15 @@
           <a:p>
             <a:r>
               <a:rPr lang="en-US" dirty="0"/>
-              <a:t>Generation of page objects classes</a:t>
+              <a:t>Generation of page </a:t>
+            </a:r>
+            <a:r>
+              <a:rPr lang="en-US" dirty="0" smtClean="0"/>
+              <a:t>object </a:t>
+            </a:r>
+            <a:r>
+              <a:rPr lang="en-US" dirty="0"/>
+              <a:t>classes</a:t>
             </a:r>
           </a:p>
           <a:p>
@@ -17113,8 +17164,12 @@
           <a:p>
             <a:pPr lvl="1"/>
             <a:r>
+              <a:rPr lang="en-US" dirty="0" smtClean="0"/>
+              <a:t>exposing </a:t>
+            </a:r>
+            <a:r>
               <a:rPr lang="en-US" dirty="0"/>
-              <a:t>expose methods to </a:t>
+              <a:t>methods to </a:t>
             </a:r>
             <a:r>
               <a:rPr lang="en-US" b="1" dirty="0"/>
@@ -17149,12 +17204,16 @@
           <a:p>
             <a:pPr lvl="1"/>
             <a:r>
-              <a:rPr lang="en-US" b="1" dirty="0"/>
-              <a:t>minimize</a:t>
+              <a:rPr lang="en-US" b="1" dirty="0" smtClean="0"/>
+              <a:t>minimize </a:t>
+            </a:r>
+            <a:r>
+              <a:rPr lang="en-US" dirty="0" smtClean="0"/>
+              <a:t>the </a:t>
             </a:r>
             <a:r>
               <a:rPr lang="en-US" dirty="0"/>
-              <a:t> the test maintenance effort</a:t>
+              <a:t>test maintenance effort</a:t>
             </a:r>
             <a:endParaRPr lang="fr-FR" dirty="0"/>
           </a:p>
@@ -17166,7 +17225,7 @@
     </p:spTree>
     <p:extLst>
       <p:ext uri="{BB962C8B-B14F-4D97-AF65-F5344CB8AC3E}">
-        <p14:creationId xmlns:p14="http://schemas.microsoft.com/office/powerpoint/2010/main" val="1683021932"/>
+        <p14:creationId xmlns:p14="http://schemas.microsoft.com/office/powerpoint/2010/main" xmlns="" val="1683021932"/>
       </p:ext>
     </p:extLst>
   </p:cSld>
@@ -17237,10 +17296,10 @@
           <p:nvPr/>
         </p:nvPicPr>
         <p:blipFill>
-          <a:blip r:embed="rId2">
+          <a:blip r:embed="rId2" cstate="print">
             <a:extLst>
               <a:ext uri="{28A0092B-C50C-407E-A947-70E740481C1C}">
-                <a14:useLocalDpi xmlns:a14="http://schemas.microsoft.com/office/drawing/2010/main" val="0"/>
+                <a14:useLocalDpi xmlns:a14="http://schemas.microsoft.com/office/drawing/2010/main" xmlns="" val="0"/>
               </a:ext>
             </a:extLst>
           </a:blip>
@@ -17878,7 +17937,7 @@
     </p:spTree>
     <p:extLst>
       <p:ext uri="{BB962C8B-B14F-4D97-AF65-F5344CB8AC3E}">
-        <p14:creationId xmlns:p14="http://schemas.microsoft.com/office/powerpoint/2010/main" val="3007787296"/>
+        <p14:creationId xmlns:p14="http://schemas.microsoft.com/office/powerpoint/2010/main" xmlns="" val="3007787296"/>
       </p:ext>
     </p:extLst>
   </p:cSld>
@@ -18033,7 +18092,7 @@
     </p:spTree>
     <p:extLst>
       <p:ext uri="{BB962C8B-B14F-4D97-AF65-F5344CB8AC3E}">
-        <p14:creationId xmlns:p14="http://schemas.microsoft.com/office/powerpoint/2010/main" val="13878138"/>
+        <p14:creationId xmlns:p14="http://schemas.microsoft.com/office/powerpoint/2010/main" xmlns="" val="13878138"/>
       </p:ext>
     </p:extLst>
   </p:cSld>
@@ -18112,7 +18171,7 @@
     </p:spTree>
     <p:extLst>
       <p:ext uri="{BB962C8B-B14F-4D97-AF65-F5344CB8AC3E}">
-        <p14:creationId xmlns:p14="http://schemas.microsoft.com/office/powerpoint/2010/main" val="40929930"/>
+        <p14:creationId xmlns:p14="http://schemas.microsoft.com/office/powerpoint/2010/main" xmlns="" val="40929930"/>
       </p:ext>
     </p:extLst>
   </p:cSld>
@@ -18191,7 +18250,7 @@
     </p:spTree>
     <p:extLst>
       <p:ext uri="{BB962C8B-B14F-4D97-AF65-F5344CB8AC3E}">
-        <p14:creationId xmlns:p14="http://schemas.microsoft.com/office/powerpoint/2010/main" val="4014343169"/>
+        <p14:creationId xmlns:p14="http://schemas.microsoft.com/office/powerpoint/2010/main" xmlns="" val="4014343169"/>
       </p:ext>
     </p:extLst>
   </p:cSld>
@@ -18378,7 +18437,7 @@
     </p:spTree>
     <p:extLst>
       <p:ext uri="{BB962C8B-B14F-4D97-AF65-F5344CB8AC3E}">
-        <p14:creationId xmlns:p14="http://schemas.microsoft.com/office/powerpoint/2010/main" val="4255503392"/>
+        <p14:creationId xmlns:p14="http://schemas.microsoft.com/office/powerpoint/2010/main" xmlns="" val="4255503392"/>
       </p:ext>
     </p:extLst>
   </p:cSld>
@@ -18527,7 +18586,7 @@
     </p:spTree>
     <p:extLst>
       <p:ext uri="{BB962C8B-B14F-4D97-AF65-F5344CB8AC3E}">
-        <p14:creationId xmlns:p14="http://schemas.microsoft.com/office/powerpoint/2010/main" val="2375505937"/>
+        <p14:creationId xmlns:p14="http://schemas.microsoft.com/office/powerpoint/2010/main" xmlns="" val="2375505937"/>
       </p:ext>
     </p:extLst>
   </p:cSld>
@@ -18658,18 +18717,18 @@
     </p:spTree>
     <p:extLst>
       <p:ext uri="{BB962C8B-B14F-4D97-AF65-F5344CB8AC3E}">
-        <p14:creationId xmlns:p14="http://schemas.microsoft.com/office/powerpoint/2010/main" val="1618189430"/>
+        <p14:creationId xmlns:p14="http://schemas.microsoft.com/office/powerpoint/2010/main" xmlns="" val="1618189430"/>
       </p:ext>
     </p:extLst>
   </p:cSld>
   <p:clrMapOvr>
     <a:masterClrMapping/>
   </p:clrMapOvr>
-  <mc:AlternateContent xmlns:mc="http://schemas.openxmlformats.org/markup-compatibility/2006" xmlns:p14="http://schemas.microsoft.com/office/powerpoint/2010/main">
-    <mc:Choice Requires="p14">
+  <mc:AlternateContent xmlns:mc="http://schemas.openxmlformats.org/markup-compatibility/2006">
+    <mc:Choice xmlns:p14="http://schemas.microsoft.com/office/powerpoint/2010/main" xmlns="" Requires="p14">
       <p:transition spd="slow" p14:dur="2000"/>
     </mc:Choice>
-    <mc:Fallback xmlns="">
+    <mc:Fallback>
       <p:transition spd="slow"/>
     </mc:Fallback>
   </mc:AlternateContent>
@@ -18834,7 +18893,7 @@
     </p:spTree>
     <p:extLst>
       <p:ext uri="{BB962C8B-B14F-4D97-AF65-F5344CB8AC3E}">
-        <p14:creationId xmlns:p14="http://schemas.microsoft.com/office/powerpoint/2010/main" val="3644490438"/>
+        <p14:creationId xmlns:p14="http://schemas.microsoft.com/office/powerpoint/2010/main" xmlns="" val="3644490438"/>
       </p:ext>
     </p:extLst>
   </p:cSld>

</xml_diff>

<commit_message>
udpated field & screen class diagrams
typo in PPT
</commit_message>
<xml_diff>
--- a/mdl4ui-docs/mdl4ui_cg2013.pptx
+++ b/mdl4ui-docs/mdl4ui_cg2013.pptx
@@ -322,7 +322,7 @@
     </p:spTree>
     <p:extLst>
       <p:ext uri="{BB962C8B-B14F-4D97-AF65-F5344CB8AC3E}">
-        <p14:creationId xmlns:p14="http://schemas.microsoft.com/office/powerpoint/2010/main" xmlns="" val="70803672"/>
+        <p14:creationId xmlns:p14="http://schemas.microsoft.com/office/powerpoint/2010/main" val="70803672"/>
       </p:ext>
     </p:extLst>
   </p:cSld>
@@ -582,7 +582,7 @@
     </p:spTree>
     <p:extLst>
       <p:ext uri="{BB962C8B-B14F-4D97-AF65-F5344CB8AC3E}">
-        <p14:creationId xmlns:p14="http://schemas.microsoft.com/office/powerpoint/2010/main" xmlns="" val="1701488114"/>
+        <p14:creationId xmlns:p14="http://schemas.microsoft.com/office/powerpoint/2010/main" val="1701488114"/>
       </p:ext>
     </p:extLst>
   </p:cSld>
@@ -757,7 +757,7 @@
     </p:spTree>
     <p:extLst>
       <p:ext uri="{BB962C8B-B14F-4D97-AF65-F5344CB8AC3E}">
-        <p14:creationId xmlns:p14="http://schemas.microsoft.com/office/powerpoint/2010/main" xmlns="" val="3047004223"/>
+        <p14:creationId xmlns:p14="http://schemas.microsoft.com/office/powerpoint/2010/main" val="3047004223"/>
       </p:ext>
     </p:extLst>
   </p:cSld>
@@ -842,7 +842,7 @@
     </p:spTree>
     <p:extLst>
       <p:ext uri="{BB962C8B-B14F-4D97-AF65-F5344CB8AC3E}">
-        <p14:creationId xmlns:p14="http://schemas.microsoft.com/office/powerpoint/2010/main" xmlns="" val="3280979232"/>
+        <p14:creationId xmlns:p14="http://schemas.microsoft.com/office/powerpoint/2010/main" val="3280979232"/>
       </p:ext>
     </p:extLst>
   </p:cSld>
@@ -927,7 +927,7 @@
     </p:spTree>
     <p:extLst>
       <p:ext uri="{BB962C8B-B14F-4D97-AF65-F5344CB8AC3E}">
-        <p14:creationId xmlns:p14="http://schemas.microsoft.com/office/powerpoint/2010/main" xmlns="" val="1987381696"/>
+        <p14:creationId xmlns:p14="http://schemas.microsoft.com/office/powerpoint/2010/main" val="1987381696"/>
       </p:ext>
     </p:extLst>
   </p:cSld>
@@ -1171,7 +1171,7 @@
     </p:spTree>
     <p:extLst>
       <p:ext uri="{BB962C8B-B14F-4D97-AF65-F5344CB8AC3E}">
-        <p14:creationId xmlns:p14="http://schemas.microsoft.com/office/powerpoint/2010/main" xmlns="" val="322609761"/>
+        <p14:creationId xmlns:p14="http://schemas.microsoft.com/office/powerpoint/2010/main" val="322609761"/>
       </p:ext>
     </p:extLst>
   </p:cSld>
@@ -1343,7 +1343,7 @@
     </p:spTree>
     <p:extLst>
       <p:ext uri="{BB962C8B-B14F-4D97-AF65-F5344CB8AC3E}">
-        <p14:creationId xmlns:p14="http://schemas.microsoft.com/office/powerpoint/2010/main" xmlns="" val="1248456722"/>
+        <p14:creationId xmlns:p14="http://schemas.microsoft.com/office/powerpoint/2010/main" val="1248456722"/>
       </p:ext>
     </p:extLst>
   </p:cSld>
@@ -1525,7 +1525,7 @@
     </p:spTree>
     <p:extLst>
       <p:ext uri="{BB962C8B-B14F-4D97-AF65-F5344CB8AC3E}">
-        <p14:creationId xmlns:p14="http://schemas.microsoft.com/office/powerpoint/2010/main" xmlns="" val="4236232986"/>
+        <p14:creationId xmlns:p14="http://schemas.microsoft.com/office/powerpoint/2010/main" val="4236232986"/>
       </p:ext>
     </p:extLst>
   </p:cSld>
@@ -1697,7 +1697,7 @@
     </p:spTree>
     <p:extLst>
       <p:ext uri="{BB962C8B-B14F-4D97-AF65-F5344CB8AC3E}">
-        <p14:creationId xmlns:p14="http://schemas.microsoft.com/office/powerpoint/2010/main" xmlns="" val="3454835055"/>
+        <p14:creationId xmlns:p14="http://schemas.microsoft.com/office/powerpoint/2010/main" val="3454835055"/>
       </p:ext>
     </p:extLst>
   </p:cSld>
@@ -1952,7 +1952,7 @@
     </p:spTree>
     <p:extLst>
       <p:ext uri="{BB962C8B-B14F-4D97-AF65-F5344CB8AC3E}">
-        <p14:creationId xmlns:p14="http://schemas.microsoft.com/office/powerpoint/2010/main" xmlns="" val="804127244"/>
+        <p14:creationId xmlns:p14="http://schemas.microsoft.com/office/powerpoint/2010/main" val="804127244"/>
       </p:ext>
     </p:extLst>
   </p:cSld>
@@ -2242,7 +2242,7 @@
     </p:spTree>
     <p:extLst>
       <p:ext uri="{BB962C8B-B14F-4D97-AF65-F5344CB8AC3E}">
-        <p14:creationId xmlns:p14="http://schemas.microsoft.com/office/powerpoint/2010/main" xmlns="" val="586698658"/>
+        <p14:creationId xmlns:p14="http://schemas.microsoft.com/office/powerpoint/2010/main" val="586698658"/>
       </p:ext>
     </p:extLst>
   </p:cSld>
@@ -2666,7 +2666,7 @@
     </p:spTree>
     <p:extLst>
       <p:ext uri="{BB962C8B-B14F-4D97-AF65-F5344CB8AC3E}">
-        <p14:creationId xmlns:p14="http://schemas.microsoft.com/office/powerpoint/2010/main" xmlns="" val="19144436"/>
+        <p14:creationId xmlns:p14="http://schemas.microsoft.com/office/powerpoint/2010/main" val="19144436"/>
       </p:ext>
     </p:extLst>
   </p:cSld>
@@ -2786,7 +2786,7 @@
     </p:spTree>
     <p:extLst>
       <p:ext uri="{BB962C8B-B14F-4D97-AF65-F5344CB8AC3E}">
-        <p14:creationId xmlns:p14="http://schemas.microsoft.com/office/powerpoint/2010/main" xmlns="" val="202749597"/>
+        <p14:creationId xmlns:p14="http://schemas.microsoft.com/office/powerpoint/2010/main" val="202749597"/>
       </p:ext>
     </p:extLst>
   </p:cSld>
@@ -2883,7 +2883,7 @@
     </p:spTree>
     <p:extLst>
       <p:ext uri="{BB962C8B-B14F-4D97-AF65-F5344CB8AC3E}">
-        <p14:creationId xmlns:p14="http://schemas.microsoft.com/office/powerpoint/2010/main" xmlns="" val="2898363528"/>
+        <p14:creationId xmlns:p14="http://schemas.microsoft.com/office/powerpoint/2010/main" val="2898363528"/>
       </p:ext>
     </p:extLst>
   </p:cSld>
@@ -3162,7 +3162,7 @@
     </p:spTree>
     <p:extLst>
       <p:ext uri="{BB962C8B-B14F-4D97-AF65-F5344CB8AC3E}">
-        <p14:creationId xmlns:p14="http://schemas.microsoft.com/office/powerpoint/2010/main" xmlns="" val="4010598191"/>
+        <p14:creationId xmlns:p14="http://schemas.microsoft.com/office/powerpoint/2010/main" val="4010598191"/>
       </p:ext>
     </p:extLst>
   </p:cSld>
@@ -3417,7 +3417,7 @@
     </p:spTree>
     <p:extLst>
       <p:ext uri="{BB962C8B-B14F-4D97-AF65-F5344CB8AC3E}">
-        <p14:creationId xmlns:p14="http://schemas.microsoft.com/office/powerpoint/2010/main" xmlns="" val="1433498939"/>
+        <p14:creationId xmlns:p14="http://schemas.microsoft.com/office/powerpoint/2010/main" val="1433498939"/>
       </p:ext>
     </p:extLst>
   </p:cSld>
@@ -3668,7 +3668,7 @@
     </p:spTree>
     <p:extLst>
       <p:ext uri="{BB962C8B-B14F-4D97-AF65-F5344CB8AC3E}">
-        <p14:creationId xmlns:p14="http://schemas.microsoft.com/office/powerpoint/2010/main" xmlns="" val="2684825788"/>
+        <p14:creationId xmlns:p14="http://schemas.microsoft.com/office/powerpoint/2010/main" val="2684825788"/>
       </p:ext>
     </p:extLst>
   </p:cSld>
@@ -4039,18 +4039,18 @@
     </p:spTree>
     <p:extLst>
       <p:ext uri="{BB962C8B-B14F-4D97-AF65-F5344CB8AC3E}">
-        <p14:creationId xmlns:p14="http://schemas.microsoft.com/office/powerpoint/2010/main" xmlns="" val="3955344790"/>
+        <p14:creationId xmlns:p14="http://schemas.microsoft.com/office/powerpoint/2010/main" val="3955344790"/>
       </p:ext>
     </p:extLst>
   </p:cSld>
   <p:clrMapOvr>
     <a:masterClrMapping/>
   </p:clrMapOvr>
-  <mc:AlternateContent xmlns:mc="http://schemas.openxmlformats.org/markup-compatibility/2006">
-    <mc:Choice xmlns:p14="http://schemas.microsoft.com/office/powerpoint/2010/main" xmlns="" Requires="p14">
+  <mc:AlternateContent xmlns:mc="http://schemas.openxmlformats.org/markup-compatibility/2006" xmlns:p14="http://schemas.microsoft.com/office/powerpoint/2010/main">
+    <mc:Choice Requires="p14">
       <p:transition spd="slow" p14:dur="2000"/>
     </mc:Choice>
-    <mc:Fallback>
+    <mc:Fallback xmlns="">
       <p:transition spd="slow"/>
     </mc:Fallback>
   </mc:AlternateContent>
@@ -4130,7 +4130,7 @@
     </p:spTree>
     <p:extLst>
       <p:ext uri="{BB962C8B-B14F-4D97-AF65-F5344CB8AC3E}">
-        <p14:creationId xmlns:p14="http://schemas.microsoft.com/office/powerpoint/2010/main" xmlns="" val="3139881919"/>
+        <p14:creationId xmlns:p14="http://schemas.microsoft.com/office/powerpoint/2010/main" val="3139881919"/>
       </p:ext>
     </p:extLst>
   </p:cSld>
@@ -4497,7 +4497,31 @@
             </a:r>
             <a:r>
               <a:rPr lang="en-US" sz="2000" dirty="0"/>
-              <a:t>: the web application that assemble the code,  compile various resources with GWT and add styling</a:t>
+              <a:t>: the web application that </a:t>
+            </a:r>
+            <a:r>
+              <a:rPr lang="en-US" sz="2000" dirty="0" smtClean="0"/>
+              <a:t>assembles </a:t>
+            </a:r>
+            <a:r>
+              <a:rPr lang="en-US" sz="2000" dirty="0"/>
+              <a:t>the code,  </a:t>
+            </a:r>
+            <a:r>
+              <a:rPr lang="en-US" sz="2000" dirty="0" smtClean="0"/>
+              <a:t>compiles </a:t>
+            </a:r>
+            <a:r>
+              <a:rPr lang="en-US" sz="2000" dirty="0"/>
+              <a:t>various resources with GWT and </a:t>
+            </a:r>
+            <a:r>
+              <a:rPr lang="en-US" sz="2000" dirty="0" smtClean="0"/>
+              <a:t>adds </a:t>
+            </a:r>
+            <a:r>
+              <a:rPr lang="en-US" sz="2000" dirty="0"/>
+              <a:t>styling</a:t>
             </a:r>
           </a:p>
           <a:p>
@@ -4508,7 +4532,7 @@
     </p:spTree>
     <p:extLst>
       <p:ext uri="{BB962C8B-B14F-4D97-AF65-F5344CB8AC3E}">
-        <p14:creationId xmlns:p14="http://schemas.microsoft.com/office/powerpoint/2010/main" xmlns="" val="1728169033"/>
+        <p14:creationId xmlns:p14="http://schemas.microsoft.com/office/powerpoint/2010/main" val="1728169033"/>
       </p:ext>
     </p:extLst>
   </p:cSld>
@@ -4554,7 +4578,7 @@
           <a:blip r:embed="rId2" cstate="print">
             <a:extLst>
               <a:ext uri="{28A0092B-C50C-407E-A947-70E740481C1C}">
-                <a14:useLocalDpi xmlns:a14="http://schemas.microsoft.com/office/drawing/2010/main" xmlns="" val="0"/>
+                <a14:useLocalDpi xmlns:a14="http://schemas.microsoft.com/office/drawing/2010/main" val="0"/>
               </a:ext>
             </a:extLst>
           </a:blip>
@@ -4584,7 +4608,7 @@
           <a:blip r:embed="rId3" cstate="print">
             <a:extLst>
               <a:ext uri="{28A0092B-C50C-407E-A947-70E740481C1C}">
-                <a14:useLocalDpi xmlns:a14="http://schemas.microsoft.com/office/drawing/2010/main" xmlns="" val="0"/>
+                <a14:useLocalDpi xmlns:a14="http://schemas.microsoft.com/office/drawing/2010/main" val="0"/>
               </a:ext>
             </a:extLst>
           </a:blip>
@@ -4764,7 +4788,7 @@
           <a:p>
             <a:r>
               <a:rPr lang="en-US" dirty="0" smtClean="0"/>
-              <a:t>Look at my model</a:t>
+              <a:t>MDL4UI sample model </a:t>
             </a:r>
             <a:endParaRPr lang="en-US" dirty="0"/>
           </a:p>
@@ -4901,7 +4925,7 @@
     </p:spTree>
     <p:extLst>
       <p:ext uri="{BB962C8B-B14F-4D97-AF65-F5344CB8AC3E}">
-        <p14:creationId xmlns:p14="http://schemas.microsoft.com/office/powerpoint/2010/main" xmlns="" val="2819423520"/>
+        <p14:creationId xmlns:p14="http://schemas.microsoft.com/office/powerpoint/2010/main" val="2819423520"/>
       </p:ext>
     </p:extLst>
   </p:cSld>
@@ -4960,544 +4984,484 @@
           </a:p>
         </p:txBody>
       </p:sp>
-      <p:grpSp>
-        <p:nvGrpSpPr>
-          <p:cNvPr id="16" name="Groupe 15"/>
-          <p:cNvGrpSpPr/>
+      <p:sp>
+        <p:nvSpPr>
+          <p:cNvPr id="4" name="Rectangle à coins arrondis 3"/>
+          <p:cNvSpPr/>
           <p:nvPr/>
-        </p:nvGrpSpPr>
-        <p:grpSpPr>
+        </p:nvSpPr>
+        <p:spPr>
           <a:xfrm>
             <a:off x="304800" y="1524000"/>
-            <a:ext cx="8534400" cy="914400"/>
-            <a:chOff x="304800" y="1524000"/>
-            <a:chExt cx="8534400" cy="914400"/>
+            <a:ext cx="6172200" cy="914400"/>
           </a:xfrm>
-        </p:grpSpPr>
-        <p:sp>
-          <p:nvSpPr>
-            <p:cNvPr id="4" name="Rectangle à coins arrondis 3"/>
-            <p:cNvSpPr/>
-            <p:nvPr/>
-          </p:nvSpPr>
-          <p:spPr>
-            <a:xfrm>
-              <a:off x="304800" y="1524000"/>
-              <a:ext cx="6172200" cy="914400"/>
-            </a:xfrm>
-            <a:prstGeom prst="roundRect">
-              <a:avLst/>
-            </a:prstGeom>
-          </p:spPr>
-          <p:style>
-            <a:lnRef idx="2">
-              <a:schemeClr val="accent1">
-                <a:shade val="50000"/>
-              </a:schemeClr>
-            </a:lnRef>
-            <a:fillRef idx="1">
-              <a:schemeClr val="accent1"/>
-            </a:fillRef>
-            <a:effectRef idx="0">
-              <a:schemeClr val="accent1"/>
-            </a:effectRef>
-            <a:fontRef idx="minor">
-              <a:schemeClr val="lt1"/>
-            </a:fontRef>
-          </p:style>
-          <p:txBody>
-            <a:bodyPr rtlCol="0" anchor="ctr"/>
-            <a:lstStyle/>
-            <a:p>
-              <a:pPr algn="ctr"/>
-              <a:r>
-                <a:rPr lang="en-US" dirty="0" err="1" smtClean="0"/>
-                <a:t>FieldID</a:t>
-              </a:r>
-              <a:r>
-                <a:rPr lang="en-US" dirty="0" smtClean="0"/>
-                <a:t> – </a:t>
-              </a:r>
-              <a:r>
-                <a:rPr lang="en-US" dirty="0" err="1" smtClean="0"/>
-                <a:t>GroupID</a:t>
-              </a:r>
-              <a:r>
-                <a:rPr lang="en-US" dirty="0" smtClean="0"/>
-                <a:t> – </a:t>
-              </a:r>
-              <a:r>
-                <a:rPr lang="en-US" dirty="0" err="1" smtClean="0"/>
-                <a:t>BlockID</a:t>
-              </a:r>
-              <a:r>
-                <a:rPr lang="en-US" dirty="0" smtClean="0"/>
-                <a:t> – </a:t>
-              </a:r>
-              <a:r>
-                <a:rPr lang="en-US" dirty="0" err="1" smtClean="0"/>
-                <a:t>ScreenID</a:t>
-              </a:r>
-              <a:r>
-                <a:rPr lang="en-US" dirty="0" smtClean="0"/>
-                <a:t> - </a:t>
-              </a:r>
-              <a:r>
-                <a:rPr lang="en-US" dirty="0" err="1" smtClean="0"/>
-                <a:t>ScenarioID</a:t>
-              </a:r>
-              <a:endParaRPr lang="en-US" dirty="0"/>
-            </a:p>
-          </p:txBody>
-        </p:sp>
-        <p:sp>
-          <p:nvSpPr>
-            <p:cNvPr id="8" name="Rectangle à coins arrondis 7"/>
-            <p:cNvSpPr/>
-            <p:nvPr/>
-          </p:nvSpPr>
-          <p:spPr>
-            <a:xfrm>
-              <a:off x="6629400" y="1524000"/>
-              <a:ext cx="2209800" cy="914400"/>
-            </a:xfrm>
-            <a:prstGeom prst="roundRect">
-              <a:avLst/>
-            </a:prstGeom>
-          </p:spPr>
-          <p:style>
-            <a:lnRef idx="2">
-              <a:schemeClr val="accent1">
-                <a:shade val="50000"/>
-              </a:schemeClr>
-            </a:lnRef>
-            <a:fillRef idx="1">
-              <a:schemeClr val="accent1"/>
-            </a:fillRef>
-            <a:effectRef idx="0">
-              <a:schemeClr val="accent1"/>
-            </a:effectRef>
-            <a:fontRef idx="minor">
-              <a:schemeClr val="lt1"/>
-            </a:fontRef>
-          </p:style>
-          <p:txBody>
-            <a:bodyPr rtlCol="0" anchor="ctr"/>
-            <a:lstStyle/>
-            <a:p>
-              <a:pPr algn="ctr"/>
-              <a:r>
-                <a:rPr lang="en-US" dirty="0" smtClean="0"/>
-                <a:t>MetaModel</a:t>
-              </a:r>
-              <a:endParaRPr lang="en-US" dirty="0"/>
-            </a:p>
-          </p:txBody>
-        </p:sp>
-      </p:grpSp>
-      <p:grpSp>
-        <p:nvGrpSpPr>
-          <p:cNvPr id="14" name="Groupe 13"/>
-          <p:cNvGrpSpPr/>
+          <a:prstGeom prst="roundRect">
+            <a:avLst/>
+          </a:prstGeom>
+        </p:spPr>
+        <p:style>
+          <a:lnRef idx="2">
+            <a:schemeClr val="accent1">
+              <a:shade val="50000"/>
+            </a:schemeClr>
+          </a:lnRef>
+          <a:fillRef idx="1">
+            <a:schemeClr val="accent1"/>
+          </a:fillRef>
+          <a:effectRef idx="0">
+            <a:schemeClr val="accent1"/>
+          </a:effectRef>
+          <a:fontRef idx="minor">
+            <a:schemeClr val="lt1"/>
+          </a:fontRef>
+        </p:style>
+        <p:txBody>
+          <a:bodyPr rtlCol="0" anchor="ctr"/>
+          <a:lstStyle/>
+          <a:p>
+            <a:pPr algn="ctr"/>
+            <a:r>
+              <a:rPr lang="en-US" dirty="0" err="1" smtClean="0"/>
+              <a:t>FieldID</a:t>
+            </a:r>
+            <a:r>
+              <a:rPr lang="en-US" dirty="0" smtClean="0"/>
+              <a:t> – </a:t>
+            </a:r>
+            <a:r>
+              <a:rPr lang="en-US" dirty="0" err="1" smtClean="0"/>
+              <a:t>GroupID</a:t>
+            </a:r>
+            <a:r>
+              <a:rPr lang="en-US" dirty="0" smtClean="0"/>
+              <a:t> – </a:t>
+            </a:r>
+            <a:r>
+              <a:rPr lang="en-US" dirty="0" err="1" smtClean="0"/>
+              <a:t>BlockID</a:t>
+            </a:r>
+            <a:r>
+              <a:rPr lang="en-US" dirty="0" smtClean="0"/>
+              <a:t> – </a:t>
+            </a:r>
+            <a:r>
+              <a:rPr lang="en-US" dirty="0" err="1" smtClean="0"/>
+              <a:t>ScreenID</a:t>
+            </a:r>
+            <a:r>
+              <a:rPr lang="en-US" dirty="0" smtClean="0"/>
+              <a:t> - </a:t>
+            </a:r>
+            <a:r>
+              <a:rPr lang="en-US" dirty="0" err="1" smtClean="0"/>
+              <a:t>ScenarioID</a:t>
+            </a:r>
+            <a:endParaRPr lang="en-US" dirty="0"/>
+          </a:p>
+        </p:txBody>
+      </p:sp>
+      <p:sp>
+        <p:nvSpPr>
+          <p:cNvPr id="8" name="Rectangle à coins arrondis 7"/>
+          <p:cNvSpPr/>
           <p:nvPr/>
-        </p:nvGrpSpPr>
-        <p:grpSpPr>
+        </p:nvSpPr>
+        <p:spPr>
+          <a:xfrm>
+            <a:off x="6629400" y="1524000"/>
+            <a:ext cx="2209800" cy="914400"/>
+          </a:xfrm>
+          <a:prstGeom prst="roundRect">
+            <a:avLst/>
+          </a:prstGeom>
+        </p:spPr>
+        <p:style>
+          <a:lnRef idx="2">
+            <a:schemeClr val="accent1">
+              <a:shade val="50000"/>
+            </a:schemeClr>
+          </a:lnRef>
+          <a:fillRef idx="1">
+            <a:schemeClr val="accent1"/>
+          </a:fillRef>
+          <a:effectRef idx="0">
+            <a:schemeClr val="accent1"/>
+          </a:effectRef>
+          <a:fontRef idx="minor">
+            <a:schemeClr val="lt1"/>
+          </a:fontRef>
+        </p:style>
+        <p:txBody>
+          <a:bodyPr rtlCol="0" anchor="ctr"/>
+          <a:lstStyle/>
+          <a:p>
+            <a:pPr algn="ctr"/>
+            <a:r>
+              <a:rPr lang="en-US" dirty="0" smtClean="0"/>
+              <a:t>MetaModel</a:t>
+            </a:r>
+            <a:endParaRPr lang="en-US" dirty="0"/>
+          </a:p>
+        </p:txBody>
+      </p:sp>
+      <p:sp>
+        <p:nvSpPr>
+          <p:cNvPr id="5" name="Rectangle à coins arrondis 4"/>
+          <p:cNvSpPr/>
+          <p:nvPr/>
+        </p:nvSpPr>
+        <p:spPr>
           <a:xfrm>
             <a:off x="304800" y="4419600"/>
-            <a:ext cx="8534400" cy="914400"/>
-            <a:chOff x="304800" y="4419600"/>
-            <a:chExt cx="8534400" cy="914400"/>
+            <a:ext cx="6172200" cy="914400"/>
           </a:xfrm>
-        </p:grpSpPr>
-        <p:sp>
-          <p:nvSpPr>
-            <p:cNvPr id="5" name="Rectangle à coins arrondis 4"/>
-            <p:cNvSpPr/>
-            <p:nvPr/>
-          </p:nvSpPr>
-          <p:spPr>
-            <a:xfrm>
-              <a:off x="304800" y="4419600"/>
-              <a:ext cx="6172200" cy="914400"/>
-            </a:xfrm>
-            <a:prstGeom prst="roundRect">
-              <a:avLst/>
-            </a:prstGeom>
-          </p:spPr>
-          <p:style>
-            <a:lnRef idx="2">
-              <a:schemeClr val="accent2">
-                <a:shade val="50000"/>
-              </a:schemeClr>
-            </a:lnRef>
-            <a:fillRef idx="1">
-              <a:schemeClr val="accent2"/>
-            </a:fillRef>
-            <a:effectRef idx="0">
-              <a:schemeClr val="accent2"/>
-            </a:effectRef>
-            <a:fontRef idx="minor">
-              <a:schemeClr val="lt1"/>
-            </a:fontRef>
-          </p:style>
-          <p:txBody>
-            <a:bodyPr rtlCol="0" anchor="ctr"/>
-            <a:lstStyle/>
-            <a:p>
-              <a:pPr algn="ctr"/>
-              <a:r>
-                <a:rPr lang="en-US" dirty="0" smtClean="0"/>
-                <a:t>Field – Group – Block - Screen</a:t>
-              </a:r>
-              <a:endParaRPr lang="en-US" dirty="0"/>
-            </a:p>
-          </p:txBody>
-        </p:sp>
-        <p:sp>
-          <p:nvSpPr>
-            <p:cNvPr id="9" name="Rectangle à coins arrondis 8"/>
-            <p:cNvSpPr/>
-            <p:nvPr/>
-          </p:nvSpPr>
-          <p:spPr>
-            <a:xfrm>
-              <a:off x="6629400" y="4419600"/>
-              <a:ext cx="2209800" cy="914400"/>
-            </a:xfrm>
-            <a:prstGeom prst="roundRect">
-              <a:avLst/>
-            </a:prstGeom>
-          </p:spPr>
-          <p:style>
-            <a:lnRef idx="2">
-              <a:schemeClr val="accent2">
-                <a:shade val="50000"/>
-              </a:schemeClr>
-            </a:lnRef>
-            <a:fillRef idx="1">
-              <a:schemeClr val="accent2"/>
-            </a:fillRef>
-            <a:effectRef idx="0">
-              <a:schemeClr val="accent2"/>
-            </a:effectRef>
-            <a:fontRef idx="minor">
-              <a:schemeClr val="lt1"/>
-            </a:fontRef>
-          </p:style>
-          <p:txBody>
-            <a:bodyPr rtlCol="0" anchor="ctr"/>
-            <a:lstStyle/>
-            <a:p>
-              <a:pPr algn="ctr"/>
-              <a:r>
-                <a:rPr lang="en-US" dirty="0" smtClean="0"/>
-                <a:t>Model Instance (runtime)</a:t>
-              </a:r>
-              <a:endParaRPr lang="en-US" dirty="0"/>
-            </a:p>
-          </p:txBody>
-        </p:sp>
-      </p:grpSp>
-      <p:grpSp>
-        <p:nvGrpSpPr>
-          <p:cNvPr id="13" name="Groupe 12"/>
-          <p:cNvGrpSpPr/>
+          <a:prstGeom prst="roundRect">
+            <a:avLst/>
+          </a:prstGeom>
+        </p:spPr>
+        <p:style>
+          <a:lnRef idx="2">
+            <a:schemeClr val="accent2">
+              <a:shade val="50000"/>
+            </a:schemeClr>
+          </a:lnRef>
+          <a:fillRef idx="1">
+            <a:schemeClr val="accent2"/>
+          </a:fillRef>
+          <a:effectRef idx="0">
+            <a:schemeClr val="accent2"/>
+          </a:effectRef>
+          <a:fontRef idx="minor">
+            <a:schemeClr val="lt1"/>
+          </a:fontRef>
+        </p:style>
+        <p:txBody>
+          <a:bodyPr rtlCol="0" anchor="ctr"/>
+          <a:lstStyle/>
+          <a:p>
+            <a:pPr algn="ctr"/>
+            <a:r>
+              <a:rPr lang="en-US" dirty="0" smtClean="0"/>
+              <a:t>Field – Group – Block - Screen</a:t>
+            </a:r>
+            <a:endParaRPr lang="en-US" dirty="0"/>
+          </a:p>
+        </p:txBody>
+      </p:sp>
+      <p:sp>
+        <p:nvSpPr>
+          <p:cNvPr id="9" name="Rectangle à coins arrondis 8"/>
+          <p:cNvSpPr/>
           <p:nvPr/>
-        </p:nvGrpSpPr>
-        <p:grpSpPr>
+        </p:nvSpPr>
+        <p:spPr>
+          <a:xfrm>
+            <a:off x="6629400" y="4419600"/>
+            <a:ext cx="2209800" cy="914400"/>
+          </a:xfrm>
+          <a:prstGeom prst="roundRect">
+            <a:avLst/>
+          </a:prstGeom>
+        </p:spPr>
+        <p:style>
+          <a:lnRef idx="2">
+            <a:schemeClr val="accent2">
+              <a:shade val="50000"/>
+            </a:schemeClr>
+          </a:lnRef>
+          <a:fillRef idx="1">
+            <a:schemeClr val="accent2"/>
+          </a:fillRef>
+          <a:effectRef idx="0">
+            <a:schemeClr val="accent2"/>
+          </a:effectRef>
+          <a:fontRef idx="minor">
+            <a:schemeClr val="lt1"/>
+          </a:fontRef>
+        </p:style>
+        <p:txBody>
+          <a:bodyPr rtlCol="0" anchor="ctr"/>
+          <a:lstStyle/>
+          <a:p>
+            <a:pPr algn="ctr"/>
+            <a:r>
+              <a:rPr lang="en-US" dirty="0" smtClean="0"/>
+              <a:t>Model Instance (runtime)</a:t>
+            </a:r>
+            <a:endParaRPr lang="en-US" dirty="0"/>
+          </a:p>
+        </p:txBody>
+      </p:sp>
+      <p:sp>
+        <p:nvSpPr>
+          <p:cNvPr id="6" name="Rectangle à coins arrondis 5"/>
+          <p:cNvSpPr/>
+          <p:nvPr/>
+        </p:nvSpPr>
+        <p:spPr>
           <a:xfrm>
             <a:off x="304800" y="5486400"/>
-            <a:ext cx="8534400" cy="914400"/>
-            <a:chOff x="304800" y="5486400"/>
-            <a:chExt cx="8534400" cy="914400"/>
+            <a:ext cx="6172200" cy="914400"/>
           </a:xfrm>
-        </p:grpSpPr>
-        <p:sp>
-          <p:nvSpPr>
-            <p:cNvPr id="6" name="Rectangle à coins arrondis 5"/>
-            <p:cNvSpPr/>
-            <p:nvPr/>
-          </p:nvSpPr>
-          <p:spPr>
-            <a:xfrm>
-              <a:off x="304800" y="5486400"/>
-              <a:ext cx="6172200" cy="914400"/>
-            </a:xfrm>
-            <a:prstGeom prst="roundRect">
-              <a:avLst/>
-            </a:prstGeom>
-          </p:spPr>
-          <p:style>
-            <a:lnRef idx="2">
-              <a:schemeClr val="accent6">
-                <a:shade val="50000"/>
-              </a:schemeClr>
-            </a:lnRef>
-            <a:fillRef idx="1">
-              <a:schemeClr val="accent6"/>
-            </a:fillRef>
-            <a:effectRef idx="0">
-              <a:schemeClr val="accent6"/>
-            </a:effectRef>
-            <a:fontRef idx="minor">
-              <a:schemeClr val="lt1"/>
-            </a:fontRef>
-          </p:style>
-          <p:txBody>
-            <a:bodyPr rtlCol="0" anchor="ctr"/>
-            <a:lstStyle/>
-            <a:p>
-              <a:pPr algn="ctr"/>
-              <a:r>
-                <a:rPr lang="en-US" dirty="0" err="1" smtClean="0"/>
-                <a:t>FieldView</a:t>
-              </a:r>
-              <a:r>
-                <a:rPr lang="en-US" dirty="0" smtClean="0"/>
-                <a:t> – </a:t>
-              </a:r>
-              <a:r>
-                <a:rPr lang="en-US" dirty="0" err="1" smtClean="0"/>
-                <a:t>GroupView</a:t>
-              </a:r>
-              <a:r>
-                <a:rPr lang="en-US" dirty="0" smtClean="0"/>
-                <a:t> – </a:t>
-              </a:r>
-              <a:r>
-                <a:rPr lang="en-US" dirty="0" err="1" smtClean="0"/>
-                <a:t>BlockView</a:t>
-              </a:r>
-              <a:r>
-                <a:rPr lang="en-US" dirty="0" smtClean="0"/>
-                <a:t> - </a:t>
-              </a:r>
-              <a:r>
-                <a:rPr lang="en-US" dirty="0" err="1" smtClean="0"/>
-                <a:t>ScreenView</a:t>
-              </a:r>
-              <a:endParaRPr lang="en-US" dirty="0"/>
-            </a:p>
-          </p:txBody>
-        </p:sp>
-        <p:sp>
-          <p:nvSpPr>
-            <p:cNvPr id="10" name="Rectangle à coins arrondis 9"/>
-            <p:cNvSpPr/>
-            <p:nvPr/>
-          </p:nvSpPr>
-          <p:spPr>
-            <a:xfrm>
-              <a:off x="6629400" y="5486400"/>
-              <a:ext cx="2209800" cy="914400"/>
-            </a:xfrm>
-            <a:prstGeom prst="roundRect">
-              <a:avLst/>
-            </a:prstGeom>
-          </p:spPr>
-          <p:style>
-            <a:lnRef idx="2">
-              <a:schemeClr val="accent6">
-                <a:shade val="50000"/>
-              </a:schemeClr>
-            </a:lnRef>
-            <a:fillRef idx="1">
-              <a:schemeClr val="accent6"/>
-            </a:fillRef>
-            <a:effectRef idx="0">
-              <a:schemeClr val="accent6"/>
-            </a:effectRef>
-            <a:fontRef idx="minor">
-              <a:schemeClr val="lt1"/>
-            </a:fontRef>
-          </p:style>
-          <p:txBody>
-            <a:bodyPr rtlCol="0" anchor="ctr"/>
-            <a:lstStyle/>
-            <a:p>
-              <a:pPr algn="ctr"/>
-              <a:r>
-                <a:rPr lang="en-US" dirty="0" smtClean="0"/>
-                <a:t>View of the MVC pattern (runtime)</a:t>
-              </a:r>
-              <a:endParaRPr lang="en-US" dirty="0"/>
-            </a:p>
-          </p:txBody>
-        </p:sp>
-      </p:grpSp>
-      <p:grpSp>
-        <p:nvGrpSpPr>
-          <p:cNvPr id="15" name="Groupe 14"/>
-          <p:cNvGrpSpPr/>
+          <a:prstGeom prst="roundRect">
+            <a:avLst/>
+          </a:prstGeom>
+        </p:spPr>
+        <p:style>
+          <a:lnRef idx="2">
+            <a:schemeClr val="accent6">
+              <a:shade val="50000"/>
+            </a:schemeClr>
+          </a:lnRef>
+          <a:fillRef idx="1">
+            <a:schemeClr val="accent6"/>
+          </a:fillRef>
+          <a:effectRef idx="0">
+            <a:schemeClr val="accent6"/>
+          </a:effectRef>
+          <a:fontRef idx="minor">
+            <a:schemeClr val="lt1"/>
+          </a:fontRef>
+        </p:style>
+        <p:txBody>
+          <a:bodyPr rtlCol="0" anchor="ctr"/>
+          <a:lstStyle/>
+          <a:p>
+            <a:pPr algn="ctr"/>
+            <a:r>
+              <a:rPr lang="en-US" dirty="0" err="1" smtClean="0"/>
+              <a:t>FieldView</a:t>
+            </a:r>
+            <a:r>
+              <a:rPr lang="en-US" dirty="0" smtClean="0"/>
+              <a:t> – </a:t>
+            </a:r>
+            <a:r>
+              <a:rPr lang="en-US" dirty="0" err="1" smtClean="0"/>
+              <a:t>GroupView</a:t>
+            </a:r>
+            <a:r>
+              <a:rPr lang="en-US" dirty="0" smtClean="0"/>
+              <a:t> – </a:t>
+            </a:r>
+            <a:r>
+              <a:rPr lang="en-US" dirty="0" err="1" smtClean="0"/>
+              <a:t>BlockView</a:t>
+            </a:r>
+            <a:r>
+              <a:rPr lang="en-US" dirty="0" smtClean="0"/>
+              <a:t> - </a:t>
+            </a:r>
+            <a:r>
+              <a:rPr lang="en-US" dirty="0" err="1" smtClean="0"/>
+              <a:t>ScreenView</a:t>
+            </a:r>
+            <a:endParaRPr lang="en-US" dirty="0"/>
+          </a:p>
+        </p:txBody>
+      </p:sp>
+      <p:sp>
+        <p:nvSpPr>
+          <p:cNvPr id="10" name="Rectangle à coins arrondis 9"/>
+          <p:cNvSpPr/>
           <p:nvPr/>
-        </p:nvGrpSpPr>
-        <p:grpSpPr>
+        </p:nvSpPr>
+        <p:spPr>
+          <a:xfrm>
+            <a:off x="6629400" y="5486400"/>
+            <a:ext cx="2209800" cy="914400"/>
+          </a:xfrm>
+          <a:prstGeom prst="roundRect">
+            <a:avLst/>
+          </a:prstGeom>
+        </p:spPr>
+        <p:style>
+          <a:lnRef idx="2">
+            <a:schemeClr val="accent6">
+              <a:shade val="50000"/>
+            </a:schemeClr>
+          </a:lnRef>
+          <a:fillRef idx="1">
+            <a:schemeClr val="accent6"/>
+          </a:fillRef>
+          <a:effectRef idx="0">
+            <a:schemeClr val="accent6"/>
+          </a:effectRef>
+          <a:fontRef idx="minor">
+            <a:schemeClr val="lt1"/>
+          </a:fontRef>
+        </p:style>
+        <p:txBody>
+          <a:bodyPr rtlCol="0" anchor="ctr"/>
+          <a:lstStyle/>
+          <a:p>
+            <a:pPr algn="ctr"/>
+            <a:r>
+              <a:rPr lang="en-US" dirty="0" smtClean="0"/>
+              <a:t>View of the MVC pattern (runtime)</a:t>
+            </a:r>
+            <a:endParaRPr lang="en-US" dirty="0"/>
+          </a:p>
+        </p:txBody>
+      </p:sp>
+      <p:sp>
+        <p:nvSpPr>
+          <p:cNvPr id="12" name="Rectangle à coins arrondis 11"/>
+          <p:cNvSpPr/>
+          <p:nvPr/>
+        </p:nvSpPr>
+        <p:spPr>
           <a:xfrm>
             <a:off x="152400" y="2590800"/>
             <a:ext cx="8839200" cy="1676400"/>
-            <a:chOff x="152400" y="2590800"/>
-            <a:chExt cx="8839200" cy="1676400"/>
           </a:xfrm>
-        </p:grpSpPr>
-        <p:sp>
-          <p:nvSpPr>
-            <p:cNvPr id="12" name="Rectangle à coins arrondis 11"/>
-            <p:cNvSpPr/>
-            <p:nvPr/>
-          </p:nvSpPr>
-          <p:spPr>
-            <a:xfrm>
-              <a:off x="152400" y="2590800"/>
-              <a:ext cx="8839200" cy="1676400"/>
-            </a:xfrm>
-            <a:prstGeom prst="roundRect">
-              <a:avLst/>
-            </a:prstGeom>
-          </p:spPr>
-          <p:style>
-            <a:lnRef idx="2">
-              <a:schemeClr val="accent3"/>
-            </a:lnRef>
-            <a:fillRef idx="1">
-              <a:schemeClr val="lt1"/>
-            </a:fillRef>
-            <a:effectRef idx="0">
-              <a:schemeClr val="accent3"/>
-            </a:effectRef>
-            <a:fontRef idx="minor">
-              <a:schemeClr val="dk1"/>
-            </a:fontRef>
-          </p:style>
-          <p:txBody>
-            <a:bodyPr rtlCol="0" anchor="t"/>
-            <a:lstStyle/>
-            <a:p>
-              <a:pPr algn="ctr"/>
-              <a:r>
-                <a:rPr lang="en-US" dirty="0" smtClean="0"/>
-                <a:t>Customization layer</a:t>
-              </a:r>
-              <a:endParaRPr lang="en-US" dirty="0"/>
-            </a:p>
-          </p:txBody>
-        </p:sp>
-        <p:sp>
-          <p:nvSpPr>
-            <p:cNvPr id="7" name="Rectangle à coins arrondis 6"/>
-            <p:cNvSpPr/>
-            <p:nvPr/>
-          </p:nvSpPr>
-          <p:spPr>
-            <a:xfrm>
-              <a:off x="304800" y="3200400"/>
-              <a:ext cx="6172200" cy="914400"/>
-            </a:xfrm>
-            <a:prstGeom prst="roundRect">
-              <a:avLst/>
-            </a:prstGeom>
-          </p:spPr>
-          <p:style>
-            <a:lnRef idx="2">
-              <a:schemeClr val="accent3">
-                <a:shade val="50000"/>
-              </a:schemeClr>
-            </a:lnRef>
-            <a:fillRef idx="1">
-              <a:schemeClr val="accent3"/>
-            </a:fillRef>
-            <a:effectRef idx="0">
-              <a:schemeClr val="accent3"/>
-            </a:effectRef>
-            <a:fontRef idx="minor">
-              <a:schemeClr val="lt1"/>
-            </a:fontRef>
-          </p:style>
-          <p:txBody>
-            <a:bodyPr rtlCol="0" anchor="ctr"/>
-            <a:lstStyle/>
-            <a:p>
-              <a:pPr algn="ctr"/>
-              <a:r>
-                <a:rPr lang="en-US" dirty="0" err="1" smtClean="0"/>
-                <a:t>EFieldSample</a:t>
-              </a:r>
-              <a:r>
-                <a:rPr lang="en-US" dirty="0" smtClean="0"/>
-                <a:t> – </a:t>
-              </a:r>
-              <a:r>
-                <a:rPr lang="en-US" dirty="0" err="1" smtClean="0"/>
-                <a:t>EGroupSample</a:t>
-              </a:r>
-              <a:r>
-                <a:rPr lang="en-US" dirty="0" smtClean="0"/>
-                <a:t> – </a:t>
-              </a:r>
-              <a:r>
-                <a:rPr lang="en-US" dirty="0" err="1" smtClean="0"/>
-                <a:t>BlockSample</a:t>
-              </a:r>
-              <a:r>
-                <a:rPr lang="en-US" dirty="0" smtClean="0"/>
-                <a:t> - </a:t>
-              </a:r>
-              <a:r>
-                <a:rPr lang="en-US" dirty="0" err="1" smtClean="0"/>
-                <a:t>EScreenSample</a:t>
-              </a:r>
-              <a:endParaRPr lang="en-US" dirty="0"/>
-            </a:p>
-          </p:txBody>
-        </p:sp>
-        <p:sp>
-          <p:nvSpPr>
-            <p:cNvPr id="11" name="Rectangle à coins arrondis 10"/>
-            <p:cNvSpPr/>
-            <p:nvPr/>
-          </p:nvSpPr>
-          <p:spPr>
-            <a:xfrm>
-              <a:off x="6629400" y="3200400"/>
-              <a:ext cx="2209800" cy="914400"/>
-            </a:xfrm>
-            <a:prstGeom prst="roundRect">
-              <a:avLst/>
-            </a:prstGeom>
-          </p:spPr>
-          <p:style>
-            <a:lnRef idx="2">
-              <a:schemeClr val="accent3">
-                <a:shade val="50000"/>
-              </a:schemeClr>
-            </a:lnRef>
-            <a:fillRef idx="1">
-              <a:schemeClr val="accent3"/>
-            </a:fillRef>
-            <a:effectRef idx="0">
-              <a:schemeClr val="accent3"/>
-            </a:effectRef>
-            <a:fontRef idx="minor">
-              <a:schemeClr val="lt1"/>
-            </a:fontRef>
-          </p:style>
-          <p:txBody>
-            <a:bodyPr rtlCol="0" anchor="ctr"/>
-            <a:lstStyle/>
-            <a:p>
-              <a:pPr algn="ctr"/>
-              <a:r>
-                <a:rPr lang="en-US" dirty="0" smtClean="0"/>
-                <a:t>Model</a:t>
-              </a:r>
-              <a:endParaRPr lang="en-US" dirty="0"/>
-            </a:p>
-          </p:txBody>
-        </p:sp>
-      </p:grpSp>
+          <a:prstGeom prst="roundRect">
+            <a:avLst/>
+          </a:prstGeom>
+        </p:spPr>
+        <p:style>
+          <a:lnRef idx="2">
+            <a:schemeClr val="accent3"/>
+          </a:lnRef>
+          <a:fillRef idx="1">
+            <a:schemeClr val="lt1"/>
+          </a:fillRef>
+          <a:effectRef idx="0">
+            <a:schemeClr val="accent3"/>
+          </a:effectRef>
+          <a:fontRef idx="minor">
+            <a:schemeClr val="dk1"/>
+          </a:fontRef>
+        </p:style>
+        <p:txBody>
+          <a:bodyPr rtlCol="0" anchor="t"/>
+          <a:lstStyle/>
+          <a:p>
+            <a:pPr algn="ctr"/>
+            <a:r>
+              <a:rPr lang="en-US" dirty="0" smtClean="0"/>
+              <a:t>Customization layer</a:t>
+            </a:r>
+            <a:endParaRPr lang="en-US" dirty="0"/>
+          </a:p>
+        </p:txBody>
+      </p:sp>
+      <p:sp>
+        <p:nvSpPr>
+          <p:cNvPr id="7" name="Rectangle à coins arrondis 6"/>
+          <p:cNvSpPr/>
+          <p:nvPr/>
+        </p:nvSpPr>
+        <p:spPr>
+          <a:xfrm>
+            <a:off x="304800" y="3200400"/>
+            <a:ext cx="6172200" cy="914400"/>
+          </a:xfrm>
+          <a:prstGeom prst="roundRect">
+            <a:avLst/>
+          </a:prstGeom>
+        </p:spPr>
+        <p:style>
+          <a:lnRef idx="2">
+            <a:schemeClr val="accent3">
+              <a:shade val="50000"/>
+            </a:schemeClr>
+          </a:lnRef>
+          <a:fillRef idx="1">
+            <a:schemeClr val="accent3"/>
+          </a:fillRef>
+          <a:effectRef idx="0">
+            <a:schemeClr val="accent3"/>
+          </a:effectRef>
+          <a:fontRef idx="minor">
+            <a:schemeClr val="lt1"/>
+          </a:fontRef>
+        </p:style>
+        <p:txBody>
+          <a:bodyPr rtlCol="0" anchor="ctr"/>
+          <a:lstStyle/>
+          <a:p>
+            <a:pPr algn="ctr"/>
+            <a:r>
+              <a:rPr lang="en-US" dirty="0" err="1" smtClean="0"/>
+              <a:t>EFieldSample</a:t>
+            </a:r>
+            <a:r>
+              <a:rPr lang="en-US" dirty="0" smtClean="0"/>
+              <a:t> – </a:t>
+            </a:r>
+            <a:r>
+              <a:rPr lang="en-US" dirty="0" err="1" smtClean="0"/>
+              <a:t>EGroupSample</a:t>
+            </a:r>
+            <a:r>
+              <a:rPr lang="en-US" dirty="0" smtClean="0"/>
+              <a:t> – </a:t>
+            </a:r>
+            <a:r>
+              <a:rPr lang="en-US" dirty="0" err="1" smtClean="0"/>
+              <a:t>BlockSample</a:t>
+            </a:r>
+            <a:r>
+              <a:rPr lang="en-US" dirty="0" smtClean="0"/>
+              <a:t> - </a:t>
+            </a:r>
+            <a:r>
+              <a:rPr lang="en-US" dirty="0" err="1" smtClean="0"/>
+              <a:t>EScreenSample</a:t>
+            </a:r>
+            <a:endParaRPr lang="en-US" dirty="0"/>
+          </a:p>
+        </p:txBody>
+      </p:sp>
+      <p:sp>
+        <p:nvSpPr>
+          <p:cNvPr id="11" name="Rectangle à coins arrondis 10"/>
+          <p:cNvSpPr/>
+          <p:nvPr/>
+        </p:nvSpPr>
+        <p:spPr>
+          <a:xfrm>
+            <a:off x="6629400" y="3200400"/>
+            <a:ext cx="2209800" cy="914400"/>
+          </a:xfrm>
+          <a:prstGeom prst="roundRect">
+            <a:avLst/>
+          </a:prstGeom>
+        </p:spPr>
+        <p:style>
+          <a:lnRef idx="2">
+            <a:schemeClr val="accent3">
+              <a:shade val="50000"/>
+            </a:schemeClr>
+          </a:lnRef>
+          <a:fillRef idx="1">
+            <a:schemeClr val="accent3"/>
+          </a:fillRef>
+          <a:effectRef idx="0">
+            <a:schemeClr val="accent3"/>
+          </a:effectRef>
+          <a:fontRef idx="minor">
+            <a:schemeClr val="lt1"/>
+          </a:fontRef>
+        </p:style>
+        <p:txBody>
+          <a:bodyPr rtlCol="0" anchor="ctr"/>
+          <a:lstStyle/>
+          <a:p>
+            <a:pPr algn="ctr"/>
+            <a:r>
+              <a:rPr lang="en-US" dirty="0" smtClean="0"/>
+              <a:t>Model</a:t>
+            </a:r>
+            <a:endParaRPr lang="en-US" dirty="0"/>
+          </a:p>
+        </p:txBody>
+      </p:sp>
     </p:spTree>
     <p:extLst>
       <p:ext uri="{BB962C8B-B14F-4D97-AF65-F5344CB8AC3E}">
-        <p14:creationId xmlns:p14="http://schemas.microsoft.com/office/powerpoint/2010/main" xmlns="" val="3627640579"/>
+        <p14:creationId xmlns:p14="http://schemas.microsoft.com/office/powerpoint/2010/main" val="3627640579"/>
       </p:ext>
     </p:extLst>
   </p:cSld>
@@ -5663,7 +5627,7 @@
           <a:blip r:embed="rId2" cstate="print">
             <a:extLst>
               <a:ext uri="{28A0092B-C50C-407E-A947-70E740481C1C}">
-                <a14:useLocalDpi xmlns:a14="http://schemas.microsoft.com/office/drawing/2010/main" xmlns="" val="0"/>
+                <a14:useLocalDpi xmlns:a14="http://schemas.microsoft.com/office/drawing/2010/main" val="0"/>
               </a:ext>
             </a:extLst>
           </a:blip>
@@ -5739,7 +5703,7 @@
     </p:spTree>
     <p:extLst>
       <p:ext uri="{BB962C8B-B14F-4D97-AF65-F5344CB8AC3E}">
-        <p14:creationId xmlns:p14="http://schemas.microsoft.com/office/powerpoint/2010/main" xmlns="" val="171061288"/>
+        <p14:creationId xmlns:p14="http://schemas.microsoft.com/office/powerpoint/2010/main" val="171061288"/>
       </p:ext>
     </p:extLst>
   </p:cSld>
@@ -5785,7 +5749,7 @@
           <a:blip r:embed="rId2" cstate="print">
             <a:extLst>
               <a:ext uri="{28A0092B-C50C-407E-A947-70E740481C1C}">
-                <a14:useLocalDpi xmlns:a14="http://schemas.microsoft.com/office/drawing/2010/main" xmlns="" val="0"/>
+                <a14:useLocalDpi xmlns:a14="http://schemas.microsoft.com/office/drawing/2010/main" val="0"/>
               </a:ext>
             </a:extLst>
           </a:blip>
@@ -6020,7 +5984,7 @@
     </p:spTree>
     <p:extLst>
       <p:ext uri="{BB962C8B-B14F-4D97-AF65-F5344CB8AC3E}">
-        <p14:creationId xmlns:p14="http://schemas.microsoft.com/office/powerpoint/2010/main" xmlns="" val="394514968"/>
+        <p14:creationId xmlns:p14="http://schemas.microsoft.com/office/powerpoint/2010/main" val="394514968"/>
       </p:ext>
     </p:extLst>
   </p:cSld>
@@ -6154,7 +6118,7 @@
           <a:blip r:embed="rId2" cstate="print">
             <a:extLst>
               <a:ext uri="{28A0092B-C50C-407E-A947-70E740481C1C}">
-                <a14:useLocalDpi xmlns:a14="http://schemas.microsoft.com/office/drawing/2010/main" xmlns="" val="0"/>
+                <a14:useLocalDpi xmlns:a14="http://schemas.microsoft.com/office/drawing/2010/main" val="0"/>
               </a:ext>
             </a:extLst>
           </a:blip>
@@ -6235,7 +6199,7 @@
     </p:spTree>
     <p:extLst>
       <p:ext uri="{BB962C8B-B14F-4D97-AF65-F5344CB8AC3E}">
-        <p14:creationId xmlns:p14="http://schemas.microsoft.com/office/powerpoint/2010/main" xmlns="" val="3593113261"/>
+        <p14:creationId xmlns:p14="http://schemas.microsoft.com/office/powerpoint/2010/main" val="3593113261"/>
       </p:ext>
     </p:extLst>
   </p:cSld>
@@ -6393,7 +6357,7 @@
           <a:blip r:embed="rId2" cstate="print">
             <a:extLst>
               <a:ext uri="{28A0092B-C50C-407E-A947-70E740481C1C}">
-                <a14:useLocalDpi xmlns:a14="http://schemas.microsoft.com/office/drawing/2010/main" xmlns="" val="0"/>
+                <a14:useLocalDpi xmlns:a14="http://schemas.microsoft.com/office/drawing/2010/main" val="0"/>
               </a:ext>
             </a:extLst>
           </a:blip>
@@ -6469,7 +6433,7 @@
     </p:spTree>
     <p:extLst>
       <p:ext uri="{BB962C8B-B14F-4D97-AF65-F5344CB8AC3E}">
-        <p14:creationId xmlns:p14="http://schemas.microsoft.com/office/powerpoint/2010/main" xmlns="" val="451913240"/>
+        <p14:creationId xmlns:p14="http://schemas.microsoft.com/office/powerpoint/2010/main" val="451913240"/>
       </p:ext>
     </p:extLst>
   </p:cSld>
@@ -6528,17 +6492,17 @@
       </p:sp>
       <p:pic>
         <p:nvPicPr>
-          <p:cNvPr id="5" name="Image 4"/>
+          <p:cNvPr id="112" name="Image 111"/>
           <p:cNvPicPr>
             <a:picLocks noChangeAspect="1"/>
           </p:cNvPicPr>
           <p:nvPr/>
         </p:nvPicPr>
         <p:blipFill>
-          <a:blip r:embed="rId2" cstate="print">
+          <a:blip r:embed="rId3" cstate="print">
             <a:extLst>
               <a:ext uri="{28A0092B-C50C-407E-A947-70E740481C1C}">
-                <a14:useLocalDpi xmlns:a14="http://schemas.microsoft.com/office/drawing/2010/main" xmlns="" val="0"/>
+                <a14:useLocalDpi xmlns:a14="http://schemas.microsoft.com/office/drawing/2010/main" val="0"/>
               </a:ext>
             </a:extLst>
           </a:blip>
@@ -6548,18 +6512,194 @@
         </p:blipFill>
         <p:spPr>
           <a:xfrm>
-            <a:off x="1063424" y="1171573"/>
-            <a:ext cx="6708976" cy="5608563"/>
+            <a:off x="152400" y="1524000"/>
+            <a:ext cx="8854939" cy="4118128"/>
           </a:xfrm>
           <a:prstGeom prst="rect">
             <a:avLst/>
           </a:prstGeom>
         </p:spPr>
       </p:pic>
+      <p:sp>
+        <p:nvSpPr>
+          <p:cNvPr id="113" name="Rectangle à coins arrondis 112"/>
+          <p:cNvSpPr/>
+          <p:nvPr/>
+        </p:nvSpPr>
+        <p:spPr>
+          <a:xfrm>
+            <a:off x="2819400" y="5804647"/>
+            <a:ext cx="2209800" cy="914400"/>
+          </a:xfrm>
+          <a:prstGeom prst="roundRect">
+            <a:avLst/>
+          </a:prstGeom>
+        </p:spPr>
+        <p:style>
+          <a:lnRef idx="2">
+            <a:schemeClr val="accent1">
+              <a:shade val="50000"/>
+            </a:schemeClr>
+          </a:lnRef>
+          <a:fillRef idx="1">
+            <a:schemeClr val="accent1"/>
+          </a:fillRef>
+          <a:effectRef idx="0">
+            <a:schemeClr val="accent1"/>
+          </a:effectRef>
+          <a:fontRef idx="minor">
+            <a:schemeClr val="lt1"/>
+          </a:fontRef>
+        </p:style>
+        <p:txBody>
+          <a:bodyPr rtlCol="0" anchor="ctr"/>
+          <a:lstStyle/>
+          <a:p>
+            <a:pPr algn="ctr"/>
+            <a:r>
+              <a:rPr lang="en-US" dirty="0" smtClean="0"/>
+              <a:t>MetaModel</a:t>
+            </a:r>
+            <a:endParaRPr lang="en-US" dirty="0"/>
+          </a:p>
+        </p:txBody>
+      </p:sp>
+      <p:sp>
+        <p:nvSpPr>
+          <p:cNvPr id="114" name="Rectangle à coins arrondis 113"/>
+          <p:cNvSpPr/>
+          <p:nvPr/>
+        </p:nvSpPr>
+        <p:spPr>
+          <a:xfrm>
+            <a:off x="5257800" y="5804647"/>
+            <a:ext cx="1676400" cy="914400"/>
+          </a:xfrm>
+          <a:prstGeom prst="roundRect">
+            <a:avLst/>
+          </a:prstGeom>
+        </p:spPr>
+        <p:style>
+          <a:lnRef idx="2">
+            <a:schemeClr val="accent2">
+              <a:shade val="50000"/>
+            </a:schemeClr>
+          </a:lnRef>
+          <a:fillRef idx="1">
+            <a:schemeClr val="accent2"/>
+          </a:fillRef>
+          <a:effectRef idx="0">
+            <a:schemeClr val="accent2"/>
+          </a:effectRef>
+          <a:fontRef idx="minor">
+            <a:schemeClr val="lt1"/>
+          </a:fontRef>
+        </p:style>
+        <p:txBody>
+          <a:bodyPr rtlCol="0" anchor="ctr"/>
+          <a:lstStyle/>
+          <a:p>
+            <a:pPr algn="ctr"/>
+            <a:r>
+              <a:rPr lang="en-US" dirty="0" smtClean="0"/>
+              <a:t>Model Instance (runtime)</a:t>
+            </a:r>
+            <a:endParaRPr lang="en-US" dirty="0"/>
+          </a:p>
+        </p:txBody>
+      </p:sp>
+      <p:sp>
+        <p:nvSpPr>
+          <p:cNvPr id="115" name="Rectangle à coins arrondis 114"/>
+          <p:cNvSpPr/>
+          <p:nvPr/>
+        </p:nvSpPr>
+        <p:spPr>
+          <a:xfrm>
+            <a:off x="7147061" y="5813612"/>
+            <a:ext cx="1768339" cy="914400"/>
+          </a:xfrm>
+          <a:prstGeom prst="roundRect">
+            <a:avLst/>
+          </a:prstGeom>
+        </p:spPr>
+        <p:style>
+          <a:lnRef idx="2">
+            <a:schemeClr val="accent6">
+              <a:shade val="50000"/>
+            </a:schemeClr>
+          </a:lnRef>
+          <a:fillRef idx="1">
+            <a:schemeClr val="accent6"/>
+          </a:fillRef>
+          <a:effectRef idx="0">
+            <a:schemeClr val="accent6"/>
+          </a:effectRef>
+          <a:fontRef idx="minor">
+            <a:schemeClr val="lt1"/>
+          </a:fontRef>
+        </p:style>
+        <p:txBody>
+          <a:bodyPr rtlCol="0" anchor="ctr"/>
+          <a:lstStyle/>
+          <a:p>
+            <a:pPr algn="ctr"/>
+            <a:r>
+              <a:rPr lang="en-US" dirty="0" smtClean="0"/>
+              <a:t>View of the MVC pattern (runtime)</a:t>
+            </a:r>
+            <a:endParaRPr lang="en-US" dirty="0"/>
+          </a:p>
+        </p:txBody>
+      </p:sp>
+      <p:sp>
+        <p:nvSpPr>
+          <p:cNvPr id="116" name="Rectangle à coins arrondis 115"/>
+          <p:cNvSpPr/>
+          <p:nvPr/>
+        </p:nvSpPr>
+        <p:spPr>
+          <a:xfrm>
+            <a:off x="152400" y="5791200"/>
+            <a:ext cx="1981200" cy="914400"/>
+          </a:xfrm>
+          <a:prstGeom prst="roundRect">
+            <a:avLst/>
+          </a:prstGeom>
+        </p:spPr>
+        <p:style>
+          <a:lnRef idx="2">
+            <a:schemeClr val="accent3">
+              <a:shade val="50000"/>
+            </a:schemeClr>
+          </a:lnRef>
+          <a:fillRef idx="1">
+            <a:schemeClr val="accent3"/>
+          </a:fillRef>
+          <a:effectRef idx="0">
+            <a:schemeClr val="accent3"/>
+          </a:effectRef>
+          <a:fontRef idx="minor">
+            <a:schemeClr val="lt1"/>
+          </a:fontRef>
+        </p:style>
+        <p:txBody>
+          <a:bodyPr rtlCol="0" anchor="ctr"/>
+          <a:lstStyle/>
+          <a:p>
+            <a:pPr algn="ctr"/>
+            <a:r>
+              <a:rPr lang="en-US" dirty="0" smtClean="0"/>
+              <a:t>Model</a:t>
+            </a:r>
+            <a:endParaRPr lang="en-US" dirty="0"/>
+          </a:p>
+        </p:txBody>
+      </p:sp>
     </p:spTree>
     <p:extLst>
       <p:ext uri="{BB962C8B-B14F-4D97-AF65-F5344CB8AC3E}">
-        <p14:creationId xmlns:p14="http://schemas.microsoft.com/office/powerpoint/2010/main" xmlns="" val="2009636028"/>
+        <p14:creationId xmlns:p14="http://schemas.microsoft.com/office/powerpoint/2010/main" val="2009636028"/>
       </p:ext>
     </p:extLst>
   </p:cSld>
@@ -6618,7 +6758,7 @@
       </p:sp>
       <p:pic>
         <p:nvPicPr>
-          <p:cNvPr id="5" name="Image 4"/>
+          <p:cNvPr id="4" name="Image 3"/>
           <p:cNvPicPr>
             <a:picLocks noChangeAspect="1"/>
           </p:cNvPicPr>
@@ -6628,7 +6768,7 @@
           <a:blip r:embed="rId2" cstate="print">
             <a:extLst>
               <a:ext uri="{28A0092B-C50C-407E-A947-70E740481C1C}">
-                <a14:useLocalDpi xmlns:a14="http://schemas.microsoft.com/office/drawing/2010/main" xmlns="" val="0"/>
+                <a14:useLocalDpi xmlns:a14="http://schemas.microsoft.com/office/drawing/2010/main" val="0"/>
               </a:ext>
             </a:extLst>
           </a:blip>
@@ -6638,18 +6778,194 @@
         </p:blipFill>
         <p:spPr>
           <a:xfrm>
-            <a:off x="1604963" y="1139405"/>
-            <a:ext cx="5862637" cy="5642395"/>
+            <a:off x="165300" y="1524000"/>
+            <a:ext cx="8869412" cy="4114800"/>
           </a:xfrm>
           <a:prstGeom prst="rect">
             <a:avLst/>
           </a:prstGeom>
         </p:spPr>
       </p:pic>
+      <p:sp>
+        <p:nvSpPr>
+          <p:cNvPr id="6" name="Rectangle à coins arrondis 5"/>
+          <p:cNvSpPr/>
+          <p:nvPr/>
+        </p:nvSpPr>
+        <p:spPr>
+          <a:xfrm>
+            <a:off x="2438400" y="5813612"/>
+            <a:ext cx="1447800" cy="914400"/>
+          </a:xfrm>
+          <a:prstGeom prst="roundRect">
+            <a:avLst/>
+          </a:prstGeom>
+        </p:spPr>
+        <p:style>
+          <a:lnRef idx="2">
+            <a:schemeClr val="accent1">
+              <a:shade val="50000"/>
+            </a:schemeClr>
+          </a:lnRef>
+          <a:fillRef idx="1">
+            <a:schemeClr val="accent1"/>
+          </a:fillRef>
+          <a:effectRef idx="0">
+            <a:schemeClr val="accent1"/>
+          </a:effectRef>
+          <a:fontRef idx="minor">
+            <a:schemeClr val="lt1"/>
+          </a:fontRef>
+        </p:style>
+        <p:txBody>
+          <a:bodyPr rtlCol="0" anchor="ctr"/>
+          <a:lstStyle/>
+          <a:p>
+            <a:pPr algn="ctr"/>
+            <a:r>
+              <a:rPr lang="en-US" dirty="0" smtClean="0"/>
+              <a:t>MetaModel</a:t>
+            </a:r>
+            <a:endParaRPr lang="en-US" dirty="0"/>
+          </a:p>
+        </p:txBody>
+      </p:sp>
+      <p:sp>
+        <p:nvSpPr>
+          <p:cNvPr id="7" name="Rectangle à coins arrondis 6"/>
+          <p:cNvSpPr/>
+          <p:nvPr/>
+        </p:nvSpPr>
+        <p:spPr>
+          <a:xfrm>
+            <a:off x="4495800" y="5813612"/>
+            <a:ext cx="1905000" cy="914400"/>
+          </a:xfrm>
+          <a:prstGeom prst="roundRect">
+            <a:avLst/>
+          </a:prstGeom>
+        </p:spPr>
+        <p:style>
+          <a:lnRef idx="2">
+            <a:schemeClr val="accent2">
+              <a:shade val="50000"/>
+            </a:schemeClr>
+          </a:lnRef>
+          <a:fillRef idx="1">
+            <a:schemeClr val="accent2"/>
+          </a:fillRef>
+          <a:effectRef idx="0">
+            <a:schemeClr val="accent2"/>
+          </a:effectRef>
+          <a:fontRef idx="minor">
+            <a:schemeClr val="lt1"/>
+          </a:fontRef>
+        </p:style>
+        <p:txBody>
+          <a:bodyPr rtlCol="0" anchor="ctr"/>
+          <a:lstStyle/>
+          <a:p>
+            <a:pPr algn="ctr"/>
+            <a:r>
+              <a:rPr lang="en-US" dirty="0" smtClean="0"/>
+              <a:t>Model Instance (runtime)</a:t>
+            </a:r>
+            <a:endParaRPr lang="en-US" dirty="0"/>
+          </a:p>
+        </p:txBody>
+      </p:sp>
+      <p:sp>
+        <p:nvSpPr>
+          <p:cNvPr id="8" name="Rectangle à coins arrondis 7"/>
+          <p:cNvSpPr/>
+          <p:nvPr/>
+        </p:nvSpPr>
+        <p:spPr>
+          <a:xfrm>
+            <a:off x="6934200" y="5813612"/>
+            <a:ext cx="2133600" cy="914400"/>
+          </a:xfrm>
+          <a:prstGeom prst="roundRect">
+            <a:avLst/>
+          </a:prstGeom>
+        </p:spPr>
+        <p:style>
+          <a:lnRef idx="2">
+            <a:schemeClr val="accent6">
+              <a:shade val="50000"/>
+            </a:schemeClr>
+          </a:lnRef>
+          <a:fillRef idx="1">
+            <a:schemeClr val="accent6"/>
+          </a:fillRef>
+          <a:effectRef idx="0">
+            <a:schemeClr val="accent6"/>
+          </a:effectRef>
+          <a:fontRef idx="minor">
+            <a:schemeClr val="lt1"/>
+          </a:fontRef>
+        </p:style>
+        <p:txBody>
+          <a:bodyPr rtlCol="0" anchor="ctr"/>
+          <a:lstStyle/>
+          <a:p>
+            <a:pPr algn="ctr"/>
+            <a:r>
+              <a:rPr lang="en-US" dirty="0" smtClean="0"/>
+              <a:t>View of the MVC pattern (runtime)</a:t>
+            </a:r>
+            <a:endParaRPr lang="en-US" dirty="0"/>
+          </a:p>
+        </p:txBody>
+      </p:sp>
+      <p:sp>
+        <p:nvSpPr>
+          <p:cNvPr id="9" name="Rectangle à coins arrondis 8"/>
+          <p:cNvSpPr/>
+          <p:nvPr/>
+        </p:nvSpPr>
+        <p:spPr>
+          <a:xfrm>
+            <a:off x="152400" y="5791200"/>
+            <a:ext cx="1981200" cy="914400"/>
+          </a:xfrm>
+          <a:prstGeom prst="roundRect">
+            <a:avLst/>
+          </a:prstGeom>
+        </p:spPr>
+        <p:style>
+          <a:lnRef idx="2">
+            <a:schemeClr val="accent3">
+              <a:shade val="50000"/>
+            </a:schemeClr>
+          </a:lnRef>
+          <a:fillRef idx="1">
+            <a:schemeClr val="accent3"/>
+          </a:fillRef>
+          <a:effectRef idx="0">
+            <a:schemeClr val="accent3"/>
+          </a:effectRef>
+          <a:fontRef idx="minor">
+            <a:schemeClr val="lt1"/>
+          </a:fontRef>
+        </p:style>
+        <p:txBody>
+          <a:bodyPr rtlCol="0" anchor="ctr"/>
+          <a:lstStyle/>
+          <a:p>
+            <a:pPr algn="ctr"/>
+            <a:r>
+              <a:rPr lang="en-US" dirty="0" smtClean="0"/>
+              <a:t>Model</a:t>
+            </a:r>
+            <a:endParaRPr lang="en-US" dirty="0"/>
+          </a:p>
+        </p:txBody>
+      </p:sp>
     </p:spTree>
     <p:extLst>
       <p:ext uri="{BB962C8B-B14F-4D97-AF65-F5344CB8AC3E}">
-        <p14:creationId xmlns:p14="http://schemas.microsoft.com/office/powerpoint/2010/main" xmlns="" val="1131833659"/>
+        <p14:creationId xmlns:p14="http://schemas.microsoft.com/office/powerpoint/2010/main" val="1131833659"/>
       </p:ext>
     </p:extLst>
   </p:cSld>
@@ -6798,7 +7114,11 @@
             <a:pPr lvl="1"/>
             <a:r>
               <a:rPr lang="en-US" sz="1800" dirty="0" smtClean="0"/>
-              <a:t>Services Platform for J2EE</a:t>
+              <a:t>SOA Platform </a:t>
+            </a:r>
+            <a:r>
+              <a:rPr lang="en-US" sz="1800" dirty="0" smtClean="0"/>
+              <a:t>for J2EE</a:t>
             </a:r>
           </a:p>
           <a:p>
@@ -6885,7 +7205,11 @@
             <a:pPr lvl="1"/>
             <a:r>
               <a:rPr lang="en-US" sz="1800" dirty="0" smtClean="0"/>
-              <a:t>Services Platform for J2EE</a:t>
+              <a:t>SOA Platform </a:t>
+            </a:r>
+            <a:r>
+              <a:rPr lang="en-US" sz="1800" dirty="0" smtClean="0"/>
+              <a:t>for J2EE</a:t>
             </a:r>
           </a:p>
           <a:p>
@@ -6919,7 +7243,7 @@
           <a:blip r:embed="rId2" cstate="print">
             <a:extLst>
               <a:ext uri="{28A0092B-C50C-407E-A947-70E740481C1C}">
-                <a14:useLocalDpi xmlns:a14="http://schemas.microsoft.com/office/drawing/2010/main" xmlns=""/>
+                <a14:useLocalDpi xmlns:a14="http://schemas.microsoft.com/office/drawing/2010/main"/>
               </a:ext>
             </a:extLst>
           </a:blip>
@@ -6944,7 +7268,7 @@
     </p:spTree>
     <p:extLst>
       <p:ext uri="{BB962C8B-B14F-4D97-AF65-F5344CB8AC3E}">
-        <p14:creationId xmlns:p14="http://schemas.microsoft.com/office/powerpoint/2010/main" xmlns="" val="1630604182"/>
+        <p14:creationId xmlns:p14="http://schemas.microsoft.com/office/powerpoint/2010/main" val="1630604182"/>
       </p:ext>
     </p:extLst>
   </p:cSld>
@@ -7013,7 +7337,7 @@
           <a:blip r:embed="rId2" cstate="print">
             <a:extLst>
               <a:ext uri="{28A0092B-C50C-407E-A947-70E740481C1C}">
-                <a14:useLocalDpi xmlns:a14="http://schemas.microsoft.com/office/drawing/2010/main" xmlns="" val="0"/>
+                <a14:useLocalDpi xmlns:a14="http://schemas.microsoft.com/office/drawing/2010/main" val="0"/>
               </a:ext>
             </a:extLst>
           </a:blip>
@@ -7034,7 +7358,7 @@
     </p:spTree>
     <p:extLst>
       <p:ext uri="{BB962C8B-B14F-4D97-AF65-F5344CB8AC3E}">
-        <p14:creationId xmlns:p14="http://schemas.microsoft.com/office/powerpoint/2010/main" xmlns="" val="1848404178"/>
+        <p14:creationId xmlns:p14="http://schemas.microsoft.com/office/powerpoint/2010/main" val="1848404178"/>
       </p:ext>
     </p:extLst>
   </p:cSld>
@@ -7195,7 +7519,7 @@
     </p:spTree>
     <p:extLst>
       <p:ext uri="{BB962C8B-B14F-4D97-AF65-F5344CB8AC3E}">
-        <p14:creationId xmlns:p14="http://schemas.microsoft.com/office/powerpoint/2010/main" xmlns="" val="1155854373"/>
+        <p14:creationId xmlns:p14="http://schemas.microsoft.com/office/powerpoint/2010/main" val="1155854373"/>
       </p:ext>
     </p:extLst>
   </p:cSld>
@@ -7380,7 +7704,7 @@
     </p:spTree>
     <p:extLst>
       <p:ext uri="{BB962C8B-B14F-4D97-AF65-F5344CB8AC3E}">
-        <p14:creationId xmlns:p14="http://schemas.microsoft.com/office/powerpoint/2010/main" xmlns="" val="1027356186"/>
+        <p14:creationId xmlns:p14="http://schemas.microsoft.com/office/powerpoint/2010/main" val="1027356186"/>
       </p:ext>
     </p:extLst>
   </p:cSld>
@@ -7449,7 +7773,7 @@
           <a:blip r:embed="rId2" cstate="print">
             <a:extLst>
               <a:ext uri="{28A0092B-C50C-407E-A947-70E740481C1C}">
-                <a14:useLocalDpi xmlns:a14="http://schemas.microsoft.com/office/drawing/2010/main" xmlns="" val="0"/>
+                <a14:useLocalDpi xmlns:a14="http://schemas.microsoft.com/office/drawing/2010/main" val="0"/>
               </a:ext>
             </a:extLst>
           </a:blip>
@@ -7479,7 +7803,7 @@
           <a:blip r:embed="rId3" cstate="print">
             <a:extLst>
               <a:ext uri="{28A0092B-C50C-407E-A947-70E740481C1C}">
-                <a14:useLocalDpi xmlns:a14="http://schemas.microsoft.com/office/drawing/2010/main" xmlns="" val="0"/>
+                <a14:useLocalDpi xmlns:a14="http://schemas.microsoft.com/office/drawing/2010/main" val="0"/>
               </a:ext>
             </a:extLst>
           </a:blip>
@@ -7503,7 +7827,7 @@
     </p:spTree>
     <p:extLst>
       <p:ext uri="{BB962C8B-B14F-4D97-AF65-F5344CB8AC3E}">
-        <p14:creationId xmlns:p14="http://schemas.microsoft.com/office/powerpoint/2010/main" xmlns="" val="2369171751"/>
+        <p14:creationId xmlns:p14="http://schemas.microsoft.com/office/powerpoint/2010/main" val="2369171751"/>
       </p:ext>
     </p:extLst>
   </p:cSld>
@@ -7572,7 +7896,7 @@
           <a:blip r:embed="rId2" cstate="print">
             <a:extLst>
               <a:ext uri="{28A0092B-C50C-407E-A947-70E740481C1C}">
-                <a14:useLocalDpi xmlns:a14="http://schemas.microsoft.com/office/drawing/2010/main" xmlns="" val="0"/>
+                <a14:useLocalDpi xmlns:a14="http://schemas.microsoft.com/office/drawing/2010/main" val="0"/>
               </a:ext>
             </a:extLst>
           </a:blip>
@@ -7602,7 +7926,7 @@
           <a:blip r:embed="rId3" cstate="print">
             <a:extLst>
               <a:ext uri="{28A0092B-C50C-407E-A947-70E740481C1C}">
-                <a14:useLocalDpi xmlns:a14="http://schemas.microsoft.com/office/drawing/2010/main" xmlns="" val="0"/>
+                <a14:useLocalDpi xmlns:a14="http://schemas.microsoft.com/office/drawing/2010/main" val="0"/>
               </a:ext>
             </a:extLst>
           </a:blip>
@@ -7632,7 +7956,7 @@
           <a:blip r:embed="rId4" cstate="print">
             <a:extLst>
               <a:ext uri="{28A0092B-C50C-407E-A947-70E740481C1C}">
-                <a14:useLocalDpi xmlns:a14="http://schemas.microsoft.com/office/drawing/2010/main" xmlns="" val="0"/>
+                <a14:useLocalDpi xmlns:a14="http://schemas.microsoft.com/office/drawing/2010/main" val="0"/>
               </a:ext>
             </a:extLst>
           </a:blip>
@@ -7748,7 +8072,7 @@
     </p:spTree>
     <p:extLst>
       <p:ext uri="{BB962C8B-B14F-4D97-AF65-F5344CB8AC3E}">
-        <p14:creationId xmlns:p14="http://schemas.microsoft.com/office/powerpoint/2010/main" xmlns="" val="3216378839"/>
+        <p14:creationId xmlns:p14="http://schemas.microsoft.com/office/powerpoint/2010/main" val="3216378839"/>
       </p:ext>
     </p:extLst>
   </p:cSld>
@@ -7817,7 +8141,7 @@
           <a:blip r:embed="rId2" cstate="print">
             <a:extLst>
               <a:ext uri="{28A0092B-C50C-407E-A947-70E740481C1C}">
-                <a14:useLocalDpi xmlns:a14="http://schemas.microsoft.com/office/drawing/2010/main" xmlns="" val="0"/>
+                <a14:useLocalDpi xmlns:a14="http://schemas.microsoft.com/office/drawing/2010/main" val="0"/>
               </a:ext>
             </a:extLst>
           </a:blip>
@@ -7926,7 +8250,7 @@
     </p:spTree>
     <p:extLst>
       <p:ext uri="{BB962C8B-B14F-4D97-AF65-F5344CB8AC3E}">
-        <p14:creationId xmlns:p14="http://schemas.microsoft.com/office/powerpoint/2010/main" xmlns="" val="2527117896"/>
+        <p14:creationId xmlns:p14="http://schemas.microsoft.com/office/powerpoint/2010/main" val="2527117896"/>
       </p:ext>
     </p:extLst>
   </p:cSld>
@@ -8115,7 +8439,7 @@
     </p:spTree>
     <p:extLst>
       <p:ext uri="{BB962C8B-B14F-4D97-AF65-F5344CB8AC3E}">
-        <p14:creationId xmlns:p14="http://schemas.microsoft.com/office/powerpoint/2010/main" xmlns="" val="3098398089"/>
+        <p14:creationId xmlns:p14="http://schemas.microsoft.com/office/powerpoint/2010/main" val="3098398089"/>
       </p:ext>
     </p:extLst>
   </p:cSld>
@@ -8407,7 +8731,7 @@
     </p:spTree>
     <p:extLst>
       <p:ext uri="{BB962C8B-B14F-4D97-AF65-F5344CB8AC3E}">
-        <p14:creationId xmlns:p14="http://schemas.microsoft.com/office/powerpoint/2010/main" xmlns="" val="3449390454"/>
+        <p14:creationId xmlns:p14="http://schemas.microsoft.com/office/powerpoint/2010/main" val="3449390454"/>
       </p:ext>
     </p:extLst>
   </p:cSld>
@@ -9105,7 +9429,7 @@
     </p:spTree>
     <p:extLst>
       <p:ext uri="{BB962C8B-B14F-4D97-AF65-F5344CB8AC3E}">
-        <p14:creationId xmlns:p14="http://schemas.microsoft.com/office/powerpoint/2010/main" xmlns="" val="4006469721"/>
+        <p14:creationId xmlns:p14="http://schemas.microsoft.com/office/powerpoint/2010/main" val="4006469721"/>
       </p:ext>
     </p:extLst>
   </p:cSld>
@@ -9497,7 +9821,7 @@
     </p:spTree>
     <p:extLst>
       <p:ext uri="{BB962C8B-B14F-4D97-AF65-F5344CB8AC3E}">
-        <p14:creationId xmlns:p14="http://schemas.microsoft.com/office/powerpoint/2010/main" xmlns="" val="1678422724"/>
+        <p14:creationId xmlns:p14="http://schemas.microsoft.com/office/powerpoint/2010/main" val="1678422724"/>
       </p:ext>
     </p:extLst>
   </p:cSld>
@@ -9581,54 +9905,111 @@
             </a:pPr>
             <a:r>
               <a:rPr lang="en-US" dirty="0" smtClean="0"/>
-              <a:t>Car journey (160 questions)</a:t>
-            </a:r>
-          </a:p>
-          <a:p>
-            <a:pPr lvl="1">
-              <a:buFont typeface="Wingdings" pitchFamily="2" charset="2"/>
-              <a:buChar char="§"/>
-            </a:pPr>
-            <a:r>
-              <a:rPr lang="en-US" dirty="0" smtClean="0"/>
-              <a:t>Motorbike journey (180 questions)</a:t>
-            </a:r>
-          </a:p>
-          <a:p>
-            <a:pPr lvl="1">
-              <a:buFont typeface="Wingdings" pitchFamily="2" charset="2"/>
-              <a:buChar char="§"/>
-            </a:pPr>
-            <a:r>
-              <a:rPr lang="en-US" dirty="0" smtClean="0"/>
-              <a:t>Health journey (50 questions)</a:t>
-            </a:r>
-          </a:p>
-          <a:p>
-            <a:pPr lvl="1">
-              <a:buFont typeface="Wingdings" pitchFamily="2" charset="2"/>
-              <a:buChar char="§"/>
-            </a:pPr>
-            <a:r>
-              <a:rPr lang="en-US" dirty="0" smtClean="0"/>
-              <a:t>Home journey (70 questions)</a:t>
-            </a:r>
-          </a:p>
-          <a:p>
-            <a:pPr lvl="1">
-              <a:buFont typeface="Wingdings" pitchFamily="2" charset="2"/>
-              <a:buChar char="§"/>
-            </a:pPr>
-            <a:r>
-              <a:rPr lang="en-US" dirty="0" smtClean="0"/>
-              <a:t>Loan journey (40 questions)</a:t>
-            </a:r>
-          </a:p>
-          <a:p>
-            <a:r>
-              <a:rPr lang="en-US" dirty="0" smtClean="0"/>
-              <a:t>A lot of linked questions with business rules</a:t>
-            </a:r>
+              <a:t>Car </a:t>
+            </a:r>
+            <a:r>
+              <a:rPr lang="en-US" dirty="0" smtClean="0"/>
+              <a:t>form (160 </a:t>
+            </a:r>
+            <a:r>
+              <a:rPr lang="en-US" dirty="0" smtClean="0"/>
+              <a:t>questions)</a:t>
+            </a:r>
+          </a:p>
+          <a:p>
+            <a:pPr lvl="1"/>
+            <a:r>
+              <a:rPr lang="en-US" dirty="0" smtClean="0"/>
+              <a:t>Motorbike </a:t>
+            </a:r>
+            <a:r>
+              <a:rPr lang="en-US" dirty="0"/>
+              <a:t>form </a:t>
+            </a:r>
+            <a:r>
+              <a:rPr lang="en-US" dirty="0" smtClean="0"/>
+              <a:t>(</a:t>
+            </a:r>
+            <a:r>
+              <a:rPr lang="en-US" dirty="0" smtClean="0"/>
+              <a:t>180 questions)</a:t>
+            </a:r>
+          </a:p>
+          <a:p>
+            <a:pPr lvl="1"/>
+            <a:r>
+              <a:rPr lang="en-US" dirty="0" smtClean="0"/>
+              <a:t>Health </a:t>
+            </a:r>
+            <a:r>
+              <a:rPr lang="en-US" dirty="0"/>
+              <a:t>form </a:t>
+            </a:r>
+            <a:r>
+              <a:rPr lang="en-US" dirty="0" smtClean="0"/>
+              <a:t>(</a:t>
+            </a:r>
+            <a:r>
+              <a:rPr lang="en-US" dirty="0" smtClean="0"/>
+              <a:t>50 questions)</a:t>
+            </a:r>
+          </a:p>
+          <a:p>
+            <a:pPr lvl="1"/>
+            <a:r>
+              <a:rPr lang="en-US" dirty="0" smtClean="0"/>
+              <a:t>Home </a:t>
+            </a:r>
+            <a:r>
+              <a:rPr lang="en-US" dirty="0"/>
+              <a:t>form </a:t>
+            </a:r>
+            <a:r>
+              <a:rPr lang="en-US" dirty="0" smtClean="0"/>
+              <a:t>(</a:t>
+            </a:r>
+            <a:r>
+              <a:rPr lang="en-US" dirty="0" smtClean="0"/>
+              <a:t>70 questions)</a:t>
+            </a:r>
+          </a:p>
+          <a:p>
+            <a:pPr lvl="1"/>
+            <a:r>
+              <a:rPr lang="en-US" dirty="0" smtClean="0"/>
+              <a:t>Loan </a:t>
+            </a:r>
+            <a:r>
+              <a:rPr lang="en-US" dirty="0"/>
+              <a:t>form </a:t>
+            </a:r>
+            <a:r>
+              <a:rPr lang="en-US" dirty="0" smtClean="0"/>
+              <a:t>(</a:t>
+            </a:r>
+            <a:r>
+              <a:rPr lang="en-US" dirty="0" smtClean="0"/>
+              <a:t>40 questions)</a:t>
+            </a:r>
+          </a:p>
+          <a:p>
+            <a:r>
+              <a:rPr lang="en-US" dirty="0" smtClean="0"/>
+              <a:t>A lot of </a:t>
+            </a:r>
+            <a:r>
+              <a:rPr lang="en-US" dirty="0" smtClean="0"/>
+              <a:t>questions </a:t>
+            </a:r>
+            <a:r>
+              <a:rPr lang="en-US" dirty="0" smtClean="0"/>
+              <a:t>with business </a:t>
+            </a:r>
+            <a:r>
+              <a:rPr lang="en-US" dirty="0" smtClean="0"/>
+              <a:t>rules that are linked by dependencies and business rules</a:t>
+            </a:r>
+            <a:endParaRPr lang="en-US" dirty="0" smtClean="0"/>
           </a:p>
           <a:p>
             <a:endParaRPr lang="en-US" dirty="0"/>
@@ -9638,7 +10019,7 @@
     </p:spTree>
     <p:extLst>
       <p:ext uri="{BB962C8B-B14F-4D97-AF65-F5344CB8AC3E}">
-        <p14:creationId xmlns:p14="http://schemas.microsoft.com/office/powerpoint/2010/main" xmlns="" val="3312784383"/>
+        <p14:creationId xmlns:p14="http://schemas.microsoft.com/office/powerpoint/2010/main" val="3312784383"/>
       </p:ext>
     </p:extLst>
   </p:cSld>
@@ -10427,7 +10808,7 @@
     </p:spTree>
     <p:extLst>
       <p:ext uri="{BB962C8B-B14F-4D97-AF65-F5344CB8AC3E}">
-        <p14:creationId xmlns:p14="http://schemas.microsoft.com/office/powerpoint/2010/main" xmlns="" val="2792941284"/>
+        <p14:creationId xmlns:p14="http://schemas.microsoft.com/office/powerpoint/2010/main" val="2792941284"/>
       </p:ext>
     </p:extLst>
   </p:cSld>
@@ -10473,7 +10854,7 @@
           <a:blip r:embed="rId2" cstate="print">
             <a:extLst>
               <a:ext uri="{28A0092B-C50C-407E-A947-70E740481C1C}">
-                <a14:useLocalDpi xmlns:a14="http://schemas.microsoft.com/office/drawing/2010/main" xmlns="" val="0"/>
+                <a14:useLocalDpi xmlns:a14="http://schemas.microsoft.com/office/drawing/2010/main" val="0"/>
               </a:ext>
             </a:extLst>
           </a:blip>
@@ -10530,7 +10911,7 @@
           <p:nvPr>
             <p:extLst>
               <p:ext uri="{D42A27DB-BD31-4B8C-83A1-F6EECF244321}">
-                <p14:modId xmlns:p14="http://schemas.microsoft.com/office/powerpoint/2010/main" xmlns="" val="3204736979"/>
+                <p14:modId xmlns:p14="http://schemas.microsoft.com/office/powerpoint/2010/main" val="3204736979"/>
               </p:ext>
             </p:extLst>
           </p:nvPr>
@@ -10864,7 +11245,7 @@
     </p:spTree>
     <p:extLst>
       <p:ext uri="{BB962C8B-B14F-4D97-AF65-F5344CB8AC3E}">
-        <p14:creationId xmlns:p14="http://schemas.microsoft.com/office/powerpoint/2010/main" xmlns="" val="3195513628"/>
+        <p14:creationId xmlns:p14="http://schemas.microsoft.com/office/powerpoint/2010/main" val="3195513628"/>
       </p:ext>
     </p:extLst>
   </p:cSld>
@@ -11055,7 +11436,7 @@
     </p:spTree>
     <p:extLst>
       <p:ext uri="{BB962C8B-B14F-4D97-AF65-F5344CB8AC3E}">
-        <p14:creationId xmlns:p14="http://schemas.microsoft.com/office/powerpoint/2010/main" xmlns="" val="3220083538"/>
+        <p14:creationId xmlns:p14="http://schemas.microsoft.com/office/powerpoint/2010/main" val="3220083538"/>
       </p:ext>
     </p:extLst>
   </p:cSld>
@@ -11267,7 +11648,7 @@
     </p:spTree>
     <p:extLst>
       <p:ext uri="{BB962C8B-B14F-4D97-AF65-F5344CB8AC3E}">
-        <p14:creationId xmlns:p14="http://schemas.microsoft.com/office/powerpoint/2010/main" xmlns="" val="856396653"/>
+        <p14:creationId xmlns:p14="http://schemas.microsoft.com/office/powerpoint/2010/main" val="856396653"/>
       </p:ext>
     </p:extLst>
   </p:cSld>
@@ -11771,7 +12152,7 @@
     </p:spTree>
     <p:extLst>
       <p:ext uri="{BB962C8B-B14F-4D97-AF65-F5344CB8AC3E}">
-        <p14:creationId xmlns:p14="http://schemas.microsoft.com/office/powerpoint/2010/main" xmlns="" val="1556099287"/>
+        <p14:creationId xmlns:p14="http://schemas.microsoft.com/office/powerpoint/2010/main" val="1556099287"/>
       </p:ext>
     </p:extLst>
   </p:cSld>
@@ -12042,7 +12423,7 @@
     </p:spTree>
     <p:extLst>
       <p:ext uri="{BB962C8B-B14F-4D97-AF65-F5344CB8AC3E}">
-        <p14:creationId xmlns:p14="http://schemas.microsoft.com/office/powerpoint/2010/main" xmlns="" val="3443329555"/>
+        <p14:creationId xmlns:p14="http://schemas.microsoft.com/office/powerpoint/2010/main" val="3443329555"/>
       </p:ext>
     </p:extLst>
   </p:cSld>
@@ -12399,7 +12780,7 @@
     </p:spTree>
     <p:extLst>
       <p:ext uri="{BB962C8B-B14F-4D97-AF65-F5344CB8AC3E}">
-        <p14:creationId xmlns:p14="http://schemas.microsoft.com/office/powerpoint/2010/main" xmlns="" val="2948210574"/>
+        <p14:creationId xmlns:p14="http://schemas.microsoft.com/office/powerpoint/2010/main" val="2948210574"/>
       </p:ext>
     </p:extLst>
   </p:cSld>
@@ -12467,7 +12848,7 @@
           <p:nvPr>
             <p:extLst>
               <p:ext uri="{D42A27DB-BD31-4B8C-83A1-F6EECF244321}">
-                <p14:modId xmlns:p14="http://schemas.microsoft.com/office/powerpoint/2010/main" xmlns="" val="2181104498"/>
+                <p14:modId xmlns:p14="http://schemas.microsoft.com/office/powerpoint/2010/main" val="2181104498"/>
               </p:ext>
             </p:extLst>
           </p:nvPr>
@@ -13253,7 +13634,7 @@
     </p:spTree>
     <p:extLst>
       <p:ext uri="{BB962C8B-B14F-4D97-AF65-F5344CB8AC3E}">
-        <p14:creationId xmlns:p14="http://schemas.microsoft.com/office/powerpoint/2010/main" xmlns="" val="2197364214"/>
+        <p14:creationId xmlns:p14="http://schemas.microsoft.com/office/powerpoint/2010/main" val="2197364214"/>
       </p:ext>
     </p:extLst>
   </p:cSld>
@@ -13711,7 +14092,7 @@
     </p:spTree>
     <p:extLst>
       <p:ext uri="{BB962C8B-B14F-4D97-AF65-F5344CB8AC3E}">
-        <p14:creationId xmlns:p14="http://schemas.microsoft.com/office/powerpoint/2010/main" xmlns="" val="977874982"/>
+        <p14:creationId xmlns:p14="http://schemas.microsoft.com/office/powerpoint/2010/main" val="977874982"/>
       </p:ext>
     </p:extLst>
   </p:cSld>
@@ -13875,7 +14256,7 @@
     </p:spTree>
     <p:extLst>
       <p:ext uri="{BB962C8B-B14F-4D97-AF65-F5344CB8AC3E}">
-        <p14:creationId xmlns:p14="http://schemas.microsoft.com/office/powerpoint/2010/main" xmlns="" val="2092776985"/>
+        <p14:creationId xmlns:p14="http://schemas.microsoft.com/office/powerpoint/2010/main" val="2092776985"/>
       </p:ext>
     </p:extLst>
   </p:cSld>
@@ -14120,7 +14501,7 @@
     </p:spTree>
     <p:extLst>
       <p:ext uri="{BB962C8B-B14F-4D97-AF65-F5344CB8AC3E}">
-        <p14:creationId xmlns:p14="http://schemas.microsoft.com/office/powerpoint/2010/main" xmlns="" val="2834344091"/>
+        <p14:creationId xmlns:p14="http://schemas.microsoft.com/office/powerpoint/2010/main" val="2834344091"/>
       </p:ext>
     </p:extLst>
   </p:cSld>
@@ -14484,7 +14865,7 @@
           <a:blip r:embed="rId2" cstate="print">
             <a:extLst>
               <a:ext uri="{28A0092B-C50C-407E-A947-70E740481C1C}">
-                <a14:useLocalDpi xmlns:a14="http://schemas.microsoft.com/office/drawing/2010/main" xmlns="" val="0"/>
+                <a14:useLocalDpi xmlns:a14="http://schemas.microsoft.com/office/drawing/2010/main" val="0"/>
               </a:ext>
             </a:extLst>
           </a:blip>
@@ -14615,7 +14996,7 @@
     </p:spTree>
     <p:extLst>
       <p:ext uri="{BB962C8B-B14F-4D97-AF65-F5344CB8AC3E}">
-        <p14:creationId xmlns:p14="http://schemas.microsoft.com/office/powerpoint/2010/main" xmlns="" val="318706902"/>
+        <p14:creationId xmlns:p14="http://schemas.microsoft.com/office/powerpoint/2010/main" val="318706902"/>
       </p:ext>
     </p:extLst>
   </p:cSld>
@@ -14698,7 +15079,7 @@
           <p:nvPr>
             <p:extLst>
               <p:ext uri="{D42A27DB-BD31-4B8C-83A1-F6EECF244321}">
-                <p14:modId xmlns:p14="http://schemas.microsoft.com/office/powerpoint/2010/main" xmlns="" val="3075550189"/>
+                <p14:modId xmlns:p14="http://schemas.microsoft.com/office/powerpoint/2010/main" val="3075550189"/>
               </p:ext>
             </p:extLst>
           </p:nvPr>
@@ -15049,7 +15430,7 @@
           <a:blip r:embed="rId3" cstate="print">
             <a:extLst>
               <a:ext uri="{28A0092B-C50C-407E-A947-70E740481C1C}">
-                <a14:useLocalDpi xmlns:a14="http://schemas.microsoft.com/office/drawing/2010/main" xmlns="" val="0"/>
+                <a14:useLocalDpi xmlns:a14="http://schemas.microsoft.com/office/drawing/2010/main" val="0"/>
               </a:ext>
             </a:extLst>
           </a:blip>
@@ -15079,7 +15460,7 @@
           <a:blip r:embed="rId4" cstate="print">
             <a:extLst>
               <a:ext uri="{28A0092B-C50C-407E-A947-70E740481C1C}">
-                <a14:useLocalDpi xmlns:a14="http://schemas.microsoft.com/office/drawing/2010/main" xmlns="" val="0"/>
+                <a14:useLocalDpi xmlns:a14="http://schemas.microsoft.com/office/drawing/2010/main" val="0"/>
               </a:ext>
             </a:extLst>
           </a:blip>
@@ -15109,7 +15490,7 @@
           <a:blip r:embed="rId5" cstate="print">
             <a:extLst>
               <a:ext uri="{28A0092B-C50C-407E-A947-70E740481C1C}">
-                <a14:useLocalDpi xmlns:a14="http://schemas.microsoft.com/office/drawing/2010/main" xmlns="" val="0"/>
+                <a14:useLocalDpi xmlns:a14="http://schemas.microsoft.com/office/drawing/2010/main" val="0"/>
               </a:ext>
             </a:extLst>
           </a:blip>
@@ -15139,7 +15520,7 @@
           <a:blip r:embed="rId6" cstate="print">
             <a:extLst>
               <a:ext uri="{28A0092B-C50C-407E-A947-70E740481C1C}">
-                <a14:useLocalDpi xmlns:a14="http://schemas.microsoft.com/office/drawing/2010/main" xmlns="" val="0"/>
+                <a14:useLocalDpi xmlns:a14="http://schemas.microsoft.com/office/drawing/2010/main" val="0"/>
               </a:ext>
             </a:extLst>
           </a:blip>
@@ -15169,7 +15550,7 @@
           <a:blip r:embed="rId7" cstate="print">
             <a:extLst>
               <a:ext uri="{28A0092B-C50C-407E-A947-70E740481C1C}">
-                <a14:useLocalDpi xmlns:a14="http://schemas.microsoft.com/office/drawing/2010/main" xmlns="" val="0"/>
+                <a14:useLocalDpi xmlns:a14="http://schemas.microsoft.com/office/drawing/2010/main" val="0"/>
               </a:ext>
             </a:extLst>
           </a:blip>
@@ -15199,7 +15580,7 @@
           <a:blip r:embed="rId8" cstate="print">
             <a:extLst>
               <a:ext uri="{28A0092B-C50C-407E-A947-70E740481C1C}">
-                <a14:useLocalDpi xmlns:a14="http://schemas.microsoft.com/office/drawing/2010/main" xmlns="" val="0"/>
+                <a14:useLocalDpi xmlns:a14="http://schemas.microsoft.com/office/drawing/2010/main" val="0"/>
               </a:ext>
             </a:extLst>
           </a:blip>
@@ -15220,7 +15601,7 @@
     </p:spTree>
     <p:extLst>
       <p:ext uri="{BB962C8B-B14F-4D97-AF65-F5344CB8AC3E}">
-        <p14:creationId xmlns:p14="http://schemas.microsoft.com/office/powerpoint/2010/main" xmlns="" val="949325302"/>
+        <p14:creationId xmlns:p14="http://schemas.microsoft.com/office/powerpoint/2010/main" val="949325302"/>
       </p:ext>
     </p:extLst>
   </p:cSld>
@@ -15299,7 +15680,7 @@
     </p:spTree>
     <p:extLst>
       <p:ext uri="{BB962C8B-B14F-4D97-AF65-F5344CB8AC3E}">
-        <p14:creationId xmlns:p14="http://schemas.microsoft.com/office/powerpoint/2010/main" xmlns="" val="2674396190"/>
+        <p14:creationId xmlns:p14="http://schemas.microsoft.com/office/powerpoint/2010/main" val="2674396190"/>
       </p:ext>
     </p:extLst>
   </p:cSld>
@@ -15378,7 +15759,7 @@
     </p:spTree>
     <p:extLst>
       <p:ext uri="{BB962C8B-B14F-4D97-AF65-F5344CB8AC3E}">
-        <p14:creationId xmlns:p14="http://schemas.microsoft.com/office/powerpoint/2010/main" xmlns="" val="2713826086"/>
+        <p14:creationId xmlns:p14="http://schemas.microsoft.com/office/powerpoint/2010/main" val="2713826086"/>
       </p:ext>
     </p:extLst>
   </p:cSld>
@@ -15488,15 +15869,7 @@
             <a:pPr lvl="1"/>
             <a:r>
               <a:rPr lang="en-US" dirty="0" smtClean="0"/>
-              <a:t>field </a:t>
-            </a:r>
-            <a:r>
-              <a:rPr lang="en-US" dirty="0" smtClean="0"/>
-              <a:t>visibility </a:t>
-            </a:r>
-            <a:r>
-              <a:rPr lang="en-US" dirty="0" smtClean="0"/>
-              <a:t>update</a:t>
+              <a:t>field visibility update</a:t>
             </a:r>
             <a:endParaRPr lang="en-US" dirty="0"/>
           </a:p>
@@ -15546,7 +15919,7 @@
     </p:spTree>
     <p:extLst>
       <p:ext uri="{BB962C8B-B14F-4D97-AF65-F5344CB8AC3E}">
-        <p14:creationId xmlns:p14="http://schemas.microsoft.com/office/powerpoint/2010/main" xmlns="" val="714747940"/>
+        <p14:creationId xmlns:p14="http://schemas.microsoft.com/office/powerpoint/2010/main" val="714747940"/>
       </p:ext>
     </p:extLst>
   </p:cSld>
@@ -16081,7 +16454,7 @@
     </p:spTree>
     <p:extLst>
       <p:ext uri="{BB962C8B-B14F-4D97-AF65-F5344CB8AC3E}">
-        <p14:creationId xmlns:p14="http://schemas.microsoft.com/office/powerpoint/2010/main" xmlns="" val="3760395846"/>
+        <p14:creationId xmlns:p14="http://schemas.microsoft.com/office/powerpoint/2010/main" val="3760395846"/>
       </p:ext>
     </p:extLst>
   </p:cSld>
@@ -16914,7 +17287,7 @@
     </p:spTree>
     <p:extLst>
       <p:ext uri="{BB962C8B-B14F-4D97-AF65-F5344CB8AC3E}">
-        <p14:creationId xmlns:p14="http://schemas.microsoft.com/office/powerpoint/2010/main" xmlns="" val="1422967000"/>
+        <p14:creationId xmlns:p14="http://schemas.microsoft.com/office/powerpoint/2010/main" val="1422967000"/>
       </p:ext>
     </p:extLst>
   </p:cSld>
@@ -17065,7 +17438,7 @@
     </p:spTree>
     <p:extLst>
       <p:ext uri="{BB962C8B-B14F-4D97-AF65-F5344CB8AC3E}">
-        <p14:creationId xmlns:p14="http://schemas.microsoft.com/office/powerpoint/2010/main" xmlns="" val="2654585083"/>
+        <p14:creationId xmlns:p14="http://schemas.microsoft.com/office/powerpoint/2010/main" val="2654585083"/>
       </p:ext>
     </p:extLst>
   </p:cSld>
@@ -17225,7 +17598,7 @@
     </p:spTree>
     <p:extLst>
       <p:ext uri="{BB962C8B-B14F-4D97-AF65-F5344CB8AC3E}">
-        <p14:creationId xmlns:p14="http://schemas.microsoft.com/office/powerpoint/2010/main" xmlns="" val="1683021932"/>
+        <p14:creationId xmlns:p14="http://schemas.microsoft.com/office/powerpoint/2010/main" val="1683021932"/>
       </p:ext>
     </p:extLst>
   </p:cSld>
@@ -17299,7 +17672,7 @@
           <a:blip r:embed="rId2" cstate="print">
             <a:extLst>
               <a:ext uri="{28A0092B-C50C-407E-A947-70E740481C1C}">
-                <a14:useLocalDpi xmlns:a14="http://schemas.microsoft.com/office/drawing/2010/main" xmlns="" val="0"/>
+                <a14:useLocalDpi xmlns:a14="http://schemas.microsoft.com/office/drawing/2010/main" val="0"/>
               </a:ext>
             </a:extLst>
           </a:blip>
@@ -17937,7 +18310,7 @@
     </p:spTree>
     <p:extLst>
       <p:ext uri="{BB962C8B-B14F-4D97-AF65-F5344CB8AC3E}">
-        <p14:creationId xmlns:p14="http://schemas.microsoft.com/office/powerpoint/2010/main" xmlns="" val="3007787296"/>
+        <p14:creationId xmlns:p14="http://schemas.microsoft.com/office/powerpoint/2010/main" val="3007787296"/>
       </p:ext>
     </p:extLst>
   </p:cSld>
@@ -18007,7 +18380,7 @@
         <p:spPr/>
         <p:txBody>
           <a:bodyPr>
-            <a:normAutofit fontScale="70000" lnSpcReduction="20000"/>
+            <a:normAutofit fontScale="85000" lnSpcReduction="20000"/>
           </a:bodyPr>
           <a:lstStyle/>
           <a:p>
@@ -18023,7 +18396,15 @@
             </a:pPr>
             <a:r>
               <a:rPr lang="en-US" dirty="0" smtClean="0"/>
-              <a:t>I declare a child -&gt; question set for this child appears</a:t>
+              <a:t>I declare a </a:t>
+            </a:r>
+            <a:r>
+              <a:rPr lang="en-US" dirty="0" smtClean="0"/>
+              <a:t>claim -&gt; </a:t>
+            </a:r>
+            <a:r>
+              <a:rPr lang="en-US" dirty="0" smtClean="0"/>
+              <a:t>question set for this child appears</a:t>
             </a:r>
           </a:p>
           <a:p>
@@ -18036,8 +18417,29 @@
             <a:pPr lvl="1"/>
             <a:r>
               <a:rPr lang="en-US" dirty="0" smtClean="0"/>
-              <a:t>I’ve been owning a car since one year -&gt; the date selected for a claim should be later than the car’s purchase</a:t>
-            </a:r>
+              <a:t>I’ve been owning a car </a:t>
+            </a:r>
+            <a:r>
+              <a:rPr lang="en-US" dirty="0" smtClean="0"/>
+              <a:t>for one </a:t>
+            </a:r>
+            <a:r>
+              <a:rPr lang="en-US" dirty="0" smtClean="0"/>
+              <a:t>year -&gt; </a:t>
+            </a:r>
+            <a:r>
+              <a:rPr lang="en-US" dirty="0" smtClean="0"/>
+              <a:t>constraint on the date for </a:t>
+            </a:r>
+            <a:r>
+              <a:rPr lang="en-US" dirty="0" smtClean="0"/>
+              <a:t>a claim should be later than the car’s </a:t>
+            </a:r>
+            <a:r>
+              <a:rPr lang="en-US" dirty="0" smtClean="0"/>
+              <a:t>purchase date</a:t>
+            </a:r>
+            <a:endParaRPr lang="en-US" dirty="0" smtClean="0"/>
           </a:p>
           <a:p>
             <a:r>
@@ -18052,7 +18454,23 @@
             </a:pPr>
             <a:r>
               <a:rPr lang="en-US" dirty="0" smtClean="0"/>
-              <a:t>I change the number of occurred claims -&gt; previous details of claims should be dropped</a:t>
+              <a:t>I change the number of occurred claims </a:t>
+            </a:r>
+            <a:r>
+              <a:rPr lang="en-US" dirty="0" smtClean="0"/>
+              <a:t>from 2 to 1 -&gt; </a:t>
+            </a:r>
+            <a:r>
+              <a:rPr lang="en-US" dirty="0" smtClean="0"/>
+              <a:t>previous details of </a:t>
+            </a:r>
+            <a:r>
+              <a:rPr lang="en-US" dirty="0" smtClean="0"/>
+              <a:t>claim number 2 </a:t>
+            </a:r>
+            <a:r>
+              <a:rPr lang="en-US" dirty="0" smtClean="0"/>
+              <a:t>should be dropped</a:t>
             </a:r>
           </a:p>
           <a:p>
@@ -18068,31 +18486,32 @@
             </a:pPr>
             <a:r>
               <a:rPr lang="en-US" dirty="0" smtClean="0"/>
-              <a:t>I change my date of birth -&gt; I could not obtain my car license before 18 years old</a:t>
-            </a:r>
-          </a:p>
-          <a:p>
-            <a:r>
-              <a:rPr lang="en-US" dirty="0" smtClean="0"/>
-              <a:t>MVC</a:t>
-            </a:r>
-          </a:p>
-          <a:p>
-            <a:pPr lvl="1">
-              <a:buFont typeface="Wingdings" pitchFamily="2" charset="2"/>
-              <a:buChar char="§"/>
-            </a:pPr>
-            <a:r>
-              <a:rPr lang="en-US" dirty="0" smtClean="0"/>
-              <a:t>Reset from dependencies should update the data model and the view</a:t>
-            </a:r>
+              <a:t>I change my date of birth -&gt; I could not obtain my car license before </a:t>
+            </a:r>
+            <a:r>
+              <a:rPr lang="en-US" dirty="0" smtClean="0"/>
+              <a:t>being </a:t>
+            </a:r>
+            <a:r>
+              <a:rPr lang="en-US" dirty="0" smtClean="0"/>
+              <a:t>18 </a:t>
+            </a:r>
+            <a:r>
+              <a:rPr lang="en-US" dirty="0" smtClean="0"/>
+              <a:t>years </a:t>
+            </a:r>
+            <a:r>
+              <a:rPr lang="en-US" dirty="0" smtClean="0"/>
+              <a:t>old</a:t>
+            </a:r>
+            <a:endParaRPr lang="en-US" dirty="0" smtClean="0"/>
           </a:p>
         </p:txBody>
       </p:sp>
     </p:spTree>
     <p:extLst>
       <p:ext uri="{BB962C8B-B14F-4D97-AF65-F5344CB8AC3E}">
-        <p14:creationId xmlns:p14="http://schemas.microsoft.com/office/powerpoint/2010/main" xmlns="" val="13878138"/>
+        <p14:creationId xmlns:p14="http://schemas.microsoft.com/office/powerpoint/2010/main" val="13878138"/>
       </p:ext>
     </p:extLst>
   </p:cSld>
@@ -18171,7 +18590,7 @@
     </p:spTree>
     <p:extLst>
       <p:ext uri="{BB962C8B-B14F-4D97-AF65-F5344CB8AC3E}">
-        <p14:creationId xmlns:p14="http://schemas.microsoft.com/office/powerpoint/2010/main" xmlns="" val="40929930"/>
+        <p14:creationId xmlns:p14="http://schemas.microsoft.com/office/powerpoint/2010/main" val="40929930"/>
       </p:ext>
     </p:extLst>
   </p:cSld>
@@ -18250,7 +18669,7 @@
     </p:spTree>
     <p:extLst>
       <p:ext uri="{BB962C8B-B14F-4D97-AF65-F5344CB8AC3E}">
-        <p14:creationId xmlns:p14="http://schemas.microsoft.com/office/powerpoint/2010/main" xmlns="" val="4014343169"/>
+        <p14:creationId xmlns:p14="http://schemas.microsoft.com/office/powerpoint/2010/main" val="4014343169"/>
       </p:ext>
     </p:extLst>
   </p:cSld>
@@ -18349,7 +18768,19 @@
           <a:p>
             <a:r>
               <a:rPr lang="en-US" dirty="0" smtClean="0"/>
-              <a:t>Page navigation was triggering model updates and sent the contents to the server</a:t>
+              <a:t>Page navigation was triggering model updates </a:t>
+            </a:r>
+            <a:r>
+              <a:rPr lang="en-US" dirty="0" smtClean="0"/>
+              <a:t>that were</a:t>
+            </a:r>
+            <a:r>
+              <a:rPr lang="en-US" dirty="0" smtClean="0"/>
+              <a:t> sent to the </a:t>
+            </a:r>
+            <a:r>
+              <a:rPr lang="en-US" dirty="0" smtClean="0"/>
+              <a:t>server</a:t>
             </a:r>
             <a:endParaRPr lang="en-US" dirty="0"/>
           </a:p>
@@ -18418,7 +18849,15 @@
             </a:pPr>
             <a:r>
               <a:rPr lang="en-US" sz="2400" dirty="0" smtClean="0"/>
-              <a:t>Dependencies between fields not documented</a:t>
+              <a:t>Dependencies between fields </a:t>
+            </a:r>
+            <a:r>
+              <a:rPr lang="en-US" sz="2400" dirty="0" smtClean="0"/>
+              <a:t>was not </a:t>
+            </a:r>
+            <a:r>
+              <a:rPr lang="en-US" sz="2400" dirty="0" smtClean="0"/>
+              <a:t>documented</a:t>
             </a:r>
           </a:p>
           <a:p>
@@ -18437,7 +18876,7 @@
     </p:spTree>
     <p:extLst>
       <p:ext uri="{BB962C8B-B14F-4D97-AF65-F5344CB8AC3E}">
-        <p14:creationId xmlns:p14="http://schemas.microsoft.com/office/powerpoint/2010/main" xmlns="" val="4255503392"/>
+        <p14:creationId xmlns:p14="http://schemas.microsoft.com/office/powerpoint/2010/main" val="4255503392"/>
       </p:ext>
     </p:extLst>
   </p:cSld>
@@ -18483,12 +18922,14 @@
         </p:nvSpPr>
         <p:spPr/>
         <p:txBody>
-          <a:bodyPr/>
+          <a:bodyPr>
+            <a:normAutofit fontScale="90000"/>
+          </a:bodyPr>
           <a:lstStyle/>
           <a:p>
             <a:r>
               <a:rPr lang="en-US" dirty="0" smtClean="0"/>
-              <a:t>Leverage the CSS IDs</a:t>
+              <a:t>The CSS ids : a limited starting point</a:t>
             </a:r>
             <a:endParaRPr lang="en-US" dirty="0"/>
           </a:p>
@@ -18530,15 +18971,28 @@
             <a:pPr lvl="1"/>
             <a:r>
               <a:rPr lang="en-US" dirty="0" smtClean="0"/>
-              <a:t>Unique ID was not guaranteed</a:t>
-            </a:r>
+              <a:t>No guaranty</a:t>
+            </a:r>
+            <a:r>
+              <a:rPr lang="en-US" dirty="0" smtClean="0"/>
+              <a:t> that CSS ids are unique</a:t>
+            </a:r>
+            <a:endParaRPr lang="en-US" dirty="0" smtClean="0"/>
           </a:p>
           <a:p>
             <a:pPr lvl="1"/>
             <a:r>
               <a:rPr lang="en-US" dirty="0" smtClean="0"/>
-              <a:t>Each CSS update add some new kind of CSS class or shared CSS ID for quick look and feel bug fixes</a:t>
-            </a:r>
+              <a:t>Styling is evolving with his own constraints</a:t>
+            </a:r>
+          </a:p>
+          <a:p>
+            <a:pPr lvl="1"/>
+            <a:r>
+              <a:rPr lang="en-US" dirty="0" smtClean="0"/>
+              <a:t>Not the original purpose of CSS</a:t>
+            </a:r>
+            <a:endParaRPr lang="en-US" dirty="0" smtClean="0"/>
           </a:p>
         </p:txBody>
       </p:sp>
@@ -18550,8 +19004,8 @@
         </p:nvSpPr>
         <p:spPr>
           <a:xfrm>
-            <a:off x="4114800" y="5526741"/>
-            <a:ext cx="4680064" cy="954107"/>
+            <a:off x="2667001" y="5533947"/>
+            <a:ext cx="5867400" cy="954107"/>
           </a:xfrm>
           <a:prstGeom prst="rect">
             <a:avLst/>
@@ -18564,20 +19018,38 @@
           </a:ln>
         </p:spPr>
         <p:txBody>
-          <a:bodyPr wrap="none" rtlCol="0">
+          <a:bodyPr wrap="square" rtlCol="0">
             <a:spAutoFit/>
           </a:bodyPr>
           <a:lstStyle/>
           <a:p>
             <a:r>
               <a:rPr lang="en-US" sz="2800" dirty="0" smtClean="0"/>
-              <a:t>Using CSS on web forms hide</a:t>
-            </a:r>
-          </a:p>
-          <a:p>
+              <a:t>Using CSS on web forms </a:t>
+            </a:r>
             <a:r>
               <a:rPr lang="en-US" sz="2800" dirty="0" smtClean="0"/>
-              <a:t>a model that could be leverage</a:t>
+              <a:t>hides</a:t>
+            </a:r>
+            <a:r>
+              <a:rPr lang="en-US" sz="2800" dirty="0"/>
+              <a:t> </a:t>
+            </a:r>
+            <a:r>
+              <a:rPr lang="en-US" sz="2800" dirty="0" smtClean="0"/>
+              <a:t>an implicit</a:t>
+            </a:r>
+            <a:r>
+              <a:rPr lang="en-US" sz="2800" dirty="0" smtClean="0"/>
+              <a:t> </a:t>
+            </a:r>
+            <a:r>
+              <a:rPr lang="en-US" sz="2800" dirty="0" smtClean="0"/>
+              <a:t>model that could be </a:t>
+            </a:r>
+            <a:r>
+              <a:rPr lang="en-US" sz="2800" dirty="0" smtClean="0"/>
+              <a:t>leveraged</a:t>
             </a:r>
             <a:endParaRPr lang="en-US" sz="2800" dirty="0"/>
           </a:p>
@@ -18586,7 +19058,7 @@
     </p:spTree>
     <p:extLst>
       <p:ext uri="{BB962C8B-B14F-4D97-AF65-F5344CB8AC3E}">
-        <p14:creationId xmlns:p14="http://schemas.microsoft.com/office/powerpoint/2010/main" xmlns="" val="2375505937"/>
+        <p14:creationId xmlns:p14="http://schemas.microsoft.com/office/powerpoint/2010/main" val="2375505937"/>
       </p:ext>
     </p:extLst>
   </p:cSld>
@@ -18656,20 +19128,29 @@
         <p:spPr/>
         <p:txBody>
           <a:bodyPr>
-            <a:normAutofit lnSpcReduction="10000"/>
+            <a:normAutofit fontScale="92500" lnSpcReduction="10000"/>
           </a:bodyPr>
           <a:lstStyle/>
           <a:p>
             <a:r>
               <a:rPr lang="en-US" dirty="0" smtClean="0"/>
-              <a:t>Providing stability during the evolutions of the forms</a:t>
-            </a:r>
+              <a:t>Ensuring non regression even with frequent changes on forms</a:t>
+            </a:r>
+            <a:endParaRPr lang="en-US" dirty="0" smtClean="0"/>
           </a:p>
           <a:p>
             <a:pPr lvl="1"/>
             <a:r>
               <a:rPr lang="en-US" dirty="0" smtClean="0"/>
-              <a:t>No side effect between business rules</a:t>
+              <a:t>No </a:t>
+            </a:r>
+            <a:r>
+              <a:rPr lang="en-US" dirty="0" smtClean="0"/>
+              <a:t>unexpected side effects </a:t>
+            </a:r>
+            <a:r>
+              <a:rPr lang="en-US" dirty="0" smtClean="0"/>
+              <a:t>between business rules</a:t>
             </a:r>
           </a:p>
           <a:p>
@@ -18682,29 +19163,41 @@
           <a:p>
             <a:r>
               <a:rPr lang="en-US" dirty="0" smtClean="0"/>
-              <a:t>Ensuring a fast and up-to-date understanding of the form complexity</a:t>
-            </a:r>
-          </a:p>
-          <a:p>
-            <a:r>
-              <a:rPr lang="en-US" dirty="0" smtClean="0"/>
-              <a:t>Minimizing the maintenance effort</a:t>
+              <a:t>Enabling a </a:t>
+            </a:r>
+            <a:r>
+              <a:rPr lang="en-US" dirty="0" smtClean="0"/>
+              <a:t>fast and up-to-date understanding of the form complexity</a:t>
+            </a:r>
+          </a:p>
+          <a:p>
+            <a:r>
+              <a:rPr lang="en-US" dirty="0" smtClean="0"/>
+              <a:t>Reducing the </a:t>
+            </a:r>
+            <a:r>
+              <a:rPr lang="en-US" dirty="0" smtClean="0"/>
+              <a:t>maintenance effort</a:t>
+            </a:r>
+          </a:p>
+          <a:p>
+            <a:r>
+              <a:rPr lang="en-US" dirty="0" smtClean="0"/>
+              <a:t>Supporting fields </a:t>
+            </a:r>
+            <a:r>
+              <a:rPr lang="en-US" dirty="0" smtClean="0"/>
+              <a:t>shuffle</a:t>
             </a:r>
           </a:p>
           <a:p>
             <a:r>
               <a:rPr lang="en-US" dirty="0"/>
-              <a:t>Allowing </a:t>
-            </a:r>
-            <a:r>
-              <a:rPr lang="en-US" dirty="0" smtClean="0"/>
-              <a:t>fields shuffle</a:t>
-            </a:r>
-          </a:p>
-          <a:p>
-            <a:r>
-              <a:rPr lang="en-US" dirty="0" smtClean="0"/>
-              <a:t>Allowing AB testing</a:t>
+              <a:t>Supporting AB </a:t>
+            </a:r>
+            <a:r>
+              <a:rPr lang="en-US" dirty="0" smtClean="0"/>
+              <a:t>testing</a:t>
             </a:r>
             <a:endParaRPr lang="en-US" dirty="0"/>
           </a:p>
@@ -18717,18 +19210,18 @@
     </p:spTree>
     <p:extLst>
       <p:ext uri="{BB962C8B-B14F-4D97-AF65-F5344CB8AC3E}">
-        <p14:creationId xmlns:p14="http://schemas.microsoft.com/office/powerpoint/2010/main" xmlns="" val="1618189430"/>
+        <p14:creationId xmlns:p14="http://schemas.microsoft.com/office/powerpoint/2010/main" val="1618189430"/>
       </p:ext>
     </p:extLst>
   </p:cSld>
   <p:clrMapOvr>
     <a:masterClrMapping/>
   </p:clrMapOvr>
-  <mc:AlternateContent xmlns:mc="http://schemas.openxmlformats.org/markup-compatibility/2006">
-    <mc:Choice xmlns:p14="http://schemas.microsoft.com/office/powerpoint/2010/main" xmlns="" Requires="p14">
+  <mc:AlternateContent xmlns:mc="http://schemas.openxmlformats.org/markup-compatibility/2006" xmlns:p14="http://schemas.microsoft.com/office/powerpoint/2010/main">
+    <mc:Choice Requires="p14">
       <p:transition spd="slow" p14:dur="2000"/>
     </mc:Choice>
-    <mc:Fallback>
+    <mc:Fallback xmlns="">
       <p:transition spd="slow"/>
     </mc:Fallback>
   </mc:AlternateContent>
@@ -18840,7 +19333,11 @@
           <a:p>
             <a:r>
               <a:rPr lang="en-US" dirty="0" smtClean="0"/>
-              <a:t>Required Java 6+ and Maven</a:t>
+              <a:t>Requires </a:t>
+            </a:r>
+            <a:r>
+              <a:rPr lang="en-US" dirty="0" smtClean="0"/>
+              <a:t>Java 6+ and Maven</a:t>
             </a:r>
             <a:endParaRPr lang="en-US" dirty="0"/>
           </a:p>
@@ -18864,8 +19361,8 @@
         </p:nvSpPr>
         <p:spPr>
           <a:xfrm>
-            <a:off x="2205935" y="5867400"/>
-            <a:ext cx="4732129" cy="584775"/>
+            <a:off x="2109947" y="5867400"/>
+            <a:ext cx="4924105" cy="584775"/>
           </a:xfrm>
           <a:prstGeom prst="rect">
             <a:avLst/>
@@ -18885,15 +19382,20 @@
             <a:pPr algn="ctr"/>
             <a:r>
               <a:rPr lang="en-US" sz="3200" b="1" dirty="0"/>
-              <a:t>WE ACCEPT PULL REQUEST</a:t>
-            </a:r>
+              <a:t>WE ACCEPT PULL </a:t>
+            </a:r>
+            <a:r>
+              <a:rPr lang="en-US" sz="3200" b="1" dirty="0" smtClean="0"/>
+              <a:t>REQUESTS</a:t>
+            </a:r>
+            <a:endParaRPr lang="en-US" sz="3200" b="1" dirty="0"/>
           </a:p>
         </p:txBody>
       </p:sp>
     </p:spTree>
     <p:extLst>
       <p:ext uri="{BB962C8B-B14F-4D97-AF65-F5344CB8AC3E}">
-        <p14:creationId xmlns:p14="http://schemas.microsoft.com/office/powerpoint/2010/main" xmlns="" val="3644490438"/>
+        <p14:creationId xmlns:p14="http://schemas.microsoft.com/office/powerpoint/2010/main" val="3644490438"/>
       </p:ext>
     </p:extLst>
   </p:cSld>

</xml_diff>

<commit_message>
fixed a few typo
</commit_message>
<xml_diff>
--- a/mdl4ui-docs/mdl4ui_cg2013.pptx
+++ b/mdl4ui-docs/mdl4ui_cg2013.pptx
@@ -8666,11 +8666,7 @@
             <a:pPr lvl="1"/>
             <a:r>
               <a:rPr lang="en-US" sz="1800" dirty="0" smtClean="0"/>
-              <a:t>SOA Platform </a:t>
-            </a:r>
-            <a:r>
-              <a:rPr lang="en-US" sz="1800" dirty="0" smtClean="0"/>
-              <a:t>for J2EE</a:t>
+              <a:t>SOA Platform for J2EE</a:t>
             </a:r>
           </a:p>
           <a:p>
@@ -8757,11 +8753,7 @@
             <a:pPr lvl="1"/>
             <a:r>
               <a:rPr lang="en-US" sz="1800" dirty="0" smtClean="0"/>
-              <a:t>SOA Platform </a:t>
-            </a:r>
-            <a:r>
-              <a:rPr lang="en-US" sz="1800" dirty="0" smtClean="0"/>
-              <a:t>for J2EE</a:t>
+              <a:t>SOA Platform for J2EE</a:t>
             </a:r>
           </a:p>
           <a:p>
@@ -9335,7 +9327,7 @@
           <p:nvPr/>
         </p:nvPicPr>
         <p:blipFill>
-          <a:blip r:embed="rId3" cstate="print">
+          <a:blip r:embed="rId2" cstate="print">
             <a:extLst>
               <a:ext uri="{28A0092B-C50C-407E-A947-70E740481C1C}">
                 <a14:useLocalDpi xmlns:a14="http://schemas.microsoft.com/office/drawing/2010/main" val="0"/>
@@ -9981,13 +9973,8 @@
             </a:r>
             <a:r>
               <a:rPr lang="en-US" dirty="0" smtClean="0"/>
-              <a:t>for </a:t>
-            </a:r>
-            <a:r>
-              <a:rPr lang="en-US" dirty="0" smtClean="0"/>
-              <a:t>the model</a:t>
-            </a:r>
-            <a:endParaRPr lang="en-US" dirty="0" smtClean="0"/>
+              <a:t>for the model</a:t>
+            </a:r>
           </a:p>
           <a:p>
             <a:r>
@@ -9996,15 +9983,7 @@
             </a:r>
             <a:r>
               <a:rPr lang="en-US" dirty="0" smtClean="0"/>
-              <a:t>required to </a:t>
-            </a:r>
-            <a:r>
-              <a:rPr lang="en-US" dirty="0" smtClean="0"/>
-              <a:t>implement </a:t>
-            </a:r>
-            <a:r>
-              <a:rPr lang="en-US" dirty="0" smtClean="0"/>
-              <a:t>the model</a:t>
+              <a:t>required to implement the model</a:t>
             </a:r>
           </a:p>
           <a:p>
@@ -10047,11 +10026,7 @@
             </a:r>
             <a:r>
               <a:rPr lang="en-US" dirty="0" smtClean="0"/>
-              <a:t> </a:t>
-            </a:r>
-            <a:r>
-              <a:rPr lang="en-US" dirty="0" smtClean="0"/>
-              <a:t>is very fast</a:t>
+              <a:t> is very fast</a:t>
             </a:r>
           </a:p>
           <a:p>
@@ -10168,41 +10143,21 @@
           <a:p>
             <a:r>
               <a:rPr lang="en-US" dirty="0" smtClean="0"/>
-              <a:t>Implementing business rules </a:t>
+              <a:t>Implementing business rules involves </a:t>
+            </a:r>
+            <a:r>
+              <a:rPr lang="en-US" b="1" dirty="0" smtClean="0"/>
+              <a:t>triggering the behaviors </a:t>
             </a:r>
             <a:r>
               <a:rPr lang="en-US" dirty="0" smtClean="0"/>
-              <a:t>involves </a:t>
-            </a:r>
+              <a:t>using a dependency model</a:t>
+            </a:r>
+          </a:p>
+          <a:p>
             <a:r>
               <a:rPr lang="en-US" b="1" dirty="0" smtClean="0"/>
-              <a:t>triggering </a:t>
-            </a:r>
-            <a:r>
-              <a:rPr lang="en-US" b="1" dirty="0" smtClean="0"/>
-              <a:t>the </a:t>
-            </a:r>
-            <a:r>
-              <a:rPr lang="en-US" b="1" dirty="0" smtClean="0"/>
-              <a:t>behaviors </a:t>
-            </a:r>
-            <a:r>
-              <a:rPr lang="en-US" dirty="0" smtClean="0"/>
-              <a:t>using </a:t>
-            </a:r>
-            <a:r>
-              <a:rPr lang="en-US" dirty="0" smtClean="0"/>
-              <a:t>a dependency model</a:t>
-            </a:r>
-          </a:p>
-          <a:p>
-            <a:r>
-              <a:rPr lang="en-US" b="1" dirty="0" smtClean="0"/>
-              <a:t>No </a:t>
-            </a:r>
-            <a:r>
-              <a:rPr lang="en-US" b="1" dirty="0" smtClean="0"/>
-              <a:t>semantics </a:t>
+              <a:t>No semantics </a:t>
             </a:r>
             <a:r>
               <a:rPr lang="en-US" dirty="0" smtClean="0"/>
@@ -10224,13 +10179,8 @@
             </a:r>
             <a:r>
               <a:rPr lang="en-US" b="1" dirty="0" smtClean="0"/>
-              <a:t> </a:t>
-            </a:r>
-            <a:r>
-              <a:rPr lang="en-US" b="1" dirty="0" smtClean="0"/>
-              <a:t>source attribute</a:t>
-            </a:r>
-            <a:endParaRPr lang="en-US" b="1" dirty="0" smtClean="0"/>
+              <a:t> source attribute</a:t>
+            </a:r>
           </a:p>
           <a:p>
             <a:r>
@@ -10252,7 +10202,6 @@
               <a:rPr lang="en-US" dirty="0" smtClean="0"/>
               <a:t>Visibility of the fields</a:t>
             </a:r>
-            <a:endParaRPr lang="en-US" dirty="0" smtClean="0"/>
           </a:p>
           <a:p>
             <a:pPr lvl="1"/>
@@ -10264,7 +10213,6 @@
               <a:rPr lang="en-US" dirty="0" smtClean="0"/>
               <a:t>range definition</a:t>
             </a:r>
-            <a:endParaRPr lang="en-US" dirty="0" smtClean="0"/>
           </a:p>
           <a:p>
             <a:pPr lvl="1"/>
@@ -10272,7 +10220,6 @@
               <a:rPr lang="en-US" dirty="0" smtClean="0"/>
               <a:t>Reset of value</a:t>
             </a:r>
-            <a:endParaRPr lang="en-US" dirty="0" smtClean="0"/>
           </a:p>
           <a:p>
             <a:pPr lvl="1"/>
@@ -10280,7 +10227,6 @@
               <a:rPr lang="en-US" dirty="0" smtClean="0"/>
               <a:t>Validation of value</a:t>
             </a:r>
-            <a:endParaRPr lang="en-US" dirty="0" smtClean="0"/>
           </a:p>
           <a:p>
             <a:pPr lvl="1"/>
@@ -10708,20 +10654,25 @@
         </p:nvSpPr>
         <p:spPr/>
         <p:txBody>
-          <a:bodyPr/>
+          <a:bodyPr>
+            <a:normAutofit fontScale="90000"/>
+          </a:bodyPr>
           <a:lstStyle/>
           <a:p>
             <a:r>
               <a:rPr lang="en-US" dirty="0" smtClean="0"/>
-              <a:t>Declaring </a:t>
-            </a:r>
+              <a:t>In code declarative</a:t>
+            </a:r>
+            <a:br>
+              <a:rPr lang="en-US" dirty="0" smtClean="0"/>
+            </a:br>
             <a:r>
               <a:rPr lang="en-US" dirty="0" smtClean="0"/>
               <a:t>dependencies </a:t>
             </a:r>
             <a:r>
               <a:rPr lang="en-US" dirty="0" smtClean="0"/>
-              <a:t>as code</a:t>
+              <a:t>modeling</a:t>
             </a:r>
             <a:endParaRPr lang="en-US" dirty="0"/>
           </a:p>
@@ -10749,7 +10700,7 @@
         </p:blipFill>
         <p:spPr>
           <a:xfrm>
-            <a:off x="1828800" y="1371600"/>
+            <a:off x="1828800" y="1752600"/>
             <a:ext cx="7086600" cy="4611310"/>
           </a:xfrm>
           <a:prstGeom prst="rect">
@@ -10765,7 +10716,7 @@
         </p:nvSpPr>
         <p:spPr>
           <a:xfrm>
-            <a:off x="297802" y="4331209"/>
+            <a:off x="297802" y="4661118"/>
             <a:ext cx="6234954" cy="1815882"/>
           </a:xfrm>
           <a:prstGeom prst="rect">
@@ -10791,7 +10742,6 @@
               <a:rPr lang="en-US" sz="2800" b="1" dirty="0" smtClean="0"/>
               <a:t>enumerations</a:t>
             </a:r>
-            <a:endParaRPr lang="en-US" sz="2800" b="1" dirty="0" smtClean="0"/>
           </a:p>
           <a:p>
             <a:pPr marL="285750" indent="-285750">
@@ -10836,15 +10786,7 @@
             </a:r>
             <a:r>
               <a:rPr lang="en-US" sz="2800" dirty="0" smtClean="0"/>
-              <a:t> </a:t>
-            </a:r>
-            <a:r>
-              <a:rPr lang="en-US" sz="2800" dirty="0" smtClean="0"/>
-              <a:t>fields </a:t>
-            </a:r>
-            <a:r>
-              <a:rPr lang="en-US" sz="2800" dirty="0" smtClean="0"/>
-              <a:t>as </a:t>
+              <a:t> fields as </a:t>
             </a:r>
             <a:r>
               <a:rPr lang="en-US" sz="2800" b="1" dirty="0" smtClean="0"/>
@@ -10941,15 +10883,7 @@
             </a:pPr>
             <a:r>
               <a:rPr lang="en-US" dirty="0" smtClean="0"/>
-              <a:t>Car </a:t>
-            </a:r>
-            <a:r>
-              <a:rPr lang="en-US" dirty="0" smtClean="0"/>
-              <a:t>form (160 </a:t>
-            </a:r>
-            <a:r>
-              <a:rPr lang="en-US" dirty="0" smtClean="0"/>
-              <a:t>questions)</a:t>
+              <a:t>Car form (160 questions)</a:t>
             </a:r>
           </a:p>
           <a:p>
@@ -10964,11 +10898,7 @@
             </a:r>
             <a:r>
               <a:rPr lang="en-US" dirty="0" smtClean="0"/>
-              <a:t>(</a:t>
-            </a:r>
-            <a:r>
-              <a:rPr lang="en-US" dirty="0" smtClean="0"/>
-              <a:t>180 questions)</a:t>
+              <a:t>(180 questions)</a:t>
             </a:r>
           </a:p>
           <a:p>
@@ -10983,11 +10913,7 @@
             </a:r>
             <a:r>
               <a:rPr lang="en-US" dirty="0" smtClean="0"/>
-              <a:t>(</a:t>
-            </a:r>
-            <a:r>
-              <a:rPr lang="en-US" dirty="0" smtClean="0"/>
-              <a:t>50 questions)</a:t>
+              <a:t>(50 questions)</a:t>
             </a:r>
           </a:p>
           <a:p>
@@ -11002,11 +10928,7 @@
             </a:r>
             <a:r>
               <a:rPr lang="en-US" dirty="0" smtClean="0"/>
-              <a:t>(</a:t>
-            </a:r>
-            <a:r>
-              <a:rPr lang="en-US" dirty="0" smtClean="0"/>
-              <a:t>70 questions)</a:t>
+              <a:t>(70 questions)</a:t>
             </a:r>
           </a:p>
           <a:p>
@@ -11021,31 +10943,14 @@
             </a:r>
             <a:r>
               <a:rPr lang="en-US" dirty="0" smtClean="0"/>
-              <a:t>(</a:t>
-            </a:r>
+              <a:t>(40 questions)</a:t>
+            </a:r>
+          </a:p>
+          <a:p>
             <a:r>
               <a:rPr lang="en-US" dirty="0" smtClean="0"/>
-              <a:t>40 questions)</a:t>
-            </a:r>
-          </a:p>
-          <a:p>
-            <a:r>
-              <a:rPr lang="en-US" dirty="0" smtClean="0"/>
-              <a:t>A lot of </a:t>
-            </a:r>
-            <a:r>
-              <a:rPr lang="en-US" dirty="0" smtClean="0"/>
-              <a:t>questions </a:t>
-            </a:r>
-            <a:r>
-              <a:rPr lang="en-US" dirty="0" smtClean="0"/>
-              <a:t>with business </a:t>
-            </a:r>
-            <a:r>
-              <a:rPr lang="en-US" dirty="0" smtClean="0"/>
-              <a:t>rules that are linked by dependencies and business rules</a:t>
-            </a:r>
-            <a:endParaRPr lang="en-US" dirty="0" smtClean="0"/>
+              <a:t>A lot of questions with business rules that are linked by dependencies and business rules</a:t>
+            </a:r>
           </a:p>
           <a:p>
             <a:endParaRPr lang="en-US" dirty="0"/>
@@ -11254,7 +11159,6 @@
                 <a:rPr lang="en-US" sz="4400" b="1" dirty="0"/>
                 <a:t>C</a:t>
               </a:r>
-              <a:endParaRPr lang="en-US" sz="4400" b="1" dirty="0"/>
             </a:p>
           </p:txBody>
         </p:sp>
@@ -11947,15 +11851,7 @@
           <a:p>
             <a:r>
               <a:rPr lang="en-US" b="1" dirty="0" smtClean="0"/>
-              <a:t>No runtime </a:t>
-            </a:r>
-            <a:r>
-              <a:rPr lang="en-US" b="1" dirty="0" smtClean="0"/>
-              <a:t>infinite </a:t>
-            </a:r>
-            <a:r>
-              <a:rPr lang="en-US" b="1" dirty="0" smtClean="0"/>
-              <a:t>loop </a:t>
+              <a:t>No runtime infinite loop </a:t>
             </a:r>
             <a:r>
               <a:rPr lang="en-US" dirty="0" smtClean="0"/>
@@ -12362,7 +12258,15 @@
             </a:r>
             <a:r>
               <a:rPr lang="en-US" sz="2200" dirty="0" smtClean="0"/>
-              <a:t>of the model as code</a:t>
+              <a:t>of the model </a:t>
+            </a:r>
+            <a:r>
+              <a:rPr lang="en-US" sz="2200" dirty="0" smtClean="0"/>
+              <a:t>as </a:t>
+            </a:r>
+            <a:r>
+              <a:rPr lang="en-US" sz="2200" dirty="0" smtClean="0"/>
+              <a:t>code</a:t>
             </a:r>
           </a:p>
           <a:p>
@@ -19335,15 +19239,7 @@
             </a:pPr>
             <a:r>
               <a:rPr lang="en-US" dirty="0" smtClean="0"/>
-              <a:t>I declare a </a:t>
-            </a:r>
-            <a:r>
-              <a:rPr lang="en-US" dirty="0" smtClean="0"/>
-              <a:t>claim -&gt; </a:t>
-            </a:r>
-            <a:r>
-              <a:rPr lang="en-US" dirty="0" smtClean="0"/>
-              <a:t>question set for this child appears</a:t>
+              <a:t>I declare a claim -&gt; question set for this child appears</a:t>
             </a:r>
           </a:p>
           <a:p>
@@ -19356,29 +19252,8 @@
             <a:pPr lvl="1"/>
             <a:r>
               <a:rPr lang="en-US" dirty="0" smtClean="0"/>
-              <a:t>I’ve been owning a car </a:t>
-            </a:r>
-            <a:r>
-              <a:rPr lang="en-US" dirty="0" smtClean="0"/>
-              <a:t>for one </a:t>
-            </a:r>
-            <a:r>
-              <a:rPr lang="en-US" dirty="0" smtClean="0"/>
-              <a:t>year -&gt; </a:t>
-            </a:r>
-            <a:r>
-              <a:rPr lang="en-US" dirty="0" smtClean="0"/>
-              <a:t>constraint on the date for </a:t>
-            </a:r>
-            <a:r>
-              <a:rPr lang="en-US" dirty="0" smtClean="0"/>
-              <a:t>a claim should be later than the car’s </a:t>
-            </a:r>
-            <a:r>
-              <a:rPr lang="en-US" dirty="0" smtClean="0"/>
-              <a:t>purchase date</a:t>
-            </a:r>
-            <a:endParaRPr lang="en-US" dirty="0" smtClean="0"/>
+              <a:t>I’ve been owning a car for one year -&gt; constraint on the date for a claim should be later than the car’s purchase date</a:t>
+            </a:r>
           </a:p>
           <a:p>
             <a:r>
@@ -19393,23 +19268,7 @@
             </a:pPr>
             <a:r>
               <a:rPr lang="en-US" dirty="0" smtClean="0"/>
-              <a:t>I change the number of occurred claims </a:t>
-            </a:r>
-            <a:r>
-              <a:rPr lang="en-US" dirty="0" smtClean="0"/>
-              <a:t>from 2 to 1 -&gt; </a:t>
-            </a:r>
-            <a:r>
-              <a:rPr lang="en-US" dirty="0" smtClean="0"/>
-              <a:t>previous details of </a:t>
-            </a:r>
-            <a:r>
-              <a:rPr lang="en-US" dirty="0" smtClean="0"/>
-              <a:t>claim number 2 </a:t>
-            </a:r>
-            <a:r>
-              <a:rPr lang="en-US" dirty="0" smtClean="0"/>
-              <a:t>should be dropped</a:t>
+              <a:t>I change the number of occurred claims from 2 to 1 -&gt; previous details of claim number 2 should be dropped</a:t>
             </a:r>
           </a:p>
           <a:p>
@@ -19425,25 +19284,8 @@
             </a:pPr>
             <a:r>
               <a:rPr lang="en-US" dirty="0" smtClean="0"/>
-              <a:t>I change my date of birth -&gt; I could not obtain my car license before </a:t>
-            </a:r>
-            <a:r>
-              <a:rPr lang="en-US" dirty="0" smtClean="0"/>
-              <a:t>being </a:t>
-            </a:r>
-            <a:r>
-              <a:rPr lang="en-US" dirty="0" smtClean="0"/>
-              <a:t>18 </a:t>
-            </a:r>
-            <a:r>
-              <a:rPr lang="en-US" dirty="0" smtClean="0"/>
-              <a:t>years </a:t>
-            </a:r>
-            <a:r>
-              <a:rPr lang="en-US" dirty="0" smtClean="0"/>
-              <a:t>old</a:t>
-            </a:r>
-            <a:endParaRPr lang="en-US" dirty="0" smtClean="0"/>
+              <a:t>I change my date of birth -&gt; I could not obtain my car license before being 18 years old</a:t>
+            </a:r>
           </a:p>
         </p:txBody>
       </p:sp>
@@ -22098,19 +21940,7 @@
           <a:p>
             <a:r>
               <a:rPr lang="en-US" dirty="0" smtClean="0"/>
-              <a:t>Page navigation was triggering model updates </a:t>
-            </a:r>
-            <a:r>
-              <a:rPr lang="en-US" dirty="0" smtClean="0"/>
-              <a:t>that were</a:t>
-            </a:r>
-            <a:r>
-              <a:rPr lang="en-US" dirty="0" smtClean="0"/>
-              <a:t> sent to the </a:t>
-            </a:r>
-            <a:r>
-              <a:rPr lang="en-US" dirty="0" smtClean="0"/>
-              <a:t>server</a:t>
+              <a:t>Page navigation was triggering model updates that were sent to the server</a:t>
             </a:r>
             <a:endParaRPr lang="en-US" dirty="0"/>
           </a:p>
@@ -22179,15 +22009,7 @@
             </a:pPr>
             <a:r>
               <a:rPr lang="en-US" sz="2400" dirty="0" smtClean="0"/>
-              <a:t>Dependencies between fields </a:t>
-            </a:r>
-            <a:r>
-              <a:rPr lang="en-US" sz="2400" dirty="0" smtClean="0"/>
-              <a:t>was not </a:t>
-            </a:r>
-            <a:r>
-              <a:rPr lang="en-US" sz="2400" dirty="0" smtClean="0"/>
-              <a:t>documented</a:t>
+              <a:t>Dependencies between fields was not documented</a:t>
             </a:r>
           </a:p>
           <a:p>
@@ -22301,13 +22123,8 @@
             <a:pPr lvl="1"/>
             <a:r>
               <a:rPr lang="en-US" dirty="0" smtClean="0"/>
-              <a:t>No guaranty</a:t>
-            </a:r>
-            <a:r>
-              <a:rPr lang="en-US" dirty="0" smtClean="0"/>
-              <a:t> that CSS ids are unique</a:t>
-            </a:r>
-            <a:endParaRPr lang="en-US" dirty="0" smtClean="0"/>
+              <a:t>No guaranty that CSS ids are unique</a:t>
+            </a:r>
           </a:p>
           <a:p>
             <a:pPr lvl="1"/>
@@ -22322,7 +22139,6 @@
               <a:rPr lang="en-US" dirty="0" smtClean="0"/>
               <a:t>Not the original purpose of CSS</a:t>
             </a:r>
-            <a:endParaRPr lang="en-US" dirty="0" smtClean="0"/>
           </a:p>
         </p:txBody>
       </p:sp>
@@ -22355,11 +22171,7 @@
           <a:p>
             <a:r>
               <a:rPr lang="en-US" sz="2800" dirty="0" smtClean="0"/>
-              <a:t>Using CSS on web forms </a:t>
-            </a:r>
-            <a:r>
-              <a:rPr lang="en-US" sz="2800" dirty="0" smtClean="0"/>
-              <a:t>hides</a:t>
+              <a:t>Using CSS on web forms hides</a:t>
             </a:r>
             <a:r>
               <a:rPr lang="en-US" sz="2800" dirty="0"/>
@@ -22367,19 +22179,7 @@
             </a:r>
             <a:r>
               <a:rPr lang="en-US" sz="2800" dirty="0" smtClean="0"/>
-              <a:t>an implicit</a:t>
-            </a:r>
-            <a:r>
-              <a:rPr lang="en-US" sz="2800" dirty="0" smtClean="0"/>
-              <a:t> </a:t>
-            </a:r>
-            <a:r>
-              <a:rPr lang="en-US" sz="2800" dirty="0" smtClean="0"/>
-              <a:t>model that could be </a:t>
-            </a:r>
-            <a:r>
-              <a:rPr lang="en-US" sz="2800" dirty="0" smtClean="0"/>
-              <a:t>leveraged</a:t>
+              <a:t>an implicit model that could be leveraged</a:t>
             </a:r>
             <a:endParaRPr lang="en-US" sz="2800" dirty="0"/>
           </a:p>
@@ -22466,21 +22266,12 @@
               <a:rPr lang="en-US" dirty="0" smtClean="0"/>
               <a:t>Ensuring non regression even with frequent changes on forms</a:t>
             </a:r>
-            <a:endParaRPr lang="en-US" dirty="0" smtClean="0"/>
           </a:p>
           <a:p>
             <a:pPr lvl="1"/>
             <a:r>
               <a:rPr lang="en-US" dirty="0" smtClean="0"/>
-              <a:t>No </a:t>
-            </a:r>
-            <a:r>
-              <a:rPr lang="en-US" dirty="0" smtClean="0"/>
-              <a:t>unexpected side effects </a:t>
-            </a:r>
-            <a:r>
-              <a:rPr lang="en-US" dirty="0" smtClean="0"/>
-              <a:t>between business rules</a:t>
+              <a:t>No unexpected side effects between business rules</a:t>
             </a:r>
           </a:p>
           <a:p>
@@ -22493,31 +22284,19 @@
           <a:p>
             <a:r>
               <a:rPr lang="en-US" dirty="0" smtClean="0"/>
-              <a:t>Enabling a </a:t>
-            </a:r>
+              <a:t>Enabling a fast and up-to-date understanding of the form complexity</a:t>
+            </a:r>
+          </a:p>
+          <a:p>
             <a:r>
               <a:rPr lang="en-US" dirty="0" smtClean="0"/>
-              <a:t>fast and up-to-date understanding of the form complexity</a:t>
+              <a:t>Reducing the maintenance effort</a:t>
             </a:r>
           </a:p>
           <a:p>
             <a:r>
               <a:rPr lang="en-US" dirty="0" smtClean="0"/>
-              <a:t>Reducing the </a:t>
-            </a:r>
-            <a:r>
-              <a:rPr lang="en-US" dirty="0" smtClean="0"/>
-              <a:t>maintenance effort</a:t>
-            </a:r>
-          </a:p>
-          <a:p>
-            <a:r>
-              <a:rPr lang="en-US" dirty="0" smtClean="0"/>
-              <a:t>Supporting fields </a:t>
-            </a:r>
-            <a:r>
-              <a:rPr lang="en-US" dirty="0" smtClean="0"/>
-              <a:t>shuffle</a:t>
+              <a:t>Supporting fields shuffle</a:t>
             </a:r>
           </a:p>
           <a:p>
@@ -22663,11 +22442,7 @@
           <a:p>
             <a:r>
               <a:rPr lang="en-US" dirty="0" smtClean="0"/>
-              <a:t>Requires </a:t>
-            </a:r>
-            <a:r>
-              <a:rPr lang="en-US" dirty="0" smtClean="0"/>
-              <a:t>Java 6+ and Maven</a:t>
+              <a:t>Requires Java 6+ and Maven</a:t>
             </a:r>
             <a:endParaRPr lang="en-US" dirty="0"/>
           </a:p>

</xml_diff>

<commit_message>
add live coding steps
slides improvements
</commit_message>
<xml_diff>
--- a/mdl4ui-docs/mdl4ui_cg2013.pptx
+++ b/mdl4ui-docs/mdl4ui_cg2013.pptx
@@ -52,8 +52,8 @@
     <p:sldId id="284" r:id="rId40"/>
     <p:sldId id="288" r:id="rId41"/>
     <p:sldId id="295" r:id="rId42"/>
-    <p:sldId id="294" r:id="rId43"/>
-    <p:sldId id="293" r:id="rId44"/>
+    <p:sldId id="293" r:id="rId43"/>
+    <p:sldId id="294" r:id="rId44"/>
     <p:sldId id="292" r:id="rId45"/>
     <p:sldId id="296" r:id="rId46"/>
     <p:sldId id="297" r:id="rId47"/>
@@ -257,7 +257,7 @@
             <a:fld id="{9F3D9D59-C69D-478D-98BA-46DD69AE3241}" type="datetimeFigureOut">
               <a:rPr lang="en-US" smtClean="0"/>
               <a:pPr/>
-              <a:t>4/4/2013</a:t>
+              <a:t>4/5/2013</a:t>
             </a:fld>
             <a:endParaRPr lang="en-US"/>
           </a:p>
@@ -333,7 +333,7 @@
     </p:spTree>
     <p:extLst>
       <p:ext uri="{BB962C8B-B14F-4D97-AF65-F5344CB8AC3E}">
-        <p14:creationId xmlns:p14="http://schemas.microsoft.com/office/powerpoint/2010/main" val="70803672"/>
+        <p14:creationId xmlns="" xmlns:p14="http://schemas.microsoft.com/office/powerpoint/2010/main" val="70803672"/>
       </p:ext>
     </p:extLst>
   </p:cSld>
@@ -424,7 +424,7 @@
             <a:fld id="{724035F6-A10F-4A2D-A4E3-1D4F59E0F1A1}" type="datetimeFigureOut">
               <a:rPr lang="en-US" smtClean="0"/>
               <a:pPr/>
-              <a:t>4/4/2013</a:t>
+              <a:t>4/5/2013</a:t>
             </a:fld>
             <a:endParaRPr lang="en-US"/>
           </a:p>
@@ -593,7 +593,7 @@
     </p:spTree>
     <p:extLst>
       <p:ext uri="{BB962C8B-B14F-4D97-AF65-F5344CB8AC3E}">
-        <p14:creationId xmlns:p14="http://schemas.microsoft.com/office/powerpoint/2010/main" val="1701488114"/>
+        <p14:creationId xmlns="" xmlns:p14="http://schemas.microsoft.com/office/powerpoint/2010/main" val="1701488114"/>
       </p:ext>
     </p:extLst>
   </p:cSld>
@@ -759,7 +759,7 @@
             <a:fld id="{1C995A55-B5EF-47FB-BCEC-1018828F2E10}" type="slidenum">
               <a:rPr lang="en-US" smtClean="0"/>
               <a:pPr/>
-              <a:t>43</a:t>
+              <a:t>42</a:t>
             </a:fld>
             <a:endParaRPr lang="en-US"/>
           </a:p>
@@ -768,7 +768,7 @@
     </p:spTree>
     <p:extLst>
       <p:ext uri="{BB962C8B-B14F-4D97-AF65-F5344CB8AC3E}">
-        <p14:creationId xmlns:p14="http://schemas.microsoft.com/office/powerpoint/2010/main" val="3047004223"/>
+        <p14:creationId xmlns="" xmlns:p14="http://schemas.microsoft.com/office/powerpoint/2010/main" val="3047004223"/>
       </p:ext>
     </p:extLst>
   </p:cSld>
@@ -853,7 +853,7 @@
     </p:spTree>
     <p:extLst>
       <p:ext uri="{BB962C8B-B14F-4D97-AF65-F5344CB8AC3E}">
-        <p14:creationId xmlns:p14="http://schemas.microsoft.com/office/powerpoint/2010/main" val="3280979232"/>
+        <p14:creationId xmlns="" xmlns:p14="http://schemas.microsoft.com/office/powerpoint/2010/main" val="3280979232"/>
       </p:ext>
     </p:extLst>
   </p:cSld>
@@ -938,7 +938,7 @@
     </p:spTree>
     <p:extLst>
       <p:ext uri="{BB962C8B-B14F-4D97-AF65-F5344CB8AC3E}">
-        <p14:creationId xmlns:p14="http://schemas.microsoft.com/office/powerpoint/2010/main" val="1987381696"/>
+        <p14:creationId xmlns="" xmlns:p14="http://schemas.microsoft.com/office/powerpoint/2010/main" val="1987381696"/>
       </p:ext>
     </p:extLst>
   </p:cSld>
@@ -1130,7 +1130,7 @@
             <a:fld id="{1B5268FF-0D67-4269-9FD2-93B489DF800A}" type="datetimeFigureOut">
               <a:rPr lang="fr-FR" smtClean="0"/>
               <a:pPr/>
-              <a:t>04/04/2013</a:t>
+              <a:t>05/04/2013</a:t>
             </a:fld>
             <a:endParaRPr lang="fr-FR"/>
           </a:p>
@@ -1182,7 +1182,7 @@
     </p:spTree>
     <p:extLst>
       <p:ext uri="{BB962C8B-B14F-4D97-AF65-F5344CB8AC3E}">
-        <p14:creationId xmlns:p14="http://schemas.microsoft.com/office/powerpoint/2010/main" val="322609761"/>
+        <p14:creationId xmlns="" xmlns:p14="http://schemas.microsoft.com/office/powerpoint/2010/main" val="322609761"/>
       </p:ext>
     </p:extLst>
   </p:cSld>
@@ -1302,7 +1302,7 @@
             <a:fld id="{1B5268FF-0D67-4269-9FD2-93B489DF800A}" type="datetimeFigureOut">
               <a:rPr lang="fr-FR" smtClean="0"/>
               <a:pPr/>
-              <a:t>04/04/2013</a:t>
+              <a:t>05/04/2013</a:t>
             </a:fld>
             <a:endParaRPr lang="fr-FR"/>
           </a:p>
@@ -1354,7 +1354,7 @@
     </p:spTree>
     <p:extLst>
       <p:ext uri="{BB962C8B-B14F-4D97-AF65-F5344CB8AC3E}">
-        <p14:creationId xmlns:p14="http://schemas.microsoft.com/office/powerpoint/2010/main" val="1248456722"/>
+        <p14:creationId xmlns="" xmlns:p14="http://schemas.microsoft.com/office/powerpoint/2010/main" val="1248456722"/>
       </p:ext>
     </p:extLst>
   </p:cSld>
@@ -1484,7 +1484,7 @@
             <a:fld id="{1B5268FF-0D67-4269-9FD2-93B489DF800A}" type="datetimeFigureOut">
               <a:rPr lang="fr-FR" smtClean="0"/>
               <a:pPr/>
-              <a:t>04/04/2013</a:t>
+              <a:t>05/04/2013</a:t>
             </a:fld>
             <a:endParaRPr lang="fr-FR"/>
           </a:p>
@@ -1536,7 +1536,7 @@
     </p:spTree>
     <p:extLst>
       <p:ext uri="{BB962C8B-B14F-4D97-AF65-F5344CB8AC3E}">
-        <p14:creationId xmlns:p14="http://schemas.microsoft.com/office/powerpoint/2010/main" val="4236232986"/>
+        <p14:creationId xmlns="" xmlns:p14="http://schemas.microsoft.com/office/powerpoint/2010/main" val="4236232986"/>
       </p:ext>
     </p:extLst>
   </p:cSld>
@@ -1656,7 +1656,7 @@
             <a:fld id="{1B5268FF-0D67-4269-9FD2-93B489DF800A}" type="datetimeFigureOut">
               <a:rPr lang="fr-FR" smtClean="0"/>
               <a:pPr/>
-              <a:t>04/04/2013</a:t>
+              <a:t>05/04/2013</a:t>
             </a:fld>
             <a:endParaRPr lang="fr-FR"/>
           </a:p>
@@ -1708,7 +1708,7 @@
     </p:spTree>
     <p:extLst>
       <p:ext uri="{BB962C8B-B14F-4D97-AF65-F5344CB8AC3E}">
-        <p14:creationId xmlns:p14="http://schemas.microsoft.com/office/powerpoint/2010/main" val="3454835055"/>
+        <p14:creationId xmlns="" xmlns:p14="http://schemas.microsoft.com/office/powerpoint/2010/main" val="3454835055"/>
       </p:ext>
     </p:extLst>
   </p:cSld>
@@ -1911,7 +1911,7 @@
             <a:fld id="{1B5268FF-0D67-4269-9FD2-93B489DF800A}" type="datetimeFigureOut">
               <a:rPr lang="fr-FR" smtClean="0"/>
               <a:pPr/>
-              <a:t>04/04/2013</a:t>
+              <a:t>05/04/2013</a:t>
             </a:fld>
             <a:endParaRPr lang="fr-FR"/>
           </a:p>
@@ -1963,7 +1963,7 @@
     </p:spTree>
     <p:extLst>
       <p:ext uri="{BB962C8B-B14F-4D97-AF65-F5344CB8AC3E}">
-        <p14:creationId xmlns:p14="http://schemas.microsoft.com/office/powerpoint/2010/main" val="804127244"/>
+        <p14:creationId xmlns="" xmlns:p14="http://schemas.microsoft.com/office/powerpoint/2010/main" val="804127244"/>
       </p:ext>
     </p:extLst>
   </p:cSld>
@@ -2201,7 +2201,7 @@
             <a:fld id="{1B5268FF-0D67-4269-9FD2-93B489DF800A}" type="datetimeFigureOut">
               <a:rPr lang="fr-FR" smtClean="0"/>
               <a:pPr/>
-              <a:t>04/04/2013</a:t>
+              <a:t>05/04/2013</a:t>
             </a:fld>
             <a:endParaRPr lang="fr-FR"/>
           </a:p>
@@ -2253,7 +2253,7 @@
     </p:spTree>
     <p:extLst>
       <p:ext uri="{BB962C8B-B14F-4D97-AF65-F5344CB8AC3E}">
-        <p14:creationId xmlns:p14="http://schemas.microsoft.com/office/powerpoint/2010/main" val="586698658"/>
+        <p14:creationId xmlns="" xmlns:p14="http://schemas.microsoft.com/office/powerpoint/2010/main" val="586698658"/>
       </p:ext>
     </p:extLst>
   </p:cSld>
@@ -2625,7 +2625,7 @@
             <a:fld id="{1B5268FF-0D67-4269-9FD2-93B489DF800A}" type="datetimeFigureOut">
               <a:rPr lang="fr-FR" smtClean="0"/>
               <a:pPr/>
-              <a:t>04/04/2013</a:t>
+              <a:t>05/04/2013</a:t>
             </a:fld>
             <a:endParaRPr lang="fr-FR"/>
           </a:p>
@@ -2677,7 +2677,7 @@
     </p:spTree>
     <p:extLst>
       <p:ext uri="{BB962C8B-B14F-4D97-AF65-F5344CB8AC3E}">
-        <p14:creationId xmlns:p14="http://schemas.microsoft.com/office/powerpoint/2010/main" val="19144436"/>
+        <p14:creationId xmlns="" xmlns:p14="http://schemas.microsoft.com/office/powerpoint/2010/main" val="19144436"/>
       </p:ext>
     </p:extLst>
   </p:cSld>
@@ -2745,7 +2745,7 @@
             <a:fld id="{1B5268FF-0D67-4269-9FD2-93B489DF800A}" type="datetimeFigureOut">
               <a:rPr lang="fr-FR" smtClean="0"/>
               <a:pPr/>
-              <a:t>04/04/2013</a:t>
+              <a:t>05/04/2013</a:t>
             </a:fld>
             <a:endParaRPr lang="fr-FR"/>
           </a:p>
@@ -2797,7 +2797,7 @@
     </p:spTree>
     <p:extLst>
       <p:ext uri="{BB962C8B-B14F-4D97-AF65-F5344CB8AC3E}">
-        <p14:creationId xmlns:p14="http://schemas.microsoft.com/office/powerpoint/2010/main" val="202749597"/>
+        <p14:creationId xmlns="" xmlns:p14="http://schemas.microsoft.com/office/powerpoint/2010/main" val="202749597"/>
       </p:ext>
     </p:extLst>
   </p:cSld>
@@ -2842,7 +2842,7 @@
             <a:fld id="{1B5268FF-0D67-4269-9FD2-93B489DF800A}" type="datetimeFigureOut">
               <a:rPr lang="fr-FR" smtClean="0"/>
               <a:pPr/>
-              <a:t>04/04/2013</a:t>
+              <a:t>05/04/2013</a:t>
             </a:fld>
             <a:endParaRPr lang="fr-FR"/>
           </a:p>
@@ -2894,7 +2894,7 @@
     </p:spTree>
     <p:extLst>
       <p:ext uri="{BB962C8B-B14F-4D97-AF65-F5344CB8AC3E}">
-        <p14:creationId xmlns:p14="http://schemas.microsoft.com/office/powerpoint/2010/main" val="2898363528"/>
+        <p14:creationId xmlns="" xmlns:p14="http://schemas.microsoft.com/office/powerpoint/2010/main" val="2898363528"/>
       </p:ext>
     </p:extLst>
   </p:cSld>
@@ -3121,7 +3121,7 @@
             <a:fld id="{1B5268FF-0D67-4269-9FD2-93B489DF800A}" type="datetimeFigureOut">
               <a:rPr lang="fr-FR" smtClean="0"/>
               <a:pPr/>
-              <a:t>04/04/2013</a:t>
+              <a:t>05/04/2013</a:t>
             </a:fld>
             <a:endParaRPr lang="fr-FR"/>
           </a:p>
@@ -3173,7 +3173,7 @@
     </p:spTree>
     <p:extLst>
       <p:ext uri="{BB962C8B-B14F-4D97-AF65-F5344CB8AC3E}">
-        <p14:creationId xmlns:p14="http://schemas.microsoft.com/office/powerpoint/2010/main" val="4010598191"/>
+        <p14:creationId xmlns="" xmlns:p14="http://schemas.microsoft.com/office/powerpoint/2010/main" val="4010598191"/>
       </p:ext>
     </p:extLst>
   </p:cSld>
@@ -3376,7 +3376,7 @@
             <a:fld id="{1B5268FF-0D67-4269-9FD2-93B489DF800A}" type="datetimeFigureOut">
               <a:rPr lang="fr-FR" smtClean="0"/>
               <a:pPr/>
-              <a:t>04/04/2013</a:t>
+              <a:t>05/04/2013</a:t>
             </a:fld>
             <a:endParaRPr lang="fr-FR"/>
           </a:p>
@@ -3428,7 +3428,7 @@
     </p:spTree>
     <p:extLst>
       <p:ext uri="{BB962C8B-B14F-4D97-AF65-F5344CB8AC3E}">
-        <p14:creationId xmlns:p14="http://schemas.microsoft.com/office/powerpoint/2010/main" val="1433498939"/>
+        <p14:creationId xmlns="" xmlns:p14="http://schemas.microsoft.com/office/powerpoint/2010/main" val="1433498939"/>
       </p:ext>
     </p:extLst>
   </p:cSld>
@@ -3591,7 +3591,7 @@
             <a:fld id="{1B5268FF-0D67-4269-9FD2-93B489DF800A}" type="datetimeFigureOut">
               <a:rPr lang="fr-FR" smtClean="0"/>
               <a:pPr/>
-              <a:t>04/04/2013</a:t>
+              <a:t>05/04/2013</a:t>
             </a:fld>
             <a:endParaRPr lang="fr-FR"/>
           </a:p>
@@ -3679,7 +3679,7 @@
     </p:spTree>
     <p:extLst>
       <p:ext uri="{BB962C8B-B14F-4D97-AF65-F5344CB8AC3E}">
-        <p14:creationId xmlns:p14="http://schemas.microsoft.com/office/powerpoint/2010/main" val="2684825788"/>
+        <p14:creationId xmlns="" xmlns:p14="http://schemas.microsoft.com/office/powerpoint/2010/main" val="2684825788"/>
       </p:ext>
     </p:extLst>
   </p:cSld>
@@ -4050,18 +4050,18 @@
     </p:spTree>
     <p:extLst>
       <p:ext uri="{BB962C8B-B14F-4D97-AF65-F5344CB8AC3E}">
-        <p14:creationId xmlns:p14="http://schemas.microsoft.com/office/powerpoint/2010/main" val="3955344790"/>
+        <p14:creationId xmlns="" xmlns:p14="http://schemas.microsoft.com/office/powerpoint/2010/main" val="3955344790"/>
       </p:ext>
     </p:extLst>
   </p:cSld>
   <p:clrMapOvr>
     <a:masterClrMapping/>
   </p:clrMapOvr>
-  <mc:AlternateContent xmlns:mc="http://schemas.openxmlformats.org/markup-compatibility/2006" xmlns:p14="http://schemas.microsoft.com/office/powerpoint/2010/main">
-    <mc:Choice Requires="p14">
+  <mc:AlternateContent xmlns:mc="http://schemas.openxmlformats.org/markup-compatibility/2006">
+    <mc:Choice xmlns="" xmlns:p14="http://schemas.microsoft.com/office/powerpoint/2010/main" Requires="p14">
       <p:transition spd="slow" p14:dur="2000"/>
     </mc:Choice>
-    <mc:Fallback xmlns="">
+    <mc:Fallback>
       <p:transition spd="slow"/>
     </mc:Fallback>
   </mc:AlternateContent>
@@ -4141,7 +4141,7 @@
     </p:spTree>
     <p:extLst>
       <p:ext uri="{BB962C8B-B14F-4D97-AF65-F5344CB8AC3E}">
-        <p14:creationId xmlns:p14="http://schemas.microsoft.com/office/powerpoint/2010/main" val="3139881919"/>
+        <p14:creationId xmlns="" xmlns:p14="http://schemas.microsoft.com/office/powerpoint/2010/main" val="3139881919"/>
       </p:ext>
     </p:extLst>
   </p:cSld>
@@ -4543,7 +4543,7 @@
     </p:spTree>
     <p:extLst>
       <p:ext uri="{BB962C8B-B14F-4D97-AF65-F5344CB8AC3E}">
-        <p14:creationId xmlns:p14="http://schemas.microsoft.com/office/powerpoint/2010/main" val="1728169033"/>
+        <p14:creationId xmlns="" xmlns:p14="http://schemas.microsoft.com/office/powerpoint/2010/main" val="1728169033"/>
       </p:ext>
     </p:extLst>
   </p:cSld>
@@ -4694,7 +4694,7 @@
     </p:spTree>
     <p:extLst>
       <p:ext uri="{BB962C8B-B14F-4D97-AF65-F5344CB8AC3E}">
-        <p14:creationId xmlns:p14="http://schemas.microsoft.com/office/powerpoint/2010/main" val="3774437115"/>
+        <p14:creationId xmlns="" xmlns:p14="http://schemas.microsoft.com/office/powerpoint/2010/main" val="3774437115"/>
       </p:ext>
     </p:extLst>
   </p:cSld>
@@ -4774,10 +4774,10 @@
             <p:nvPr/>
           </p:nvPicPr>
           <p:blipFill>
-            <a:blip r:embed="rId2">
+            <a:blip r:embed="rId2" cstate="print">
               <a:extLst>
                 <a:ext uri="{28A0092B-C50C-407E-A947-70E740481C1C}">
-                  <a14:useLocalDpi xmlns:a14="http://schemas.microsoft.com/office/drawing/2010/main" val="0"/>
+                  <a14:useLocalDpi xmlns="" xmlns:a14="http://schemas.microsoft.com/office/drawing/2010/main" val="0"/>
                 </a:ext>
               </a:extLst>
             </a:blip>
@@ -4804,10 +4804,10 @@
             <p:nvPr/>
           </p:nvPicPr>
           <p:blipFill>
-            <a:blip r:embed="rId3">
+            <a:blip r:embed="rId3" cstate="print">
               <a:extLst>
                 <a:ext uri="{28A0092B-C50C-407E-A947-70E740481C1C}">
-                  <a14:useLocalDpi xmlns:a14="http://schemas.microsoft.com/office/drawing/2010/main" val="0"/>
+                  <a14:useLocalDpi xmlns="" xmlns:a14="http://schemas.microsoft.com/office/drawing/2010/main" val="0"/>
                 </a:ext>
               </a:extLst>
             </a:blip>
@@ -4834,10 +4834,10 @@
             <p:nvPr/>
           </p:nvPicPr>
           <p:blipFill>
-            <a:blip r:embed="rId4">
+            <a:blip r:embed="rId4" cstate="print">
               <a:extLst>
                 <a:ext uri="{28A0092B-C50C-407E-A947-70E740481C1C}">
-                  <a14:useLocalDpi xmlns:a14="http://schemas.microsoft.com/office/drawing/2010/main" val="0"/>
+                  <a14:useLocalDpi xmlns="" xmlns:a14="http://schemas.microsoft.com/office/drawing/2010/main" val="0"/>
                 </a:ext>
               </a:extLst>
             </a:blip>
@@ -4960,7 +4960,7 @@
     </p:spTree>
     <p:extLst>
       <p:ext uri="{BB962C8B-B14F-4D97-AF65-F5344CB8AC3E}">
-        <p14:creationId xmlns:p14="http://schemas.microsoft.com/office/powerpoint/2010/main" val="1377264780"/>
+        <p14:creationId xmlns="" xmlns:p14="http://schemas.microsoft.com/office/powerpoint/2010/main" val="1377264780"/>
       </p:ext>
     </p:extLst>
   </p:cSld>
@@ -5155,10 +5155,10 @@
           <p:nvPr/>
         </p:nvPicPr>
         <p:blipFill>
-          <a:blip r:embed="rId2">
+          <a:blip r:embed="rId2" cstate="print">
             <a:extLst>
               <a:ext uri="{28A0092B-C50C-407E-A947-70E740481C1C}">
-                <a14:useLocalDpi xmlns:a14="http://schemas.microsoft.com/office/drawing/2010/main" val="0"/>
+                <a14:useLocalDpi xmlns="" xmlns:a14="http://schemas.microsoft.com/office/drawing/2010/main" val="0"/>
               </a:ext>
             </a:extLst>
           </a:blip>
@@ -5185,10 +5185,10 @@
           <p:nvPr/>
         </p:nvPicPr>
         <p:blipFill>
-          <a:blip r:embed="rId3">
+          <a:blip r:embed="rId3" cstate="print">
             <a:extLst>
               <a:ext uri="{28A0092B-C50C-407E-A947-70E740481C1C}">
-                <a14:useLocalDpi xmlns:a14="http://schemas.microsoft.com/office/drawing/2010/main" val="0"/>
+                <a14:useLocalDpi xmlns="" xmlns:a14="http://schemas.microsoft.com/office/drawing/2010/main" val="0"/>
               </a:ext>
             </a:extLst>
           </a:blip>
@@ -5311,10 +5311,10 @@
           <p:nvPr/>
         </p:nvPicPr>
         <p:blipFill>
-          <a:blip r:embed="rId4">
+          <a:blip r:embed="rId4" cstate="print">
             <a:extLst>
               <a:ext uri="{28A0092B-C50C-407E-A947-70E740481C1C}">
-                <a14:useLocalDpi xmlns:a14="http://schemas.microsoft.com/office/drawing/2010/main" val="0"/>
+                <a14:useLocalDpi xmlns="" xmlns:a14="http://schemas.microsoft.com/office/drawing/2010/main" val="0"/>
               </a:ext>
             </a:extLst>
           </a:blip>
@@ -5427,7 +5427,7 @@
     </p:spTree>
     <p:extLst>
       <p:ext uri="{BB962C8B-B14F-4D97-AF65-F5344CB8AC3E}">
-        <p14:creationId xmlns:p14="http://schemas.microsoft.com/office/powerpoint/2010/main" val="3336203041"/>
+        <p14:creationId xmlns="" xmlns:p14="http://schemas.microsoft.com/office/powerpoint/2010/main" val="3336203041"/>
       </p:ext>
     </p:extLst>
   </p:cSld>
@@ -5842,10 +5842,10 @@
           <p:nvPr/>
         </p:nvPicPr>
         <p:blipFill>
-          <a:blip r:embed="rId2">
+          <a:blip r:embed="rId2" cstate="print">
             <a:extLst>
               <a:ext uri="{28A0092B-C50C-407E-A947-70E740481C1C}">
-                <a14:useLocalDpi xmlns:a14="http://schemas.microsoft.com/office/drawing/2010/main" val="0"/>
+                <a14:useLocalDpi xmlns="" xmlns:a14="http://schemas.microsoft.com/office/drawing/2010/main" val="0"/>
               </a:ext>
             </a:extLst>
           </a:blip>
@@ -5872,10 +5872,10 @@
           <p:nvPr/>
         </p:nvPicPr>
         <p:blipFill>
-          <a:blip r:embed="rId3">
+          <a:blip r:embed="rId3" cstate="print">
             <a:extLst>
               <a:ext uri="{28A0092B-C50C-407E-A947-70E740481C1C}">
-                <a14:useLocalDpi xmlns:a14="http://schemas.microsoft.com/office/drawing/2010/main" val="0"/>
+                <a14:useLocalDpi xmlns="" xmlns:a14="http://schemas.microsoft.com/office/drawing/2010/main" val="0"/>
               </a:ext>
             </a:extLst>
           </a:blip>
@@ -5902,10 +5902,10 @@
           <p:nvPr/>
         </p:nvPicPr>
         <p:blipFill>
-          <a:blip r:embed="rId4">
+          <a:blip r:embed="rId4" cstate="print">
             <a:extLst>
               <a:ext uri="{28A0092B-C50C-407E-A947-70E740481C1C}">
-                <a14:useLocalDpi xmlns:a14="http://schemas.microsoft.com/office/drawing/2010/main" val="0"/>
+                <a14:useLocalDpi xmlns="" xmlns:a14="http://schemas.microsoft.com/office/drawing/2010/main" val="0"/>
               </a:ext>
             </a:extLst>
           </a:blip>
@@ -6018,7 +6018,7 @@
     </p:spTree>
     <p:extLst>
       <p:ext uri="{BB962C8B-B14F-4D97-AF65-F5344CB8AC3E}">
-        <p14:creationId xmlns:p14="http://schemas.microsoft.com/office/powerpoint/2010/main" val="864210357"/>
+        <p14:creationId xmlns="" xmlns:p14="http://schemas.microsoft.com/office/powerpoint/2010/main" val="864210357"/>
       </p:ext>
     </p:extLst>
   </p:cSld>
@@ -6289,10 +6289,10 @@
           <p:nvPr/>
         </p:nvPicPr>
         <p:blipFill>
-          <a:blip r:embed="rId2">
+          <a:blip r:embed="rId2" cstate="print">
             <a:extLst>
               <a:ext uri="{28A0092B-C50C-407E-A947-70E740481C1C}">
-                <a14:useLocalDpi xmlns:a14="http://schemas.microsoft.com/office/drawing/2010/main" val="0"/>
+                <a14:useLocalDpi xmlns="" xmlns:a14="http://schemas.microsoft.com/office/drawing/2010/main" val="0"/>
               </a:ext>
             </a:extLst>
           </a:blip>
@@ -6319,10 +6319,10 @@
           <p:nvPr/>
         </p:nvPicPr>
         <p:blipFill>
-          <a:blip r:embed="rId3">
+          <a:blip r:embed="rId3" cstate="print">
             <a:extLst>
               <a:ext uri="{28A0092B-C50C-407E-A947-70E740481C1C}">
-                <a14:useLocalDpi xmlns:a14="http://schemas.microsoft.com/office/drawing/2010/main" val="0"/>
+                <a14:useLocalDpi xmlns="" xmlns:a14="http://schemas.microsoft.com/office/drawing/2010/main" val="0"/>
               </a:ext>
             </a:extLst>
           </a:blip>
@@ -6556,10 +6556,10 @@
           <p:nvPr/>
         </p:nvPicPr>
         <p:blipFill>
-          <a:blip r:embed="rId4">
+          <a:blip r:embed="rId4" cstate="print">
             <a:extLst>
               <a:ext uri="{28A0092B-C50C-407E-A947-70E740481C1C}">
-                <a14:useLocalDpi xmlns:a14="http://schemas.microsoft.com/office/drawing/2010/main" val="0"/>
+                <a14:useLocalDpi xmlns="" xmlns:a14="http://schemas.microsoft.com/office/drawing/2010/main" val="0"/>
               </a:ext>
             </a:extLst>
           </a:blip>
@@ -7038,7 +7038,7 @@
     </p:spTree>
     <p:extLst>
       <p:ext uri="{BB962C8B-B14F-4D97-AF65-F5344CB8AC3E}">
-        <p14:creationId xmlns:p14="http://schemas.microsoft.com/office/powerpoint/2010/main" val="3336203041"/>
+        <p14:creationId xmlns="" xmlns:p14="http://schemas.microsoft.com/office/powerpoint/2010/main" val="3336203041"/>
       </p:ext>
     </p:extLst>
   </p:cSld>
@@ -7268,7 +7268,7 @@
           <a:blip r:embed="rId2" cstate="print">
             <a:extLst>
               <a:ext uri="{28A0092B-C50C-407E-A947-70E740481C1C}">
-                <a14:useLocalDpi xmlns:a14="http://schemas.microsoft.com/office/drawing/2010/main" val="0"/>
+                <a14:useLocalDpi xmlns="" xmlns:a14="http://schemas.microsoft.com/office/drawing/2010/main" val="0"/>
               </a:ext>
             </a:extLst>
           </a:blip>
@@ -7298,7 +7298,7 @@
           <a:blip r:embed="rId3" cstate="print">
             <a:extLst>
               <a:ext uri="{28A0092B-C50C-407E-A947-70E740481C1C}">
-                <a14:useLocalDpi xmlns:a14="http://schemas.microsoft.com/office/drawing/2010/main" val="0"/>
+                <a14:useLocalDpi xmlns="" xmlns:a14="http://schemas.microsoft.com/office/drawing/2010/main" val="0"/>
               </a:ext>
             </a:extLst>
           </a:blip>
@@ -7615,7 +7615,7 @@
     </p:spTree>
     <p:extLst>
       <p:ext uri="{BB962C8B-B14F-4D97-AF65-F5344CB8AC3E}">
-        <p14:creationId xmlns:p14="http://schemas.microsoft.com/office/powerpoint/2010/main" val="2819423520"/>
+        <p14:creationId xmlns="" xmlns:p14="http://schemas.microsoft.com/office/powerpoint/2010/main" val="2819423520"/>
       </p:ext>
     </p:extLst>
   </p:cSld>
@@ -8123,7 +8123,7 @@
     </p:spTree>
     <p:extLst>
       <p:ext uri="{BB962C8B-B14F-4D97-AF65-F5344CB8AC3E}">
-        <p14:creationId xmlns:p14="http://schemas.microsoft.com/office/powerpoint/2010/main" val="3627640579"/>
+        <p14:creationId xmlns="" xmlns:p14="http://schemas.microsoft.com/office/powerpoint/2010/main" val="3627640579"/>
       </p:ext>
     </p:extLst>
   </p:cSld>
@@ -8261,7 +8261,7 @@
           <a:blip r:embed="rId2" cstate="print">
             <a:extLst>
               <a:ext uri="{28A0092B-C50C-407E-A947-70E740481C1C}">
-                <a14:useLocalDpi xmlns:a14="http://schemas.microsoft.com/office/drawing/2010/main" val="0"/>
+                <a14:useLocalDpi xmlns="" xmlns:a14="http://schemas.microsoft.com/office/drawing/2010/main" val="0"/>
               </a:ext>
             </a:extLst>
           </a:blip>
@@ -8337,7 +8337,7 @@
     </p:spTree>
     <p:extLst>
       <p:ext uri="{BB962C8B-B14F-4D97-AF65-F5344CB8AC3E}">
-        <p14:creationId xmlns:p14="http://schemas.microsoft.com/office/powerpoint/2010/main" val="171061288"/>
+        <p14:creationId xmlns="" xmlns:p14="http://schemas.microsoft.com/office/powerpoint/2010/main" val="171061288"/>
       </p:ext>
     </p:extLst>
   </p:cSld>
@@ -8607,7 +8607,7 @@
           <a:blip r:embed="rId2" cstate="print">
             <a:extLst>
               <a:ext uri="{28A0092B-C50C-407E-A947-70E740481C1C}">
-                <a14:useLocalDpi xmlns:a14="http://schemas.microsoft.com/office/drawing/2010/main"/>
+                <a14:useLocalDpi xmlns="" xmlns:a14="http://schemas.microsoft.com/office/drawing/2010/main"/>
               </a:ext>
             </a:extLst>
           </a:blip>
@@ -8632,7 +8632,7 @@
     </p:spTree>
     <p:extLst>
       <p:ext uri="{BB962C8B-B14F-4D97-AF65-F5344CB8AC3E}">
-        <p14:creationId xmlns:p14="http://schemas.microsoft.com/office/powerpoint/2010/main" val="1630604182"/>
+        <p14:creationId xmlns="" xmlns:p14="http://schemas.microsoft.com/office/powerpoint/2010/main" val="1630604182"/>
       </p:ext>
     </p:extLst>
   </p:cSld>
@@ -8678,7 +8678,7 @@
           <a:blip r:embed="rId2" cstate="print">
             <a:extLst>
               <a:ext uri="{28A0092B-C50C-407E-A947-70E740481C1C}">
-                <a14:useLocalDpi xmlns:a14="http://schemas.microsoft.com/office/drawing/2010/main" val="0"/>
+                <a14:useLocalDpi xmlns="" xmlns:a14="http://schemas.microsoft.com/office/drawing/2010/main" val="0"/>
               </a:ext>
             </a:extLst>
           </a:blip>
@@ -8913,7 +8913,7 @@
     </p:spTree>
     <p:extLst>
       <p:ext uri="{BB962C8B-B14F-4D97-AF65-F5344CB8AC3E}">
-        <p14:creationId xmlns:p14="http://schemas.microsoft.com/office/powerpoint/2010/main" val="394514968"/>
+        <p14:creationId xmlns="" xmlns:p14="http://schemas.microsoft.com/office/powerpoint/2010/main" val="394514968"/>
       </p:ext>
     </p:extLst>
   </p:cSld>
@@ -9047,7 +9047,7 @@
           <a:blip r:embed="rId2" cstate="print">
             <a:extLst>
               <a:ext uri="{28A0092B-C50C-407E-A947-70E740481C1C}">
-                <a14:useLocalDpi xmlns:a14="http://schemas.microsoft.com/office/drawing/2010/main" val="0"/>
+                <a14:useLocalDpi xmlns="" xmlns:a14="http://schemas.microsoft.com/office/drawing/2010/main" val="0"/>
               </a:ext>
             </a:extLst>
           </a:blip>
@@ -9128,7 +9128,7 @@
     </p:spTree>
     <p:extLst>
       <p:ext uri="{BB962C8B-B14F-4D97-AF65-F5344CB8AC3E}">
-        <p14:creationId xmlns:p14="http://schemas.microsoft.com/office/powerpoint/2010/main" val="3593113261"/>
+        <p14:creationId xmlns="" xmlns:p14="http://schemas.microsoft.com/office/powerpoint/2010/main" val="3593113261"/>
       </p:ext>
     </p:extLst>
   </p:cSld>
@@ -9286,7 +9286,7 @@
           <a:blip r:embed="rId2" cstate="print">
             <a:extLst>
               <a:ext uri="{28A0092B-C50C-407E-A947-70E740481C1C}">
-                <a14:useLocalDpi xmlns:a14="http://schemas.microsoft.com/office/drawing/2010/main" val="0"/>
+                <a14:useLocalDpi xmlns="" xmlns:a14="http://schemas.microsoft.com/office/drawing/2010/main" val="0"/>
               </a:ext>
             </a:extLst>
           </a:blip>
@@ -9362,7 +9362,7 @@
     </p:spTree>
     <p:extLst>
       <p:ext uri="{BB962C8B-B14F-4D97-AF65-F5344CB8AC3E}">
-        <p14:creationId xmlns:p14="http://schemas.microsoft.com/office/powerpoint/2010/main" val="451913240"/>
+        <p14:creationId xmlns="" xmlns:p14="http://schemas.microsoft.com/office/powerpoint/2010/main" val="451913240"/>
       </p:ext>
     </p:extLst>
   </p:cSld>
@@ -9431,7 +9431,7 @@
           <a:blip r:embed="rId2" cstate="print">
             <a:extLst>
               <a:ext uri="{28A0092B-C50C-407E-A947-70E740481C1C}">
-                <a14:useLocalDpi xmlns:a14="http://schemas.microsoft.com/office/drawing/2010/main" val="0"/>
+                <a14:useLocalDpi xmlns="" xmlns:a14="http://schemas.microsoft.com/office/drawing/2010/main" val="0"/>
               </a:ext>
             </a:extLst>
           </a:blip>
@@ -9628,7 +9628,7 @@
     </p:spTree>
     <p:extLst>
       <p:ext uri="{BB962C8B-B14F-4D97-AF65-F5344CB8AC3E}">
-        <p14:creationId xmlns:p14="http://schemas.microsoft.com/office/powerpoint/2010/main" val="2009636028"/>
+        <p14:creationId xmlns="" xmlns:p14="http://schemas.microsoft.com/office/powerpoint/2010/main" val="2009636028"/>
       </p:ext>
     </p:extLst>
   </p:cSld>
@@ -9697,7 +9697,7 @@
           <a:blip r:embed="rId2" cstate="print">
             <a:extLst>
               <a:ext uri="{28A0092B-C50C-407E-A947-70E740481C1C}">
-                <a14:useLocalDpi xmlns:a14="http://schemas.microsoft.com/office/drawing/2010/main" val="0"/>
+                <a14:useLocalDpi xmlns="" xmlns:a14="http://schemas.microsoft.com/office/drawing/2010/main" val="0"/>
               </a:ext>
             </a:extLst>
           </a:blip>
@@ -9894,7 +9894,7 @@
     </p:spTree>
     <p:extLst>
       <p:ext uri="{BB962C8B-B14F-4D97-AF65-F5344CB8AC3E}">
-        <p14:creationId xmlns:p14="http://schemas.microsoft.com/office/powerpoint/2010/main" val="1131833659"/>
+        <p14:creationId xmlns="" xmlns:p14="http://schemas.microsoft.com/office/powerpoint/2010/main" val="1131833659"/>
       </p:ext>
     </p:extLst>
   </p:cSld>
@@ -10045,7 +10045,7 @@
     </p:spTree>
     <p:extLst>
       <p:ext uri="{BB962C8B-B14F-4D97-AF65-F5344CB8AC3E}">
-        <p14:creationId xmlns:p14="http://schemas.microsoft.com/office/powerpoint/2010/main" val="3774437115"/>
+        <p14:creationId xmlns="" xmlns:p14="http://schemas.microsoft.com/office/powerpoint/2010/main" val="3774437115"/>
       </p:ext>
     </p:extLst>
   </p:cSld>
@@ -10114,7 +10114,7 @@
           <a:blip r:embed="rId2" cstate="print">
             <a:extLst>
               <a:ext uri="{28A0092B-C50C-407E-A947-70E740481C1C}">
-                <a14:useLocalDpi xmlns:a14="http://schemas.microsoft.com/office/drawing/2010/main" val="0"/>
+                <a14:useLocalDpi xmlns="" xmlns:a14="http://schemas.microsoft.com/office/drawing/2010/main" val="0"/>
               </a:ext>
             </a:extLst>
           </a:blip>
@@ -10135,7 +10135,7 @@
     </p:spTree>
     <p:extLst>
       <p:ext uri="{BB962C8B-B14F-4D97-AF65-F5344CB8AC3E}">
-        <p14:creationId xmlns:p14="http://schemas.microsoft.com/office/powerpoint/2010/main" val="1848404178"/>
+        <p14:creationId xmlns="" xmlns:p14="http://schemas.microsoft.com/office/powerpoint/2010/main" val="1848404178"/>
       </p:ext>
     </p:extLst>
   </p:cSld>
@@ -10319,7 +10319,7 @@
     </p:spTree>
     <p:extLst>
       <p:ext uri="{BB962C8B-B14F-4D97-AF65-F5344CB8AC3E}">
-        <p14:creationId xmlns:p14="http://schemas.microsoft.com/office/powerpoint/2010/main" val="1155854373"/>
+        <p14:creationId xmlns="" xmlns:p14="http://schemas.microsoft.com/office/powerpoint/2010/main" val="1155854373"/>
       </p:ext>
     </p:extLst>
   </p:cSld>
@@ -10492,7 +10492,7 @@
     </p:spTree>
     <p:extLst>
       <p:ext uri="{BB962C8B-B14F-4D97-AF65-F5344CB8AC3E}">
-        <p14:creationId xmlns:p14="http://schemas.microsoft.com/office/powerpoint/2010/main" val="1027356186"/>
+        <p14:creationId xmlns="" xmlns:p14="http://schemas.microsoft.com/office/powerpoint/2010/main" val="1027356186"/>
       </p:ext>
     </p:extLst>
   </p:cSld>
@@ -10561,7 +10561,7 @@
           <a:blip r:embed="rId2" cstate="print">
             <a:extLst>
               <a:ext uri="{28A0092B-C50C-407E-A947-70E740481C1C}">
-                <a14:useLocalDpi xmlns:a14="http://schemas.microsoft.com/office/drawing/2010/main" val="0"/>
+                <a14:useLocalDpi xmlns="" xmlns:a14="http://schemas.microsoft.com/office/drawing/2010/main" val="0"/>
               </a:ext>
             </a:extLst>
           </a:blip>
@@ -10591,7 +10591,7 @@
           <a:blip r:embed="rId3" cstate="print">
             <a:extLst>
               <a:ext uri="{28A0092B-C50C-407E-A947-70E740481C1C}">
-                <a14:useLocalDpi xmlns:a14="http://schemas.microsoft.com/office/drawing/2010/main" val="0"/>
+                <a14:useLocalDpi xmlns="" xmlns:a14="http://schemas.microsoft.com/office/drawing/2010/main" val="0"/>
               </a:ext>
             </a:extLst>
           </a:blip>
@@ -10615,7 +10615,7 @@
     </p:spTree>
     <p:extLst>
       <p:ext uri="{BB962C8B-B14F-4D97-AF65-F5344CB8AC3E}">
-        <p14:creationId xmlns:p14="http://schemas.microsoft.com/office/powerpoint/2010/main" val="2369171751"/>
+        <p14:creationId xmlns="" xmlns:p14="http://schemas.microsoft.com/office/powerpoint/2010/main" val="2369171751"/>
       </p:ext>
     </p:extLst>
   </p:cSld>
@@ -10776,7 +10776,7 @@
     </p:spTree>
     <p:extLst>
       <p:ext uri="{BB962C8B-B14F-4D97-AF65-F5344CB8AC3E}">
-        <p14:creationId xmlns:p14="http://schemas.microsoft.com/office/powerpoint/2010/main" val="3312784383"/>
+        <p14:creationId xmlns="" xmlns:p14="http://schemas.microsoft.com/office/powerpoint/2010/main" val="3312784383"/>
       </p:ext>
     </p:extLst>
   </p:cSld>
@@ -10845,7 +10845,7 @@
           <a:blip r:embed="rId2" cstate="print">
             <a:extLst>
               <a:ext uri="{28A0092B-C50C-407E-A947-70E740481C1C}">
-                <a14:useLocalDpi xmlns:a14="http://schemas.microsoft.com/office/drawing/2010/main" val="0"/>
+                <a14:useLocalDpi xmlns="" xmlns:a14="http://schemas.microsoft.com/office/drawing/2010/main" val="0"/>
               </a:ext>
             </a:extLst>
           </a:blip>
@@ -10875,7 +10875,7 @@
           <a:blip r:embed="rId3" cstate="print">
             <a:extLst>
               <a:ext uri="{28A0092B-C50C-407E-A947-70E740481C1C}">
-                <a14:useLocalDpi xmlns:a14="http://schemas.microsoft.com/office/drawing/2010/main" val="0"/>
+                <a14:useLocalDpi xmlns="" xmlns:a14="http://schemas.microsoft.com/office/drawing/2010/main" val="0"/>
               </a:ext>
             </a:extLst>
           </a:blip>
@@ -10905,7 +10905,7 @@
           <a:blip r:embed="rId4" cstate="print">
             <a:extLst>
               <a:ext uri="{28A0092B-C50C-407E-A947-70E740481C1C}">
-                <a14:useLocalDpi xmlns:a14="http://schemas.microsoft.com/office/drawing/2010/main" val="0"/>
+                <a14:useLocalDpi xmlns="" xmlns:a14="http://schemas.microsoft.com/office/drawing/2010/main" val="0"/>
               </a:ext>
             </a:extLst>
           </a:blip>
@@ -11021,7 +11021,7 @@
     </p:spTree>
     <p:extLst>
       <p:ext uri="{BB962C8B-B14F-4D97-AF65-F5344CB8AC3E}">
-        <p14:creationId xmlns:p14="http://schemas.microsoft.com/office/powerpoint/2010/main" val="3216378839"/>
+        <p14:creationId xmlns="" xmlns:p14="http://schemas.microsoft.com/office/powerpoint/2010/main" val="3216378839"/>
       </p:ext>
     </p:extLst>
   </p:cSld>
@@ -11099,7 +11099,7 @@
           <a:blip r:embed="rId2" cstate="print">
             <a:extLst>
               <a:ext uri="{28A0092B-C50C-407E-A947-70E740481C1C}">
-                <a14:useLocalDpi xmlns:a14="http://schemas.microsoft.com/office/drawing/2010/main" val="0"/>
+                <a14:useLocalDpi xmlns="" xmlns:a14="http://schemas.microsoft.com/office/drawing/2010/main" val="0"/>
               </a:ext>
             </a:extLst>
           </a:blip>
@@ -11208,7 +11208,7 @@
     </p:spTree>
     <p:extLst>
       <p:ext uri="{BB962C8B-B14F-4D97-AF65-F5344CB8AC3E}">
-        <p14:creationId xmlns:p14="http://schemas.microsoft.com/office/powerpoint/2010/main" val="2527117896"/>
+        <p14:creationId xmlns="" xmlns:p14="http://schemas.microsoft.com/office/powerpoint/2010/main" val="2527117896"/>
       </p:ext>
     </p:extLst>
   </p:cSld>
@@ -11922,7 +11922,7 @@
     </p:spTree>
     <p:extLst>
       <p:ext uri="{BB962C8B-B14F-4D97-AF65-F5344CB8AC3E}">
-        <p14:creationId xmlns:p14="http://schemas.microsoft.com/office/powerpoint/2010/main" val="1994743043"/>
+        <p14:creationId xmlns="" xmlns:p14="http://schemas.microsoft.com/office/powerpoint/2010/main" val="1994743043"/>
       </p:ext>
     </p:extLst>
   </p:cSld>
@@ -12099,11 +12099,7 @@
           <a:p>
             <a:r>
               <a:rPr lang="en-US" b="1" dirty="0" smtClean="0"/>
-              <a:t>No runtime infinite </a:t>
-            </a:r>
-            <a:r>
-              <a:rPr lang="en-US" b="1" dirty="0" smtClean="0"/>
-              <a:t>loop</a:t>
+              <a:t>No runtime infinite loop</a:t>
             </a:r>
             <a:endParaRPr lang="en-US" dirty="0" smtClean="0"/>
           </a:p>
@@ -12112,7 +12108,7 @@
     </p:spTree>
     <p:extLst>
       <p:ext uri="{BB962C8B-B14F-4D97-AF65-F5344CB8AC3E}">
-        <p14:creationId xmlns:p14="http://schemas.microsoft.com/office/powerpoint/2010/main" val="3098398089"/>
+        <p14:creationId xmlns="" xmlns:p14="http://schemas.microsoft.com/office/powerpoint/2010/main" val="3098398089"/>
       </p:ext>
     </p:extLst>
   </p:cSld>
@@ -12392,7 +12388,7 @@
     </p:spTree>
     <p:extLst>
       <p:ext uri="{BB962C8B-B14F-4D97-AF65-F5344CB8AC3E}">
-        <p14:creationId xmlns:p14="http://schemas.microsoft.com/office/powerpoint/2010/main" val="3449390454"/>
+        <p14:creationId xmlns="" xmlns:p14="http://schemas.microsoft.com/office/powerpoint/2010/main" val="3449390454"/>
       </p:ext>
     </p:extLst>
   </p:cSld>
@@ -12487,21 +12483,12 @@
             </a:pPr>
             <a:r>
               <a:rPr lang="en-US" sz="2200" b="1" dirty="0" smtClean="0"/>
-              <a:t>XMI </a:t>
-            </a:r>
-            <a:r>
-              <a:rPr lang="en-US" sz="2200" b="1" dirty="0" smtClean="0"/>
-              <a:t>export </a:t>
+              <a:t>XMI export </a:t>
             </a:r>
             <a:r>
               <a:rPr lang="en-US" sz="2200" dirty="0" smtClean="0"/>
-              <a:t>of the model </a:t>
-            </a:r>
-            <a:r>
-              <a:rPr lang="en-US" sz="2200" dirty="0" smtClean="0"/>
-              <a:t>from code</a:t>
-            </a:r>
-            <a:endParaRPr lang="en-US" sz="2200" dirty="0" smtClean="0"/>
+              <a:t>of the model from code</a:t>
+            </a:r>
           </a:p>
           <a:p>
             <a:pPr marL="2571750" lvl="5" indent="-285750">
@@ -12572,11 +12559,7 @@
             </a:pPr>
             <a:r>
               <a:rPr lang="en-US" sz="2200" dirty="0" smtClean="0"/>
-              <a:t>Executes </a:t>
-            </a:r>
-            <a:r>
-              <a:rPr lang="en-US" sz="2200" dirty="0" smtClean="0"/>
-              <a:t>the MDL4UI maven plugin</a:t>
+              <a:t>Executes the MDL4UI maven plugin</a:t>
             </a:r>
           </a:p>
           <a:p>
@@ -12586,19 +12569,7 @@
             </a:pPr>
             <a:r>
               <a:rPr lang="en-US" sz="2200" dirty="0" smtClean="0"/>
-              <a:t>Loads previously </a:t>
-            </a:r>
-            <a:r>
-              <a:rPr lang="en-US" sz="2200" dirty="0" smtClean="0"/>
-              <a:t>compiled </a:t>
-            </a:r>
-            <a:r>
-              <a:rPr lang="en-US" sz="2200" dirty="0" smtClean="0"/>
-              <a:t>model </a:t>
-            </a:r>
-            <a:r>
-              <a:rPr lang="en-US" sz="2200" dirty="0" smtClean="0"/>
-              <a:t>in </a:t>
+              <a:t>Loads previously compiled model in </a:t>
             </a:r>
             <a:r>
               <a:rPr lang="en-US" sz="2200" b="1" dirty="0" smtClean="0"/>
@@ -12632,11 +12603,7 @@
             </a:pPr>
             <a:r>
               <a:rPr lang="en-US" sz="2200" dirty="0" smtClean="0"/>
-              <a:t>Compiles </a:t>
-            </a:r>
-            <a:r>
-              <a:rPr lang="en-US" sz="2200" dirty="0" smtClean="0"/>
-              <a:t>the generated code</a:t>
+              <a:t>Compiles the generated code</a:t>
             </a:r>
           </a:p>
         </p:txBody>
@@ -13111,7 +13078,7 @@
     </p:spTree>
     <p:extLst>
       <p:ext uri="{BB962C8B-B14F-4D97-AF65-F5344CB8AC3E}">
-        <p14:creationId xmlns:p14="http://schemas.microsoft.com/office/powerpoint/2010/main" val="4006469721"/>
+        <p14:creationId xmlns="" xmlns:p14="http://schemas.microsoft.com/office/powerpoint/2010/main" val="4006469721"/>
       </p:ext>
     </p:extLst>
   </p:cSld>
@@ -13224,11 +13191,7 @@
             </a:r>
             <a:r>
               <a:rPr lang="en-US" sz="2000" dirty="0" smtClean="0"/>
-              <a:t>(ElementID </a:t>
-            </a:r>
-            <a:r>
-              <a:rPr lang="en-US" sz="2000" dirty="0" smtClean="0"/>
-              <a:t>parentId) {</a:t>
+              <a:t>(ElementID parentId) {</a:t>
             </a:r>
           </a:p>
           <a:p>
@@ -13348,15 +13311,7 @@
             </a:pPr>
             <a:r>
               <a:rPr lang="en-US" sz="2000" dirty="0" smtClean="0"/>
-              <a:t>                </a:t>
-            </a:r>
-            <a:r>
-              <a:rPr lang="en-US" sz="2000" dirty="0" smtClean="0"/>
-              <a:t>lookOver(childId</a:t>
-            </a:r>
-            <a:r>
-              <a:rPr lang="en-US" sz="2000" dirty="0" smtClean="0"/>
-              <a:t>);</a:t>
+              <a:t>                lookOver(childId);</a:t>
             </a:r>
           </a:p>
           <a:p>
@@ -13431,7 +13386,7 @@
     </p:spTree>
     <p:extLst>
       <p:ext uri="{BB962C8B-B14F-4D97-AF65-F5344CB8AC3E}">
-        <p14:creationId xmlns:p14="http://schemas.microsoft.com/office/powerpoint/2010/main" val="1678422724"/>
+        <p14:creationId xmlns="" xmlns:p14="http://schemas.microsoft.com/office/powerpoint/2010/main" val="1678422724"/>
       </p:ext>
     </p:extLst>
   </p:cSld>
@@ -14044,7 +13999,7 @@
     </p:spTree>
     <p:extLst>
       <p:ext uri="{BB962C8B-B14F-4D97-AF65-F5344CB8AC3E}">
-        <p14:creationId xmlns:p14="http://schemas.microsoft.com/office/powerpoint/2010/main" val="2792941284"/>
+        <p14:creationId xmlns="" xmlns:p14="http://schemas.microsoft.com/office/powerpoint/2010/main" val="2792941284"/>
       </p:ext>
     </p:extLst>
   </p:cSld>
@@ -14195,7 +14150,7 @@
     </p:spTree>
     <p:extLst>
       <p:ext uri="{BB962C8B-B14F-4D97-AF65-F5344CB8AC3E}">
-        <p14:creationId xmlns:p14="http://schemas.microsoft.com/office/powerpoint/2010/main" val="2960012499"/>
+        <p14:creationId xmlns="" xmlns:p14="http://schemas.microsoft.com/office/powerpoint/2010/main" val="2960012499"/>
       </p:ext>
     </p:extLst>
   </p:cSld>
@@ -14248,11 +14203,7 @@
           <a:p>
             <a:r>
               <a:rPr lang="en-US" dirty="0" smtClean="0"/>
-              <a:t>Goal </a:t>
-            </a:r>
-            <a:r>
-              <a:rPr lang="en-US" dirty="0" smtClean="0"/>
-              <a:t>and inspiration</a:t>
+              <a:t>Goal and inspiration</a:t>
             </a:r>
             <a:endParaRPr lang="en-US" dirty="0"/>
           </a:p>
@@ -14302,21 +14253,8 @@
             </a:r>
             <a:r>
               <a:rPr lang="en-US" sz="2000" dirty="0" smtClean="0"/>
-              <a:t> in tiny </a:t>
-            </a:r>
-            <a:r>
-              <a:rPr lang="en-US" sz="2000" dirty="0" smtClean="0"/>
-              <a:t>pieces </a:t>
-            </a:r>
-            <a:r>
-              <a:rPr lang="en-US" sz="2000" dirty="0" smtClean="0"/>
-              <a:t>of code is the </a:t>
-            </a:r>
-            <a:r>
-              <a:rPr lang="en-US" sz="2000" dirty="0" smtClean="0"/>
-              <a:t>key for :</a:t>
-            </a:r>
-            <a:endParaRPr lang="en-US" sz="2000" dirty="0" smtClean="0"/>
+              <a:t> in tiny pieces of code is the key for :</a:t>
+            </a:r>
           </a:p>
           <a:p>
             <a:pPr lvl="1"/>
@@ -14363,13 +14301,8 @@
             <a:pPr lvl="1"/>
             <a:r>
               <a:rPr lang="en-US" sz="2000" dirty="0" smtClean="0"/>
-              <a:t>Injection, CDI, Guice</a:t>
-            </a:r>
-            <a:r>
-              <a:rPr lang="en-US" sz="2000" dirty="0" smtClean="0"/>
-              <a:t>, Dagger</a:t>
-            </a:r>
-            <a:endParaRPr lang="en-US" sz="2000" dirty="0" smtClean="0"/>
+              <a:t>Injection, CDI, Guice, Dagger</a:t>
+            </a:r>
           </a:p>
           <a:p>
             <a:r>
@@ -14378,15 +14311,7 @@
             </a:r>
             <a:r>
               <a:rPr lang="en-US" sz="2000" dirty="0" smtClean="0"/>
-              <a:t> runtime using JavaScript is </a:t>
-            </a:r>
-            <a:r>
-              <a:rPr lang="en-US" sz="2000" dirty="0" smtClean="0"/>
-              <a:t>a </a:t>
-            </a:r>
-            <a:r>
-              <a:rPr lang="en-US" sz="2000" dirty="0" smtClean="0"/>
-              <a:t>heavy </a:t>
+              <a:t> runtime using JavaScript is a heavy </a:t>
             </a:r>
             <a:r>
               <a:rPr lang="en-US" sz="2000" b="1" dirty="0" smtClean="0"/>
@@ -14405,7 +14330,7 @@
     </p:spTree>
     <p:extLst>
       <p:ext uri="{BB962C8B-B14F-4D97-AF65-F5344CB8AC3E}">
-        <p14:creationId xmlns:p14="http://schemas.microsoft.com/office/powerpoint/2010/main" val="3220083538"/>
+        <p14:creationId xmlns="" xmlns:p14="http://schemas.microsoft.com/office/powerpoint/2010/main" val="3220083538"/>
       </p:ext>
     </p:extLst>
   </p:cSld>
@@ -14650,7 +14575,7 @@
     </p:spTree>
     <p:extLst>
       <p:ext uri="{BB962C8B-B14F-4D97-AF65-F5344CB8AC3E}">
-        <p14:creationId xmlns:p14="http://schemas.microsoft.com/office/powerpoint/2010/main" val="2834344091"/>
+        <p14:creationId xmlns="" xmlns:p14="http://schemas.microsoft.com/office/powerpoint/2010/main" val="2834344091"/>
       </p:ext>
     </p:extLst>
   </p:cSld>
@@ -15080,7 +15005,6 @@
               <a:rPr lang="en-US" dirty="0" smtClean="0"/>
               <a:t>FieldEditor</a:t>
             </a:r>
-            <a:endParaRPr lang="en-US" dirty="0" smtClean="0"/>
           </a:p>
           <a:p>
             <a:pPr lvl="1"/>
@@ -15094,13 +15018,8 @@
             </a:r>
             <a:r>
               <a:rPr lang="en-US" dirty="0" smtClean="0"/>
-              <a:t>during form </a:t>
-            </a:r>
-            <a:r>
-              <a:rPr lang="en-US" dirty="0" smtClean="0"/>
-              <a:t>completion</a:t>
-            </a:r>
-            <a:endParaRPr lang="en-US" dirty="0" smtClean="0"/>
+              <a:t>during form completion</a:t>
+            </a:r>
           </a:p>
           <a:p>
             <a:pPr lvl="1"/>
@@ -15134,7 +15053,6 @@
               <a:rPr lang="en-US" dirty="0" smtClean="0"/>
               <a:t>Labeling</a:t>
             </a:r>
-            <a:endParaRPr lang="en-US" dirty="0" smtClean="0"/>
           </a:p>
           <a:p>
             <a:pPr lvl="1"/>
@@ -15173,7 +15091,7 @@
     </p:spTree>
     <p:extLst>
       <p:ext uri="{BB962C8B-B14F-4D97-AF65-F5344CB8AC3E}">
-        <p14:creationId xmlns:p14="http://schemas.microsoft.com/office/powerpoint/2010/main" val="856396653"/>
+        <p14:creationId xmlns="" xmlns:p14="http://schemas.microsoft.com/office/powerpoint/2010/main" val="856396653"/>
       </p:ext>
     </p:extLst>
   </p:cSld>
@@ -15444,7 +15362,7 @@
     </p:spTree>
     <p:extLst>
       <p:ext uri="{BB962C8B-B14F-4D97-AF65-F5344CB8AC3E}">
-        <p14:creationId xmlns:p14="http://schemas.microsoft.com/office/powerpoint/2010/main" val="3443329555"/>
+        <p14:creationId xmlns="" xmlns:p14="http://schemas.microsoft.com/office/powerpoint/2010/main" val="3443329555"/>
       </p:ext>
     </p:extLst>
   </p:cSld>
@@ -15494,8 +15412,12 @@
           <a:lstStyle/>
           <a:p>
             <a:r>
+              <a:rPr lang="en-US" dirty="0"/>
+              <a:t>FieldEditor </a:t>
+            </a:r>
+            <a:r>
               <a:rPr lang="en-US" dirty="0" smtClean="0"/>
-              <a:t>FieldBehaviour API</a:t>
+              <a:t>API</a:t>
             </a:r>
             <a:endParaRPr lang="en-US" dirty="0"/>
           </a:p>
@@ -15513,13 +15435,13 @@
         </p:nvSpPr>
         <p:spPr>
           <a:xfrm>
-            <a:off x="457200" y="1600200"/>
-            <a:ext cx="4876800" cy="4800600"/>
+            <a:off x="228600" y="1556090"/>
+            <a:ext cx="6172200" cy="4838165"/>
           </a:xfrm>
         </p:spPr>
         <p:txBody>
           <a:bodyPr>
-            <a:normAutofit/>
+            <a:noAutofit/>
           </a:bodyPr>
           <a:lstStyle/>
           <a:p>
@@ -15527,21 +15449,21 @@
               <a:buNone/>
             </a:pPr>
             <a:r>
-              <a:rPr lang="en-US" sz="2000" b="1" dirty="0"/>
+              <a:rPr lang="en-US" sz="1800" b="1" dirty="0"/>
               <a:t>public interface </a:t>
             </a:r>
             <a:r>
-              <a:rPr lang="en-US" sz="2000" b="1" dirty="0">
+              <a:rPr lang="en-US" sz="1800" b="1" dirty="0">
                 <a:solidFill>
                   <a:schemeClr val="accent1">
                     <a:lumMod val="75000"/>
                   </a:schemeClr>
                 </a:solidFill>
               </a:rPr>
-              <a:t>FieldBehaviour </a:t>
-            </a:r>
-            <a:r>
-              <a:rPr lang="en-US" sz="2000" dirty="0"/>
+              <a:t>FieldEditor </a:t>
+            </a:r>
+            <a:r>
+              <a:rPr lang="en-US" sz="1800" dirty="0"/>
               <a:t>{</a:t>
             </a:r>
           </a:p>
@@ -15549,93 +15471,18 @@
             <a:pPr marL="0" indent="0">
               <a:buNone/>
             </a:pPr>
-            <a:endParaRPr lang="en-US" sz="2000" dirty="0"/>
+            <a:endParaRPr lang="en-US" sz="1800" dirty="0"/>
           </a:p>
           <a:p>
             <a:pPr marL="0" indent="0">
               <a:buNone/>
             </a:pPr>
             <a:r>
-              <a:rPr lang="en-US" sz="2000" dirty="0"/>
+              <a:rPr lang="en-US" sz="1800" dirty="0"/>
               <a:t>    </a:t>
             </a:r>
             <a:r>
-              <a:rPr lang="en-US" sz="2000" b="1" dirty="0">
-                <a:solidFill>
-                  <a:schemeClr val="accent1">
-                    <a:lumMod val="75000"/>
-                  </a:schemeClr>
-                </a:solidFill>
-              </a:rPr>
-              <a:t>boolean </a:t>
-            </a:r>
-            <a:r>
-              <a:rPr lang="en-US" sz="2000" b="1" dirty="0">
-                <a:solidFill>
-                  <a:srgbClr val="C00000"/>
-                </a:solidFill>
-              </a:rPr>
-              <a:t>isVisible</a:t>
-            </a:r>
-            <a:r>
-              <a:rPr lang="en-US" sz="2000" dirty="0"/>
-              <a:t>(FieldID </a:t>
-            </a:r>
-            <a:r>
-              <a:rPr lang="en-US" sz="2000" dirty="0" err="1" smtClean="0"/>
-              <a:t>fieldId</a:t>
-            </a:r>
-            <a:r>
-              <a:rPr lang="en-US" sz="2000" dirty="0" smtClean="0"/>
-              <a:t>,</a:t>
-            </a:r>
-          </a:p>
-          <a:p>
-            <a:pPr marL="0" indent="0">
-              <a:buNone/>
-            </a:pPr>
-            <a:r>
-              <a:rPr lang="en-US" sz="2000" dirty="0" smtClean="0"/>
-              <a:t>                                    WizardContext </a:t>
-            </a:r>
-            <a:r>
-              <a:rPr lang="en-US" sz="2000" dirty="0"/>
-              <a:t>context</a:t>
-            </a:r>
-            <a:r>
-              <a:rPr lang="en-US" sz="2000" dirty="0" smtClean="0"/>
-              <a:t>,</a:t>
-            </a:r>
-          </a:p>
-          <a:p>
-            <a:pPr marL="0" indent="0">
-              <a:buNone/>
-            </a:pPr>
-            <a:r>
-              <a:rPr lang="en-US" sz="2000" dirty="0" smtClean="0"/>
-              <a:t>                                    FieldEvent </a:t>
-            </a:r>
-            <a:r>
-              <a:rPr lang="en-US" sz="2000" dirty="0"/>
-              <a:t>fieldEvent);</a:t>
-            </a:r>
-          </a:p>
-          <a:p>
-            <a:pPr marL="0" indent="0">
-              <a:buNone/>
-            </a:pPr>
-            <a:endParaRPr lang="en-US" sz="2000" dirty="0"/>
-          </a:p>
-          <a:p>
-            <a:pPr marL="0" indent="0">
-              <a:buNone/>
-            </a:pPr>
-            <a:r>
-              <a:rPr lang="en-US" sz="2000" dirty="0"/>
-              <a:t>    </a:t>
-            </a:r>
-            <a:r>
-              <a:rPr lang="en-US" sz="2000" b="1" dirty="0">
+              <a:rPr lang="en-US" sz="1800" b="1" dirty="0">
                 <a:solidFill>
                   <a:schemeClr val="accent1">
                     <a:lumMod val="75000"/>
@@ -15645,24 +15492,28 @@
               <a:t>void</a:t>
             </a:r>
             <a:r>
-              <a:rPr lang="en-US" sz="2000" b="1" dirty="0"/>
+              <a:rPr lang="en-US" sz="1800" dirty="0"/>
               <a:t> </a:t>
             </a:r>
             <a:r>
-              <a:rPr lang="en-US" sz="2000" b="1" dirty="0">
+              <a:rPr lang="en-US" sz="1800" b="1" dirty="0" err="1">
                 <a:solidFill>
                   <a:srgbClr val="C00000"/>
                 </a:solidFill>
               </a:rPr>
-              <a:t>updateValue</a:t>
-            </a:r>
-            <a:r>
-              <a:rPr lang="en-US" sz="2000" dirty="0"/>
-              <a:t>(Field </a:t>
-            </a:r>
-            <a:r>
-              <a:rPr lang="en-US" sz="2000" dirty="0" smtClean="0"/>
-              <a:t>field,                 </a:t>
+              <a:t>updateFromContext</a:t>
+            </a:r>
+            <a:r>
+              <a:rPr lang="en-US" sz="1800" dirty="0"/>
+              <a:t>(Field field</a:t>
+            </a:r>
+            <a:r>
+              <a:rPr lang="en-US" sz="1800" dirty="0" smtClean="0"/>
+              <a:t>,  </a:t>
+            </a:r>
+            <a:r>
+              <a:rPr lang="en-US" sz="1800" dirty="0"/>
+              <a:t>WizardContext context,</a:t>
             </a:r>
           </a:p>
           <a:p>
@@ -15670,67 +15521,244 @@
               <a:buNone/>
             </a:pPr>
             <a:r>
-              <a:rPr lang="en-US" sz="2000" dirty="0"/>
-              <a:t> </a:t>
-            </a:r>
-            <a:r>
-              <a:rPr lang="en-US" sz="2000" dirty="0" smtClean="0"/>
-              <a:t>                                   WizardContext context,</a:t>
+              <a:rPr lang="en-US" sz="1800" dirty="0"/>
+              <a:t>                                                   FieldEvent fieldEvent);</a:t>
             </a:r>
           </a:p>
           <a:p>
             <a:pPr marL="0" indent="0">
               <a:buNone/>
             </a:pPr>
-            <a:r>
-              <a:rPr lang="en-US" sz="2000" dirty="0" smtClean="0"/>
-              <a:t>                                    FieldEvent </a:t>
-            </a:r>
-            <a:r>
-              <a:rPr lang="en-US" sz="2000" dirty="0"/>
-              <a:t>event);</a:t>
-            </a:r>
+            <a:endParaRPr lang="en-US" sz="1800" dirty="0"/>
           </a:p>
           <a:p>
             <a:pPr marL="0" indent="0">
               <a:buNone/>
             </a:pPr>
             <a:r>
-              <a:rPr lang="en-US" sz="2000" dirty="0"/>
+              <a:rPr lang="en-US" sz="1800" dirty="0"/>
+              <a:t>    </a:t>
+            </a:r>
+            <a:r>
+              <a:rPr lang="en-US" sz="1800" b="1" dirty="0">
+                <a:solidFill>
+                  <a:schemeClr val="accent1">
+                    <a:lumMod val="75000"/>
+                  </a:schemeClr>
+                </a:solidFill>
+              </a:rPr>
+              <a:t>void</a:t>
+            </a:r>
+            <a:r>
+              <a:rPr lang="en-US" sz="1800" dirty="0"/>
+              <a:t> </a:t>
+            </a:r>
+            <a:r>
+              <a:rPr lang="en-US" sz="1800" b="1" dirty="0" err="1">
+                <a:solidFill>
+                  <a:srgbClr val="C00000"/>
+                </a:solidFill>
+              </a:rPr>
+              <a:t>updateContext</a:t>
+            </a:r>
+            <a:r>
+              <a:rPr lang="en-US" sz="1800" dirty="0"/>
+              <a:t>(Field field</a:t>
+            </a:r>
+            <a:r>
+              <a:rPr lang="en-US" sz="1800" dirty="0" smtClean="0"/>
+              <a:t>, </a:t>
+            </a:r>
+            <a:r>
+              <a:rPr lang="en-US" sz="1800" dirty="0"/>
+              <a:t>WizardContext context,</a:t>
+            </a:r>
+          </a:p>
+          <a:p>
+            <a:pPr marL="0" indent="0">
+              <a:buNone/>
+            </a:pPr>
+            <a:r>
+              <a:rPr lang="en-US" sz="1800" dirty="0"/>
+              <a:t>                                         FieldEvent fieldEvent);</a:t>
+            </a:r>
+          </a:p>
+          <a:p>
+            <a:pPr marL="0" indent="0">
+              <a:buNone/>
+            </a:pPr>
+            <a:endParaRPr lang="en-US" sz="1800" dirty="0"/>
+          </a:p>
+          <a:p>
+            <a:pPr marL="0" indent="0">
+              <a:buNone/>
+            </a:pPr>
+            <a:r>
+              <a:rPr lang="en-US" sz="1800" dirty="0"/>
+              <a:t>    </a:t>
+            </a:r>
+            <a:r>
+              <a:rPr lang="en-US" sz="1800" b="1" dirty="0">
+                <a:solidFill>
+                  <a:schemeClr val="accent1">
+                    <a:lumMod val="75000"/>
+                  </a:schemeClr>
+                </a:solidFill>
+              </a:rPr>
+              <a:t>void</a:t>
+            </a:r>
+            <a:r>
+              <a:rPr lang="en-US" sz="1800" dirty="0"/>
+              <a:t> </a:t>
+            </a:r>
+            <a:r>
+              <a:rPr lang="en-US" sz="1800" b="1" dirty="0">
+                <a:solidFill>
+                  <a:srgbClr val="C00000"/>
+                </a:solidFill>
+              </a:rPr>
+              <a:t>reset</a:t>
+            </a:r>
+            <a:r>
+              <a:rPr lang="en-US" sz="1800" dirty="0"/>
+              <a:t>(Field field</a:t>
+            </a:r>
+            <a:r>
+              <a:rPr lang="en-US" sz="1800" dirty="0" smtClean="0"/>
+              <a:t>, WizardContext </a:t>
+            </a:r>
+            <a:r>
+              <a:rPr lang="en-US" sz="1800" dirty="0"/>
+              <a:t>context,</a:t>
+            </a:r>
+          </a:p>
+          <a:p>
+            <a:pPr marL="0" indent="0">
+              <a:buNone/>
+            </a:pPr>
+            <a:r>
+              <a:rPr lang="en-US" sz="1800" dirty="0"/>
+              <a:t>                       FieldEvent fieldEvent);</a:t>
+            </a:r>
+          </a:p>
+          <a:p>
+            <a:pPr marL="0" indent="0">
+              <a:buNone/>
+            </a:pPr>
+            <a:endParaRPr lang="en-US" sz="1800" dirty="0"/>
+          </a:p>
+          <a:p>
+            <a:pPr marL="0" indent="0">
+              <a:buNone/>
+            </a:pPr>
+            <a:r>
+              <a:rPr lang="en-US" sz="1800" dirty="0"/>
+              <a:t>    FieldValidation </a:t>
+            </a:r>
+            <a:r>
+              <a:rPr lang="en-US" sz="1800" b="1" dirty="0">
+                <a:solidFill>
+                  <a:srgbClr val="C00000"/>
+                </a:solidFill>
+              </a:rPr>
+              <a:t>validate</a:t>
+            </a:r>
+            <a:r>
+              <a:rPr lang="en-US" sz="1800" dirty="0"/>
+              <a:t>(Field field</a:t>
+            </a:r>
+            <a:r>
+              <a:rPr lang="en-US" sz="1800" dirty="0" smtClean="0"/>
+              <a:t>, WizardContext </a:t>
+            </a:r>
+            <a:r>
+              <a:rPr lang="en-US" sz="1800" dirty="0"/>
+              <a:t>context,</a:t>
+            </a:r>
+          </a:p>
+          <a:p>
+            <a:pPr marL="0" indent="0">
+              <a:buNone/>
+            </a:pPr>
+            <a:r>
+              <a:rPr lang="en-US" sz="1800" dirty="0"/>
+              <a:t>                                                FieldEvent fieldEvent);</a:t>
+            </a:r>
+          </a:p>
+          <a:p>
+            <a:pPr marL="0" indent="0">
+              <a:buNone/>
+            </a:pPr>
+            <a:r>
+              <a:rPr lang="en-US" sz="1800" dirty="0" smtClean="0"/>
               <a:t>}</a:t>
             </a:r>
-          </a:p>
-        </p:txBody>
-      </p:sp>
-      <p:sp>
-        <p:nvSpPr>
-          <p:cNvPr id="4" name="Espace réservé du contenu 3"/>
-          <p:cNvSpPr>
-            <a:spLocks noGrp="1"/>
-          </p:cNvSpPr>
-          <p:nvPr>
-            <p:ph sz="half" idx="2"/>
-          </p:nvPr>
+            <a:endParaRPr lang="en-US" sz="1800" dirty="0"/>
+          </a:p>
+        </p:txBody>
+      </p:sp>
+      <p:sp>
+        <p:nvSpPr>
+          <p:cNvPr id="5" name="ZoneTexte 4"/>
+          <p:cNvSpPr txBox="1"/>
+          <p:nvPr/>
         </p:nvSpPr>
         <p:spPr>
           <a:xfrm>
-            <a:off x="5410200" y="1600200"/>
-            <a:ext cx="3276600" cy="4525963"/>
+            <a:off x="6248400" y="1295400"/>
+            <a:ext cx="2667000" cy="5109091"/>
           </a:xfrm>
+          <a:prstGeom prst="rect">
+            <a:avLst/>
+          </a:prstGeom>
+          <a:noFill/>
         </p:spPr>
         <p:txBody>
-          <a:bodyPr>
-            <a:normAutofit/>
+          <a:bodyPr wrap="square" rtlCol="0">
+            <a:spAutoFit/>
           </a:bodyPr>
           <a:lstStyle/>
           <a:p>
+            <a:pPr marL="285750" indent="-285750">
+              <a:buFont typeface="Arial" pitchFamily="34" charset="0"/>
+              <a:buChar char="•"/>
+            </a:pPr>
+            <a:r>
+              <a:rPr lang="en-US" sz="2000" dirty="0" smtClean="0"/>
+              <a:t>WizardContext is the </a:t>
+            </a:r>
+            <a:r>
+              <a:rPr lang="en-US" sz="2000" b="1" dirty="0" smtClean="0"/>
+              <a:t>entry point </a:t>
+            </a:r>
+            <a:r>
+              <a:rPr lang="en-US" sz="2000" dirty="0" smtClean="0"/>
+              <a:t>of the domain model for the MVC pattern</a:t>
+            </a:r>
+          </a:p>
+          <a:p>
+            <a:pPr marL="285750" indent="-285750">
+              <a:buFont typeface="Arial" pitchFamily="34" charset="0"/>
+              <a:buChar char="•"/>
+            </a:pPr>
+            <a:endParaRPr lang="en-US" sz="2000" b="1" dirty="0">
+              <a:solidFill>
+                <a:srgbClr val="C00000"/>
+              </a:solidFill>
+            </a:endParaRPr>
+          </a:p>
+          <a:p>
+            <a:pPr marL="285750" indent="-285750">
+              <a:buFont typeface="Arial" pitchFamily="34" charset="0"/>
+              <a:buChar char="•"/>
+            </a:pPr>
             <a:r>
               <a:rPr lang="en-US" sz="2000" b="1" dirty="0" smtClean="0">
                 <a:solidFill>
                   <a:srgbClr val="C00000"/>
                 </a:solidFill>
               </a:rPr>
-              <a:t>isVisible</a:t>
+              <a:t>updateFromContext</a:t>
             </a:r>
             <a:r>
               <a:rPr lang="en-US" sz="2000" dirty="0" smtClean="0">
@@ -15741,34 +15769,16 @@
               <a:t> </a:t>
             </a:r>
             <a:r>
-              <a:rPr lang="en-US" sz="2000" dirty="0" smtClean="0"/>
-              <a:t>returns </a:t>
-            </a:r>
-            <a:r>
-              <a:rPr lang="en-US" sz="2000" dirty="0" smtClean="0"/>
-              <a:t>the visibility </a:t>
-            </a:r>
-            <a:r>
-              <a:rPr lang="en-US" sz="2000" b="1" dirty="0" smtClean="0"/>
-              <a:t>following</a:t>
-            </a:r>
-            <a:r>
-              <a:rPr lang="en-US" sz="2000" dirty="0" smtClean="0"/>
-              <a:t> the value of the domain </a:t>
-            </a:r>
-            <a:r>
-              <a:rPr lang="en-US" sz="2000" b="1" dirty="0" smtClean="0"/>
-              <a:t>model</a:t>
-            </a:r>
-          </a:p>
-          <a:p>
+              <a:rPr lang="en-US" sz="2000" dirty="0"/>
+              <a:t>and </a:t>
+            </a:r>
             <a:r>
               <a:rPr lang="en-US" sz="2000" b="1" dirty="0" smtClean="0">
                 <a:solidFill>
                   <a:srgbClr val="C00000"/>
                 </a:solidFill>
               </a:rPr>
-              <a:t>updateValue</a:t>
+              <a:t>updateContext</a:t>
             </a:r>
             <a:r>
               <a:rPr lang="en-US" sz="2000" dirty="0" smtClean="0">
@@ -15779,33 +15789,92 @@
               <a:t> </a:t>
             </a:r>
             <a:r>
+              <a:rPr lang="en-US" sz="2000" b="1" dirty="0"/>
+              <a:t>read and update </a:t>
+            </a:r>
+            <a:r>
+              <a:rPr lang="en-US" sz="2000" dirty="0"/>
+              <a:t>the domain model of the MVC </a:t>
+            </a:r>
+            <a:r>
+              <a:rPr lang="en-US" sz="2400" dirty="0" smtClean="0"/>
+              <a:t>pattern</a:t>
+            </a:r>
+          </a:p>
+          <a:p>
+            <a:pPr marL="285750" indent="-285750">
+              <a:buFont typeface="Arial" pitchFamily="34" charset="0"/>
+              <a:buChar char="•"/>
+            </a:pPr>
+            <a:endParaRPr lang="en-US" sz="2400" dirty="0"/>
+          </a:p>
+          <a:p>
+            <a:pPr marL="285750" indent="-285750">
+              <a:buFont typeface="Arial" pitchFamily="34" charset="0"/>
+              <a:buChar char="•"/>
+            </a:pPr>
+            <a:r>
+              <a:rPr lang="en-US" sz="2000" b="1" dirty="0">
+                <a:solidFill>
+                  <a:srgbClr val="C00000"/>
+                </a:solidFill>
+              </a:rPr>
+              <a:t>reset</a:t>
+            </a:r>
+            <a:r>
+              <a:rPr lang="en-US" sz="2000" dirty="0"/>
+              <a:t> is </a:t>
+            </a:r>
+            <a:r>
               <a:rPr lang="en-US" sz="2000" dirty="0" smtClean="0"/>
-              <a:t>is </a:t>
-            </a:r>
-            <a:r>
-              <a:rPr lang="en-US" sz="2000" b="1" dirty="0" smtClean="0"/>
-              <a:t>triggered</a:t>
-            </a:r>
-            <a:r>
-              <a:rPr lang="en-US" sz="2000" dirty="0" smtClean="0"/>
-              <a:t> </a:t>
-            </a:r>
-            <a:r>
-              <a:rPr lang="en-US" sz="2000" dirty="0" smtClean="0"/>
-              <a:t>by the </a:t>
-            </a:r>
-            <a:r>
-              <a:rPr lang="en-US" sz="2000" b="1" dirty="0" smtClean="0"/>
-              <a:t>dependency management</a:t>
-            </a:r>
-            <a:endParaRPr lang="en-US" sz="2000" b="1" dirty="0"/>
+              <a:t>called </a:t>
+            </a:r>
+            <a:r>
+              <a:rPr lang="en-US" sz="2000" dirty="0"/>
+              <a:t>after a </a:t>
+            </a:r>
+            <a:r>
+              <a:rPr lang="en-US" sz="2000" b="1" dirty="0"/>
+              <a:t>field</a:t>
+            </a:r>
+            <a:r>
+              <a:rPr lang="en-US" sz="2000" dirty="0"/>
+              <a:t> is </a:t>
+            </a:r>
+            <a:r>
+              <a:rPr lang="en-US" sz="2000" b="1" dirty="0"/>
+              <a:t>hidden</a:t>
+            </a:r>
+            <a:r>
+              <a:rPr lang="en-US" sz="2000" dirty="0"/>
+              <a:t> or a </a:t>
+            </a:r>
+            <a:r>
+              <a:rPr lang="en-US" sz="2000" b="1" dirty="0"/>
+              <a:t>value change </a:t>
+            </a:r>
+            <a:r>
+              <a:rPr lang="en-US" sz="2000" dirty="0"/>
+              <a:t>from a </a:t>
+            </a:r>
+            <a:r>
+              <a:rPr lang="en-US" sz="2000" b="1" dirty="0"/>
+              <a:t>dependency</a:t>
+            </a:r>
+          </a:p>
+          <a:p>
+            <a:pPr marL="285750" indent="-285750">
+              <a:buFont typeface="Arial" pitchFamily="34" charset="0"/>
+              <a:buChar char="•"/>
+            </a:pPr>
+            <a:endParaRPr lang="en-US" dirty="0"/>
           </a:p>
         </p:txBody>
       </p:sp>
     </p:spTree>
     <p:extLst>
       <p:ext uri="{BB962C8B-B14F-4D97-AF65-F5344CB8AC3E}">
-        <p14:creationId xmlns:p14="http://schemas.microsoft.com/office/powerpoint/2010/main" val="2948210574"/>
+        <p14:creationId xmlns="" xmlns:p14="http://schemas.microsoft.com/office/powerpoint/2010/main" val="1556099287"/>
       </p:ext>
     </p:extLst>
   </p:cSld>
@@ -15855,12 +15924,8 @@
           <a:lstStyle/>
           <a:p>
             <a:r>
-              <a:rPr lang="en-US" dirty="0"/>
-              <a:t>FieldEditor </a:t>
-            </a:r>
-            <a:r>
               <a:rPr lang="en-US" dirty="0" smtClean="0"/>
-              <a:t>API</a:t>
+              <a:t>FieldBehaviour API</a:t>
             </a:r>
             <a:endParaRPr lang="en-US" dirty="0"/>
           </a:p>
@@ -15878,13 +15943,13 @@
         </p:nvSpPr>
         <p:spPr>
           <a:xfrm>
-            <a:off x="228600" y="1556090"/>
-            <a:ext cx="6172200" cy="4838165"/>
+            <a:off x="457200" y="1600200"/>
+            <a:ext cx="4876800" cy="4800600"/>
           </a:xfrm>
         </p:spPr>
         <p:txBody>
           <a:bodyPr>
-            <a:noAutofit/>
+            <a:normAutofit/>
           </a:bodyPr>
           <a:lstStyle/>
           <a:p>
@@ -15892,21 +15957,21 @@
               <a:buNone/>
             </a:pPr>
             <a:r>
-              <a:rPr lang="en-US" sz="1800" b="1" dirty="0"/>
+              <a:rPr lang="en-US" sz="2000" b="1" dirty="0"/>
               <a:t>public interface </a:t>
             </a:r>
             <a:r>
-              <a:rPr lang="en-US" sz="1800" b="1" dirty="0">
+              <a:rPr lang="en-US" sz="2000" b="1" dirty="0">
                 <a:solidFill>
                   <a:schemeClr val="accent1">
                     <a:lumMod val="75000"/>
                   </a:schemeClr>
                 </a:solidFill>
               </a:rPr>
-              <a:t>FieldEditor </a:t>
-            </a:r>
-            <a:r>
-              <a:rPr lang="en-US" sz="1800" dirty="0"/>
+              <a:t>FieldBehaviour </a:t>
+            </a:r>
+            <a:r>
+              <a:rPr lang="en-US" sz="2000" dirty="0"/>
               <a:t>{</a:t>
             </a:r>
           </a:p>
@@ -15914,18 +15979,93 @@
             <a:pPr marL="0" indent="0">
               <a:buNone/>
             </a:pPr>
-            <a:endParaRPr lang="en-US" sz="1800" dirty="0"/>
+            <a:endParaRPr lang="en-US" sz="2000" dirty="0"/>
           </a:p>
           <a:p>
             <a:pPr marL="0" indent="0">
               <a:buNone/>
             </a:pPr>
             <a:r>
-              <a:rPr lang="en-US" sz="1800" dirty="0"/>
+              <a:rPr lang="en-US" sz="2000" dirty="0"/>
               <a:t>    </a:t>
             </a:r>
             <a:r>
-              <a:rPr lang="en-US" sz="1800" b="1" dirty="0">
+              <a:rPr lang="en-US" sz="2000" b="1" dirty="0">
+                <a:solidFill>
+                  <a:schemeClr val="accent1">
+                    <a:lumMod val="75000"/>
+                  </a:schemeClr>
+                </a:solidFill>
+              </a:rPr>
+              <a:t>boolean </a:t>
+            </a:r>
+            <a:r>
+              <a:rPr lang="en-US" sz="2000" b="1" dirty="0">
+                <a:solidFill>
+                  <a:srgbClr val="C00000"/>
+                </a:solidFill>
+              </a:rPr>
+              <a:t>isVisible</a:t>
+            </a:r>
+            <a:r>
+              <a:rPr lang="en-US" sz="2000" dirty="0"/>
+              <a:t>(FieldID </a:t>
+            </a:r>
+            <a:r>
+              <a:rPr lang="en-US" sz="2000" dirty="0" err="1" smtClean="0"/>
+              <a:t>fieldId</a:t>
+            </a:r>
+            <a:r>
+              <a:rPr lang="en-US" sz="2000" dirty="0" smtClean="0"/>
+              <a:t>,</a:t>
+            </a:r>
+          </a:p>
+          <a:p>
+            <a:pPr marL="0" indent="0">
+              <a:buNone/>
+            </a:pPr>
+            <a:r>
+              <a:rPr lang="en-US" sz="2000" dirty="0" smtClean="0"/>
+              <a:t>                                    WizardContext </a:t>
+            </a:r>
+            <a:r>
+              <a:rPr lang="en-US" sz="2000" dirty="0"/>
+              <a:t>context</a:t>
+            </a:r>
+            <a:r>
+              <a:rPr lang="en-US" sz="2000" dirty="0" smtClean="0"/>
+              <a:t>,</a:t>
+            </a:r>
+          </a:p>
+          <a:p>
+            <a:pPr marL="0" indent="0">
+              <a:buNone/>
+            </a:pPr>
+            <a:r>
+              <a:rPr lang="en-US" sz="2000" dirty="0" smtClean="0"/>
+              <a:t>                                    FieldEvent </a:t>
+            </a:r>
+            <a:r>
+              <a:rPr lang="en-US" sz="2000" dirty="0"/>
+              <a:t>fieldEvent);</a:t>
+            </a:r>
+          </a:p>
+          <a:p>
+            <a:pPr marL="0" indent="0">
+              <a:buNone/>
+            </a:pPr>
+            <a:endParaRPr lang="en-US" sz="2000" dirty="0"/>
+          </a:p>
+          <a:p>
+            <a:pPr marL="0" indent="0">
+              <a:buNone/>
+            </a:pPr>
+            <a:r>
+              <a:rPr lang="en-US" sz="2000" dirty="0"/>
+              <a:t>    </a:t>
+            </a:r>
+            <a:r>
+              <a:rPr lang="en-US" sz="2000" b="1" dirty="0">
                 <a:solidFill>
                   <a:schemeClr val="accent1">
                     <a:lumMod val="75000"/>
@@ -15935,28 +16075,24 @@
               <a:t>void</a:t>
             </a:r>
             <a:r>
-              <a:rPr lang="en-US" sz="1800" dirty="0"/>
+              <a:rPr lang="en-US" sz="2000" b="1" dirty="0"/>
               <a:t> </a:t>
             </a:r>
             <a:r>
-              <a:rPr lang="en-US" sz="1800" b="1" dirty="0" err="1">
+              <a:rPr lang="en-US" sz="2000" b="1" dirty="0">
                 <a:solidFill>
                   <a:srgbClr val="C00000"/>
                 </a:solidFill>
               </a:rPr>
-              <a:t>updateFromContext</a:t>
-            </a:r>
-            <a:r>
-              <a:rPr lang="en-US" sz="1800" dirty="0"/>
-              <a:t>(Field field</a:t>
-            </a:r>
-            <a:r>
-              <a:rPr lang="en-US" sz="1800" dirty="0" smtClean="0"/>
-              <a:t>,  </a:t>
-            </a:r>
-            <a:r>
-              <a:rPr lang="en-US" sz="1800" dirty="0"/>
-              <a:t>WizardContext context,</a:t>
+              <a:t>updateValue</a:t>
+            </a:r>
+            <a:r>
+              <a:rPr lang="en-US" sz="2000" dirty="0"/>
+              <a:t>(Field </a:t>
+            </a:r>
+            <a:r>
+              <a:rPr lang="en-US" sz="2000" dirty="0" smtClean="0"/>
+              <a:t>field,                 </a:t>
             </a:r>
           </a:p>
           <a:p>
@@ -15964,244 +16100,67 @@
               <a:buNone/>
             </a:pPr>
             <a:r>
-              <a:rPr lang="en-US" sz="1800" dirty="0"/>
-              <a:t>                                                   FieldEvent fieldEvent);</a:t>
+              <a:rPr lang="en-US" sz="2000" dirty="0"/>
+              <a:t> </a:t>
+            </a:r>
+            <a:r>
+              <a:rPr lang="en-US" sz="2000" dirty="0" smtClean="0"/>
+              <a:t>                                   WizardContext context,</a:t>
             </a:r>
           </a:p>
           <a:p>
             <a:pPr marL="0" indent="0">
               <a:buNone/>
             </a:pPr>
-            <a:endParaRPr lang="en-US" sz="1800" dirty="0"/>
+            <a:r>
+              <a:rPr lang="en-US" sz="2000" dirty="0" smtClean="0"/>
+              <a:t>                                    FieldEvent </a:t>
+            </a:r>
+            <a:r>
+              <a:rPr lang="en-US" sz="2000" dirty="0"/>
+              <a:t>event);</a:t>
+            </a:r>
           </a:p>
           <a:p>
             <a:pPr marL="0" indent="0">
               <a:buNone/>
             </a:pPr>
             <a:r>
-              <a:rPr lang="en-US" sz="1800" dirty="0"/>
-              <a:t>    </a:t>
-            </a:r>
-            <a:r>
-              <a:rPr lang="en-US" sz="1800" b="1" dirty="0">
-                <a:solidFill>
-                  <a:schemeClr val="accent1">
-                    <a:lumMod val="75000"/>
-                  </a:schemeClr>
-                </a:solidFill>
-              </a:rPr>
-              <a:t>void</a:t>
-            </a:r>
-            <a:r>
-              <a:rPr lang="en-US" sz="1800" dirty="0"/>
-              <a:t> </a:t>
-            </a:r>
-            <a:r>
-              <a:rPr lang="en-US" sz="1800" b="1" dirty="0" err="1">
-                <a:solidFill>
-                  <a:srgbClr val="C00000"/>
-                </a:solidFill>
-              </a:rPr>
-              <a:t>updateContext</a:t>
-            </a:r>
-            <a:r>
-              <a:rPr lang="en-US" sz="1800" dirty="0"/>
-              <a:t>(Field field</a:t>
-            </a:r>
-            <a:r>
-              <a:rPr lang="en-US" sz="1800" dirty="0" smtClean="0"/>
-              <a:t>, </a:t>
-            </a:r>
-            <a:r>
-              <a:rPr lang="en-US" sz="1800" dirty="0"/>
-              <a:t>WizardContext context,</a:t>
-            </a:r>
-          </a:p>
-          <a:p>
-            <a:pPr marL="0" indent="0">
-              <a:buNone/>
-            </a:pPr>
-            <a:r>
-              <a:rPr lang="en-US" sz="1800" dirty="0"/>
-              <a:t>                                         FieldEvent fieldEvent);</a:t>
-            </a:r>
-          </a:p>
-          <a:p>
-            <a:pPr marL="0" indent="0">
-              <a:buNone/>
-            </a:pPr>
-            <a:endParaRPr lang="en-US" sz="1800" dirty="0"/>
-          </a:p>
-          <a:p>
-            <a:pPr marL="0" indent="0">
-              <a:buNone/>
-            </a:pPr>
-            <a:r>
-              <a:rPr lang="en-US" sz="1800" dirty="0"/>
-              <a:t>    </a:t>
-            </a:r>
-            <a:r>
-              <a:rPr lang="en-US" sz="1800" b="1" dirty="0">
-                <a:solidFill>
-                  <a:schemeClr val="accent1">
-                    <a:lumMod val="75000"/>
-                  </a:schemeClr>
-                </a:solidFill>
-              </a:rPr>
-              <a:t>void</a:t>
-            </a:r>
-            <a:r>
-              <a:rPr lang="en-US" sz="1800" dirty="0"/>
-              <a:t> </a:t>
-            </a:r>
-            <a:r>
-              <a:rPr lang="en-US" sz="1800" b="1" dirty="0">
-                <a:solidFill>
-                  <a:srgbClr val="C00000"/>
-                </a:solidFill>
-              </a:rPr>
-              <a:t>reset</a:t>
-            </a:r>
-            <a:r>
-              <a:rPr lang="en-US" sz="1800" dirty="0"/>
-              <a:t>(Field field</a:t>
-            </a:r>
-            <a:r>
-              <a:rPr lang="en-US" sz="1800" dirty="0" smtClean="0"/>
-              <a:t>, WizardContext </a:t>
-            </a:r>
-            <a:r>
-              <a:rPr lang="en-US" sz="1800" dirty="0"/>
-              <a:t>context,</a:t>
-            </a:r>
-          </a:p>
-          <a:p>
-            <a:pPr marL="0" indent="0">
-              <a:buNone/>
-            </a:pPr>
-            <a:r>
-              <a:rPr lang="en-US" sz="1800" dirty="0"/>
-              <a:t>                       FieldEvent fieldEvent);</a:t>
-            </a:r>
-          </a:p>
-          <a:p>
-            <a:pPr marL="0" indent="0">
-              <a:buNone/>
-            </a:pPr>
-            <a:endParaRPr lang="en-US" sz="1800" dirty="0"/>
-          </a:p>
-          <a:p>
-            <a:pPr marL="0" indent="0">
-              <a:buNone/>
-            </a:pPr>
-            <a:r>
-              <a:rPr lang="en-US" sz="1800" dirty="0"/>
-              <a:t>    FieldValidation </a:t>
-            </a:r>
-            <a:r>
-              <a:rPr lang="en-US" sz="1800" b="1" dirty="0">
-                <a:solidFill>
-                  <a:srgbClr val="C00000"/>
-                </a:solidFill>
-              </a:rPr>
-              <a:t>validate</a:t>
-            </a:r>
-            <a:r>
-              <a:rPr lang="en-US" sz="1800" dirty="0"/>
-              <a:t>(Field field</a:t>
-            </a:r>
-            <a:r>
-              <a:rPr lang="en-US" sz="1800" dirty="0" smtClean="0"/>
-              <a:t>, WizardContext </a:t>
-            </a:r>
-            <a:r>
-              <a:rPr lang="en-US" sz="1800" dirty="0"/>
-              <a:t>context,</a:t>
-            </a:r>
-          </a:p>
-          <a:p>
-            <a:pPr marL="0" indent="0">
-              <a:buNone/>
-            </a:pPr>
-            <a:r>
-              <a:rPr lang="en-US" sz="1800" dirty="0"/>
-              <a:t>                                                FieldEvent fieldEvent);</a:t>
-            </a:r>
-          </a:p>
-          <a:p>
-            <a:pPr marL="0" indent="0">
-              <a:buNone/>
-            </a:pPr>
-            <a:r>
-              <a:rPr lang="en-US" sz="1800" dirty="0" smtClean="0"/>
+              <a:rPr lang="en-US" sz="2000" dirty="0"/>
               <a:t>}</a:t>
             </a:r>
-            <a:endParaRPr lang="en-US" sz="1800" dirty="0"/>
-          </a:p>
-        </p:txBody>
-      </p:sp>
-      <p:sp>
-        <p:nvSpPr>
-          <p:cNvPr id="5" name="ZoneTexte 4"/>
-          <p:cNvSpPr txBox="1"/>
-          <p:nvPr/>
+          </a:p>
+        </p:txBody>
+      </p:sp>
+      <p:sp>
+        <p:nvSpPr>
+          <p:cNvPr id="4" name="Espace réservé du contenu 3"/>
+          <p:cNvSpPr>
+            <a:spLocks noGrp="1"/>
+          </p:cNvSpPr>
+          <p:nvPr>
+            <p:ph sz="half" idx="2"/>
+          </p:nvPr>
         </p:nvSpPr>
         <p:spPr>
           <a:xfrm>
-            <a:off x="6248400" y="1295400"/>
-            <a:ext cx="2667000" cy="5109091"/>
+            <a:off x="5410200" y="1600200"/>
+            <a:ext cx="3276600" cy="4525963"/>
           </a:xfrm>
-          <a:prstGeom prst="rect">
-            <a:avLst/>
-          </a:prstGeom>
-          <a:noFill/>
         </p:spPr>
         <p:txBody>
-          <a:bodyPr wrap="square" rtlCol="0">
-            <a:spAutoFit/>
+          <a:bodyPr>
+            <a:normAutofit/>
           </a:bodyPr>
           <a:lstStyle/>
           <a:p>
-            <a:pPr marL="285750" indent="-285750">
-              <a:buFont typeface="Arial" pitchFamily="34" charset="0"/>
-              <a:buChar char="•"/>
-            </a:pPr>
-            <a:r>
-              <a:rPr lang="en-US" sz="2000" dirty="0" smtClean="0"/>
-              <a:t>WizardContext is the </a:t>
-            </a:r>
-            <a:r>
-              <a:rPr lang="en-US" sz="2000" b="1" dirty="0" smtClean="0"/>
-              <a:t>entry point </a:t>
-            </a:r>
-            <a:r>
-              <a:rPr lang="en-US" sz="2000" dirty="0" smtClean="0"/>
-              <a:t>of the domain model for the MVC pattern</a:t>
-            </a:r>
-          </a:p>
-          <a:p>
-            <a:pPr marL="285750" indent="-285750">
-              <a:buFont typeface="Arial" pitchFamily="34" charset="0"/>
-              <a:buChar char="•"/>
-            </a:pPr>
-            <a:endParaRPr lang="en-US" sz="2000" b="1" dirty="0">
-              <a:solidFill>
-                <a:srgbClr val="C00000"/>
-              </a:solidFill>
-            </a:endParaRPr>
-          </a:p>
-          <a:p>
-            <a:pPr marL="285750" indent="-285750">
-              <a:buFont typeface="Arial" pitchFamily="34" charset="0"/>
-              <a:buChar char="•"/>
-            </a:pPr>
             <a:r>
               <a:rPr lang="en-US" sz="2000" b="1" dirty="0" smtClean="0">
                 <a:solidFill>
                   <a:srgbClr val="C00000"/>
                 </a:solidFill>
               </a:rPr>
-              <a:t>updateFromContext</a:t>
+              <a:t>isVisible</a:t>
             </a:r>
             <a:r>
               <a:rPr lang="en-US" sz="2000" dirty="0" smtClean="0">
@@ -16212,16 +16171,30 @@
               <a:t> </a:t>
             </a:r>
             <a:r>
-              <a:rPr lang="en-US" sz="2000" dirty="0"/>
-              <a:t>and </a:t>
-            </a:r>
+              <a:rPr lang="en-US" sz="2000" dirty="0" smtClean="0"/>
+              <a:t>returns the visibility </a:t>
+            </a:r>
+            <a:r>
+              <a:rPr lang="en-US" sz="2000" b="1" dirty="0" smtClean="0"/>
+              <a:t>following</a:t>
+            </a:r>
+            <a:r>
+              <a:rPr lang="en-US" sz="2000" dirty="0" smtClean="0"/>
+              <a:t> the value of the domain </a:t>
+            </a:r>
+            <a:r>
+              <a:rPr lang="en-US" sz="2000" b="1" dirty="0" smtClean="0"/>
+              <a:t>model</a:t>
+            </a:r>
+          </a:p>
+          <a:p>
             <a:r>
               <a:rPr lang="en-US" sz="2000" b="1" dirty="0" smtClean="0">
                 <a:solidFill>
                   <a:srgbClr val="C00000"/>
                 </a:solidFill>
               </a:rPr>
-              <a:t>updateContext</a:t>
+              <a:t>updateValue</a:t>
             </a:r>
             <a:r>
               <a:rPr lang="en-US" sz="2000" dirty="0" smtClean="0">
@@ -16232,92 +16205,29 @@
               <a:t> </a:t>
             </a:r>
             <a:r>
-              <a:rPr lang="en-US" sz="2000" b="1" dirty="0"/>
-              <a:t>read and update </a:t>
-            </a:r>
-            <a:r>
-              <a:rPr lang="en-US" sz="2000" dirty="0"/>
-              <a:t>the domain model of the MVC </a:t>
-            </a:r>
-            <a:r>
-              <a:rPr lang="en-US" sz="2400" dirty="0" smtClean="0"/>
-              <a:t>pattern</a:t>
-            </a:r>
-          </a:p>
-          <a:p>
-            <a:pPr marL="285750" indent="-285750">
-              <a:buFont typeface="Arial" pitchFamily="34" charset="0"/>
-              <a:buChar char="•"/>
-            </a:pPr>
-            <a:endParaRPr lang="en-US" sz="2400" dirty="0"/>
-          </a:p>
-          <a:p>
-            <a:pPr marL="285750" indent="-285750">
-              <a:buFont typeface="Arial" pitchFamily="34" charset="0"/>
-              <a:buChar char="•"/>
-            </a:pPr>
-            <a:r>
-              <a:rPr lang="en-US" sz="2000" b="1" dirty="0">
-                <a:solidFill>
-                  <a:srgbClr val="C00000"/>
-                </a:solidFill>
-              </a:rPr>
-              <a:t>reset</a:t>
-            </a:r>
-            <a:r>
-              <a:rPr lang="en-US" sz="2000" dirty="0"/>
-              <a:t> is </a:t>
-            </a:r>
-            <a:r>
               <a:rPr lang="en-US" sz="2000" dirty="0" smtClean="0"/>
-              <a:t>called </a:t>
-            </a:r>
-            <a:r>
-              <a:rPr lang="en-US" sz="2000" dirty="0"/>
-              <a:t>after a </a:t>
-            </a:r>
-            <a:r>
-              <a:rPr lang="en-US" sz="2000" b="1" dirty="0"/>
-              <a:t>field</a:t>
-            </a:r>
-            <a:r>
-              <a:rPr lang="en-US" sz="2000" dirty="0"/>
-              <a:t> is </a:t>
-            </a:r>
-            <a:r>
-              <a:rPr lang="en-US" sz="2000" b="1" dirty="0"/>
-              <a:t>hidden</a:t>
-            </a:r>
-            <a:r>
-              <a:rPr lang="en-US" sz="2000" dirty="0"/>
-              <a:t> or a </a:t>
-            </a:r>
-            <a:r>
-              <a:rPr lang="en-US" sz="2000" b="1" dirty="0"/>
-              <a:t>value change </a:t>
-            </a:r>
-            <a:r>
-              <a:rPr lang="en-US" sz="2000" dirty="0"/>
-              <a:t>from a </a:t>
-            </a:r>
-            <a:r>
-              <a:rPr lang="en-US" sz="2000" b="1" dirty="0"/>
-              <a:t>dependency</a:t>
-            </a:r>
-          </a:p>
-          <a:p>
-            <a:pPr marL="285750" indent="-285750">
-              <a:buFont typeface="Arial" pitchFamily="34" charset="0"/>
-              <a:buChar char="•"/>
-            </a:pPr>
-            <a:endParaRPr lang="en-US" dirty="0"/>
+              <a:t>is </a:t>
+            </a:r>
+            <a:r>
+              <a:rPr lang="en-US" sz="2000" b="1" dirty="0" smtClean="0"/>
+              <a:t>triggered</a:t>
+            </a:r>
+            <a:r>
+              <a:rPr lang="en-US" sz="2000" dirty="0" smtClean="0"/>
+              <a:t> by the </a:t>
+            </a:r>
+            <a:r>
+              <a:rPr lang="en-US" sz="2000" b="1" dirty="0" smtClean="0"/>
+              <a:t>dependency management</a:t>
+            </a:r>
+            <a:endParaRPr lang="en-US" sz="2000" b="1" dirty="0"/>
           </a:p>
         </p:txBody>
       </p:sp>
     </p:spTree>
     <p:extLst>
       <p:ext uri="{BB962C8B-B14F-4D97-AF65-F5344CB8AC3E}">
-        <p14:creationId xmlns:p14="http://schemas.microsoft.com/office/powerpoint/2010/main" val="1556099287"/>
+        <p14:creationId xmlns="" xmlns:p14="http://schemas.microsoft.com/office/powerpoint/2010/main" val="2948210574"/>
       </p:ext>
     </p:extLst>
   </p:cSld>
@@ -16385,14 +16295,14 @@
           <p:nvPr>
             <p:extLst>
               <p:ext uri="{D42A27DB-BD31-4B8C-83A1-F6EECF244321}">
-                <p14:modId xmlns:p14="http://schemas.microsoft.com/office/powerpoint/2010/main" val="2181104498"/>
+                <p14:modId xmlns="" xmlns:p14="http://schemas.microsoft.com/office/powerpoint/2010/main" val="2181104498"/>
               </p:ext>
             </p:extLst>
           </p:nvPr>
         </p:nvGraphicFramePr>
         <p:xfrm>
           <a:off x="457200" y="1828800"/>
-          <a:ext cx="8229600" cy="4397529"/>
+          <a:ext cx="8229600" cy="4824249"/>
         </p:xfrm>
         <a:graphic>
           <a:graphicData uri="http://schemas.openxmlformats.org/drawingml/2006/table">
@@ -16482,8 +16392,33 @@
                       </a:pPr>
                       <a:r>
                         <a:rPr lang="en-US" sz="1600" b="1" dirty="0" smtClean="0"/>
-                        <a:t>@InjectBehaviour</a:t>
+                        <a:t>@</a:t>
                       </a:r>
+                      <a:r>
+                        <a:rPr lang="en-US" sz="1600" b="1" dirty="0" err="1" smtClean="0"/>
+                        <a:t>InjectInit</a:t>
+                      </a:r>
+                      <a:endParaRPr lang="en-US" sz="1600" b="1" dirty="0" smtClean="0"/>
+                    </a:p>
+                    <a:p>
+                      <a:pPr marL="0" marR="0" indent="0" algn="l" defTabSz="914400" rtl="0" eaLnBrk="1" fontAlgn="auto" latinLnBrk="0" hangingPunct="1">
+                        <a:lnSpc>
+                          <a:spcPct val="100000"/>
+                        </a:lnSpc>
+                        <a:spcBef>
+                          <a:spcPts val="0"/>
+                        </a:spcBef>
+                        <a:spcAft>
+                          <a:spcPts val="0"/>
+                        </a:spcAft>
+                        <a:buClrTx/>
+                        <a:buSzTx/>
+                        <a:buFontTx/>
+                        <a:buNone/>
+                        <a:tabLst/>
+                        <a:defRPr/>
+                      </a:pPr>
+                      <a:endParaRPr lang="en-US" sz="1600" b="1" dirty="0" smtClean="0"/>
                     </a:p>
                   </a:txBody>
                   <a:tcPr/>
@@ -16495,10 +16430,32 @@
                     <a:p>
                       <a:r>
                         <a:rPr lang="en-US" sz="1600" b="1" dirty="0" smtClean="0"/>
-                        <a:t>@InjectSampleBehaviour</a:t>
+                        <a:t>@</a:t>
                       </a:r>
+                      <a:r>
+                        <a:rPr lang="en-US" sz="1600" b="1" dirty="0" err="1" smtClean="0"/>
+                        <a:t>InjectSampleInit</a:t>
+                      </a:r>
+                      <a:endParaRPr lang="en-US" sz="1600" b="1" dirty="0" smtClean="0"/>
                     </a:p>
                     <a:p>
+                      <a:pPr marL="0" marR="0" indent="0" algn="l" defTabSz="914400" rtl="0" eaLnBrk="1" fontAlgn="auto" latinLnBrk="0" hangingPunct="1">
+                        <a:lnSpc>
+                          <a:spcPct val="100000"/>
+                        </a:lnSpc>
+                        <a:spcBef>
+                          <a:spcPts val="0"/>
+                        </a:spcBef>
+                        <a:spcAft>
+                          <a:spcPts val="0"/>
+                        </a:spcAft>
+                        <a:buClrTx/>
+                        <a:buSzTx/>
+                        <a:buFontTx/>
+                        <a:buNone/>
+                        <a:tabLst/>
+                        <a:defRPr/>
+                      </a:pPr>
                       <a:r>
                         <a:rPr lang="en-US" sz="1200" dirty="0" smtClean="0"/>
                         <a:t>Reference</a:t>
@@ -16511,6 +16468,9 @@
                         <a:rPr lang="en-US" sz="1200" baseline="0" dirty="0" err="1" smtClean="0"/>
                         <a:t>EFieldSample</a:t>
                       </a:r>
+                      <a:endParaRPr lang="en-US" sz="1200" dirty="0" smtClean="0"/>
+                    </a:p>
+                    <a:p>
                       <a:endParaRPr lang="en-US" sz="1200" dirty="0"/>
                     </a:p>
                   </a:txBody>
@@ -16521,6 +16481,23 @@
                     <a:bodyPr/>
                     <a:lstStyle/>
                     <a:p>
+                      <a:pPr marL="0" marR="0" indent="0" algn="l" defTabSz="914400" rtl="0" eaLnBrk="1" fontAlgn="auto" latinLnBrk="0" hangingPunct="1">
+                        <a:lnSpc>
+                          <a:spcPct val="100000"/>
+                        </a:lnSpc>
+                        <a:spcBef>
+                          <a:spcPts val="0"/>
+                        </a:spcBef>
+                        <a:spcAft>
+                          <a:spcPts val="0"/>
+                        </a:spcAft>
+                        <a:buClrTx/>
+                        <a:buSzTx/>
+                        <a:buFontTx/>
+                        <a:buNone/>
+                        <a:tabLst/>
+                        <a:defRPr/>
+                      </a:pPr>
                       <a:r>
                         <a:rPr lang="en-US" sz="1600" dirty="0" smtClean="0"/>
                         <a:t>Any class implementing</a:t>
@@ -16530,10 +16507,10 @@
                         <a:t> </a:t>
                       </a:r>
                       <a:r>
-                        <a:rPr lang="en-US" sz="1600" b="1" baseline="0" dirty="0" smtClean="0"/>
-                        <a:t>FieldBehaviour</a:t>
+                        <a:rPr lang="en-US" sz="1600" b="1" baseline="0" dirty="0" err="1" smtClean="0"/>
+                        <a:t>FieldInitializer</a:t>
                       </a:r>
-                      <a:endParaRPr lang="en-US" sz="1600" b="1" dirty="0"/>
+                      <a:endParaRPr lang="en-US" sz="1600" b="1" dirty="0" smtClean="0"/>
                     </a:p>
                   </a:txBody>
                   <a:tcPr/>
@@ -16663,8 +16640,221 @@
                       </a:pPr>
                       <a:r>
                         <a:rPr lang="en-US" sz="1600" b="1" dirty="0" smtClean="0"/>
-                        <a:t>@InjectHelp</a:t>
+                        <a:t>@</a:t>
                       </a:r>
+                      <a:r>
+                        <a:rPr lang="en-US" sz="1600" b="1" dirty="0" err="1" smtClean="0"/>
+                        <a:t>InjectBehaviour</a:t>
+                      </a:r>
+                      <a:endParaRPr lang="en-US" sz="1600" b="1" dirty="0" smtClean="0"/>
+                    </a:p>
+                  </a:txBody>
+                  <a:tcPr/>
+                </a:tc>
+                <a:tc>
+                  <a:txBody>
+                    <a:bodyPr/>
+                    <a:lstStyle/>
+                    <a:p>
+                      <a:pPr marL="0" algn="l" defTabSz="914400" rtl="0" eaLnBrk="1" latinLnBrk="0" hangingPunct="1"/>
+                      <a:r>
+                        <a:rPr lang="en-US" sz="1600" b="1" kern="1200" dirty="0" smtClean="0">
+                          <a:solidFill>
+                            <a:schemeClr val="dk1"/>
+                          </a:solidFill>
+                          <a:latin typeface="+mn-lt"/>
+                          <a:ea typeface="+mn-ea"/>
+                          <a:cs typeface="+mn-cs"/>
+                        </a:rPr>
+                        <a:t>@</a:t>
+                      </a:r>
+                      <a:r>
+                        <a:rPr lang="en-US" sz="1600" b="1" kern="1200" dirty="0" err="1" smtClean="0">
+                          <a:solidFill>
+                            <a:schemeClr val="dk1"/>
+                          </a:solidFill>
+                          <a:latin typeface="+mn-lt"/>
+                          <a:ea typeface="+mn-ea"/>
+                          <a:cs typeface="+mn-cs"/>
+                        </a:rPr>
+                        <a:t>InjectSampleBehaviour</a:t>
+                      </a:r>
+                      <a:endParaRPr lang="en-US" sz="1600" b="1" kern="1200" dirty="0" smtClean="0">
+                        <a:solidFill>
+                          <a:schemeClr val="dk1"/>
+                        </a:solidFill>
+                        <a:latin typeface="+mn-lt"/>
+                        <a:ea typeface="+mn-ea"/>
+                        <a:cs typeface="+mn-cs"/>
+                      </a:endParaRPr>
+                    </a:p>
+                    <a:p>
+                      <a:pPr marL="0" marR="0" indent="0" algn="l" defTabSz="914400" rtl="0" eaLnBrk="1" fontAlgn="auto" latinLnBrk="0" hangingPunct="1">
+                        <a:lnSpc>
+                          <a:spcPct val="100000"/>
+                        </a:lnSpc>
+                        <a:spcBef>
+                          <a:spcPts val="0"/>
+                        </a:spcBef>
+                        <a:spcAft>
+                          <a:spcPts val="0"/>
+                        </a:spcAft>
+                        <a:buClrTx/>
+                        <a:buSzTx/>
+                        <a:buFontTx/>
+                        <a:buNone/>
+                        <a:tabLst/>
+                        <a:defRPr/>
+                      </a:pPr>
+                      <a:r>
+                        <a:rPr lang="en-US" sz="1200" kern="1200" dirty="0" smtClean="0">
+                          <a:solidFill>
+                            <a:schemeClr val="dk1"/>
+                          </a:solidFill>
+                          <a:latin typeface="+mn-lt"/>
+                          <a:ea typeface="+mn-ea"/>
+                          <a:cs typeface="+mn-cs"/>
+                        </a:rPr>
+                        <a:t>Reference one or more </a:t>
+                      </a:r>
+                      <a:r>
+                        <a:rPr lang="en-US" sz="1200" kern="1200" dirty="0" err="1" smtClean="0">
+                          <a:solidFill>
+                            <a:schemeClr val="dk1"/>
+                          </a:solidFill>
+                          <a:latin typeface="+mn-lt"/>
+                          <a:ea typeface="+mn-ea"/>
+                          <a:cs typeface="+mn-cs"/>
+                        </a:rPr>
+                        <a:t>EFieldSample</a:t>
+                      </a:r>
+                      <a:endParaRPr lang="en-US" sz="1200" kern="1200" dirty="0" smtClean="0">
+                        <a:solidFill>
+                          <a:schemeClr val="dk1"/>
+                        </a:solidFill>
+                        <a:latin typeface="+mn-lt"/>
+                        <a:ea typeface="+mn-ea"/>
+                        <a:cs typeface="+mn-cs"/>
+                      </a:endParaRPr>
+                    </a:p>
+                    <a:p>
+                      <a:endParaRPr lang="en-US" sz="1600" b="1" dirty="0" smtClean="0"/>
+                    </a:p>
+                  </a:txBody>
+                  <a:tcPr/>
+                </a:tc>
+                <a:tc>
+                  <a:txBody>
+                    <a:bodyPr/>
+                    <a:lstStyle/>
+                    <a:p>
+                      <a:pPr marL="0" marR="0" indent="0" algn="l" defTabSz="914400" rtl="0" eaLnBrk="1" fontAlgn="auto" latinLnBrk="0" hangingPunct="1">
+                        <a:lnSpc>
+                          <a:spcPct val="100000"/>
+                        </a:lnSpc>
+                        <a:spcBef>
+                          <a:spcPts val="0"/>
+                        </a:spcBef>
+                        <a:spcAft>
+                          <a:spcPts val="0"/>
+                        </a:spcAft>
+                        <a:buClrTx/>
+                        <a:buSzTx/>
+                        <a:buFontTx/>
+                        <a:buNone/>
+                        <a:tabLst/>
+                        <a:defRPr/>
+                      </a:pPr>
+                      <a:r>
+                        <a:rPr lang="en-US" sz="1600" dirty="0" smtClean="0"/>
+                        <a:t>Any class implementing</a:t>
+                      </a:r>
+                      <a:r>
+                        <a:rPr lang="en-US" sz="1600" baseline="0" dirty="0" smtClean="0"/>
+                        <a:t> </a:t>
+                      </a:r>
+                      <a:r>
+                        <a:rPr lang="en-US" sz="1600" b="1" baseline="0" dirty="0" err="1" smtClean="0"/>
+                        <a:t>FieldBehaviour</a:t>
+                      </a:r>
+                      <a:endParaRPr lang="en-US" sz="1600" b="1" baseline="0" dirty="0" smtClean="0"/>
+                    </a:p>
+                  </a:txBody>
+                  <a:tcPr/>
+                </a:tc>
+              </a:tr>
+              <a:tr h="535677">
+                <a:tc>
+                  <a:txBody>
+                    <a:bodyPr/>
+                    <a:lstStyle/>
+                    <a:p>
+                      <a:pPr marL="0" marR="0" indent="0" algn="l" defTabSz="914400" rtl="0" eaLnBrk="1" fontAlgn="auto" latinLnBrk="0" hangingPunct="1">
+                        <a:lnSpc>
+                          <a:spcPct val="100000"/>
+                        </a:lnSpc>
+                        <a:spcBef>
+                          <a:spcPts val="0"/>
+                        </a:spcBef>
+                        <a:spcAft>
+                          <a:spcPts val="0"/>
+                        </a:spcAft>
+                        <a:buClrTx/>
+                        <a:buSzTx/>
+                        <a:buFontTx/>
+                        <a:buNone/>
+                        <a:tabLst/>
+                        <a:defRPr/>
+                      </a:pPr>
+                      <a:r>
+                        <a:rPr lang="en-US" sz="1600" b="1" dirty="0" smtClean="0"/>
+                        <a:t>@</a:t>
+                      </a:r>
+                      <a:r>
+                        <a:rPr lang="en-US" sz="1600" b="1" dirty="0" err="1" smtClean="0"/>
+                        <a:t>InjectLabel</a:t>
+                      </a:r>
+                      <a:endParaRPr lang="en-US" sz="1600" b="1" dirty="0" smtClean="0"/>
+                    </a:p>
+                    <a:p>
+                      <a:pPr marL="0" marR="0" indent="0" algn="l" defTabSz="914400" rtl="0" eaLnBrk="1" fontAlgn="auto" latinLnBrk="0" hangingPunct="1">
+                        <a:lnSpc>
+                          <a:spcPct val="100000"/>
+                        </a:lnSpc>
+                        <a:spcBef>
+                          <a:spcPts val="0"/>
+                        </a:spcBef>
+                        <a:spcAft>
+                          <a:spcPts val="0"/>
+                        </a:spcAft>
+                        <a:buClrTx/>
+                        <a:buSzTx/>
+                        <a:buFontTx/>
+                        <a:buNone/>
+                        <a:tabLst/>
+                        <a:defRPr/>
+                      </a:pPr>
+                      <a:endParaRPr lang="en-US" sz="1600" b="1" dirty="0" smtClean="0"/>
+                    </a:p>
+                    <a:p>
+                      <a:pPr marL="0" marR="0" indent="0" algn="l" defTabSz="914400" rtl="0" eaLnBrk="1" fontAlgn="auto" latinLnBrk="0" hangingPunct="1">
+                        <a:lnSpc>
+                          <a:spcPct val="100000"/>
+                        </a:lnSpc>
+                        <a:spcBef>
+                          <a:spcPts val="0"/>
+                        </a:spcBef>
+                        <a:spcAft>
+                          <a:spcPts val="0"/>
+                        </a:spcAft>
+                        <a:buClrTx/>
+                        <a:buSzTx/>
+                        <a:buFontTx/>
+                        <a:buNone/>
+                        <a:tabLst/>
+                        <a:defRPr/>
+                      </a:pPr>
+                      <a:endParaRPr lang="en-US" sz="1600" b="1" dirty="0" smtClean="0"/>
                     </a:p>
                   </a:txBody>
                   <a:tcPr/>
@@ -16676,8 +16866,13 @@
                     <a:p>
                       <a:r>
                         <a:rPr lang="en-US" sz="1600" b="1" dirty="0" smtClean="0"/>
-                        <a:t>@InjectSampleHelp</a:t>
+                        <a:t>@</a:t>
                       </a:r>
+                      <a:r>
+                        <a:rPr lang="en-US" sz="1600" b="1" dirty="0" err="1" smtClean="0"/>
+                        <a:t>InjectSampleLabel</a:t>
+                      </a:r>
+                      <a:endParaRPr lang="en-US" sz="1600" b="1" dirty="0" smtClean="0"/>
                     </a:p>
                     <a:p>
                       <a:pPr marL="0" marR="0" indent="0" algn="l" defTabSz="914400" rtl="0" eaLnBrk="1" fontAlgn="auto" latinLnBrk="0" hangingPunct="1">
@@ -16739,6 +16934,9 @@
                       </a:r>
                       <a:endParaRPr lang="en-US" sz="1200" dirty="0" smtClean="0"/>
                     </a:p>
+                    <a:p>
+                      <a:endParaRPr lang="en-US" sz="1200" baseline="0" dirty="0" smtClean="0"/>
+                    </a:p>
                   </a:txBody>
                   <a:tcPr/>
                 </a:tc>
@@ -16780,106 +16978,6 @@
                         <a:rPr lang="en-US" sz="1600" baseline="0" dirty="0" smtClean="0"/>
                         <a:t>without parameter returning a String</a:t>
                       </a:r>
-                      <a:endParaRPr lang="en-US" sz="1600" dirty="0" smtClean="0"/>
-                    </a:p>
-                  </a:txBody>
-                  <a:tcPr/>
-                </a:tc>
-              </a:tr>
-              <a:tr h="535677">
-                <a:tc>
-                  <a:txBody>
-                    <a:bodyPr/>
-                    <a:lstStyle/>
-                    <a:p>
-                      <a:pPr marL="0" marR="0" indent="0" algn="l" defTabSz="914400" rtl="0" eaLnBrk="1" fontAlgn="auto" latinLnBrk="0" hangingPunct="1">
-                        <a:lnSpc>
-                          <a:spcPct val="100000"/>
-                        </a:lnSpc>
-                        <a:spcBef>
-                          <a:spcPts val="0"/>
-                        </a:spcBef>
-                        <a:spcAft>
-                          <a:spcPts val="0"/>
-                        </a:spcAft>
-                        <a:buClrTx/>
-                        <a:buSzTx/>
-                        <a:buFontTx/>
-                        <a:buNone/>
-                        <a:tabLst/>
-                        <a:defRPr/>
-                      </a:pPr>
-                      <a:r>
-                        <a:rPr lang="en-US" sz="1600" b="1" dirty="0" smtClean="0"/>
-                        <a:t>@InjectInit</a:t>
-                      </a:r>
-                    </a:p>
-                  </a:txBody>
-                  <a:tcPr/>
-                </a:tc>
-                <a:tc>
-                  <a:txBody>
-                    <a:bodyPr/>
-                    <a:lstStyle/>
-                    <a:p>
-                      <a:r>
-                        <a:rPr lang="en-US" sz="1600" b="1" dirty="0" smtClean="0"/>
-                        <a:t>@InjectSampleInit</a:t>
-                      </a:r>
-                    </a:p>
-                    <a:p>
-                      <a:pPr marL="0" marR="0" indent="0" algn="l" defTabSz="914400" rtl="0" eaLnBrk="1" fontAlgn="auto" latinLnBrk="0" hangingPunct="1">
-                        <a:lnSpc>
-                          <a:spcPct val="100000"/>
-                        </a:lnSpc>
-                        <a:spcBef>
-                          <a:spcPts val="0"/>
-                        </a:spcBef>
-                        <a:spcAft>
-                          <a:spcPts val="0"/>
-                        </a:spcAft>
-                        <a:buClrTx/>
-                        <a:buSzTx/>
-                        <a:buFontTx/>
-                        <a:buNone/>
-                        <a:tabLst/>
-                        <a:defRPr/>
-                      </a:pPr>
-                      <a:r>
-                        <a:rPr lang="en-US" sz="1200" dirty="0" smtClean="0"/>
-                        <a:t>Reference</a:t>
-                      </a:r>
-                      <a:r>
-                        <a:rPr lang="en-US" sz="1200" baseline="0" dirty="0" smtClean="0"/>
-                        <a:t> one or more </a:t>
-                      </a:r>
-                      <a:r>
-                        <a:rPr lang="en-US" sz="1200" baseline="0" dirty="0" err="1" smtClean="0"/>
-                        <a:t>EFieldSample</a:t>
-                      </a:r>
-                      <a:endParaRPr lang="en-US" sz="1200" dirty="0" smtClean="0"/>
-                    </a:p>
-                  </a:txBody>
-                  <a:tcPr/>
-                </a:tc>
-                <a:tc>
-                  <a:txBody>
-                    <a:bodyPr/>
-                    <a:lstStyle/>
-                    <a:p>
-                      <a:r>
-                        <a:rPr lang="en-US" sz="1600" dirty="0" smtClean="0"/>
-                        <a:t>Any class implementing</a:t>
-                      </a:r>
-                      <a:r>
-                        <a:rPr lang="en-US" sz="1600" baseline="0" dirty="0" smtClean="0"/>
-                        <a:t> </a:t>
-                      </a:r>
-                      <a:r>
-                        <a:rPr lang="en-US" sz="1600" b="1" baseline="0" dirty="0" smtClean="0"/>
-                        <a:t>FieldInitializer</a:t>
-                      </a:r>
-                      <a:endParaRPr lang="en-US" sz="1600" b="1" dirty="0" smtClean="0"/>
                     </a:p>
                   </a:txBody>
                   <a:tcPr/>
@@ -16910,8 +17008,13 @@
                       </a:pPr>
                       <a:r>
                         <a:rPr lang="en-US" sz="1600" b="1" dirty="0" smtClean="0"/>
-                        <a:t>@InjectLabel</a:t>
+                        <a:t>@</a:t>
                       </a:r>
+                      <a:r>
+                        <a:rPr lang="en-US" sz="1600" b="1" dirty="0" err="1" smtClean="0"/>
+                        <a:t>InjectHelp</a:t>
+                      </a:r>
+                      <a:endParaRPr lang="en-US" sz="1600" b="1" dirty="0" smtClean="0"/>
                     </a:p>
                   </a:txBody>
                   <a:tcPr/>
@@ -16923,8 +17026,13 @@
                     <a:p>
                       <a:r>
                         <a:rPr lang="en-US" sz="1600" b="1" dirty="0" smtClean="0"/>
-                        <a:t>@InjectSampleLabel</a:t>
+                        <a:t>@</a:t>
                       </a:r>
+                      <a:r>
+                        <a:rPr lang="en-US" sz="1600" b="1" dirty="0" err="1" smtClean="0"/>
+                        <a:t>InjectSampleHelp</a:t>
+                      </a:r>
+                      <a:endParaRPr lang="en-US" sz="1600" b="1" dirty="0" smtClean="0"/>
                     </a:p>
                     <a:p>
                       <a:pPr marL="0" marR="0" indent="0" algn="l" defTabSz="914400" rtl="0" eaLnBrk="1" fontAlgn="auto" latinLnBrk="0" hangingPunct="1">
@@ -17171,7 +17279,7 @@
     </p:spTree>
     <p:extLst>
       <p:ext uri="{BB962C8B-B14F-4D97-AF65-F5344CB8AC3E}">
-        <p14:creationId xmlns:p14="http://schemas.microsoft.com/office/powerpoint/2010/main" val="2197364214"/>
+        <p14:creationId xmlns="" xmlns:p14="http://schemas.microsoft.com/office/powerpoint/2010/main" val="2197364214"/>
       </p:ext>
     </p:extLst>
   </p:cSld>
@@ -17222,15 +17330,7 @@
           <a:p>
             <a:r>
               <a:rPr lang="en-US" dirty="0" smtClean="0"/>
-              <a:t>Declaring a </a:t>
-            </a:r>
-            <a:r>
-              <a:rPr lang="en-US" dirty="0" smtClean="0"/>
-              <a:t>feature </a:t>
-            </a:r>
-            <a:r>
-              <a:rPr lang="en-US" dirty="0" smtClean="0"/>
-              <a:t>of a field</a:t>
+              <a:t>Declaring a feature of a field</a:t>
             </a:r>
             <a:endParaRPr lang="en-US" dirty="0"/>
           </a:p>
@@ -17246,7 +17346,12 @@
             <p:ph idx="1"/>
           </p:nvPr>
         </p:nvSpPr>
-        <p:spPr/>
+        <p:spPr>
+          <a:xfrm>
+            <a:off x="152400" y="1600200"/>
+            <a:ext cx="8839200" cy="4525963"/>
+          </a:xfrm>
+        </p:spPr>
         <p:txBody>
           <a:bodyPr>
             <a:normAutofit lnSpcReduction="10000"/>
@@ -17637,7 +17742,7 @@
     </p:spTree>
     <p:extLst>
       <p:ext uri="{BB962C8B-B14F-4D97-AF65-F5344CB8AC3E}">
-        <p14:creationId xmlns:p14="http://schemas.microsoft.com/office/powerpoint/2010/main" val="977874982"/>
+        <p14:creationId xmlns="" xmlns:p14="http://schemas.microsoft.com/office/powerpoint/2010/main" val="977874982"/>
       </p:ext>
     </p:extLst>
   </p:cSld>
@@ -17729,15 +17834,7 @@
             </a:r>
             <a:r>
               <a:rPr lang="en-US" dirty="0" smtClean="0"/>
-              <a:t>to </a:t>
-            </a:r>
-            <a:r>
-              <a:rPr lang="en-US" dirty="0" smtClean="0"/>
-              <a:t>bind together </a:t>
-            </a:r>
-            <a:r>
-              <a:rPr lang="en-US" dirty="0" smtClean="0"/>
-              <a:t>the various field features and the fields</a:t>
+              <a:t>to bind together the various field features and the fields</a:t>
             </a:r>
           </a:p>
           <a:p>
@@ -17751,11 +17848,7 @@
             </a:r>
             <a:r>
               <a:rPr lang="en-US" dirty="0" smtClean="0"/>
-              <a:t>packaged with the </a:t>
-            </a:r>
-            <a:r>
-              <a:rPr lang="en-US" dirty="0" smtClean="0"/>
-              <a:t>JDK since Java 6</a:t>
+              <a:t>packaged with the JDK since Java 6</a:t>
             </a:r>
           </a:p>
           <a:p>
@@ -17779,19 +17872,7 @@
           <a:p>
             <a:r>
               <a:rPr lang="en-US" dirty="0" smtClean="0"/>
-              <a:t>Source </a:t>
-            </a:r>
-            <a:r>
-              <a:rPr lang="en-US" dirty="0" smtClean="0"/>
-              <a:t>code </a:t>
-            </a:r>
-            <a:r>
-              <a:rPr lang="en-US" dirty="0" smtClean="0"/>
-              <a:t>processing based </a:t>
-            </a:r>
-            <a:r>
-              <a:rPr lang="en-US" dirty="0" smtClean="0"/>
-              <a:t>on </a:t>
+              <a:t>Source code processing based on </a:t>
             </a:r>
             <a:r>
               <a:rPr lang="en-US" b="1" dirty="0" smtClean="0"/>
@@ -17816,19 +17897,7 @@
           <a:p>
             <a:r>
               <a:rPr lang="en-US" dirty="0" smtClean="0"/>
-              <a:t>No </a:t>
-            </a:r>
-            <a:r>
-              <a:rPr lang="en-US" dirty="0" smtClean="0"/>
-              <a:t>built-in </a:t>
-            </a:r>
-            <a:r>
-              <a:rPr lang="en-US" dirty="0" smtClean="0"/>
-              <a:t>code </a:t>
-            </a:r>
-            <a:r>
-              <a:rPr lang="en-US" dirty="0" smtClean="0"/>
-              <a:t>generator</a:t>
+              <a:t>No built-in code generator</a:t>
             </a:r>
           </a:p>
           <a:p>
@@ -17837,7 +17906,6 @@
               <a:rPr lang="en-US" dirty="0" smtClean="0"/>
               <a:t>Use basic template mechanism to simplify source code generation</a:t>
             </a:r>
-            <a:endParaRPr lang="en-US" dirty="0" smtClean="0"/>
           </a:p>
           <a:p>
             <a:endParaRPr lang="en-US" dirty="0" smtClean="0"/>
@@ -17850,7 +17918,7 @@
     </p:spTree>
     <p:extLst>
       <p:ext uri="{BB962C8B-B14F-4D97-AF65-F5344CB8AC3E}">
-        <p14:creationId xmlns:p14="http://schemas.microsoft.com/office/powerpoint/2010/main" val="2092776985"/>
+        <p14:creationId xmlns="" xmlns:p14="http://schemas.microsoft.com/office/powerpoint/2010/main" val="2092776985"/>
       </p:ext>
     </p:extLst>
   </p:cSld>
@@ -17903,11 +17971,7 @@
           <a:p>
             <a:r>
               <a:rPr lang="en-US" dirty="0" smtClean="0"/>
-              <a:t>Generated pattern to </a:t>
-            </a:r>
-            <a:r>
-              <a:rPr lang="en-US" dirty="0" smtClean="0"/>
-              <a:t>glue things together</a:t>
+              <a:t>Generated pattern to glue things together</a:t>
             </a:r>
             <a:endParaRPr lang="en-US" dirty="0"/>
           </a:p>
@@ -17925,7 +17989,7 @@
           <a:blip r:embed="rId2" cstate="print">
             <a:extLst>
               <a:ext uri="{28A0092B-C50C-407E-A947-70E740481C1C}">
-                <a14:useLocalDpi xmlns:a14="http://schemas.microsoft.com/office/drawing/2010/main" val="0"/>
+                <a14:useLocalDpi xmlns="" xmlns:a14="http://schemas.microsoft.com/office/drawing/2010/main" val="0"/>
               </a:ext>
             </a:extLst>
           </a:blip>
@@ -17989,15 +18053,7 @@
             </a:r>
             <a:r>
               <a:rPr lang="en-US" sz="2000" dirty="0" smtClean="0"/>
-              <a:t>is </a:t>
-            </a:r>
-            <a:r>
-              <a:rPr lang="en-US" sz="2000" dirty="0" smtClean="0"/>
-              <a:t>executed </a:t>
-            </a:r>
-            <a:r>
-              <a:rPr lang="en-US" sz="2000" dirty="0" smtClean="0"/>
-              <a:t>during the compilation of </a:t>
+              <a:t>is executed during the compilation of </a:t>
             </a:r>
             <a:r>
               <a:rPr lang="en-US" sz="2000" b="1" dirty="0" smtClean="0"/>
@@ -18033,23 +18089,11 @@
             </a:pPr>
             <a:r>
               <a:rPr lang="en-US" sz="2000" dirty="0" smtClean="0"/>
-              <a:t>An </a:t>
-            </a:r>
-            <a:r>
-              <a:rPr lang="en-US" sz="2000" dirty="0" smtClean="0"/>
-              <a:t>implementation for </a:t>
+              <a:t>An implementation for </a:t>
             </a:r>
             <a:r>
               <a:rPr lang="en-US" sz="2000" b="1" dirty="0" smtClean="0"/>
-              <a:t>GWT </a:t>
-            </a:r>
-            <a:r>
-              <a:rPr lang="en-US" sz="2000" b="1" dirty="0" smtClean="0"/>
-              <a:t>client </a:t>
-            </a:r>
-            <a:r>
-              <a:rPr lang="en-US" sz="2000" b="1" dirty="0" smtClean="0"/>
-              <a:t>runtime</a:t>
+              <a:t>GWT client runtime</a:t>
             </a:r>
             <a:r>
               <a:rPr lang="en-US" sz="2000" dirty="0" smtClean="0"/>
@@ -18068,27 +18112,11 @@
             </a:r>
             <a:r>
               <a:rPr lang="en-US" sz="2000" b="1" dirty="0" smtClean="0"/>
-              <a:t>mock </a:t>
-            </a:r>
-            <a:r>
-              <a:rPr lang="en-US" sz="2000" b="1" dirty="0" smtClean="0"/>
-              <a:t>implementation </a:t>
-            </a:r>
-            <a:r>
-              <a:rPr lang="en-US" sz="2000" b="1" dirty="0" smtClean="0"/>
-              <a:t>GWT less </a:t>
+              <a:t>mock implementation GWT less </a:t>
             </a:r>
             <a:r>
               <a:rPr lang="en-US" sz="2000" dirty="0" smtClean="0"/>
-              <a:t>for </a:t>
-            </a:r>
-            <a:r>
-              <a:rPr lang="en-US" sz="2000" dirty="0" smtClean="0"/>
-              <a:t>unit </a:t>
-            </a:r>
-            <a:r>
-              <a:rPr lang="en-US" sz="2000" dirty="0" smtClean="0"/>
-              <a:t>testing purpose</a:t>
+              <a:t>for unit testing purpose</a:t>
             </a:r>
             <a:endParaRPr lang="en-US" sz="2000" dirty="0"/>
           </a:p>
@@ -18097,7 +18125,7 @@
     </p:spTree>
     <p:extLst>
       <p:ext uri="{BB962C8B-B14F-4D97-AF65-F5344CB8AC3E}">
-        <p14:creationId xmlns:p14="http://schemas.microsoft.com/office/powerpoint/2010/main" val="318706902"/>
+        <p14:creationId xmlns="" xmlns:p14="http://schemas.microsoft.com/office/powerpoint/2010/main" val="318706902"/>
       </p:ext>
     </p:extLst>
   </p:cSld>
@@ -18180,7 +18208,7 @@
           <p:nvPr>
             <p:extLst>
               <p:ext uri="{D42A27DB-BD31-4B8C-83A1-F6EECF244321}">
-                <p14:modId xmlns:p14="http://schemas.microsoft.com/office/powerpoint/2010/main" val="3075550189"/>
+                <p14:modId xmlns="" xmlns:p14="http://schemas.microsoft.com/office/powerpoint/2010/main" val="3075550189"/>
               </p:ext>
             </p:extLst>
           </p:nvPr>
@@ -18254,8 +18282,13 @@
                       </a:pPr>
                       <a:r>
                         <a:rPr lang="en-US" sz="1600" b="1" dirty="0" smtClean="0"/>
-                        <a:t>@InjectBehaviour</a:t>
+                        <a:t>@</a:t>
                       </a:r>
+                      <a:r>
+                        <a:rPr lang="en-US" sz="1600" b="1" dirty="0" err="1" smtClean="0"/>
+                        <a:t>InjectInit</a:t>
+                      </a:r>
+                      <a:endParaRPr lang="en-US" sz="1600" b="1" dirty="0" smtClean="0"/>
                     </a:p>
                   </a:txBody>
                   <a:tcPr anchor="ctr"/>
@@ -18338,8 +18371,13 @@
                       </a:pPr>
                       <a:r>
                         <a:rPr lang="en-US" sz="1600" b="1" dirty="0" smtClean="0"/>
-                        <a:t>@InjectHelp</a:t>
+                        <a:t>@</a:t>
                       </a:r>
+                      <a:r>
+                        <a:rPr lang="en-US" sz="1600" b="1" dirty="0" err="1" smtClean="0"/>
+                        <a:t>InjectBehaviour</a:t>
+                      </a:r>
+                      <a:endParaRPr lang="en-US" sz="1600" b="1" dirty="0" smtClean="0"/>
                     </a:p>
                   </a:txBody>
                   <a:tcPr anchor="ctr"/>
@@ -18397,8 +18435,13 @@
                       </a:pPr>
                       <a:r>
                         <a:rPr lang="en-US" sz="1600" b="1" dirty="0" smtClean="0"/>
-                        <a:t>@InjectInit</a:t>
+                        <a:t>@</a:t>
                       </a:r>
+                      <a:r>
+                        <a:rPr lang="en-US" sz="1600" b="1" dirty="0" err="1" smtClean="0"/>
+                        <a:t>InjectLabel</a:t>
+                      </a:r>
+                      <a:endParaRPr lang="en-US" sz="1600" b="1" dirty="0" smtClean="0"/>
                     </a:p>
                   </a:txBody>
                   <a:tcPr anchor="ctr"/>
@@ -18439,8 +18482,13 @@
                       </a:pPr>
                       <a:r>
                         <a:rPr lang="en-US" sz="1600" b="1" dirty="0" smtClean="0"/>
-                        <a:t>@InjectLabel</a:t>
+                        <a:t>@</a:t>
                       </a:r>
+                      <a:r>
+                        <a:rPr lang="en-US" sz="1600" b="1" dirty="0" err="1" smtClean="0"/>
+                        <a:t>InjectHelp</a:t>
+                      </a:r>
+                      <a:endParaRPr lang="en-US" sz="1600" b="1" dirty="0" smtClean="0"/>
                     </a:p>
                   </a:txBody>
                   <a:tcPr anchor="ctr"/>
@@ -18531,7 +18579,7 @@
           <a:blip r:embed="rId3" cstate="print">
             <a:extLst>
               <a:ext uri="{28A0092B-C50C-407E-A947-70E740481C1C}">
-                <a14:useLocalDpi xmlns:a14="http://schemas.microsoft.com/office/drawing/2010/main" val="0"/>
+                <a14:useLocalDpi xmlns="" xmlns:a14="http://schemas.microsoft.com/office/drawing/2010/main" val="0"/>
               </a:ext>
             </a:extLst>
           </a:blip>
@@ -18541,7 +18589,7 @@
         </p:blipFill>
         <p:spPr>
           <a:xfrm>
-            <a:off x="3048000" y="2057400"/>
+            <a:off x="3048000" y="3505200"/>
             <a:ext cx="2518258" cy="494873"/>
           </a:xfrm>
           <a:prstGeom prst="rect">
@@ -18561,7 +18609,7 @@
           <a:blip r:embed="rId4" cstate="print">
             <a:extLst>
               <a:ext uri="{28A0092B-C50C-407E-A947-70E740481C1C}">
-                <a14:useLocalDpi xmlns:a14="http://schemas.microsoft.com/office/drawing/2010/main" val="0"/>
+                <a14:useLocalDpi xmlns="" xmlns:a14="http://schemas.microsoft.com/office/drawing/2010/main" val="0"/>
               </a:ext>
             </a:extLst>
           </a:blip>
@@ -18591,7 +18639,7 @@
           <a:blip r:embed="rId5" cstate="print">
             <a:extLst>
               <a:ext uri="{28A0092B-C50C-407E-A947-70E740481C1C}">
-                <a14:useLocalDpi xmlns:a14="http://schemas.microsoft.com/office/drawing/2010/main" val="0"/>
+                <a14:useLocalDpi xmlns="" xmlns:a14="http://schemas.microsoft.com/office/drawing/2010/main" val="0"/>
               </a:ext>
             </a:extLst>
           </a:blip>
@@ -18601,7 +18649,7 @@
         </p:blipFill>
         <p:spPr>
           <a:xfrm>
-            <a:off x="3048000" y="3505200"/>
+            <a:off x="3048000" y="5105400"/>
             <a:ext cx="4451665" cy="494873"/>
           </a:xfrm>
           <a:prstGeom prst="rect">
@@ -18621,7 +18669,7 @@
           <a:blip r:embed="rId6" cstate="print">
             <a:extLst>
               <a:ext uri="{28A0092B-C50C-407E-A947-70E740481C1C}">
-                <a14:useLocalDpi xmlns:a14="http://schemas.microsoft.com/office/drawing/2010/main" val="0"/>
+                <a14:useLocalDpi xmlns="" xmlns:a14="http://schemas.microsoft.com/office/drawing/2010/main" val="0"/>
               </a:ext>
             </a:extLst>
           </a:blip>
@@ -18631,7 +18679,7 @@
         </p:blipFill>
         <p:spPr>
           <a:xfrm>
-            <a:off x="3048000" y="4381073"/>
+            <a:off x="3048000" y="2057400"/>
             <a:ext cx="2429378" cy="494873"/>
           </a:xfrm>
           <a:prstGeom prst="rect">
@@ -18651,7 +18699,7 @@
           <a:blip r:embed="rId7" cstate="print">
             <a:extLst>
               <a:ext uri="{28A0092B-C50C-407E-A947-70E740481C1C}">
-                <a14:useLocalDpi xmlns:a14="http://schemas.microsoft.com/office/drawing/2010/main" val="0"/>
+                <a14:useLocalDpi xmlns="" xmlns:a14="http://schemas.microsoft.com/office/drawing/2010/main" val="0"/>
               </a:ext>
             </a:extLst>
           </a:blip>
@@ -18661,7 +18709,7 @@
         </p:blipFill>
         <p:spPr>
           <a:xfrm>
-            <a:off x="3029415" y="5067727"/>
+            <a:off x="3048000" y="4267200"/>
             <a:ext cx="4497751" cy="494873"/>
           </a:xfrm>
           <a:prstGeom prst="rect">
@@ -18681,7 +18729,7 @@
           <a:blip r:embed="rId8" cstate="print">
             <a:extLst>
               <a:ext uri="{28A0092B-C50C-407E-A947-70E740481C1C}">
-                <a14:useLocalDpi xmlns:a14="http://schemas.microsoft.com/office/drawing/2010/main" val="0"/>
+                <a14:useLocalDpi xmlns="" xmlns:a14="http://schemas.microsoft.com/office/drawing/2010/main" val="0"/>
               </a:ext>
             </a:extLst>
           </a:blip>
@@ -18702,7 +18750,7 @@
     </p:spTree>
     <p:extLst>
       <p:ext uri="{BB962C8B-B14F-4D97-AF65-F5344CB8AC3E}">
-        <p14:creationId xmlns:p14="http://schemas.microsoft.com/office/powerpoint/2010/main" val="949325302"/>
+        <p14:creationId xmlns="" xmlns:p14="http://schemas.microsoft.com/office/powerpoint/2010/main" val="949325302"/>
       </p:ext>
     </p:extLst>
   </p:cSld>
@@ -18853,7 +18901,7 @@
     </p:spTree>
     <p:extLst>
       <p:ext uri="{BB962C8B-B14F-4D97-AF65-F5344CB8AC3E}">
-        <p14:creationId xmlns:p14="http://schemas.microsoft.com/office/powerpoint/2010/main" val="1326827891"/>
+        <p14:creationId xmlns="" xmlns:p14="http://schemas.microsoft.com/office/powerpoint/2010/main" val="1326827891"/>
       </p:ext>
     </p:extLst>
   </p:cSld>
@@ -18992,7 +19040,7 @@
     </p:spTree>
     <p:extLst>
       <p:ext uri="{BB962C8B-B14F-4D97-AF65-F5344CB8AC3E}">
-        <p14:creationId xmlns:p14="http://schemas.microsoft.com/office/powerpoint/2010/main" val="13878138"/>
+        <p14:creationId xmlns="" xmlns:p14="http://schemas.microsoft.com/office/powerpoint/2010/main" val="13878138"/>
       </p:ext>
     </p:extLst>
   </p:cSld>
@@ -19038,7 +19086,7 @@
           <a:blip r:embed="rId2" cstate="print">
             <a:extLst>
               <a:ext uri="{28A0092B-C50C-407E-A947-70E740481C1C}">
-                <a14:useLocalDpi xmlns:a14="http://schemas.microsoft.com/office/drawing/2010/main" val="0"/>
+                <a14:useLocalDpi xmlns="" xmlns:a14="http://schemas.microsoft.com/office/drawing/2010/main" val="0"/>
               </a:ext>
             </a:extLst>
           </a:blip>
@@ -19080,11 +19128,7 @@
           <a:p>
             <a:r>
               <a:rPr lang="en-US" dirty="0" smtClean="0"/>
-              <a:t>Generate UML </a:t>
-            </a:r>
-            <a:r>
-              <a:rPr lang="en-US" dirty="0" smtClean="0"/>
-              <a:t>to understand the model</a:t>
+              <a:t>Generate UML to understand the model</a:t>
             </a:r>
             <a:endParaRPr lang="en-US" dirty="0"/>
           </a:p>
@@ -19099,7 +19143,7 @@
           <p:nvPr>
             <p:extLst>
               <p:ext uri="{D42A27DB-BD31-4B8C-83A1-F6EECF244321}">
-                <p14:modId xmlns:p14="http://schemas.microsoft.com/office/powerpoint/2010/main" val="3204736979"/>
+                <p14:modId xmlns="" xmlns:p14="http://schemas.microsoft.com/office/powerpoint/2010/main" val="3204736979"/>
               </p:ext>
             </p:extLst>
           </p:nvPr>
@@ -19386,15 +19430,7 @@
             </a:r>
             <a:r>
               <a:rPr lang="en-US" sz="2000" dirty="0" smtClean="0"/>
-              <a:t> </a:t>
-            </a:r>
-            <a:r>
-              <a:rPr lang="en-US" sz="2000" dirty="0" smtClean="0"/>
-              <a:t>the </a:t>
-            </a:r>
-            <a:r>
-              <a:rPr lang="en-US" sz="2000" dirty="0" smtClean="0"/>
-              <a:t>model and specify </a:t>
+              <a:t> the model and specify </a:t>
             </a:r>
             <a:r>
               <a:rPr lang="en-US" sz="2000" b="1" dirty="0" smtClean="0"/>
@@ -19422,11 +19458,7 @@
             </a:pPr>
             <a:r>
               <a:rPr lang="en-US" sz="2000" dirty="0" smtClean="0"/>
-              <a:t>Generated </a:t>
-            </a:r>
-            <a:r>
-              <a:rPr lang="en-US" sz="2000" dirty="0" smtClean="0"/>
-              <a:t>as an artifact of the </a:t>
+              <a:t>Generated as an artifact of the </a:t>
             </a:r>
             <a:r>
               <a:rPr lang="en-US" sz="2000" b="1" dirty="0" smtClean="0"/>
@@ -19443,7 +19475,7 @@
     </p:spTree>
     <p:extLst>
       <p:ext uri="{BB962C8B-B14F-4D97-AF65-F5344CB8AC3E}">
-        <p14:creationId xmlns:p14="http://schemas.microsoft.com/office/powerpoint/2010/main" val="3195513628"/>
+        <p14:creationId xmlns="" xmlns:p14="http://schemas.microsoft.com/office/powerpoint/2010/main" val="3195513628"/>
       </p:ext>
     </p:extLst>
   </p:cSld>
@@ -19515,14 +19547,80 @@
           <a:bodyPr/>
           <a:lstStyle/>
           <a:p>
-            <a:endParaRPr lang="en-US"/>
+            <a:r>
+              <a:rPr lang="en-US" dirty="0" smtClean="0"/>
+              <a:t>Use </a:t>
+            </a:r>
+            <a:r>
+              <a:rPr lang="en-US" dirty="0" err="1" smtClean="0"/>
+              <a:t>FieldEditor</a:t>
+            </a:r>
+            <a:r>
+              <a:rPr lang="en-US" dirty="0" smtClean="0"/>
+              <a:t> &amp; </a:t>
+            </a:r>
+            <a:r>
+              <a:rPr lang="en-US" dirty="0" err="1" smtClean="0"/>
+              <a:t>FieldBehaviour</a:t>
+            </a:r>
+            <a:r>
+              <a:rPr lang="en-US" dirty="0" smtClean="0"/>
+              <a:t> to track:</a:t>
+            </a:r>
+          </a:p>
+          <a:p>
+            <a:pPr lvl="1"/>
+            <a:r>
+              <a:rPr lang="en-US" dirty="0" smtClean="0"/>
+              <a:t>User inputs</a:t>
+            </a:r>
+          </a:p>
+          <a:p>
+            <a:pPr lvl="1"/>
+            <a:r>
+              <a:rPr lang="en-US" dirty="0" smtClean="0"/>
+              <a:t>Validation errors</a:t>
+            </a:r>
+          </a:p>
+          <a:p>
+            <a:pPr lvl="1"/>
+            <a:r>
+              <a:rPr lang="en-US" dirty="0" smtClean="0"/>
+              <a:t>Most common user profiles</a:t>
+            </a:r>
+          </a:p>
+          <a:p>
+            <a:endParaRPr lang="en-US" dirty="0" smtClean="0"/>
+          </a:p>
+          <a:p>
+            <a:r>
+              <a:rPr lang="en-US" dirty="0" smtClean="0"/>
+              <a:t>Use of tracking results:</a:t>
+            </a:r>
+          </a:p>
+          <a:p>
+            <a:pPr lvl="1"/>
+            <a:r>
+              <a:rPr lang="en-US" dirty="0" smtClean="0"/>
+              <a:t>Improve forms for faster input</a:t>
+            </a:r>
+          </a:p>
+          <a:p>
+            <a:pPr lvl="1"/>
+            <a:r>
+              <a:rPr lang="en-US" dirty="0" smtClean="0"/>
+              <a:t>Find ergonomic issues</a:t>
+            </a:r>
+          </a:p>
+          <a:p>
+            <a:endParaRPr lang="en-US" dirty="0"/>
           </a:p>
         </p:txBody>
       </p:sp>
     </p:spTree>
     <p:extLst>
       <p:ext uri="{BB962C8B-B14F-4D97-AF65-F5344CB8AC3E}">
-        <p14:creationId xmlns:p14="http://schemas.microsoft.com/office/powerpoint/2010/main" val="2674396190"/>
+        <p14:creationId xmlns="" xmlns:p14="http://schemas.microsoft.com/office/powerpoint/2010/main" val="2674396190"/>
       </p:ext>
     </p:extLst>
   </p:cSld>
@@ -19591,17 +19689,73 @@
         </p:nvSpPr>
         <p:spPr/>
         <p:txBody>
-          <a:bodyPr/>
+          <a:bodyPr>
+            <a:normAutofit lnSpcReduction="10000"/>
+          </a:bodyPr>
           <a:lstStyle/>
           <a:p>
-            <a:endParaRPr lang="en-US"/>
+            <a:r>
+              <a:rPr lang="en-US" dirty="0" smtClean="0"/>
+              <a:t>Identify changes improving a website performance</a:t>
+            </a:r>
+          </a:p>
+          <a:p>
+            <a:pPr lvl="1"/>
+            <a:r>
+              <a:rPr lang="en-US" dirty="0" smtClean="0"/>
+              <a:t>Compare two versions (A and B)</a:t>
+            </a:r>
+          </a:p>
+          <a:p>
+            <a:pPr lvl="1"/>
+            <a:r>
+              <a:rPr lang="en-US" dirty="0" smtClean="0"/>
+              <a:t>Compare the registration conversion</a:t>
+            </a:r>
+          </a:p>
+          <a:p>
+            <a:pPr lvl="1"/>
+            <a:r>
+              <a:rPr lang="en-US" dirty="0" smtClean="0"/>
+              <a:t>Keep the most efficient version</a:t>
+            </a:r>
+          </a:p>
+          <a:p>
+            <a:endParaRPr lang="en-US" dirty="0" smtClean="0"/>
+          </a:p>
+          <a:p>
+            <a:r>
+              <a:rPr lang="en-US" dirty="0" smtClean="0"/>
+              <a:t>Can be done using</a:t>
+            </a:r>
+          </a:p>
+          <a:p>
+            <a:pPr lvl="1"/>
+            <a:r>
+              <a:rPr lang="en-US" dirty="0" err="1" smtClean="0"/>
+              <a:t>FieldBehaviour</a:t>
+            </a:r>
+            <a:r>
+              <a:rPr lang="en-US" dirty="0" smtClean="0"/>
+              <a:t> specific implementation</a:t>
+            </a:r>
+          </a:p>
+          <a:p>
+            <a:pPr lvl="1"/>
+            <a:r>
+              <a:rPr lang="en-US" dirty="0" smtClean="0"/>
+              <a:t>Two different scenarios</a:t>
+            </a:r>
+          </a:p>
+          <a:p>
+            <a:endParaRPr lang="en-US" dirty="0"/>
           </a:p>
         </p:txBody>
       </p:sp>
     </p:spTree>
     <p:extLst>
       <p:ext uri="{BB962C8B-B14F-4D97-AF65-F5344CB8AC3E}">
-        <p14:creationId xmlns:p14="http://schemas.microsoft.com/office/powerpoint/2010/main" val="2713826086"/>
+        <p14:creationId xmlns="" xmlns:p14="http://schemas.microsoft.com/office/powerpoint/2010/main" val="2713826086"/>
       </p:ext>
     </p:extLst>
   </p:cSld>
@@ -19793,7 +19947,7 @@
     </p:spTree>
     <p:extLst>
       <p:ext uri="{BB962C8B-B14F-4D97-AF65-F5344CB8AC3E}">
-        <p14:creationId xmlns:p14="http://schemas.microsoft.com/office/powerpoint/2010/main" val="714747940"/>
+        <p14:creationId xmlns="" xmlns:p14="http://schemas.microsoft.com/office/powerpoint/2010/main" val="714747940"/>
       </p:ext>
     </p:extLst>
   </p:cSld>
@@ -20332,7 +20486,7 @@
     </p:spTree>
     <p:extLst>
       <p:ext uri="{BB962C8B-B14F-4D97-AF65-F5344CB8AC3E}">
-        <p14:creationId xmlns:p14="http://schemas.microsoft.com/office/powerpoint/2010/main" val="3760395846"/>
+        <p14:creationId xmlns="" xmlns:p14="http://schemas.microsoft.com/office/powerpoint/2010/main" val="3760395846"/>
       </p:ext>
     </p:extLst>
   </p:cSld>
@@ -21165,7 +21319,7 @@
     </p:spTree>
     <p:extLst>
       <p:ext uri="{BB962C8B-B14F-4D97-AF65-F5344CB8AC3E}">
-        <p14:creationId xmlns:p14="http://schemas.microsoft.com/office/powerpoint/2010/main" val="1422967000"/>
+        <p14:creationId xmlns="" xmlns:p14="http://schemas.microsoft.com/office/powerpoint/2010/main" val="1422967000"/>
       </p:ext>
     </p:extLst>
   </p:cSld>
@@ -21316,7 +21470,7 @@
     </p:spTree>
     <p:extLst>
       <p:ext uri="{BB962C8B-B14F-4D97-AF65-F5344CB8AC3E}">
-        <p14:creationId xmlns:p14="http://schemas.microsoft.com/office/powerpoint/2010/main" val="2654585083"/>
+        <p14:creationId xmlns="" xmlns:p14="http://schemas.microsoft.com/office/powerpoint/2010/main" val="2654585083"/>
       </p:ext>
     </p:extLst>
   </p:cSld>
@@ -21476,7 +21630,7 @@
     </p:spTree>
     <p:extLst>
       <p:ext uri="{BB962C8B-B14F-4D97-AF65-F5344CB8AC3E}">
-        <p14:creationId xmlns:p14="http://schemas.microsoft.com/office/powerpoint/2010/main" val="1683021932"/>
+        <p14:creationId xmlns="" xmlns:p14="http://schemas.microsoft.com/office/powerpoint/2010/main" val="1683021932"/>
       </p:ext>
     </p:extLst>
   </p:cSld>
@@ -21550,7 +21704,7 @@
           <a:blip r:embed="rId2" cstate="print">
             <a:extLst>
               <a:ext uri="{28A0092B-C50C-407E-A947-70E740481C1C}">
-                <a14:useLocalDpi xmlns:a14="http://schemas.microsoft.com/office/drawing/2010/main" val="0"/>
+                <a14:useLocalDpi xmlns="" xmlns:a14="http://schemas.microsoft.com/office/drawing/2010/main" val="0"/>
               </a:ext>
             </a:extLst>
           </a:blip>
@@ -22186,7 +22340,7 @@
     </p:spTree>
     <p:extLst>
       <p:ext uri="{BB962C8B-B14F-4D97-AF65-F5344CB8AC3E}">
-        <p14:creationId xmlns:p14="http://schemas.microsoft.com/office/powerpoint/2010/main" val="3007787296"/>
+        <p14:creationId xmlns="" xmlns:p14="http://schemas.microsoft.com/office/powerpoint/2010/main" val="3007787296"/>
       </p:ext>
     </p:extLst>
   </p:cSld>
@@ -22286,7 +22440,6 @@
               <a:rPr lang="en-US" dirty="0" smtClean="0"/>
               <a:t>Automated testing on more than 400 fields in 5 complex forms</a:t>
             </a:r>
-            <a:endParaRPr lang="en-US" dirty="0" smtClean="0"/>
           </a:p>
           <a:p>
             <a:endParaRPr lang="en-US" dirty="0"/>
@@ -22296,7 +22449,7 @@
     </p:spTree>
     <p:extLst>
       <p:ext uri="{BB962C8B-B14F-4D97-AF65-F5344CB8AC3E}">
-        <p14:creationId xmlns:p14="http://schemas.microsoft.com/office/powerpoint/2010/main" val="40929930"/>
+        <p14:creationId xmlns="" xmlns:p14="http://schemas.microsoft.com/office/powerpoint/2010/main" val="40929930"/>
       </p:ext>
     </p:extLst>
   </p:cSld>
@@ -22483,7 +22636,7 @@
     </p:spTree>
     <p:extLst>
       <p:ext uri="{BB962C8B-B14F-4D97-AF65-F5344CB8AC3E}">
-        <p14:creationId xmlns:p14="http://schemas.microsoft.com/office/powerpoint/2010/main" val="4255503392"/>
+        <p14:creationId xmlns="" xmlns:p14="http://schemas.microsoft.com/office/powerpoint/2010/main" val="4255503392"/>
       </p:ext>
     </p:extLst>
   </p:cSld>
@@ -22562,7 +22715,7 @@
     </p:spTree>
     <p:extLst>
       <p:ext uri="{BB962C8B-B14F-4D97-AF65-F5344CB8AC3E}">
-        <p14:creationId xmlns:p14="http://schemas.microsoft.com/office/powerpoint/2010/main" val="1336479164"/>
+        <p14:creationId xmlns="" xmlns:p14="http://schemas.microsoft.com/office/powerpoint/2010/main" val="1336479164"/>
       </p:ext>
     </p:extLst>
   </p:cSld>
@@ -22649,7 +22802,6 @@
               <a:rPr lang="en-US" dirty="0" smtClean="0"/>
               <a:t>Adaptive path for the forms completion</a:t>
             </a:r>
-            <a:endParaRPr lang="en-US" dirty="0" smtClean="0"/>
           </a:p>
           <a:p>
             <a:pPr marL="0" indent="0">
@@ -22662,7 +22814,7 @@
     </p:spTree>
     <p:extLst>
       <p:ext uri="{BB962C8B-B14F-4D97-AF65-F5344CB8AC3E}">
-        <p14:creationId xmlns:p14="http://schemas.microsoft.com/office/powerpoint/2010/main" val="4014343169"/>
+        <p14:creationId xmlns="" xmlns:p14="http://schemas.microsoft.com/office/powerpoint/2010/main" val="4014343169"/>
       </p:ext>
     </p:extLst>
   </p:cSld>
@@ -22813,7 +22965,7 @@
     </p:spTree>
     <p:extLst>
       <p:ext uri="{BB962C8B-B14F-4D97-AF65-F5344CB8AC3E}">
-        <p14:creationId xmlns:p14="http://schemas.microsoft.com/office/powerpoint/2010/main" val="2781303602"/>
+        <p14:creationId xmlns="" xmlns:p14="http://schemas.microsoft.com/office/powerpoint/2010/main" val="2781303602"/>
       </p:ext>
     </p:extLst>
   </p:cSld>
@@ -22973,7 +23125,7 @@
     </p:spTree>
     <p:extLst>
       <p:ext uri="{BB962C8B-B14F-4D97-AF65-F5344CB8AC3E}">
-        <p14:creationId xmlns:p14="http://schemas.microsoft.com/office/powerpoint/2010/main" val="2375505937"/>
+        <p14:creationId xmlns="" xmlns:p14="http://schemas.microsoft.com/office/powerpoint/2010/main" val="2375505937"/>
       </p:ext>
     </p:extLst>
   </p:cSld>
@@ -23104,18 +23256,18 @@
     </p:spTree>
     <p:extLst>
       <p:ext uri="{BB962C8B-B14F-4D97-AF65-F5344CB8AC3E}">
-        <p14:creationId xmlns:p14="http://schemas.microsoft.com/office/powerpoint/2010/main" val="1618189430"/>
+        <p14:creationId xmlns="" xmlns:p14="http://schemas.microsoft.com/office/powerpoint/2010/main" val="1618189430"/>
       </p:ext>
     </p:extLst>
   </p:cSld>
   <p:clrMapOvr>
     <a:masterClrMapping/>
   </p:clrMapOvr>
-  <mc:AlternateContent xmlns:mc="http://schemas.openxmlformats.org/markup-compatibility/2006" xmlns:p14="http://schemas.microsoft.com/office/powerpoint/2010/main">
-    <mc:Choice Requires="p14">
+  <mc:AlternateContent xmlns:mc="http://schemas.openxmlformats.org/markup-compatibility/2006">
+    <mc:Choice xmlns="" xmlns:p14="http://schemas.microsoft.com/office/powerpoint/2010/main" Requires="p14">
       <p:transition spd="slow" p14:dur="2000"/>
     </mc:Choice>
-    <mc:Fallback xmlns="">
+    <mc:Fallback>
       <p:transition spd="slow"/>
     </mc:Fallback>
   </mc:AlternateContent>
@@ -23285,7 +23437,7 @@
     </p:spTree>
     <p:extLst>
       <p:ext uri="{BB962C8B-B14F-4D97-AF65-F5344CB8AC3E}">
-        <p14:creationId xmlns:p14="http://schemas.microsoft.com/office/powerpoint/2010/main" val="3644490438"/>
+        <p14:creationId xmlns="" xmlns:p14="http://schemas.microsoft.com/office/powerpoint/2010/main" val="3644490438"/>
       </p:ext>
     </p:extLst>
   </p:cSld>

</xml_diff>

<commit_message>
review field tracking & AB testing
</commit_message>
<xml_diff>
--- a/mdl4ui-docs/mdl4ui_cg2013.pptx
+++ b/mdl4ui-docs/mdl4ui_cg2013.pptx
@@ -5,22 +5,22 @@
     <p:sldMasterId id="2147483648" r:id="rId1"/>
   </p:sldMasterIdLst>
   <p:notesMasterIdLst>
-    <p:notesMasterId r:id="rId64"/>
+    <p:notesMasterId r:id="rId65"/>
   </p:notesMasterIdLst>
   <p:handoutMasterIdLst>
-    <p:handoutMasterId r:id="rId65"/>
+    <p:handoutMasterId r:id="rId66"/>
   </p:handoutMasterIdLst>
   <p:sldIdLst>
     <p:sldId id="256" r:id="rId2"/>
     <p:sldId id="257" r:id="rId3"/>
-    <p:sldId id="259" r:id="rId4"/>
-    <p:sldId id="258" r:id="rId5"/>
-    <p:sldId id="260" r:id="rId6"/>
-    <p:sldId id="261" r:id="rId7"/>
-    <p:sldId id="262" r:id="rId8"/>
-    <p:sldId id="263" r:id="rId9"/>
-    <p:sldId id="264" r:id="rId10"/>
-    <p:sldId id="265" r:id="rId11"/>
+    <p:sldId id="323" r:id="rId4"/>
+    <p:sldId id="259" r:id="rId5"/>
+    <p:sldId id="258" r:id="rId6"/>
+    <p:sldId id="260" r:id="rId7"/>
+    <p:sldId id="261" r:id="rId8"/>
+    <p:sldId id="262" r:id="rId9"/>
+    <p:sldId id="263" r:id="rId10"/>
+    <p:sldId id="264" r:id="rId11"/>
     <p:sldId id="266" r:id="rId12"/>
     <p:sldId id="319" r:id="rId13"/>
     <p:sldId id="312" r:id="rId14"/>
@@ -69,10 +69,11 @@
     <p:sldId id="301" r:id="rId57"/>
     <p:sldId id="307" r:id="rId58"/>
     <p:sldId id="309" r:id="rId59"/>
-    <p:sldId id="302" r:id="rId60"/>
-    <p:sldId id="321" r:id="rId61"/>
-    <p:sldId id="303" r:id="rId62"/>
-    <p:sldId id="322" r:id="rId63"/>
+    <p:sldId id="325" r:id="rId60"/>
+    <p:sldId id="302" r:id="rId61"/>
+    <p:sldId id="321" r:id="rId62"/>
+    <p:sldId id="303" r:id="rId63"/>
+    <p:sldId id="322" r:id="rId64"/>
   </p:sldIdLst>
   <p:sldSz cx="9144000" cy="6858000" type="screen4x3"/>
   <p:notesSz cx="6807200" cy="9939338"/>
@@ -333,7 +334,7 @@
     </p:spTree>
     <p:extLst>
       <p:ext uri="{BB962C8B-B14F-4D97-AF65-F5344CB8AC3E}">
-        <p14:creationId xmlns="" xmlns:p14="http://schemas.microsoft.com/office/powerpoint/2010/main" val="70803672"/>
+        <p14:creationId xmlns:p14="http://schemas.microsoft.com/office/powerpoint/2010/main" xmlns="" val="70803672"/>
       </p:ext>
     </p:extLst>
   </p:cSld>
@@ -593,7 +594,7 @@
     </p:spTree>
     <p:extLst>
       <p:ext uri="{BB962C8B-B14F-4D97-AF65-F5344CB8AC3E}">
-        <p14:creationId xmlns="" xmlns:p14="http://schemas.microsoft.com/office/powerpoint/2010/main" val="1701488114"/>
+        <p14:creationId xmlns:p14="http://schemas.microsoft.com/office/powerpoint/2010/main" xmlns="" val="1701488114"/>
       </p:ext>
     </p:extLst>
   </p:cSld>
@@ -768,7 +769,7 @@
     </p:spTree>
     <p:extLst>
       <p:ext uri="{BB962C8B-B14F-4D97-AF65-F5344CB8AC3E}">
-        <p14:creationId xmlns="" xmlns:p14="http://schemas.microsoft.com/office/powerpoint/2010/main" val="3047004223"/>
+        <p14:creationId xmlns:p14="http://schemas.microsoft.com/office/powerpoint/2010/main" xmlns="" val="3047004223"/>
       </p:ext>
     </p:extLst>
   </p:cSld>
@@ -853,7 +854,7 @@
     </p:spTree>
     <p:extLst>
       <p:ext uri="{BB962C8B-B14F-4D97-AF65-F5344CB8AC3E}">
-        <p14:creationId xmlns="" xmlns:p14="http://schemas.microsoft.com/office/powerpoint/2010/main" val="3280979232"/>
+        <p14:creationId xmlns:p14="http://schemas.microsoft.com/office/powerpoint/2010/main" xmlns="" val="3280979232"/>
       </p:ext>
     </p:extLst>
   </p:cSld>
@@ -938,9 +939,91 @@
     </p:spTree>
     <p:extLst>
       <p:ext uri="{BB962C8B-B14F-4D97-AF65-F5344CB8AC3E}">
-        <p14:creationId xmlns="" xmlns:p14="http://schemas.microsoft.com/office/powerpoint/2010/main" val="1987381696"/>
+        <p14:creationId xmlns:p14="http://schemas.microsoft.com/office/powerpoint/2010/main" xmlns="" val="1987381696"/>
       </p:ext>
     </p:extLst>
+  </p:cSld>
+  <p:clrMapOvr>
+    <a:masterClrMapping/>
+  </p:clrMapOvr>
+</p:notes>
+</file>
+
+<file path=ppt/notesSlides/notesSlide4.xml><?xml version="1.0" encoding="utf-8"?>
+<p:notes xmlns:a="http://schemas.openxmlformats.org/drawingml/2006/main" xmlns:r="http://schemas.openxmlformats.org/officeDocument/2006/relationships" xmlns:p="http://schemas.openxmlformats.org/presentationml/2006/main">
+  <p:cSld>
+    <p:spTree>
+      <p:nvGrpSpPr>
+        <p:cNvPr id="1" name=""/>
+        <p:cNvGrpSpPr/>
+        <p:nvPr/>
+      </p:nvGrpSpPr>
+      <p:grpSpPr>
+        <a:xfrm>
+          <a:off x="0" y="0"/>
+          <a:ext cx="0" cy="0"/>
+          <a:chOff x="0" y="0"/>
+          <a:chExt cx="0" cy="0"/>
+        </a:xfrm>
+      </p:grpSpPr>
+      <p:sp>
+        <p:nvSpPr>
+          <p:cNvPr id="2" name="Espace réservé de l'image des diapositives 1"/>
+          <p:cNvSpPr>
+            <a:spLocks noGrp="1" noRot="1" noChangeAspect="1"/>
+          </p:cNvSpPr>
+          <p:nvPr>
+            <p:ph type="sldImg"/>
+          </p:nvPr>
+        </p:nvSpPr>
+        <p:spPr/>
+      </p:sp>
+      <p:sp>
+        <p:nvSpPr>
+          <p:cNvPr id="3" name="Espace réservé des commentaires 2"/>
+          <p:cNvSpPr>
+            <a:spLocks noGrp="1"/>
+          </p:cNvSpPr>
+          <p:nvPr>
+            <p:ph type="body" idx="1"/>
+          </p:nvPr>
+        </p:nvSpPr>
+        <p:spPr/>
+        <p:txBody>
+          <a:bodyPr>
+            <a:normAutofit/>
+          </a:bodyPr>
+          <a:lstStyle/>
+          <a:p>
+            <a:endParaRPr lang="en-US" dirty="0"/>
+          </a:p>
+        </p:txBody>
+      </p:sp>
+      <p:sp>
+        <p:nvSpPr>
+          <p:cNvPr id="4" name="Espace réservé du numéro de diapositive 3"/>
+          <p:cNvSpPr>
+            <a:spLocks noGrp="1"/>
+          </p:cNvSpPr>
+          <p:nvPr>
+            <p:ph type="sldNum" sz="quarter" idx="10"/>
+          </p:nvPr>
+        </p:nvSpPr>
+        <p:spPr/>
+        <p:txBody>
+          <a:bodyPr/>
+          <a:lstStyle/>
+          <a:p>
+            <a:fld id="{1C995A55-B5EF-47FB-BCEC-1018828F2E10}" type="slidenum">
+              <a:rPr lang="en-US" smtClean="0"/>
+              <a:pPr/>
+              <a:t>52</a:t>
+            </a:fld>
+            <a:endParaRPr lang="en-US"/>
+          </a:p>
+        </p:txBody>
+      </p:sp>
+    </p:spTree>
   </p:cSld>
   <p:clrMapOvr>
     <a:masterClrMapping/>
@@ -1182,7 +1265,7 @@
     </p:spTree>
     <p:extLst>
       <p:ext uri="{BB962C8B-B14F-4D97-AF65-F5344CB8AC3E}">
-        <p14:creationId xmlns="" xmlns:p14="http://schemas.microsoft.com/office/powerpoint/2010/main" val="322609761"/>
+        <p14:creationId xmlns:p14="http://schemas.microsoft.com/office/powerpoint/2010/main" xmlns="" val="322609761"/>
       </p:ext>
     </p:extLst>
   </p:cSld>
@@ -1354,7 +1437,7 @@
     </p:spTree>
     <p:extLst>
       <p:ext uri="{BB962C8B-B14F-4D97-AF65-F5344CB8AC3E}">
-        <p14:creationId xmlns="" xmlns:p14="http://schemas.microsoft.com/office/powerpoint/2010/main" val="1248456722"/>
+        <p14:creationId xmlns:p14="http://schemas.microsoft.com/office/powerpoint/2010/main" xmlns="" val="1248456722"/>
       </p:ext>
     </p:extLst>
   </p:cSld>
@@ -1536,7 +1619,7 @@
     </p:spTree>
     <p:extLst>
       <p:ext uri="{BB962C8B-B14F-4D97-AF65-F5344CB8AC3E}">
-        <p14:creationId xmlns="" xmlns:p14="http://schemas.microsoft.com/office/powerpoint/2010/main" val="4236232986"/>
+        <p14:creationId xmlns:p14="http://schemas.microsoft.com/office/powerpoint/2010/main" xmlns="" val="4236232986"/>
       </p:ext>
     </p:extLst>
   </p:cSld>
@@ -1708,7 +1791,7 @@
     </p:spTree>
     <p:extLst>
       <p:ext uri="{BB962C8B-B14F-4D97-AF65-F5344CB8AC3E}">
-        <p14:creationId xmlns="" xmlns:p14="http://schemas.microsoft.com/office/powerpoint/2010/main" val="3454835055"/>
+        <p14:creationId xmlns:p14="http://schemas.microsoft.com/office/powerpoint/2010/main" xmlns="" val="3454835055"/>
       </p:ext>
     </p:extLst>
   </p:cSld>
@@ -1963,7 +2046,7 @@
     </p:spTree>
     <p:extLst>
       <p:ext uri="{BB962C8B-B14F-4D97-AF65-F5344CB8AC3E}">
-        <p14:creationId xmlns="" xmlns:p14="http://schemas.microsoft.com/office/powerpoint/2010/main" val="804127244"/>
+        <p14:creationId xmlns:p14="http://schemas.microsoft.com/office/powerpoint/2010/main" xmlns="" val="804127244"/>
       </p:ext>
     </p:extLst>
   </p:cSld>
@@ -2253,7 +2336,7 @@
     </p:spTree>
     <p:extLst>
       <p:ext uri="{BB962C8B-B14F-4D97-AF65-F5344CB8AC3E}">
-        <p14:creationId xmlns="" xmlns:p14="http://schemas.microsoft.com/office/powerpoint/2010/main" val="586698658"/>
+        <p14:creationId xmlns:p14="http://schemas.microsoft.com/office/powerpoint/2010/main" xmlns="" val="586698658"/>
       </p:ext>
     </p:extLst>
   </p:cSld>
@@ -2677,7 +2760,7 @@
     </p:spTree>
     <p:extLst>
       <p:ext uri="{BB962C8B-B14F-4D97-AF65-F5344CB8AC3E}">
-        <p14:creationId xmlns="" xmlns:p14="http://schemas.microsoft.com/office/powerpoint/2010/main" val="19144436"/>
+        <p14:creationId xmlns:p14="http://schemas.microsoft.com/office/powerpoint/2010/main" xmlns="" val="19144436"/>
       </p:ext>
     </p:extLst>
   </p:cSld>
@@ -2797,7 +2880,7 @@
     </p:spTree>
     <p:extLst>
       <p:ext uri="{BB962C8B-B14F-4D97-AF65-F5344CB8AC3E}">
-        <p14:creationId xmlns="" xmlns:p14="http://schemas.microsoft.com/office/powerpoint/2010/main" val="202749597"/>
+        <p14:creationId xmlns:p14="http://schemas.microsoft.com/office/powerpoint/2010/main" xmlns="" val="202749597"/>
       </p:ext>
     </p:extLst>
   </p:cSld>
@@ -2894,7 +2977,7 @@
     </p:spTree>
     <p:extLst>
       <p:ext uri="{BB962C8B-B14F-4D97-AF65-F5344CB8AC3E}">
-        <p14:creationId xmlns="" xmlns:p14="http://schemas.microsoft.com/office/powerpoint/2010/main" val="2898363528"/>
+        <p14:creationId xmlns:p14="http://schemas.microsoft.com/office/powerpoint/2010/main" xmlns="" val="2898363528"/>
       </p:ext>
     </p:extLst>
   </p:cSld>
@@ -3173,7 +3256,7 @@
     </p:spTree>
     <p:extLst>
       <p:ext uri="{BB962C8B-B14F-4D97-AF65-F5344CB8AC3E}">
-        <p14:creationId xmlns="" xmlns:p14="http://schemas.microsoft.com/office/powerpoint/2010/main" val="4010598191"/>
+        <p14:creationId xmlns:p14="http://schemas.microsoft.com/office/powerpoint/2010/main" xmlns="" val="4010598191"/>
       </p:ext>
     </p:extLst>
   </p:cSld>
@@ -3428,7 +3511,7 @@
     </p:spTree>
     <p:extLst>
       <p:ext uri="{BB962C8B-B14F-4D97-AF65-F5344CB8AC3E}">
-        <p14:creationId xmlns="" xmlns:p14="http://schemas.microsoft.com/office/powerpoint/2010/main" val="1433498939"/>
+        <p14:creationId xmlns:p14="http://schemas.microsoft.com/office/powerpoint/2010/main" xmlns="" val="1433498939"/>
       </p:ext>
     </p:extLst>
   </p:cSld>
@@ -3679,7 +3762,7 @@
     </p:spTree>
     <p:extLst>
       <p:ext uri="{BB962C8B-B14F-4D97-AF65-F5344CB8AC3E}">
-        <p14:creationId xmlns="" xmlns:p14="http://schemas.microsoft.com/office/powerpoint/2010/main" val="2684825788"/>
+        <p14:creationId xmlns:p14="http://schemas.microsoft.com/office/powerpoint/2010/main" xmlns="" val="2684825788"/>
       </p:ext>
     </p:extLst>
   </p:cSld>
@@ -4050,7 +4133,7 @@
     </p:spTree>
     <p:extLst>
       <p:ext uri="{BB962C8B-B14F-4D97-AF65-F5344CB8AC3E}">
-        <p14:creationId xmlns="" xmlns:p14="http://schemas.microsoft.com/office/powerpoint/2010/main" val="3955344790"/>
+        <p14:creationId xmlns:p14="http://schemas.microsoft.com/office/powerpoint/2010/main" xmlns="" val="3955344790"/>
       </p:ext>
     </p:extLst>
   </p:cSld>
@@ -4058,7 +4141,7 @@
     <a:masterClrMapping/>
   </p:clrMapOvr>
   <mc:AlternateContent xmlns:mc="http://schemas.openxmlformats.org/markup-compatibility/2006">
-    <mc:Choice xmlns="" xmlns:p14="http://schemas.microsoft.com/office/powerpoint/2010/main" Requires="p14">
+    <mc:Choice xmlns:p14="http://schemas.microsoft.com/office/powerpoint/2010/main" xmlns="" Requires="p14">
       <p:transition spd="slow" p14:dur="2000"/>
     </mc:Choice>
     <mc:Fallback>
@@ -4099,7 +4182,7 @@
             <a:spLocks noGrp="1"/>
           </p:cNvSpPr>
           <p:nvPr>
-            <p:ph type="ctrTitle"/>
+            <p:ph type="title"/>
           </p:nvPr>
         </p:nvSpPr>
         <p:spPr/>
@@ -4109,7 +4192,7 @@
           <a:p>
             <a:r>
               <a:rPr lang="en-US" dirty="0" smtClean="0"/>
-              <a:t>Quick demo</a:t>
+              <a:t>MDL4UI our OSS sandbox</a:t>
             </a:r>
             <a:endParaRPr lang="en-US" dirty="0"/>
           </a:p>
@@ -4117,31 +4200,121 @@
       </p:sp>
       <p:sp>
         <p:nvSpPr>
-          <p:cNvPr id="3" name="Sous-titre 2"/>
+          <p:cNvPr id="3" name="Espace réservé du contenu 2"/>
           <p:cNvSpPr>
             <a:spLocks noGrp="1"/>
           </p:cNvSpPr>
           <p:nvPr>
-            <p:ph type="subTitle" idx="1"/>
+            <p:ph idx="1"/>
           </p:nvPr>
         </p:nvSpPr>
         <p:spPr/>
         <p:txBody>
-          <a:bodyPr/>
+          <a:bodyPr>
+            <a:normAutofit/>
+          </a:bodyPr>
           <a:lstStyle/>
           <a:p>
             <a:r>
               <a:rPr lang="en-US" dirty="0" smtClean="0"/>
-              <a:t>MDL4UI from scratch</a:t>
+              <a:t>Available on </a:t>
+            </a:r>
+            <a:r>
+              <a:rPr lang="en-US" dirty="0" err="1" smtClean="0"/>
+              <a:t>github</a:t>
+            </a:r>
+            <a:endParaRPr lang="en-US" dirty="0" smtClean="0"/>
+          </a:p>
+          <a:p>
+            <a:pPr lvl="1"/>
+            <a:r>
+              <a:rPr lang="en-US" dirty="0" smtClean="0">
+                <a:hlinkClick r:id="rId2"/>
+              </a:rPr>
+              <a:t>http://github.com/lesfurets/mdl4ui</a:t>
+            </a:r>
+            <a:endParaRPr lang="en-US" dirty="0" smtClean="0"/>
+          </a:p>
+          <a:p>
+            <a:r>
+              <a:rPr lang="en-US" dirty="0" smtClean="0"/>
+              <a:t>Full framework and example</a:t>
+            </a:r>
+          </a:p>
+          <a:p>
+            <a:r>
+              <a:rPr lang="en-US" dirty="0" smtClean="0"/>
+              <a:t>Based on GWT and Twitter bootstrap</a:t>
+            </a:r>
+          </a:p>
+          <a:p>
+            <a:r>
+              <a:rPr lang="en-US" dirty="0" smtClean="0"/>
+              <a:t>Ready to fork and play</a:t>
+            </a:r>
+          </a:p>
+          <a:p>
+            <a:r>
+              <a:rPr lang="en-US" dirty="0" smtClean="0"/>
+              <a:t>Requires Java 6+ and Maven</a:t>
             </a:r>
             <a:endParaRPr lang="en-US" dirty="0"/>
+          </a:p>
+          <a:p>
+            <a:r>
+              <a:rPr lang="en-US" dirty="0"/>
+              <a:t>5</a:t>
+            </a:r>
+            <a:r>
+              <a:rPr lang="en-US" dirty="0" smtClean="0"/>
+              <a:t>0 sec to build and run from scratch</a:t>
+            </a:r>
+          </a:p>
+        </p:txBody>
+      </p:sp>
+      <p:sp>
+        <p:nvSpPr>
+          <p:cNvPr id="4" name="Rectangle 3"/>
+          <p:cNvSpPr/>
+          <p:nvPr/>
+        </p:nvSpPr>
+        <p:spPr>
+          <a:xfrm>
+            <a:off x="2109947" y="5867400"/>
+            <a:ext cx="4924105" cy="584775"/>
+          </a:xfrm>
+          <a:prstGeom prst="rect">
+            <a:avLst/>
+          </a:prstGeom>
+          <a:ln w="57150">
+            <a:solidFill>
+              <a:srgbClr val="C00000"/>
+            </a:solidFill>
+          </a:ln>
+        </p:spPr>
+        <p:txBody>
+          <a:bodyPr wrap="none">
+            <a:spAutoFit/>
+          </a:bodyPr>
+          <a:lstStyle/>
+          <a:p>
+            <a:pPr algn="ctr"/>
+            <a:r>
+              <a:rPr lang="en-US" sz="3200" b="1" dirty="0"/>
+              <a:t>WE ACCEPT PULL </a:t>
+            </a:r>
+            <a:r>
+              <a:rPr lang="en-US" sz="3200" b="1" dirty="0" smtClean="0"/>
+              <a:t>REQUESTS</a:t>
+            </a:r>
+            <a:endParaRPr lang="en-US" sz="3200" b="1" dirty="0"/>
           </a:p>
         </p:txBody>
       </p:sp>
     </p:spTree>
     <p:extLst>
       <p:ext uri="{BB962C8B-B14F-4D97-AF65-F5344CB8AC3E}">
-        <p14:creationId xmlns="" xmlns:p14="http://schemas.microsoft.com/office/powerpoint/2010/main" val="3139881919"/>
+        <p14:creationId xmlns:p14="http://schemas.microsoft.com/office/powerpoint/2010/main" xmlns="" val="3644490438"/>
       </p:ext>
     </p:extLst>
   </p:cSld>
@@ -4543,7 +4716,7 @@
     </p:spTree>
     <p:extLst>
       <p:ext uri="{BB962C8B-B14F-4D97-AF65-F5344CB8AC3E}">
-        <p14:creationId xmlns="" xmlns:p14="http://schemas.microsoft.com/office/powerpoint/2010/main" val="1728169033"/>
+        <p14:creationId xmlns:p14="http://schemas.microsoft.com/office/powerpoint/2010/main" xmlns="" val="1728169033"/>
       </p:ext>
     </p:extLst>
   </p:cSld>
@@ -4594,13 +4767,22 @@
           </a:xfrm>
         </p:spPr>
         <p:txBody>
-          <a:bodyPr/>
+          <a:bodyPr>
+            <a:normAutofit fontScale="90000"/>
+          </a:bodyPr>
           <a:lstStyle/>
           <a:p>
             <a:r>
-              <a:rPr lang="en-US" dirty="0" smtClean="0"/>
-              <a:t>Model</a:t>
-            </a:r>
+              <a:rPr lang="en-US" sz="4900" dirty="0" smtClean="0"/>
+              <a:t>Modeling approach</a:t>
+            </a:r>
+            <a:r>
+              <a:rPr lang="en-US" dirty="0" smtClean="0"/>
+              <a:t/>
+            </a:r>
+            <a:br>
+              <a:rPr lang="en-US" dirty="0" smtClean="0"/>
+            </a:br>
             <a:endParaRPr lang="en-US" dirty="0"/>
           </a:p>
         </p:txBody>
@@ -4613,7 +4795,7 @@
         </p:nvSpPr>
         <p:spPr>
           <a:xfrm>
-            <a:off x="2133600" y="3523129"/>
+            <a:off x="1600200" y="3200400"/>
             <a:ext cx="914400" cy="914400"/>
           </a:xfrm>
           <a:prstGeom prst="corner">
@@ -4656,7 +4838,7 @@
         </p:nvSpPr>
         <p:spPr>
           <a:xfrm rot="10800000">
-            <a:off x="6019800" y="2608729"/>
+            <a:off x="6705600" y="2286000"/>
             <a:ext cx="914400" cy="914400"/>
           </a:xfrm>
           <a:prstGeom prst="corner">
@@ -4694,7 +4876,7 @@
     </p:spTree>
     <p:extLst>
       <p:ext uri="{BB962C8B-B14F-4D97-AF65-F5344CB8AC3E}">
-        <p14:creationId xmlns="" xmlns:p14="http://schemas.microsoft.com/office/powerpoint/2010/main" val="3774437115"/>
+        <p14:creationId xmlns:p14="http://schemas.microsoft.com/office/powerpoint/2010/main" xmlns="" val="3774437115"/>
       </p:ext>
     </p:extLst>
   </p:cSld>
@@ -4777,7 +4959,7 @@
             <a:blip r:embed="rId2" cstate="print">
               <a:extLst>
                 <a:ext uri="{28A0092B-C50C-407E-A947-70E740481C1C}">
-                  <a14:useLocalDpi xmlns="" xmlns:a14="http://schemas.microsoft.com/office/drawing/2010/main" val="0"/>
+                  <a14:useLocalDpi xmlns:a14="http://schemas.microsoft.com/office/drawing/2010/main" xmlns="" val="0"/>
                 </a:ext>
               </a:extLst>
             </a:blip>
@@ -4807,7 +4989,7 @@
             <a:blip r:embed="rId3" cstate="print">
               <a:extLst>
                 <a:ext uri="{28A0092B-C50C-407E-A947-70E740481C1C}">
-                  <a14:useLocalDpi xmlns="" xmlns:a14="http://schemas.microsoft.com/office/drawing/2010/main" val="0"/>
+                  <a14:useLocalDpi xmlns:a14="http://schemas.microsoft.com/office/drawing/2010/main" xmlns="" val="0"/>
                 </a:ext>
               </a:extLst>
             </a:blip>
@@ -4837,7 +5019,7 @@
             <a:blip r:embed="rId4" cstate="print">
               <a:extLst>
                 <a:ext uri="{28A0092B-C50C-407E-A947-70E740481C1C}">
-                  <a14:useLocalDpi xmlns="" xmlns:a14="http://schemas.microsoft.com/office/drawing/2010/main" val="0"/>
+                  <a14:useLocalDpi xmlns:a14="http://schemas.microsoft.com/office/drawing/2010/main" xmlns="" val="0"/>
                 </a:ext>
               </a:extLst>
             </a:blip>
@@ -4960,7 +5142,7 @@
     </p:spTree>
     <p:extLst>
       <p:ext uri="{BB962C8B-B14F-4D97-AF65-F5344CB8AC3E}">
-        <p14:creationId xmlns="" xmlns:p14="http://schemas.microsoft.com/office/powerpoint/2010/main" val="1377264780"/>
+        <p14:creationId xmlns:p14="http://schemas.microsoft.com/office/powerpoint/2010/main" xmlns="" val="1377264780"/>
       </p:ext>
     </p:extLst>
   </p:cSld>
@@ -5158,7 +5340,7 @@
           <a:blip r:embed="rId2" cstate="print">
             <a:extLst>
               <a:ext uri="{28A0092B-C50C-407E-A947-70E740481C1C}">
-                <a14:useLocalDpi xmlns="" xmlns:a14="http://schemas.microsoft.com/office/drawing/2010/main" val="0"/>
+                <a14:useLocalDpi xmlns:a14="http://schemas.microsoft.com/office/drawing/2010/main" xmlns="" val="0"/>
               </a:ext>
             </a:extLst>
           </a:blip>
@@ -5188,7 +5370,7 @@
           <a:blip r:embed="rId3" cstate="print">
             <a:extLst>
               <a:ext uri="{28A0092B-C50C-407E-A947-70E740481C1C}">
-                <a14:useLocalDpi xmlns="" xmlns:a14="http://schemas.microsoft.com/office/drawing/2010/main" val="0"/>
+                <a14:useLocalDpi xmlns:a14="http://schemas.microsoft.com/office/drawing/2010/main" xmlns="" val="0"/>
               </a:ext>
             </a:extLst>
           </a:blip>
@@ -5314,7 +5496,7 @@
           <a:blip r:embed="rId4" cstate="print">
             <a:extLst>
               <a:ext uri="{28A0092B-C50C-407E-A947-70E740481C1C}">
-                <a14:useLocalDpi xmlns="" xmlns:a14="http://schemas.microsoft.com/office/drawing/2010/main" val="0"/>
+                <a14:useLocalDpi xmlns:a14="http://schemas.microsoft.com/office/drawing/2010/main" xmlns="" val="0"/>
               </a:ext>
             </a:extLst>
           </a:blip>
@@ -5427,7 +5609,7 @@
     </p:spTree>
     <p:extLst>
       <p:ext uri="{BB962C8B-B14F-4D97-AF65-F5344CB8AC3E}">
-        <p14:creationId xmlns="" xmlns:p14="http://schemas.microsoft.com/office/powerpoint/2010/main" val="3336203041"/>
+        <p14:creationId xmlns:p14="http://schemas.microsoft.com/office/powerpoint/2010/main" xmlns="" val="3336203041"/>
       </p:ext>
     </p:extLst>
   </p:cSld>
@@ -5845,7 +6027,7 @@
           <a:blip r:embed="rId2" cstate="print">
             <a:extLst>
               <a:ext uri="{28A0092B-C50C-407E-A947-70E740481C1C}">
-                <a14:useLocalDpi xmlns="" xmlns:a14="http://schemas.microsoft.com/office/drawing/2010/main" val="0"/>
+                <a14:useLocalDpi xmlns:a14="http://schemas.microsoft.com/office/drawing/2010/main" xmlns="" val="0"/>
               </a:ext>
             </a:extLst>
           </a:blip>
@@ -5875,7 +6057,7 @@
           <a:blip r:embed="rId3" cstate="print">
             <a:extLst>
               <a:ext uri="{28A0092B-C50C-407E-A947-70E740481C1C}">
-                <a14:useLocalDpi xmlns="" xmlns:a14="http://schemas.microsoft.com/office/drawing/2010/main" val="0"/>
+                <a14:useLocalDpi xmlns:a14="http://schemas.microsoft.com/office/drawing/2010/main" xmlns="" val="0"/>
               </a:ext>
             </a:extLst>
           </a:blip>
@@ -5905,7 +6087,7 @@
           <a:blip r:embed="rId4" cstate="print">
             <a:extLst>
               <a:ext uri="{28A0092B-C50C-407E-A947-70E740481C1C}">
-                <a14:useLocalDpi xmlns="" xmlns:a14="http://schemas.microsoft.com/office/drawing/2010/main" val="0"/>
+                <a14:useLocalDpi xmlns:a14="http://schemas.microsoft.com/office/drawing/2010/main" xmlns="" val="0"/>
               </a:ext>
             </a:extLst>
           </a:blip>
@@ -6018,7 +6200,7 @@
     </p:spTree>
     <p:extLst>
       <p:ext uri="{BB962C8B-B14F-4D97-AF65-F5344CB8AC3E}">
-        <p14:creationId xmlns="" xmlns:p14="http://schemas.microsoft.com/office/powerpoint/2010/main" val="864210357"/>
+        <p14:creationId xmlns:p14="http://schemas.microsoft.com/office/powerpoint/2010/main" xmlns="" val="864210357"/>
       </p:ext>
     </p:extLst>
   </p:cSld>
@@ -6292,7 +6474,7 @@
           <a:blip r:embed="rId2" cstate="print">
             <a:extLst>
               <a:ext uri="{28A0092B-C50C-407E-A947-70E740481C1C}">
-                <a14:useLocalDpi xmlns="" xmlns:a14="http://schemas.microsoft.com/office/drawing/2010/main" val="0"/>
+                <a14:useLocalDpi xmlns:a14="http://schemas.microsoft.com/office/drawing/2010/main" xmlns="" val="0"/>
               </a:ext>
             </a:extLst>
           </a:blip>
@@ -6322,7 +6504,7 @@
           <a:blip r:embed="rId3" cstate="print">
             <a:extLst>
               <a:ext uri="{28A0092B-C50C-407E-A947-70E740481C1C}">
-                <a14:useLocalDpi xmlns="" xmlns:a14="http://schemas.microsoft.com/office/drawing/2010/main" val="0"/>
+                <a14:useLocalDpi xmlns:a14="http://schemas.microsoft.com/office/drawing/2010/main" xmlns="" val="0"/>
               </a:ext>
             </a:extLst>
           </a:blip>
@@ -6559,7 +6741,7 @@
           <a:blip r:embed="rId4" cstate="print">
             <a:extLst>
               <a:ext uri="{28A0092B-C50C-407E-A947-70E740481C1C}">
-                <a14:useLocalDpi xmlns="" xmlns:a14="http://schemas.microsoft.com/office/drawing/2010/main" val="0"/>
+                <a14:useLocalDpi xmlns:a14="http://schemas.microsoft.com/office/drawing/2010/main" xmlns="" val="0"/>
               </a:ext>
             </a:extLst>
           </a:blip>
@@ -7038,7 +7220,7 @@
     </p:spTree>
     <p:extLst>
       <p:ext uri="{BB962C8B-B14F-4D97-AF65-F5344CB8AC3E}">
-        <p14:creationId xmlns="" xmlns:p14="http://schemas.microsoft.com/office/powerpoint/2010/main" val="3336203041"/>
+        <p14:creationId xmlns:p14="http://schemas.microsoft.com/office/powerpoint/2010/main" xmlns="" val="3336203041"/>
       </p:ext>
     </p:extLst>
   </p:cSld>
@@ -7268,7 +7450,7 @@
           <a:blip r:embed="rId2" cstate="print">
             <a:extLst>
               <a:ext uri="{28A0092B-C50C-407E-A947-70E740481C1C}">
-                <a14:useLocalDpi xmlns="" xmlns:a14="http://schemas.microsoft.com/office/drawing/2010/main" val="0"/>
+                <a14:useLocalDpi xmlns:a14="http://schemas.microsoft.com/office/drawing/2010/main" xmlns="" val="0"/>
               </a:ext>
             </a:extLst>
           </a:blip>
@@ -7298,7 +7480,7 @@
           <a:blip r:embed="rId3" cstate="print">
             <a:extLst>
               <a:ext uri="{28A0092B-C50C-407E-A947-70E740481C1C}">
-                <a14:useLocalDpi xmlns="" xmlns:a14="http://schemas.microsoft.com/office/drawing/2010/main" val="0"/>
+                <a14:useLocalDpi xmlns:a14="http://schemas.microsoft.com/office/drawing/2010/main" xmlns="" val="0"/>
               </a:ext>
             </a:extLst>
           </a:blip>
@@ -7615,7 +7797,7 @@
     </p:spTree>
     <p:extLst>
       <p:ext uri="{BB962C8B-B14F-4D97-AF65-F5344CB8AC3E}">
-        <p14:creationId xmlns="" xmlns:p14="http://schemas.microsoft.com/office/powerpoint/2010/main" val="2819423520"/>
+        <p14:creationId xmlns:p14="http://schemas.microsoft.com/office/powerpoint/2010/main" xmlns="" val="2819423520"/>
       </p:ext>
     </p:extLst>
   </p:cSld>
@@ -8123,7 +8305,7 @@
     </p:spTree>
     <p:extLst>
       <p:ext uri="{BB962C8B-B14F-4D97-AF65-F5344CB8AC3E}">
-        <p14:creationId xmlns="" xmlns:p14="http://schemas.microsoft.com/office/powerpoint/2010/main" val="3627640579"/>
+        <p14:creationId xmlns:p14="http://schemas.microsoft.com/office/powerpoint/2010/main" xmlns="" val="3627640579"/>
       </p:ext>
     </p:extLst>
   </p:cSld>
@@ -8261,7 +8443,7 @@
           <a:blip r:embed="rId2" cstate="print">
             <a:extLst>
               <a:ext uri="{28A0092B-C50C-407E-A947-70E740481C1C}">
-                <a14:useLocalDpi xmlns="" xmlns:a14="http://schemas.microsoft.com/office/drawing/2010/main" val="0"/>
+                <a14:useLocalDpi xmlns:a14="http://schemas.microsoft.com/office/drawing/2010/main" xmlns="" val="0"/>
               </a:ext>
             </a:extLst>
           </a:blip>
@@ -8337,7 +8519,7 @@
     </p:spTree>
     <p:extLst>
       <p:ext uri="{BB962C8B-B14F-4D97-AF65-F5344CB8AC3E}">
-        <p14:creationId xmlns="" xmlns:p14="http://schemas.microsoft.com/office/powerpoint/2010/main" val="171061288"/>
+        <p14:creationId xmlns:p14="http://schemas.microsoft.com/office/powerpoint/2010/main" xmlns="" val="171061288"/>
       </p:ext>
     </p:extLst>
   </p:cSld>
@@ -8607,7 +8789,7 @@
           <a:blip r:embed="rId2" cstate="print">
             <a:extLst>
               <a:ext uri="{28A0092B-C50C-407E-A947-70E740481C1C}">
-                <a14:useLocalDpi xmlns="" xmlns:a14="http://schemas.microsoft.com/office/drawing/2010/main"/>
+                <a14:useLocalDpi xmlns:a14="http://schemas.microsoft.com/office/drawing/2010/main" xmlns=""/>
               </a:ext>
             </a:extLst>
           </a:blip>
@@ -8632,7 +8814,7 @@
     </p:spTree>
     <p:extLst>
       <p:ext uri="{BB962C8B-B14F-4D97-AF65-F5344CB8AC3E}">
-        <p14:creationId xmlns="" xmlns:p14="http://schemas.microsoft.com/office/powerpoint/2010/main" val="1630604182"/>
+        <p14:creationId xmlns:p14="http://schemas.microsoft.com/office/powerpoint/2010/main" xmlns="" val="1630604182"/>
       </p:ext>
     </p:extLst>
   </p:cSld>
@@ -8678,7 +8860,7 @@
           <a:blip r:embed="rId2" cstate="print">
             <a:extLst>
               <a:ext uri="{28A0092B-C50C-407E-A947-70E740481C1C}">
-                <a14:useLocalDpi xmlns="" xmlns:a14="http://schemas.microsoft.com/office/drawing/2010/main" val="0"/>
+                <a14:useLocalDpi xmlns:a14="http://schemas.microsoft.com/office/drawing/2010/main" xmlns="" val="0"/>
               </a:ext>
             </a:extLst>
           </a:blip>
@@ -8913,7 +9095,7 @@
     </p:spTree>
     <p:extLst>
       <p:ext uri="{BB962C8B-B14F-4D97-AF65-F5344CB8AC3E}">
-        <p14:creationId xmlns="" xmlns:p14="http://schemas.microsoft.com/office/powerpoint/2010/main" val="394514968"/>
+        <p14:creationId xmlns:p14="http://schemas.microsoft.com/office/powerpoint/2010/main" xmlns="" val="394514968"/>
       </p:ext>
     </p:extLst>
   </p:cSld>
@@ -9047,7 +9229,7 @@
           <a:blip r:embed="rId2" cstate="print">
             <a:extLst>
               <a:ext uri="{28A0092B-C50C-407E-A947-70E740481C1C}">
-                <a14:useLocalDpi xmlns="" xmlns:a14="http://schemas.microsoft.com/office/drawing/2010/main" val="0"/>
+                <a14:useLocalDpi xmlns:a14="http://schemas.microsoft.com/office/drawing/2010/main" xmlns="" val="0"/>
               </a:ext>
             </a:extLst>
           </a:blip>
@@ -9128,7 +9310,7 @@
     </p:spTree>
     <p:extLst>
       <p:ext uri="{BB962C8B-B14F-4D97-AF65-F5344CB8AC3E}">
-        <p14:creationId xmlns="" xmlns:p14="http://schemas.microsoft.com/office/powerpoint/2010/main" val="3593113261"/>
+        <p14:creationId xmlns:p14="http://schemas.microsoft.com/office/powerpoint/2010/main" xmlns="" val="3593113261"/>
       </p:ext>
     </p:extLst>
   </p:cSld>
@@ -9286,7 +9468,7 @@
           <a:blip r:embed="rId2" cstate="print">
             <a:extLst>
               <a:ext uri="{28A0092B-C50C-407E-A947-70E740481C1C}">
-                <a14:useLocalDpi xmlns="" xmlns:a14="http://schemas.microsoft.com/office/drawing/2010/main" val="0"/>
+                <a14:useLocalDpi xmlns:a14="http://schemas.microsoft.com/office/drawing/2010/main" xmlns="" val="0"/>
               </a:ext>
             </a:extLst>
           </a:blip>
@@ -9362,7 +9544,7 @@
     </p:spTree>
     <p:extLst>
       <p:ext uri="{BB962C8B-B14F-4D97-AF65-F5344CB8AC3E}">
-        <p14:creationId xmlns="" xmlns:p14="http://schemas.microsoft.com/office/powerpoint/2010/main" val="451913240"/>
+        <p14:creationId xmlns:p14="http://schemas.microsoft.com/office/powerpoint/2010/main" xmlns="" val="451913240"/>
       </p:ext>
     </p:extLst>
   </p:cSld>
@@ -9431,7 +9613,7 @@
           <a:blip r:embed="rId2" cstate="print">
             <a:extLst>
               <a:ext uri="{28A0092B-C50C-407E-A947-70E740481C1C}">
-                <a14:useLocalDpi xmlns="" xmlns:a14="http://schemas.microsoft.com/office/drawing/2010/main" val="0"/>
+                <a14:useLocalDpi xmlns:a14="http://schemas.microsoft.com/office/drawing/2010/main" xmlns="" val="0"/>
               </a:ext>
             </a:extLst>
           </a:blip>
@@ -9628,7 +9810,7 @@
     </p:spTree>
     <p:extLst>
       <p:ext uri="{BB962C8B-B14F-4D97-AF65-F5344CB8AC3E}">
-        <p14:creationId xmlns="" xmlns:p14="http://schemas.microsoft.com/office/powerpoint/2010/main" val="2009636028"/>
+        <p14:creationId xmlns:p14="http://schemas.microsoft.com/office/powerpoint/2010/main" xmlns="" val="2009636028"/>
       </p:ext>
     </p:extLst>
   </p:cSld>
@@ -9697,7 +9879,7 @@
           <a:blip r:embed="rId2" cstate="print">
             <a:extLst>
               <a:ext uri="{28A0092B-C50C-407E-A947-70E740481C1C}">
-                <a14:useLocalDpi xmlns="" xmlns:a14="http://schemas.microsoft.com/office/drawing/2010/main" val="0"/>
+                <a14:useLocalDpi xmlns:a14="http://schemas.microsoft.com/office/drawing/2010/main" xmlns="" val="0"/>
               </a:ext>
             </a:extLst>
           </a:blip>
@@ -9894,7 +10076,7 @@
     </p:spTree>
     <p:extLst>
       <p:ext uri="{BB962C8B-B14F-4D97-AF65-F5344CB8AC3E}">
-        <p14:creationId xmlns="" xmlns:p14="http://schemas.microsoft.com/office/powerpoint/2010/main" val="1131833659"/>
+        <p14:creationId xmlns:p14="http://schemas.microsoft.com/office/powerpoint/2010/main" xmlns="" val="1131833659"/>
       </p:ext>
     </p:extLst>
   </p:cSld>
@@ -9950,7 +10132,7 @@
           <a:p>
             <a:r>
               <a:rPr lang="en-US" dirty="0" smtClean="0"/>
-              <a:t>Dependencies</a:t>
+              <a:t>Dependency Model</a:t>
             </a:r>
             <a:endParaRPr lang="en-US" dirty="0"/>
           </a:p>
@@ -9964,7 +10146,7 @@
         </p:nvSpPr>
         <p:spPr>
           <a:xfrm>
-            <a:off x="2133600" y="3523129"/>
+            <a:off x="1600200" y="3523129"/>
             <a:ext cx="914400" cy="914400"/>
           </a:xfrm>
           <a:prstGeom prst="corner">
@@ -10007,7 +10189,7 @@
         </p:nvSpPr>
         <p:spPr>
           <a:xfrm rot="10800000">
-            <a:off x="6019800" y="2608729"/>
+            <a:off x="6705600" y="2608729"/>
             <a:ext cx="914400" cy="914400"/>
           </a:xfrm>
           <a:prstGeom prst="corner">
@@ -10045,7 +10227,7 @@
     </p:spTree>
     <p:extLst>
       <p:ext uri="{BB962C8B-B14F-4D97-AF65-F5344CB8AC3E}">
-        <p14:creationId xmlns="" xmlns:p14="http://schemas.microsoft.com/office/powerpoint/2010/main" val="3774437115"/>
+        <p14:creationId xmlns:p14="http://schemas.microsoft.com/office/powerpoint/2010/main" xmlns="" val="3774437115"/>
       </p:ext>
     </p:extLst>
   </p:cSld>
@@ -10114,7 +10296,7 @@
           <a:blip r:embed="rId2" cstate="print">
             <a:extLst>
               <a:ext uri="{28A0092B-C50C-407E-A947-70E740481C1C}">
-                <a14:useLocalDpi xmlns="" xmlns:a14="http://schemas.microsoft.com/office/drawing/2010/main" val="0"/>
+                <a14:useLocalDpi xmlns:a14="http://schemas.microsoft.com/office/drawing/2010/main" xmlns="" val="0"/>
               </a:ext>
             </a:extLst>
           </a:blip>
@@ -10135,7 +10317,7 @@
     </p:spTree>
     <p:extLst>
       <p:ext uri="{BB962C8B-B14F-4D97-AF65-F5344CB8AC3E}">
-        <p14:creationId xmlns="" xmlns:p14="http://schemas.microsoft.com/office/powerpoint/2010/main" val="1848404178"/>
+        <p14:creationId xmlns:p14="http://schemas.microsoft.com/office/powerpoint/2010/main" xmlns="" val="1848404178"/>
       </p:ext>
     </p:extLst>
   </p:cSld>
@@ -10319,7 +10501,7 @@
     </p:spTree>
     <p:extLst>
       <p:ext uri="{BB962C8B-B14F-4D97-AF65-F5344CB8AC3E}">
-        <p14:creationId xmlns="" xmlns:p14="http://schemas.microsoft.com/office/powerpoint/2010/main" val="1155854373"/>
+        <p14:creationId xmlns:p14="http://schemas.microsoft.com/office/powerpoint/2010/main" xmlns="" val="1155854373"/>
       </p:ext>
     </p:extLst>
   </p:cSld>
@@ -10492,7 +10674,7 @@
     </p:spTree>
     <p:extLst>
       <p:ext uri="{BB962C8B-B14F-4D97-AF65-F5344CB8AC3E}">
-        <p14:creationId xmlns="" xmlns:p14="http://schemas.microsoft.com/office/powerpoint/2010/main" val="1027356186"/>
+        <p14:creationId xmlns:p14="http://schemas.microsoft.com/office/powerpoint/2010/main" xmlns="" val="1027356186"/>
       </p:ext>
     </p:extLst>
   </p:cSld>
@@ -10561,7 +10743,7 @@
           <a:blip r:embed="rId2" cstate="print">
             <a:extLst>
               <a:ext uri="{28A0092B-C50C-407E-A947-70E740481C1C}">
-                <a14:useLocalDpi xmlns="" xmlns:a14="http://schemas.microsoft.com/office/drawing/2010/main" val="0"/>
+                <a14:useLocalDpi xmlns:a14="http://schemas.microsoft.com/office/drawing/2010/main" xmlns="" val="0"/>
               </a:ext>
             </a:extLst>
           </a:blip>
@@ -10591,7 +10773,7 @@
           <a:blip r:embed="rId3" cstate="print">
             <a:extLst>
               <a:ext uri="{28A0092B-C50C-407E-A947-70E740481C1C}">
-                <a14:useLocalDpi xmlns="" xmlns:a14="http://schemas.microsoft.com/office/drawing/2010/main" val="0"/>
+                <a14:useLocalDpi xmlns:a14="http://schemas.microsoft.com/office/drawing/2010/main" xmlns="" val="0"/>
               </a:ext>
             </a:extLst>
           </a:blip>
@@ -10615,7 +10797,7 @@
     </p:spTree>
     <p:extLst>
       <p:ext uri="{BB962C8B-B14F-4D97-AF65-F5344CB8AC3E}">
-        <p14:creationId xmlns="" xmlns:p14="http://schemas.microsoft.com/office/powerpoint/2010/main" val="2369171751"/>
+        <p14:creationId xmlns:p14="http://schemas.microsoft.com/office/powerpoint/2010/main" xmlns="" val="2369171751"/>
       </p:ext>
     </p:extLst>
   </p:cSld>
@@ -10665,10 +10847,10 @@
           <a:lstStyle/>
           <a:p>
             <a:r>
-              <a:rPr lang="en-US" dirty="0" smtClean="0"/>
-              <a:t>Context at LesFurets.com</a:t>
-            </a:r>
-            <a:endParaRPr lang="en-US" dirty="0"/>
+              <a:rPr lang="fr-FR" dirty="0" smtClean="0"/>
+              <a:t>Agenda</a:t>
+            </a:r>
+            <a:endParaRPr lang="fr-FR" dirty="0"/>
           </a:p>
         </p:txBody>
       </p:sp>
@@ -10679,106 +10861,178 @@
             <a:spLocks noGrp="1"/>
           </p:cNvSpPr>
           <p:nvPr>
-            <p:ph idx="1"/>
+            <p:ph sz="half" idx="1"/>
           </p:nvPr>
         </p:nvSpPr>
-        <p:spPr/>
-        <p:txBody>
-          <a:bodyPr/>
+        <p:spPr>
+          <a:xfrm>
+            <a:off x="457200" y="1600200"/>
+            <a:ext cx="8229600" cy="4876800"/>
+          </a:xfrm>
+        </p:spPr>
+        <p:txBody>
+          <a:bodyPr anchor="ctr">
+            <a:noAutofit/>
+          </a:bodyPr>
           <a:lstStyle/>
           <a:p>
-            <a:r>
-              <a:rPr lang="en-US" dirty="0" smtClean="0"/>
-              <a:t>5 questions sets for a insurance aggregator</a:t>
-            </a:r>
-          </a:p>
-          <a:p>
-            <a:pPr lvl="1">
-              <a:buFont typeface="Wingdings" pitchFamily="2" charset="2"/>
-              <a:buChar char="§"/>
+            <a:pPr algn="ctr">
+              <a:buNone/>
             </a:pPr>
             <a:r>
-              <a:rPr lang="en-US" dirty="0" smtClean="0"/>
-              <a:t>Car form (160 questions)</a:t>
-            </a:r>
-          </a:p>
-          <a:p>
-            <a:pPr lvl="1"/>
-            <a:r>
-              <a:rPr lang="en-US" dirty="0" smtClean="0"/>
-              <a:t>Motorbike </a:t>
-            </a:r>
-            <a:r>
-              <a:rPr lang="en-US" dirty="0"/>
-              <a:t>form </a:t>
-            </a:r>
-            <a:r>
-              <a:rPr lang="en-US" dirty="0" smtClean="0"/>
-              <a:t>(180 questions)</a:t>
-            </a:r>
-          </a:p>
-          <a:p>
-            <a:pPr lvl="1"/>
-            <a:r>
-              <a:rPr lang="en-US" dirty="0" smtClean="0"/>
-              <a:t>Health </a:t>
-            </a:r>
-            <a:r>
-              <a:rPr lang="en-US" dirty="0"/>
-              <a:t>form </a:t>
-            </a:r>
-            <a:r>
-              <a:rPr lang="en-US" dirty="0" smtClean="0"/>
-              <a:t>(50 questions)</a:t>
-            </a:r>
-          </a:p>
-          <a:p>
-            <a:pPr lvl="1"/>
-            <a:r>
-              <a:rPr lang="en-US" dirty="0" smtClean="0"/>
-              <a:t>Home </a:t>
-            </a:r>
-            <a:r>
-              <a:rPr lang="en-US" dirty="0"/>
-              <a:t>form </a:t>
-            </a:r>
-            <a:r>
-              <a:rPr lang="en-US" dirty="0" smtClean="0"/>
-              <a:t>(70 questions)</a:t>
-            </a:r>
-          </a:p>
-          <a:p>
-            <a:pPr lvl="1"/>
-            <a:r>
-              <a:rPr lang="en-US" dirty="0" smtClean="0"/>
-              <a:t>Loan </a:t>
-            </a:r>
-            <a:r>
-              <a:rPr lang="en-US" dirty="0"/>
-              <a:t>form </a:t>
-            </a:r>
-            <a:r>
-              <a:rPr lang="en-US" dirty="0" smtClean="0"/>
-              <a:t>(40 questions)</a:t>
-            </a:r>
-          </a:p>
-          <a:p>
-            <a:r>
-              <a:rPr lang="en-US" dirty="0" smtClean="0"/>
-              <a:t>A lot of questions with business rules that are linked by dependencies and business rules</a:t>
-            </a:r>
-          </a:p>
-          <a:p>
-            <a:endParaRPr lang="en-US" dirty="0"/>
+              <a:rPr lang="en-US" sz="3200" dirty="0" smtClean="0"/>
+              <a:t>Context</a:t>
+            </a:r>
+          </a:p>
+          <a:p>
+            <a:pPr algn="ctr">
+              <a:buNone/>
+            </a:pPr>
+            <a:r>
+              <a:rPr lang="en-US" sz="3200" dirty="0" smtClean="0"/>
+              <a:t>Modeling approach</a:t>
+            </a:r>
+          </a:p>
+          <a:p>
+            <a:pPr algn="ctr">
+              <a:buNone/>
+            </a:pPr>
+            <a:r>
+              <a:rPr lang="en-US" sz="3200" dirty="0" smtClean="0"/>
+              <a:t>Dependency Model</a:t>
+            </a:r>
+          </a:p>
+          <a:p>
+            <a:pPr algn="ctr">
+              <a:buNone/>
+            </a:pPr>
+            <a:r>
+              <a:rPr lang="en-US" sz="3200" dirty="0" smtClean="0"/>
+              <a:t>Field features</a:t>
+            </a:r>
+          </a:p>
+          <a:p>
+            <a:pPr algn="ctr">
+              <a:buNone/>
+            </a:pPr>
+            <a:r>
+              <a:rPr lang="en-US" sz="3200" dirty="0" smtClean="0"/>
+              <a:t>Extensions</a:t>
+            </a:r>
+            <a:endParaRPr lang="en-US" sz="3200" dirty="0" smtClean="0"/>
+          </a:p>
+          <a:p>
+            <a:pPr algn="ctr">
+              <a:buNone/>
+            </a:pPr>
+            <a:r>
+              <a:rPr lang="en-US" sz="3200" dirty="0" smtClean="0"/>
+              <a:t>Live coding demo</a:t>
+            </a:r>
+          </a:p>
+          <a:p>
+            <a:pPr algn="ctr">
+              <a:buNone/>
+            </a:pPr>
+            <a:r>
+              <a:rPr lang="en-US" sz="3200" dirty="0" smtClean="0">
+                <a:latin typeface="+mj-lt"/>
+              </a:rPr>
+              <a:t>Back to LesFurets.com</a:t>
+            </a:r>
+            <a:endParaRPr lang="en-US" sz="3200" dirty="0">
+              <a:latin typeface="+mj-lt"/>
+            </a:endParaRPr>
+          </a:p>
+        </p:txBody>
+      </p:sp>
+      <p:sp>
+        <p:nvSpPr>
+          <p:cNvPr id="6" name="Forme en L 5"/>
+          <p:cNvSpPr/>
+          <p:nvPr/>
+        </p:nvSpPr>
+        <p:spPr>
+          <a:xfrm>
+            <a:off x="1905000" y="5791200"/>
+            <a:ext cx="914400" cy="914400"/>
+          </a:xfrm>
+          <a:prstGeom prst="corner">
+            <a:avLst/>
+          </a:prstGeom>
+          <a:ln>
+            <a:noFill/>
+          </a:ln>
+        </p:spPr>
+        <p:style>
+          <a:lnRef idx="2">
+            <a:schemeClr val="accent1">
+              <a:shade val="50000"/>
+            </a:schemeClr>
+          </a:lnRef>
+          <a:fillRef idx="1">
+            <a:schemeClr val="accent1"/>
+          </a:fillRef>
+          <a:effectRef idx="0">
+            <a:schemeClr val="accent1"/>
+          </a:effectRef>
+          <a:fontRef idx="minor">
+            <a:schemeClr val="lt1"/>
+          </a:fontRef>
+        </p:style>
+        <p:txBody>
+          <a:bodyPr rtlCol="0" anchor="ctr"/>
+          <a:lstStyle/>
+          <a:p>
+            <a:pPr algn="ctr"/>
+            <a:endParaRPr lang="en-US"/>
+          </a:p>
+        </p:txBody>
+      </p:sp>
+      <p:sp>
+        <p:nvSpPr>
+          <p:cNvPr id="7" name="Forme en L 6"/>
+          <p:cNvSpPr/>
+          <p:nvPr/>
+        </p:nvSpPr>
+        <p:spPr>
+          <a:xfrm rot="10800000">
+            <a:off x="6324600" y="1371600"/>
+            <a:ext cx="914400" cy="914400"/>
+          </a:xfrm>
+          <a:prstGeom prst="corner">
+            <a:avLst/>
+          </a:prstGeom>
+          <a:ln>
+            <a:noFill/>
+          </a:ln>
+        </p:spPr>
+        <p:style>
+          <a:lnRef idx="2">
+            <a:schemeClr val="accent1">
+              <a:shade val="50000"/>
+            </a:schemeClr>
+          </a:lnRef>
+          <a:fillRef idx="1">
+            <a:schemeClr val="accent1"/>
+          </a:fillRef>
+          <a:effectRef idx="0">
+            <a:schemeClr val="accent1"/>
+          </a:effectRef>
+          <a:fontRef idx="minor">
+            <a:schemeClr val="lt1"/>
+          </a:fontRef>
+        </p:style>
+        <p:txBody>
+          <a:bodyPr rtlCol="0" anchor="ctr"/>
+          <a:lstStyle/>
+          <a:p>
+            <a:pPr algn="ctr"/>
+            <a:endParaRPr lang="en-US"/>
           </a:p>
         </p:txBody>
       </p:sp>
     </p:spTree>
-    <p:extLst>
-      <p:ext uri="{BB962C8B-B14F-4D97-AF65-F5344CB8AC3E}">
-        <p14:creationId xmlns="" xmlns:p14="http://schemas.microsoft.com/office/powerpoint/2010/main" val="3312784383"/>
-      </p:ext>
-    </p:extLst>
   </p:cSld>
   <p:clrMapOvr>
     <a:masterClrMapping/>
@@ -10845,7 +11099,7 @@
           <a:blip r:embed="rId2" cstate="print">
             <a:extLst>
               <a:ext uri="{28A0092B-C50C-407E-A947-70E740481C1C}">
-                <a14:useLocalDpi xmlns="" xmlns:a14="http://schemas.microsoft.com/office/drawing/2010/main" val="0"/>
+                <a14:useLocalDpi xmlns:a14="http://schemas.microsoft.com/office/drawing/2010/main" xmlns="" val="0"/>
               </a:ext>
             </a:extLst>
           </a:blip>
@@ -10875,7 +11129,7 @@
           <a:blip r:embed="rId3" cstate="print">
             <a:extLst>
               <a:ext uri="{28A0092B-C50C-407E-A947-70E740481C1C}">
-                <a14:useLocalDpi xmlns="" xmlns:a14="http://schemas.microsoft.com/office/drawing/2010/main" val="0"/>
+                <a14:useLocalDpi xmlns:a14="http://schemas.microsoft.com/office/drawing/2010/main" xmlns="" val="0"/>
               </a:ext>
             </a:extLst>
           </a:blip>
@@ -10905,7 +11159,7 @@
           <a:blip r:embed="rId4" cstate="print">
             <a:extLst>
               <a:ext uri="{28A0092B-C50C-407E-A947-70E740481C1C}">
-                <a14:useLocalDpi xmlns="" xmlns:a14="http://schemas.microsoft.com/office/drawing/2010/main" val="0"/>
+                <a14:useLocalDpi xmlns:a14="http://schemas.microsoft.com/office/drawing/2010/main" xmlns="" val="0"/>
               </a:ext>
             </a:extLst>
           </a:blip>
@@ -11021,7 +11275,7 @@
     </p:spTree>
     <p:extLst>
       <p:ext uri="{BB962C8B-B14F-4D97-AF65-F5344CB8AC3E}">
-        <p14:creationId xmlns="" xmlns:p14="http://schemas.microsoft.com/office/powerpoint/2010/main" val="3216378839"/>
+        <p14:creationId xmlns:p14="http://schemas.microsoft.com/office/powerpoint/2010/main" xmlns="" val="3216378839"/>
       </p:ext>
     </p:extLst>
   </p:cSld>
@@ -11099,7 +11353,7 @@
           <a:blip r:embed="rId2" cstate="print">
             <a:extLst>
               <a:ext uri="{28A0092B-C50C-407E-A947-70E740481C1C}">
-                <a14:useLocalDpi xmlns="" xmlns:a14="http://schemas.microsoft.com/office/drawing/2010/main" val="0"/>
+                <a14:useLocalDpi xmlns:a14="http://schemas.microsoft.com/office/drawing/2010/main" xmlns="" val="0"/>
               </a:ext>
             </a:extLst>
           </a:blip>
@@ -11208,7 +11462,7 @@
     </p:spTree>
     <p:extLst>
       <p:ext uri="{BB962C8B-B14F-4D97-AF65-F5344CB8AC3E}">
-        <p14:creationId xmlns="" xmlns:p14="http://schemas.microsoft.com/office/powerpoint/2010/main" val="2527117896"/>
+        <p14:creationId xmlns:p14="http://schemas.microsoft.com/office/powerpoint/2010/main" xmlns="" val="2527117896"/>
       </p:ext>
     </p:extLst>
   </p:cSld>
@@ -11922,7 +12176,7 @@
     </p:spTree>
     <p:extLst>
       <p:ext uri="{BB962C8B-B14F-4D97-AF65-F5344CB8AC3E}">
-        <p14:creationId xmlns="" xmlns:p14="http://schemas.microsoft.com/office/powerpoint/2010/main" val="1994743043"/>
+        <p14:creationId xmlns:p14="http://schemas.microsoft.com/office/powerpoint/2010/main" xmlns="" val="1994743043"/>
       </p:ext>
     </p:extLst>
   </p:cSld>
@@ -12108,7 +12362,7 @@
     </p:spTree>
     <p:extLst>
       <p:ext uri="{BB962C8B-B14F-4D97-AF65-F5344CB8AC3E}">
-        <p14:creationId xmlns="" xmlns:p14="http://schemas.microsoft.com/office/powerpoint/2010/main" val="3098398089"/>
+        <p14:creationId xmlns:p14="http://schemas.microsoft.com/office/powerpoint/2010/main" xmlns="" val="3098398089"/>
       </p:ext>
     </p:extLst>
   </p:cSld>
@@ -12388,7 +12642,7 @@
     </p:spTree>
     <p:extLst>
       <p:ext uri="{BB962C8B-B14F-4D97-AF65-F5344CB8AC3E}">
-        <p14:creationId xmlns="" xmlns:p14="http://schemas.microsoft.com/office/powerpoint/2010/main" val="3449390454"/>
+        <p14:creationId xmlns:p14="http://schemas.microsoft.com/office/powerpoint/2010/main" xmlns="" val="3449390454"/>
       </p:ext>
     </p:extLst>
   </p:cSld>
@@ -13078,7 +13332,7 @@
     </p:spTree>
     <p:extLst>
       <p:ext uri="{BB962C8B-B14F-4D97-AF65-F5344CB8AC3E}">
-        <p14:creationId xmlns="" xmlns:p14="http://schemas.microsoft.com/office/powerpoint/2010/main" val="4006469721"/>
+        <p14:creationId xmlns:p14="http://schemas.microsoft.com/office/powerpoint/2010/main" xmlns="" val="4006469721"/>
       </p:ext>
     </p:extLst>
   </p:cSld>
@@ -13386,7 +13640,7 @@
     </p:spTree>
     <p:extLst>
       <p:ext uri="{BB962C8B-B14F-4D97-AF65-F5344CB8AC3E}">
-        <p14:creationId xmlns="" xmlns:p14="http://schemas.microsoft.com/office/powerpoint/2010/main" val="1678422724"/>
+        <p14:creationId xmlns:p14="http://schemas.microsoft.com/office/powerpoint/2010/main" xmlns="" val="1678422724"/>
       </p:ext>
     </p:extLst>
   </p:cSld>
@@ -13999,7 +14253,7 @@
     </p:spTree>
     <p:extLst>
       <p:ext uri="{BB962C8B-B14F-4D97-AF65-F5344CB8AC3E}">
-        <p14:creationId xmlns="" xmlns:p14="http://schemas.microsoft.com/office/powerpoint/2010/main" val="2792941284"/>
+        <p14:creationId xmlns:p14="http://schemas.microsoft.com/office/powerpoint/2010/main" xmlns="" val="2792941284"/>
       </p:ext>
     </p:extLst>
   </p:cSld>
@@ -14150,7 +14404,7 @@
     </p:spTree>
     <p:extLst>
       <p:ext uri="{BB962C8B-B14F-4D97-AF65-F5344CB8AC3E}">
-        <p14:creationId xmlns="" xmlns:p14="http://schemas.microsoft.com/office/powerpoint/2010/main" val="2960012499"/>
+        <p14:creationId xmlns:p14="http://schemas.microsoft.com/office/powerpoint/2010/main" xmlns="" val="2960012499"/>
       </p:ext>
     </p:extLst>
   </p:cSld>
@@ -14330,7 +14584,7 @@
     </p:spTree>
     <p:extLst>
       <p:ext uri="{BB962C8B-B14F-4D97-AF65-F5344CB8AC3E}">
-        <p14:creationId xmlns="" xmlns:p14="http://schemas.microsoft.com/office/powerpoint/2010/main" val="3220083538"/>
+        <p14:creationId xmlns:p14="http://schemas.microsoft.com/office/powerpoint/2010/main" xmlns="" val="3220083538"/>
       </p:ext>
     </p:extLst>
   </p:cSld>
@@ -14374,208 +14628,124 @@
             <p:ph type="title"/>
           </p:nvPr>
         </p:nvSpPr>
-        <p:spPr>
-          <a:xfrm>
-            <a:off x="457200" y="0"/>
-            <a:ext cx="8382000" cy="1143000"/>
-          </a:xfrm>
-        </p:spPr>
-        <p:txBody>
-          <a:bodyPr>
-            <a:normAutofit fontScale="90000"/>
-          </a:bodyPr>
+        <p:spPr/>
+        <p:txBody>
+          <a:bodyPr/>
           <a:lstStyle/>
           <a:p>
             <a:r>
               <a:rPr lang="en-US" dirty="0" smtClean="0"/>
-              <a:t>Sample : old question set </a:t>
+              <a:t>Context at LesFurets.com</a:t>
+            </a:r>
+            <a:endParaRPr lang="en-US" dirty="0"/>
+          </a:p>
+        </p:txBody>
+      </p:sp>
+      <p:sp>
+        <p:nvSpPr>
+          <p:cNvPr id="3" name="Espace réservé du contenu 2"/>
+          <p:cNvSpPr>
+            <a:spLocks noGrp="1"/>
+          </p:cNvSpPr>
+          <p:nvPr>
+            <p:ph idx="1"/>
+          </p:nvPr>
+        </p:nvSpPr>
+        <p:spPr/>
+        <p:txBody>
+          <a:bodyPr/>
+          <a:lstStyle/>
+          <a:p>
+            <a:r>
+              <a:rPr lang="en-US" dirty="0" smtClean="0"/>
+              <a:t>5 questions sets for a insurance aggregator</a:t>
+            </a:r>
+          </a:p>
+          <a:p>
+            <a:pPr lvl="1">
+              <a:buFont typeface="Wingdings" pitchFamily="2" charset="2"/>
+              <a:buChar char="§"/>
+            </a:pPr>
+            <a:r>
+              <a:rPr lang="en-US" dirty="0" smtClean="0"/>
+              <a:t>Car form (160 questions)</a:t>
+            </a:r>
+          </a:p>
+          <a:p>
+            <a:pPr lvl="1"/>
+            <a:r>
+              <a:rPr lang="en-US" dirty="0" smtClean="0"/>
+              <a:t>Motorbike </a:t>
             </a:r>
             <a:r>
               <a:rPr lang="en-US" dirty="0"/>
-              <a:t>for </a:t>
-            </a:r>
-            <a:r>
-              <a:rPr lang="en-US" dirty="0" smtClean="0"/>
-              <a:t>motorbike</a:t>
-            </a:r>
+              <a:t>form </a:t>
+            </a:r>
+            <a:r>
+              <a:rPr lang="en-US" dirty="0" smtClean="0"/>
+              <a:t>(180 questions)</a:t>
+            </a:r>
+          </a:p>
+          <a:p>
+            <a:pPr lvl="1"/>
+            <a:r>
+              <a:rPr lang="en-US" dirty="0" smtClean="0"/>
+              <a:t>Health </a:t>
+            </a:r>
+            <a:r>
+              <a:rPr lang="en-US" dirty="0"/>
+              <a:t>form </a:t>
+            </a:r>
+            <a:r>
+              <a:rPr lang="en-US" dirty="0" smtClean="0"/>
+              <a:t>(50 questions)</a:t>
+            </a:r>
+          </a:p>
+          <a:p>
+            <a:pPr lvl="1"/>
+            <a:r>
+              <a:rPr lang="en-US" dirty="0" smtClean="0"/>
+              <a:t>Home </a:t>
+            </a:r>
+            <a:r>
+              <a:rPr lang="en-US" dirty="0"/>
+              <a:t>form </a:t>
+            </a:r>
+            <a:r>
+              <a:rPr lang="en-US" dirty="0" smtClean="0"/>
+              <a:t>(70 questions)</a:t>
+            </a:r>
+          </a:p>
+          <a:p>
+            <a:pPr lvl="1"/>
+            <a:r>
+              <a:rPr lang="en-US" dirty="0" smtClean="0"/>
+              <a:t>Loan </a:t>
+            </a:r>
+            <a:r>
+              <a:rPr lang="en-US" dirty="0"/>
+              <a:t>form </a:t>
+            </a:r>
+            <a:r>
+              <a:rPr lang="en-US" dirty="0" smtClean="0"/>
+              <a:t>(40 questions)</a:t>
+            </a:r>
+          </a:p>
+          <a:p>
+            <a:r>
+              <a:rPr lang="en-US" dirty="0" smtClean="0"/>
+              <a:t>A lot of questions with business rules that are linked by dependencies and business rules</a:t>
+            </a:r>
+          </a:p>
+          <a:p>
             <a:endParaRPr lang="en-US" dirty="0"/>
           </a:p>
         </p:txBody>
       </p:sp>
-      <p:pic>
-        <p:nvPicPr>
-          <p:cNvPr id="4" name="Image 3"/>
-          <p:cNvPicPr>
-            <a:picLocks noChangeAspect="1"/>
-          </p:cNvPicPr>
-          <p:nvPr/>
-        </p:nvPicPr>
-        <p:blipFill>
-          <a:blip r:embed="rId2" cstate="print"/>
-          <a:stretch>
-            <a:fillRect/>
-          </a:stretch>
-        </p:blipFill>
-        <p:spPr>
-          <a:xfrm>
-            <a:off x="878205" y="1447800"/>
-            <a:ext cx="4419600" cy="2266950"/>
-          </a:xfrm>
-          <a:prstGeom prst="rect">
-            <a:avLst/>
-          </a:prstGeom>
-          <a:ln w="57150">
-            <a:solidFill>
-              <a:srgbClr val="002060"/>
-            </a:solidFill>
-          </a:ln>
-        </p:spPr>
-      </p:pic>
-      <p:pic>
-        <p:nvPicPr>
-          <p:cNvPr id="5" name="Image 4"/>
-          <p:cNvPicPr>
-            <a:picLocks noChangeAspect="1"/>
-          </p:cNvPicPr>
-          <p:nvPr/>
-        </p:nvPicPr>
-        <p:blipFill>
-          <a:blip r:embed="rId3" cstate="print"/>
-          <a:stretch>
-            <a:fillRect/>
-          </a:stretch>
-        </p:blipFill>
-        <p:spPr>
-          <a:xfrm>
-            <a:off x="179070" y="2286000"/>
-            <a:ext cx="4276725" cy="3467100"/>
-          </a:xfrm>
-          <a:prstGeom prst="rect">
-            <a:avLst/>
-          </a:prstGeom>
-          <a:ln w="57150">
-            <a:solidFill>
-              <a:srgbClr val="002060"/>
-            </a:solidFill>
-          </a:ln>
-        </p:spPr>
-      </p:pic>
-      <p:pic>
-        <p:nvPicPr>
-          <p:cNvPr id="6" name="Image 5"/>
-          <p:cNvPicPr/>
-          <p:nvPr/>
-        </p:nvPicPr>
-        <p:blipFill>
-          <a:blip r:embed="rId4" cstate="print"/>
-          <a:stretch>
-            <a:fillRect/>
-          </a:stretch>
-        </p:blipFill>
-        <p:spPr>
-          <a:xfrm>
-            <a:off x="1219200" y="2971800"/>
-            <a:ext cx="3236595" cy="3760024"/>
-          </a:xfrm>
-          <a:prstGeom prst="rect">
-            <a:avLst/>
-          </a:prstGeom>
-          <a:ln w="57150">
-            <a:solidFill>
-              <a:srgbClr val="002060"/>
-            </a:solidFill>
-          </a:ln>
-        </p:spPr>
-      </p:pic>
-      <p:pic>
-        <p:nvPicPr>
-          <p:cNvPr id="7" name="Image 6"/>
-          <p:cNvPicPr>
-            <a:picLocks noChangeAspect="1"/>
-          </p:cNvPicPr>
-          <p:nvPr/>
-        </p:nvPicPr>
-        <p:blipFill>
-          <a:blip r:embed="rId5" cstate="print"/>
-          <a:stretch>
-            <a:fillRect/>
-          </a:stretch>
-        </p:blipFill>
-        <p:spPr>
-          <a:xfrm>
-            <a:off x="2838562" y="1178353"/>
-            <a:ext cx="3943238" cy="5306788"/>
-          </a:xfrm>
-          <a:prstGeom prst="rect">
-            <a:avLst/>
-          </a:prstGeom>
-          <a:ln w="57150">
-            <a:solidFill>
-              <a:srgbClr val="002060"/>
-            </a:solidFill>
-          </a:ln>
-        </p:spPr>
-      </p:pic>
-      <p:pic>
-        <p:nvPicPr>
-          <p:cNvPr id="8" name="Image 7"/>
-          <p:cNvPicPr>
-            <a:picLocks noChangeAspect="1"/>
-          </p:cNvPicPr>
-          <p:nvPr/>
-        </p:nvPicPr>
-        <p:blipFill>
-          <a:blip r:embed="rId6" cstate="print"/>
-          <a:stretch>
-            <a:fillRect/>
-          </a:stretch>
-        </p:blipFill>
-        <p:spPr>
-          <a:xfrm>
-            <a:off x="4343400" y="1642418"/>
-            <a:ext cx="4648200" cy="4457700"/>
-          </a:xfrm>
-          <a:prstGeom prst="rect">
-            <a:avLst/>
-          </a:prstGeom>
-          <a:ln w="57150">
-            <a:solidFill>
-              <a:srgbClr val="002060"/>
-            </a:solidFill>
-          </a:ln>
-        </p:spPr>
-      </p:pic>
-      <p:pic>
-        <p:nvPicPr>
-          <p:cNvPr id="9" name="Image 8"/>
-          <p:cNvPicPr/>
-          <p:nvPr/>
-        </p:nvPicPr>
-        <p:blipFill>
-          <a:blip r:embed="rId7" cstate="print"/>
-          <a:stretch>
-            <a:fillRect/>
-          </a:stretch>
-        </p:blipFill>
-        <p:spPr>
-          <a:xfrm>
-            <a:off x="4876800" y="1447800"/>
-            <a:ext cx="3474540" cy="4846936"/>
-          </a:xfrm>
-          <a:prstGeom prst="rect">
-            <a:avLst/>
-          </a:prstGeom>
-          <a:ln w="57150">
-            <a:solidFill>
-              <a:srgbClr val="002060"/>
-            </a:solidFill>
-          </a:ln>
-        </p:spPr>
-      </p:pic>
     </p:spTree>
     <p:extLst>
       <p:ext uri="{BB962C8B-B14F-4D97-AF65-F5344CB8AC3E}">
-        <p14:creationId xmlns="" xmlns:p14="http://schemas.microsoft.com/office/powerpoint/2010/main" val="2834344091"/>
+        <p14:creationId xmlns:p14="http://schemas.microsoft.com/office/powerpoint/2010/main" xmlns="" val="3312784383"/>
       </p:ext>
     </p:extLst>
   </p:cSld>
@@ -14585,300 +14755,7 @@
   <p:timing>
     <p:tnLst>
       <p:par>
-        <p:cTn id="1" dur="indefinite" restart="never" nodeType="tmRoot">
-          <p:childTnLst>
-            <p:seq concurrent="1" nextAc="seek">
-              <p:cTn id="2" dur="indefinite" nodeType="mainSeq">
-                <p:childTnLst>
-                  <p:par>
-                    <p:cTn id="3" fill="hold">
-                      <p:stCondLst>
-                        <p:cond delay="indefinite"/>
-                      </p:stCondLst>
-                      <p:childTnLst>
-                        <p:par>
-                          <p:cTn id="4" fill="hold">
-                            <p:stCondLst>
-                              <p:cond delay="0"/>
-                            </p:stCondLst>
-                            <p:childTnLst>
-                              <p:par>
-                                <p:cTn id="5" presetID="1" presetClass="entr" presetSubtype="0" fill="hold" nodeType="clickEffect">
-                                  <p:stCondLst>
-                                    <p:cond delay="0"/>
-                                  </p:stCondLst>
-                                  <p:childTnLst>
-                                    <p:set>
-                                      <p:cBhvr>
-                                        <p:cTn id="6" dur="1" fill="hold">
-                                          <p:stCondLst>
-                                            <p:cond delay="0"/>
-                                          </p:stCondLst>
-                                        </p:cTn>
-                                        <p:tgtEl>
-                                          <p:spTgt spid="4"/>
-                                        </p:tgtEl>
-                                        <p:attrNameLst>
-                                          <p:attrName>style.visibility</p:attrName>
-                                        </p:attrNameLst>
-                                      </p:cBhvr>
-                                      <p:to>
-                                        <p:strVal val="visible"/>
-                                      </p:to>
-                                    </p:set>
-                                  </p:childTnLst>
-                                </p:cTn>
-                              </p:par>
-                            </p:childTnLst>
-                          </p:cTn>
-                        </p:par>
-                      </p:childTnLst>
-                    </p:cTn>
-                  </p:par>
-                  <p:par>
-                    <p:cTn id="7" fill="hold">
-                      <p:stCondLst>
-                        <p:cond delay="indefinite"/>
-                      </p:stCondLst>
-                      <p:childTnLst>
-                        <p:par>
-                          <p:cTn id="8" fill="hold">
-                            <p:stCondLst>
-                              <p:cond delay="0"/>
-                            </p:stCondLst>
-                            <p:childTnLst>
-                              <p:par>
-                                <p:cTn id="9" presetID="1" presetClass="entr" presetSubtype="0" fill="hold" nodeType="clickEffect">
-                                  <p:stCondLst>
-                                    <p:cond delay="0"/>
-                                  </p:stCondLst>
-                                  <p:childTnLst>
-                                    <p:set>
-                                      <p:cBhvr>
-                                        <p:cTn id="10" dur="1" fill="hold">
-                                          <p:stCondLst>
-                                            <p:cond delay="0"/>
-                                          </p:stCondLst>
-                                        </p:cTn>
-                                        <p:tgtEl>
-                                          <p:spTgt spid="5"/>
-                                        </p:tgtEl>
-                                        <p:attrNameLst>
-                                          <p:attrName>style.visibility</p:attrName>
-                                        </p:attrNameLst>
-                                      </p:cBhvr>
-                                      <p:to>
-                                        <p:strVal val="visible"/>
-                                      </p:to>
-                                    </p:set>
-                                  </p:childTnLst>
-                                </p:cTn>
-                              </p:par>
-                            </p:childTnLst>
-                          </p:cTn>
-                        </p:par>
-                      </p:childTnLst>
-                    </p:cTn>
-                  </p:par>
-                  <p:par>
-                    <p:cTn id="11" fill="hold">
-                      <p:stCondLst>
-                        <p:cond delay="indefinite"/>
-                      </p:stCondLst>
-                      <p:childTnLst>
-                        <p:par>
-                          <p:cTn id="12" fill="hold">
-                            <p:stCondLst>
-                              <p:cond delay="0"/>
-                            </p:stCondLst>
-                            <p:childTnLst>
-                              <p:par>
-                                <p:cTn id="13" presetID="1" presetClass="entr" presetSubtype="0" fill="hold" nodeType="clickEffect">
-                                  <p:stCondLst>
-                                    <p:cond delay="0"/>
-                                  </p:stCondLst>
-                                  <p:childTnLst>
-                                    <p:set>
-                                      <p:cBhvr>
-                                        <p:cTn id="14" dur="1" fill="hold">
-                                          <p:stCondLst>
-                                            <p:cond delay="0"/>
-                                          </p:stCondLst>
-                                        </p:cTn>
-                                        <p:tgtEl>
-                                          <p:spTgt spid="6"/>
-                                        </p:tgtEl>
-                                        <p:attrNameLst>
-                                          <p:attrName>style.visibility</p:attrName>
-                                        </p:attrNameLst>
-                                      </p:cBhvr>
-                                      <p:to>
-                                        <p:strVal val="visible"/>
-                                      </p:to>
-                                    </p:set>
-                                  </p:childTnLst>
-                                </p:cTn>
-                              </p:par>
-                            </p:childTnLst>
-                          </p:cTn>
-                        </p:par>
-                      </p:childTnLst>
-                    </p:cTn>
-                  </p:par>
-                  <p:par>
-                    <p:cTn id="15" fill="hold">
-                      <p:stCondLst>
-                        <p:cond delay="indefinite"/>
-                      </p:stCondLst>
-                      <p:childTnLst>
-                        <p:par>
-                          <p:cTn id="16" fill="hold">
-                            <p:stCondLst>
-                              <p:cond delay="0"/>
-                            </p:stCondLst>
-                            <p:childTnLst>
-                              <p:par>
-                                <p:cTn id="17" presetID="1" presetClass="entr" presetSubtype="0" fill="hold" nodeType="clickEffect">
-                                  <p:stCondLst>
-                                    <p:cond delay="0"/>
-                                  </p:stCondLst>
-                                  <p:childTnLst>
-                                    <p:set>
-                                      <p:cBhvr>
-                                        <p:cTn id="18" dur="1" fill="hold">
-                                          <p:stCondLst>
-                                            <p:cond delay="0"/>
-                                          </p:stCondLst>
-                                        </p:cTn>
-                                        <p:tgtEl>
-                                          <p:spTgt spid="7"/>
-                                        </p:tgtEl>
-                                        <p:attrNameLst>
-                                          <p:attrName>style.visibility</p:attrName>
-                                        </p:attrNameLst>
-                                      </p:cBhvr>
-                                      <p:to>
-                                        <p:strVal val="visible"/>
-                                      </p:to>
-                                    </p:set>
-                                  </p:childTnLst>
-                                </p:cTn>
-                              </p:par>
-                            </p:childTnLst>
-                          </p:cTn>
-                        </p:par>
-                      </p:childTnLst>
-                    </p:cTn>
-                  </p:par>
-                  <p:par>
-                    <p:cTn id="19" fill="hold">
-                      <p:stCondLst>
-                        <p:cond delay="indefinite"/>
-                      </p:stCondLst>
-                      <p:childTnLst>
-                        <p:par>
-                          <p:cTn id="20" fill="hold">
-                            <p:stCondLst>
-                              <p:cond delay="0"/>
-                            </p:stCondLst>
-                            <p:childTnLst>
-                              <p:par>
-                                <p:cTn id="21" presetID="1" presetClass="entr" presetSubtype="0" fill="hold" nodeType="clickEffect">
-                                  <p:stCondLst>
-                                    <p:cond delay="0"/>
-                                  </p:stCondLst>
-                                  <p:childTnLst>
-                                    <p:set>
-                                      <p:cBhvr>
-                                        <p:cTn id="22" dur="1" fill="hold">
-                                          <p:stCondLst>
-                                            <p:cond delay="0"/>
-                                          </p:stCondLst>
-                                        </p:cTn>
-                                        <p:tgtEl>
-                                          <p:spTgt spid="8"/>
-                                        </p:tgtEl>
-                                        <p:attrNameLst>
-                                          <p:attrName>style.visibility</p:attrName>
-                                        </p:attrNameLst>
-                                      </p:cBhvr>
-                                      <p:to>
-                                        <p:strVal val="visible"/>
-                                      </p:to>
-                                    </p:set>
-                                  </p:childTnLst>
-                                </p:cTn>
-                              </p:par>
-                            </p:childTnLst>
-                          </p:cTn>
-                        </p:par>
-                      </p:childTnLst>
-                    </p:cTn>
-                  </p:par>
-                  <p:par>
-                    <p:cTn id="23" fill="hold">
-                      <p:stCondLst>
-                        <p:cond delay="indefinite"/>
-                      </p:stCondLst>
-                      <p:childTnLst>
-                        <p:par>
-                          <p:cTn id="24" fill="hold">
-                            <p:stCondLst>
-                              <p:cond delay="0"/>
-                            </p:stCondLst>
-                            <p:childTnLst>
-                              <p:par>
-                                <p:cTn id="25" presetID="1" presetClass="entr" presetSubtype="0" fill="hold" nodeType="clickEffect">
-                                  <p:stCondLst>
-                                    <p:cond delay="0"/>
-                                  </p:stCondLst>
-                                  <p:childTnLst>
-                                    <p:set>
-                                      <p:cBhvr>
-                                        <p:cTn id="26" dur="1" fill="hold">
-                                          <p:stCondLst>
-                                            <p:cond delay="0"/>
-                                          </p:stCondLst>
-                                        </p:cTn>
-                                        <p:tgtEl>
-                                          <p:spTgt spid="9"/>
-                                        </p:tgtEl>
-                                        <p:attrNameLst>
-                                          <p:attrName>style.visibility</p:attrName>
-                                        </p:attrNameLst>
-                                      </p:cBhvr>
-                                      <p:to>
-                                        <p:strVal val="visible"/>
-                                      </p:to>
-                                    </p:set>
-                                  </p:childTnLst>
-                                </p:cTn>
-                              </p:par>
-                            </p:childTnLst>
-                          </p:cTn>
-                        </p:par>
-                      </p:childTnLst>
-                    </p:cTn>
-                  </p:par>
-                </p:childTnLst>
-              </p:cTn>
-              <p:prevCondLst>
-                <p:cond evt="onPrev" delay="0">
-                  <p:tgtEl>
-                    <p:sldTgt/>
-                  </p:tgtEl>
-                </p:cond>
-              </p:prevCondLst>
-              <p:nextCondLst>
-                <p:cond evt="onNext" delay="0">
-                  <p:tgtEl>
-                    <p:sldTgt/>
-                  </p:tgtEl>
-                </p:cond>
-              </p:nextCondLst>
-            </p:seq>
-          </p:childTnLst>
-        </p:cTn>
+        <p:cTn id="1" dur="indefinite" restart="never" nodeType="tmRoot"/>
       </p:par>
     </p:tnLst>
   </p:timing>
@@ -15091,7 +14968,7 @@
     </p:spTree>
     <p:extLst>
       <p:ext uri="{BB962C8B-B14F-4D97-AF65-F5344CB8AC3E}">
-        <p14:creationId xmlns="" xmlns:p14="http://schemas.microsoft.com/office/powerpoint/2010/main" val="856396653"/>
+        <p14:creationId xmlns:p14="http://schemas.microsoft.com/office/powerpoint/2010/main" xmlns="" val="856396653"/>
       </p:ext>
     </p:extLst>
   </p:cSld>
@@ -15362,7 +15239,7 @@
     </p:spTree>
     <p:extLst>
       <p:ext uri="{BB962C8B-B14F-4D97-AF65-F5344CB8AC3E}">
-        <p14:creationId xmlns="" xmlns:p14="http://schemas.microsoft.com/office/powerpoint/2010/main" val="3443329555"/>
+        <p14:creationId xmlns:p14="http://schemas.microsoft.com/office/powerpoint/2010/main" xmlns="" val="3443329555"/>
       </p:ext>
     </p:extLst>
   </p:cSld>
@@ -15874,7 +15751,7 @@
     </p:spTree>
     <p:extLst>
       <p:ext uri="{BB962C8B-B14F-4D97-AF65-F5344CB8AC3E}">
-        <p14:creationId xmlns="" xmlns:p14="http://schemas.microsoft.com/office/powerpoint/2010/main" val="1556099287"/>
+        <p14:creationId xmlns:p14="http://schemas.microsoft.com/office/powerpoint/2010/main" xmlns="" val="1556099287"/>
       </p:ext>
     </p:extLst>
   </p:cSld>
@@ -16227,7 +16104,7 @@
     </p:spTree>
     <p:extLst>
       <p:ext uri="{BB962C8B-B14F-4D97-AF65-F5344CB8AC3E}">
-        <p14:creationId xmlns="" xmlns:p14="http://schemas.microsoft.com/office/powerpoint/2010/main" val="2948210574"/>
+        <p14:creationId xmlns:p14="http://schemas.microsoft.com/office/powerpoint/2010/main" xmlns="" val="2948210574"/>
       </p:ext>
     </p:extLst>
   </p:cSld>
@@ -16295,7 +16172,7 @@
           <p:nvPr>
             <p:extLst>
               <p:ext uri="{D42A27DB-BD31-4B8C-83A1-F6EECF244321}">
-                <p14:modId xmlns="" xmlns:p14="http://schemas.microsoft.com/office/powerpoint/2010/main" val="2181104498"/>
+                <p14:modId xmlns:p14="http://schemas.microsoft.com/office/powerpoint/2010/main" xmlns="" val="2181104498"/>
               </p:ext>
             </p:extLst>
           </p:nvPr>
@@ -17279,7 +17156,7 @@
     </p:spTree>
     <p:extLst>
       <p:ext uri="{BB962C8B-B14F-4D97-AF65-F5344CB8AC3E}">
-        <p14:creationId xmlns="" xmlns:p14="http://schemas.microsoft.com/office/powerpoint/2010/main" val="2197364214"/>
+        <p14:creationId xmlns:p14="http://schemas.microsoft.com/office/powerpoint/2010/main" xmlns="" val="2197364214"/>
       </p:ext>
     </p:extLst>
   </p:cSld>
@@ -17742,7 +17619,7 @@
     </p:spTree>
     <p:extLst>
       <p:ext uri="{BB962C8B-B14F-4D97-AF65-F5344CB8AC3E}">
-        <p14:creationId xmlns="" xmlns:p14="http://schemas.microsoft.com/office/powerpoint/2010/main" val="977874982"/>
+        <p14:creationId xmlns:p14="http://schemas.microsoft.com/office/powerpoint/2010/main" xmlns="" val="977874982"/>
       </p:ext>
     </p:extLst>
   </p:cSld>
@@ -17918,7 +17795,7 @@
     </p:spTree>
     <p:extLst>
       <p:ext uri="{BB962C8B-B14F-4D97-AF65-F5344CB8AC3E}">
-        <p14:creationId xmlns="" xmlns:p14="http://schemas.microsoft.com/office/powerpoint/2010/main" val="2092776985"/>
+        <p14:creationId xmlns:p14="http://schemas.microsoft.com/office/powerpoint/2010/main" xmlns="" val="2092776985"/>
       </p:ext>
     </p:extLst>
   </p:cSld>
@@ -17989,7 +17866,7 @@
           <a:blip r:embed="rId2" cstate="print">
             <a:extLst>
               <a:ext uri="{28A0092B-C50C-407E-A947-70E740481C1C}">
-                <a14:useLocalDpi xmlns="" xmlns:a14="http://schemas.microsoft.com/office/drawing/2010/main" val="0"/>
+                <a14:useLocalDpi xmlns:a14="http://schemas.microsoft.com/office/drawing/2010/main" xmlns="" val="0"/>
               </a:ext>
             </a:extLst>
           </a:blip>
@@ -18125,7 +18002,7 @@
     </p:spTree>
     <p:extLst>
       <p:ext uri="{BB962C8B-B14F-4D97-AF65-F5344CB8AC3E}">
-        <p14:creationId xmlns="" xmlns:p14="http://schemas.microsoft.com/office/powerpoint/2010/main" val="318706902"/>
+        <p14:creationId xmlns:p14="http://schemas.microsoft.com/office/powerpoint/2010/main" xmlns="" val="318706902"/>
       </p:ext>
     </p:extLst>
   </p:cSld>
@@ -18208,7 +18085,7 @@
           <p:nvPr>
             <p:extLst>
               <p:ext uri="{D42A27DB-BD31-4B8C-83A1-F6EECF244321}">
-                <p14:modId xmlns="" xmlns:p14="http://schemas.microsoft.com/office/powerpoint/2010/main" val="3075550189"/>
+                <p14:modId xmlns:p14="http://schemas.microsoft.com/office/powerpoint/2010/main" xmlns="" val="3075550189"/>
               </p:ext>
             </p:extLst>
           </p:nvPr>
@@ -18579,7 +18456,7 @@
           <a:blip r:embed="rId3" cstate="print">
             <a:extLst>
               <a:ext uri="{28A0092B-C50C-407E-A947-70E740481C1C}">
-                <a14:useLocalDpi xmlns="" xmlns:a14="http://schemas.microsoft.com/office/drawing/2010/main" val="0"/>
+                <a14:useLocalDpi xmlns:a14="http://schemas.microsoft.com/office/drawing/2010/main" xmlns="" val="0"/>
               </a:ext>
             </a:extLst>
           </a:blip>
@@ -18609,7 +18486,7 @@
           <a:blip r:embed="rId4" cstate="print">
             <a:extLst>
               <a:ext uri="{28A0092B-C50C-407E-A947-70E740481C1C}">
-                <a14:useLocalDpi xmlns="" xmlns:a14="http://schemas.microsoft.com/office/drawing/2010/main" val="0"/>
+                <a14:useLocalDpi xmlns:a14="http://schemas.microsoft.com/office/drawing/2010/main" xmlns="" val="0"/>
               </a:ext>
             </a:extLst>
           </a:blip>
@@ -18639,7 +18516,7 @@
           <a:blip r:embed="rId5" cstate="print">
             <a:extLst>
               <a:ext uri="{28A0092B-C50C-407E-A947-70E740481C1C}">
-                <a14:useLocalDpi xmlns="" xmlns:a14="http://schemas.microsoft.com/office/drawing/2010/main" val="0"/>
+                <a14:useLocalDpi xmlns:a14="http://schemas.microsoft.com/office/drawing/2010/main" xmlns="" val="0"/>
               </a:ext>
             </a:extLst>
           </a:blip>
@@ -18669,7 +18546,7 @@
           <a:blip r:embed="rId6" cstate="print">
             <a:extLst>
               <a:ext uri="{28A0092B-C50C-407E-A947-70E740481C1C}">
-                <a14:useLocalDpi xmlns="" xmlns:a14="http://schemas.microsoft.com/office/drawing/2010/main" val="0"/>
+                <a14:useLocalDpi xmlns:a14="http://schemas.microsoft.com/office/drawing/2010/main" xmlns="" val="0"/>
               </a:ext>
             </a:extLst>
           </a:blip>
@@ -18699,7 +18576,7 @@
           <a:blip r:embed="rId7" cstate="print">
             <a:extLst>
               <a:ext uri="{28A0092B-C50C-407E-A947-70E740481C1C}">
-                <a14:useLocalDpi xmlns="" xmlns:a14="http://schemas.microsoft.com/office/drawing/2010/main" val="0"/>
+                <a14:useLocalDpi xmlns:a14="http://schemas.microsoft.com/office/drawing/2010/main" xmlns="" val="0"/>
               </a:ext>
             </a:extLst>
           </a:blip>
@@ -18729,7 +18606,7 @@
           <a:blip r:embed="rId8" cstate="print">
             <a:extLst>
               <a:ext uri="{28A0092B-C50C-407E-A947-70E740481C1C}">
-                <a14:useLocalDpi xmlns="" xmlns:a14="http://schemas.microsoft.com/office/drawing/2010/main" val="0"/>
+                <a14:useLocalDpi xmlns:a14="http://schemas.microsoft.com/office/drawing/2010/main" xmlns="" val="0"/>
               </a:ext>
             </a:extLst>
           </a:blip>
@@ -18750,7 +18627,7 @@
     </p:spTree>
     <p:extLst>
       <p:ext uri="{BB962C8B-B14F-4D97-AF65-F5344CB8AC3E}">
-        <p14:creationId xmlns="" xmlns:p14="http://schemas.microsoft.com/office/powerpoint/2010/main" val="949325302"/>
+        <p14:creationId xmlns:p14="http://schemas.microsoft.com/office/powerpoint/2010/main" xmlns="" val="949325302"/>
       </p:ext>
     </p:extLst>
   </p:cSld>
@@ -18806,7 +18683,7 @@
           <a:p>
             <a:r>
               <a:rPr lang="en-US" dirty="0" smtClean="0"/>
-              <a:t>Additional features</a:t>
+              <a:t>Extensions</a:t>
             </a:r>
             <a:endParaRPr lang="en-US" dirty="0"/>
           </a:p>
@@ -18820,7 +18697,7 @@
         </p:nvSpPr>
         <p:spPr>
           <a:xfrm>
-            <a:off x="1447800" y="3523129"/>
+            <a:off x="2590800" y="3523129"/>
             <a:ext cx="914400" cy="914400"/>
           </a:xfrm>
           <a:prstGeom prst="corner">
@@ -18863,7 +18740,7 @@
         </p:nvSpPr>
         <p:spPr>
           <a:xfrm rot="10800000">
-            <a:off x="6705600" y="2608729"/>
+            <a:off x="5715000" y="2608729"/>
             <a:ext cx="914400" cy="914400"/>
           </a:xfrm>
           <a:prstGeom prst="corner">
@@ -18901,7 +18778,7 @@
     </p:spTree>
     <p:extLst>
       <p:ext uri="{BB962C8B-B14F-4D97-AF65-F5344CB8AC3E}">
-        <p14:creationId xmlns="" xmlns:p14="http://schemas.microsoft.com/office/powerpoint/2010/main" val="1326827891"/>
+        <p14:creationId xmlns:p14="http://schemas.microsoft.com/office/powerpoint/2010/main" xmlns="" val="1326827891"/>
       </p:ext>
     </p:extLst>
   </p:cSld>
@@ -18945,102 +18822,208 @@
             <p:ph type="title"/>
           </p:nvPr>
         </p:nvSpPr>
-        <p:spPr/>
-        <p:txBody>
-          <a:bodyPr/>
-          <a:lstStyle/>
-          <a:p>
-            <a:r>
-              <a:rPr lang="en-US" dirty="0" smtClean="0"/>
-              <a:t>Nature of dependencies	</a:t>
-            </a:r>
-            <a:endParaRPr lang="en-US" dirty="0"/>
-          </a:p>
-        </p:txBody>
-      </p:sp>
-      <p:sp>
-        <p:nvSpPr>
-          <p:cNvPr id="3" name="Espace réservé du contenu 2"/>
-          <p:cNvSpPr>
-            <a:spLocks noGrp="1"/>
-          </p:cNvSpPr>
-          <p:nvPr>
-            <p:ph idx="1"/>
-          </p:nvPr>
-        </p:nvSpPr>
-        <p:spPr/>
+        <p:spPr>
+          <a:xfrm>
+            <a:off x="457200" y="0"/>
+            <a:ext cx="8382000" cy="1143000"/>
+          </a:xfrm>
+        </p:spPr>
         <p:txBody>
           <a:bodyPr>
-            <a:normAutofit fontScale="85000" lnSpcReduction="20000"/>
+            <a:normAutofit fontScale="90000"/>
           </a:bodyPr>
           <a:lstStyle/>
           <a:p>
             <a:r>
               <a:rPr lang="en-US" dirty="0" smtClean="0"/>
-              <a:t>Visibility</a:t>
-            </a:r>
-          </a:p>
-          <a:p>
-            <a:pPr lvl="1">
-              <a:buFont typeface="Wingdings" pitchFamily="2" charset="2"/>
-              <a:buChar char="§"/>
-            </a:pPr>
-            <a:r>
-              <a:rPr lang="en-US" dirty="0" smtClean="0"/>
-              <a:t>I declare a claim -&gt; question set for this child appears</a:t>
-            </a:r>
-          </a:p>
-          <a:p>
-            <a:r>
-              <a:rPr lang="en-US" dirty="0" smtClean="0"/>
-              <a:t>Value range</a:t>
-            </a:r>
-          </a:p>
-          <a:p>
-            <a:pPr lvl="1"/>
-            <a:r>
-              <a:rPr lang="en-US" dirty="0" smtClean="0"/>
-              <a:t>I’ve been owning a car for one year -&gt; constraint on the date for a claim should be later than the car’s purchase date</a:t>
-            </a:r>
-          </a:p>
-          <a:p>
-            <a:r>
-              <a:rPr lang="en-US" dirty="0" smtClean="0"/>
-              <a:t>Reset</a:t>
-            </a:r>
-          </a:p>
-          <a:p>
-            <a:pPr lvl="1">
-              <a:buFont typeface="Wingdings" pitchFamily="2" charset="2"/>
-              <a:buChar char="§"/>
-            </a:pPr>
-            <a:r>
-              <a:rPr lang="en-US" dirty="0" smtClean="0"/>
-              <a:t>I change the number of occurred claims from 2 to 1 -&gt; previous details of claim number 2 should be dropped</a:t>
-            </a:r>
-          </a:p>
-          <a:p>
-            <a:r>
-              <a:rPr lang="en-US" dirty="0" smtClean="0"/>
-              <a:t>Validation</a:t>
-            </a:r>
-          </a:p>
-          <a:p>
-            <a:pPr lvl="1">
-              <a:buFont typeface="Wingdings" pitchFamily="2" charset="2"/>
-              <a:buChar char="§"/>
-            </a:pPr>
-            <a:r>
-              <a:rPr lang="en-US" dirty="0" smtClean="0"/>
-              <a:t>I change my date of birth -&gt; I could not obtain my car license before being 18 years old</a:t>
-            </a:r>
-          </a:p>
-        </p:txBody>
-      </p:sp>
+              <a:t>Sample : old question set </a:t>
+            </a:r>
+            <a:r>
+              <a:rPr lang="en-US" dirty="0"/>
+              <a:t>for </a:t>
+            </a:r>
+            <a:r>
+              <a:rPr lang="en-US" dirty="0" smtClean="0"/>
+              <a:t>motorbike</a:t>
+            </a:r>
+            <a:endParaRPr lang="en-US" dirty="0"/>
+          </a:p>
+        </p:txBody>
+      </p:sp>
+      <p:pic>
+        <p:nvPicPr>
+          <p:cNvPr id="4" name="Image 3"/>
+          <p:cNvPicPr>
+            <a:picLocks noChangeAspect="1"/>
+          </p:cNvPicPr>
+          <p:nvPr/>
+        </p:nvPicPr>
+        <p:blipFill>
+          <a:blip r:embed="rId2" cstate="print"/>
+          <a:stretch>
+            <a:fillRect/>
+          </a:stretch>
+        </p:blipFill>
+        <p:spPr>
+          <a:xfrm>
+            <a:off x="878205" y="1447800"/>
+            <a:ext cx="4419600" cy="2266950"/>
+          </a:xfrm>
+          <a:prstGeom prst="rect">
+            <a:avLst/>
+          </a:prstGeom>
+          <a:ln w="57150">
+            <a:solidFill>
+              <a:srgbClr val="002060"/>
+            </a:solidFill>
+          </a:ln>
+        </p:spPr>
+      </p:pic>
+      <p:pic>
+        <p:nvPicPr>
+          <p:cNvPr id="5" name="Image 4"/>
+          <p:cNvPicPr>
+            <a:picLocks noChangeAspect="1"/>
+          </p:cNvPicPr>
+          <p:nvPr/>
+        </p:nvPicPr>
+        <p:blipFill>
+          <a:blip r:embed="rId3" cstate="print"/>
+          <a:stretch>
+            <a:fillRect/>
+          </a:stretch>
+        </p:blipFill>
+        <p:spPr>
+          <a:xfrm>
+            <a:off x="179070" y="2286000"/>
+            <a:ext cx="4276725" cy="3467100"/>
+          </a:xfrm>
+          <a:prstGeom prst="rect">
+            <a:avLst/>
+          </a:prstGeom>
+          <a:ln w="57150">
+            <a:solidFill>
+              <a:srgbClr val="002060"/>
+            </a:solidFill>
+          </a:ln>
+        </p:spPr>
+      </p:pic>
+      <p:pic>
+        <p:nvPicPr>
+          <p:cNvPr id="6" name="Image 5"/>
+          <p:cNvPicPr/>
+          <p:nvPr/>
+        </p:nvPicPr>
+        <p:blipFill>
+          <a:blip r:embed="rId4" cstate="print"/>
+          <a:stretch>
+            <a:fillRect/>
+          </a:stretch>
+        </p:blipFill>
+        <p:spPr>
+          <a:xfrm>
+            <a:off x="1219200" y="2971800"/>
+            <a:ext cx="3236595" cy="3760024"/>
+          </a:xfrm>
+          <a:prstGeom prst="rect">
+            <a:avLst/>
+          </a:prstGeom>
+          <a:ln w="57150">
+            <a:solidFill>
+              <a:srgbClr val="002060"/>
+            </a:solidFill>
+          </a:ln>
+        </p:spPr>
+      </p:pic>
+      <p:pic>
+        <p:nvPicPr>
+          <p:cNvPr id="7" name="Image 6"/>
+          <p:cNvPicPr>
+            <a:picLocks noChangeAspect="1"/>
+          </p:cNvPicPr>
+          <p:nvPr/>
+        </p:nvPicPr>
+        <p:blipFill>
+          <a:blip r:embed="rId5" cstate="print"/>
+          <a:stretch>
+            <a:fillRect/>
+          </a:stretch>
+        </p:blipFill>
+        <p:spPr>
+          <a:xfrm>
+            <a:off x="2838562" y="1178353"/>
+            <a:ext cx="3943238" cy="5306788"/>
+          </a:xfrm>
+          <a:prstGeom prst="rect">
+            <a:avLst/>
+          </a:prstGeom>
+          <a:ln w="57150">
+            <a:solidFill>
+              <a:srgbClr val="002060"/>
+            </a:solidFill>
+          </a:ln>
+        </p:spPr>
+      </p:pic>
+      <p:pic>
+        <p:nvPicPr>
+          <p:cNvPr id="8" name="Image 7"/>
+          <p:cNvPicPr>
+            <a:picLocks noChangeAspect="1"/>
+          </p:cNvPicPr>
+          <p:nvPr/>
+        </p:nvPicPr>
+        <p:blipFill>
+          <a:blip r:embed="rId6" cstate="print"/>
+          <a:stretch>
+            <a:fillRect/>
+          </a:stretch>
+        </p:blipFill>
+        <p:spPr>
+          <a:xfrm>
+            <a:off x="4343400" y="1642418"/>
+            <a:ext cx="4648200" cy="4457700"/>
+          </a:xfrm>
+          <a:prstGeom prst="rect">
+            <a:avLst/>
+          </a:prstGeom>
+          <a:ln w="57150">
+            <a:solidFill>
+              <a:srgbClr val="002060"/>
+            </a:solidFill>
+          </a:ln>
+        </p:spPr>
+      </p:pic>
+      <p:pic>
+        <p:nvPicPr>
+          <p:cNvPr id="9" name="Image 8"/>
+          <p:cNvPicPr/>
+          <p:nvPr/>
+        </p:nvPicPr>
+        <p:blipFill>
+          <a:blip r:embed="rId7" cstate="print"/>
+          <a:stretch>
+            <a:fillRect/>
+          </a:stretch>
+        </p:blipFill>
+        <p:spPr>
+          <a:xfrm>
+            <a:off x="4876800" y="1447800"/>
+            <a:ext cx="3474540" cy="4846936"/>
+          </a:xfrm>
+          <a:prstGeom prst="rect">
+            <a:avLst/>
+          </a:prstGeom>
+          <a:ln w="57150">
+            <a:solidFill>
+              <a:srgbClr val="002060"/>
+            </a:solidFill>
+          </a:ln>
+        </p:spPr>
+      </p:pic>
     </p:spTree>
     <p:extLst>
       <p:ext uri="{BB962C8B-B14F-4D97-AF65-F5344CB8AC3E}">
-        <p14:creationId xmlns="" xmlns:p14="http://schemas.microsoft.com/office/powerpoint/2010/main" val="13878138"/>
+        <p14:creationId xmlns:p14="http://schemas.microsoft.com/office/powerpoint/2010/main" xmlns="" val="2834344091"/>
       </p:ext>
     </p:extLst>
   </p:cSld>
@@ -19050,7 +19033,300 @@
   <p:timing>
     <p:tnLst>
       <p:par>
-        <p:cTn id="1" dur="indefinite" restart="never" nodeType="tmRoot"/>
+        <p:cTn id="1" dur="indefinite" restart="never" nodeType="tmRoot">
+          <p:childTnLst>
+            <p:seq concurrent="1" nextAc="seek">
+              <p:cTn id="2" dur="indefinite" nodeType="mainSeq">
+                <p:childTnLst>
+                  <p:par>
+                    <p:cTn id="3" fill="hold">
+                      <p:stCondLst>
+                        <p:cond delay="indefinite"/>
+                      </p:stCondLst>
+                      <p:childTnLst>
+                        <p:par>
+                          <p:cTn id="4" fill="hold">
+                            <p:stCondLst>
+                              <p:cond delay="0"/>
+                            </p:stCondLst>
+                            <p:childTnLst>
+                              <p:par>
+                                <p:cTn id="5" presetID="1" presetClass="entr" presetSubtype="0" fill="hold" nodeType="clickEffect">
+                                  <p:stCondLst>
+                                    <p:cond delay="0"/>
+                                  </p:stCondLst>
+                                  <p:childTnLst>
+                                    <p:set>
+                                      <p:cBhvr>
+                                        <p:cTn id="6" dur="1" fill="hold">
+                                          <p:stCondLst>
+                                            <p:cond delay="0"/>
+                                          </p:stCondLst>
+                                        </p:cTn>
+                                        <p:tgtEl>
+                                          <p:spTgt spid="4"/>
+                                        </p:tgtEl>
+                                        <p:attrNameLst>
+                                          <p:attrName>style.visibility</p:attrName>
+                                        </p:attrNameLst>
+                                      </p:cBhvr>
+                                      <p:to>
+                                        <p:strVal val="visible"/>
+                                      </p:to>
+                                    </p:set>
+                                  </p:childTnLst>
+                                </p:cTn>
+                              </p:par>
+                            </p:childTnLst>
+                          </p:cTn>
+                        </p:par>
+                      </p:childTnLst>
+                    </p:cTn>
+                  </p:par>
+                  <p:par>
+                    <p:cTn id="7" fill="hold">
+                      <p:stCondLst>
+                        <p:cond delay="indefinite"/>
+                      </p:stCondLst>
+                      <p:childTnLst>
+                        <p:par>
+                          <p:cTn id="8" fill="hold">
+                            <p:stCondLst>
+                              <p:cond delay="0"/>
+                            </p:stCondLst>
+                            <p:childTnLst>
+                              <p:par>
+                                <p:cTn id="9" presetID="1" presetClass="entr" presetSubtype="0" fill="hold" nodeType="clickEffect">
+                                  <p:stCondLst>
+                                    <p:cond delay="0"/>
+                                  </p:stCondLst>
+                                  <p:childTnLst>
+                                    <p:set>
+                                      <p:cBhvr>
+                                        <p:cTn id="10" dur="1" fill="hold">
+                                          <p:stCondLst>
+                                            <p:cond delay="0"/>
+                                          </p:stCondLst>
+                                        </p:cTn>
+                                        <p:tgtEl>
+                                          <p:spTgt spid="5"/>
+                                        </p:tgtEl>
+                                        <p:attrNameLst>
+                                          <p:attrName>style.visibility</p:attrName>
+                                        </p:attrNameLst>
+                                      </p:cBhvr>
+                                      <p:to>
+                                        <p:strVal val="visible"/>
+                                      </p:to>
+                                    </p:set>
+                                  </p:childTnLst>
+                                </p:cTn>
+                              </p:par>
+                            </p:childTnLst>
+                          </p:cTn>
+                        </p:par>
+                      </p:childTnLst>
+                    </p:cTn>
+                  </p:par>
+                  <p:par>
+                    <p:cTn id="11" fill="hold">
+                      <p:stCondLst>
+                        <p:cond delay="indefinite"/>
+                      </p:stCondLst>
+                      <p:childTnLst>
+                        <p:par>
+                          <p:cTn id="12" fill="hold">
+                            <p:stCondLst>
+                              <p:cond delay="0"/>
+                            </p:stCondLst>
+                            <p:childTnLst>
+                              <p:par>
+                                <p:cTn id="13" presetID="1" presetClass="entr" presetSubtype="0" fill="hold" nodeType="clickEffect">
+                                  <p:stCondLst>
+                                    <p:cond delay="0"/>
+                                  </p:stCondLst>
+                                  <p:childTnLst>
+                                    <p:set>
+                                      <p:cBhvr>
+                                        <p:cTn id="14" dur="1" fill="hold">
+                                          <p:stCondLst>
+                                            <p:cond delay="0"/>
+                                          </p:stCondLst>
+                                        </p:cTn>
+                                        <p:tgtEl>
+                                          <p:spTgt spid="6"/>
+                                        </p:tgtEl>
+                                        <p:attrNameLst>
+                                          <p:attrName>style.visibility</p:attrName>
+                                        </p:attrNameLst>
+                                      </p:cBhvr>
+                                      <p:to>
+                                        <p:strVal val="visible"/>
+                                      </p:to>
+                                    </p:set>
+                                  </p:childTnLst>
+                                </p:cTn>
+                              </p:par>
+                            </p:childTnLst>
+                          </p:cTn>
+                        </p:par>
+                      </p:childTnLst>
+                    </p:cTn>
+                  </p:par>
+                  <p:par>
+                    <p:cTn id="15" fill="hold">
+                      <p:stCondLst>
+                        <p:cond delay="indefinite"/>
+                      </p:stCondLst>
+                      <p:childTnLst>
+                        <p:par>
+                          <p:cTn id="16" fill="hold">
+                            <p:stCondLst>
+                              <p:cond delay="0"/>
+                            </p:stCondLst>
+                            <p:childTnLst>
+                              <p:par>
+                                <p:cTn id="17" presetID="1" presetClass="entr" presetSubtype="0" fill="hold" nodeType="clickEffect">
+                                  <p:stCondLst>
+                                    <p:cond delay="0"/>
+                                  </p:stCondLst>
+                                  <p:childTnLst>
+                                    <p:set>
+                                      <p:cBhvr>
+                                        <p:cTn id="18" dur="1" fill="hold">
+                                          <p:stCondLst>
+                                            <p:cond delay="0"/>
+                                          </p:stCondLst>
+                                        </p:cTn>
+                                        <p:tgtEl>
+                                          <p:spTgt spid="7"/>
+                                        </p:tgtEl>
+                                        <p:attrNameLst>
+                                          <p:attrName>style.visibility</p:attrName>
+                                        </p:attrNameLst>
+                                      </p:cBhvr>
+                                      <p:to>
+                                        <p:strVal val="visible"/>
+                                      </p:to>
+                                    </p:set>
+                                  </p:childTnLst>
+                                </p:cTn>
+                              </p:par>
+                            </p:childTnLst>
+                          </p:cTn>
+                        </p:par>
+                      </p:childTnLst>
+                    </p:cTn>
+                  </p:par>
+                  <p:par>
+                    <p:cTn id="19" fill="hold">
+                      <p:stCondLst>
+                        <p:cond delay="indefinite"/>
+                      </p:stCondLst>
+                      <p:childTnLst>
+                        <p:par>
+                          <p:cTn id="20" fill="hold">
+                            <p:stCondLst>
+                              <p:cond delay="0"/>
+                            </p:stCondLst>
+                            <p:childTnLst>
+                              <p:par>
+                                <p:cTn id="21" presetID="1" presetClass="entr" presetSubtype="0" fill="hold" nodeType="clickEffect">
+                                  <p:stCondLst>
+                                    <p:cond delay="0"/>
+                                  </p:stCondLst>
+                                  <p:childTnLst>
+                                    <p:set>
+                                      <p:cBhvr>
+                                        <p:cTn id="22" dur="1" fill="hold">
+                                          <p:stCondLst>
+                                            <p:cond delay="0"/>
+                                          </p:stCondLst>
+                                        </p:cTn>
+                                        <p:tgtEl>
+                                          <p:spTgt spid="8"/>
+                                        </p:tgtEl>
+                                        <p:attrNameLst>
+                                          <p:attrName>style.visibility</p:attrName>
+                                        </p:attrNameLst>
+                                      </p:cBhvr>
+                                      <p:to>
+                                        <p:strVal val="visible"/>
+                                      </p:to>
+                                    </p:set>
+                                  </p:childTnLst>
+                                </p:cTn>
+                              </p:par>
+                            </p:childTnLst>
+                          </p:cTn>
+                        </p:par>
+                      </p:childTnLst>
+                    </p:cTn>
+                  </p:par>
+                  <p:par>
+                    <p:cTn id="23" fill="hold">
+                      <p:stCondLst>
+                        <p:cond delay="indefinite"/>
+                      </p:stCondLst>
+                      <p:childTnLst>
+                        <p:par>
+                          <p:cTn id="24" fill="hold">
+                            <p:stCondLst>
+                              <p:cond delay="0"/>
+                            </p:stCondLst>
+                            <p:childTnLst>
+                              <p:par>
+                                <p:cTn id="25" presetID="1" presetClass="entr" presetSubtype="0" fill="hold" nodeType="clickEffect">
+                                  <p:stCondLst>
+                                    <p:cond delay="0"/>
+                                  </p:stCondLst>
+                                  <p:childTnLst>
+                                    <p:set>
+                                      <p:cBhvr>
+                                        <p:cTn id="26" dur="1" fill="hold">
+                                          <p:stCondLst>
+                                            <p:cond delay="0"/>
+                                          </p:stCondLst>
+                                        </p:cTn>
+                                        <p:tgtEl>
+                                          <p:spTgt spid="9"/>
+                                        </p:tgtEl>
+                                        <p:attrNameLst>
+                                          <p:attrName>style.visibility</p:attrName>
+                                        </p:attrNameLst>
+                                      </p:cBhvr>
+                                      <p:to>
+                                        <p:strVal val="visible"/>
+                                      </p:to>
+                                    </p:set>
+                                  </p:childTnLst>
+                                </p:cTn>
+                              </p:par>
+                            </p:childTnLst>
+                          </p:cTn>
+                        </p:par>
+                      </p:childTnLst>
+                    </p:cTn>
+                  </p:par>
+                </p:childTnLst>
+              </p:cTn>
+              <p:prevCondLst>
+                <p:cond evt="onPrev" delay="0">
+                  <p:tgtEl>
+                    <p:sldTgt/>
+                  </p:tgtEl>
+                </p:cond>
+              </p:prevCondLst>
+              <p:nextCondLst>
+                <p:cond evt="onNext" delay="0">
+                  <p:tgtEl>
+                    <p:sldTgt/>
+                  </p:tgtEl>
+                </p:cond>
+              </p:nextCondLst>
+            </p:seq>
+          </p:childTnLst>
+        </p:cTn>
       </p:par>
     </p:tnLst>
   </p:timing>
@@ -19086,7 +19362,7 @@
           <a:blip r:embed="rId2" cstate="print">
             <a:extLst>
               <a:ext uri="{28A0092B-C50C-407E-A947-70E740481C1C}">
-                <a14:useLocalDpi xmlns="" xmlns:a14="http://schemas.microsoft.com/office/drawing/2010/main" val="0"/>
+                <a14:useLocalDpi xmlns:a14="http://schemas.microsoft.com/office/drawing/2010/main" xmlns="" val="0"/>
               </a:ext>
             </a:extLst>
           </a:blip>
@@ -19143,7 +19419,7 @@
           <p:nvPr>
             <p:extLst>
               <p:ext uri="{D42A27DB-BD31-4B8C-83A1-F6EECF244321}">
-                <p14:modId xmlns="" xmlns:p14="http://schemas.microsoft.com/office/powerpoint/2010/main" val="3204736979"/>
+                <p14:modId xmlns:p14="http://schemas.microsoft.com/office/powerpoint/2010/main" xmlns="" val="3204736979"/>
               </p:ext>
             </p:extLst>
           </p:nvPr>
@@ -19475,7 +19751,7 @@
     </p:spTree>
     <p:extLst>
       <p:ext uri="{BB962C8B-B14F-4D97-AF65-F5344CB8AC3E}">
-        <p14:creationId xmlns="" xmlns:p14="http://schemas.microsoft.com/office/powerpoint/2010/main" val="3195513628"/>
+        <p14:creationId xmlns:p14="http://schemas.microsoft.com/office/powerpoint/2010/main" xmlns="" val="3195513628"/>
       </p:ext>
     </p:extLst>
   </p:cSld>
@@ -19544,7 +19820,9 @@
         </p:nvSpPr>
         <p:spPr/>
         <p:txBody>
-          <a:bodyPr/>
+          <a:bodyPr>
+            <a:normAutofit lnSpcReduction="10000"/>
+          </a:bodyPr>
           <a:lstStyle/>
           <a:p>
             <a:r>
@@ -19552,21 +19830,10 @@
               <a:t>Use </a:t>
             </a:r>
             <a:r>
-              <a:rPr lang="en-US" dirty="0" err="1" smtClean="0"/>
-              <a:t>FieldEditor</a:t>
-            </a:r>
-            <a:r>
-              <a:rPr lang="en-US" dirty="0" smtClean="0"/>
-              <a:t> &amp; </a:t>
-            </a:r>
-            <a:r>
-              <a:rPr lang="en-US" dirty="0" err="1" smtClean="0"/>
-              <a:t>FieldBehaviour</a:t>
-            </a:r>
-            <a:r>
-              <a:rPr lang="en-US" dirty="0" smtClean="0"/>
-              <a:t> to track:</a:t>
-            </a:r>
+              <a:rPr lang="en-US" dirty="0" smtClean="0"/>
+              <a:t>field features to track</a:t>
+            </a:r>
+            <a:endParaRPr lang="en-US" dirty="0" smtClean="0"/>
           </a:p>
           <a:p>
             <a:pPr lvl="1"/>
@@ -19579,30 +19846,60 @@
             <a:pPr lvl="1"/>
             <a:r>
               <a:rPr lang="en-US" dirty="0" smtClean="0"/>
-              <a:t>Validation errors</a:t>
+              <a:t>Validation </a:t>
+            </a:r>
+            <a:r>
+              <a:rPr lang="en-US" dirty="0" smtClean="0"/>
+              <a:t>errors</a:t>
             </a:r>
           </a:p>
           <a:p>
             <a:pPr lvl="1"/>
             <a:r>
               <a:rPr lang="en-US" dirty="0" smtClean="0"/>
-              <a:t>Most common user profiles</a:t>
-            </a:r>
-          </a:p>
-          <a:p>
+              <a:t>Navigation</a:t>
+            </a:r>
             <a:endParaRPr lang="en-US" dirty="0" smtClean="0"/>
           </a:p>
           <a:p>
-            <a:r>
-              <a:rPr lang="en-US" dirty="0" smtClean="0"/>
-              <a:t>Use of tracking results:</a:t>
-            </a:r>
+            <a:endParaRPr lang="en-US" dirty="0" smtClean="0"/>
+          </a:p>
+          <a:p>
+            <a:r>
+              <a:rPr lang="en-US" dirty="0" smtClean="0"/>
+              <a:t>Use of tracking </a:t>
+            </a:r>
+            <a:r>
+              <a:rPr lang="en-US" dirty="0" smtClean="0"/>
+              <a:t>results</a:t>
+            </a:r>
+            <a:endParaRPr lang="en-US" dirty="0" smtClean="0"/>
           </a:p>
           <a:p>
             <a:pPr lvl="1"/>
             <a:r>
               <a:rPr lang="en-US" dirty="0" smtClean="0"/>
-              <a:t>Improve forms for faster input</a:t>
+              <a:t>Find common </a:t>
+            </a:r>
+            <a:r>
+              <a:rPr lang="en-US" dirty="0" smtClean="0"/>
+              <a:t>user </a:t>
+            </a:r>
+            <a:r>
+              <a:rPr lang="en-US" dirty="0" smtClean="0"/>
+              <a:t>profiles</a:t>
+            </a:r>
+            <a:endParaRPr lang="en-US" dirty="0" smtClean="0"/>
+          </a:p>
+          <a:p>
+            <a:pPr lvl="1"/>
+            <a:r>
+              <a:rPr lang="en-US" dirty="0" smtClean="0"/>
+              <a:t>Improve </a:t>
+            </a:r>
+            <a:r>
+              <a:rPr lang="en-US" dirty="0" smtClean="0"/>
+              <a:t>forms for faster input</a:t>
             </a:r>
           </a:p>
           <a:p>
@@ -19620,7 +19917,7 @@
     </p:spTree>
     <p:extLst>
       <p:ext uri="{BB962C8B-B14F-4D97-AF65-F5344CB8AC3E}">
-        <p14:creationId xmlns="" xmlns:p14="http://schemas.microsoft.com/office/powerpoint/2010/main" val="2674396190"/>
+        <p14:creationId xmlns:p14="http://schemas.microsoft.com/office/powerpoint/2010/main" xmlns="" val="2674396190"/>
       </p:ext>
     </p:extLst>
   </p:cSld>
@@ -19690,61 +19987,111 @@
         <p:spPr/>
         <p:txBody>
           <a:bodyPr>
-            <a:normAutofit lnSpcReduction="10000"/>
+            <a:normAutofit fontScale="92500" lnSpcReduction="10000"/>
           </a:bodyPr>
           <a:lstStyle/>
           <a:p>
             <a:r>
               <a:rPr lang="en-US" dirty="0" smtClean="0"/>
-              <a:t>Identify changes improving a website performance</a:t>
+              <a:t>Define two </a:t>
+            </a:r>
+            <a:r>
+              <a:rPr lang="en-US" dirty="0" smtClean="0"/>
+              <a:t>versions of a webpage (A and B) </a:t>
+            </a:r>
+            <a:endParaRPr lang="en-US" dirty="0" smtClean="0"/>
+          </a:p>
+          <a:p>
+            <a:r>
+              <a:rPr lang="en-US" dirty="0" smtClean="0"/>
+              <a:t>Split </a:t>
+            </a:r>
+            <a:r>
+              <a:rPr lang="en-US" dirty="0" smtClean="0"/>
+              <a:t>traffic amongst those versions </a:t>
+            </a:r>
+            <a:endParaRPr lang="en-US" dirty="0" smtClean="0"/>
+          </a:p>
+          <a:p>
+            <a:r>
+              <a:rPr lang="en-US" dirty="0" smtClean="0"/>
+              <a:t>Determine </a:t>
+            </a:r>
+            <a:r>
+              <a:rPr lang="en-US" dirty="0" smtClean="0"/>
+              <a:t>which </a:t>
+            </a:r>
+            <a:r>
+              <a:rPr lang="en-US" dirty="0" smtClean="0"/>
+              <a:t>one was more successful </a:t>
             </a:r>
           </a:p>
           <a:p>
             <a:pPr lvl="1"/>
             <a:r>
               <a:rPr lang="en-US" dirty="0" smtClean="0"/>
-              <a:t>Compare two versions (A and B)</a:t>
+              <a:t>Validate any </a:t>
+            </a:r>
+            <a:r>
+              <a:rPr lang="en-US" dirty="0" smtClean="0"/>
+              <a:t>new </a:t>
+            </a:r>
+            <a:r>
+              <a:rPr lang="en-US" dirty="0" smtClean="0"/>
+              <a:t>design</a:t>
             </a:r>
           </a:p>
           <a:p>
             <a:pPr lvl="1"/>
             <a:r>
               <a:rPr lang="en-US" dirty="0" smtClean="0"/>
-              <a:t>Compare the registration conversion</a:t>
+              <a:t>Improve your conversion rate </a:t>
             </a:r>
           </a:p>
           <a:p>
             <a:pPr lvl="1"/>
-            <a:r>
-              <a:rPr lang="en-US" dirty="0" smtClean="0"/>
-              <a:t>Keep the most efficient version</a:t>
-            </a:r>
-          </a:p>
-          <a:p>
             <a:endParaRPr lang="en-US" dirty="0" smtClean="0"/>
           </a:p>
           <a:p>
             <a:r>
               <a:rPr lang="en-US" dirty="0" smtClean="0"/>
-              <a:t>Can be done using</a:t>
-            </a:r>
+              <a:t>How it can </a:t>
+            </a:r>
+            <a:r>
+              <a:rPr lang="en-US" dirty="0" smtClean="0"/>
+              <a:t>be </a:t>
+            </a:r>
+            <a:r>
+              <a:rPr lang="en-US" dirty="0" smtClean="0"/>
+              <a:t>done?</a:t>
+            </a:r>
+            <a:endParaRPr lang="en-US" dirty="0" smtClean="0"/>
           </a:p>
           <a:p>
             <a:pPr lvl="1"/>
+            <a:r>
+              <a:rPr lang="en-US" dirty="0" smtClean="0"/>
+              <a:t>Define new fields and new </a:t>
+            </a:r>
             <a:r>
               <a:rPr lang="en-US" dirty="0" err="1" smtClean="0"/>
               <a:t>FieldBehaviour</a:t>
             </a:r>
-            <a:r>
-              <a:rPr lang="en-US" dirty="0" smtClean="0"/>
-              <a:t> specific implementation</a:t>
-            </a:r>
+            <a:endParaRPr lang="en-US" dirty="0" smtClean="0"/>
           </a:p>
           <a:p>
             <a:pPr lvl="1"/>
             <a:r>
               <a:rPr lang="en-US" dirty="0" smtClean="0"/>
-              <a:t>Two different scenarios</a:t>
+              <a:t>Define t</a:t>
+            </a:r>
+            <a:r>
+              <a:rPr lang="en-US" dirty="0" smtClean="0"/>
+              <a:t>wo </a:t>
+            </a:r>
+            <a:r>
+              <a:rPr lang="en-US" dirty="0" smtClean="0"/>
+              <a:t>different scenarios</a:t>
             </a:r>
           </a:p>
           <a:p>
@@ -19755,7 +20102,7 @@
     </p:spTree>
     <p:extLst>
       <p:ext uri="{BB962C8B-B14F-4D97-AF65-F5344CB8AC3E}">
-        <p14:creationId xmlns="" xmlns:p14="http://schemas.microsoft.com/office/powerpoint/2010/main" val="2713826086"/>
+        <p14:creationId xmlns:p14="http://schemas.microsoft.com/office/powerpoint/2010/main" xmlns="" val="2713826086"/>
       </p:ext>
     </p:extLst>
   </p:cSld>
@@ -19947,7 +20294,7 @@
     </p:spTree>
     <p:extLst>
       <p:ext uri="{BB962C8B-B14F-4D97-AF65-F5344CB8AC3E}">
-        <p14:creationId xmlns="" xmlns:p14="http://schemas.microsoft.com/office/powerpoint/2010/main" val="714747940"/>
+        <p14:creationId xmlns:p14="http://schemas.microsoft.com/office/powerpoint/2010/main" xmlns="" val="714747940"/>
       </p:ext>
     </p:extLst>
   </p:cSld>
@@ -20486,7 +20833,7 @@
     </p:spTree>
     <p:extLst>
       <p:ext uri="{BB962C8B-B14F-4D97-AF65-F5344CB8AC3E}">
-        <p14:creationId xmlns="" xmlns:p14="http://schemas.microsoft.com/office/powerpoint/2010/main" val="3760395846"/>
+        <p14:creationId xmlns:p14="http://schemas.microsoft.com/office/powerpoint/2010/main" xmlns="" val="3760395846"/>
       </p:ext>
     </p:extLst>
   </p:cSld>
@@ -21319,7 +21666,7 @@
     </p:spTree>
     <p:extLst>
       <p:ext uri="{BB962C8B-B14F-4D97-AF65-F5344CB8AC3E}">
-        <p14:creationId xmlns="" xmlns:p14="http://schemas.microsoft.com/office/powerpoint/2010/main" val="1422967000"/>
+        <p14:creationId xmlns:p14="http://schemas.microsoft.com/office/powerpoint/2010/main" xmlns="" val="1422967000"/>
       </p:ext>
     </p:extLst>
   </p:cSld>
@@ -21470,7 +21817,7 @@
     </p:spTree>
     <p:extLst>
       <p:ext uri="{BB962C8B-B14F-4D97-AF65-F5344CB8AC3E}">
-        <p14:creationId xmlns="" xmlns:p14="http://schemas.microsoft.com/office/powerpoint/2010/main" val="2654585083"/>
+        <p14:creationId xmlns:p14="http://schemas.microsoft.com/office/powerpoint/2010/main" xmlns="" val="2654585083"/>
       </p:ext>
     </p:extLst>
   </p:cSld>
@@ -21630,7 +21977,7 @@
     </p:spTree>
     <p:extLst>
       <p:ext uri="{BB962C8B-B14F-4D97-AF65-F5344CB8AC3E}">
-        <p14:creationId xmlns="" xmlns:p14="http://schemas.microsoft.com/office/powerpoint/2010/main" val="1683021932"/>
+        <p14:creationId xmlns:p14="http://schemas.microsoft.com/office/powerpoint/2010/main" xmlns="" val="1683021932"/>
       </p:ext>
     </p:extLst>
   </p:cSld>
@@ -21704,7 +22051,7 @@
           <a:blip r:embed="rId2" cstate="print">
             <a:extLst>
               <a:ext uri="{28A0092B-C50C-407E-A947-70E740481C1C}">
-                <a14:useLocalDpi xmlns="" xmlns:a14="http://schemas.microsoft.com/office/drawing/2010/main" val="0"/>
+                <a14:useLocalDpi xmlns:a14="http://schemas.microsoft.com/office/drawing/2010/main" xmlns="" val="0"/>
               </a:ext>
             </a:extLst>
           </a:blip>
@@ -22340,7 +22687,7 @@
     </p:spTree>
     <p:extLst>
       <p:ext uri="{BB962C8B-B14F-4D97-AF65-F5344CB8AC3E}">
-        <p14:creationId xmlns="" xmlns:p14="http://schemas.microsoft.com/office/powerpoint/2010/main" val="3007787296"/>
+        <p14:creationId xmlns:p14="http://schemas.microsoft.com/office/powerpoint/2010/main" xmlns="" val="3007787296"/>
       </p:ext>
     </p:extLst>
   </p:cSld>
@@ -22384,14 +22731,25 @@
             <p:ph type="title"/>
           </p:nvPr>
         </p:nvSpPr>
-        <p:spPr/>
-        <p:txBody>
-          <a:bodyPr/>
+        <p:spPr>
+          <a:xfrm>
+            <a:off x="457200" y="2895600"/>
+            <a:ext cx="8229600" cy="1143000"/>
+          </a:xfrm>
+        </p:spPr>
+        <p:txBody>
+          <a:bodyPr>
+            <a:normAutofit/>
+          </a:bodyPr>
           <a:lstStyle/>
           <a:p>
             <a:r>
               <a:rPr lang="en-US" dirty="0" smtClean="0"/>
-              <a:t>Refactoring and Agile practice</a:t>
+              <a:t>Back to </a:t>
+            </a:r>
+            <a:r>
+              <a:rPr lang="en-US" dirty="0" smtClean="0"/>
+              <a:t>LesFurets.com</a:t>
             </a:r>
             <a:endParaRPr lang="en-US" dirty="0"/>
           </a:p>
@@ -22399,57 +22757,94 @@
       </p:sp>
       <p:sp>
         <p:nvSpPr>
-          <p:cNvPr id="3" name="Espace réservé du contenu 2"/>
-          <p:cNvSpPr>
-            <a:spLocks noGrp="1"/>
-          </p:cNvSpPr>
-          <p:nvPr>
-            <p:ph idx="1"/>
-          </p:nvPr>
-        </p:nvSpPr>
-        <p:spPr/>
-        <p:txBody>
-          <a:bodyPr/>
+          <p:cNvPr id="3" name="Forme en L 2"/>
+          <p:cNvSpPr/>
+          <p:nvPr/>
+        </p:nvSpPr>
+        <p:spPr>
+          <a:xfrm>
+            <a:off x="1295400" y="3523129"/>
+            <a:ext cx="914400" cy="914400"/>
+          </a:xfrm>
+          <a:prstGeom prst="corner">
+            <a:avLst/>
+          </a:prstGeom>
+          <a:ln>
+            <a:noFill/>
+          </a:ln>
+        </p:spPr>
+        <p:style>
+          <a:lnRef idx="2">
+            <a:schemeClr val="accent1">
+              <a:shade val="50000"/>
+            </a:schemeClr>
+          </a:lnRef>
+          <a:fillRef idx="1">
+            <a:schemeClr val="accent1"/>
+          </a:fillRef>
+          <a:effectRef idx="0">
+            <a:schemeClr val="accent1"/>
+          </a:effectRef>
+          <a:fontRef idx="minor">
+            <a:schemeClr val="lt1"/>
+          </a:fontRef>
+        </p:style>
+        <p:txBody>
+          <a:bodyPr rtlCol="0" anchor="ctr"/>
           <a:lstStyle/>
           <a:p>
-            <a:r>
-              <a:rPr lang="en-US" dirty="0" smtClean="0"/>
-              <a:t>Opportunity based</a:t>
-            </a:r>
-          </a:p>
-          <a:p>
-            <a:r>
-              <a:rPr lang="en-US" dirty="0" smtClean="0"/>
-              <a:t>12 iterations with production deployment</a:t>
-            </a:r>
-          </a:p>
-          <a:p>
-            <a:r>
-              <a:rPr lang="en-US" dirty="0" smtClean="0"/>
-              <a:t>1 year of step by step refactoring</a:t>
-            </a:r>
-          </a:p>
-          <a:p>
-            <a:r>
-              <a:rPr lang="en-US" dirty="0" smtClean="0"/>
-              <a:t>Test coverage from 10% to 50% (in progress)</a:t>
-            </a:r>
-          </a:p>
-          <a:p>
-            <a:r>
-              <a:rPr lang="en-US" dirty="0" smtClean="0"/>
-              <a:t>Automated testing on more than 400 fields in 5 complex forms</a:t>
-            </a:r>
-          </a:p>
-          <a:p>
-            <a:endParaRPr lang="en-US" dirty="0"/>
+            <a:pPr algn="ctr"/>
+            <a:endParaRPr lang="en-US"/>
+          </a:p>
+        </p:txBody>
+      </p:sp>
+      <p:sp>
+        <p:nvSpPr>
+          <p:cNvPr id="4" name="Forme en L 3"/>
+          <p:cNvSpPr/>
+          <p:nvPr/>
+        </p:nvSpPr>
+        <p:spPr>
+          <a:xfrm rot="10800000">
+            <a:off x="7010400" y="2608729"/>
+            <a:ext cx="914400" cy="914400"/>
+          </a:xfrm>
+          <a:prstGeom prst="corner">
+            <a:avLst/>
+          </a:prstGeom>
+          <a:ln>
+            <a:noFill/>
+          </a:ln>
+        </p:spPr>
+        <p:style>
+          <a:lnRef idx="2">
+            <a:schemeClr val="accent1">
+              <a:shade val="50000"/>
+            </a:schemeClr>
+          </a:lnRef>
+          <a:fillRef idx="1">
+            <a:schemeClr val="accent1"/>
+          </a:fillRef>
+          <a:effectRef idx="0">
+            <a:schemeClr val="accent1"/>
+          </a:effectRef>
+          <a:fontRef idx="minor">
+            <a:schemeClr val="lt1"/>
+          </a:fontRef>
+        </p:style>
+        <p:txBody>
+          <a:bodyPr rtlCol="0" anchor="ctr"/>
+          <a:lstStyle/>
+          <a:p>
+            <a:pPr algn="ctr"/>
+            <a:endParaRPr lang="en-US"/>
           </a:p>
         </p:txBody>
       </p:sp>
     </p:spTree>
     <p:extLst>
       <p:ext uri="{BB962C8B-B14F-4D97-AF65-F5344CB8AC3E}">
-        <p14:creationId xmlns="" xmlns:p14="http://schemas.microsoft.com/office/powerpoint/2010/main" val="40929930"/>
+        <p14:creationId xmlns:p14="http://schemas.microsoft.com/office/powerpoint/2010/main" xmlns="" val="1326827891"/>
       </p:ext>
     </p:extLst>
   </p:cSld>
@@ -22500,7 +22895,7 @@
           <a:p>
             <a:r>
               <a:rPr lang="en-US" dirty="0" smtClean="0"/>
-              <a:t>Complexity and bug hell	</a:t>
+              <a:t>Nature of dependencies	</a:t>
             </a:r>
             <a:endParaRPr lang="en-US" dirty="0"/>
           </a:p>
@@ -22516,127 +22911,79 @@
             <p:ph idx="1"/>
           </p:nvPr>
         </p:nvSpPr>
-        <p:spPr>
-          <a:xfrm>
-            <a:off x="457200" y="1600200"/>
-            <a:ext cx="4038600" cy="4525963"/>
-          </a:xfrm>
-        </p:spPr>
+        <p:spPr/>
         <p:txBody>
           <a:bodyPr>
-            <a:normAutofit fontScale="77500" lnSpcReduction="20000"/>
+            <a:normAutofit fontScale="85000" lnSpcReduction="20000"/>
           </a:bodyPr>
           <a:lstStyle/>
           <a:p>
             <a:r>
               <a:rPr lang="en-US" dirty="0" smtClean="0"/>
-              <a:t>Historical design was based on a page scope</a:t>
-            </a:r>
-          </a:p>
-          <a:p>
-            <a:r>
-              <a:rPr lang="en-US" dirty="0" smtClean="0"/>
-              <a:t>All the rules between fields were embedded in each page code</a:t>
-            </a:r>
-          </a:p>
-          <a:p>
-            <a:r>
-              <a:rPr lang="en-US" dirty="0" smtClean="0"/>
-              <a:t>Business rules were directly written on the widget values without MVC pattern</a:t>
-            </a:r>
-          </a:p>
-          <a:p>
-            <a:r>
-              <a:rPr lang="en-US" dirty="0" smtClean="0"/>
-              <a:t>Page navigation was triggering model updates that were sent to the server</a:t>
-            </a:r>
-            <a:endParaRPr lang="en-US" dirty="0"/>
-          </a:p>
-        </p:txBody>
-      </p:sp>
-      <p:sp>
-        <p:nvSpPr>
-          <p:cNvPr id="4" name="ZoneTexte 3"/>
-          <p:cNvSpPr txBox="1"/>
-          <p:nvPr/>
-        </p:nvSpPr>
-        <p:spPr>
-          <a:xfrm>
-            <a:off x="4724400" y="1507153"/>
-            <a:ext cx="3962400" cy="4893647"/>
-          </a:xfrm>
-          <a:prstGeom prst="rect">
-            <a:avLst/>
-          </a:prstGeom>
-          <a:noFill/>
-          <a:ln w="57150">
-            <a:solidFill>
-              <a:srgbClr val="C00000"/>
-            </a:solidFill>
-          </a:ln>
-        </p:spPr>
-        <p:txBody>
-          <a:bodyPr wrap="square" rtlCol="0">
-            <a:spAutoFit/>
-          </a:bodyPr>
-          <a:lstStyle/>
-          <a:p>
-            <a:pPr marL="285750" indent="-285750">
-              <a:buFont typeface="Arial" pitchFamily="34" charset="0"/>
-              <a:buChar char="•"/>
+              <a:t>Visibility</a:t>
+            </a:r>
+          </a:p>
+          <a:p>
+            <a:pPr lvl="1">
+              <a:buFont typeface="Wingdings" pitchFamily="2" charset="2"/>
+              <a:buChar char="§"/>
             </a:pPr>
             <a:r>
-              <a:rPr lang="en-US" sz="2400" dirty="0" smtClean="0"/>
-              <a:t>Governance of the business rules between fields was difficult</a:t>
-            </a:r>
-          </a:p>
-          <a:p>
-            <a:pPr marL="285750" indent="-285750">
-              <a:buFont typeface="Arial" pitchFamily="34" charset="0"/>
-              <a:buChar char="•"/>
+              <a:rPr lang="en-US" dirty="0" smtClean="0"/>
+              <a:t>I declare a claim -&gt; question set for this child appears</a:t>
+            </a:r>
+          </a:p>
+          <a:p>
+            <a:r>
+              <a:rPr lang="en-US" dirty="0" smtClean="0"/>
+              <a:t>Value range</a:t>
+            </a:r>
+          </a:p>
+          <a:p>
+            <a:pPr lvl="1"/>
+            <a:r>
+              <a:rPr lang="en-US" dirty="0" smtClean="0"/>
+              <a:t>I’ve been owning a car for one year -&gt; constraint on the date for a claim should be later than the car’s purchase date</a:t>
+            </a:r>
+          </a:p>
+          <a:p>
+            <a:r>
+              <a:rPr lang="en-US" dirty="0" smtClean="0"/>
+              <a:t>Reset</a:t>
+            </a:r>
+          </a:p>
+          <a:p>
+            <a:pPr lvl="1">
+              <a:buFont typeface="Wingdings" pitchFamily="2" charset="2"/>
+              <a:buChar char="§"/>
             </a:pPr>
             <a:r>
-              <a:rPr lang="en-US" sz="2400" dirty="0" smtClean="0"/>
-              <a:t>Lots of side effects between rules</a:t>
-            </a:r>
-          </a:p>
-          <a:p>
-            <a:pPr marL="285750" indent="-285750">
-              <a:buFont typeface="Arial" pitchFamily="34" charset="0"/>
-              <a:buChar char="•"/>
+              <a:rPr lang="en-US" dirty="0" smtClean="0"/>
+              <a:t>I change the number of occurred claims from 2 to 1 -&gt; previous details of claim number 2 should be dropped</a:t>
+            </a:r>
+          </a:p>
+          <a:p>
+            <a:r>
+              <a:rPr lang="en-US" dirty="0" smtClean="0"/>
+              <a:t>Validation</a:t>
+            </a:r>
+          </a:p>
+          <a:p>
+            <a:pPr lvl="1">
+              <a:buFont typeface="Wingdings" pitchFamily="2" charset="2"/>
+              <a:buChar char="§"/>
             </a:pPr>
             <a:r>
-              <a:rPr lang="en-US" sz="2400" dirty="0" smtClean="0"/>
-              <a:t>Improving or adding new rules provided a lot of regressions</a:t>
-            </a:r>
-          </a:p>
-          <a:p>
-            <a:pPr marL="285750" indent="-285750">
-              <a:buFont typeface="Arial" pitchFamily="34" charset="0"/>
-              <a:buChar char="•"/>
-            </a:pPr>
-            <a:r>
-              <a:rPr lang="en-US" sz="2400" dirty="0" smtClean="0"/>
-              <a:t>Dependencies between fields was not documented</a:t>
-            </a:r>
-          </a:p>
-          <a:p>
-            <a:pPr marL="285750" indent="-285750">
-              <a:buFont typeface="Arial" pitchFamily="34" charset="0"/>
-              <a:buChar char="•"/>
-            </a:pPr>
-            <a:r>
-              <a:rPr lang="en-US" sz="2400" dirty="0" smtClean="0"/>
-              <a:t>Adding new fields or shuffling the fields order required a lot of testing</a:t>
-            </a:r>
-            <a:endParaRPr lang="en-US" sz="2400" dirty="0"/>
+              <a:rPr lang="en-US" dirty="0" smtClean="0"/>
+              <a:t>I change my date of birth -&gt; I could not obtain my car license before being 18 years old</a:t>
+            </a:r>
           </a:p>
         </p:txBody>
       </p:sp>
     </p:spTree>
     <p:extLst>
       <p:ext uri="{BB962C8B-B14F-4D97-AF65-F5344CB8AC3E}">
-        <p14:creationId xmlns="" xmlns:p14="http://schemas.microsoft.com/office/powerpoint/2010/main" val="4255503392"/>
+        <p14:creationId xmlns:p14="http://schemas.microsoft.com/office/powerpoint/2010/main" xmlns="" val="13878138"/>
       </p:ext>
     </p:extLst>
   </p:cSld>
@@ -22687,7 +23034,7 @@
           <a:p>
             <a:r>
               <a:rPr lang="en-US" dirty="0" smtClean="0"/>
-              <a:t>Project implementation timeline</a:t>
+              <a:t>Refactoring and Agile practice</a:t>
             </a:r>
             <a:endParaRPr lang="en-US" dirty="0"/>
           </a:p>
@@ -22708,6 +23055,36 @@
           <a:bodyPr/>
           <a:lstStyle/>
           <a:p>
+            <a:r>
+              <a:rPr lang="en-US" dirty="0" smtClean="0"/>
+              <a:t>Opportunity based</a:t>
+            </a:r>
+          </a:p>
+          <a:p>
+            <a:r>
+              <a:rPr lang="en-US" dirty="0" smtClean="0"/>
+              <a:t>12 iterations with production deployment</a:t>
+            </a:r>
+          </a:p>
+          <a:p>
+            <a:r>
+              <a:rPr lang="en-US" dirty="0" smtClean="0"/>
+              <a:t>1 year of step by step refactoring</a:t>
+            </a:r>
+          </a:p>
+          <a:p>
+            <a:r>
+              <a:rPr lang="en-US" dirty="0" smtClean="0"/>
+              <a:t>Test coverage from 10% to 50% (in progress)</a:t>
+            </a:r>
+          </a:p>
+          <a:p>
+            <a:r>
+              <a:rPr lang="en-US" dirty="0" smtClean="0"/>
+              <a:t>Automated testing on more than 400 fields in 5 complex forms</a:t>
+            </a:r>
+          </a:p>
+          <a:p>
             <a:endParaRPr lang="en-US" dirty="0"/>
           </a:p>
         </p:txBody>
@@ -22715,13 +23092,20 @@
     </p:spTree>
     <p:extLst>
       <p:ext uri="{BB962C8B-B14F-4D97-AF65-F5344CB8AC3E}">
-        <p14:creationId xmlns="" xmlns:p14="http://schemas.microsoft.com/office/powerpoint/2010/main" val="1336479164"/>
+        <p14:creationId xmlns:p14="http://schemas.microsoft.com/office/powerpoint/2010/main" xmlns="" val="40929930"/>
       </p:ext>
     </p:extLst>
   </p:cSld>
   <p:clrMapOvr>
     <a:masterClrMapping/>
   </p:clrMapOvr>
+  <p:timing>
+    <p:tnLst>
+      <p:par>
+        <p:cTn id="1" dur="indefinite" restart="never" nodeType="tmRoot"/>
+      </p:par>
+    </p:tnLst>
+  </p:timing>
 </p:sld>
 </file>
 
@@ -22759,7 +23143,7 @@
           <a:p>
             <a:r>
               <a:rPr lang="en-US" dirty="0" smtClean="0"/>
-              <a:t>Under investigation</a:t>
+              <a:t>Project implementation timeline</a:t>
             </a:r>
             <a:endParaRPr lang="en-US" dirty="0"/>
           </a:p>
@@ -22780,6 +23164,78 @@
           <a:bodyPr/>
           <a:lstStyle/>
           <a:p>
+            <a:endParaRPr lang="en-US" dirty="0"/>
+          </a:p>
+        </p:txBody>
+      </p:sp>
+    </p:spTree>
+    <p:extLst>
+      <p:ext uri="{BB962C8B-B14F-4D97-AF65-F5344CB8AC3E}">
+        <p14:creationId xmlns:p14="http://schemas.microsoft.com/office/powerpoint/2010/main" xmlns="" val="1336479164"/>
+      </p:ext>
+    </p:extLst>
+  </p:cSld>
+  <p:clrMapOvr>
+    <a:masterClrMapping/>
+  </p:clrMapOvr>
+</p:sld>
+</file>
+
+<file path=ppt/slides/slide62.xml><?xml version="1.0" encoding="utf-8"?>
+<p:sld xmlns:a="http://schemas.openxmlformats.org/drawingml/2006/main" xmlns:r="http://schemas.openxmlformats.org/officeDocument/2006/relationships" xmlns:p="http://schemas.openxmlformats.org/presentationml/2006/main">
+  <p:cSld>
+    <p:spTree>
+      <p:nvGrpSpPr>
+        <p:cNvPr id="1" name=""/>
+        <p:cNvGrpSpPr/>
+        <p:nvPr/>
+      </p:nvGrpSpPr>
+      <p:grpSpPr>
+        <a:xfrm>
+          <a:off x="0" y="0"/>
+          <a:ext cx="0" cy="0"/>
+          <a:chOff x="0" y="0"/>
+          <a:chExt cx="0" cy="0"/>
+        </a:xfrm>
+      </p:grpSpPr>
+      <p:sp>
+        <p:nvSpPr>
+          <p:cNvPr id="2" name="Titre 1"/>
+          <p:cNvSpPr>
+            <a:spLocks noGrp="1"/>
+          </p:cNvSpPr>
+          <p:nvPr>
+            <p:ph type="title"/>
+          </p:nvPr>
+        </p:nvSpPr>
+        <p:spPr/>
+        <p:txBody>
+          <a:bodyPr/>
+          <a:lstStyle/>
+          <a:p>
+            <a:r>
+              <a:rPr lang="en-US" dirty="0" smtClean="0"/>
+              <a:t>Under investigation</a:t>
+            </a:r>
+            <a:endParaRPr lang="en-US" dirty="0"/>
+          </a:p>
+        </p:txBody>
+      </p:sp>
+      <p:sp>
+        <p:nvSpPr>
+          <p:cNvPr id="3" name="Espace réservé du contenu 2"/>
+          <p:cNvSpPr>
+            <a:spLocks noGrp="1"/>
+          </p:cNvSpPr>
+          <p:nvPr>
+            <p:ph idx="1"/>
+          </p:nvPr>
+        </p:nvSpPr>
+        <p:spPr/>
+        <p:txBody>
+          <a:bodyPr/>
+          <a:lstStyle/>
+          <a:p>
             <a:r>
               <a:rPr lang="en-US" dirty="0" smtClean="0"/>
               <a:t>Multi Variable Testing</a:t>
@@ -22814,7 +23270,7 @@
     </p:spTree>
     <p:extLst>
       <p:ext uri="{BB962C8B-B14F-4D97-AF65-F5344CB8AC3E}">
-        <p14:creationId xmlns="" xmlns:p14="http://schemas.microsoft.com/office/powerpoint/2010/main" val="4014343169"/>
+        <p14:creationId xmlns:p14="http://schemas.microsoft.com/office/powerpoint/2010/main" xmlns="" val="4014343169"/>
       </p:ext>
     </p:extLst>
   </p:cSld>
@@ -22831,7 +23287,7 @@
 </p:sld>
 </file>
 
-<file path=ppt/slides/slide62.xml><?xml version="1.0" encoding="utf-8"?>
+<file path=ppt/slides/slide63.xml><?xml version="1.0" encoding="utf-8"?>
 <p:sld xmlns:a="http://schemas.openxmlformats.org/drawingml/2006/main" xmlns:r="http://schemas.openxmlformats.org/officeDocument/2006/relationships" xmlns:p="http://schemas.openxmlformats.org/presentationml/2006/main">
   <p:cSld>
     <p:spTree>
@@ -22965,7 +23421,7 @@
     </p:spTree>
     <p:extLst>
       <p:ext uri="{BB962C8B-B14F-4D97-AF65-F5344CB8AC3E}">
-        <p14:creationId xmlns="" xmlns:p14="http://schemas.microsoft.com/office/powerpoint/2010/main" val="2781303602"/>
+        <p14:creationId xmlns:p14="http://schemas.microsoft.com/office/powerpoint/2010/main" xmlns="" val="2781303602"/>
       </p:ext>
     </p:extLst>
   </p:cSld>
@@ -23011,14 +23467,12 @@
         </p:nvSpPr>
         <p:spPr/>
         <p:txBody>
-          <a:bodyPr>
-            <a:normAutofit fontScale="90000"/>
-          </a:bodyPr>
+          <a:bodyPr/>
           <a:lstStyle/>
           <a:p>
             <a:r>
               <a:rPr lang="en-US" dirty="0" smtClean="0"/>
-              <a:t>The CSS ids : a limited starting point</a:t>
+              <a:t>Complexity and bug hell	</a:t>
             </a:r>
             <a:endParaRPr lang="en-US" dirty="0"/>
           </a:p>
@@ -23036,46 +23490,39 @@
         </p:nvSpPr>
         <p:spPr>
           <a:xfrm>
-            <a:off x="457200" y="1600201"/>
-            <a:ext cx="8229600" cy="3276600"/>
+            <a:off x="457200" y="1600200"/>
+            <a:ext cx="4038600" cy="4525963"/>
           </a:xfrm>
         </p:spPr>
         <p:txBody>
-          <a:bodyPr/>
+          <a:bodyPr>
+            <a:normAutofit fontScale="77500" lnSpcReduction="20000"/>
+          </a:bodyPr>
           <a:lstStyle/>
           <a:p>
             <a:r>
               <a:rPr lang="en-US" dirty="0" smtClean="0"/>
-              <a:t>All the form fields were still having a CSS class and an ID for CSS skinning</a:t>
-            </a:r>
-          </a:p>
-          <a:p>
-            <a:pPr lvl="1"/>
-            <a:r>
-              <a:rPr lang="en-US" dirty="0" smtClean="0"/>
-              <a:t>No real taxonomy</a:t>
-            </a:r>
-          </a:p>
-          <a:p>
-            <a:pPr lvl="1"/>
-            <a:r>
-              <a:rPr lang="en-US" dirty="0" smtClean="0"/>
-              <a:t>No guaranty that CSS ids are unique</a:t>
-            </a:r>
-          </a:p>
-          <a:p>
-            <a:pPr lvl="1"/>
-            <a:r>
-              <a:rPr lang="en-US" dirty="0" smtClean="0"/>
-              <a:t>Styling is evolving with his own constraints</a:t>
-            </a:r>
-          </a:p>
-          <a:p>
-            <a:pPr lvl="1"/>
-            <a:r>
-              <a:rPr lang="en-US" dirty="0" smtClean="0"/>
-              <a:t>Not the original purpose of CSS</a:t>
-            </a:r>
+              <a:t>Historical design was based on a page scope</a:t>
+            </a:r>
+          </a:p>
+          <a:p>
+            <a:r>
+              <a:rPr lang="en-US" dirty="0" smtClean="0"/>
+              <a:t>All the rules between fields were embedded in each page code</a:t>
+            </a:r>
+          </a:p>
+          <a:p>
+            <a:r>
+              <a:rPr lang="en-US" dirty="0" smtClean="0"/>
+              <a:t>Business rules were directly written on the widget values without MVC pattern</a:t>
+            </a:r>
+          </a:p>
+          <a:p>
+            <a:r>
+              <a:rPr lang="en-US" dirty="0" smtClean="0"/>
+              <a:t>Page navigation was triggering model updates that were sent to the server</a:t>
+            </a:r>
+            <a:endParaRPr lang="en-US" dirty="0"/>
           </a:p>
         </p:txBody>
       </p:sp>
@@ -23087,8 +23534,8 @@
         </p:nvSpPr>
         <p:spPr>
           <a:xfrm>
-            <a:off x="2667001" y="5533947"/>
-            <a:ext cx="5867400" cy="954107"/>
+            <a:off x="4724400" y="1507153"/>
+            <a:ext cx="3962400" cy="4893647"/>
           </a:xfrm>
           <a:prstGeom prst="rect">
             <a:avLst/>
@@ -23106,26 +23553,62 @@
           </a:bodyPr>
           <a:lstStyle/>
           <a:p>
-            <a:r>
-              <a:rPr lang="en-US" sz="2800" dirty="0" smtClean="0"/>
-              <a:t>Using CSS on web forms hides</a:t>
-            </a:r>
-            <a:r>
-              <a:rPr lang="en-US" sz="2800" dirty="0"/>
-              <a:t> </a:t>
-            </a:r>
-            <a:r>
-              <a:rPr lang="en-US" sz="2800" dirty="0" smtClean="0"/>
-              <a:t>an implicit model that could be leveraged</a:t>
-            </a:r>
-            <a:endParaRPr lang="en-US" sz="2800" dirty="0"/>
+            <a:pPr marL="285750" indent="-285750">
+              <a:buFont typeface="Arial" pitchFamily="34" charset="0"/>
+              <a:buChar char="•"/>
+            </a:pPr>
+            <a:r>
+              <a:rPr lang="en-US" sz="2400" dirty="0" smtClean="0"/>
+              <a:t>Governance of the business rules between fields was difficult</a:t>
+            </a:r>
+          </a:p>
+          <a:p>
+            <a:pPr marL="285750" indent="-285750">
+              <a:buFont typeface="Arial" pitchFamily="34" charset="0"/>
+              <a:buChar char="•"/>
+            </a:pPr>
+            <a:r>
+              <a:rPr lang="en-US" sz="2400" dirty="0" smtClean="0"/>
+              <a:t>Lots of side effects between rules</a:t>
+            </a:r>
+          </a:p>
+          <a:p>
+            <a:pPr marL="285750" indent="-285750">
+              <a:buFont typeface="Arial" pitchFamily="34" charset="0"/>
+              <a:buChar char="•"/>
+            </a:pPr>
+            <a:r>
+              <a:rPr lang="en-US" sz="2400" dirty="0" smtClean="0"/>
+              <a:t>Improving or adding new rules provided a lot of regressions</a:t>
+            </a:r>
+          </a:p>
+          <a:p>
+            <a:pPr marL="285750" indent="-285750">
+              <a:buFont typeface="Arial" pitchFamily="34" charset="0"/>
+              <a:buChar char="•"/>
+            </a:pPr>
+            <a:r>
+              <a:rPr lang="en-US" sz="2400" dirty="0" smtClean="0"/>
+              <a:t>Dependencies between fields was not documented</a:t>
+            </a:r>
+          </a:p>
+          <a:p>
+            <a:pPr marL="285750" indent="-285750">
+              <a:buFont typeface="Arial" pitchFamily="34" charset="0"/>
+              <a:buChar char="•"/>
+            </a:pPr>
+            <a:r>
+              <a:rPr lang="en-US" sz="2400" dirty="0" smtClean="0"/>
+              <a:t>Adding new fields or shuffling the fields order required a lot of testing</a:t>
+            </a:r>
+            <a:endParaRPr lang="en-US" sz="2400" dirty="0"/>
           </a:p>
         </p:txBody>
       </p:sp>
     </p:spTree>
     <p:extLst>
       <p:ext uri="{BB962C8B-B14F-4D97-AF65-F5344CB8AC3E}">
-        <p14:creationId xmlns="" xmlns:p14="http://schemas.microsoft.com/office/powerpoint/2010/main" val="2375505937"/>
+        <p14:creationId xmlns:p14="http://schemas.microsoft.com/office/powerpoint/2010/main" xmlns="" val="4255503392"/>
       </p:ext>
     </p:extLst>
   </p:cSld>
@@ -23171,12 +23654,14 @@
         </p:nvSpPr>
         <p:spPr/>
         <p:txBody>
-          <a:bodyPr/>
+          <a:bodyPr>
+            <a:normAutofit fontScale="90000"/>
+          </a:bodyPr>
           <a:lstStyle/>
           <a:p>
             <a:r>
               <a:rPr lang="en-US" dirty="0" smtClean="0"/>
-              <a:t>Requirements</a:t>
+              <a:t>The CSS ids : a limited starting point</a:t>
             </a:r>
             <a:endParaRPr lang="en-US" dirty="0"/>
           </a:p>
@@ -23192,85 +23677,104 @@
             <p:ph idx="1"/>
           </p:nvPr>
         </p:nvSpPr>
-        <p:spPr/>
-        <p:txBody>
-          <a:bodyPr>
-            <a:normAutofit fontScale="92500" lnSpcReduction="10000"/>
+        <p:spPr>
+          <a:xfrm>
+            <a:off x="457200" y="1600201"/>
+            <a:ext cx="8229600" cy="3276600"/>
+          </a:xfrm>
+        </p:spPr>
+        <p:txBody>
+          <a:bodyPr/>
+          <a:lstStyle/>
+          <a:p>
+            <a:r>
+              <a:rPr lang="en-US" dirty="0" smtClean="0"/>
+              <a:t>All the form fields were still having a CSS class and an ID for CSS skinning</a:t>
+            </a:r>
+          </a:p>
+          <a:p>
+            <a:pPr lvl="1"/>
+            <a:r>
+              <a:rPr lang="en-US" dirty="0" smtClean="0"/>
+              <a:t>No real taxonomy</a:t>
+            </a:r>
+          </a:p>
+          <a:p>
+            <a:pPr lvl="1"/>
+            <a:r>
+              <a:rPr lang="en-US" dirty="0" smtClean="0"/>
+              <a:t>No guaranty that CSS ids are unique</a:t>
+            </a:r>
+          </a:p>
+          <a:p>
+            <a:pPr lvl="1"/>
+            <a:r>
+              <a:rPr lang="en-US" dirty="0" smtClean="0"/>
+              <a:t>Styling is evolving with his own constraints</a:t>
+            </a:r>
+          </a:p>
+          <a:p>
+            <a:pPr lvl="1"/>
+            <a:r>
+              <a:rPr lang="en-US" dirty="0" smtClean="0"/>
+              <a:t>Not the original purpose of CSS</a:t>
+            </a:r>
+          </a:p>
+        </p:txBody>
+      </p:sp>
+      <p:sp>
+        <p:nvSpPr>
+          <p:cNvPr id="4" name="ZoneTexte 3"/>
+          <p:cNvSpPr txBox="1"/>
+          <p:nvPr/>
+        </p:nvSpPr>
+        <p:spPr>
+          <a:xfrm>
+            <a:off x="2667001" y="5533947"/>
+            <a:ext cx="5867400" cy="954107"/>
+          </a:xfrm>
+          <a:prstGeom prst="rect">
+            <a:avLst/>
+          </a:prstGeom>
+          <a:noFill/>
+          <a:ln w="57150">
+            <a:solidFill>
+              <a:srgbClr val="C00000"/>
+            </a:solidFill>
+          </a:ln>
+        </p:spPr>
+        <p:txBody>
+          <a:bodyPr wrap="square" rtlCol="0">
+            <a:spAutoFit/>
           </a:bodyPr>
           <a:lstStyle/>
           <a:p>
             <a:r>
-              <a:rPr lang="en-US" dirty="0" smtClean="0"/>
-              <a:t>Ensuring non regression even with frequent changes on forms</a:t>
-            </a:r>
-          </a:p>
-          <a:p>
-            <a:pPr lvl="1"/>
-            <a:r>
-              <a:rPr lang="en-US" dirty="0" smtClean="0"/>
-              <a:t>No unexpected side effects between business rules</a:t>
-            </a:r>
-          </a:p>
-          <a:p>
-            <a:pPr lvl="1"/>
-            <a:r>
-              <a:rPr lang="en-US" dirty="0" smtClean="0"/>
-              <a:t>Make unit testing possible</a:t>
-            </a:r>
-          </a:p>
-          <a:p>
-            <a:r>
-              <a:rPr lang="en-US" dirty="0" smtClean="0"/>
-              <a:t>Enabling a fast and up-to-date understanding of the form complexity</a:t>
-            </a:r>
-          </a:p>
-          <a:p>
-            <a:r>
-              <a:rPr lang="en-US" dirty="0" smtClean="0"/>
-              <a:t>Reducing the maintenance effort</a:t>
-            </a:r>
-          </a:p>
-          <a:p>
-            <a:r>
-              <a:rPr lang="en-US" dirty="0" smtClean="0"/>
-              <a:t>Supporting fields shuffle</a:t>
-            </a:r>
-          </a:p>
-          <a:p>
-            <a:r>
-              <a:rPr lang="en-US" dirty="0"/>
-              <a:t>Supporting AB </a:t>
-            </a:r>
-            <a:r>
-              <a:rPr lang="en-US" dirty="0" smtClean="0"/>
-              <a:t>testing</a:t>
-            </a:r>
-            <a:endParaRPr lang="en-US" dirty="0"/>
-          </a:p>
-          <a:p>
-            <a:pPr lvl="1"/>
-            <a:endParaRPr lang="en-US" dirty="0"/>
+              <a:rPr lang="en-US" sz="2800" dirty="0" smtClean="0"/>
+              <a:t>Using CSS on web forms hides</a:t>
+            </a:r>
+            <a:r>
+              <a:rPr lang="en-US" sz="2800" dirty="0"/>
+              <a:t> </a:t>
+            </a:r>
+            <a:r>
+              <a:rPr lang="en-US" sz="2800" dirty="0" smtClean="0"/>
+              <a:t>an implicit model that could be leveraged</a:t>
+            </a:r>
+            <a:endParaRPr lang="en-US" sz="2800" dirty="0"/>
           </a:p>
         </p:txBody>
       </p:sp>
     </p:spTree>
     <p:extLst>
       <p:ext uri="{BB962C8B-B14F-4D97-AF65-F5344CB8AC3E}">
-        <p14:creationId xmlns="" xmlns:p14="http://schemas.microsoft.com/office/powerpoint/2010/main" val="1618189430"/>
+        <p14:creationId xmlns:p14="http://schemas.microsoft.com/office/powerpoint/2010/main" xmlns="" val="2375505937"/>
       </p:ext>
     </p:extLst>
   </p:cSld>
   <p:clrMapOvr>
     <a:masterClrMapping/>
   </p:clrMapOvr>
-  <mc:AlternateContent xmlns:mc="http://schemas.openxmlformats.org/markup-compatibility/2006">
-    <mc:Choice xmlns="" xmlns:p14="http://schemas.microsoft.com/office/powerpoint/2010/main" Requires="p14">
-      <p:transition spd="slow" p14:dur="2000"/>
-    </mc:Choice>
-    <mc:Fallback>
-      <p:transition spd="slow"/>
-    </mc:Fallback>
-  </mc:AlternateContent>
   <p:timing>
     <p:tnLst>
       <p:par>
@@ -23315,7 +23819,7 @@
           <a:p>
             <a:r>
               <a:rPr lang="en-US" dirty="0" smtClean="0"/>
-              <a:t>MDL4UI our OSS sandbox</a:t>
+              <a:t>Requirements</a:t>
             </a:r>
             <a:endParaRPr lang="en-US" dirty="0"/>
           </a:p>
@@ -23334,116 +23838,82 @@
         <p:spPr/>
         <p:txBody>
           <a:bodyPr>
-            <a:normAutofit/>
+            <a:normAutofit fontScale="92500" lnSpcReduction="10000"/>
           </a:bodyPr>
           <a:lstStyle/>
           <a:p>
             <a:r>
               <a:rPr lang="en-US" dirty="0" smtClean="0"/>
-              <a:t>Available on </a:t>
-            </a:r>
-            <a:r>
-              <a:rPr lang="en-US" dirty="0" err="1" smtClean="0"/>
-              <a:t>github</a:t>
-            </a:r>
-            <a:endParaRPr lang="en-US" dirty="0" smtClean="0"/>
+              <a:t>Ensuring non regression even with frequent changes on forms</a:t>
+            </a:r>
           </a:p>
           <a:p>
             <a:pPr lvl="1"/>
             <a:r>
-              <a:rPr lang="en-US" dirty="0" smtClean="0">
-                <a:hlinkClick r:id="rId2"/>
-              </a:rPr>
-              <a:t>http://github.com/lesfurets/mdl4ui</a:t>
-            </a:r>
-            <a:endParaRPr lang="en-US" dirty="0" smtClean="0"/>
-          </a:p>
-          <a:p>
-            <a:r>
-              <a:rPr lang="en-US" dirty="0" smtClean="0"/>
-              <a:t>Full framework and example</a:t>
-            </a:r>
-          </a:p>
-          <a:p>
-            <a:r>
-              <a:rPr lang="en-US" dirty="0" smtClean="0"/>
-              <a:t>Based on GWT and Twitter bootstrap</a:t>
-            </a:r>
-          </a:p>
-          <a:p>
-            <a:r>
-              <a:rPr lang="en-US" dirty="0" smtClean="0"/>
-              <a:t>Ready to fork and play</a:t>
-            </a:r>
-          </a:p>
-          <a:p>
-            <a:r>
-              <a:rPr lang="en-US" dirty="0" smtClean="0"/>
-              <a:t>Requires Java 6+ and Maven</a:t>
+              <a:rPr lang="en-US" dirty="0" smtClean="0"/>
+              <a:t>No unexpected side effects between business rules</a:t>
+            </a:r>
+          </a:p>
+          <a:p>
+            <a:pPr lvl="1"/>
+            <a:r>
+              <a:rPr lang="en-US" dirty="0" smtClean="0"/>
+              <a:t>Make unit testing possible</a:t>
+            </a:r>
+          </a:p>
+          <a:p>
+            <a:r>
+              <a:rPr lang="en-US" dirty="0" smtClean="0"/>
+              <a:t>Enabling a fast and up-to-date understanding of the form complexity</a:t>
+            </a:r>
+          </a:p>
+          <a:p>
+            <a:r>
+              <a:rPr lang="en-US" dirty="0" smtClean="0"/>
+              <a:t>Reducing the maintenance effort</a:t>
+            </a:r>
+          </a:p>
+          <a:p>
+            <a:r>
+              <a:rPr lang="en-US" dirty="0" smtClean="0"/>
+              <a:t>Supporting fields shuffle</a:t>
+            </a:r>
+          </a:p>
+          <a:p>
+            <a:r>
+              <a:rPr lang="en-US" dirty="0"/>
+              <a:t>Supporting AB </a:t>
+            </a:r>
+            <a:r>
+              <a:rPr lang="en-US" dirty="0" smtClean="0"/>
+              <a:t>testing</a:t>
             </a:r>
             <a:endParaRPr lang="en-US" dirty="0"/>
           </a:p>
           <a:p>
-            <a:r>
-              <a:rPr lang="en-US" dirty="0"/>
-              <a:t>5</a:t>
-            </a:r>
-            <a:r>
-              <a:rPr lang="en-US" dirty="0" smtClean="0"/>
-              <a:t>0 sec to build and run from scratch</a:t>
-            </a:r>
-          </a:p>
-        </p:txBody>
-      </p:sp>
-      <p:sp>
-        <p:nvSpPr>
-          <p:cNvPr id="4" name="Rectangle 3"/>
-          <p:cNvSpPr/>
-          <p:nvPr/>
-        </p:nvSpPr>
-        <p:spPr>
-          <a:xfrm>
-            <a:off x="2109947" y="5867400"/>
-            <a:ext cx="4924105" cy="584775"/>
-          </a:xfrm>
-          <a:prstGeom prst="rect">
-            <a:avLst/>
-          </a:prstGeom>
-          <a:ln w="57150">
-            <a:solidFill>
-              <a:srgbClr val="C00000"/>
-            </a:solidFill>
-          </a:ln>
-        </p:spPr>
-        <p:txBody>
-          <a:bodyPr wrap="none">
-            <a:spAutoFit/>
-          </a:bodyPr>
-          <a:lstStyle/>
-          <a:p>
-            <a:pPr algn="ctr"/>
-            <a:r>
-              <a:rPr lang="en-US" sz="3200" b="1" dirty="0"/>
-              <a:t>WE ACCEPT PULL </a:t>
-            </a:r>
-            <a:r>
-              <a:rPr lang="en-US" sz="3200" b="1" dirty="0" smtClean="0"/>
-              <a:t>REQUESTS</a:t>
-            </a:r>
-            <a:endParaRPr lang="en-US" sz="3200" b="1" dirty="0"/>
+            <a:pPr lvl="1"/>
+            <a:endParaRPr lang="en-US" dirty="0"/>
           </a:p>
         </p:txBody>
       </p:sp>
     </p:spTree>
     <p:extLst>
       <p:ext uri="{BB962C8B-B14F-4D97-AF65-F5344CB8AC3E}">
-        <p14:creationId xmlns="" xmlns:p14="http://schemas.microsoft.com/office/powerpoint/2010/main" val="3644490438"/>
+        <p14:creationId xmlns:p14="http://schemas.microsoft.com/office/powerpoint/2010/main" xmlns="" val="1618189430"/>
       </p:ext>
     </p:extLst>
   </p:cSld>
   <p:clrMapOvr>
     <a:masterClrMapping/>
   </p:clrMapOvr>
+  <mc:AlternateContent xmlns:mc="http://schemas.openxmlformats.org/markup-compatibility/2006">
+    <mc:Choice xmlns:p14="http://schemas.microsoft.com/office/powerpoint/2010/main" xmlns="" Requires="p14">
+      <p:transition spd="slow" p14:dur="2000"/>
+    </mc:Choice>
+    <mc:Fallback>
+      <p:transition spd="slow"/>
+    </mc:Fallback>
+  </mc:AlternateContent>
   <p:timing>
     <p:tnLst>
       <p:par>

</xml_diff>

<commit_message>
add agenda, rework transition slides
</commit_message>
<xml_diff>
--- a/mdl4ui-docs/mdl4ui_cg2013.pptx
+++ b/mdl4ui-docs/mdl4ui_cg2013.pptx
@@ -5,10 +5,10 @@
     <p:sldMasterId id="2147483648" r:id="rId1"/>
   </p:sldMasterIdLst>
   <p:notesMasterIdLst>
-    <p:notesMasterId r:id="rId65"/>
+    <p:notesMasterId r:id="rId66"/>
   </p:notesMasterIdLst>
   <p:handoutMasterIdLst>
-    <p:handoutMasterId r:id="rId66"/>
+    <p:handoutMasterId r:id="rId67"/>
   </p:handoutMasterIdLst>
   <p:sldIdLst>
     <p:sldId id="256" r:id="rId2"/>
@@ -22,7 +22,7 @@
     <p:sldId id="263" r:id="rId10"/>
     <p:sldId id="264" r:id="rId11"/>
     <p:sldId id="266" r:id="rId12"/>
-    <p:sldId id="319" r:id="rId13"/>
+    <p:sldId id="326" r:id="rId13"/>
     <p:sldId id="312" r:id="rId14"/>
     <p:sldId id="313" r:id="rId15"/>
     <p:sldId id="315" r:id="rId16"/>
@@ -35,7 +35,7 @@
     <p:sldId id="272" r:id="rId23"/>
     <p:sldId id="274" r:id="rId24"/>
     <p:sldId id="273" r:id="rId25"/>
-    <p:sldId id="318" r:id="rId26"/>
+    <p:sldId id="327" r:id="rId26"/>
     <p:sldId id="275" r:id="rId27"/>
     <p:sldId id="276" r:id="rId28"/>
     <p:sldId id="277" r:id="rId29"/>
@@ -48,7 +48,7 @@
     <p:sldId id="282" r:id="rId36"/>
     <p:sldId id="285" r:id="rId37"/>
     <p:sldId id="286" r:id="rId38"/>
-    <p:sldId id="317" r:id="rId39"/>
+    <p:sldId id="328" r:id="rId39"/>
     <p:sldId id="284" r:id="rId40"/>
     <p:sldId id="288" r:id="rId41"/>
     <p:sldId id="295" r:id="rId42"/>
@@ -59,7 +59,7 @@
     <p:sldId id="297" r:id="rId47"/>
     <p:sldId id="304" r:id="rId48"/>
     <p:sldId id="305" r:id="rId49"/>
-    <p:sldId id="320" r:id="rId50"/>
+    <p:sldId id="329" r:id="rId50"/>
     <p:sldId id="283" r:id="rId51"/>
     <p:sldId id="300" r:id="rId52"/>
     <p:sldId id="299" r:id="rId53"/>
@@ -69,11 +69,12 @@
     <p:sldId id="301" r:id="rId57"/>
     <p:sldId id="307" r:id="rId58"/>
     <p:sldId id="309" r:id="rId59"/>
-    <p:sldId id="325" r:id="rId60"/>
-    <p:sldId id="302" r:id="rId61"/>
-    <p:sldId id="321" r:id="rId62"/>
-    <p:sldId id="303" r:id="rId63"/>
-    <p:sldId id="322" r:id="rId64"/>
+    <p:sldId id="330" r:id="rId60"/>
+    <p:sldId id="331" r:id="rId61"/>
+    <p:sldId id="302" r:id="rId62"/>
+    <p:sldId id="321" r:id="rId63"/>
+    <p:sldId id="303" r:id="rId64"/>
+    <p:sldId id="322" r:id="rId65"/>
   </p:sldIdLst>
   <p:sldSz cx="9144000" cy="6858000" type="screen4x3"/>
   <p:notesSz cx="6807200" cy="9939338"/>
@@ -334,7 +335,7 @@
     </p:spTree>
     <p:extLst>
       <p:ext uri="{BB962C8B-B14F-4D97-AF65-F5344CB8AC3E}">
-        <p14:creationId xmlns:p14="http://schemas.microsoft.com/office/powerpoint/2010/main" xmlns="" val="70803672"/>
+        <p14:creationId xmlns="" xmlns:p14="http://schemas.microsoft.com/office/powerpoint/2010/main" val="70803672"/>
       </p:ext>
     </p:extLst>
   </p:cSld>
@@ -594,7 +595,7 @@
     </p:spTree>
     <p:extLst>
       <p:ext uri="{BB962C8B-B14F-4D97-AF65-F5344CB8AC3E}">
-        <p14:creationId xmlns:p14="http://schemas.microsoft.com/office/powerpoint/2010/main" xmlns="" val="1701488114"/>
+        <p14:creationId xmlns="" xmlns:p14="http://schemas.microsoft.com/office/powerpoint/2010/main" val="1701488114"/>
       </p:ext>
     </p:extLst>
   </p:cSld>
@@ -769,7 +770,7 @@
     </p:spTree>
     <p:extLst>
       <p:ext uri="{BB962C8B-B14F-4D97-AF65-F5344CB8AC3E}">
-        <p14:creationId xmlns:p14="http://schemas.microsoft.com/office/powerpoint/2010/main" xmlns="" val="3047004223"/>
+        <p14:creationId xmlns="" xmlns:p14="http://schemas.microsoft.com/office/powerpoint/2010/main" val="3047004223"/>
       </p:ext>
     </p:extLst>
   </p:cSld>
@@ -854,7 +855,7 @@
     </p:spTree>
     <p:extLst>
       <p:ext uri="{BB962C8B-B14F-4D97-AF65-F5344CB8AC3E}">
-        <p14:creationId xmlns:p14="http://schemas.microsoft.com/office/powerpoint/2010/main" xmlns="" val="3280979232"/>
+        <p14:creationId xmlns="" xmlns:p14="http://schemas.microsoft.com/office/powerpoint/2010/main" val="3280979232"/>
       </p:ext>
     </p:extLst>
   </p:cSld>
@@ -939,7 +940,7 @@
     </p:spTree>
     <p:extLst>
       <p:ext uri="{BB962C8B-B14F-4D97-AF65-F5344CB8AC3E}">
-        <p14:creationId xmlns:p14="http://schemas.microsoft.com/office/powerpoint/2010/main" xmlns="" val="1987381696"/>
+        <p14:creationId xmlns="" xmlns:p14="http://schemas.microsoft.com/office/powerpoint/2010/main" val="1987381696"/>
       </p:ext>
     </p:extLst>
   </p:cSld>
@@ -1265,7 +1266,7 @@
     </p:spTree>
     <p:extLst>
       <p:ext uri="{BB962C8B-B14F-4D97-AF65-F5344CB8AC3E}">
-        <p14:creationId xmlns:p14="http://schemas.microsoft.com/office/powerpoint/2010/main" xmlns="" val="322609761"/>
+        <p14:creationId xmlns="" xmlns:p14="http://schemas.microsoft.com/office/powerpoint/2010/main" val="322609761"/>
       </p:ext>
     </p:extLst>
   </p:cSld>
@@ -1437,7 +1438,7 @@
     </p:spTree>
     <p:extLst>
       <p:ext uri="{BB962C8B-B14F-4D97-AF65-F5344CB8AC3E}">
-        <p14:creationId xmlns:p14="http://schemas.microsoft.com/office/powerpoint/2010/main" xmlns="" val="1248456722"/>
+        <p14:creationId xmlns="" xmlns:p14="http://schemas.microsoft.com/office/powerpoint/2010/main" val="1248456722"/>
       </p:ext>
     </p:extLst>
   </p:cSld>
@@ -1619,7 +1620,7 @@
     </p:spTree>
     <p:extLst>
       <p:ext uri="{BB962C8B-B14F-4D97-AF65-F5344CB8AC3E}">
-        <p14:creationId xmlns:p14="http://schemas.microsoft.com/office/powerpoint/2010/main" xmlns="" val="4236232986"/>
+        <p14:creationId xmlns="" xmlns:p14="http://schemas.microsoft.com/office/powerpoint/2010/main" val="4236232986"/>
       </p:ext>
     </p:extLst>
   </p:cSld>
@@ -1791,7 +1792,7 @@
     </p:spTree>
     <p:extLst>
       <p:ext uri="{BB962C8B-B14F-4D97-AF65-F5344CB8AC3E}">
-        <p14:creationId xmlns:p14="http://schemas.microsoft.com/office/powerpoint/2010/main" xmlns="" val="3454835055"/>
+        <p14:creationId xmlns="" xmlns:p14="http://schemas.microsoft.com/office/powerpoint/2010/main" val="3454835055"/>
       </p:ext>
     </p:extLst>
   </p:cSld>
@@ -2046,7 +2047,7 @@
     </p:spTree>
     <p:extLst>
       <p:ext uri="{BB962C8B-B14F-4D97-AF65-F5344CB8AC3E}">
-        <p14:creationId xmlns:p14="http://schemas.microsoft.com/office/powerpoint/2010/main" xmlns="" val="804127244"/>
+        <p14:creationId xmlns="" xmlns:p14="http://schemas.microsoft.com/office/powerpoint/2010/main" val="804127244"/>
       </p:ext>
     </p:extLst>
   </p:cSld>
@@ -2336,7 +2337,7 @@
     </p:spTree>
     <p:extLst>
       <p:ext uri="{BB962C8B-B14F-4D97-AF65-F5344CB8AC3E}">
-        <p14:creationId xmlns:p14="http://schemas.microsoft.com/office/powerpoint/2010/main" xmlns="" val="586698658"/>
+        <p14:creationId xmlns="" xmlns:p14="http://schemas.microsoft.com/office/powerpoint/2010/main" val="586698658"/>
       </p:ext>
     </p:extLst>
   </p:cSld>
@@ -2760,7 +2761,7 @@
     </p:spTree>
     <p:extLst>
       <p:ext uri="{BB962C8B-B14F-4D97-AF65-F5344CB8AC3E}">
-        <p14:creationId xmlns:p14="http://schemas.microsoft.com/office/powerpoint/2010/main" xmlns="" val="19144436"/>
+        <p14:creationId xmlns="" xmlns:p14="http://schemas.microsoft.com/office/powerpoint/2010/main" val="19144436"/>
       </p:ext>
     </p:extLst>
   </p:cSld>
@@ -2880,7 +2881,7 @@
     </p:spTree>
     <p:extLst>
       <p:ext uri="{BB962C8B-B14F-4D97-AF65-F5344CB8AC3E}">
-        <p14:creationId xmlns:p14="http://schemas.microsoft.com/office/powerpoint/2010/main" xmlns="" val="202749597"/>
+        <p14:creationId xmlns="" xmlns:p14="http://schemas.microsoft.com/office/powerpoint/2010/main" val="202749597"/>
       </p:ext>
     </p:extLst>
   </p:cSld>
@@ -2977,7 +2978,7 @@
     </p:spTree>
     <p:extLst>
       <p:ext uri="{BB962C8B-B14F-4D97-AF65-F5344CB8AC3E}">
-        <p14:creationId xmlns:p14="http://schemas.microsoft.com/office/powerpoint/2010/main" xmlns="" val="2898363528"/>
+        <p14:creationId xmlns="" xmlns:p14="http://schemas.microsoft.com/office/powerpoint/2010/main" val="2898363528"/>
       </p:ext>
     </p:extLst>
   </p:cSld>
@@ -3256,7 +3257,7 @@
     </p:spTree>
     <p:extLst>
       <p:ext uri="{BB962C8B-B14F-4D97-AF65-F5344CB8AC3E}">
-        <p14:creationId xmlns:p14="http://schemas.microsoft.com/office/powerpoint/2010/main" xmlns="" val="4010598191"/>
+        <p14:creationId xmlns="" xmlns:p14="http://schemas.microsoft.com/office/powerpoint/2010/main" val="4010598191"/>
       </p:ext>
     </p:extLst>
   </p:cSld>
@@ -3511,7 +3512,7 @@
     </p:spTree>
     <p:extLst>
       <p:ext uri="{BB962C8B-B14F-4D97-AF65-F5344CB8AC3E}">
-        <p14:creationId xmlns:p14="http://schemas.microsoft.com/office/powerpoint/2010/main" xmlns="" val="1433498939"/>
+        <p14:creationId xmlns="" xmlns:p14="http://schemas.microsoft.com/office/powerpoint/2010/main" val="1433498939"/>
       </p:ext>
     </p:extLst>
   </p:cSld>
@@ -3762,7 +3763,7 @@
     </p:spTree>
     <p:extLst>
       <p:ext uri="{BB962C8B-B14F-4D97-AF65-F5344CB8AC3E}">
-        <p14:creationId xmlns:p14="http://schemas.microsoft.com/office/powerpoint/2010/main" xmlns="" val="2684825788"/>
+        <p14:creationId xmlns="" xmlns:p14="http://schemas.microsoft.com/office/powerpoint/2010/main" val="2684825788"/>
       </p:ext>
     </p:extLst>
   </p:cSld>
@@ -4133,7 +4134,7 @@
     </p:spTree>
     <p:extLst>
       <p:ext uri="{BB962C8B-B14F-4D97-AF65-F5344CB8AC3E}">
-        <p14:creationId xmlns:p14="http://schemas.microsoft.com/office/powerpoint/2010/main" xmlns="" val="3955344790"/>
+        <p14:creationId xmlns="" xmlns:p14="http://schemas.microsoft.com/office/powerpoint/2010/main" val="3955344790"/>
       </p:ext>
     </p:extLst>
   </p:cSld>
@@ -4141,7 +4142,7 @@
     <a:masterClrMapping/>
   </p:clrMapOvr>
   <mc:AlternateContent xmlns:mc="http://schemas.openxmlformats.org/markup-compatibility/2006">
-    <mc:Choice xmlns:p14="http://schemas.microsoft.com/office/powerpoint/2010/main" xmlns="" Requires="p14">
+    <mc:Choice xmlns="" xmlns:p14="http://schemas.microsoft.com/office/powerpoint/2010/main" Requires="p14">
       <p:transition spd="slow" p14:dur="2000"/>
     </mc:Choice>
     <mc:Fallback>
@@ -4314,7 +4315,7 @@
     </p:spTree>
     <p:extLst>
       <p:ext uri="{BB962C8B-B14F-4D97-AF65-F5344CB8AC3E}">
-        <p14:creationId xmlns:p14="http://schemas.microsoft.com/office/powerpoint/2010/main" xmlns="" val="3644490438"/>
+        <p14:creationId xmlns="" xmlns:p14="http://schemas.microsoft.com/office/powerpoint/2010/main" val="3644490438"/>
       </p:ext>
     </p:extLst>
   </p:cSld>
@@ -4716,7 +4717,7 @@
     </p:spTree>
     <p:extLst>
       <p:ext uri="{BB962C8B-B14F-4D97-AF65-F5344CB8AC3E}">
-        <p14:creationId xmlns:p14="http://schemas.microsoft.com/office/powerpoint/2010/main" xmlns="" val="1728169033"/>
+        <p14:creationId xmlns="" xmlns:p14="http://schemas.microsoft.com/office/powerpoint/2010/main" val="1728169033"/>
       </p:ext>
     </p:extLst>
   </p:cSld>
@@ -4752,51 +4753,157 @@
       </p:grpSpPr>
       <p:sp>
         <p:nvSpPr>
-          <p:cNvPr id="2" name="Titre 1"/>
+          <p:cNvPr id="3" name="Espace réservé du contenu 2"/>
           <p:cNvSpPr>
             <a:spLocks noGrp="1"/>
           </p:cNvSpPr>
           <p:nvPr>
-            <p:ph type="title"/>
+            <p:ph sz="half" idx="1"/>
           </p:nvPr>
         </p:nvSpPr>
         <p:spPr>
           <a:xfrm>
-            <a:off x="457200" y="2895600"/>
-            <a:ext cx="8229600" cy="1143000"/>
+            <a:off x="457200" y="381000"/>
+            <a:ext cx="8229600" cy="6096000"/>
           </a:xfrm>
         </p:spPr>
         <p:txBody>
-          <a:bodyPr>
-            <a:normAutofit fontScale="90000"/>
+          <a:bodyPr anchor="ctr">
+            <a:noAutofit/>
           </a:bodyPr>
           <a:lstStyle/>
           <a:p>
-            <a:r>
-              <a:rPr lang="en-US" sz="4900" dirty="0" smtClean="0"/>
+            <a:pPr algn="ctr">
+              <a:lnSpc>
+                <a:spcPct val="150000"/>
+              </a:lnSpc>
+              <a:buNone/>
+            </a:pPr>
+            <a:r>
+              <a:rPr lang="en-US" sz="3200" dirty="0" smtClean="0">
+                <a:solidFill>
+                  <a:schemeClr val="bg1">
+                    <a:lumMod val="75000"/>
+                  </a:schemeClr>
+                </a:solidFill>
+              </a:rPr>
+              <a:t>Context</a:t>
+            </a:r>
+          </a:p>
+          <a:p>
+            <a:pPr algn="ctr">
+              <a:lnSpc>
+                <a:spcPct val="150000"/>
+              </a:lnSpc>
+              <a:buNone/>
+            </a:pPr>
+            <a:r>
+              <a:rPr lang="en-US" sz="3200" dirty="0" smtClean="0"/>
               <a:t>Modeling approach</a:t>
             </a:r>
-            <a:r>
-              <a:rPr lang="en-US" dirty="0" smtClean="0"/>
-              <a:t/>
-            </a:r>
-            <a:br>
-              <a:rPr lang="en-US" dirty="0" smtClean="0"/>
-            </a:br>
-            <a:endParaRPr lang="en-US" dirty="0"/>
-          </a:p>
-        </p:txBody>
-      </p:sp>
-      <p:sp>
-        <p:nvSpPr>
-          <p:cNvPr id="3" name="Forme en L 2"/>
+          </a:p>
+          <a:p>
+            <a:pPr algn="ctr">
+              <a:lnSpc>
+                <a:spcPct val="150000"/>
+              </a:lnSpc>
+              <a:buNone/>
+            </a:pPr>
+            <a:r>
+              <a:rPr lang="en-US" sz="3200" dirty="0" smtClean="0">
+                <a:solidFill>
+                  <a:schemeClr val="bg1">
+                    <a:lumMod val="75000"/>
+                  </a:schemeClr>
+                </a:solidFill>
+              </a:rPr>
+              <a:t>Dependency Model</a:t>
+            </a:r>
+          </a:p>
+          <a:p>
+            <a:pPr algn="ctr">
+              <a:lnSpc>
+                <a:spcPct val="150000"/>
+              </a:lnSpc>
+              <a:buNone/>
+            </a:pPr>
+            <a:r>
+              <a:rPr lang="en-US" sz="3200" dirty="0" smtClean="0">
+                <a:solidFill>
+                  <a:schemeClr val="bg1">
+                    <a:lumMod val="75000"/>
+                  </a:schemeClr>
+                </a:solidFill>
+              </a:rPr>
+              <a:t>Field features</a:t>
+            </a:r>
+          </a:p>
+          <a:p>
+            <a:pPr algn="ctr">
+              <a:lnSpc>
+                <a:spcPct val="150000"/>
+              </a:lnSpc>
+              <a:buNone/>
+            </a:pPr>
+            <a:r>
+              <a:rPr lang="en-US" sz="3200" dirty="0" smtClean="0">
+                <a:solidFill>
+                  <a:schemeClr val="bg1">
+                    <a:lumMod val="75000"/>
+                  </a:schemeClr>
+                </a:solidFill>
+              </a:rPr>
+              <a:t>Extensions</a:t>
+            </a:r>
+          </a:p>
+          <a:p>
+            <a:pPr algn="ctr">
+              <a:lnSpc>
+                <a:spcPct val="150000"/>
+              </a:lnSpc>
+              <a:buNone/>
+            </a:pPr>
+            <a:r>
+              <a:rPr lang="en-US" sz="3200" dirty="0" smtClean="0">
+                <a:solidFill>
+                  <a:schemeClr val="bg1">
+                    <a:lumMod val="75000"/>
+                  </a:schemeClr>
+                </a:solidFill>
+              </a:rPr>
+              <a:t>Live coding demo</a:t>
+            </a:r>
+          </a:p>
+          <a:p>
+            <a:pPr algn="ctr">
+              <a:lnSpc>
+                <a:spcPct val="150000"/>
+              </a:lnSpc>
+              <a:buNone/>
+            </a:pPr>
+            <a:r>
+              <a:rPr lang="en-US" sz="3200" dirty="0" smtClean="0">
+                <a:solidFill>
+                  <a:schemeClr val="bg1">
+                    <a:lumMod val="75000"/>
+                  </a:schemeClr>
+                </a:solidFill>
+              </a:rPr>
+              <a:t>Back to LesFurets.com</a:t>
+            </a:r>
+          </a:p>
+        </p:txBody>
+      </p:sp>
+      <p:sp>
+        <p:nvSpPr>
+          <p:cNvPr id="6" name="Forme en L 5"/>
           <p:cNvSpPr/>
           <p:nvPr/>
         </p:nvSpPr>
         <p:spPr>
           <a:xfrm>
-            <a:off x="1600200" y="3200400"/>
-            <a:ext cx="914400" cy="914400"/>
+            <a:off x="2514600" y="1828800"/>
+            <a:ext cx="533400" cy="533400"/>
           </a:xfrm>
           <a:prstGeom prst="corner">
             <a:avLst/>
@@ -4832,14 +4939,14 @@
       </p:sp>
       <p:sp>
         <p:nvSpPr>
-          <p:cNvPr id="4" name="Forme en L 3"/>
+          <p:cNvPr id="7" name="Forme en L 6"/>
           <p:cNvSpPr/>
           <p:nvPr/>
         </p:nvSpPr>
         <p:spPr>
           <a:xfrm rot="10800000">
-            <a:off x="6705600" y="2286000"/>
-            <a:ext cx="914400" cy="914400"/>
+            <a:off x="6096000" y="1371600"/>
+            <a:ext cx="533400" cy="533400"/>
           </a:xfrm>
           <a:prstGeom prst="corner">
             <a:avLst/>
@@ -4874,11 +4981,6 @@
         </p:txBody>
       </p:sp>
     </p:spTree>
-    <p:extLst>
-      <p:ext uri="{BB962C8B-B14F-4D97-AF65-F5344CB8AC3E}">
-        <p14:creationId xmlns:p14="http://schemas.microsoft.com/office/powerpoint/2010/main" xmlns="" val="3774437115"/>
-      </p:ext>
-    </p:extLst>
   </p:cSld>
   <p:clrMapOvr>
     <a:masterClrMapping/>
@@ -4959,7 +5061,7 @@
             <a:blip r:embed="rId2" cstate="print">
               <a:extLst>
                 <a:ext uri="{28A0092B-C50C-407E-A947-70E740481C1C}">
-                  <a14:useLocalDpi xmlns:a14="http://schemas.microsoft.com/office/drawing/2010/main" xmlns="" val="0"/>
+                  <a14:useLocalDpi xmlns="" xmlns:a14="http://schemas.microsoft.com/office/drawing/2010/main" val="0"/>
                 </a:ext>
               </a:extLst>
             </a:blip>
@@ -4989,7 +5091,7 @@
             <a:blip r:embed="rId3" cstate="print">
               <a:extLst>
                 <a:ext uri="{28A0092B-C50C-407E-A947-70E740481C1C}">
-                  <a14:useLocalDpi xmlns:a14="http://schemas.microsoft.com/office/drawing/2010/main" xmlns="" val="0"/>
+                  <a14:useLocalDpi xmlns="" xmlns:a14="http://schemas.microsoft.com/office/drawing/2010/main" val="0"/>
                 </a:ext>
               </a:extLst>
             </a:blip>
@@ -5019,7 +5121,7 @@
             <a:blip r:embed="rId4" cstate="print">
               <a:extLst>
                 <a:ext uri="{28A0092B-C50C-407E-A947-70E740481C1C}">
-                  <a14:useLocalDpi xmlns:a14="http://schemas.microsoft.com/office/drawing/2010/main" xmlns="" val="0"/>
+                  <a14:useLocalDpi xmlns="" xmlns:a14="http://schemas.microsoft.com/office/drawing/2010/main" val="0"/>
                 </a:ext>
               </a:extLst>
             </a:blip>
@@ -5142,7 +5244,7 @@
     </p:spTree>
     <p:extLst>
       <p:ext uri="{BB962C8B-B14F-4D97-AF65-F5344CB8AC3E}">
-        <p14:creationId xmlns:p14="http://schemas.microsoft.com/office/powerpoint/2010/main" xmlns="" val="1377264780"/>
+        <p14:creationId xmlns="" xmlns:p14="http://schemas.microsoft.com/office/powerpoint/2010/main" val="1377264780"/>
       </p:ext>
     </p:extLst>
   </p:cSld>
@@ -5340,7 +5442,7 @@
           <a:blip r:embed="rId2" cstate="print">
             <a:extLst>
               <a:ext uri="{28A0092B-C50C-407E-A947-70E740481C1C}">
-                <a14:useLocalDpi xmlns:a14="http://schemas.microsoft.com/office/drawing/2010/main" xmlns="" val="0"/>
+                <a14:useLocalDpi xmlns="" xmlns:a14="http://schemas.microsoft.com/office/drawing/2010/main" val="0"/>
               </a:ext>
             </a:extLst>
           </a:blip>
@@ -5370,7 +5472,7 @@
           <a:blip r:embed="rId3" cstate="print">
             <a:extLst>
               <a:ext uri="{28A0092B-C50C-407E-A947-70E740481C1C}">
-                <a14:useLocalDpi xmlns:a14="http://schemas.microsoft.com/office/drawing/2010/main" xmlns="" val="0"/>
+                <a14:useLocalDpi xmlns="" xmlns:a14="http://schemas.microsoft.com/office/drawing/2010/main" val="0"/>
               </a:ext>
             </a:extLst>
           </a:blip>
@@ -5496,7 +5598,7 @@
           <a:blip r:embed="rId4" cstate="print">
             <a:extLst>
               <a:ext uri="{28A0092B-C50C-407E-A947-70E740481C1C}">
-                <a14:useLocalDpi xmlns:a14="http://schemas.microsoft.com/office/drawing/2010/main" xmlns="" val="0"/>
+                <a14:useLocalDpi xmlns="" xmlns:a14="http://schemas.microsoft.com/office/drawing/2010/main" val="0"/>
               </a:ext>
             </a:extLst>
           </a:blip>
@@ -5609,7 +5711,7 @@
     </p:spTree>
     <p:extLst>
       <p:ext uri="{BB962C8B-B14F-4D97-AF65-F5344CB8AC3E}">
-        <p14:creationId xmlns:p14="http://schemas.microsoft.com/office/powerpoint/2010/main" xmlns="" val="3336203041"/>
+        <p14:creationId xmlns="" xmlns:p14="http://schemas.microsoft.com/office/powerpoint/2010/main" val="3336203041"/>
       </p:ext>
     </p:extLst>
   </p:cSld>
@@ -6027,7 +6129,7 @@
           <a:blip r:embed="rId2" cstate="print">
             <a:extLst>
               <a:ext uri="{28A0092B-C50C-407E-A947-70E740481C1C}">
-                <a14:useLocalDpi xmlns:a14="http://schemas.microsoft.com/office/drawing/2010/main" xmlns="" val="0"/>
+                <a14:useLocalDpi xmlns="" xmlns:a14="http://schemas.microsoft.com/office/drawing/2010/main" val="0"/>
               </a:ext>
             </a:extLst>
           </a:blip>
@@ -6057,7 +6159,7 @@
           <a:blip r:embed="rId3" cstate="print">
             <a:extLst>
               <a:ext uri="{28A0092B-C50C-407E-A947-70E740481C1C}">
-                <a14:useLocalDpi xmlns:a14="http://schemas.microsoft.com/office/drawing/2010/main" xmlns="" val="0"/>
+                <a14:useLocalDpi xmlns="" xmlns:a14="http://schemas.microsoft.com/office/drawing/2010/main" val="0"/>
               </a:ext>
             </a:extLst>
           </a:blip>
@@ -6087,7 +6189,7 @@
           <a:blip r:embed="rId4" cstate="print">
             <a:extLst>
               <a:ext uri="{28A0092B-C50C-407E-A947-70E740481C1C}">
-                <a14:useLocalDpi xmlns:a14="http://schemas.microsoft.com/office/drawing/2010/main" xmlns="" val="0"/>
+                <a14:useLocalDpi xmlns="" xmlns:a14="http://schemas.microsoft.com/office/drawing/2010/main" val="0"/>
               </a:ext>
             </a:extLst>
           </a:blip>
@@ -6200,7 +6302,7 @@
     </p:spTree>
     <p:extLst>
       <p:ext uri="{BB962C8B-B14F-4D97-AF65-F5344CB8AC3E}">
-        <p14:creationId xmlns:p14="http://schemas.microsoft.com/office/powerpoint/2010/main" xmlns="" val="864210357"/>
+        <p14:creationId xmlns="" xmlns:p14="http://schemas.microsoft.com/office/powerpoint/2010/main" val="864210357"/>
       </p:ext>
     </p:extLst>
   </p:cSld>
@@ -6474,7 +6576,7 @@
           <a:blip r:embed="rId2" cstate="print">
             <a:extLst>
               <a:ext uri="{28A0092B-C50C-407E-A947-70E740481C1C}">
-                <a14:useLocalDpi xmlns:a14="http://schemas.microsoft.com/office/drawing/2010/main" xmlns="" val="0"/>
+                <a14:useLocalDpi xmlns="" xmlns:a14="http://schemas.microsoft.com/office/drawing/2010/main" val="0"/>
               </a:ext>
             </a:extLst>
           </a:blip>
@@ -6504,7 +6606,7 @@
           <a:blip r:embed="rId3" cstate="print">
             <a:extLst>
               <a:ext uri="{28A0092B-C50C-407E-A947-70E740481C1C}">
-                <a14:useLocalDpi xmlns:a14="http://schemas.microsoft.com/office/drawing/2010/main" xmlns="" val="0"/>
+                <a14:useLocalDpi xmlns="" xmlns:a14="http://schemas.microsoft.com/office/drawing/2010/main" val="0"/>
               </a:ext>
             </a:extLst>
           </a:blip>
@@ -6741,7 +6843,7 @@
           <a:blip r:embed="rId4" cstate="print">
             <a:extLst>
               <a:ext uri="{28A0092B-C50C-407E-A947-70E740481C1C}">
-                <a14:useLocalDpi xmlns:a14="http://schemas.microsoft.com/office/drawing/2010/main" xmlns="" val="0"/>
+                <a14:useLocalDpi xmlns="" xmlns:a14="http://schemas.microsoft.com/office/drawing/2010/main" val="0"/>
               </a:ext>
             </a:extLst>
           </a:blip>
@@ -7220,7 +7322,7 @@
     </p:spTree>
     <p:extLst>
       <p:ext uri="{BB962C8B-B14F-4D97-AF65-F5344CB8AC3E}">
-        <p14:creationId xmlns:p14="http://schemas.microsoft.com/office/powerpoint/2010/main" xmlns="" val="3336203041"/>
+        <p14:creationId xmlns="" xmlns:p14="http://schemas.microsoft.com/office/powerpoint/2010/main" val="3336203041"/>
       </p:ext>
     </p:extLst>
   </p:cSld>
@@ -7450,7 +7552,7 @@
           <a:blip r:embed="rId2" cstate="print">
             <a:extLst>
               <a:ext uri="{28A0092B-C50C-407E-A947-70E740481C1C}">
-                <a14:useLocalDpi xmlns:a14="http://schemas.microsoft.com/office/drawing/2010/main" xmlns="" val="0"/>
+                <a14:useLocalDpi xmlns="" xmlns:a14="http://schemas.microsoft.com/office/drawing/2010/main" val="0"/>
               </a:ext>
             </a:extLst>
           </a:blip>
@@ -7480,7 +7582,7 @@
           <a:blip r:embed="rId3" cstate="print">
             <a:extLst>
               <a:ext uri="{28A0092B-C50C-407E-A947-70E740481C1C}">
-                <a14:useLocalDpi xmlns:a14="http://schemas.microsoft.com/office/drawing/2010/main" xmlns="" val="0"/>
+                <a14:useLocalDpi xmlns="" xmlns:a14="http://schemas.microsoft.com/office/drawing/2010/main" val="0"/>
               </a:ext>
             </a:extLst>
           </a:blip>
@@ -7797,7 +7899,7 @@
     </p:spTree>
     <p:extLst>
       <p:ext uri="{BB962C8B-B14F-4D97-AF65-F5344CB8AC3E}">
-        <p14:creationId xmlns:p14="http://schemas.microsoft.com/office/powerpoint/2010/main" xmlns="" val="2819423520"/>
+        <p14:creationId xmlns="" xmlns:p14="http://schemas.microsoft.com/office/powerpoint/2010/main" val="2819423520"/>
       </p:ext>
     </p:extLst>
   </p:cSld>
@@ -8305,7 +8407,7 @@
     </p:spTree>
     <p:extLst>
       <p:ext uri="{BB962C8B-B14F-4D97-AF65-F5344CB8AC3E}">
-        <p14:creationId xmlns:p14="http://schemas.microsoft.com/office/powerpoint/2010/main" xmlns="" val="3627640579"/>
+        <p14:creationId xmlns="" xmlns:p14="http://schemas.microsoft.com/office/powerpoint/2010/main" val="3627640579"/>
       </p:ext>
     </p:extLst>
   </p:cSld>
@@ -8443,7 +8545,7 @@
           <a:blip r:embed="rId2" cstate="print">
             <a:extLst>
               <a:ext uri="{28A0092B-C50C-407E-A947-70E740481C1C}">
-                <a14:useLocalDpi xmlns:a14="http://schemas.microsoft.com/office/drawing/2010/main" xmlns="" val="0"/>
+                <a14:useLocalDpi xmlns="" xmlns:a14="http://schemas.microsoft.com/office/drawing/2010/main" val="0"/>
               </a:ext>
             </a:extLst>
           </a:blip>
@@ -8519,7 +8621,7 @@
     </p:spTree>
     <p:extLst>
       <p:ext uri="{BB962C8B-B14F-4D97-AF65-F5344CB8AC3E}">
-        <p14:creationId xmlns:p14="http://schemas.microsoft.com/office/powerpoint/2010/main" xmlns="" val="171061288"/>
+        <p14:creationId xmlns="" xmlns:p14="http://schemas.microsoft.com/office/powerpoint/2010/main" val="171061288"/>
       </p:ext>
     </p:extLst>
   </p:cSld>
@@ -8789,7 +8891,7 @@
           <a:blip r:embed="rId2" cstate="print">
             <a:extLst>
               <a:ext uri="{28A0092B-C50C-407E-A947-70E740481C1C}">
-                <a14:useLocalDpi xmlns:a14="http://schemas.microsoft.com/office/drawing/2010/main" xmlns=""/>
+                <a14:useLocalDpi xmlns="" xmlns:a14="http://schemas.microsoft.com/office/drawing/2010/main"/>
               </a:ext>
             </a:extLst>
           </a:blip>
@@ -8814,7 +8916,7 @@
     </p:spTree>
     <p:extLst>
       <p:ext uri="{BB962C8B-B14F-4D97-AF65-F5344CB8AC3E}">
-        <p14:creationId xmlns:p14="http://schemas.microsoft.com/office/powerpoint/2010/main" xmlns="" val="1630604182"/>
+        <p14:creationId xmlns="" xmlns:p14="http://schemas.microsoft.com/office/powerpoint/2010/main" val="1630604182"/>
       </p:ext>
     </p:extLst>
   </p:cSld>
@@ -8860,7 +8962,7 @@
           <a:blip r:embed="rId2" cstate="print">
             <a:extLst>
               <a:ext uri="{28A0092B-C50C-407E-A947-70E740481C1C}">
-                <a14:useLocalDpi xmlns:a14="http://schemas.microsoft.com/office/drawing/2010/main" xmlns="" val="0"/>
+                <a14:useLocalDpi xmlns="" xmlns:a14="http://schemas.microsoft.com/office/drawing/2010/main" val="0"/>
               </a:ext>
             </a:extLst>
           </a:blip>
@@ -9095,7 +9197,7 @@
     </p:spTree>
     <p:extLst>
       <p:ext uri="{BB962C8B-B14F-4D97-AF65-F5344CB8AC3E}">
-        <p14:creationId xmlns:p14="http://schemas.microsoft.com/office/powerpoint/2010/main" xmlns="" val="394514968"/>
+        <p14:creationId xmlns="" xmlns:p14="http://schemas.microsoft.com/office/powerpoint/2010/main" val="394514968"/>
       </p:ext>
     </p:extLst>
   </p:cSld>
@@ -9229,7 +9331,7 @@
           <a:blip r:embed="rId2" cstate="print">
             <a:extLst>
               <a:ext uri="{28A0092B-C50C-407E-A947-70E740481C1C}">
-                <a14:useLocalDpi xmlns:a14="http://schemas.microsoft.com/office/drawing/2010/main" xmlns="" val="0"/>
+                <a14:useLocalDpi xmlns="" xmlns:a14="http://schemas.microsoft.com/office/drawing/2010/main" val="0"/>
               </a:ext>
             </a:extLst>
           </a:blip>
@@ -9310,7 +9412,7 @@
     </p:spTree>
     <p:extLst>
       <p:ext uri="{BB962C8B-B14F-4D97-AF65-F5344CB8AC3E}">
-        <p14:creationId xmlns:p14="http://schemas.microsoft.com/office/powerpoint/2010/main" xmlns="" val="3593113261"/>
+        <p14:creationId xmlns="" xmlns:p14="http://schemas.microsoft.com/office/powerpoint/2010/main" val="3593113261"/>
       </p:ext>
     </p:extLst>
   </p:cSld>
@@ -9468,7 +9570,7 @@
           <a:blip r:embed="rId2" cstate="print">
             <a:extLst>
               <a:ext uri="{28A0092B-C50C-407E-A947-70E740481C1C}">
-                <a14:useLocalDpi xmlns:a14="http://schemas.microsoft.com/office/drawing/2010/main" xmlns="" val="0"/>
+                <a14:useLocalDpi xmlns="" xmlns:a14="http://schemas.microsoft.com/office/drawing/2010/main" val="0"/>
               </a:ext>
             </a:extLst>
           </a:blip>
@@ -9544,7 +9646,7 @@
     </p:spTree>
     <p:extLst>
       <p:ext uri="{BB962C8B-B14F-4D97-AF65-F5344CB8AC3E}">
-        <p14:creationId xmlns:p14="http://schemas.microsoft.com/office/powerpoint/2010/main" xmlns="" val="451913240"/>
+        <p14:creationId xmlns="" xmlns:p14="http://schemas.microsoft.com/office/powerpoint/2010/main" val="451913240"/>
       </p:ext>
     </p:extLst>
   </p:cSld>
@@ -9613,7 +9715,7 @@
           <a:blip r:embed="rId2" cstate="print">
             <a:extLst>
               <a:ext uri="{28A0092B-C50C-407E-A947-70E740481C1C}">
-                <a14:useLocalDpi xmlns:a14="http://schemas.microsoft.com/office/drawing/2010/main" xmlns="" val="0"/>
+                <a14:useLocalDpi xmlns="" xmlns:a14="http://schemas.microsoft.com/office/drawing/2010/main" val="0"/>
               </a:ext>
             </a:extLst>
           </a:blip>
@@ -9810,7 +9912,7 @@
     </p:spTree>
     <p:extLst>
       <p:ext uri="{BB962C8B-B14F-4D97-AF65-F5344CB8AC3E}">
-        <p14:creationId xmlns:p14="http://schemas.microsoft.com/office/powerpoint/2010/main" xmlns="" val="2009636028"/>
+        <p14:creationId xmlns="" xmlns:p14="http://schemas.microsoft.com/office/powerpoint/2010/main" val="2009636028"/>
       </p:ext>
     </p:extLst>
   </p:cSld>
@@ -9879,7 +9981,7 @@
           <a:blip r:embed="rId2" cstate="print">
             <a:extLst>
               <a:ext uri="{28A0092B-C50C-407E-A947-70E740481C1C}">
-                <a14:useLocalDpi xmlns:a14="http://schemas.microsoft.com/office/drawing/2010/main" xmlns="" val="0"/>
+                <a14:useLocalDpi xmlns="" xmlns:a14="http://schemas.microsoft.com/office/drawing/2010/main" val="0"/>
               </a:ext>
             </a:extLst>
           </a:blip>
@@ -10076,7 +10178,7 @@
     </p:spTree>
     <p:extLst>
       <p:ext uri="{BB962C8B-B14F-4D97-AF65-F5344CB8AC3E}">
-        <p14:creationId xmlns:p14="http://schemas.microsoft.com/office/powerpoint/2010/main" xmlns="" val="1131833659"/>
+        <p14:creationId xmlns="" xmlns:p14="http://schemas.microsoft.com/office/powerpoint/2010/main" val="1131833659"/>
       </p:ext>
     </p:extLst>
   </p:cSld>
@@ -10112,42 +10214,157 @@
       </p:grpSpPr>
       <p:sp>
         <p:nvSpPr>
-          <p:cNvPr id="2" name="Titre 1"/>
+          <p:cNvPr id="3" name="Espace réservé du contenu 2"/>
           <p:cNvSpPr>
             <a:spLocks noGrp="1"/>
           </p:cNvSpPr>
           <p:nvPr>
-            <p:ph type="title"/>
+            <p:ph sz="half" idx="1"/>
           </p:nvPr>
         </p:nvSpPr>
         <p:spPr>
           <a:xfrm>
-            <a:off x="457200" y="2895600"/>
-            <a:ext cx="8229600" cy="1143000"/>
+            <a:off x="457200" y="381000"/>
+            <a:ext cx="8229600" cy="6096000"/>
           </a:xfrm>
         </p:spPr>
         <p:txBody>
-          <a:bodyPr/>
+          <a:bodyPr anchor="ctr">
+            <a:noAutofit/>
+          </a:bodyPr>
           <a:lstStyle/>
           <a:p>
-            <a:r>
-              <a:rPr lang="en-US" dirty="0" smtClean="0"/>
+            <a:pPr algn="ctr">
+              <a:lnSpc>
+                <a:spcPct val="150000"/>
+              </a:lnSpc>
+              <a:buNone/>
+            </a:pPr>
+            <a:r>
+              <a:rPr lang="en-US" sz="3200" dirty="0" smtClean="0">
+                <a:solidFill>
+                  <a:schemeClr val="bg1">
+                    <a:lumMod val="75000"/>
+                  </a:schemeClr>
+                </a:solidFill>
+              </a:rPr>
+              <a:t>Context</a:t>
+            </a:r>
+          </a:p>
+          <a:p>
+            <a:pPr algn="ctr">
+              <a:lnSpc>
+                <a:spcPct val="150000"/>
+              </a:lnSpc>
+              <a:buNone/>
+            </a:pPr>
+            <a:r>
+              <a:rPr lang="en-US" sz="3200" dirty="0" smtClean="0">
+                <a:solidFill>
+                  <a:schemeClr val="bg1">
+                    <a:lumMod val="75000"/>
+                  </a:schemeClr>
+                </a:solidFill>
+              </a:rPr>
+              <a:t>Modeling approach</a:t>
+            </a:r>
+          </a:p>
+          <a:p>
+            <a:pPr algn="ctr">
+              <a:lnSpc>
+                <a:spcPct val="150000"/>
+              </a:lnSpc>
+              <a:buNone/>
+            </a:pPr>
+            <a:r>
+              <a:rPr lang="en-US" sz="3200" dirty="0" smtClean="0"/>
               <a:t>Dependency Model</a:t>
             </a:r>
-            <a:endParaRPr lang="en-US" dirty="0"/>
-          </a:p>
-        </p:txBody>
-      </p:sp>
-      <p:sp>
-        <p:nvSpPr>
-          <p:cNvPr id="3" name="Forme en L 2"/>
+          </a:p>
+          <a:p>
+            <a:pPr algn="ctr">
+              <a:lnSpc>
+                <a:spcPct val="150000"/>
+              </a:lnSpc>
+              <a:buNone/>
+            </a:pPr>
+            <a:r>
+              <a:rPr lang="en-US" sz="3200" dirty="0" smtClean="0">
+                <a:solidFill>
+                  <a:schemeClr val="bg1">
+                    <a:lumMod val="75000"/>
+                  </a:schemeClr>
+                </a:solidFill>
+              </a:rPr>
+              <a:t>Field features</a:t>
+            </a:r>
+          </a:p>
+          <a:p>
+            <a:pPr algn="ctr">
+              <a:lnSpc>
+                <a:spcPct val="150000"/>
+              </a:lnSpc>
+              <a:buNone/>
+            </a:pPr>
+            <a:r>
+              <a:rPr lang="en-US" sz="3200" dirty="0" smtClean="0">
+                <a:solidFill>
+                  <a:schemeClr val="bg1">
+                    <a:lumMod val="75000"/>
+                  </a:schemeClr>
+                </a:solidFill>
+              </a:rPr>
+              <a:t>Extensions</a:t>
+            </a:r>
+          </a:p>
+          <a:p>
+            <a:pPr algn="ctr">
+              <a:lnSpc>
+                <a:spcPct val="150000"/>
+              </a:lnSpc>
+              <a:buNone/>
+            </a:pPr>
+            <a:r>
+              <a:rPr lang="en-US" sz="3200" dirty="0" smtClean="0">
+                <a:solidFill>
+                  <a:schemeClr val="bg1">
+                    <a:lumMod val="75000"/>
+                  </a:schemeClr>
+                </a:solidFill>
+              </a:rPr>
+              <a:t>Live coding demo</a:t>
+            </a:r>
+          </a:p>
+          <a:p>
+            <a:pPr algn="ctr">
+              <a:lnSpc>
+                <a:spcPct val="150000"/>
+              </a:lnSpc>
+              <a:buNone/>
+            </a:pPr>
+            <a:r>
+              <a:rPr lang="en-US" sz="3200" dirty="0" smtClean="0">
+                <a:solidFill>
+                  <a:schemeClr val="bg1">
+                    <a:lumMod val="75000"/>
+                  </a:schemeClr>
+                </a:solidFill>
+              </a:rPr>
+              <a:t>Back to LesFurets.com</a:t>
+            </a:r>
+          </a:p>
+        </p:txBody>
+      </p:sp>
+      <p:sp>
+        <p:nvSpPr>
+          <p:cNvPr id="6" name="Forme en L 5"/>
           <p:cNvSpPr/>
           <p:nvPr/>
         </p:nvSpPr>
         <p:spPr>
           <a:xfrm>
-            <a:off x="1600200" y="3523129"/>
-            <a:ext cx="914400" cy="914400"/>
+            <a:off x="2514600" y="2667000"/>
+            <a:ext cx="533400" cy="533400"/>
           </a:xfrm>
           <a:prstGeom prst="corner">
             <a:avLst/>
@@ -10183,14 +10400,14 @@
       </p:sp>
       <p:sp>
         <p:nvSpPr>
-          <p:cNvPr id="4" name="Forme en L 3"/>
+          <p:cNvPr id="7" name="Forme en L 6"/>
           <p:cNvSpPr/>
           <p:nvPr/>
         </p:nvSpPr>
         <p:spPr>
           <a:xfrm rot="10800000">
-            <a:off x="6705600" y="2608729"/>
-            <a:ext cx="914400" cy="914400"/>
+            <a:off x="6096000" y="2133600"/>
+            <a:ext cx="533400" cy="533400"/>
           </a:xfrm>
           <a:prstGeom prst="corner">
             <a:avLst/>
@@ -10225,11 +10442,6 @@
         </p:txBody>
       </p:sp>
     </p:spTree>
-    <p:extLst>
-      <p:ext uri="{BB962C8B-B14F-4D97-AF65-F5344CB8AC3E}">
-        <p14:creationId xmlns:p14="http://schemas.microsoft.com/office/powerpoint/2010/main" xmlns="" val="3774437115"/>
-      </p:ext>
-    </p:extLst>
   </p:cSld>
   <p:clrMapOvr>
     <a:masterClrMapping/>
@@ -10296,7 +10508,7 @@
           <a:blip r:embed="rId2" cstate="print">
             <a:extLst>
               <a:ext uri="{28A0092B-C50C-407E-A947-70E740481C1C}">
-                <a14:useLocalDpi xmlns:a14="http://schemas.microsoft.com/office/drawing/2010/main" xmlns="" val="0"/>
+                <a14:useLocalDpi xmlns="" xmlns:a14="http://schemas.microsoft.com/office/drawing/2010/main" val="0"/>
               </a:ext>
             </a:extLst>
           </a:blip>
@@ -10317,7 +10529,7 @@
     </p:spTree>
     <p:extLst>
       <p:ext uri="{BB962C8B-B14F-4D97-AF65-F5344CB8AC3E}">
-        <p14:creationId xmlns:p14="http://schemas.microsoft.com/office/powerpoint/2010/main" xmlns="" val="1848404178"/>
+        <p14:creationId xmlns="" xmlns:p14="http://schemas.microsoft.com/office/powerpoint/2010/main" val="1848404178"/>
       </p:ext>
     </p:extLst>
   </p:cSld>
@@ -10501,7 +10713,7 @@
     </p:spTree>
     <p:extLst>
       <p:ext uri="{BB962C8B-B14F-4D97-AF65-F5344CB8AC3E}">
-        <p14:creationId xmlns:p14="http://schemas.microsoft.com/office/powerpoint/2010/main" xmlns="" val="1155854373"/>
+        <p14:creationId xmlns="" xmlns:p14="http://schemas.microsoft.com/office/powerpoint/2010/main" val="1155854373"/>
       </p:ext>
     </p:extLst>
   </p:cSld>
@@ -10674,7 +10886,7 @@
     </p:spTree>
     <p:extLst>
       <p:ext uri="{BB962C8B-B14F-4D97-AF65-F5344CB8AC3E}">
-        <p14:creationId xmlns:p14="http://schemas.microsoft.com/office/powerpoint/2010/main" xmlns="" val="1027356186"/>
+        <p14:creationId xmlns="" xmlns:p14="http://schemas.microsoft.com/office/powerpoint/2010/main" val="1027356186"/>
       </p:ext>
     </p:extLst>
   </p:cSld>
@@ -10743,7 +10955,7 @@
           <a:blip r:embed="rId2" cstate="print">
             <a:extLst>
               <a:ext uri="{28A0092B-C50C-407E-A947-70E740481C1C}">
-                <a14:useLocalDpi xmlns:a14="http://schemas.microsoft.com/office/drawing/2010/main" xmlns="" val="0"/>
+                <a14:useLocalDpi xmlns="" xmlns:a14="http://schemas.microsoft.com/office/drawing/2010/main" val="0"/>
               </a:ext>
             </a:extLst>
           </a:blip>
@@ -10773,7 +10985,7 @@
           <a:blip r:embed="rId3" cstate="print">
             <a:extLst>
               <a:ext uri="{28A0092B-C50C-407E-A947-70E740481C1C}">
-                <a14:useLocalDpi xmlns:a14="http://schemas.microsoft.com/office/drawing/2010/main" xmlns="" val="0"/>
+                <a14:useLocalDpi xmlns="" xmlns:a14="http://schemas.microsoft.com/office/drawing/2010/main" val="0"/>
               </a:ext>
             </a:extLst>
           </a:blip>
@@ -10797,7 +11009,7 @@
     </p:spTree>
     <p:extLst>
       <p:ext uri="{BB962C8B-B14F-4D97-AF65-F5344CB8AC3E}">
-        <p14:creationId xmlns:p14="http://schemas.microsoft.com/office/powerpoint/2010/main" xmlns="" val="2369171751"/>
+        <p14:creationId xmlns="" xmlns:p14="http://schemas.microsoft.com/office/powerpoint/2010/main" val="2369171751"/>
       </p:ext>
     </p:extLst>
   </p:cSld>
@@ -10919,7 +11131,6 @@
               <a:rPr lang="en-US" sz="3200" dirty="0" smtClean="0"/>
               <a:t>Extensions</a:t>
             </a:r>
-            <a:endParaRPr lang="en-US" sz="3200" dirty="0" smtClean="0"/>
           </a:p>
           <a:p>
             <a:pPr algn="ctr">
@@ -11099,7 +11310,7 @@
           <a:blip r:embed="rId2" cstate="print">
             <a:extLst>
               <a:ext uri="{28A0092B-C50C-407E-A947-70E740481C1C}">
-                <a14:useLocalDpi xmlns:a14="http://schemas.microsoft.com/office/drawing/2010/main" xmlns="" val="0"/>
+                <a14:useLocalDpi xmlns="" xmlns:a14="http://schemas.microsoft.com/office/drawing/2010/main" val="0"/>
               </a:ext>
             </a:extLst>
           </a:blip>
@@ -11129,7 +11340,7 @@
           <a:blip r:embed="rId3" cstate="print">
             <a:extLst>
               <a:ext uri="{28A0092B-C50C-407E-A947-70E740481C1C}">
-                <a14:useLocalDpi xmlns:a14="http://schemas.microsoft.com/office/drawing/2010/main" xmlns="" val="0"/>
+                <a14:useLocalDpi xmlns="" xmlns:a14="http://schemas.microsoft.com/office/drawing/2010/main" val="0"/>
               </a:ext>
             </a:extLst>
           </a:blip>
@@ -11159,7 +11370,7 @@
           <a:blip r:embed="rId4" cstate="print">
             <a:extLst>
               <a:ext uri="{28A0092B-C50C-407E-A947-70E740481C1C}">
-                <a14:useLocalDpi xmlns:a14="http://schemas.microsoft.com/office/drawing/2010/main" xmlns="" val="0"/>
+                <a14:useLocalDpi xmlns="" xmlns:a14="http://schemas.microsoft.com/office/drawing/2010/main" val="0"/>
               </a:ext>
             </a:extLst>
           </a:blip>
@@ -11275,7 +11486,7 @@
     </p:spTree>
     <p:extLst>
       <p:ext uri="{BB962C8B-B14F-4D97-AF65-F5344CB8AC3E}">
-        <p14:creationId xmlns:p14="http://schemas.microsoft.com/office/powerpoint/2010/main" xmlns="" val="3216378839"/>
+        <p14:creationId xmlns="" xmlns:p14="http://schemas.microsoft.com/office/powerpoint/2010/main" val="3216378839"/>
       </p:ext>
     </p:extLst>
   </p:cSld>
@@ -11353,7 +11564,7 @@
           <a:blip r:embed="rId2" cstate="print">
             <a:extLst>
               <a:ext uri="{28A0092B-C50C-407E-A947-70E740481C1C}">
-                <a14:useLocalDpi xmlns:a14="http://schemas.microsoft.com/office/drawing/2010/main" xmlns="" val="0"/>
+                <a14:useLocalDpi xmlns="" xmlns:a14="http://schemas.microsoft.com/office/drawing/2010/main" val="0"/>
               </a:ext>
             </a:extLst>
           </a:blip>
@@ -11462,7 +11673,7 @@
     </p:spTree>
     <p:extLst>
       <p:ext uri="{BB962C8B-B14F-4D97-AF65-F5344CB8AC3E}">
-        <p14:creationId xmlns:p14="http://schemas.microsoft.com/office/powerpoint/2010/main" xmlns="" val="2527117896"/>
+        <p14:creationId xmlns="" xmlns:p14="http://schemas.microsoft.com/office/powerpoint/2010/main" val="2527117896"/>
       </p:ext>
     </p:extLst>
   </p:cSld>
@@ -12176,7 +12387,7 @@
     </p:spTree>
     <p:extLst>
       <p:ext uri="{BB962C8B-B14F-4D97-AF65-F5344CB8AC3E}">
-        <p14:creationId xmlns:p14="http://schemas.microsoft.com/office/powerpoint/2010/main" xmlns="" val="1994743043"/>
+        <p14:creationId xmlns="" xmlns:p14="http://schemas.microsoft.com/office/powerpoint/2010/main" val="1994743043"/>
       </p:ext>
     </p:extLst>
   </p:cSld>
@@ -12362,7 +12573,7 @@
     </p:spTree>
     <p:extLst>
       <p:ext uri="{BB962C8B-B14F-4D97-AF65-F5344CB8AC3E}">
-        <p14:creationId xmlns:p14="http://schemas.microsoft.com/office/powerpoint/2010/main" xmlns="" val="3098398089"/>
+        <p14:creationId xmlns="" xmlns:p14="http://schemas.microsoft.com/office/powerpoint/2010/main" val="3098398089"/>
       </p:ext>
     </p:extLst>
   </p:cSld>
@@ -12642,7 +12853,7 @@
     </p:spTree>
     <p:extLst>
       <p:ext uri="{BB962C8B-B14F-4D97-AF65-F5344CB8AC3E}">
-        <p14:creationId xmlns:p14="http://schemas.microsoft.com/office/powerpoint/2010/main" xmlns="" val="3449390454"/>
+        <p14:creationId xmlns="" xmlns:p14="http://schemas.microsoft.com/office/powerpoint/2010/main" val="3449390454"/>
       </p:ext>
     </p:extLst>
   </p:cSld>
@@ -13332,7 +13543,7 @@
     </p:spTree>
     <p:extLst>
       <p:ext uri="{BB962C8B-B14F-4D97-AF65-F5344CB8AC3E}">
-        <p14:creationId xmlns:p14="http://schemas.microsoft.com/office/powerpoint/2010/main" xmlns="" val="4006469721"/>
+        <p14:creationId xmlns="" xmlns:p14="http://schemas.microsoft.com/office/powerpoint/2010/main" val="4006469721"/>
       </p:ext>
     </p:extLst>
   </p:cSld>
@@ -13640,7 +13851,7 @@
     </p:spTree>
     <p:extLst>
       <p:ext uri="{BB962C8B-B14F-4D97-AF65-F5344CB8AC3E}">
-        <p14:creationId xmlns:p14="http://schemas.microsoft.com/office/powerpoint/2010/main" xmlns="" val="1678422724"/>
+        <p14:creationId xmlns="" xmlns:p14="http://schemas.microsoft.com/office/powerpoint/2010/main" val="1678422724"/>
       </p:ext>
     </p:extLst>
   </p:cSld>
@@ -14253,7 +14464,7 @@
     </p:spTree>
     <p:extLst>
       <p:ext uri="{BB962C8B-B14F-4D97-AF65-F5344CB8AC3E}">
-        <p14:creationId xmlns:p14="http://schemas.microsoft.com/office/powerpoint/2010/main" xmlns="" val="2792941284"/>
+        <p14:creationId xmlns="" xmlns:p14="http://schemas.microsoft.com/office/powerpoint/2010/main" val="2792941284"/>
       </p:ext>
     </p:extLst>
   </p:cSld>
@@ -14289,42 +14500,157 @@
       </p:grpSpPr>
       <p:sp>
         <p:nvSpPr>
-          <p:cNvPr id="2" name="Titre 1"/>
+          <p:cNvPr id="3" name="Espace réservé du contenu 2"/>
           <p:cNvSpPr>
             <a:spLocks noGrp="1"/>
           </p:cNvSpPr>
           <p:nvPr>
-            <p:ph type="title"/>
+            <p:ph sz="half" idx="1"/>
           </p:nvPr>
         </p:nvSpPr>
         <p:spPr>
           <a:xfrm>
-            <a:off x="457200" y="2895600"/>
-            <a:ext cx="8229600" cy="1143000"/>
+            <a:off x="457200" y="381000"/>
+            <a:ext cx="8229600" cy="6096000"/>
           </a:xfrm>
         </p:spPr>
         <p:txBody>
-          <a:bodyPr/>
+          <a:bodyPr anchor="ctr">
+            <a:noAutofit/>
+          </a:bodyPr>
           <a:lstStyle/>
           <a:p>
-            <a:r>
-              <a:rPr lang="en-US" dirty="0" smtClean="0"/>
+            <a:pPr algn="ctr">
+              <a:lnSpc>
+                <a:spcPct val="150000"/>
+              </a:lnSpc>
+              <a:buNone/>
+            </a:pPr>
+            <a:r>
+              <a:rPr lang="en-US" sz="3200" dirty="0" smtClean="0">
+                <a:solidFill>
+                  <a:schemeClr val="bg1">
+                    <a:lumMod val="75000"/>
+                  </a:schemeClr>
+                </a:solidFill>
+              </a:rPr>
+              <a:t>Context</a:t>
+            </a:r>
+          </a:p>
+          <a:p>
+            <a:pPr algn="ctr">
+              <a:lnSpc>
+                <a:spcPct val="150000"/>
+              </a:lnSpc>
+              <a:buNone/>
+            </a:pPr>
+            <a:r>
+              <a:rPr lang="en-US" sz="3200" dirty="0" smtClean="0">
+                <a:solidFill>
+                  <a:schemeClr val="bg1">
+                    <a:lumMod val="75000"/>
+                  </a:schemeClr>
+                </a:solidFill>
+              </a:rPr>
+              <a:t>Modeling approach</a:t>
+            </a:r>
+          </a:p>
+          <a:p>
+            <a:pPr algn="ctr">
+              <a:lnSpc>
+                <a:spcPct val="150000"/>
+              </a:lnSpc>
+              <a:buNone/>
+            </a:pPr>
+            <a:r>
+              <a:rPr lang="en-US" sz="3200" dirty="0" smtClean="0">
+                <a:solidFill>
+                  <a:schemeClr val="bg1">
+                    <a:lumMod val="75000"/>
+                  </a:schemeClr>
+                </a:solidFill>
+              </a:rPr>
+              <a:t>Dependency Model</a:t>
+            </a:r>
+          </a:p>
+          <a:p>
+            <a:pPr algn="ctr">
+              <a:lnSpc>
+                <a:spcPct val="150000"/>
+              </a:lnSpc>
+              <a:buNone/>
+            </a:pPr>
+            <a:r>
+              <a:rPr lang="en-US" sz="3200" dirty="0" smtClean="0"/>
               <a:t>Field features</a:t>
             </a:r>
-            <a:endParaRPr lang="en-US" dirty="0"/>
-          </a:p>
-        </p:txBody>
-      </p:sp>
-      <p:sp>
-        <p:nvSpPr>
-          <p:cNvPr id="3" name="Forme en L 2"/>
+          </a:p>
+          <a:p>
+            <a:pPr algn="ctr">
+              <a:lnSpc>
+                <a:spcPct val="150000"/>
+              </a:lnSpc>
+              <a:buNone/>
+            </a:pPr>
+            <a:r>
+              <a:rPr lang="en-US" sz="3200" dirty="0" smtClean="0">
+                <a:solidFill>
+                  <a:schemeClr val="bg1">
+                    <a:lumMod val="75000"/>
+                  </a:schemeClr>
+                </a:solidFill>
+              </a:rPr>
+              <a:t>Extensions</a:t>
+            </a:r>
+          </a:p>
+          <a:p>
+            <a:pPr algn="ctr">
+              <a:lnSpc>
+                <a:spcPct val="150000"/>
+              </a:lnSpc>
+              <a:buNone/>
+            </a:pPr>
+            <a:r>
+              <a:rPr lang="en-US" sz="3200" dirty="0" smtClean="0">
+                <a:solidFill>
+                  <a:schemeClr val="bg1">
+                    <a:lumMod val="75000"/>
+                  </a:schemeClr>
+                </a:solidFill>
+              </a:rPr>
+              <a:t>Live coding demo</a:t>
+            </a:r>
+          </a:p>
+          <a:p>
+            <a:pPr algn="ctr">
+              <a:lnSpc>
+                <a:spcPct val="150000"/>
+              </a:lnSpc>
+              <a:buNone/>
+            </a:pPr>
+            <a:r>
+              <a:rPr lang="en-US" sz="3200" dirty="0" smtClean="0">
+                <a:solidFill>
+                  <a:schemeClr val="bg1">
+                    <a:lumMod val="75000"/>
+                  </a:schemeClr>
+                </a:solidFill>
+              </a:rPr>
+              <a:t>Back to LesFurets.com</a:t>
+            </a:r>
+          </a:p>
+        </p:txBody>
+      </p:sp>
+      <p:sp>
+        <p:nvSpPr>
+          <p:cNvPr id="6" name="Forme en L 5"/>
           <p:cNvSpPr/>
           <p:nvPr/>
         </p:nvSpPr>
         <p:spPr>
           <a:xfrm>
-            <a:off x="2133600" y="3523129"/>
-            <a:ext cx="914400" cy="914400"/>
+            <a:off x="3048000" y="3505200"/>
+            <a:ext cx="533400" cy="533400"/>
           </a:xfrm>
           <a:prstGeom prst="corner">
             <a:avLst/>
@@ -14360,14 +14686,14 @@
       </p:sp>
       <p:sp>
         <p:nvSpPr>
-          <p:cNvPr id="4" name="Forme en L 3"/>
+          <p:cNvPr id="7" name="Forme en L 6"/>
           <p:cNvSpPr/>
           <p:nvPr/>
         </p:nvSpPr>
         <p:spPr>
           <a:xfrm rot="10800000">
-            <a:off x="6019800" y="2608729"/>
-            <a:ext cx="914400" cy="914400"/>
+            <a:off x="5638800" y="2971800"/>
+            <a:ext cx="533400" cy="533400"/>
           </a:xfrm>
           <a:prstGeom prst="corner">
             <a:avLst/>
@@ -14402,11 +14728,6 @@
         </p:txBody>
       </p:sp>
     </p:spTree>
-    <p:extLst>
-      <p:ext uri="{BB962C8B-B14F-4D97-AF65-F5344CB8AC3E}">
-        <p14:creationId xmlns:p14="http://schemas.microsoft.com/office/powerpoint/2010/main" xmlns="" val="2960012499"/>
-      </p:ext>
-    </p:extLst>
   </p:cSld>
   <p:clrMapOvr>
     <a:masterClrMapping/>
@@ -14584,7 +14905,7 @@
     </p:spTree>
     <p:extLst>
       <p:ext uri="{BB962C8B-B14F-4D97-AF65-F5344CB8AC3E}">
-        <p14:creationId xmlns:p14="http://schemas.microsoft.com/office/powerpoint/2010/main" xmlns="" val="3220083538"/>
+        <p14:creationId xmlns="" xmlns:p14="http://schemas.microsoft.com/office/powerpoint/2010/main" val="3220083538"/>
       </p:ext>
     </p:extLst>
   </p:cSld>
@@ -14745,7 +15066,7 @@
     </p:spTree>
     <p:extLst>
       <p:ext uri="{BB962C8B-B14F-4D97-AF65-F5344CB8AC3E}">
-        <p14:creationId xmlns:p14="http://schemas.microsoft.com/office/powerpoint/2010/main" xmlns="" val="3312784383"/>
+        <p14:creationId xmlns="" xmlns:p14="http://schemas.microsoft.com/office/powerpoint/2010/main" val="3312784383"/>
       </p:ext>
     </p:extLst>
   </p:cSld>
@@ -14968,7 +15289,7 @@
     </p:spTree>
     <p:extLst>
       <p:ext uri="{BB962C8B-B14F-4D97-AF65-F5344CB8AC3E}">
-        <p14:creationId xmlns:p14="http://schemas.microsoft.com/office/powerpoint/2010/main" xmlns="" val="856396653"/>
+        <p14:creationId xmlns="" xmlns:p14="http://schemas.microsoft.com/office/powerpoint/2010/main" val="856396653"/>
       </p:ext>
     </p:extLst>
   </p:cSld>
@@ -15239,7 +15560,7 @@
     </p:spTree>
     <p:extLst>
       <p:ext uri="{BB962C8B-B14F-4D97-AF65-F5344CB8AC3E}">
-        <p14:creationId xmlns:p14="http://schemas.microsoft.com/office/powerpoint/2010/main" xmlns="" val="3443329555"/>
+        <p14:creationId xmlns="" xmlns:p14="http://schemas.microsoft.com/office/powerpoint/2010/main" val="3443329555"/>
       </p:ext>
     </p:extLst>
   </p:cSld>
@@ -15751,7 +16072,7 @@
     </p:spTree>
     <p:extLst>
       <p:ext uri="{BB962C8B-B14F-4D97-AF65-F5344CB8AC3E}">
-        <p14:creationId xmlns:p14="http://schemas.microsoft.com/office/powerpoint/2010/main" xmlns="" val="1556099287"/>
+        <p14:creationId xmlns="" xmlns:p14="http://schemas.microsoft.com/office/powerpoint/2010/main" val="1556099287"/>
       </p:ext>
     </p:extLst>
   </p:cSld>
@@ -16104,7 +16425,7 @@
     </p:spTree>
     <p:extLst>
       <p:ext uri="{BB962C8B-B14F-4D97-AF65-F5344CB8AC3E}">
-        <p14:creationId xmlns:p14="http://schemas.microsoft.com/office/powerpoint/2010/main" xmlns="" val="2948210574"/>
+        <p14:creationId xmlns="" xmlns:p14="http://schemas.microsoft.com/office/powerpoint/2010/main" val="2948210574"/>
       </p:ext>
     </p:extLst>
   </p:cSld>
@@ -16172,7 +16493,7 @@
           <p:nvPr>
             <p:extLst>
               <p:ext uri="{D42A27DB-BD31-4B8C-83A1-F6EECF244321}">
-                <p14:modId xmlns:p14="http://schemas.microsoft.com/office/powerpoint/2010/main" xmlns="" val="2181104498"/>
+                <p14:modId xmlns="" xmlns:p14="http://schemas.microsoft.com/office/powerpoint/2010/main" val="2181104498"/>
               </p:ext>
             </p:extLst>
           </p:nvPr>
@@ -17156,7 +17477,7 @@
     </p:spTree>
     <p:extLst>
       <p:ext uri="{BB962C8B-B14F-4D97-AF65-F5344CB8AC3E}">
-        <p14:creationId xmlns:p14="http://schemas.microsoft.com/office/powerpoint/2010/main" xmlns="" val="2197364214"/>
+        <p14:creationId xmlns="" xmlns:p14="http://schemas.microsoft.com/office/powerpoint/2010/main" val="2197364214"/>
       </p:ext>
     </p:extLst>
   </p:cSld>
@@ -17619,7 +17940,7 @@
     </p:spTree>
     <p:extLst>
       <p:ext uri="{BB962C8B-B14F-4D97-AF65-F5344CB8AC3E}">
-        <p14:creationId xmlns:p14="http://schemas.microsoft.com/office/powerpoint/2010/main" xmlns="" val="977874982"/>
+        <p14:creationId xmlns="" xmlns:p14="http://schemas.microsoft.com/office/powerpoint/2010/main" val="977874982"/>
       </p:ext>
     </p:extLst>
   </p:cSld>
@@ -17795,7 +18116,7 @@
     </p:spTree>
     <p:extLst>
       <p:ext uri="{BB962C8B-B14F-4D97-AF65-F5344CB8AC3E}">
-        <p14:creationId xmlns:p14="http://schemas.microsoft.com/office/powerpoint/2010/main" xmlns="" val="2092776985"/>
+        <p14:creationId xmlns="" xmlns:p14="http://schemas.microsoft.com/office/powerpoint/2010/main" val="2092776985"/>
       </p:ext>
     </p:extLst>
   </p:cSld>
@@ -17866,7 +18187,7 @@
           <a:blip r:embed="rId2" cstate="print">
             <a:extLst>
               <a:ext uri="{28A0092B-C50C-407E-A947-70E740481C1C}">
-                <a14:useLocalDpi xmlns:a14="http://schemas.microsoft.com/office/drawing/2010/main" xmlns="" val="0"/>
+                <a14:useLocalDpi xmlns="" xmlns:a14="http://schemas.microsoft.com/office/drawing/2010/main" val="0"/>
               </a:ext>
             </a:extLst>
           </a:blip>
@@ -18002,7 +18323,7 @@
     </p:spTree>
     <p:extLst>
       <p:ext uri="{BB962C8B-B14F-4D97-AF65-F5344CB8AC3E}">
-        <p14:creationId xmlns:p14="http://schemas.microsoft.com/office/powerpoint/2010/main" xmlns="" val="318706902"/>
+        <p14:creationId xmlns="" xmlns:p14="http://schemas.microsoft.com/office/powerpoint/2010/main" val="318706902"/>
       </p:ext>
     </p:extLst>
   </p:cSld>
@@ -18085,7 +18406,7 @@
           <p:nvPr>
             <p:extLst>
               <p:ext uri="{D42A27DB-BD31-4B8C-83A1-F6EECF244321}">
-                <p14:modId xmlns:p14="http://schemas.microsoft.com/office/powerpoint/2010/main" xmlns="" val="3075550189"/>
+                <p14:modId xmlns="" xmlns:p14="http://schemas.microsoft.com/office/powerpoint/2010/main" val="3075550189"/>
               </p:ext>
             </p:extLst>
           </p:nvPr>
@@ -18456,7 +18777,7 @@
           <a:blip r:embed="rId3" cstate="print">
             <a:extLst>
               <a:ext uri="{28A0092B-C50C-407E-A947-70E740481C1C}">
-                <a14:useLocalDpi xmlns:a14="http://schemas.microsoft.com/office/drawing/2010/main" xmlns="" val="0"/>
+                <a14:useLocalDpi xmlns="" xmlns:a14="http://schemas.microsoft.com/office/drawing/2010/main" val="0"/>
               </a:ext>
             </a:extLst>
           </a:blip>
@@ -18486,7 +18807,7 @@
           <a:blip r:embed="rId4" cstate="print">
             <a:extLst>
               <a:ext uri="{28A0092B-C50C-407E-A947-70E740481C1C}">
-                <a14:useLocalDpi xmlns:a14="http://schemas.microsoft.com/office/drawing/2010/main" xmlns="" val="0"/>
+                <a14:useLocalDpi xmlns="" xmlns:a14="http://schemas.microsoft.com/office/drawing/2010/main" val="0"/>
               </a:ext>
             </a:extLst>
           </a:blip>
@@ -18516,7 +18837,7 @@
           <a:blip r:embed="rId5" cstate="print">
             <a:extLst>
               <a:ext uri="{28A0092B-C50C-407E-A947-70E740481C1C}">
-                <a14:useLocalDpi xmlns:a14="http://schemas.microsoft.com/office/drawing/2010/main" xmlns="" val="0"/>
+                <a14:useLocalDpi xmlns="" xmlns:a14="http://schemas.microsoft.com/office/drawing/2010/main" val="0"/>
               </a:ext>
             </a:extLst>
           </a:blip>
@@ -18546,7 +18867,7 @@
           <a:blip r:embed="rId6" cstate="print">
             <a:extLst>
               <a:ext uri="{28A0092B-C50C-407E-A947-70E740481C1C}">
-                <a14:useLocalDpi xmlns:a14="http://schemas.microsoft.com/office/drawing/2010/main" xmlns="" val="0"/>
+                <a14:useLocalDpi xmlns="" xmlns:a14="http://schemas.microsoft.com/office/drawing/2010/main" val="0"/>
               </a:ext>
             </a:extLst>
           </a:blip>
@@ -18576,7 +18897,7 @@
           <a:blip r:embed="rId7" cstate="print">
             <a:extLst>
               <a:ext uri="{28A0092B-C50C-407E-A947-70E740481C1C}">
-                <a14:useLocalDpi xmlns:a14="http://schemas.microsoft.com/office/drawing/2010/main" xmlns="" val="0"/>
+                <a14:useLocalDpi xmlns="" xmlns:a14="http://schemas.microsoft.com/office/drawing/2010/main" val="0"/>
               </a:ext>
             </a:extLst>
           </a:blip>
@@ -18606,7 +18927,7 @@
           <a:blip r:embed="rId8" cstate="print">
             <a:extLst>
               <a:ext uri="{28A0092B-C50C-407E-A947-70E740481C1C}">
-                <a14:useLocalDpi xmlns:a14="http://schemas.microsoft.com/office/drawing/2010/main" xmlns="" val="0"/>
+                <a14:useLocalDpi xmlns="" xmlns:a14="http://schemas.microsoft.com/office/drawing/2010/main" val="0"/>
               </a:ext>
             </a:extLst>
           </a:blip>
@@ -18627,7 +18948,7 @@
     </p:spTree>
     <p:extLst>
       <p:ext uri="{BB962C8B-B14F-4D97-AF65-F5344CB8AC3E}">
-        <p14:creationId xmlns:p14="http://schemas.microsoft.com/office/powerpoint/2010/main" xmlns="" val="949325302"/>
+        <p14:creationId xmlns="" xmlns:p14="http://schemas.microsoft.com/office/powerpoint/2010/main" val="949325302"/>
       </p:ext>
     </p:extLst>
   </p:cSld>
@@ -18663,42 +18984,157 @@
       </p:grpSpPr>
       <p:sp>
         <p:nvSpPr>
-          <p:cNvPr id="2" name="Titre 1"/>
+          <p:cNvPr id="3" name="Espace réservé du contenu 2"/>
           <p:cNvSpPr>
             <a:spLocks noGrp="1"/>
           </p:cNvSpPr>
           <p:nvPr>
-            <p:ph type="title"/>
+            <p:ph sz="half" idx="1"/>
           </p:nvPr>
         </p:nvSpPr>
         <p:spPr>
           <a:xfrm>
-            <a:off x="457200" y="2895600"/>
-            <a:ext cx="8229600" cy="1143000"/>
+            <a:off x="457200" y="381000"/>
+            <a:ext cx="8229600" cy="6096000"/>
           </a:xfrm>
         </p:spPr>
         <p:txBody>
-          <a:bodyPr/>
+          <a:bodyPr anchor="ctr">
+            <a:noAutofit/>
+          </a:bodyPr>
           <a:lstStyle/>
           <a:p>
-            <a:r>
-              <a:rPr lang="en-US" dirty="0" smtClean="0"/>
+            <a:pPr algn="ctr">
+              <a:lnSpc>
+                <a:spcPct val="150000"/>
+              </a:lnSpc>
+              <a:buNone/>
+            </a:pPr>
+            <a:r>
+              <a:rPr lang="en-US" sz="3200" dirty="0" smtClean="0">
+                <a:solidFill>
+                  <a:schemeClr val="bg1">
+                    <a:lumMod val="75000"/>
+                  </a:schemeClr>
+                </a:solidFill>
+              </a:rPr>
+              <a:t>Context</a:t>
+            </a:r>
+          </a:p>
+          <a:p>
+            <a:pPr algn="ctr">
+              <a:lnSpc>
+                <a:spcPct val="150000"/>
+              </a:lnSpc>
+              <a:buNone/>
+            </a:pPr>
+            <a:r>
+              <a:rPr lang="en-US" sz="3200" dirty="0" smtClean="0">
+                <a:solidFill>
+                  <a:schemeClr val="bg1">
+                    <a:lumMod val="75000"/>
+                  </a:schemeClr>
+                </a:solidFill>
+              </a:rPr>
+              <a:t>Modeling approach</a:t>
+            </a:r>
+          </a:p>
+          <a:p>
+            <a:pPr algn="ctr">
+              <a:lnSpc>
+                <a:spcPct val="150000"/>
+              </a:lnSpc>
+              <a:buNone/>
+            </a:pPr>
+            <a:r>
+              <a:rPr lang="en-US" sz="3200" dirty="0" smtClean="0">
+                <a:solidFill>
+                  <a:schemeClr val="bg1">
+                    <a:lumMod val="75000"/>
+                  </a:schemeClr>
+                </a:solidFill>
+              </a:rPr>
+              <a:t>Dependency Model</a:t>
+            </a:r>
+          </a:p>
+          <a:p>
+            <a:pPr algn="ctr">
+              <a:lnSpc>
+                <a:spcPct val="150000"/>
+              </a:lnSpc>
+              <a:buNone/>
+            </a:pPr>
+            <a:r>
+              <a:rPr lang="en-US" sz="3200" dirty="0" smtClean="0">
+                <a:solidFill>
+                  <a:schemeClr val="bg1">
+                    <a:lumMod val="75000"/>
+                  </a:schemeClr>
+                </a:solidFill>
+              </a:rPr>
+              <a:t>Field features</a:t>
+            </a:r>
+          </a:p>
+          <a:p>
+            <a:pPr algn="ctr">
+              <a:lnSpc>
+                <a:spcPct val="150000"/>
+              </a:lnSpc>
+              <a:buNone/>
+            </a:pPr>
+            <a:r>
+              <a:rPr lang="en-US" sz="3200" dirty="0" smtClean="0"/>
               <a:t>Extensions</a:t>
             </a:r>
-            <a:endParaRPr lang="en-US" dirty="0"/>
-          </a:p>
-        </p:txBody>
-      </p:sp>
-      <p:sp>
-        <p:nvSpPr>
-          <p:cNvPr id="3" name="Forme en L 2"/>
+          </a:p>
+          <a:p>
+            <a:pPr algn="ctr">
+              <a:lnSpc>
+                <a:spcPct val="150000"/>
+              </a:lnSpc>
+              <a:buNone/>
+            </a:pPr>
+            <a:r>
+              <a:rPr lang="en-US" sz="3200" dirty="0" smtClean="0">
+                <a:solidFill>
+                  <a:schemeClr val="bg1">
+                    <a:lumMod val="75000"/>
+                  </a:schemeClr>
+                </a:solidFill>
+              </a:rPr>
+              <a:t>Live coding demo</a:t>
+            </a:r>
+          </a:p>
+          <a:p>
+            <a:pPr algn="ctr">
+              <a:lnSpc>
+                <a:spcPct val="150000"/>
+              </a:lnSpc>
+              <a:buNone/>
+            </a:pPr>
+            <a:r>
+              <a:rPr lang="en-US" sz="3200" dirty="0" smtClean="0">
+                <a:solidFill>
+                  <a:schemeClr val="bg1">
+                    <a:lumMod val="75000"/>
+                  </a:schemeClr>
+                </a:solidFill>
+              </a:rPr>
+              <a:t>Back to LesFurets.com</a:t>
+            </a:r>
+          </a:p>
+        </p:txBody>
+      </p:sp>
+      <p:sp>
+        <p:nvSpPr>
+          <p:cNvPr id="6" name="Forme en L 5"/>
           <p:cNvSpPr/>
           <p:nvPr/>
         </p:nvSpPr>
         <p:spPr>
           <a:xfrm>
-            <a:off x="2590800" y="3523129"/>
-            <a:ext cx="914400" cy="914400"/>
+            <a:off x="3200400" y="4343400"/>
+            <a:ext cx="533400" cy="533400"/>
           </a:xfrm>
           <a:prstGeom prst="corner">
             <a:avLst/>
@@ -18734,14 +19170,14 @@
       </p:sp>
       <p:sp>
         <p:nvSpPr>
-          <p:cNvPr id="4" name="Forme en L 3"/>
+          <p:cNvPr id="7" name="Forme en L 6"/>
           <p:cNvSpPr/>
           <p:nvPr/>
         </p:nvSpPr>
         <p:spPr>
           <a:xfrm rot="10800000">
-            <a:off x="5715000" y="2608729"/>
-            <a:ext cx="914400" cy="914400"/>
+            <a:off x="5410200" y="3810000"/>
+            <a:ext cx="533400" cy="533400"/>
           </a:xfrm>
           <a:prstGeom prst="corner">
             <a:avLst/>
@@ -18776,11 +19212,6 @@
         </p:txBody>
       </p:sp>
     </p:spTree>
-    <p:extLst>
-      <p:ext uri="{BB962C8B-B14F-4D97-AF65-F5344CB8AC3E}">
-        <p14:creationId xmlns:p14="http://schemas.microsoft.com/office/powerpoint/2010/main" xmlns="" val="1326827891"/>
-      </p:ext>
-    </p:extLst>
   </p:cSld>
   <p:clrMapOvr>
     <a:masterClrMapping/>
@@ -19023,7 +19454,7 @@
     </p:spTree>
     <p:extLst>
       <p:ext uri="{BB962C8B-B14F-4D97-AF65-F5344CB8AC3E}">
-        <p14:creationId xmlns:p14="http://schemas.microsoft.com/office/powerpoint/2010/main" xmlns="" val="2834344091"/>
+        <p14:creationId xmlns="" xmlns:p14="http://schemas.microsoft.com/office/powerpoint/2010/main" val="2834344091"/>
       </p:ext>
     </p:extLst>
   </p:cSld>
@@ -19362,7 +19793,7 @@
           <a:blip r:embed="rId2" cstate="print">
             <a:extLst>
               <a:ext uri="{28A0092B-C50C-407E-A947-70E740481C1C}">
-                <a14:useLocalDpi xmlns:a14="http://schemas.microsoft.com/office/drawing/2010/main" xmlns="" val="0"/>
+                <a14:useLocalDpi xmlns="" xmlns:a14="http://schemas.microsoft.com/office/drawing/2010/main" val="0"/>
               </a:ext>
             </a:extLst>
           </a:blip>
@@ -19419,7 +19850,7 @@
           <p:nvPr>
             <p:extLst>
               <p:ext uri="{D42A27DB-BD31-4B8C-83A1-F6EECF244321}">
-                <p14:modId xmlns:p14="http://schemas.microsoft.com/office/powerpoint/2010/main" xmlns="" val="3204736979"/>
+                <p14:modId xmlns="" xmlns:p14="http://schemas.microsoft.com/office/powerpoint/2010/main" val="3204736979"/>
               </p:ext>
             </p:extLst>
           </p:nvPr>
@@ -19751,7 +20182,7 @@
     </p:spTree>
     <p:extLst>
       <p:ext uri="{BB962C8B-B14F-4D97-AF65-F5344CB8AC3E}">
-        <p14:creationId xmlns:p14="http://schemas.microsoft.com/office/powerpoint/2010/main" xmlns="" val="3195513628"/>
+        <p14:creationId xmlns="" xmlns:p14="http://schemas.microsoft.com/office/powerpoint/2010/main" val="3195513628"/>
       </p:ext>
     </p:extLst>
   </p:cSld>
@@ -19827,13 +20258,8 @@
           <a:p>
             <a:r>
               <a:rPr lang="en-US" dirty="0" smtClean="0"/>
-              <a:t>Use </a:t>
-            </a:r>
-            <a:r>
-              <a:rPr lang="en-US" dirty="0" smtClean="0"/>
-              <a:t>field features to track</a:t>
-            </a:r>
-            <a:endParaRPr lang="en-US" dirty="0" smtClean="0"/>
+              <a:t>Use field features to track</a:t>
+            </a:r>
           </a:p>
           <a:p>
             <a:pPr lvl="1"/>
@@ -19846,11 +20272,7 @@
             <a:pPr lvl="1"/>
             <a:r>
               <a:rPr lang="en-US" dirty="0" smtClean="0"/>
-              <a:t>Validation </a:t>
-            </a:r>
-            <a:r>
-              <a:rPr lang="en-US" dirty="0" smtClean="0"/>
-              <a:t>errors</a:t>
+              <a:t>Validation errors</a:t>
             </a:r>
           </a:p>
           <a:p>
@@ -19859,47 +20281,28 @@
               <a:rPr lang="en-US" dirty="0" smtClean="0"/>
               <a:t>Navigation</a:t>
             </a:r>
+          </a:p>
+          <a:p>
             <a:endParaRPr lang="en-US" dirty="0" smtClean="0"/>
           </a:p>
           <a:p>
-            <a:endParaRPr lang="en-US" dirty="0" smtClean="0"/>
-          </a:p>
-          <a:p>
             <a:r>
               <a:rPr lang="en-US" dirty="0" smtClean="0"/>
-              <a:t>Use of tracking </a:t>
-            </a:r>
+              <a:t>Use of tracking results</a:t>
+            </a:r>
+          </a:p>
+          <a:p>
+            <a:pPr lvl="1"/>
             <a:r>
               <a:rPr lang="en-US" dirty="0" smtClean="0"/>
-              <a:t>results</a:t>
-            </a:r>
-            <a:endParaRPr lang="en-US" dirty="0" smtClean="0"/>
+              <a:t>Find common user profiles</a:t>
+            </a:r>
           </a:p>
           <a:p>
             <a:pPr lvl="1"/>
             <a:r>
               <a:rPr lang="en-US" dirty="0" smtClean="0"/>
-              <a:t>Find common </a:t>
-            </a:r>
-            <a:r>
-              <a:rPr lang="en-US" dirty="0" smtClean="0"/>
-              <a:t>user </a:t>
-            </a:r>
-            <a:r>
-              <a:rPr lang="en-US" dirty="0" smtClean="0"/>
-              <a:t>profiles</a:t>
-            </a:r>
-            <a:endParaRPr lang="en-US" dirty="0" smtClean="0"/>
-          </a:p>
-          <a:p>
-            <a:pPr lvl="1"/>
-            <a:r>
-              <a:rPr lang="en-US" dirty="0" smtClean="0"/>
-              <a:t>Improve </a:t>
-            </a:r>
-            <a:r>
-              <a:rPr lang="en-US" dirty="0" smtClean="0"/>
-              <a:t>forms for faster input</a:t>
+              <a:t>Improve forms for faster input</a:t>
             </a:r>
           </a:p>
           <a:p>
@@ -19917,7 +20320,7 @@
     </p:spTree>
     <p:extLst>
       <p:ext uri="{BB962C8B-B14F-4D97-AF65-F5344CB8AC3E}">
-        <p14:creationId xmlns:p14="http://schemas.microsoft.com/office/powerpoint/2010/main" xmlns="" val="2674396190"/>
+        <p14:creationId xmlns="" xmlns:p14="http://schemas.microsoft.com/office/powerpoint/2010/main" val="2674396190"/>
       </p:ext>
     </p:extLst>
   </p:cSld>
@@ -19993,52 +20396,26 @@
           <a:p>
             <a:r>
               <a:rPr lang="en-US" dirty="0" smtClean="0"/>
-              <a:t>Define two </a:t>
-            </a:r>
+              <a:t>Define two versions of a webpage (A and B) </a:t>
+            </a:r>
+          </a:p>
+          <a:p>
             <a:r>
               <a:rPr lang="en-US" dirty="0" smtClean="0"/>
-              <a:t>versions of a webpage (A and B) </a:t>
-            </a:r>
-            <a:endParaRPr lang="en-US" dirty="0" smtClean="0"/>
+              <a:t>Split traffic amongst those versions </a:t>
+            </a:r>
           </a:p>
           <a:p>
             <a:r>
               <a:rPr lang="en-US" dirty="0" smtClean="0"/>
-              <a:t>Split </a:t>
-            </a:r>
+              <a:t>Determine which one was more successful </a:t>
+            </a:r>
+          </a:p>
+          <a:p>
+            <a:pPr lvl="1"/>
             <a:r>
               <a:rPr lang="en-US" dirty="0" smtClean="0"/>
-              <a:t>traffic amongst those versions </a:t>
-            </a:r>
-            <a:endParaRPr lang="en-US" dirty="0" smtClean="0"/>
-          </a:p>
-          <a:p>
-            <a:r>
-              <a:rPr lang="en-US" dirty="0" smtClean="0"/>
-              <a:t>Determine </a:t>
-            </a:r>
-            <a:r>
-              <a:rPr lang="en-US" dirty="0" smtClean="0"/>
-              <a:t>which </a:t>
-            </a:r>
-            <a:r>
-              <a:rPr lang="en-US" dirty="0" smtClean="0"/>
-              <a:t>one was more successful </a:t>
-            </a:r>
-          </a:p>
-          <a:p>
-            <a:pPr lvl="1"/>
-            <a:r>
-              <a:rPr lang="en-US" dirty="0" smtClean="0"/>
-              <a:t>Validate any </a:t>
-            </a:r>
-            <a:r>
-              <a:rPr lang="en-US" dirty="0" smtClean="0"/>
-              <a:t>new </a:t>
-            </a:r>
-            <a:r>
-              <a:rPr lang="en-US" dirty="0" smtClean="0"/>
-              <a:t>design</a:t>
+              <a:t>Validate any new design</a:t>
             </a:r>
           </a:p>
           <a:p>
@@ -20055,17 +20432,8 @@
           <a:p>
             <a:r>
               <a:rPr lang="en-US" dirty="0" smtClean="0"/>
-              <a:t>How it can </a:t>
-            </a:r>
-            <a:r>
-              <a:rPr lang="en-US" dirty="0" smtClean="0"/>
-              <a:t>be </a:t>
-            </a:r>
-            <a:r>
-              <a:rPr lang="en-US" dirty="0" smtClean="0"/>
-              <a:t>done?</a:t>
-            </a:r>
-            <a:endParaRPr lang="en-US" dirty="0" smtClean="0"/>
+              <a:t>How it can be done?</a:t>
+            </a:r>
           </a:p>
           <a:p>
             <a:pPr lvl="1"/>
@@ -20083,15 +20451,7 @@
             <a:pPr lvl="1"/>
             <a:r>
               <a:rPr lang="en-US" dirty="0" smtClean="0"/>
-              <a:t>Define t</a:t>
-            </a:r>
-            <a:r>
-              <a:rPr lang="en-US" dirty="0" smtClean="0"/>
-              <a:t>wo </a:t>
-            </a:r>
-            <a:r>
-              <a:rPr lang="en-US" dirty="0" smtClean="0"/>
-              <a:t>different scenarios</a:t>
+              <a:t>Define two different scenarios</a:t>
             </a:r>
           </a:p>
           <a:p>
@@ -20102,7 +20462,7 @@
     </p:spTree>
     <p:extLst>
       <p:ext uri="{BB962C8B-B14F-4D97-AF65-F5344CB8AC3E}">
-        <p14:creationId xmlns:p14="http://schemas.microsoft.com/office/powerpoint/2010/main" xmlns="" val="2713826086"/>
+        <p14:creationId xmlns="" xmlns:p14="http://schemas.microsoft.com/office/powerpoint/2010/main" val="2713826086"/>
       </p:ext>
     </p:extLst>
   </p:cSld>
@@ -20294,7 +20654,7 @@
     </p:spTree>
     <p:extLst>
       <p:ext uri="{BB962C8B-B14F-4D97-AF65-F5344CB8AC3E}">
-        <p14:creationId xmlns:p14="http://schemas.microsoft.com/office/powerpoint/2010/main" xmlns="" val="714747940"/>
+        <p14:creationId xmlns="" xmlns:p14="http://schemas.microsoft.com/office/powerpoint/2010/main" val="714747940"/>
       </p:ext>
     </p:extLst>
   </p:cSld>
@@ -20833,7 +21193,7 @@
     </p:spTree>
     <p:extLst>
       <p:ext uri="{BB962C8B-B14F-4D97-AF65-F5344CB8AC3E}">
-        <p14:creationId xmlns:p14="http://schemas.microsoft.com/office/powerpoint/2010/main" xmlns="" val="3760395846"/>
+        <p14:creationId xmlns="" xmlns:p14="http://schemas.microsoft.com/office/powerpoint/2010/main" val="3760395846"/>
       </p:ext>
     </p:extLst>
   </p:cSld>
@@ -21666,7 +22026,7 @@
     </p:spTree>
     <p:extLst>
       <p:ext uri="{BB962C8B-B14F-4D97-AF65-F5344CB8AC3E}">
-        <p14:creationId xmlns:p14="http://schemas.microsoft.com/office/powerpoint/2010/main" xmlns="" val="1422967000"/>
+        <p14:creationId xmlns="" xmlns:p14="http://schemas.microsoft.com/office/powerpoint/2010/main" val="1422967000"/>
       </p:ext>
     </p:extLst>
   </p:cSld>
@@ -21817,7 +22177,7 @@
     </p:spTree>
     <p:extLst>
       <p:ext uri="{BB962C8B-B14F-4D97-AF65-F5344CB8AC3E}">
-        <p14:creationId xmlns:p14="http://schemas.microsoft.com/office/powerpoint/2010/main" xmlns="" val="2654585083"/>
+        <p14:creationId xmlns="" xmlns:p14="http://schemas.microsoft.com/office/powerpoint/2010/main" val="2654585083"/>
       </p:ext>
     </p:extLst>
   </p:cSld>
@@ -21977,7 +22337,7 @@
     </p:spTree>
     <p:extLst>
       <p:ext uri="{BB962C8B-B14F-4D97-AF65-F5344CB8AC3E}">
-        <p14:creationId xmlns:p14="http://schemas.microsoft.com/office/powerpoint/2010/main" xmlns="" val="1683021932"/>
+        <p14:creationId xmlns="" xmlns:p14="http://schemas.microsoft.com/office/powerpoint/2010/main" val="1683021932"/>
       </p:ext>
     </p:extLst>
   </p:cSld>
@@ -22051,7 +22411,7 @@
           <a:blip r:embed="rId2" cstate="print">
             <a:extLst>
               <a:ext uri="{28A0092B-C50C-407E-A947-70E740481C1C}">
-                <a14:useLocalDpi xmlns:a14="http://schemas.microsoft.com/office/drawing/2010/main" xmlns="" val="0"/>
+                <a14:useLocalDpi xmlns="" xmlns:a14="http://schemas.microsoft.com/office/drawing/2010/main" val="0"/>
               </a:ext>
             </a:extLst>
           </a:blip>
@@ -22687,7 +23047,7 @@
     </p:spTree>
     <p:extLst>
       <p:ext uri="{BB962C8B-B14F-4D97-AF65-F5344CB8AC3E}">
-        <p14:creationId xmlns:p14="http://schemas.microsoft.com/office/powerpoint/2010/main" xmlns="" val="3007787296"/>
+        <p14:creationId xmlns="" xmlns:p14="http://schemas.microsoft.com/office/powerpoint/2010/main" val="3007787296"/>
       </p:ext>
     </p:extLst>
   </p:cSld>
@@ -22723,48 +23083,157 @@
       </p:grpSpPr>
       <p:sp>
         <p:nvSpPr>
-          <p:cNvPr id="2" name="Titre 1"/>
+          <p:cNvPr id="3" name="Espace réservé du contenu 2"/>
           <p:cNvSpPr>
             <a:spLocks noGrp="1"/>
           </p:cNvSpPr>
           <p:nvPr>
-            <p:ph type="title"/>
+            <p:ph sz="half" idx="1"/>
           </p:nvPr>
         </p:nvSpPr>
         <p:spPr>
           <a:xfrm>
-            <a:off x="457200" y="2895600"/>
-            <a:ext cx="8229600" cy="1143000"/>
+            <a:off x="457200" y="381000"/>
+            <a:ext cx="8229600" cy="6096000"/>
           </a:xfrm>
         </p:spPr>
         <p:txBody>
-          <a:bodyPr>
-            <a:normAutofit/>
+          <a:bodyPr anchor="ctr">
+            <a:noAutofit/>
           </a:bodyPr>
           <a:lstStyle/>
           <a:p>
-            <a:r>
-              <a:rPr lang="en-US" dirty="0" smtClean="0"/>
-              <a:t>Back to </a:t>
-            </a:r>
-            <a:r>
-              <a:rPr lang="en-US" dirty="0" smtClean="0"/>
-              <a:t>LesFurets.com</a:t>
-            </a:r>
-            <a:endParaRPr lang="en-US" dirty="0"/>
-          </a:p>
-        </p:txBody>
-      </p:sp>
-      <p:sp>
-        <p:nvSpPr>
-          <p:cNvPr id="3" name="Forme en L 2"/>
+            <a:pPr algn="ctr">
+              <a:lnSpc>
+                <a:spcPct val="150000"/>
+              </a:lnSpc>
+              <a:buNone/>
+            </a:pPr>
+            <a:r>
+              <a:rPr lang="en-US" sz="3200" dirty="0" smtClean="0">
+                <a:solidFill>
+                  <a:schemeClr val="bg1">
+                    <a:lumMod val="75000"/>
+                  </a:schemeClr>
+                </a:solidFill>
+              </a:rPr>
+              <a:t>Context</a:t>
+            </a:r>
+          </a:p>
+          <a:p>
+            <a:pPr algn="ctr">
+              <a:lnSpc>
+                <a:spcPct val="150000"/>
+              </a:lnSpc>
+              <a:buNone/>
+            </a:pPr>
+            <a:r>
+              <a:rPr lang="en-US" sz="3200" dirty="0" smtClean="0">
+                <a:solidFill>
+                  <a:schemeClr val="bg1">
+                    <a:lumMod val="75000"/>
+                  </a:schemeClr>
+                </a:solidFill>
+              </a:rPr>
+              <a:t>Modeling approach</a:t>
+            </a:r>
+          </a:p>
+          <a:p>
+            <a:pPr algn="ctr">
+              <a:lnSpc>
+                <a:spcPct val="150000"/>
+              </a:lnSpc>
+              <a:buNone/>
+            </a:pPr>
+            <a:r>
+              <a:rPr lang="en-US" sz="3200" dirty="0" smtClean="0">
+                <a:solidFill>
+                  <a:schemeClr val="bg1">
+                    <a:lumMod val="75000"/>
+                  </a:schemeClr>
+                </a:solidFill>
+              </a:rPr>
+              <a:t>Dependency Model</a:t>
+            </a:r>
+          </a:p>
+          <a:p>
+            <a:pPr algn="ctr">
+              <a:lnSpc>
+                <a:spcPct val="150000"/>
+              </a:lnSpc>
+              <a:buNone/>
+            </a:pPr>
+            <a:r>
+              <a:rPr lang="en-US" sz="3200" dirty="0" smtClean="0">
+                <a:solidFill>
+                  <a:schemeClr val="bg1">
+                    <a:lumMod val="75000"/>
+                  </a:schemeClr>
+                </a:solidFill>
+              </a:rPr>
+              <a:t>Field features</a:t>
+            </a:r>
+          </a:p>
+          <a:p>
+            <a:pPr algn="ctr">
+              <a:lnSpc>
+                <a:spcPct val="150000"/>
+              </a:lnSpc>
+              <a:buNone/>
+            </a:pPr>
+            <a:r>
+              <a:rPr lang="en-US" sz="3200" dirty="0" smtClean="0">
+                <a:solidFill>
+                  <a:schemeClr val="bg1">
+                    <a:lumMod val="75000"/>
+                  </a:schemeClr>
+                </a:solidFill>
+              </a:rPr>
+              <a:t>Extensions</a:t>
+            </a:r>
+          </a:p>
+          <a:p>
+            <a:pPr algn="ctr">
+              <a:lnSpc>
+                <a:spcPct val="150000"/>
+              </a:lnSpc>
+              <a:buNone/>
+            </a:pPr>
+            <a:r>
+              <a:rPr lang="en-US" sz="3200" dirty="0" smtClean="0"/>
+              <a:t>Live coding demo</a:t>
+            </a:r>
+          </a:p>
+          <a:p>
+            <a:pPr algn="ctr">
+              <a:lnSpc>
+                <a:spcPct val="150000"/>
+              </a:lnSpc>
+              <a:buNone/>
+            </a:pPr>
+            <a:r>
+              <a:rPr lang="en-US" sz="3200" dirty="0" smtClean="0">
+                <a:solidFill>
+                  <a:schemeClr val="bg1">
+                    <a:lumMod val="75000"/>
+                  </a:schemeClr>
+                </a:solidFill>
+              </a:rPr>
+              <a:t>Back to LesFurets.com</a:t>
+            </a:r>
+          </a:p>
+        </p:txBody>
+      </p:sp>
+      <p:sp>
+        <p:nvSpPr>
+          <p:cNvPr id="6" name="Forme en L 5"/>
           <p:cNvSpPr/>
           <p:nvPr/>
         </p:nvSpPr>
         <p:spPr>
           <a:xfrm>
-            <a:off x="1295400" y="3523129"/>
-            <a:ext cx="914400" cy="914400"/>
+            <a:off x="2667000" y="5105400"/>
+            <a:ext cx="533400" cy="533400"/>
           </a:xfrm>
           <a:prstGeom prst="corner">
             <a:avLst/>
@@ -22800,14 +23269,14 @@
       </p:sp>
       <p:sp>
         <p:nvSpPr>
-          <p:cNvPr id="4" name="Forme en L 3"/>
+          <p:cNvPr id="7" name="Forme en L 6"/>
           <p:cNvSpPr/>
           <p:nvPr/>
         </p:nvSpPr>
         <p:spPr>
           <a:xfrm rot="10800000">
-            <a:off x="7010400" y="2608729"/>
-            <a:ext cx="914400" cy="914400"/>
+            <a:off x="5943600" y="4648199"/>
+            <a:ext cx="533400" cy="533400"/>
           </a:xfrm>
           <a:prstGeom prst="corner">
             <a:avLst/>
@@ -22842,11 +23311,6 @@
         </p:txBody>
       </p:sp>
     </p:spTree>
-    <p:extLst>
-      <p:ext uri="{BB962C8B-B14F-4D97-AF65-F5344CB8AC3E}">
-        <p14:creationId xmlns:p14="http://schemas.microsoft.com/office/powerpoint/2010/main" xmlns="" val="1326827891"/>
-      </p:ext>
-    </p:extLst>
   </p:cSld>
   <p:clrMapOvr>
     <a:masterClrMapping/>
@@ -22983,7 +23447,7 @@
     </p:spTree>
     <p:extLst>
       <p:ext uri="{BB962C8B-B14F-4D97-AF65-F5344CB8AC3E}">
-        <p14:creationId xmlns:p14="http://schemas.microsoft.com/office/powerpoint/2010/main" xmlns="" val="13878138"/>
+        <p14:creationId xmlns="" xmlns:p14="http://schemas.microsoft.com/office/powerpoint/2010/main" val="13878138"/>
       </p:ext>
     </p:extLst>
   </p:cSld>
@@ -23019,82 +23483,234 @@
       </p:grpSpPr>
       <p:sp>
         <p:nvSpPr>
-          <p:cNvPr id="2" name="Titre 1"/>
-          <p:cNvSpPr>
-            <a:spLocks noGrp="1"/>
-          </p:cNvSpPr>
-          <p:nvPr>
-            <p:ph type="title"/>
-          </p:nvPr>
-        </p:nvSpPr>
-        <p:spPr/>
-        <p:txBody>
-          <a:bodyPr/>
-          <a:lstStyle/>
-          <a:p>
-            <a:r>
-              <a:rPr lang="en-US" dirty="0" smtClean="0"/>
-              <a:t>Refactoring and Agile practice</a:t>
-            </a:r>
-            <a:endParaRPr lang="en-US" dirty="0"/>
-          </a:p>
-        </p:txBody>
-      </p:sp>
-      <p:sp>
-        <p:nvSpPr>
           <p:cNvPr id="3" name="Espace réservé du contenu 2"/>
           <p:cNvSpPr>
             <a:spLocks noGrp="1"/>
           </p:cNvSpPr>
           <p:nvPr>
-            <p:ph idx="1"/>
+            <p:ph sz="half" idx="1"/>
           </p:nvPr>
         </p:nvSpPr>
-        <p:spPr/>
-        <p:txBody>
-          <a:bodyPr/>
+        <p:spPr>
+          <a:xfrm>
+            <a:off x="457200" y="381000"/>
+            <a:ext cx="8229600" cy="6096000"/>
+          </a:xfrm>
+        </p:spPr>
+        <p:txBody>
+          <a:bodyPr anchor="ctr">
+            <a:noAutofit/>
+          </a:bodyPr>
           <a:lstStyle/>
           <a:p>
-            <a:r>
-              <a:rPr lang="en-US" dirty="0" smtClean="0"/>
-              <a:t>Opportunity based</a:t>
-            </a:r>
-          </a:p>
-          <a:p>
-            <a:r>
-              <a:rPr lang="en-US" dirty="0" smtClean="0"/>
-              <a:t>12 iterations with production deployment</a:t>
-            </a:r>
-          </a:p>
-          <a:p>
-            <a:r>
-              <a:rPr lang="en-US" dirty="0" smtClean="0"/>
-              <a:t>1 year of step by step refactoring</a:t>
-            </a:r>
-          </a:p>
-          <a:p>
-            <a:r>
-              <a:rPr lang="en-US" dirty="0" smtClean="0"/>
-              <a:t>Test coverage from 10% to 50% (in progress)</a:t>
-            </a:r>
-          </a:p>
-          <a:p>
-            <a:r>
-              <a:rPr lang="en-US" dirty="0" smtClean="0"/>
-              <a:t>Automated testing on more than 400 fields in 5 complex forms</a:t>
-            </a:r>
-          </a:p>
-          <a:p>
-            <a:endParaRPr lang="en-US" dirty="0"/>
+            <a:pPr algn="ctr">
+              <a:lnSpc>
+                <a:spcPct val="150000"/>
+              </a:lnSpc>
+              <a:buNone/>
+            </a:pPr>
+            <a:r>
+              <a:rPr lang="en-US" sz="3200" dirty="0" smtClean="0">
+                <a:solidFill>
+                  <a:schemeClr val="bg1">
+                    <a:lumMod val="75000"/>
+                  </a:schemeClr>
+                </a:solidFill>
+              </a:rPr>
+              <a:t>Context</a:t>
+            </a:r>
+          </a:p>
+          <a:p>
+            <a:pPr algn="ctr">
+              <a:lnSpc>
+                <a:spcPct val="150000"/>
+              </a:lnSpc>
+              <a:buNone/>
+            </a:pPr>
+            <a:r>
+              <a:rPr lang="en-US" sz="3200" dirty="0" smtClean="0">
+                <a:solidFill>
+                  <a:schemeClr val="bg1">
+                    <a:lumMod val="75000"/>
+                  </a:schemeClr>
+                </a:solidFill>
+              </a:rPr>
+              <a:t>Modeling approach</a:t>
+            </a:r>
+          </a:p>
+          <a:p>
+            <a:pPr algn="ctr">
+              <a:lnSpc>
+                <a:spcPct val="150000"/>
+              </a:lnSpc>
+              <a:buNone/>
+            </a:pPr>
+            <a:r>
+              <a:rPr lang="en-US" sz="3200" dirty="0" smtClean="0">
+                <a:solidFill>
+                  <a:schemeClr val="bg1">
+                    <a:lumMod val="75000"/>
+                  </a:schemeClr>
+                </a:solidFill>
+              </a:rPr>
+              <a:t>Dependency Model</a:t>
+            </a:r>
+          </a:p>
+          <a:p>
+            <a:pPr algn="ctr">
+              <a:lnSpc>
+                <a:spcPct val="150000"/>
+              </a:lnSpc>
+              <a:buNone/>
+            </a:pPr>
+            <a:r>
+              <a:rPr lang="en-US" sz="3200" dirty="0" smtClean="0">
+                <a:solidFill>
+                  <a:schemeClr val="bg1">
+                    <a:lumMod val="75000"/>
+                  </a:schemeClr>
+                </a:solidFill>
+              </a:rPr>
+              <a:t>Field features</a:t>
+            </a:r>
+          </a:p>
+          <a:p>
+            <a:pPr algn="ctr">
+              <a:lnSpc>
+                <a:spcPct val="150000"/>
+              </a:lnSpc>
+              <a:buNone/>
+            </a:pPr>
+            <a:r>
+              <a:rPr lang="en-US" sz="3200" dirty="0" smtClean="0">
+                <a:solidFill>
+                  <a:schemeClr val="bg1">
+                    <a:lumMod val="75000"/>
+                  </a:schemeClr>
+                </a:solidFill>
+              </a:rPr>
+              <a:t>Extensions</a:t>
+            </a:r>
+          </a:p>
+          <a:p>
+            <a:pPr algn="ctr">
+              <a:lnSpc>
+                <a:spcPct val="150000"/>
+              </a:lnSpc>
+              <a:buNone/>
+            </a:pPr>
+            <a:r>
+              <a:rPr lang="en-US" sz="3200" dirty="0" smtClean="0">
+                <a:solidFill>
+                  <a:schemeClr val="bg1">
+                    <a:lumMod val="75000"/>
+                  </a:schemeClr>
+                </a:solidFill>
+              </a:rPr>
+              <a:t>Live coding demo</a:t>
+            </a:r>
+          </a:p>
+          <a:p>
+            <a:pPr algn="ctr">
+              <a:lnSpc>
+                <a:spcPct val="150000"/>
+              </a:lnSpc>
+              <a:buNone/>
+            </a:pPr>
+            <a:r>
+              <a:rPr lang="en-US" sz="3200" dirty="0" smtClean="0"/>
+              <a:t>Back to LesFurets.com</a:t>
+            </a:r>
+          </a:p>
+        </p:txBody>
+      </p:sp>
+      <p:sp>
+        <p:nvSpPr>
+          <p:cNvPr id="6" name="Forme en L 5"/>
+          <p:cNvSpPr/>
+          <p:nvPr/>
+        </p:nvSpPr>
+        <p:spPr>
+          <a:xfrm>
+            <a:off x="2286000" y="5943600"/>
+            <a:ext cx="533400" cy="533400"/>
+          </a:xfrm>
+          <a:prstGeom prst="corner">
+            <a:avLst/>
+          </a:prstGeom>
+          <a:ln>
+            <a:noFill/>
+          </a:ln>
+        </p:spPr>
+        <p:style>
+          <a:lnRef idx="2">
+            <a:schemeClr val="accent1">
+              <a:shade val="50000"/>
+            </a:schemeClr>
+          </a:lnRef>
+          <a:fillRef idx="1">
+            <a:schemeClr val="accent1"/>
+          </a:fillRef>
+          <a:effectRef idx="0">
+            <a:schemeClr val="accent1"/>
+          </a:effectRef>
+          <a:fontRef idx="minor">
+            <a:schemeClr val="lt1"/>
+          </a:fontRef>
+        </p:style>
+        <p:txBody>
+          <a:bodyPr rtlCol="0" anchor="ctr"/>
+          <a:lstStyle/>
+          <a:p>
+            <a:pPr algn="ctr"/>
+            <a:endParaRPr lang="en-US"/>
+          </a:p>
+        </p:txBody>
+      </p:sp>
+      <p:sp>
+        <p:nvSpPr>
+          <p:cNvPr id="7" name="Forme en L 6"/>
+          <p:cNvSpPr/>
+          <p:nvPr/>
+        </p:nvSpPr>
+        <p:spPr>
+          <a:xfrm rot="10800000">
+            <a:off x="6324600" y="5486399"/>
+            <a:ext cx="533400" cy="533400"/>
+          </a:xfrm>
+          <a:prstGeom prst="corner">
+            <a:avLst/>
+          </a:prstGeom>
+          <a:ln>
+            <a:noFill/>
+          </a:ln>
+        </p:spPr>
+        <p:style>
+          <a:lnRef idx="2">
+            <a:schemeClr val="accent1">
+              <a:shade val="50000"/>
+            </a:schemeClr>
+          </a:lnRef>
+          <a:fillRef idx="1">
+            <a:schemeClr val="accent1"/>
+          </a:fillRef>
+          <a:effectRef idx="0">
+            <a:schemeClr val="accent1"/>
+          </a:effectRef>
+          <a:fontRef idx="minor">
+            <a:schemeClr val="lt1"/>
+          </a:fontRef>
+        </p:style>
+        <p:txBody>
+          <a:bodyPr rtlCol="0" anchor="ctr"/>
+          <a:lstStyle/>
+          <a:p>
+            <a:pPr algn="ctr"/>
+            <a:endParaRPr lang="en-US"/>
           </a:p>
         </p:txBody>
       </p:sp>
     </p:spTree>
-    <p:extLst>
-      <p:ext uri="{BB962C8B-B14F-4D97-AF65-F5344CB8AC3E}">
-        <p14:creationId xmlns:p14="http://schemas.microsoft.com/office/powerpoint/2010/main" xmlns="" val="40929930"/>
-      </p:ext>
-    </p:extLst>
   </p:cSld>
   <p:clrMapOvr>
     <a:masterClrMapping/>
@@ -23143,7 +23759,7 @@
           <a:p>
             <a:r>
               <a:rPr lang="en-US" dirty="0" smtClean="0"/>
-              <a:t>Project implementation timeline</a:t>
+              <a:t>Refactoring and Agile practice</a:t>
             </a:r>
             <a:endParaRPr lang="en-US" dirty="0"/>
           </a:p>
@@ -23164,6 +23780,36 @@
           <a:bodyPr/>
           <a:lstStyle/>
           <a:p>
+            <a:r>
+              <a:rPr lang="en-US" dirty="0" smtClean="0"/>
+              <a:t>Opportunity based</a:t>
+            </a:r>
+          </a:p>
+          <a:p>
+            <a:r>
+              <a:rPr lang="en-US" dirty="0" smtClean="0"/>
+              <a:t>12 iterations with production deployment</a:t>
+            </a:r>
+          </a:p>
+          <a:p>
+            <a:r>
+              <a:rPr lang="en-US" dirty="0" smtClean="0"/>
+              <a:t>1 year of step by step refactoring</a:t>
+            </a:r>
+          </a:p>
+          <a:p>
+            <a:r>
+              <a:rPr lang="en-US" dirty="0" smtClean="0"/>
+              <a:t>Test coverage from 10% to 50% (in progress)</a:t>
+            </a:r>
+          </a:p>
+          <a:p>
+            <a:r>
+              <a:rPr lang="en-US" dirty="0" smtClean="0"/>
+              <a:t>Automated testing on more than 400 fields in 5 complex forms</a:t>
+            </a:r>
+          </a:p>
+          <a:p>
             <a:endParaRPr lang="en-US" dirty="0"/>
           </a:p>
         </p:txBody>
@@ -23171,13 +23817,20 @@
     </p:spTree>
     <p:extLst>
       <p:ext uri="{BB962C8B-B14F-4D97-AF65-F5344CB8AC3E}">
-        <p14:creationId xmlns:p14="http://schemas.microsoft.com/office/powerpoint/2010/main" xmlns="" val="1336479164"/>
+        <p14:creationId xmlns="" xmlns:p14="http://schemas.microsoft.com/office/powerpoint/2010/main" val="40929930"/>
       </p:ext>
     </p:extLst>
   </p:cSld>
   <p:clrMapOvr>
     <a:masterClrMapping/>
   </p:clrMapOvr>
+  <p:timing>
+    <p:tnLst>
+      <p:par>
+        <p:cTn id="1" dur="indefinite" restart="never" nodeType="tmRoot"/>
+      </p:par>
+    </p:tnLst>
+  </p:timing>
 </p:sld>
 </file>
 
@@ -23215,7 +23868,7 @@
           <a:p>
             <a:r>
               <a:rPr lang="en-US" dirty="0" smtClean="0"/>
-              <a:t>Under investigation</a:t>
+              <a:t>Project implementation timeline</a:t>
             </a:r>
             <a:endParaRPr lang="en-US" dirty="0"/>
           </a:p>
@@ -23236,6 +23889,78 @@
           <a:bodyPr/>
           <a:lstStyle/>
           <a:p>
+            <a:endParaRPr lang="en-US" dirty="0"/>
+          </a:p>
+        </p:txBody>
+      </p:sp>
+    </p:spTree>
+    <p:extLst>
+      <p:ext uri="{BB962C8B-B14F-4D97-AF65-F5344CB8AC3E}">
+        <p14:creationId xmlns="" xmlns:p14="http://schemas.microsoft.com/office/powerpoint/2010/main" val="1336479164"/>
+      </p:ext>
+    </p:extLst>
+  </p:cSld>
+  <p:clrMapOvr>
+    <a:masterClrMapping/>
+  </p:clrMapOvr>
+</p:sld>
+</file>
+
+<file path=ppt/slides/slide63.xml><?xml version="1.0" encoding="utf-8"?>
+<p:sld xmlns:a="http://schemas.openxmlformats.org/drawingml/2006/main" xmlns:r="http://schemas.openxmlformats.org/officeDocument/2006/relationships" xmlns:p="http://schemas.openxmlformats.org/presentationml/2006/main">
+  <p:cSld>
+    <p:spTree>
+      <p:nvGrpSpPr>
+        <p:cNvPr id="1" name=""/>
+        <p:cNvGrpSpPr/>
+        <p:nvPr/>
+      </p:nvGrpSpPr>
+      <p:grpSpPr>
+        <a:xfrm>
+          <a:off x="0" y="0"/>
+          <a:ext cx="0" cy="0"/>
+          <a:chOff x="0" y="0"/>
+          <a:chExt cx="0" cy="0"/>
+        </a:xfrm>
+      </p:grpSpPr>
+      <p:sp>
+        <p:nvSpPr>
+          <p:cNvPr id="2" name="Titre 1"/>
+          <p:cNvSpPr>
+            <a:spLocks noGrp="1"/>
+          </p:cNvSpPr>
+          <p:nvPr>
+            <p:ph type="title"/>
+          </p:nvPr>
+        </p:nvSpPr>
+        <p:spPr/>
+        <p:txBody>
+          <a:bodyPr/>
+          <a:lstStyle/>
+          <a:p>
+            <a:r>
+              <a:rPr lang="en-US" dirty="0" smtClean="0"/>
+              <a:t>Under investigation</a:t>
+            </a:r>
+            <a:endParaRPr lang="en-US" dirty="0"/>
+          </a:p>
+        </p:txBody>
+      </p:sp>
+      <p:sp>
+        <p:nvSpPr>
+          <p:cNvPr id="3" name="Espace réservé du contenu 2"/>
+          <p:cNvSpPr>
+            <a:spLocks noGrp="1"/>
+          </p:cNvSpPr>
+          <p:nvPr>
+            <p:ph idx="1"/>
+          </p:nvPr>
+        </p:nvSpPr>
+        <p:spPr/>
+        <p:txBody>
+          <a:bodyPr/>
+          <a:lstStyle/>
+          <a:p>
             <a:r>
               <a:rPr lang="en-US" dirty="0" smtClean="0"/>
               <a:t>Multi Variable Testing</a:t>
@@ -23270,7 +23995,7 @@
     </p:spTree>
     <p:extLst>
       <p:ext uri="{BB962C8B-B14F-4D97-AF65-F5344CB8AC3E}">
-        <p14:creationId xmlns:p14="http://schemas.microsoft.com/office/powerpoint/2010/main" xmlns="" val="4014343169"/>
+        <p14:creationId xmlns="" xmlns:p14="http://schemas.microsoft.com/office/powerpoint/2010/main" val="4014343169"/>
       </p:ext>
     </p:extLst>
   </p:cSld>
@@ -23287,7 +24012,7 @@
 </p:sld>
 </file>
 
-<file path=ppt/slides/slide63.xml><?xml version="1.0" encoding="utf-8"?>
+<file path=ppt/slides/slide64.xml><?xml version="1.0" encoding="utf-8"?>
 <p:sld xmlns:a="http://schemas.openxmlformats.org/drawingml/2006/main" xmlns:r="http://schemas.openxmlformats.org/officeDocument/2006/relationships" xmlns:p="http://schemas.openxmlformats.org/presentationml/2006/main">
   <p:cSld>
     <p:spTree>
@@ -23421,7 +24146,7 @@
     </p:spTree>
     <p:extLst>
       <p:ext uri="{BB962C8B-B14F-4D97-AF65-F5344CB8AC3E}">
-        <p14:creationId xmlns:p14="http://schemas.microsoft.com/office/powerpoint/2010/main" xmlns="" val="2781303602"/>
+        <p14:creationId xmlns="" xmlns:p14="http://schemas.microsoft.com/office/powerpoint/2010/main" val="2781303602"/>
       </p:ext>
     </p:extLst>
   </p:cSld>
@@ -23608,7 +24333,7 @@
     </p:spTree>
     <p:extLst>
       <p:ext uri="{BB962C8B-B14F-4D97-AF65-F5344CB8AC3E}">
-        <p14:creationId xmlns:p14="http://schemas.microsoft.com/office/powerpoint/2010/main" xmlns="" val="4255503392"/>
+        <p14:creationId xmlns="" xmlns:p14="http://schemas.microsoft.com/office/powerpoint/2010/main" val="4255503392"/>
       </p:ext>
     </p:extLst>
   </p:cSld>
@@ -23768,7 +24493,7 @@
     </p:spTree>
     <p:extLst>
       <p:ext uri="{BB962C8B-B14F-4D97-AF65-F5344CB8AC3E}">
-        <p14:creationId xmlns:p14="http://schemas.microsoft.com/office/powerpoint/2010/main" xmlns="" val="2375505937"/>
+        <p14:creationId xmlns="" xmlns:p14="http://schemas.microsoft.com/office/powerpoint/2010/main" val="2375505937"/>
       </p:ext>
     </p:extLst>
   </p:cSld>
@@ -23899,7 +24624,7 @@
     </p:spTree>
     <p:extLst>
       <p:ext uri="{BB962C8B-B14F-4D97-AF65-F5344CB8AC3E}">
-        <p14:creationId xmlns:p14="http://schemas.microsoft.com/office/powerpoint/2010/main" xmlns="" val="1618189430"/>
+        <p14:creationId xmlns="" xmlns:p14="http://schemas.microsoft.com/office/powerpoint/2010/main" val="1618189430"/>
       </p:ext>
     </p:extLst>
   </p:cSld>
@@ -23907,7 +24632,7 @@
     <a:masterClrMapping/>
   </p:clrMapOvr>
   <mc:AlternateContent xmlns:mc="http://schemas.openxmlformats.org/markup-compatibility/2006">
-    <mc:Choice xmlns:p14="http://schemas.microsoft.com/office/powerpoint/2010/main" xmlns="" Requires="p14">
+    <mc:Choice xmlns="" xmlns:p14="http://schemas.microsoft.com/office/powerpoint/2010/main" Requires="p14">
       <p:transition spd="slow" p14:dur="2000"/>
     </mc:Choice>
     <mc:Fallback>

</xml_diff>

<commit_message>
minor fix on slides
</commit_message>
<xml_diff>
--- a/mdl4ui-docs/mdl4ui_cg2013.pptx
+++ b/mdl4ui-docs/mdl4ui_cg2013.pptx
@@ -335,7 +335,7 @@
     </p:spTree>
     <p:extLst>
       <p:ext uri="{BB962C8B-B14F-4D97-AF65-F5344CB8AC3E}">
-        <p14:creationId xmlns="" xmlns:p14="http://schemas.microsoft.com/office/powerpoint/2010/main" val="70803672"/>
+        <p14:creationId xmlns:p14="http://schemas.microsoft.com/office/powerpoint/2010/main" xmlns="" val="70803672"/>
       </p:ext>
     </p:extLst>
   </p:cSld>
@@ -595,7 +595,7 @@
     </p:spTree>
     <p:extLst>
       <p:ext uri="{BB962C8B-B14F-4D97-AF65-F5344CB8AC3E}">
-        <p14:creationId xmlns="" xmlns:p14="http://schemas.microsoft.com/office/powerpoint/2010/main" val="1701488114"/>
+        <p14:creationId xmlns:p14="http://schemas.microsoft.com/office/powerpoint/2010/main" xmlns="" val="1701488114"/>
       </p:ext>
     </p:extLst>
   </p:cSld>
@@ -770,7 +770,7 @@
     </p:spTree>
     <p:extLst>
       <p:ext uri="{BB962C8B-B14F-4D97-AF65-F5344CB8AC3E}">
-        <p14:creationId xmlns="" xmlns:p14="http://schemas.microsoft.com/office/powerpoint/2010/main" val="3047004223"/>
+        <p14:creationId xmlns:p14="http://schemas.microsoft.com/office/powerpoint/2010/main" xmlns="" val="3047004223"/>
       </p:ext>
     </p:extLst>
   </p:cSld>
@@ -855,7 +855,7 @@
     </p:spTree>
     <p:extLst>
       <p:ext uri="{BB962C8B-B14F-4D97-AF65-F5344CB8AC3E}">
-        <p14:creationId xmlns="" xmlns:p14="http://schemas.microsoft.com/office/powerpoint/2010/main" val="3280979232"/>
+        <p14:creationId xmlns:p14="http://schemas.microsoft.com/office/powerpoint/2010/main" xmlns="" val="3280979232"/>
       </p:ext>
     </p:extLst>
   </p:cSld>
@@ -940,7 +940,7 @@
     </p:spTree>
     <p:extLst>
       <p:ext uri="{BB962C8B-B14F-4D97-AF65-F5344CB8AC3E}">
-        <p14:creationId xmlns="" xmlns:p14="http://schemas.microsoft.com/office/powerpoint/2010/main" val="1987381696"/>
+        <p14:creationId xmlns:p14="http://schemas.microsoft.com/office/powerpoint/2010/main" xmlns="" val="1987381696"/>
       </p:ext>
     </p:extLst>
   </p:cSld>
@@ -1266,7 +1266,7 @@
     </p:spTree>
     <p:extLst>
       <p:ext uri="{BB962C8B-B14F-4D97-AF65-F5344CB8AC3E}">
-        <p14:creationId xmlns="" xmlns:p14="http://schemas.microsoft.com/office/powerpoint/2010/main" val="322609761"/>
+        <p14:creationId xmlns:p14="http://schemas.microsoft.com/office/powerpoint/2010/main" xmlns="" val="322609761"/>
       </p:ext>
     </p:extLst>
   </p:cSld>
@@ -1438,7 +1438,7 @@
     </p:spTree>
     <p:extLst>
       <p:ext uri="{BB962C8B-B14F-4D97-AF65-F5344CB8AC3E}">
-        <p14:creationId xmlns="" xmlns:p14="http://schemas.microsoft.com/office/powerpoint/2010/main" val="1248456722"/>
+        <p14:creationId xmlns:p14="http://schemas.microsoft.com/office/powerpoint/2010/main" xmlns="" val="1248456722"/>
       </p:ext>
     </p:extLst>
   </p:cSld>
@@ -1620,7 +1620,7 @@
     </p:spTree>
     <p:extLst>
       <p:ext uri="{BB962C8B-B14F-4D97-AF65-F5344CB8AC3E}">
-        <p14:creationId xmlns="" xmlns:p14="http://schemas.microsoft.com/office/powerpoint/2010/main" val="4236232986"/>
+        <p14:creationId xmlns:p14="http://schemas.microsoft.com/office/powerpoint/2010/main" xmlns="" val="4236232986"/>
       </p:ext>
     </p:extLst>
   </p:cSld>
@@ -1792,7 +1792,7 @@
     </p:spTree>
     <p:extLst>
       <p:ext uri="{BB962C8B-B14F-4D97-AF65-F5344CB8AC3E}">
-        <p14:creationId xmlns="" xmlns:p14="http://schemas.microsoft.com/office/powerpoint/2010/main" val="3454835055"/>
+        <p14:creationId xmlns:p14="http://schemas.microsoft.com/office/powerpoint/2010/main" xmlns="" val="3454835055"/>
       </p:ext>
     </p:extLst>
   </p:cSld>
@@ -2047,7 +2047,7 @@
     </p:spTree>
     <p:extLst>
       <p:ext uri="{BB962C8B-B14F-4D97-AF65-F5344CB8AC3E}">
-        <p14:creationId xmlns="" xmlns:p14="http://schemas.microsoft.com/office/powerpoint/2010/main" val="804127244"/>
+        <p14:creationId xmlns:p14="http://schemas.microsoft.com/office/powerpoint/2010/main" xmlns="" val="804127244"/>
       </p:ext>
     </p:extLst>
   </p:cSld>
@@ -2337,7 +2337,7 @@
     </p:spTree>
     <p:extLst>
       <p:ext uri="{BB962C8B-B14F-4D97-AF65-F5344CB8AC3E}">
-        <p14:creationId xmlns="" xmlns:p14="http://schemas.microsoft.com/office/powerpoint/2010/main" val="586698658"/>
+        <p14:creationId xmlns:p14="http://schemas.microsoft.com/office/powerpoint/2010/main" xmlns="" val="586698658"/>
       </p:ext>
     </p:extLst>
   </p:cSld>
@@ -2761,7 +2761,7 @@
     </p:spTree>
     <p:extLst>
       <p:ext uri="{BB962C8B-B14F-4D97-AF65-F5344CB8AC3E}">
-        <p14:creationId xmlns="" xmlns:p14="http://schemas.microsoft.com/office/powerpoint/2010/main" val="19144436"/>
+        <p14:creationId xmlns:p14="http://schemas.microsoft.com/office/powerpoint/2010/main" xmlns="" val="19144436"/>
       </p:ext>
     </p:extLst>
   </p:cSld>
@@ -2881,7 +2881,7 @@
     </p:spTree>
     <p:extLst>
       <p:ext uri="{BB962C8B-B14F-4D97-AF65-F5344CB8AC3E}">
-        <p14:creationId xmlns="" xmlns:p14="http://schemas.microsoft.com/office/powerpoint/2010/main" val="202749597"/>
+        <p14:creationId xmlns:p14="http://schemas.microsoft.com/office/powerpoint/2010/main" xmlns="" val="202749597"/>
       </p:ext>
     </p:extLst>
   </p:cSld>
@@ -2978,7 +2978,7 @@
     </p:spTree>
     <p:extLst>
       <p:ext uri="{BB962C8B-B14F-4D97-AF65-F5344CB8AC3E}">
-        <p14:creationId xmlns="" xmlns:p14="http://schemas.microsoft.com/office/powerpoint/2010/main" val="2898363528"/>
+        <p14:creationId xmlns:p14="http://schemas.microsoft.com/office/powerpoint/2010/main" xmlns="" val="2898363528"/>
       </p:ext>
     </p:extLst>
   </p:cSld>
@@ -3257,7 +3257,7 @@
     </p:spTree>
     <p:extLst>
       <p:ext uri="{BB962C8B-B14F-4D97-AF65-F5344CB8AC3E}">
-        <p14:creationId xmlns="" xmlns:p14="http://schemas.microsoft.com/office/powerpoint/2010/main" val="4010598191"/>
+        <p14:creationId xmlns:p14="http://schemas.microsoft.com/office/powerpoint/2010/main" xmlns="" val="4010598191"/>
       </p:ext>
     </p:extLst>
   </p:cSld>
@@ -3512,7 +3512,7 @@
     </p:spTree>
     <p:extLst>
       <p:ext uri="{BB962C8B-B14F-4D97-AF65-F5344CB8AC3E}">
-        <p14:creationId xmlns="" xmlns:p14="http://schemas.microsoft.com/office/powerpoint/2010/main" val="1433498939"/>
+        <p14:creationId xmlns:p14="http://schemas.microsoft.com/office/powerpoint/2010/main" xmlns="" val="1433498939"/>
       </p:ext>
     </p:extLst>
   </p:cSld>
@@ -3763,7 +3763,7 @@
     </p:spTree>
     <p:extLst>
       <p:ext uri="{BB962C8B-B14F-4D97-AF65-F5344CB8AC3E}">
-        <p14:creationId xmlns="" xmlns:p14="http://schemas.microsoft.com/office/powerpoint/2010/main" val="2684825788"/>
+        <p14:creationId xmlns:p14="http://schemas.microsoft.com/office/powerpoint/2010/main" xmlns="" val="2684825788"/>
       </p:ext>
     </p:extLst>
   </p:cSld>
@@ -4134,7 +4134,7 @@
     </p:spTree>
     <p:extLst>
       <p:ext uri="{BB962C8B-B14F-4D97-AF65-F5344CB8AC3E}">
-        <p14:creationId xmlns="" xmlns:p14="http://schemas.microsoft.com/office/powerpoint/2010/main" val="3955344790"/>
+        <p14:creationId xmlns:p14="http://schemas.microsoft.com/office/powerpoint/2010/main" xmlns="" val="3955344790"/>
       </p:ext>
     </p:extLst>
   </p:cSld>
@@ -4142,7 +4142,7 @@
     <a:masterClrMapping/>
   </p:clrMapOvr>
   <mc:AlternateContent xmlns:mc="http://schemas.openxmlformats.org/markup-compatibility/2006">
-    <mc:Choice xmlns="" xmlns:p14="http://schemas.microsoft.com/office/powerpoint/2010/main" Requires="p14">
+    <mc:Choice xmlns:p14="http://schemas.microsoft.com/office/powerpoint/2010/main" xmlns="" Requires="p14">
       <p:transition spd="slow" p14:dur="2000"/>
     </mc:Choice>
     <mc:Fallback>
@@ -4315,7 +4315,7 @@
     </p:spTree>
     <p:extLst>
       <p:ext uri="{BB962C8B-B14F-4D97-AF65-F5344CB8AC3E}">
-        <p14:creationId xmlns="" xmlns:p14="http://schemas.microsoft.com/office/powerpoint/2010/main" val="3644490438"/>
+        <p14:creationId xmlns:p14="http://schemas.microsoft.com/office/powerpoint/2010/main" xmlns="" val="3644490438"/>
       </p:ext>
     </p:extLst>
   </p:cSld>
@@ -4717,7 +4717,7 @@
     </p:spTree>
     <p:extLst>
       <p:ext uri="{BB962C8B-B14F-4D97-AF65-F5344CB8AC3E}">
-        <p14:creationId xmlns="" xmlns:p14="http://schemas.microsoft.com/office/powerpoint/2010/main" val="1728169033"/>
+        <p14:creationId xmlns:p14="http://schemas.microsoft.com/office/powerpoint/2010/main" xmlns="" val="1728169033"/>
       </p:ext>
     </p:extLst>
   </p:cSld>
@@ -5061,7 +5061,7 @@
             <a:blip r:embed="rId2" cstate="print">
               <a:extLst>
                 <a:ext uri="{28A0092B-C50C-407E-A947-70E740481C1C}">
-                  <a14:useLocalDpi xmlns="" xmlns:a14="http://schemas.microsoft.com/office/drawing/2010/main" val="0"/>
+                  <a14:useLocalDpi xmlns:a14="http://schemas.microsoft.com/office/drawing/2010/main" xmlns="" val="0"/>
                 </a:ext>
               </a:extLst>
             </a:blip>
@@ -5091,7 +5091,7 @@
             <a:blip r:embed="rId3" cstate="print">
               <a:extLst>
                 <a:ext uri="{28A0092B-C50C-407E-A947-70E740481C1C}">
-                  <a14:useLocalDpi xmlns="" xmlns:a14="http://schemas.microsoft.com/office/drawing/2010/main" val="0"/>
+                  <a14:useLocalDpi xmlns:a14="http://schemas.microsoft.com/office/drawing/2010/main" xmlns="" val="0"/>
                 </a:ext>
               </a:extLst>
             </a:blip>
@@ -5121,7 +5121,7 @@
             <a:blip r:embed="rId4" cstate="print">
               <a:extLst>
                 <a:ext uri="{28A0092B-C50C-407E-A947-70E740481C1C}">
-                  <a14:useLocalDpi xmlns="" xmlns:a14="http://schemas.microsoft.com/office/drawing/2010/main" val="0"/>
+                  <a14:useLocalDpi xmlns:a14="http://schemas.microsoft.com/office/drawing/2010/main" xmlns="" val="0"/>
                 </a:ext>
               </a:extLst>
             </a:blip>
@@ -5244,7 +5244,7 @@
     </p:spTree>
     <p:extLst>
       <p:ext uri="{BB962C8B-B14F-4D97-AF65-F5344CB8AC3E}">
-        <p14:creationId xmlns="" xmlns:p14="http://schemas.microsoft.com/office/powerpoint/2010/main" val="1377264780"/>
+        <p14:creationId xmlns:p14="http://schemas.microsoft.com/office/powerpoint/2010/main" xmlns="" val="1377264780"/>
       </p:ext>
     </p:extLst>
   </p:cSld>
@@ -5442,7 +5442,7 @@
           <a:blip r:embed="rId2" cstate="print">
             <a:extLst>
               <a:ext uri="{28A0092B-C50C-407E-A947-70E740481C1C}">
-                <a14:useLocalDpi xmlns="" xmlns:a14="http://schemas.microsoft.com/office/drawing/2010/main" val="0"/>
+                <a14:useLocalDpi xmlns:a14="http://schemas.microsoft.com/office/drawing/2010/main" xmlns="" val="0"/>
               </a:ext>
             </a:extLst>
           </a:blip>
@@ -5472,7 +5472,7 @@
           <a:blip r:embed="rId3" cstate="print">
             <a:extLst>
               <a:ext uri="{28A0092B-C50C-407E-A947-70E740481C1C}">
-                <a14:useLocalDpi xmlns="" xmlns:a14="http://schemas.microsoft.com/office/drawing/2010/main" val="0"/>
+                <a14:useLocalDpi xmlns:a14="http://schemas.microsoft.com/office/drawing/2010/main" xmlns="" val="0"/>
               </a:ext>
             </a:extLst>
           </a:blip>
@@ -5598,7 +5598,7 @@
           <a:blip r:embed="rId4" cstate="print">
             <a:extLst>
               <a:ext uri="{28A0092B-C50C-407E-A947-70E740481C1C}">
-                <a14:useLocalDpi xmlns="" xmlns:a14="http://schemas.microsoft.com/office/drawing/2010/main" val="0"/>
+                <a14:useLocalDpi xmlns:a14="http://schemas.microsoft.com/office/drawing/2010/main" xmlns="" val="0"/>
               </a:ext>
             </a:extLst>
           </a:blip>
@@ -5711,7 +5711,7 @@
     </p:spTree>
     <p:extLst>
       <p:ext uri="{BB962C8B-B14F-4D97-AF65-F5344CB8AC3E}">
-        <p14:creationId xmlns="" xmlns:p14="http://schemas.microsoft.com/office/powerpoint/2010/main" val="3336203041"/>
+        <p14:creationId xmlns:p14="http://schemas.microsoft.com/office/powerpoint/2010/main" xmlns="" val="3336203041"/>
       </p:ext>
     </p:extLst>
   </p:cSld>
@@ -6129,7 +6129,7 @@
           <a:blip r:embed="rId2" cstate="print">
             <a:extLst>
               <a:ext uri="{28A0092B-C50C-407E-A947-70E740481C1C}">
-                <a14:useLocalDpi xmlns="" xmlns:a14="http://schemas.microsoft.com/office/drawing/2010/main" val="0"/>
+                <a14:useLocalDpi xmlns:a14="http://schemas.microsoft.com/office/drawing/2010/main" xmlns="" val="0"/>
               </a:ext>
             </a:extLst>
           </a:blip>
@@ -6159,7 +6159,7 @@
           <a:blip r:embed="rId3" cstate="print">
             <a:extLst>
               <a:ext uri="{28A0092B-C50C-407E-A947-70E740481C1C}">
-                <a14:useLocalDpi xmlns="" xmlns:a14="http://schemas.microsoft.com/office/drawing/2010/main" val="0"/>
+                <a14:useLocalDpi xmlns:a14="http://schemas.microsoft.com/office/drawing/2010/main" xmlns="" val="0"/>
               </a:ext>
             </a:extLst>
           </a:blip>
@@ -6189,7 +6189,7 @@
           <a:blip r:embed="rId4" cstate="print">
             <a:extLst>
               <a:ext uri="{28A0092B-C50C-407E-A947-70E740481C1C}">
-                <a14:useLocalDpi xmlns="" xmlns:a14="http://schemas.microsoft.com/office/drawing/2010/main" val="0"/>
+                <a14:useLocalDpi xmlns:a14="http://schemas.microsoft.com/office/drawing/2010/main" xmlns="" val="0"/>
               </a:ext>
             </a:extLst>
           </a:blip>
@@ -6302,7 +6302,7 @@
     </p:spTree>
     <p:extLst>
       <p:ext uri="{BB962C8B-B14F-4D97-AF65-F5344CB8AC3E}">
-        <p14:creationId xmlns="" xmlns:p14="http://schemas.microsoft.com/office/powerpoint/2010/main" val="864210357"/>
+        <p14:creationId xmlns:p14="http://schemas.microsoft.com/office/powerpoint/2010/main" xmlns="" val="864210357"/>
       </p:ext>
     </p:extLst>
   </p:cSld>
@@ -6576,7 +6576,7 @@
           <a:blip r:embed="rId2" cstate="print">
             <a:extLst>
               <a:ext uri="{28A0092B-C50C-407E-A947-70E740481C1C}">
-                <a14:useLocalDpi xmlns="" xmlns:a14="http://schemas.microsoft.com/office/drawing/2010/main" val="0"/>
+                <a14:useLocalDpi xmlns:a14="http://schemas.microsoft.com/office/drawing/2010/main" xmlns="" val="0"/>
               </a:ext>
             </a:extLst>
           </a:blip>
@@ -6606,7 +6606,7 @@
           <a:blip r:embed="rId3" cstate="print">
             <a:extLst>
               <a:ext uri="{28A0092B-C50C-407E-A947-70E740481C1C}">
-                <a14:useLocalDpi xmlns="" xmlns:a14="http://schemas.microsoft.com/office/drawing/2010/main" val="0"/>
+                <a14:useLocalDpi xmlns:a14="http://schemas.microsoft.com/office/drawing/2010/main" xmlns="" val="0"/>
               </a:ext>
             </a:extLst>
           </a:blip>
@@ -6843,7 +6843,7 @@
           <a:blip r:embed="rId4" cstate="print">
             <a:extLst>
               <a:ext uri="{28A0092B-C50C-407E-A947-70E740481C1C}">
-                <a14:useLocalDpi xmlns="" xmlns:a14="http://schemas.microsoft.com/office/drawing/2010/main" val="0"/>
+                <a14:useLocalDpi xmlns:a14="http://schemas.microsoft.com/office/drawing/2010/main" xmlns="" val="0"/>
               </a:ext>
             </a:extLst>
           </a:blip>
@@ -7322,7 +7322,7 @@
     </p:spTree>
     <p:extLst>
       <p:ext uri="{BB962C8B-B14F-4D97-AF65-F5344CB8AC3E}">
-        <p14:creationId xmlns="" xmlns:p14="http://schemas.microsoft.com/office/powerpoint/2010/main" val="3336203041"/>
+        <p14:creationId xmlns:p14="http://schemas.microsoft.com/office/powerpoint/2010/main" xmlns="" val="3336203041"/>
       </p:ext>
     </p:extLst>
   </p:cSld>
@@ -7552,7 +7552,7 @@
           <a:blip r:embed="rId2" cstate="print">
             <a:extLst>
               <a:ext uri="{28A0092B-C50C-407E-A947-70E740481C1C}">
-                <a14:useLocalDpi xmlns="" xmlns:a14="http://schemas.microsoft.com/office/drawing/2010/main" val="0"/>
+                <a14:useLocalDpi xmlns:a14="http://schemas.microsoft.com/office/drawing/2010/main" xmlns="" val="0"/>
               </a:ext>
             </a:extLst>
           </a:blip>
@@ -7582,7 +7582,7 @@
           <a:blip r:embed="rId3" cstate="print">
             <a:extLst>
               <a:ext uri="{28A0092B-C50C-407E-A947-70E740481C1C}">
-                <a14:useLocalDpi xmlns="" xmlns:a14="http://schemas.microsoft.com/office/drawing/2010/main" val="0"/>
+                <a14:useLocalDpi xmlns:a14="http://schemas.microsoft.com/office/drawing/2010/main" xmlns="" val="0"/>
               </a:ext>
             </a:extLst>
           </a:blip>
@@ -7899,7 +7899,7 @@
     </p:spTree>
     <p:extLst>
       <p:ext uri="{BB962C8B-B14F-4D97-AF65-F5344CB8AC3E}">
-        <p14:creationId xmlns="" xmlns:p14="http://schemas.microsoft.com/office/powerpoint/2010/main" val="2819423520"/>
+        <p14:creationId xmlns:p14="http://schemas.microsoft.com/office/powerpoint/2010/main" xmlns="" val="2819423520"/>
       </p:ext>
     </p:extLst>
   </p:cSld>
@@ -8407,7 +8407,7 @@
     </p:spTree>
     <p:extLst>
       <p:ext uri="{BB962C8B-B14F-4D97-AF65-F5344CB8AC3E}">
-        <p14:creationId xmlns="" xmlns:p14="http://schemas.microsoft.com/office/powerpoint/2010/main" val="3627640579"/>
+        <p14:creationId xmlns:p14="http://schemas.microsoft.com/office/powerpoint/2010/main" xmlns="" val="3627640579"/>
       </p:ext>
     </p:extLst>
   </p:cSld>
@@ -8545,7 +8545,7 @@
           <a:blip r:embed="rId2" cstate="print">
             <a:extLst>
               <a:ext uri="{28A0092B-C50C-407E-A947-70E740481C1C}">
-                <a14:useLocalDpi xmlns="" xmlns:a14="http://schemas.microsoft.com/office/drawing/2010/main" val="0"/>
+                <a14:useLocalDpi xmlns:a14="http://schemas.microsoft.com/office/drawing/2010/main" xmlns="" val="0"/>
               </a:ext>
             </a:extLst>
           </a:blip>
@@ -8621,7 +8621,7 @@
     </p:spTree>
     <p:extLst>
       <p:ext uri="{BB962C8B-B14F-4D97-AF65-F5344CB8AC3E}">
-        <p14:creationId xmlns="" xmlns:p14="http://schemas.microsoft.com/office/powerpoint/2010/main" val="171061288"/>
+        <p14:creationId xmlns:p14="http://schemas.microsoft.com/office/powerpoint/2010/main" xmlns="" val="171061288"/>
       </p:ext>
     </p:extLst>
   </p:cSld>
@@ -8891,7 +8891,7 @@
           <a:blip r:embed="rId2" cstate="print">
             <a:extLst>
               <a:ext uri="{28A0092B-C50C-407E-A947-70E740481C1C}">
-                <a14:useLocalDpi xmlns="" xmlns:a14="http://schemas.microsoft.com/office/drawing/2010/main"/>
+                <a14:useLocalDpi xmlns:a14="http://schemas.microsoft.com/office/drawing/2010/main" xmlns=""/>
               </a:ext>
             </a:extLst>
           </a:blip>
@@ -8916,7 +8916,7 @@
     </p:spTree>
     <p:extLst>
       <p:ext uri="{BB962C8B-B14F-4D97-AF65-F5344CB8AC3E}">
-        <p14:creationId xmlns="" xmlns:p14="http://schemas.microsoft.com/office/powerpoint/2010/main" val="1630604182"/>
+        <p14:creationId xmlns:p14="http://schemas.microsoft.com/office/powerpoint/2010/main" xmlns="" val="1630604182"/>
       </p:ext>
     </p:extLst>
   </p:cSld>
@@ -8962,7 +8962,7 @@
           <a:blip r:embed="rId2" cstate="print">
             <a:extLst>
               <a:ext uri="{28A0092B-C50C-407E-A947-70E740481C1C}">
-                <a14:useLocalDpi xmlns="" xmlns:a14="http://schemas.microsoft.com/office/drawing/2010/main" val="0"/>
+                <a14:useLocalDpi xmlns:a14="http://schemas.microsoft.com/office/drawing/2010/main" xmlns="" val="0"/>
               </a:ext>
             </a:extLst>
           </a:blip>
@@ -9197,7 +9197,7 @@
     </p:spTree>
     <p:extLst>
       <p:ext uri="{BB962C8B-B14F-4D97-AF65-F5344CB8AC3E}">
-        <p14:creationId xmlns="" xmlns:p14="http://schemas.microsoft.com/office/powerpoint/2010/main" val="394514968"/>
+        <p14:creationId xmlns:p14="http://schemas.microsoft.com/office/powerpoint/2010/main" xmlns="" val="394514968"/>
       </p:ext>
     </p:extLst>
   </p:cSld>
@@ -9331,7 +9331,7 @@
           <a:blip r:embed="rId2" cstate="print">
             <a:extLst>
               <a:ext uri="{28A0092B-C50C-407E-A947-70E740481C1C}">
-                <a14:useLocalDpi xmlns="" xmlns:a14="http://schemas.microsoft.com/office/drawing/2010/main" val="0"/>
+                <a14:useLocalDpi xmlns:a14="http://schemas.microsoft.com/office/drawing/2010/main" xmlns="" val="0"/>
               </a:ext>
             </a:extLst>
           </a:blip>
@@ -9412,7 +9412,7 @@
     </p:spTree>
     <p:extLst>
       <p:ext uri="{BB962C8B-B14F-4D97-AF65-F5344CB8AC3E}">
-        <p14:creationId xmlns="" xmlns:p14="http://schemas.microsoft.com/office/powerpoint/2010/main" val="3593113261"/>
+        <p14:creationId xmlns:p14="http://schemas.microsoft.com/office/powerpoint/2010/main" xmlns="" val="3593113261"/>
       </p:ext>
     </p:extLst>
   </p:cSld>
@@ -9570,7 +9570,7 @@
           <a:blip r:embed="rId2" cstate="print">
             <a:extLst>
               <a:ext uri="{28A0092B-C50C-407E-A947-70E740481C1C}">
-                <a14:useLocalDpi xmlns="" xmlns:a14="http://schemas.microsoft.com/office/drawing/2010/main" val="0"/>
+                <a14:useLocalDpi xmlns:a14="http://schemas.microsoft.com/office/drawing/2010/main" xmlns="" val="0"/>
               </a:ext>
             </a:extLst>
           </a:blip>
@@ -9646,7 +9646,7 @@
     </p:spTree>
     <p:extLst>
       <p:ext uri="{BB962C8B-B14F-4D97-AF65-F5344CB8AC3E}">
-        <p14:creationId xmlns="" xmlns:p14="http://schemas.microsoft.com/office/powerpoint/2010/main" val="451913240"/>
+        <p14:creationId xmlns:p14="http://schemas.microsoft.com/office/powerpoint/2010/main" xmlns="" val="451913240"/>
       </p:ext>
     </p:extLst>
   </p:cSld>
@@ -9715,7 +9715,7 @@
           <a:blip r:embed="rId2" cstate="print">
             <a:extLst>
               <a:ext uri="{28A0092B-C50C-407E-A947-70E740481C1C}">
-                <a14:useLocalDpi xmlns="" xmlns:a14="http://schemas.microsoft.com/office/drawing/2010/main" val="0"/>
+                <a14:useLocalDpi xmlns:a14="http://schemas.microsoft.com/office/drawing/2010/main" xmlns="" val="0"/>
               </a:ext>
             </a:extLst>
           </a:blip>
@@ -9912,7 +9912,7 @@
     </p:spTree>
     <p:extLst>
       <p:ext uri="{BB962C8B-B14F-4D97-AF65-F5344CB8AC3E}">
-        <p14:creationId xmlns="" xmlns:p14="http://schemas.microsoft.com/office/powerpoint/2010/main" val="2009636028"/>
+        <p14:creationId xmlns:p14="http://schemas.microsoft.com/office/powerpoint/2010/main" xmlns="" val="2009636028"/>
       </p:ext>
     </p:extLst>
   </p:cSld>
@@ -9981,7 +9981,7 @@
           <a:blip r:embed="rId2" cstate="print">
             <a:extLst>
               <a:ext uri="{28A0092B-C50C-407E-A947-70E740481C1C}">
-                <a14:useLocalDpi xmlns="" xmlns:a14="http://schemas.microsoft.com/office/drawing/2010/main" val="0"/>
+                <a14:useLocalDpi xmlns:a14="http://schemas.microsoft.com/office/drawing/2010/main" xmlns="" val="0"/>
               </a:ext>
             </a:extLst>
           </a:blip>
@@ -10178,7 +10178,7 @@
     </p:spTree>
     <p:extLst>
       <p:ext uri="{BB962C8B-B14F-4D97-AF65-F5344CB8AC3E}">
-        <p14:creationId xmlns="" xmlns:p14="http://schemas.microsoft.com/office/powerpoint/2010/main" val="1131833659"/>
+        <p14:creationId xmlns:p14="http://schemas.microsoft.com/office/powerpoint/2010/main" xmlns="" val="1131833659"/>
       </p:ext>
     </p:extLst>
   </p:cSld>
@@ -10508,7 +10508,7 @@
           <a:blip r:embed="rId2" cstate="print">
             <a:extLst>
               <a:ext uri="{28A0092B-C50C-407E-A947-70E740481C1C}">
-                <a14:useLocalDpi xmlns="" xmlns:a14="http://schemas.microsoft.com/office/drawing/2010/main" val="0"/>
+                <a14:useLocalDpi xmlns:a14="http://schemas.microsoft.com/office/drawing/2010/main" xmlns="" val="0"/>
               </a:ext>
             </a:extLst>
           </a:blip>
@@ -10529,7 +10529,7 @@
     </p:spTree>
     <p:extLst>
       <p:ext uri="{BB962C8B-B14F-4D97-AF65-F5344CB8AC3E}">
-        <p14:creationId xmlns="" xmlns:p14="http://schemas.microsoft.com/office/powerpoint/2010/main" val="1848404178"/>
+        <p14:creationId xmlns:p14="http://schemas.microsoft.com/office/powerpoint/2010/main" xmlns="" val="1848404178"/>
       </p:ext>
     </p:extLst>
   </p:cSld>
@@ -10713,7 +10713,7 @@
     </p:spTree>
     <p:extLst>
       <p:ext uri="{BB962C8B-B14F-4D97-AF65-F5344CB8AC3E}">
-        <p14:creationId xmlns="" xmlns:p14="http://schemas.microsoft.com/office/powerpoint/2010/main" val="1155854373"/>
+        <p14:creationId xmlns:p14="http://schemas.microsoft.com/office/powerpoint/2010/main" xmlns="" val="1155854373"/>
       </p:ext>
     </p:extLst>
   </p:cSld>
@@ -10886,7 +10886,7 @@
     </p:spTree>
     <p:extLst>
       <p:ext uri="{BB962C8B-B14F-4D97-AF65-F5344CB8AC3E}">
-        <p14:creationId xmlns="" xmlns:p14="http://schemas.microsoft.com/office/powerpoint/2010/main" val="1027356186"/>
+        <p14:creationId xmlns:p14="http://schemas.microsoft.com/office/powerpoint/2010/main" xmlns="" val="1027356186"/>
       </p:ext>
     </p:extLst>
   </p:cSld>
@@ -10955,7 +10955,7 @@
           <a:blip r:embed="rId2" cstate="print">
             <a:extLst>
               <a:ext uri="{28A0092B-C50C-407E-A947-70E740481C1C}">
-                <a14:useLocalDpi xmlns="" xmlns:a14="http://schemas.microsoft.com/office/drawing/2010/main" val="0"/>
+                <a14:useLocalDpi xmlns:a14="http://schemas.microsoft.com/office/drawing/2010/main" xmlns="" val="0"/>
               </a:ext>
             </a:extLst>
           </a:blip>
@@ -10985,7 +10985,7 @@
           <a:blip r:embed="rId3" cstate="print">
             <a:extLst>
               <a:ext uri="{28A0092B-C50C-407E-A947-70E740481C1C}">
-                <a14:useLocalDpi xmlns="" xmlns:a14="http://schemas.microsoft.com/office/drawing/2010/main" val="0"/>
+                <a14:useLocalDpi xmlns:a14="http://schemas.microsoft.com/office/drawing/2010/main" xmlns="" val="0"/>
               </a:ext>
             </a:extLst>
           </a:blip>
@@ -11009,7 +11009,7 @@
     </p:spTree>
     <p:extLst>
       <p:ext uri="{BB962C8B-B14F-4D97-AF65-F5344CB8AC3E}">
-        <p14:creationId xmlns="" xmlns:p14="http://schemas.microsoft.com/office/powerpoint/2010/main" val="2369171751"/>
+        <p14:creationId xmlns:p14="http://schemas.microsoft.com/office/powerpoint/2010/main" xmlns="" val="2369171751"/>
       </p:ext>
     </p:extLst>
   </p:cSld>
@@ -11165,7 +11165,7 @@
         </p:nvSpPr>
         <p:spPr>
           <a:xfrm>
-            <a:off x="1905000" y="5791200"/>
+            <a:off x="1752600" y="5791200"/>
             <a:ext cx="914400" cy="914400"/>
           </a:xfrm>
           <a:prstGeom prst="corner">
@@ -11310,7 +11310,7 @@
           <a:blip r:embed="rId2" cstate="print">
             <a:extLst>
               <a:ext uri="{28A0092B-C50C-407E-A947-70E740481C1C}">
-                <a14:useLocalDpi xmlns="" xmlns:a14="http://schemas.microsoft.com/office/drawing/2010/main" val="0"/>
+                <a14:useLocalDpi xmlns:a14="http://schemas.microsoft.com/office/drawing/2010/main" xmlns="" val="0"/>
               </a:ext>
             </a:extLst>
           </a:blip>
@@ -11340,7 +11340,7 @@
           <a:blip r:embed="rId3" cstate="print">
             <a:extLst>
               <a:ext uri="{28A0092B-C50C-407E-A947-70E740481C1C}">
-                <a14:useLocalDpi xmlns="" xmlns:a14="http://schemas.microsoft.com/office/drawing/2010/main" val="0"/>
+                <a14:useLocalDpi xmlns:a14="http://schemas.microsoft.com/office/drawing/2010/main" xmlns="" val="0"/>
               </a:ext>
             </a:extLst>
           </a:blip>
@@ -11370,7 +11370,7 @@
           <a:blip r:embed="rId4" cstate="print">
             <a:extLst>
               <a:ext uri="{28A0092B-C50C-407E-A947-70E740481C1C}">
-                <a14:useLocalDpi xmlns="" xmlns:a14="http://schemas.microsoft.com/office/drawing/2010/main" val="0"/>
+                <a14:useLocalDpi xmlns:a14="http://schemas.microsoft.com/office/drawing/2010/main" xmlns="" val="0"/>
               </a:ext>
             </a:extLst>
           </a:blip>
@@ -11486,7 +11486,7 @@
     </p:spTree>
     <p:extLst>
       <p:ext uri="{BB962C8B-B14F-4D97-AF65-F5344CB8AC3E}">
-        <p14:creationId xmlns="" xmlns:p14="http://schemas.microsoft.com/office/powerpoint/2010/main" val="3216378839"/>
+        <p14:creationId xmlns:p14="http://schemas.microsoft.com/office/powerpoint/2010/main" xmlns="" val="3216378839"/>
       </p:ext>
     </p:extLst>
   </p:cSld>
@@ -11564,7 +11564,7 @@
           <a:blip r:embed="rId2" cstate="print">
             <a:extLst>
               <a:ext uri="{28A0092B-C50C-407E-A947-70E740481C1C}">
-                <a14:useLocalDpi xmlns="" xmlns:a14="http://schemas.microsoft.com/office/drawing/2010/main" val="0"/>
+                <a14:useLocalDpi xmlns:a14="http://schemas.microsoft.com/office/drawing/2010/main" xmlns="" val="0"/>
               </a:ext>
             </a:extLst>
           </a:blip>
@@ -11673,7 +11673,7 @@
     </p:spTree>
     <p:extLst>
       <p:ext uri="{BB962C8B-B14F-4D97-AF65-F5344CB8AC3E}">
-        <p14:creationId xmlns="" xmlns:p14="http://schemas.microsoft.com/office/powerpoint/2010/main" val="2527117896"/>
+        <p14:creationId xmlns:p14="http://schemas.microsoft.com/office/powerpoint/2010/main" xmlns="" val="2527117896"/>
       </p:ext>
     </p:extLst>
   </p:cSld>
@@ -12387,7 +12387,7 @@
     </p:spTree>
     <p:extLst>
       <p:ext uri="{BB962C8B-B14F-4D97-AF65-F5344CB8AC3E}">
-        <p14:creationId xmlns="" xmlns:p14="http://schemas.microsoft.com/office/powerpoint/2010/main" val="1994743043"/>
+        <p14:creationId xmlns:p14="http://schemas.microsoft.com/office/powerpoint/2010/main" xmlns="" val="1994743043"/>
       </p:ext>
     </p:extLst>
   </p:cSld>
@@ -12573,7 +12573,7 @@
     </p:spTree>
     <p:extLst>
       <p:ext uri="{BB962C8B-B14F-4D97-AF65-F5344CB8AC3E}">
-        <p14:creationId xmlns="" xmlns:p14="http://schemas.microsoft.com/office/powerpoint/2010/main" val="3098398089"/>
+        <p14:creationId xmlns:p14="http://schemas.microsoft.com/office/powerpoint/2010/main" xmlns="" val="3098398089"/>
       </p:ext>
     </p:extLst>
   </p:cSld>
@@ -12853,7 +12853,7 @@
     </p:spTree>
     <p:extLst>
       <p:ext uri="{BB962C8B-B14F-4D97-AF65-F5344CB8AC3E}">
-        <p14:creationId xmlns="" xmlns:p14="http://schemas.microsoft.com/office/powerpoint/2010/main" val="3449390454"/>
+        <p14:creationId xmlns:p14="http://schemas.microsoft.com/office/powerpoint/2010/main" xmlns="" val="3449390454"/>
       </p:ext>
     </p:extLst>
   </p:cSld>
@@ -13543,7 +13543,7 @@
     </p:spTree>
     <p:extLst>
       <p:ext uri="{BB962C8B-B14F-4D97-AF65-F5344CB8AC3E}">
-        <p14:creationId xmlns="" xmlns:p14="http://schemas.microsoft.com/office/powerpoint/2010/main" val="4006469721"/>
+        <p14:creationId xmlns:p14="http://schemas.microsoft.com/office/powerpoint/2010/main" xmlns="" val="4006469721"/>
       </p:ext>
     </p:extLst>
   </p:cSld>
@@ -13851,7 +13851,7 @@
     </p:spTree>
     <p:extLst>
       <p:ext uri="{BB962C8B-B14F-4D97-AF65-F5344CB8AC3E}">
-        <p14:creationId xmlns="" xmlns:p14="http://schemas.microsoft.com/office/powerpoint/2010/main" val="1678422724"/>
+        <p14:creationId xmlns:p14="http://schemas.microsoft.com/office/powerpoint/2010/main" xmlns="" val="1678422724"/>
       </p:ext>
     </p:extLst>
   </p:cSld>
@@ -14464,7 +14464,7 @@
     </p:spTree>
     <p:extLst>
       <p:ext uri="{BB962C8B-B14F-4D97-AF65-F5344CB8AC3E}">
-        <p14:creationId xmlns="" xmlns:p14="http://schemas.microsoft.com/office/powerpoint/2010/main" val="2792941284"/>
+        <p14:creationId xmlns:p14="http://schemas.microsoft.com/office/powerpoint/2010/main" xmlns="" val="2792941284"/>
       </p:ext>
     </p:extLst>
   </p:cSld>
@@ -14905,7 +14905,7 @@
     </p:spTree>
     <p:extLst>
       <p:ext uri="{BB962C8B-B14F-4D97-AF65-F5344CB8AC3E}">
-        <p14:creationId xmlns="" xmlns:p14="http://schemas.microsoft.com/office/powerpoint/2010/main" val="3220083538"/>
+        <p14:creationId xmlns:p14="http://schemas.microsoft.com/office/powerpoint/2010/main" xmlns="" val="3220083538"/>
       </p:ext>
     </p:extLst>
   </p:cSld>
@@ -15066,7 +15066,7 @@
     </p:spTree>
     <p:extLst>
       <p:ext uri="{BB962C8B-B14F-4D97-AF65-F5344CB8AC3E}">
-        <p14:creationId xmlns="" xmlns:p14="http://schemas.microsoft.com/office/powerpoint/2010/main" val="3312784383"/>
+        <p14:creationId xmlns:p14="http://schemas.microsoft.com/office/powerpoint/2010/main" xmlns="" val="3312784383"/>
       </p:ext>
     </p:extLst>
   </p:cSld>
@@ -15289,7 +15289,7 @@
     </p:spTree>
     <p:extLst>
       <p:ext uri="{BB962C8B-B14F-4D97-AF65-F5344CB8AC3E}">
-        <p14:creationId xmlns="" xmlns:p14="http://schemas.microsoft.com/office/powerpoint/2010/main" val="856396653"/>
+        <p14:creationId xmlns:p14="http://schemas.microsoft.com/office/powerpoint/2010/main" xmlns="" val="856396653"/>
       </p:ext>
     </p:extLst>
   </p:cSld>
@@ -15560,7 +15560,7 @@
     </p:spTree>
     <p:extLst>
       <p:ext uri="{BB962C8B-B14F-4D97-AF65-F5344CB8AC3E}">
-        <p14:creationId xmlns="" xmlns:p14="http://schemas.microsoft.com/office/powerpoint/2010/main" val="3443329555"/>
+        <p14:creationId xmlns:p14="http://schemas.microsoft.com/office/powerpoint/2010/main" xmlns="" val="3443329555"/>
       </p:ext>
     </p:extLst>
   </p:cSld>
@@ -16072,7 +16072,7 @@
     </p:spTree>
     <p:extLst>
       <p:ext uri="{BB962C8B-B14F-4D97-AF65-F5344CB8AC3E}">
-        <p14:creationId xmlns="" xmlns:p14="http://schemas.microsoft.com/office/powerpoint/2010/main" val="1556099287"/>
+        <p14:creationId xmlns:p14="http://schemas.microsoft.com/office/powerpoint/2010/main" xmlns="" val="1556099287"/>
       </p:ext>
     </p:extLst>
   </p:cSld>
@@ -16425,7 +16425,7 @@
     </p:spTree>
     <p:extLst>
       <p:ext uri="{BB962C8B-B14F-4D97-AF65-F5344CB8AC3E}">
-        <p14:creationId xmlns="" xmlns:p14="http://schemas.microsoft.com/office/powerpoint/2010/main" val="2948210574"/>
+        <p14:creationId xmlns:p14="http://schemas.microsoft.com/office/powerpoint/2010/main" xmlns="" val="2948210574"/>
       </p:ext>
     </p:extLst>
   </p:cSld>
@@ -16493,7 +16493,7 @@
           <p:nvPr>
             <p:extLst>
               <p:ext uri="{D42A27DB-BD31-4B8C-83A1-F6EECF244321}">
-                <p14:modId xmlns="" xmlns:p14="http://schemas.microsoft.com/office/powerpoint/2010/main" val="2181104498"/>
+                <p14:modId xmlns:p14="http://schemas.microsoft.com/office/powerpoint/2010/main" xmlns="" val="2181104498"/>
               </p:ext>
             </p:extLst>
           </p:nvPr>
@@ -17477,7 +17477,7 @@
     </p:spTree>
     <p:extLst>
       <p:ext uri="{BB962C8B-B14F-4D97-AF65-F5344CB8AC3E}">
-        <p14:creationId xmlns="" xmlns:p14="http://schemas.microsoft.com/office/powerpoint/2010/main" val="2197364214"/>
+        <p14:creationId xmlns:p14="http://schemas.microsoft.com/office/powerpoint/2010/main" xmlns="" val="2197364214"/>
       </p:ext>
     </p:extLst>
   </p:cSld>
@@ -17940,7 +17940,7 @@
     </p:spTree>
     <p:extLst>
       <p:ext uri="{BB962C8B-B14F-4D97-AF65-F5344CB8AC3E}">
-        <p14:creationId xmlns="" xmlns:p14="http://schemas.microsoft.com/office/powerpoint/2010/main" val="977874982"/>
+        <p14:creationId xmlns:p14="http://schemas.microsoft.com/office/powerpoint/2010/main" xmlns="" val="977874982"/>
       </p:ext>
     </p:extLst>
   </p:cSld>
@@ -18116,7 +18116,7 @@
     </p:spTree>
     <p:extLst>
       <p:ext uri="{BB962C8B-B14F-4D97-AF65-F5344CB8AC3E}">
-        <p14:creationId xmlns="" xmlns:p14="http://schemas.microsoft.com/office/powerpoint/2010/main" val="2092776985"/>
+        <p14:creationId xmlns:p14="http://schemas.microsoft.com/office/powerpoint/2010/main" xmlns="" val="2092776985"/>
       </p:ext>
     </p:extLst>
   </p:cSld>
@@ -18187,7 +18187,7 @@
           <a:blip r:embed="rId2" cstate="print">
             <a:extLst>
               <a:ext uri="{28A0092B-C50C-407E-A947-70E740481C1C}">
-                <a14:useLocalDpi xmlns="" xmlns:a14="http://schemas.microsoft.com/office/drawing/2010/main" val="0"/>
+                <a14:useLocalDpi xmlns:a14="http://schemas.microsoft.com/office/drawing/2010/main" xmlns="" val="0"/>
               </a:ext>
             </a:extLst>
           </a:blip>
@@ -18323,7 +18323,7 @@
     </p:spTree>
     <p:extLst>
       <p:ext uri="{BB962C8B-B14F-4D97-AF65-F5344CB8AC3E}">
-        <p14:creationId xmlns="" xmlns:p14="http://schemas.microsoft.com/office/powerpoint/2010/main" val="318706902"/>
+        <p14:creationId xmlns:p14="http://schemas.microsoft.com/office/powerpoint/2010/main" xmlns="" val="318706902"/>
       </p:ext>
     </p:extLst>
   </p:cSld>
@@ -18406,7 +18406,7 @@
           <p:nvPr>
             <p:extLst>
               <p:ext uri="{D42A27DB-BD31-4B8C-83A1-F6EECF244321}">
-                <p14:modId xmlns="" xmlns:p14="http://schemas.microsoft.com/office/powerpoint/2010/main" val="3075550189"/>
+                <p14:modId xmlns:p14="http://schemas.microsoft.com/office/powerpoint/2010/main" xmlns="" val="3075550189"/>
               </p:ext>
             </p:extLst>
           </p:nvPr>
@@ -18777,7 +18777,7 @@
           <a:blip r:embed="rId3" cstate="print">
             <a:extLst>
               <a:ext uri="{28A0092B-C50C-407E-A947-70E740481C1C}">
-                <a14:useLocalDpi xmlns="" xmlns:a14="http://schemas.microsoft.com/office/drawing/2010/main" val="0"/>
+                <a14:useLocalDpi xmlns:a14="http://schemas.microsoft.com/office/drawing/2010/main" xmlns="" val="0"/>
               </a:ext>
             </a:extLst>
           </a:blip>
@@ -18807,7 +18807,7 @@
           <a:blip r:embed="rId4" cstate="print">
             <a:extLst>
               <a:ext uri="{28A0092B-C50C-407E-A947-70E740481C1C}">
-                <a14:useLocalDpi xmlns="" xmlns:a14="http://schemas.microsoft.com/office/drawing/2010/main" val="0"/>
+                <a14:useLocalDpi xmlns:a14="http://schemas.microsoft.com/office/drawing/2010/main" xmlns="" val="0"/>
               </a:ext>
             </a:extLst>
           </a:blip>
@@ -18837,7 +18837,7 @@
           <a:blip r:embed="rId5" cstate="print">
             <a:extLst>
               <a:ext uri="{28A0092B-C50C-407E-A947-70E740481C1C}">
-                <a14:useLocalDpi xmlns="" xmlns:a14="http://schemas.microsoft.com/office/drawing/2010/main" val="0"/>
+                <a14:useLocalDpi xmlns:a14="http://schemas.microsoft.com/office/drawing/2010/main" xmlns="" val="0"/>
               </a:ext>
             </a:extLst>
           </a:blip>
@@ -18867,7 +18867,7 @@
           <a:blip r:embed="rId6" cstate="print">
             <a:extLst>
               <a:ext uri="{28A0092B-C50C-407E-A947-70E740481C1C}">
-                <a14:useLocalDpi xmlns="" xmlns:a14="http://schemas.microsoft.com/office/drawing/2010/main" val="0"/>
+                <a14:useLocalDpi xmlns:a14="http://schemas.microsoft.com/office/drawing/2010/main" xmlns="" val="0"/>
               </a:ext>
             </a:extLst>
           </a:blip>
@@ -18897,7 +18897,7 @@
           <a:blip r:embed="rId7" cstate="print">
             <a:extLst>
               <a:ext uri="{28A0092B-C50C-407E-A947-70E740481C1C}">
-                <a14:useLocalDpi xmlns="" xmlns:a14="http://schemas.microsoft.com/office/drawing/2010/main" val="0"/>
+                <a14:useLocalDpi xmlns:a14="http://schemas.microsoft.com/office/drawing/2010/main" xmlns="" val="0"/>
               </a:ext>
             </a:extLst>
           </a:blip>
@@ -18927,7 +18927,7 @@
           <a:blip r:embed="rId8" cstate="print">
             <a:extLst>
               <a:ext uri="{28A0092B-C50C-407E-A947-70E740481C1C}">
-                <a14:useLocalDpi xmlns="" xmlns:a14="http://schemas.microsoft.com/office/drawing/2010/main" val="0"/>
+                <a14:useLocalDpi xmlns:a14="http://schemas.microsoft.com/office/drawing/2010/main" xmlns="" val="0"/>
               </a:ext>
             </a:extLst>
           </a:blip>
@@ -18948,7 +18948,7 @@
     </p:spTree>
     <p:extLst>
       <p:ext uri="{BB962C8B-B14F-4D97-AF65-F5344CB8AC3E}">
-        <p14:creationId xmlns="" xmlns:p14="http://schemas.microsoft.com/office/powerpoint/2010/main" val="949325302"/>
+        <p14:creationId xmlns:p14="http://schemas.microsoft.com/office/powerpoint/2010/main" xmlns="" val="949325302"/>
       </p:ext>
     </p:extLst>
   </p:cSld>
@@ -19454,7 +19454,7 @@
     </p:spTree>
     <p:extLst>
       <p:ext uri="{BB962C8B-B14F-4D97-AF65-F5344CB8AC3E}">
-        <p14:creationId xmlns="" xmlns:p14="http://schemas.microsoft.com/office/powerpoint/2010/main" val="2834344091"/>
+        <p14:creationId xmlns:p14="http://schemas.microsoft.com/office/powerpoint/2010/main" xmlns="" val="2834344091"/>
       </p:ext>
     </p:extLst>
   </p:cSld>
@@ -19793,7 +19793,7 @@
           <a:blip r:embed="rId2" cstate="print">
             <a:extLst>
               <a:ext uri="{28A0092B-C50C-407E-A947-70E740481C1C}">
-                <a14:useLocalDpi xmlns="" xmlns:a14="http://schemas.microsoft.com/office/drawing/2010/main" val="0"/>
+                <a14:useLocalDpi xmlns:a14="http://schemas.microsoft.com/office/drawing/2010/main" xmlns="" val="0"/>
               </a:ext>
             </a:extLst>
           </a:blip>
@@ -19850,7 +19850,7 @@
           <p:nvPr>
             <p:extLst>
               <p:ext uri="{D42A27DB-BD31-4B8C-83A1-F6EECF244321}">
-                <p14:modId xmlns="" xmlns:p14="http://schemas.microsoft.com/office/powerpoint/2010/main" val="3204736979"/>
+                <p14:modId xmlns:p14="http://schemas.microsoft.com/office/powerpoint/2010/main" xmlns="" val="3204736979"/>
               </p:ext>
             </p:extLst>
           </p:nvPr>
@@ -20182,7 +20182,7 @@
     </p:spTree>
     <p:extLst>
       <p:ext uri="{BB962C8B-B14F-4D97-AF65-F5344CB8AC3E}">
-        <p14:creationId xmlns="" xmlns:p14="http://schemas.microsoft.com/office/powerpoint/2010/main" val="3195513628"/>
+        <p14:creationId xmlns:p14="http://schemas.microsoft.com/office/powerpoint/2010/main" xmlns="" val="3195513628"/>
       </p:ext>
     </p:extLst>
   </p:cSld>
@@ -20320,7 +20320,7 @@
     </p:spTree>
     <p:extLst>
       <p:ext uri="{BB962C8B-B14F-4D97-AF65-F5344CB8AC3E}">
-        <p14:creationId xmlns="" xmlns:p14="http://schemas.microsoft.com/office/powerpoint/2010/main" val="2674396190"/>
+        <p14:creationId xmlns:p14="http://schemas.microsoft.com/office/powerpoint/2010/main" xmlns="" val="2674396190"/>
       </p:ext>
     </p:extLst>
   </p:cSld>
@@ -20462,7 +20462,7 @@
     </p:spTree>
     <p:extLst>
       <p:ext uri="{BB962C8B-B14F-4D97-AF65-F5344CB8AC3E}">
-        <p14:creationId xmlns="" xmlns:p14="http://schemas.microsoft.com/office/powerpoint/2010/main" val="2713826086"/>
+        <p14:creationId xmlns:p14="http://schemas.microsoft.com/office/powerpoint/2010/main" xmlns="" val="2713826086"/>
       </p:ext>
     </p:extLst>
   </p:cSld>
@@ -20654,7 +20654,7 @@
     </p:spTree>
     <p:extLst>
       <p:ext uri="{BB962C8B-B14F-4D97-AF65-F5344CB8AC3E}">
-        <p14:creationId xmlns="" xmlns:p14="http://schemas.microsoft.com/office/powerpoint/2010/main" val="714747940"/>
+        <p14:creationId xmlns:p14="http://schemas.microsoft.com/office/powerpoint/2010/main" xmlns="" val="714747940"/>
       </p:ext>
     </p:extLst>
   </p:cSld>
@@ -21193,7 +21193,7 @@
     </p:spTree>
     <p:extLst>
       <p:ext uri="{BB962C8B-B14F-4D97-AF65-F5344CB8AC3E}">
-        <p14:creationId xmlns="" xmlns:p14="http://schemas.microsoft.com/office/powerpoint/2010/main" val="3760395846"/>
+        <p14:creationId xmlns:p14="http://schemas.microsoft.com/office/powerpoint/2010/main" xmlns="" val="3760395846"/>
       </p:ext>
     </p:extLst>
   </p:cSld>
@@ -22026,7 +22026,7 @@
     </p:spTree>
     <p:extLst>
       <p:ext uri="{BB962C8B-B14F-4D97-AF65-F5344CB8AC3E}">
-        <p14:creationId xmlns="" xmlns:p14="http://schemas.microsoft.com/office/powerpoint/2010/main" val="1422967000"/>
+        <p14:creationId xmlns:p14="http://schemas.microsoft.com/office/powerpoint/2010/main" xmlns="" val="1422967000"/>
       </p:ext>
     </p:extLst>
   </p:cSld>
@@ -22177,7 +22177,7 @@
     </p:spTree>
     <p:extLst>
       <p:ext uri="{BB962C8B-B14F-4D97-AF65-F5344CB8AC3E}">
-        <p14:creationId xmlns="" xmlns:p14="http://schemas.microsoft.com/office/powerpoint/2010/main" val="2654585083"/>
+        <p14:creationId xmlns:p14="http://schemas.microsoft.com/office/powerpoint/2010/main" xmlns="" val="2654585083"/>
       </p:ext>
     </p:extLst>
   </p:cSld>
@@ -22337,7 +22337,7 @@
     </p:spTree>
     <p:extLst>
       <p:ext uri="{BB962C8B-B14F-4D97-AF65-F5344CB8AC3E}">
-        <p14:creationId xmlns="" xmlns:p14="http://schemas.microsoft.com/office/powerpoint/2010/main" val="1683021932"/>
+        <p14:creationId xmlns:p14="http://schemas.microsoft.com/office/powerpoint/2010/main" xmlns="" val="1683021932"/>
       </p:ext>
     </p:extLst>
   </p:cSld>
@@ -22411,7 +22411,7 @@
           <a:blip r:embed="rId2" cstate="print">
             <a:extLst>
               <a:ext uri="{28A0092B-C50C-407E-A947-70E740481C1C}">
-                <a14:useLocalDpi xmlns="" xmlns:a14="http://schemas.microsoft.com/office/drawing/2010/main" val="0"/>
+                <a14:useLocalDpi xmlns:a14="http://schemas.microsoft.com/office/drawing/2010/main" xmlns="" val="0"/>
               </a:ext>
             </a:extLst>
           </a:blip>
@@ -23047,7 +23047,7 @@
     </p:spTree>
     <p:extLst>
       <p:ext uri="{BB962C8B-B14F-4D97-AF65-F5344CB8AC3E}">
-        <p14:creationId xmlns="" xmlns:p14="http://schemas.microsoft.com/office/powerpoint/2010/main" val="3007787296"/>
+        <p14:creationId xmlns:p14="http://schemas.microsoft.com/office/powerpoint/2010/main" xmlns="" val="3007787296"/>
       </p:ext>
     </p:extLst>
   </p:cSld>
@@ -23447,7 +23447,7 @@
     </p:spTree>
     <p:extLst>
       <p:ext uri="{BB962C8B-B14F-4D97-AF65-F5344CB8AC3E}">
-        <p14:creationId xmlns="" xmlns:p14="http://schemas.microsoft.com/office/powerpoint/2010/main" val="13878138"/>
+        <p14:creationId xmlns:p14="http://schemas.microsoft.com/office/powerpoint/2010/main" xmlns="" val="13878138"/>
       </p:ext>
     </p:extLst>
   </p:cSld>
@@ -23817,7 +23817,7 @@
     </p:spTree>
     <p:extLst>
       <p:ext uri="{BB962C8B-B14F-4D97-AF65-F5344CB8AC3E}">
-        <p14:creationId xmlns="" xmlns:p14="http://schemas.microsoft.com/office/powerpoint/2010/main" val="40929930"/>
+        <p14:creationId xmlns:p14="http://schemas.microsoft.com/office/powerpoint/2010/main" xmlns="" val="40929930"/>
       </p:ext>
     </p:extLst>
   </p:cSld>
@@ -23896,7 +23896,7 @@
     </p:spTree>
     <p:extLst>
       <p:ext uri="{BB962C8B-B14F-4D97-AF65-F5344CB8AC3E}">
-        <p14:creationId xmlns="" xmlns:p14="http://schemas.microsoft.com/office/powerpoint/2010/main" val="1336479164"/>
+        <p14:creationId xmlns:p14="http://schemas.microsoft.com/office/powerpoint/2010/main" xmlns="" val="1336479164"/>
       </p:ext>
     </p:extLst>
   </p:cSld>
@@ -23995,7 +23995,7 @@
     </p:spTree>
     <p:extLst>
       <p:ext uri="{BB962C8B-B14F-4D97-AF65-F5344CB8AC3E}">
-        <p14:creationId xmlns="" xmlns:p14="http://schemas.microsoft.com/office/powerpoint/2010/main" val="4014343169"/>
+        <p14:creationId xmlns:p14="http://schemas.microsoft.com/office/powerpoint/2010/main" xmlns="" val="4014343169"/>
       </p:ext>
     </p:extLst>
   </p:cSld>
@@ -24146,7 +24146,7 @@
     </p:spTree>
     <p:extLst>
       <p:ext uri="{BB962C8B-B14F-4D97-AF65-F5344CB8AC3E}">
-        <p14:creationId xmlns="" xmlns:p14="http://schemas.microsoft.com/office/powerpoint/2010/main" val="2781303602"/>
+        <p14:creationId xmlns:p14="http://schemas.microsoft.com/office/powerpoint/2010/main" xmlns="" val="2781303602"/>
       </p:ext>
     </p:extLst>
   </p:cSld>
@@ -24333,7 +24333,7 @@
     </p:spTree>
     <p:extLst>
       <p:ext uri="{BB962C8B-B14F-4D97-AF65-F5344CB8AC3E}">
-        <p14:creationId xmlns="" xmlns:p14="http://schemas.microsoft.com/office/powerpoint/2010/main" val="4255503392"/>
+        <p14:creationId xmlns:p14="http://schemas.microsoft.com/office/powerpoint/2010/main" xmlns="" val="4255503392"/>
       </p:ext>
     </p:extLst>
   </p:cSld>
@@ -24493,7 +24493,7 @@
     </p:spTree>
     <p:extLst>
       <p:ext uri="{BB962C8B-B14F-4D97-AF65-F5344CB8AC3E}">
-        <p14:creationId xmlns="" xmlns:p14="http://schemas.microsoft.com/office/powerpoint/2010/main" val="2375505937"/>
+        <p14:creationId xmlns:p14="http://schemas.microsoft.com/office/powerpoint/2010/main" xmlns="" val="2375505937"/>
       </p:ext>
     </p:extLst>
   </p:cSld>
@@ -24624,7 +24624,7 @@
     </p:spTree>
     <p:extLst>
       <p:ext uri="{BB962C8B-B14F-4D97-AF65-F5344CB8AC3E}">
-        <p14:creationId xmlns="" xmlns:p14="http://schemas.microsoft.com/office/powerpoint/2010/main" val="1618189430"/>
+        <p14:creationId xmlns:p14="http://schemas.microsoft.com/office/powerpoint/2010/main" xmlns="" val="1618189430"/>
       </p:ext>
     </p:extLst>
   </p:cSld>
@@ -24632,7 +24632,7 @@
     <a:masterClrMapping/>
   </p:clrMapOvr>
   <mc:AlternateContent xmlns:mc="http://schemas.openxmlformats.org/markup-compatibility/2006">
-    <mc:Choice xmlns="" xmlns:p14="http://schemas.microsoft.com/office/powerpoint/2010/main" Requires="p14">
+    <mc:Choice xmlns:p14="http://schemas.microsoft.com/office/powerpoint/2010/main" xmlns="" Requires="p14">
       <p:transition spd="slow" p14:dur="2000"/>
     </mc:Choice>
     <mc:Fallback>

</xml_diff>

<commit_message>
include timeline and head logo
</commit_message>
<xml_diff>
--- a/mdl4ui-docs/mdl4ui_cg2013.pptx
+++ b/mdl4ui-docs/mdl4ui_cg2013.pptx
@@ -335,7 +335,7 @@
     </p:spTree>
     <p:extLst>
       <p:ext uri="{BB962C8B-B14F-4D97-AF65-F5344CB8AC3E}">
-        <p14:creationId xmlns="" xmlns:p14="http://schemas.microsoft.com/office/powerpoint/2010/main" val="70803672"/>
+        <p14:creationId xmlns:p14="http://schemas.microsoft.com/office/powerpoint/2010/main" val="70803672"/>
       </p:ext>
     </p:extLst>
   </p:cSld>
@@ -595,7 +595,7 @@
     </p:spTree>
     <p:extLst>
       <p:ext uri="{BB962C8B-B14F-4D97-AF65-F5344CB8AC3E}">
-        <p14:creationId xmlns="" xmlns:p14="http://schemas.microsoft.com/office/powerpoint/2010/main" val="1701488114"/>
+        <p14:creationId xmlns:p14="http://schemas.microsoft.com/office/powerpoint/2010/main" val="1701488114"/>
       </p:ext>
     </p:extLst>
   </p:cSld>
@@ -761,7 +761,7 @@
             <a:fld id="{1C995A55-B5EF-47FB-BCEC-1018828F2E10}" type="slidenum">
               <a:rPr lang="en-US" smtClean="0"/>
               <a:pPr/>
-              <a:t>42</a:t>
+              <a:t>20</a:t>
             </a:fld>
             <a:endParaRPr lang="en-US"/>
           </a:p>
@@ -770,7 +770,7 @@
     </p:spTree>
     <p:extLst>
       <p:ext uri="{BB962C8B-B14F-4D97-AF65-F5344CB8AC3E}">
-        <p14:creationId xmlns="" xmlns:p14="http://schemas.microsoft.com/office/powerpoint/2010/main" val="3047004223"/>
+        <p14:creationId xmlns:p14="http://schemas.microsoft.com/office/powerpoint/2010/main" val="2091590988"/>
       </p:ext>
     </p:extLst>
   </p:cSld>
@@ -846,7 +846,7 @@
             <a:fld id="{1C995A55-B5EF-47FB-BCEC-1018828F2E10}" type="slidenum">
               <a:rPr lang="en-US" smtClean="0"/>
               <a:pPr/>
-              <a:t>45</a:t>
+              <a:t>42</a:t>
             </a:fld>
             <a:endParaRPr lang="en-US"/>
           </a:p>
@@ -855,7 +855,7 @@
     </p:spTree>
     <p:extLst>
       <p:ext uri="{BB962C8B-B14F-4D97-AF65-F5344CB8AC3E}">
-        <p14:creationId xmlns="" xmlns:p14="http://schemas.microsoft.com/office/powerpoint/2010/main" val="3280979232"/>
+        <p14:creationId xmlns:p14="http://schemas.microsoft.com/office/powerpoint/2010/main" val="3047004223"/>
       </p:ext>
     </p:extLst>
   </p:cSld>
@@ -931,7 +931,7 @@
             <a:fld id="{1C995A55-B5EF-47FB-BCEC-1018828F2E10}" type="slidenum">
               <a:rPr lang="en-US" smtClean="0"/>
               <a:pPr/>
-              <a:t>48</a:t>
+              <a:t>45</a:t>
             </a:fld>
             <a:endParaRPr lang="en-US"/>
           </a:p>
@@ -940,7 +940,7 @@
     </p:spTree>
     <p:extLst>
       <p:ext uri="{BB962C8B-B14F-4D97-AF65-F5344CB8AC3E}">
-        <p14:creationId xmlns="" xmlns:p14="http://schemas.microsoft.com/office/powerpoint/2010/main" val="1987381696"/>
+        <p14:creationId xmlns:p14="http://schemas.microsoft.com/office/powerpoint/2010/main" val="3280979232"/>
       </p:ext>
     </p:extLst>
   </p:cSld>
@@ -951,6 +951,91 @@
 </file>
 
 <file path=ppt/notesSlides/notesSlide4.xml><?xml version="1.0" encoding="utf-8"?>
+<p:notes xmlns:a="http://schemas.openxmlformats.org/drawingml/2006/main" xmlns:r="http://schemas.openxmlformats.org/officeDocument/2006/relationships" xmlns:p="http://schemas.openxmlformats.org/presentationml/2006/main">
+  <p:cSld>
+    <p:spTree>
+      <p:nvGrpSpPr>
+        <p:cNvPr id="1" name=""/>
+        <p:cNvGrpSpPr/>
+        <p:nvPr/>
+      </p:nvGrpSpPr>
+      <p:grpSpPr>
+        <a:xfrm>
+          <a:off x="0" y="0"/>
+          <a:ext cx="0" cy="0"/>
+          <a:chOff x="0" y="0"/>
+          <a:chExt cx="0" cy="0"/>
+        </a:xfrm>
+      </p:grpSpPr>
+      <p:sp>
+        <p:nvSpPr>
+          <p:cNvPr id="2" name="Espace réservé de l'image des diapositives 1"/>
+          <p:cNvSpPr>
+            <a:spLocks noGrp="1" noRot="1" noChangeAspect="1"/>
+          </p:cNvSpPr>
+          <p:nvPr>
+            <p:ph type="sldImg"/>
+          </p:nvPr>
+        </p:nvSpPr>
+        <p:spPr/>
+      </p:sp>
+      <p:sp>
+        <p:nvSpPr>
+          <p:cNvPr id="3" name="Espace réservé des commentaires 2"/>
+          <p:cNvSpPr>
+            <a:spLocks noGrp="1"/>
+          </p:cNvSpPr>
+          <p:nvPr>
+            <p:ph type="body" idx="1"/>
+          </p:nvPr>
+        </p:nvSpPr>
+        <p:spPr/>
+        <p:txBody>
+          <a:bodyPr/>
+          <a:lstStyle/>
+          <a:p>
+            <a:endParaRPr lang="en-US" dirty="0"/>
+          </a:p>
+        </p:txBody>
+      </p:sp>
+      <p:sp>
+        <p:nvSpPr>
+          <p:cNvPr id="4" name="Espace réservé du numéro de diapositive 3"/>
+          <p:cNvSpPr>
+            <a:spLocks noGrp="1"/>
+          </p:cNvSpPr>
+          <p:nvPr>
+            <p:ph type="sldNum" sz="quarter" idx="10"/>
+          </p:nvPr>
+        </p:nvSpPr>
+        <p:spPr/>
+        <p:txBody>
+          <a:bodyPr/>
+          <a:lstStyle/>
+          <a:p>
+            <a:fld id="{1C995A55-B5EF-47FB-BCEC-1018828F2E10}" type="slidenum">
+              <a:rPr lang="en-US" smtClean="0"/>
+              <a:pPr/>
+              <a:t>48</a:t>
+            </a:fld>
+            <a:endParaRPr lang="en-US"/>
+          </a:p>
+        </p:txBody>
+      </p:sp>
+    </p:spTree>
+    <p:extLst>
+      <p:ext uri="{BB962C8B-B14F-4D97-AF65-F5344CB8AC3E}">
+        <p14:creationId xmlns:p14="http://schemas.microsoft.com/office/powerpoint/2010/main" val="1987381696"/>
+      </p:ext>
+    </p:extLst>
+  </p:cSld>
+  <p:clrMapOvr>
+    <a:masterClrMapping/>
+  </p:clrMapOvr>
+</p:notes>
+</file>
+
+<file path=ppt/notesSlides/notesSlide5.xml><?xml version="1.0" encoding="utf-8"?>
 <p:notes xmlns:a="http://schemas.openxmlformats.org/drawingml/2006/main" xmlns:r="http://schemas.openxmlformats.org/officeDocument/2006/relationships" xmlns:p="http://schemas.openxmlformats.org/presentationml/2006/main">
   <p:cSld>
     <p:spTree>
@@ -1266,7 +1351,7 @@
     </p:spTree>
     <p:extLst>
       <p:ext uri="{BB962C8B-B14F-4D97-AF65-F5344CB8AC3E}">
-        <p14:creationId xmlns="" xmlns:p14="http://schemas.microsoft.com/office/powerpoint/2010/main" val="322609761"/>
+        <p14:creationId xmlns:p14="http://schemas.microsoft.com/office/powerpoint/2010/main" val="322609761"/>
       </p:ext>
     </p:extLst>
   </p:cSld>
@@ -1438,7 +1523,7 @@
     </p:spTree>
     <p:extLst>
       <p:ext uri="{BB962C8B-B14F-4D97-AF65-F5344CB8AC3E}">
-        <p14:creationId xmlns="" xmlns:p14="http://schemas.microsoft.com/office/powerpoint/2010/main" val="1248456722"/>
+        <p14:creationId xmlns:p14="http://schemas.microsoft.com/office/powerpoint/2010/main" val="1248456722"/>
       </p:ext>
     </p:extLst>
   </p:cSld>
@@ -1620,7 +1705,7 @@
     </p:spTree>
     <p:extLst>
       <p:ext uri="{BB962C8B-B14F-4D97-AF65-F5344CB8AC3E}">
-        <p14:creationId xmlns="" xmlns:p14="http://schemas.microsoft.com/office/powerpoint/2010/main" val="4236232986"/>
+        <p14:creationId xmlns:p14="http://schemas.microsoft.com/office/powerpoint/2010/main" val="4236232986"/>
       </p:ext>
     </p:extLst>
   </p:cSld>
@@ -1792,7 +1877,7 @@
     </p:spTree>
     <p:extLst>
       <p:ext uri="{BB962C8B-B14F-4D97-AF65-F5344CB8AC3E}">
-        <p14:creationId xmlns="" xmlns:p14="http://schemas.microsoft.com/office/powerpoint/2010/main" val="3454835055"/>
+        <p14:creationId xmlns:p14="http://schemas.microsoft.com/office/powerpoint/2010/main" val="3454835055"/>
       </p:ext>
     </p:extLst>
   </p:cSld>
@@ -2047,7 +2132,7 @@
     </p:spTree>
     <p:extLst>
       <p:ext uri="{BB962C8B-B14F-4D97-AF65-F5344CB8AC3E}">
-        <p14:creationId xmlns="" xmlns:p14="http://schemas.microsoft.com/office/powerpoint/2010/main" val="804127244"/>
+        <p14:creationId xmlns:p14="http://schemas.microsoft.com/office/powerpoint/2010/main" val="804127244"/>
       </p:ext>
     </p:extLst>
   </p:cSld>
@@ -2337,7 +2422,7 @@
     </p:spTree>
     <p:extLst>
       <p:ext uri="{BB962C8B-B14F-4D97-AF65-F5344CB8AC3E}">
-        <p14:creationId xmlns="" xmlns:p14="http://schemas.microsoft.com/office/powerpoint/2010/main" val="586698658"/>
+        <p14:creationId xmlns:p14="http://schemas.microsoft.com/office/powerpoint/2010/main" val="586698658"/>
       </p:ext>
     </p:extLst>
   </p:cSld>
@@ -2761,7 +2846,7 @@
     </p:spTree>
     <p:extLst>
       <p:ext uri="{BB962C8B-B14F-4D97-AF65-F5344CB8AC3E}">
-        <p14:creationId xmlns="" xmlns:p14="http://schemas.microsoft.com/office/powerpoint/2010/main" val="19144436"/>
+        <p14:creationId xmlns:p14="http://schemas.microsoft.com/office/powerpoint/2010/main" val="19144436"/>
       </p:ext>
     </p:extLst>
   </p:cSld>
@@ -2881,7 +2966,7 @@
     </p:spTree>
     <p:extLst>
       <p:ext uri="{BB962C8B-B14F-4D97-AF65-F5344CB8AC3E}">
-        <p14:creationId xmlns="" xmlns:p14="http://schemas.microsoft.com/office/powerpoint/2010/main" val="202749597"/>
+        <p14:creationId xmlns:p14="http://schemas.microsoft.com/office/powerpoint/2010/main" val="202749597"/>
       </p:ext>
     </p:extLst>
   </p:cSld>
@@ -2978,7 +3063,7 @@
     </p:spTree>
     <p:extLst>
       <p:ext uri="{BB962C8B-B14F-4D97-AF65-F5344CB8AC3E}">
-        <p14:creationId xmlns="" xmlns:p14="http://schemas.microsoft.com/office/powerpoint/2010/main" val="2898363528"/>
+        <p14:creationId xmlns:p14="http://schemas.microsoft.com/office/powerpoint/2010/main" val="2898363528"/>
       </p:ext>
     </p:extLst>
   </p:cSld>
@@ -3257,7 +3342,7 @@
     </p:spTree>
     <p:extLst>
       <p:ext uri="{BB962C8B-B14F-4D97-AF65-F5344CB8AC3E}">
-        <p14:creationId xmlns="" xmlns:p14="http://schemas.microsoft.com/office/powerpoint/2010/main" val="4010598191"/>
+        <p14:creationId xmlns:p14="http://schemas.microsoft.com/office/powerpoint/2010/main" val="4010598191"/>
       </p:ext>
     </p:extLst>
   </p:cSld>
@@ -3512,7 +3597,7 @@
     </p:spTree>
     <p:extLst>
       <p:ext uri="{BB962C8B-B14F-4D97-AF65-F5344CB8AC3E}">
-        <p14:creationId xmlns="" xmlns:p14="http://schemas.microsoft.com/office/powerpoint/2010/main" val="1433498939"/>
+        <p14:creationId xmlns:p14="http://schemas.microsoft.com/office/powerpoint/2010/main" val="1433498939"/>
       </p:ext>
     </p:extLst>
   </p:cSld>
@@ -3760,10 +3845,40 @@
           </a:p>
         </p:txBody>
       </p:sp>
+      <p:pic>
+        <p:nvPicPr>
+          <p:cNvPr id="9" name="Image 8"/>
+          <p:cNvPicPr>
+            <a:picLocks noChangeAspect="1"/>
+          </p:cNvPicPr>
+          <p:nvPr userDrawn="1"/>
+        </p:nvPicPr>
+        <p:blipFill>
+          <a:blip r:embed="rId13">
+            <a:extLst>
+              <a:ext uri="{28A0092B-C50C-407E-A947-70E740481C1C}">
+                <a14:useLocalDpi xmlns:a14="http://schemas.microsoft.com/office/drawing/2010/main" val="0"/>
+              </a:ext>
+            </a:extLst>
+          </a:blip>
+          <a:stretch>
+            <a:fillRect/>
+          </a:stretch>
+        </p:blipFill>
+        <p:spPr>
+          <a:xfrm>
+            <a:off x="0" y="-5907"/>
+            <a:ext cx="9144000" cy="463107"/>
+          </a:xfrm>
+          <a:prstGeom prst="rect">
+            <a:avLst/>
+          </a:prstGeom>
+        </p:spPr>
+      </p:pic>
     </p:spTree>
     <p:extLst>
       <p:ext uri="{BB962C8B-B14F-4D97-AF65-F5344CB8AC3E}">
-        <p14:creationId xmlns="" xmlns:p14="http://schemas.microsoft.com/office/powerpoint/2010/main" val="2684825788"/>
+        <p14:creationId xmlns:p14="http://schemas.microsoft.com/office/powerpoint/2010/main" val="2684825788"/>
       </p:ext>
     </p:extLst>
   </p:cSld>
@@ -4134,18 +4249,18 @@
     </p:spTree>
     <p:extLst>
       <p:ext uri="{BB962C8B-B14F-4D97-AF65-F5344CB8AC3E}">
-        <p14:creationId xmlns="" xmlns:p14="http://schemas.microsoft.com/office/powerpoint/2010/main" val="3955344790"/>
+        <p14:creationId xmlns:p14="http://schemas.microsoft.com/office/powerpoint/2010/main" val="3955344790"/>
       </p:ext>
     </p:extLst>
   </p:cSld>
   <p:clrMapOvr>
     <a:masterClrMapping/>
   </p:clrMapOvr>
-  <mc:AlternateContent xmlns:mc="http://schemas.openxmlformats.org/markup-compatibility/2006">
-    <mc:Choice xmlns="" xmlns:p14="http://schemas.microsoft.com/office/powerpoint/2010/main" Requires="p14">
+  <mc:AlternateContent xmlns:mc="http://schemas.openxmlformats.org/markup-compatibility/2006" xmlns:p14="http://schemas.microsoft.com/office/powerpoint/2010/main">
+    <mc:Choice Requires="p14">
       <p:transition spd="slow" p14:dur="2000"/>
     </mc:Choice>
-    <mc:Fallback>
+    <mc:Fallback xmlns="">
       <p:transition spd="slow"/>
     </mc:Fallback>
   </mc:AlternateContent>
@@ -4315,7 +4430,7 @@
     </p:spTree>
     <p:extLst>
       <p:ext uri="{BB962C8B-B14F-4D97-AF65-F5344CB8AC3E}">
-        <p14:creationId xmlns="" xmlns:p14="http://schemas.microsoft.com/office/powerpoint/2010/main" val="3644490438"/>
+        <p14:creationId xmlns:p14="http://schemas.microsoft.com/office/powerpoint/2010/main" val="3644490438"/>
       </p:ext>
     </p:extLst>
   </p:cSld>
@@ -4717,7 +4832,7 @@
     </p:spTree>
     <p:extLst>
       <p:ext uri="{BB962C8B-B14F-4D97-AF65-F5344CB8AC3E}">
-        <p14:creationId xmlns="" xmlns:p14="http://schemas.microsoft.com/office/powerpoint/2010/main" val="1728169033"/>
+        <p14:creationId xmlns:p14="http://schemas.microsoft.com/office/powerpoint/2010/main" val="1728169033"/>
       </p:ext>
     </p:extLst>
   </p:cSld>
@@ -5061,7 +5176,7 @@
             <a:blip r:embed="rId2" cstate="print">
               <a:extLst>
                 <a:ext uri="{28A0092B-C50C-407E-A947-70E740481C1C}">
-                  <a14:useLocalDpi xmlns="" xmlns:a14="http://schemas.microsoft.com/office/drawing/2010/main" val="0"/>
+                  <a14:useLocalDpi xmlns:a14="http://schemas.microsoft.com/office/drawing/2010/main" val="0"/>
                 </a:ext>
               </a:extLst>
             </a:blip>
@@ -5091,7 +5206,7 @@
             <a:blip r:embed="rId3" cstate="print">
               <a:extLst>
                 <a:ext uri="{28A0092B-C50C-407E-A947-70E740481C1C}">
-                  <a14:useLocalDpi xmlns="" xmlns:a14="http://schemas.microsoft.com/office/drawing/2010/main" val="0"/>
+                  <a14:useLocalDpi xmlns:a14="http://schemas.microsoft.com/office/drawing/2010/main" val="0"/>
                 </a:ext>
               </a:extLst>
             </a:blip>
@@ -5121,7 +5236,7 @@
             <a:blip r:embed="rId4" cstate="print">
               <a:extLst>
                 <a:ext uri="{28A0092B-C50C-407E-A947-70E740481C1C}">
-                  <a14:useLocalDpi xmlns="" xmlns:a14="http://schemas.microsoft.com/office/drawing/2010/main" val="0"/>
+                  <a14:useLocalDpi xmlns:a14="http://schemas.microsoft.com/office/drawing/2010/main" val="0"/>
                 </a:ext>
               </a:extLst>
             </a:blip>
@@ -5244,7 +5359,7 @@
     </p:spTree>
     <p:extLst>
       <p:ext uri="{BB962C8B-B14F-4D97-AF65-F5344CB8AC3E}">
-        <p14:creationId xmlns="" xmlns:p14="http://schemas.microsoft.com/office/powerpoint/2010/main" val="1377264780"/>
+        <p14:creationId xmlns:p14="http://schemas.microsoft.com/office/powerpoint/2010/main" val="1377264780"/>
       </p:ext>
     </p:extLst>
   </p:cSld>
@@ -5442,7 +5557,7 @@
           <a:blip r:embed="rId2" cstate="print">
             <a:extLst>
               <a:ext uri="{28A0092B-C50C-407E-A947-70E740481C1C}">
-                <a14:useLocalDpi xmlns="" xmlns:a14="http://schemas.microsoft.com/office/drawing/2010/main" val="0"/>
+                <a14:useLocalDpi xmlns:a14="http://schemas.microsoft.com/office/drawing/2010/main" val="0"/>
               </a:ext>
             </a:extLst>
           </a:blip>
@@ -5472,7 +5587,7 @@
           <a:blip r:embed="rId3" cstate="print">
             <a:extLst>
               <a:ext uri="{28A0092B-C50C-407E-A947-70E740481C1C}">
-                <a14:useLocalDpi xmlns="" xmlns:a14="http://schemas.microsoft.com/office/drawing/2010/main" val="0"/>
+                <a14:useLocalDpi xmlns:a14="http://schemas.microsoft.com/office/drawing/2010/main" val="0"/>
               </a:ext>
             </a:extLst>
           </a:blip>
@@ -5598,7 +5713,7 @@
           <a:blip r:embed="rId4" cstate="print">
             <a:extLst>
               <a:ext uri="{28A0092B-C50C-407E-A947-70E740481C1C}">
-                <a14:useLocalDpi xmlns="" xmlns:a14="http://schemas.microsoft.com/office/drawing/2010/main" val="0"/>
+                <a14:useLocalDpi xmlns:a14="http://schemas.microsoft.com/office/drawing/2010/main" val="0"/>
               </a:ext>
             </a:extLst>
           </a:blip>
@@ -5711,7 +5826,7 @@
     </p:spTree>
     <p:extLst>
       <p:ext uri="{BB962C8B-B14F-4D97-AF65-F5344CB8AC3E}">
-        <p14:creationId xmlns="" xmlns:p14="http://schemas.microsoft.com/office/powerpoint/2010/main" val="3336203041"/>
+        <p14:creationId xmlns:p14="http://schemas.microsoft.com/office/powerpoint/2010/main" val="3336203041"/>
       </p:ext>
     </p:extLst>
   </p:cSld>
@@ -6129,7 +6244,7 @@
           <a:blip r:embed="rId2" cstate="print">
             <a:extLst>
               <a:ext uri="{28A0092B-C50C-407E-A947-70E740481C1C}">
-                <a14:useLocalDpi xmlns="" xmlns:a14="http://schemas.microsoft.com/office/drawing/2010/main" val="0"/>
+                <a14:useLocalDpi xmlns:a14="http://schemas.microsoft.com/office/drawing/2010/main" val="0"/>
               </a:ext>
             </a:extLst>
           </a:blip>
@@ -6159,7 +6274,7 @@
           <a:blip r:embed="rId3" cstate="print">
             <a:extLst>
               <a:ext uri="{28A0092B-C50C-407E-A947-70E740481C1C}">
-                <a14:useLocalDpi xmlns="" xmlns:a14="http://schemas.microsoft.com/office/drawing/2010/main" val="0"/>
+                <a14:useLocalDpi xmlns:a14="http://schemas.microsoft.com/office/drawing/2010/main" val="0"/>
               </a:ext>
             </a:extLst>
           </a:blip>
@@ -6189,7 +6304,7 @@
           <a:blip r:embed="rId4" cstate="print">
             <a:extLst>
               <a:ext uri="{28A0092B-C50C-407E-A947-70E740481C1C}">
-                <a14:useLocalDpi xmlns="" xmlns:a14="http://schemas.microsoft.com/office/drawing/2010/main" val="0"/>
+                <a14:useLocalDpi xmlns:a14="http://schemas.microsoft.com/office/drawing/2010/main" val="0"/>
               </a:ext>
             </a:extLst>
           </a:blip>
@@ -6302,7 +6417,7 @@
     </p:spTree>
     <p:extLst>
       <p:ext uri="{BB962C8B-B14F-4D97-AF65-F5344CB8AC3E}">
-        <p14:creationId xmlns="" xmlns:p14="http://schemas.microsoft.com/office/powerpoint/2010/main" val="864210357"/>
+        <p14:creationId xmlns:p14="http://schemas.microsoft.com/office/powerpoint/2010/main" val="864210357"/>
       </p:ext>
     </p:extLst>
   </p:cSld>
@@ -6576,7 +6691,7 @@
           <a:blip r:embed="rId2" cstate="print">
             <a:extLst>
               <a:ext uri="{28A0092B-C50C-407E-A947-70E740481C1C}">
-                <a14:useLocalDpi xmlns="" xmlns:a14="http://schemas.microsoft.com/office/drawing/2010/main" val="0"/>
+                <a14:useLocalDpi xmlns:a14="http://schemas.microsoft.com/office/drawing/2010/main" val="0"/>
               </a:ext>
             </a:extLst>
           </a:blip>
@@ -6606,7 +6721,7 @@
           <a:blip r:embed="rId3" cstate="print">
             <a:extLst>
               <a:ext uri="{28A0092B-C50C-407E-A947-70E740481C1C}">
-                <a14:useLocalDpi xmlns="" xmlns:a14="http://schemas.microsoft.com/office/drawing/2010/main" val="0"/>
+                <a14:useLocalDpi xmlns:a14="http://schemas.microsoft.com/office/drawing/2010/main" val="0"/>
               </a:ext>
             </a:extLst>
           </a:blip>
@@ -6843,7 +6958,7 @@
           <a:blip r:embed="rId4" cstate="print">
             <a:extLst>
               <a:ext uri="{28A0092B-C50C-407E-A947-70E740481C1C}">
-                <a14:useLocalDpi xmlns="" xmlns:a14="http://schemas.microsoft.com/office/drawing/2010/main" val="0"/>
+                <a14:useLocalDpi xmlns:a14="http://schemas.microsoft.com/office/drawing/2010/main" val="0"/>
               </a:ext>
             </a:extLst>
           </a:blip>
@@ -7322,7 +7437,7 @@
     </p:spTree>
     <p:extLst>
       <p:ext uri="{BB962C8B-B14F-4D97-AF65-F5344CB8AC3E}">
-        <p14:creationId xmlns="" xmlns:p14="http://schemas.microsoft.com/office/powerpoint/2010/main" val="3336203041"/>
+        <p14:creationId xmlns:p14="http://schemas.microsoft.com/office/powerpoint/2010/main" val="3336203041"/>
       </p:ext>
     </p:extLst>
   </p:cSld>
@@ -7552,7 +7667,7 @@
           <a:blip r:embed="rId2" cstate="print">
             <a:extLst>
               <a:ext uri="{28A0092B-C50C-407E-A947-70E740481C1C}">
-                <a14:useLocalDpi xmlns="" xmlns:a14="http://schemas.microsoft.com/office/drawing/2010/main" val="0"/>
+                <a14:useLocalDpi xmlns:a14="http://schemas.microsoft.com/office/drawing/2010/main" val="0"/>
               </a:ext>
             </a:extLst>
           </a:blip>
@@ -7582,7 +7697,7 @@
           <a:blip r:embed="rId3" cstate="print">
             <a:extLst>
               <a:ext uri="{28A0092B-C50C-407E-A947-70E740481C1C}">
-                <a14:useLocalDpi xmlns="" xmlns:a14="http://schemas.microsoft.com/office/drawing/2010/main" val="0"/>
+                <a14:useLocalDpi xmlns:a14="http://schemas.microsoft.com/office/drawing/2010/main" val="0"/>
               </a:ext>
             </a:extLst>
           </a:blip>
@@ -7899,7 +8014,7 @@
     </p:spTree>
     <p:extLst>
       <p:ext uri="{BB962C8B-B14F-4D97-AF65-F5344CB8AC3E}">
-        <p14:creationId xmlns="" xmlns:p14="http://schemas.microsoft.com/office/powerpoint/2010/main" val="2819423520"/>
+        <p14:creationId xmlns:p14="http://schemas.microsoft.com/office/powerpoint/2010/main" val="2819423520"/>
       </p:ext>
     </p:extLst>
   </p:cSld>
@@ -8407,7 +8522,7 @@
     </p:spTree>
     <p:extLst>
       <p:ext uri="{BB962C8B-B14F-4D97-AF65-F5344CB8AC3E}">
-        <p14:creationId xmlns="" xmlns:p14="http://schemas.microsoft.com/office/powerpoint/2010/main" val="3627640579"/>
+        <p14:creationId xmlns:p14="http://schemas.microsoft.com/office/powerpoint/2010/main" val="3627640579"/>
       </p:ext>
     </p:extLst>
   </p:cSld>
@@ -8449,7 +8564,7 @@
         </p:nvSpPr>
         <p:spPr>
           <a:xfrm>
-            <a:off x="304800" y="304800"/>
+            <a:off x="304800" y="457200"/>
             <a:ext cx="6172200" cy="914400"/>
           </a:xfrm>
           <a:prstGeom prst="roundRect">
@@ -8497,7 +8612,7 @@
         </p:nvSpPr>
         <p:spPr>
           <a:xfrm>
-            <a:off x="6629400" y="304800"/>
+            <a:off x="6629400" y="457200"/>
             <a:ext cx="2209800" cy="914400"/>
           </a:xfrm>
           <a:prstGeom prst="roundRect">
@@ -8545,7 +8660,7 @@
           <a:blip r:embed="rId2" cstate="print">
             <a:extLst>
               <a:ext uri="{28A0092B-C50C-407E-A947-70E740481C1C}">
-                <a14:useLocalDpi xmlns="" xmlns:a14="http://schemas.microsoft.com/office/drawing/2010/main" val="0"/>
+                <a14:useLocalDpi xmlns:a14="http://schemas.microsoft.com/office/drawing/2010/main" val="0"/>
               </a:ext>
             </a:extLst>
           </a:blip>
@@ -8555,8 +8670,8 @@
         </p:blipFill>
         <p:spPr>
           <a:xfrm>
-            <a:off x="381000" y="1295400"/>
-            <a:ext cx="8467200" cy="5486400"/>
+            <a:off x="381000" y="1399980"/>
+            <a:ext cx="8305800" cy="5381819"/>
           </a:xfrm>
           <a:prstGeom prst="rect">
             <a:avLst/>
@@ -8621,7 +8736,7 @@
     </p:spTree>
     <p:extLst>
       <p:ext uri="{BB962C8B-B14F-4D97-AF65-F5344CB8AC3E}">
-        <p14:creationId xmlns="" xmlns:p14="http://schemas.microsoft.com/office/powerpoint/2010/main" val="171061288"/>
+        <p14:creationId xmlns:p14="http://schemas.microsoft.com/office/powerpoint/2010/main" val="171061288"/>
       </p:ext>
     </p:extLst>
   </p:cSld>
@@ -8891,7 +9006,7 @@
           <a:blip r:embed="rId2" cstate="print">
             <a:extLst>
               <a:ext uri="{28A0092B-C50C-407E-A947-70E740481C1C}">
-                <a14:useLocalDpi xmlns="" xmlns:a14="http://schemas.microsoft.com/office/drawing/2010/main"/>
+                <a14:useLocalDpi xmlns:a14="http://schemas.microsoft.com/office/drawing/2010/main"/>
               </a:ext>
             </a:extLst>
           </a:blip>
@@ -8916,7 +9031,7 @@
     </p:spTree>
     <p:extLst>
       <p:ext uri="{BB962C8B-B14F-4D97-AF65-F5344CB8AC3E}">
-        <p14:creationId xmlns="" xmlns:p14="http://schemas.microsoft.com/office/powerpoint/2010/main" val="1630604182"/>
+        <p14:creationId xmlns:p14="http://schemas.microsoft.com/office/powerpoint/2010/main" val="1630604182"/>
       </p:ext>
     </p:extLst>
   </p:cSld>
@@ -8959,10 +9074,10 @@
           <p:nvPr/>
         </p:nvPicPr>
         <p:blipFill>
-          <a:blip r:embed="rId2" cstate="print">
+          <a:blip r:embed="rId3" cstate="print">
             <a:extLst>
               <a:ext uri="{28A0092B-C50C-407E-A947-70E740481C1C}">
-                <a14:useLocalDpi xmlns="" xmlns:a14="http://schemas.microsoft.com/office/drawing/2010/main" val="0"/>
+                <a14:useLocalDpi xmlns:a14="http://schemas.microsoft.com/office/drawing/2010/main" val="0"/>
               </a:ext>
             </a:extLst>
           </a:blip>
@@ -8972,8 +9087,8 @@
         </p:blipFill>
         <p:spPr>
           <a:xfrm>
-            <a:off x="838200" y="1739604"/>
-            <a:ext cx="7391400" cy="5042196"/>
+            <a:off x="914400" y="1999510"/>
+            <a:ext cx="7010400" cy="4782289"/>
           </a:xfrm>
           <a:prstGeom prst="rect">
             <a:avLst/>
@@ -8988,7 +9103,7 @@
         </p:nvSpPr>
         <p:spPr>
           <a:xfrm>
-            <a:off x="152400" y="152400"/>
+            <a:off x="152400" y="457200"/>
             <a:ext cx="8839200" cy="1524000"/>
           </a:xfrm>
           <a:prstGeom prst="roundRect">
@@ -9030,7 +9145,7 @@
         </p:nvSpPr>
         <p:spPr>
           <a:xfrm>
-            <a:off x="304800" y="609600"/>
+            <a:off x="304800" y="914400"/>
             <a:ext cx="6172200" cy="914400"/>
           </a:xfrm>
           <a:prstGeom prst="roundRect">
@@ -9098,7 +9213,7 @@
         </p:nvSpPr>
         <p:spPr>
           <a:xfrm>
-            <a:off x="6629400" y="609600"/>
+            <a:off x="6629400" y="914400"/>
             <a:ext cx="2209800" cy="914400"/>
           </a:xfrm>
           <a:prstGeom prst="roundRect">
@@ -9142,8 +9257,8 @@
         </p:nvSpPr>
         <p:spPr>
           <a:xfrm>
-            <a:off x="5410200" y="1828800"/>
-            <a:ext cx="3352800" cy="914400"/>
+            <a:off x="5334000" y="2133600"/>
+            <a:ext cx="3179975" cy="867266"/>
           </a:xfrm>
           <a:prstGeom prst="roundRect">
             <a:avLst/>
@@ -9197,7 +9312,7 @@
     </p:spTree>
     <p:extLst>
       <p:ext uri="{BB962C8B-B14F-4D97-AF65-F5344CB8AC3E}">
-        <p14:creationId xmlns="" xmlns:p14="http://schemas.microsoft.com/office/powerpoint/2010/main" val="394514968"/>
+        <p14:creationId xmlns:p14="http://schemas.microsoft.com/office/powerpoint/2010/main" val="394514968"/>
       </p:ext>
     </p:extLst>
   </p:cSld>
@@ -9239,7 +9354,7 @@
         </p:nvSpPr>
         <p:spPr>
           <a:xfrm>
-            <a:off x="304800" y="228600"/>
+            <a:off x="304800" y="457200"/>
             <a:ext cx="6172200" cy="914400"/>
           </a:xfrm>
           <a:prstGeom prst="roundRect">
@@ -9283,7 +9398,7 @@
         </p:nvSpPr>
         <p:spPr>
           <a:xfrm>
-            <a:off x="6629400" y="228600"/>
+            <a:off x="6629400" y="457200"/>
             <a:ext cx="2209800" cy="914400"/>
           </a:xfrm>
           <a:prstGeom prst="roundRect">
@@ -9331,7 +9446,7 @@
           <a:blip r:embed="rId2" cstate="print">
             <a:extLst>
               <a:ext uri="{28A0092B-C50C-407E-A947-70E740481C1C}">
-                <a14:useLocalDpi xmlns="" xmlns:a14="http://schemas.microsoft.com/office/drawing/2010/main" val="0"/>
+                <a14:useLocalDpi xmlns:a14="http://schemas.microsoft.com/office/drawing/2010/main" val="0"/>
               </a:ext>
             </a:extLst>
           </a:blip>
@@ -9341,8 +9456,8 @@
         </p:blipFill>
         <p:spPr>
           <a:xfrm>
-            <a:off x="533400" y="1371600"/>
-            <a:ext cx="7543800" cy="5386211"/>
+            <a:off x="533400" y="1524000"/>
+            <a:ext cx="7330352" cy="5233811"/>
           </a:xfrm>
           <a:prstGeom prst="rect">
             <a:avLst/>
@@ -9412,7 +9527,7 @@
     </p:spTree>
     <p:extLst>
       <p:ext uri="{BB962C8B-B14F-4D97-AF65-F5344CB8AC3E}">
-        <p14:creationId xmlns="" xmlns:p14="http://schemas.microsoft.com/office/powerpoint/2010/main" val="3593113261"/>
+        <p14:creationId xmlns:p14="http://schemas.microsoft.com/office/powerpoint/2010/main" val="3593113261"/>
       </p:ext>
     </p:extLst>
   </p:cSld>
@@ -9454,7 +9569,7 @@
         </p:nvSpPr>
         <p:spPr>
           <a:xfrm>
-            <a:off x="304800" y="228600"/>
+            <a:off x="304800" y="457200"/>
             <a:ext cx="6172200" cy="914400"/>
           </a:xfrm>
           <a:prstGeom prst="roundRect">
@@ -9522,7 +9637,7 @@
         </p:nvSpPr>
         <p:spPr>
           <a:xfrm>
-            <a:off x="6629400" y="228600"/>
+            <a:off x="6629400" y="457200"/>
             <a:ext cx="2209800" cy="914400"/>
           </a:xfrm>
           <a:prstGeom prst="roundRect">
@@ -9570,7 +9685,7 @@
           <a:blip r:embed="rId2" cstate="print">
             <a:extLst>
               <a:ext uri="{28A0092B-C50C-407E-A947-70E740481C1C}">
-                <a14:useLocalDpi xmlns="" xmlns:a14="http://schemas.microsoft.com/office/drawing/2010/main" val="0"/>
+                <a14:useLocalDpi xmlns:a14="http://schemas.microsoft.com/office/drawing/2010/main" val="0"/>
               </a:ext>
             </a:extLst>
           </a:blip>
@@ -9646,7 +9761,7 @@
     </p:spTree>
     <p:extLst>
       <p:ext uri="{BB962C8B-B14F-4D97-AF65-F5344CB8AC3E}">
-        <p14:creationId xmlns="" xmlns:p14="http://schemas.microsoft.com/office/powerpoint/2010/main" val="451913240"/>
+        <p14:creationId xmlns:p14="http://schemas.microsoft.com/office/powerpoint/2010/main" val="451913240"/>
       </p:ext>
     </p:extLst>
   </p:cSld>
@@ -9715,7 +9830,7 @@
           <a:blip r:embed="rId2" cstate="print">
             <a:extLst>
               <a:ext uri="{28A0092B-C50C-407E-A947-70E740481C1C}">
-                <a14:useLocalDpi xmlns="" xmlns:a14="http://schemas.microsoft.com/office/drawing/2010/main" val="0"/>
+                <a14:useLocalDpi xmlns:a14="http://schemas.microsoft.com/office/drawing/2010/main" val="0"/>
               </a:ext>
             </a:extLst>
           </a:blip>
@@ -9912,7 +10027,7 @@
     </p:spTree>
     <p:extLst>
       <p:ext uri="{BB962C8B-B14F-4D97-AF65-F5344CB8AC3E}">
-        <p14:creationId xmlns="" xmlns:p14="http://schemas.microsoft.com/office/powerpoint/2010/main" val="2009636028"/>
+        <p14:creationId xmlns:p14="http://schemas.microsoft.com/office/powerpoint/2010/main" val="2009636028"/>
       </p:ext>
     </p:extLst>
   </p:cSld>
@@ -9981,7 +10096,7 @@
           <a:blip r:embed="rId2" cstate="print">
             <a:extLst>
               <a:ext uri="{28A0092B-C50C-407E-A947-70E740481C1C}">
-                <a14:useLocalDpi xmlns="" xmlns:a14="http://schemas.microsoft.com/office/drawing/2010/main" val="0"/>
+                <a14:useLocalDpi xmlns:a14="http://schemas.microsoft.com/office/drawing/2010/main" val="0"/>
               </a:ext>
             </a:extLst>
           </a:blip>
@@ -10178,7 +10293,7 @@
     </p:spTree>
     <p:extLst>
       <p:ext uri="{BB962C8B-B14F-4D97-AF65-F5344CB8AC3E}">
-        <p14:creationId xmlns="" xmlns:p14="http://schemas.microsoft.com/office/powerpoint/2010/main" val="1131833659"/>
+        <p14:creationId xmlns:p14="http://schemas.microsoft.com/office/powerpoint/2010/main" val="1131833659"/>
       </p:ext>
     </p:extLst>
   </p:cSld>
@@ -10508,7 +10623,7 @@
           <a:blip r:embed="rId2" cstate="print">
             <a:extLst>
               <a:ext uri="{28A0092B-C50C-407E-A947-70E740481C1C}">
-                <a14:useLocalDpi xmlns="" xmlns:a14="http://schemas.microsoft.com/office/drawing/2010/main" val="0"/>
+                <a14:useLocalDpi xmlns:a14="http://schemas.microsoft.com/office/drawing/2010/main" val="0"/>
               </a:ext>
             </a:extLst>
           </a:blip>
@@ -10529,7 +10644,7 @@
     </p:spTree>
     <p:extLst>
       <p:ext uri="{BB962C8B-B14F-4D97-AF65-F5344CB8AC3E}">
-        <p14:creationId xmlns="" xmlns:p14="http://schemas.microsoft.com/office/powerpoint/2010/main" val="1848404178"/>
+        <p14:creationId xmlns:p14="http://schemas.microsoft.com/office/powerpoint/2010/main" val="1848404178"/>
       </p:ext>
     </p:extLst>
   </p:cSld>
@@ -10713,7 +10828,7 @@
     </p:spTree>
     <p:extLst>
       <p:ext uri="{BB962C8B-B14F-4D97-AF65-F5344CB8AC3E}">
-        <p14:creationId xmlns="" xmlns:p14="http://schemas.microsoft.com/office/powerpoint/2010/main" val="1155854373"/>
+        <p14:creationId xmlns:p14="http://schemas.microsoft.com/office/powerpoint/2010/main" val="1155854373"/>
       </p:ext>
     </p:extLst>
   </p:cSld>
@@ -10886,7 +11001,7 @@
     </p:spTree>
     <p:extLst>
       <p:ext uri="{BB962C8B-B14F-4D97-AF65-F5344CB8AC3E}">
-        <p14:creationId xmlns="" xmlns:p14="http://schemas.microsoft.com/office/powerpoint/2010/main" val="1027356186"/>
+        <p14:creationId xmlns:p14="http://schemas.microsoft.com/office/powerpoint/2010/main" val="1027356186"/>
       </p:ext>
     </p:extLst>
   </p:cSld>
@@ -10955,7 +11070,7 @@
           <a:blip r:embed="rId2" cstate="print">
             <a:extLst>
               <a:ext uri="{28A0092B-C50C-407E-A947-70E740481C1C}">
-                <a14:useLocalDpi xmlns="" xmlns:a14="http://schemas.microsoft.com/office/drawing/2010/main" val="0"/>
+                <a14:useLocalDpi xmlns:a14="http://schemas.microsoft.com/office/drawing/2010/main" val="0"/>
               </a:ext>
             </a:extLst>
           </a:blip>
@@ -10985,7 +11100,7 @@
           <a:blip r:embed="rId3" cstate="print">
             <a:extLst>
               <a:ext uri="{28A0092B-C50C-407E-A947-70E740481C1C}">
-                <a14:useLocalDpi xmlns="" xmlns:a14="http://schemas.microsoft.com/office/drawing/2010/main" val="0"/>
+                <a14:useLocalDpi xmlns:a14="http://schemas.microsoft.com/office/drawing/2010/main" val="0"/>
               </a:ext>
             </a:extLst>
           </a:blip>
@@ -11009,7 +11124,7 @@
     </p:spTree>
     <p:extLst>
       <p:ext uri="{BB962C8B-B14F-4D97-AF65-F5344CB8AC3E}">
-        <p14:creationId xmlns="" xmlns:p14="http://schemas.microsoft.com/office/powerpoint/2010/main" val="2369171751"/>
+        <p14:creationId xmlns:p14="http://schemas.microsoft.com/office/powerpoint/2010/main" val="2369171751"/>
       </p:ext>
     </p:extLst>
   </p:cSld>
@@ -11310,7 +11425,7 @@
           <a:blip r:embed="rId2" cstate="print">
             <a:extLst>
               <a:ext uri="{28A0092B-C50C-407E-A947-70E740481C1C}">
-                <a14:useLocalDpi xmlns="" xmlns:a14="http://schemas.microsoft.com/office/drawing/2010/main" val="0"/>
+                <a14:useLocalDpi xmlns:a14="http://schemas.microsoft.com/office/drawing/2010/main" val="0"/>
               </a:ext>
             </a:extLst>
           </a:blip>
@@ -11340,7 +11455,7 @@
           <a:blip r:embed="rId3" cstate="print">
             <a:extLst>
               <a:ext uri="{28A0092B-C50C-407E-A947-70E740481C1C}">
-                <a14:useLocalDpi xmlns="" xmlns:a14="http://schemas.microsoft.com/office/drawing/2010/main" val="0"/>
+                <a14:useLocalDpi xmlns:a14="http://schemas.microsoft.com/office/drawing/2010/main" val="0"/>
               </a:ext>
             </a:extLst>
           </a:blip>
@@ -11370,7 +11485,7 @@
           <a:blip r:embed="rId4" cstate="print">
             <a:extLst>
               <a:ext uri="{28A0092B-C50C-407E-A947-70E740481C1C}">
-                <a14:useLocalDpi xmlns="" xmlns:a14="http://schemas.microsoft.com/office/drawing/2010/main" val="0"/>
+                <a14:useLocalDpi xmlns:a14="http://schemas.microsoft.com/office/drawing/2010/main" val="0"/>
               </a:ext>
             </a:extLst>
           </a:blip>
@@ -11486,7 +11601,7 @@
     </p:spTree>
     <p:extLst>
       <p:ext uri="{BB962C8B-B14F-4D97-AF65-F5344CB8AC3E}">
-        <p14:creationId xmlns="" xmlns:p14="http://schemas.microsoft.com/office/powerpoint/2010/main" val="3216378839"/>
+        <p14:creationId xmlns:p14="http://schemas.microsoft.com/office/powerpoint/2010/main" val="3216378839"/>
       </p:ext>
     </p:extLst>
   </p:cSld>
@@ -11564,7 +11679,7 @@
           <a:blip r:embed="rId2" cstate="print">
             <a:extLst>
               <a:ext uri="{28A0092B-C50C-407E-A947-70E740481C1C}">
-                <a14:useLocalDpi xmlns="" xmlns:a14="http://schemas.microsoft.com/office/drawing/2010/main" val="0"/>
+                <a14:useLocalDpi xmlns:a14="http://schemas.microsoft.com/office/drawing/2010/main" val="0"/>
               </a:ext>
             </a:extLst>
           </a:blip>
@@ -11673,7 +11788,7 @@
     </p:spTree>
     <p:extLst>
       <p:ext uri="{BB962C8B-B14F-4D97-AF65-F5344CB8AC3E}">
-        <p14:creationId xmlns="" xmlns:p14="http://schemas.microsoft.com/office/powerpoint/2010/main" val="2527117896"/>
+        <p14:creationId xmlns:p14="http://schemas.microsoft.com/office/powerpoint/2010/main" val="2527117896"/>
       </p:ext>
     </p:extLst>
   </p:cSld>
@@ -12387,7 +12502,7 @@
     </p:spTree>
     <p:extLst>
       <p:ext uri="{BB962C8B-B14F-4D97-AF65-F5344CB8AC3E}">
-        <p14:creationId xmlns="" xmlns:p14="http://schemas.microsoft.com/office/powerpoint/2010/main" val="1994743043"/>
+        <p14:creationId xmlns:p14="http://schemas.microsoft.com/office/powerpoint/2010/main" val="1994743043"/>
       </p:ext>
     </p:extLst>
   </p:cSld>
@@ -12573,7 +12688,7 @@
     </p:spTree>
     <p:extLst>
       <p:ext uri="{BB962C8B-B14F-4D97-AF65-F5344CB8AC3E}">
-        <p14:creationId xmlns="" xmlns:p14="http://schemas.microsoft.com/office/powerpoint/2010/main" val="3098398089"/>
+        <p14:creationId xmlns:p14="http://schemas.microsoft.com/office/powerpoint/2010/main" val="3098398089"/>
       </p:ext>
     </p:extLst>
   </p:cSld>
@@ -12853,7 +12968,7 @@
     </p:spTree>
     <p:extLst>
       <p:ext uri="{BB962C8B-B14F-4D97-AF65-F5344CB8AC3E}">
-        <p14:creationId xmlns="" xmlns:p14="http://schemas.microsoft.com/office/powerpoint/2010/main" val="3449390454"/>
+        <p14:creationId xmlns:p14="http://schemas.microsoft.com/office/powerpoint/2010/main" val="3449390454"/>
       </p:ext>
     </p:extLst>
   </p:cSld>
@@ -13543,7 +13658,7 @@
     </p:spTree>
     <p:extLst>
       <p:ext uri="{BB962C8B-B14F-4D97-AF65-F5344CB8AC3E}">
-        <p14:creationId xmlns="" xmlns:p14="http://schemas.microsoft.com/office/powerpoint/2010/main" val="4006469721"/>
+        <p14:creationId xmlns:p14="http://schemas.microsoft.com/office/powerpoint/2010/main" val="4006469721"/>
       </p:ext>
     </p:extLst>
   </p:cSld>
@@ -13851,7 +13966,7 @@
     </p:spTree>
     <p:extLst>
       <p:ext uri="{BB962C8B-B14F-4D97-AF65-F5344CB8AC3E}">
-        <p14:creationId xmlns="" xmlns:p14="http://schemas.microsoft.com/office/powerpoint/2010/main" val="1678422724"/>
+        <p14:creationId xmlns:p14="http://schemas.microsoft.com/office/powerpoint/2010/main" val="1678422724"/>
       </p:ext>
     </p:extLst>
   </p:cSld>
@@ -14464,7 +14579,7 @@
     </p:spTree>
     <p:extLst>
       <p:ext uri="{BB962C8B-B14F-4D97-AF65-F5344CB8AC3E}">
-        <p14:creationId xmlns="" xmlns:p14="http://schemas.microsoft.com/office/powerpoint/2010/main" val="2792941284"/>
+        <p14:creationId xmlns:p14="http://schemas.microsoft.com/office/powerpoint/2010/main" val="2792941284"/>
       </p:ext>
     </p:extLst>
   </p:cSld>
@@ -14905,7 +15020,7 @@
     </p:spTree>
     <p:extLst>
       <p:ext uri="{BB962C8B-B14F-4D97-AF65-F5344CB8AC3E}">
-        <p14:creationId xmlns="" xmlns:p14="http://schemas.microsoft.com/office/powerpoint/2010/main" val="3220083538"/>
+        <p14:creationId xmlns:p14="http://schemas.microsoft.com/office/powerpoint/2010/main" val="3220083538"/>
       </p:ext>
     </p:extLst>
   </p:cSld>
@@ -15066,7 +15181,7 @@
     </p:spTree>
     <p:extLst>
       <p:ext uri="{BB962C8B-B14F-4D97-AF65-F5344CB8AC3E}">
-        <p14:creationId xmlns="" xmlns:p14="http://schemas.microsoft.com/office/powerpoint/2010/main" val="3312784383"/>
+        <p14:creationId xmlns:p14="http://schemas.microsoft.com/office/powerpoint/2010/main" val="3312784383"/>
       </p:ext>
     </p:extLst>
   </p:cSld>
@@ -15205,11 +15320,7 @@
             </a:r>
             <a:r>
               <a:rPr lang="en-US" b="1" dirty="0" smtClean="0"/>
-              <a:t>visibility </a:t>
-            </a:r>
-            <a:r>
-              <a:rPr lang="en-US" b="1" dirty="0" smtClean="0"/>
-              <a:t>changes</a:t>
+              <a:t>visibility changes</a:t>
             </a:r>
             <a:endParaRPr lang="en-US" dirty="0" smtClean="0"/>
           </a:p>
@@ -15260,11 +15371,7 @@
             </a:r>
             <a:r>
               <a:rPr lang="en-US" dirty="0" smtClean="0"/>
-              <a:t> </a:t>
-            </a:r>
-            <a:r>
-              <a:rPr lang="en-US" dirty="0" smtClean="0"/>
-              <a:t>widget </a:t>
+              <a:t> widget </a:t>
             </a:r>
             <a:r>
               <a:rPr lang="en-US" b="1" dirty="0" smtClean="0"/>
@@ -15293,7 +15400,7 @@
     </p:spTree>
     <p:extLst>
       <p:ext uri="{BB962C8B-B14F-4D97-AF65-F5344CB8AC3E}">
-        <p14:creationId xmlns="" xmlns:p14="http://schemas.microsoft.com/office/powerpoint/2010/main" val="856396653"/>
+        <p14:creationId xmlns:p14="http://schemas.microsoft.com/office/powerpoint/2010/main" val="856396653"/>
       </p:ext>
     </p:extLst>
   </p:cSld>
@@ -15495,11 +15602,7 @@
           <a:p>
             <a:r>
               <a:rPr lang="en-US" sz="2000" dirty="0" smtClean="0"/>
-              <a:t>Initialize the field during </a:t>
-            </a:r>
-            <a:r>
-              <a:rPr lang="en-US" sz="2000" dirty="0" smtClean="0"/>
-              <a:t>the </a:t>
+              <a:t>Initialize the field during the </a:t>
             </a:r>
             <a:r>
               <a:rPr lang="en-US" sz="2000" b="1" dirty="0" smtClean="0"/>
@@ -15507,20 +15610,15 @@
             </a:r>
             <a:r>
               <a:rPr lang="en-US" sz="2000" dirty="0" smtClean="0"/>
-              <a:t> of the </a:t>
-            </a:r>
-            <a:r>
-              <a:rPr lang="en-US" sz="2000" dirty="0" smtClean="0"/>
-              <a:t>application</a:t>
-            </a:r>
-            <a:endParaRPr lang="en-US" sz="2000" dirty="0" smtClean="0"/>
+              <a:t> of the application</a:t>
+            </a:r>
           </a:p>
         </p:txBody>
       </p:sp>
     </p:spTree>
     <p:extLst>
       <p:ext uri="{BB962C8B-B14F-4D97-AF65-F5344CB8AC3E}">
-        <p14:creationId xmlns="" xmlns:p14="http://schemas.microsoft.com/office/powerpoint/2010/main" val="3443329555"/>
+        <p14:creationId xmlns:p14="http://schemas.microsoft.com/office/powerpoint/2010/main" val="3443329555"/>
       </p:ext>
     </p:extLst>
   </p:cSld>
@@ -15952,11 +16050,7 @@
             </a:r>
             <a:r>
               <a:rPr lang="en-US" sz="2000" dirty="0"/>
-              <a:t>the domain model of the </a:t>
-            </a:r>
-            <a:r>
-              <a:rPr lang="en-US" sz="2000" dirty="0"/>
-              <a:t>MVC </a:t>
+              <a:t>the domain model of the MVC </a:t>
             </a:r>
             <a:r>
               <a:rPr lang="en-US" sz="2000" dirty="0" smtClean="0"/>
@@ -16036,7 +16130,7 @@
     </p:spTree>
     <p:extLst>
       <p:ext uri="{BB962C8B-B14F-4D97-AF65-F5344CB8AC3E}">
-        <p14:creationId xmlns="" xmlns:p14="http://schemas.microsoft.com/office/powerpoint/2010/main" val="1556099287"/>
+        <p14:creationId xmlns:p14="http://schemas.microsoft.com/office/powerpoint/2010/main" val="1556099287"/>
       </p:ext>
     </p:extLst>
   </p:cSld>
@@ -16389,7 +16483,7 @@
     </p:spTree>
     <p:extLst>
       <p:ext uri="{BB962C8B-B14F-4D97-AF65-F5344CB8AC3E}">
-        <p14:creationId xmlns="" xmlns:p14="http://schemas.microsoft.com/office/powerpoint/2010/main" val="2948210574"/>
+        <p14:creationId xmlns:p14="http://schemas.microsoft.com/office/powerpoint/2010/main" val="2948210574"/>
       </p:ext>
     </p:extLst>
   </p:cSld>
@@ -16457,7 +16551,7 @@
           <p:nvPr>
             <p:extLst>
               <p:ext uri="{D42A27DB-BD31-4B8C-83A1-F6EECF244321}">
-                <p14:modId xmlns="" xmlns:p14="http://schemas.microsoft.com/office/powerpoint/2010/main" val="2181104498"/>
+                <p14:modId xmlns:p14="http://schemas.microsoft.com/office/powerpoint/2010/main" val="2181104498"/>
               </p:ext>
             </p:extLst>
           </p:nvPr>
@@ -17441,7 +17535,7 @@
     </p:spTree>
     <p:extLst>
       <p:ext uri="{BB962C8B-B14F-4D97-AF65-F5344CB8AC3E}">
-        <p14:creationId xmlns="" xmlns:p14="http://schemas.microsoft.com/office/powerpoint/2010/main" val="2197364214"/>
+        <p14:creationId xmlns:p14="http://schemas.microsoft.com/office/powerpoint/2010/main" val="2197364214"/>
       </p:ext>
     </p:extLst>
   </p:cSld>
@@ -17904,7 +17998,7 @@
     </p:spTree>
     <p:extLst>
       <p:ext uri="{BB962C8B-B14F-4D97-AF65-F5344CB8AC3E}">
-        <p14:creationId xmlns="" xmlns:p14="http://schemas.microsoft.com/office/powerpoint/2010/main" val="977874982"/>
+        <p14:creationId xmlns:p14="http://schemas.microsoft.com/office/powerpoint/2010/main" val="977874982"/>
       </p:ext>
     </p:extLst>
   </p:cSld>
@@ -18080,7 +18174,7 @@
     </p:spTree>
     <p:extLst>
       <p:ext uri="{BB962C8B-B14F-4D97-AF65-F5344CB8AC3E}">
-        <p14:creationId xmlns="" xmlns:p14="http://schemas.microsoft.com/office/powerpoint/2010/main" val="2092776985"/>
+        <p14:creationId xmlns:p14="http://schemas.microsoft.com/office/powerpoint/2010/main" val="2092776985"/>
       </p:ext>
     </p:extLst>
   </p:cSld>
@@ -18151,7 +18245,7 @@
           <a:blip r:embed="rId2" cstate="print">
             <a:extLst>
               <a:ext uri="{28A0092B-C50C-407E-A947-70E740481C1C}">
-                <a14:useLocalDpi xmlns="" xmlns:a14="http://schemas.microsoft.com/office/drawing/2010/main" val="0"/>
+                <a14:useLocalDpi xmlns:a14="http://schemas.microsoft.com/office/drawing/2010/main" val="0"/>
               </a:ext>
             </a:extLst>
           </a:blip>
@@ -18287,7 +18381,7 @@
     </p:spTree>
     <p:extLst>
       <p:ext uri="{BB962C8B-B14F-4D97-AF65-F5344CB8AC3E}">
-        <p14:creationId xmlns="" xmlns:p14="http://schemas.microsoft.com/office/powerpoint/2010/main" val="318706902"/>
+        <p14:creationId xmlns:p14="http://schemas.microsoft.com/office/powerpoint/2010/main" val="318706902"/>
       </p:ext>
     </p:extLst>
   </p:cSld>
@@ -18370,7 +18464,7 @@
           <p:nvPr>
             <p:extLst>
               <p:ext uri="{D42A27DB-BD31-4B8C-83A1-F6EECF244321}">
-                <p14:modId xmlns="" xmlns:p14="http://schemas.microsoft.com/office/powerpoint/2010/main" val="3075550189"/>
+                <p14:modId xmlns:p14="http://schemas.microsoft.com/office/powerpoint/2010/main" val="3075550189"/>
               </p:ext>
             </p:extLst>
           </p:nvPr>
@@ -18741,7 +18835,7 @@
           <a:blip r:embed="rId3" cstate="print">
             <a:extLst>
               <a:ext uri="{28A0092B-C50C-407E-A947-70E740481C1C}">
-                <a14:useLocalDpi xmlns="" xmlns:a14="http://schemas.microsoft.com/office/drawing/2010/main" val="0"/>
+                <a14:useLocalDpi xmlns:a14="http://schemas.microsoft.com/office/drawing/2010/main" val="0"/>
               </a:ext>
             </a:extLst>
           </a:blip>
@@ -18771,7 +18865,7 @@
           <a:blip r:embed="rId4" cstate="print">
             <a:extLst>
               <a:ext uri="{28A0092B-C50C-407E-A947-70E740481C1C}">
-                <a14:useLocalDpi xmlns="" xmlns:a14="http://schemas.microsoft.com/office/drawing/2010/main" val="0"/>
+                <a14:useLocalDpi xmlns:a14="http://schemas.microsoft.com/office/drawing/2010/main" val="0"/>
               </a:ext>
             </a:extLst>
           </a:blip>
@@ -18801,7 +18895,7 @@
           <a:blip r:embed="rId5" cstate="print">
             <a:extLst>
               <a:ext uri="{28A0092B-C50C-407E-A947-70E740481C1C}">
-                <a14:useLocalDpi xmlns="" xmlns:a14="http://schemas.microsoft.com/office/drawing/2010/main" val="0"/>
+                <a14:useLocalDpi xmlns:a14="http://schemas.microsoft.com/office/drawing/2010/main" val="0"/>
               </a:ext>
             </a:extLst>
           </a:blip>
@@ -18831,7 +18925,7 @@
           <a:blip r:embed="rId6" cstate="print">
             <a:extLst>
               <a:ext uri="{28A0092B-C50C-407E-A947-70E740481C1C}">
-                <a14:useLocalDpi xmlns="" xmlns:a14="http://schemas.microsoft.com/office/drawing/2010/main" val="0"/>
+                <a14:useLocalDpi xmlns:a14="http://schemas.microsoft.com/office/drawing/2010/main" val="0"/>
               </a:ext>
             </a:extLst>
           </a:blip>
@@ -18861,7 +18955,7 @@
           <a:blip r:embed="rId7" cstate="print">
             <a:extLst>
               <a:ext uri="{28A0092B-C50C-407E-A947-70E740481C1C}">
-                <a14:useLocalDpi xmlns="" xmlns:a14="http://schemas.microsoft.com/office/drawing/2010/main" val="0"/>
+                <a14:useLocalDpi xmlns:a14="http://schemas.microsoft.com/office/drawing/2010/main" val="0"/>
               </a:ext>
             </a:extLst>
           </a:blip>
@@ -18891,7 +18985,7 @@
           <a:blip r:embed="rId8" cstate="print">
             <a:extLst>
               <a:ext uri="{28A0092B-C50C-407E-A947-70E740481C1C}">
-                <a14:useLocalDpi xmlns="" xmlns:a14="http://schemas.microsoft.com/office/drawing/2010/main" val="0"/>
+                <a14:useLocalDpi xmlns:a14="http://schemas.microsoft.com/office/drawing/2010/main" val="0"/>
               </a:ext>
             </a:extLst>
           </a:blip>
@@ -18912,7 +19006,7 @@
     </p:spTree>
     <p:extLst>
       <p:ext uri="{BB962C8B-B14F-4D97-AF65-F5344CB8AC3E}">
-        <p14:creationId xmlns="" xmlns:p14="http://schemas.microsoft.com/office/powerpoint/2010/main" val="949325302"/>
+        <p14:creationId xmlns:p14="http://schemas.microsoft.com/office/powerpoint/2010/main" val="949325302"/>
       </p:ext>
     </p:extLst>
   </p:cSld>
@@ -19418,7 +19512,7 @@
     </p:spTree>
     <p:extLst>
       <p:ext uri="{BB962C8B-B14F-4D97-AF65-F5344CB8AC3E}">
-        <p14:creationId xmlns="" xmlns:p14="http://schemas.microsoft.com/office/powerpoint/2010/main" val="2834344091"/>
+        <p14:creationId xmlns:p14="http://schemas.microsoft.com/office/powerpoint/2010/main" val="2834344091"/>
       </p:ext>
     </p:extLst>
   </p:cSld>
@@ -19757,7 +19851,7 @@
           <a:blip r:embed="rId2" cstate="print">
             <a:extLst>
               <a:ext uri="{28A0092B-C50C-407E-A947-70E740481C1C}">
-                <a14:useLocalDpi xmlns="" xmlns:a14="http://schemas.microsoft.com/office/drawing/2010/main" val="0"/>
+                <a14:useLocalDpi xmlns:a14="http://schemas.microsoft.com/office/drawing/2010/main" val="0"/>
               </a:ext>
             </a:extLst>
           </a:blip>
@@ -19767,8 +19861,8 @@
         </p:blipFill>
         <p:spPr>
           <a:xfrm>
-            <a:off x="335824" y="76200"/>
-            <a:ext cx="4312376" cy="6553200"/>
+            <a:off x="335824" y="423586"/>
+            <a:ext cx="4083776" cy="6205813"/>
           </a:xfrm>
           <a:prstGeom prst="rect">
             <a:avLst/>
@@ -19814,7 +19908,7 @@
           <p:nvPr>
             <p:extLst>
               <p:ext uri="{D42A27DB-BD31-4B8C-83A1-F6EECF244321}">
-                <p14:modId xmlns="" xmlns:p14="http://schemas.microsoft.com/office/powerpoint/2010/main" val="3204736979"/>
+                <p14:modId xmlns:p14="http://schemas.microsoft.com/office/powerpoint/2010/main" val="3204736979"/>
               </p:ext>
             </p:extLst>
           </p:nvPr>
@@ -20146,7 +20240,7 @@
     </p:spTree>
     <p:extLst>
       <p:ext uri="{BB962C8B-B14F-4D97-AF65-F5344CB8AC3E}">
-        <p14:creationId xmlns="" xmlns:p14="http://schemas.microsoft.com/office/powerpoint/2010/main" val="3195513628"/>
+        <p14:creationId xmlns:p14="http://schemas.microsoft.com/office/powerpoint/2010/main" val="3195513628"/>
       </p:ext>
     </p:extLst>
   </p:cSld>
@@ -20231,17 +20325,12 @@
               <a:rPr lang="en-US" dirty="0" smtClean="0"/>
               <a:t>Field inputs</a:t>
             </a:r>
-            <a:endParaRPr lang="en-US" dirty="0" smtClean="0"/>
           </a:p>
           <a:p>
             <a:pPr lvl="1"/>
             <a:r>
               <a:rPr lang="en-US" dirty="0" smtClean="0"/>
-              <a:t>Field validation </a:t>
-            </a:r>
-            <a:r>
-              <a:rPr lang="en-US" dirty="0" smtClean="0"/>
-              <a:t>errors</a:t>
+              <a:t>Field validation errors</a:t>
             </a:r>
           </a:p>
           <a:p>
@@ -20250,7 +20339,6 @@
               <a:rPr lang="en-US" dirty="0" smtClean="0"/>
               <a:t>Screen and block navigation</a:t>
             </a:r>
-            <a:endParaRPr lang="en-US" dirty="0" smtClean="0"/>
           </a:p>
           <a:p>
             <a:endParaRPr lang="en-US" dirty="0" smtClean="0"/>
@@ -20290,7 +20378,7 @@
     </p:spTree>
     <p:extLst>
       <p:ext uri="{BB962C8B-B14F-4D97-AF65-F5344CB8AC3E}">
-        <p14:creationId xmlns="" xmlns:p14="http://schemas.microsoft.com/office/powerpoint/2010/main" val="2674396190"/>
+        <p14:creationId xmlns:p14="http://schemas.microsoft.com/office/powerpoint/2010/main" val="2674396190"/>
       </p:ext>
     </p:extLst>
   </p:cSld>
@@ -20432,7 +20520,7 @@
     </p:spTree>
     <p:extLst>
       <p:ext uri="{BB962C8B-B14F-4D97-AF65-F5344CB8AC3E}">
-        <p14:creationId xmlns="" xmlns:p14="http://schemas.microsoft.com/office/powerpoint/2010/main" val="2713826086"/>
+        <p14:creationId xmlns:p14="http://schemas.microsoft.com/office/powerpoint/2010/main" val="2713826086"/>
       </p:ext>
     </p:extLst>
   </p:cSld>
@@ -20624,7 +20712,7 @@
     </p:spTree>
     <p:extLst>
       <p:ext uri="{BB962C8B-B14F-4D97-AF65-F5344CB8AC3E}">
-        <p14:creationId xmlns="" xmlns:p14="http://schemas.microsoft.com/office/powerpoint/2010/main" val="714747940"/>
+        <p14:creationId xmlns:p14="http://schemas.microsoft.com/office/powerpoint/2010/main" val="714747940"/>
       </p:ext>
     </p:extLst>
   </p:cSld>
@@ -21163,7 +21251,7 @@
     </p:spTree>
     <p:extLst>
       <p:ext uri="{BB962C8B-B14F-4D97-AF65-F5344CB8AC3E}">
-        <p14:creationId xmlns="" xmlns:p14="http://schemas.microsoft.com/office/powerpoint/2010/main" val="3760395846"/>
+        <p14:creationId xmlns:p14="http://schemas.microsoft.com/office/powerpoint/2010/main" val="3760395846"/>
       </p:ext>
     </p:extLst>
   </p:cSld>
@@ -21996,7 +22084,7 @@
     </p:spTree>
     <p:extLst>
       <p:ext uri="{BB962C8B-B14F-4D97-AF65-F5344CB8AC3E}">
-        <p14:creationId xmlns="" xmlns:p14="http://schemas.microsoft.com/office/powerpoint/2010/main" val="1422967000"/>
+        <p14:creationId xmlns:p14="http://schemas.microsoft.com/office/powerpoint/2010/main" val="1422967000"/>
       </p:ext>
     </p:extLst>
   </p:cSld>
@@ -22147,7 +22235,7 @@
     </p:spTree>
     <p:extLst>
       <p:ext uri="{BB962C8B-B14F-4D97-AF65-F5344CB8AC3E}">
-        <p14:creationId xmlns="" xmlns:p14="http://schemas.microsoft.com/office/powerpoint/2010/main" val="2654585083"/>
+        <p14:creationId xmlns:p14="http://schemas.microsoft.com/office/powerpoint/2010/main" val="2654585083"/>
       </p:ext>
     </p:extLst>
   </p:cSld>
@@ -22307,7 +22395,7 @@
     </p:spTree>
     <p:extLst>
       <p:ext uri="{BB962C8B-B14F-4D97-AF65-F5344CB8AC3E}">
-        <p14:creationId xmlns="" xmlns:p14="http://schemas.microsoft.com/office/powerpoint/2010/main" val="1683021932"/>
+        <p14:creationId xmlns:p14="http://schemas.microsoft.com/office/powerpoint/2010/main" val="1683021932"/>
       </p:ext>
     </p:extLst>
   </p:cSld>
@@ -22381,7 +22469,7 @@
           <a:blip r:embed="rId2" cstate="print">
             <a:extLst>
               <a:ext uri="{28A0092B-C50C-407E-A947-70E740481C1C}">
-                <a14:useLocalDpi xmlns="" xmlns:a14="http://schemas.microsoft.com/office/drawing/2010/main" val="0"/>
+                <a14:useLocalDpi xmlns:a14="http://schemas.microsoft.com/office/drawing/2010/main" val="0"/>
               </a:ext>
             </a:extLst>
           </a:blip>
@@ -23017,7 +23105,7 @@
     </p:spTree>
     <p:extLst>
       <p:ext uri="{BB962C8B-B14F-4D97-AF65-F5344CB8AC3E}">
-        <p14:creationId xmlns="" xmlns:p14="http://schemas.microsoft.com/office/powerpoint/2010/main" val="3007787296"/>
+        <p14:creationId xmlns:p14="http://schemas.microsoft.com/office/powerpoint/2010/main" val="3007787296"/>
       </p:ext>
     </p:extLst>
   </p:cSld>
@@ -23417,7 +23505,7 @@
     </p:spTree>
     <p:extLst>
       <p:ext uri="{BB962C8B-B14F-4D97-AF65-F5344CB8AC3E}">
-        <p14:creationId xmlns="" xmlns:p14="http://schemas.microsoft.com/office/powerpoint/2010/main" val="13878138"/>
+        <p14:creationId xmlns:p14="http://schemas.microsoft.com/office/powerpoint/2010/main" val="13878138"/>
       </p:ext>
     </p:extLst>
   </p:cSld>
@@ -23787,7 +23875,7 @@
     </p:spTree>
     <p:extLst>
       <p:ext uri="{BB962C8B-B14F-4D97-AF65-F5344CB8AC3E}">
-        <p14:creationId xmlns="" xmlns:p14="http://schemas.microsoft.com/office/powerpoint/2010/main" val="40929930"/>
+        <p14:creationId xmlns:p14="http://schemas.microsoft.com/office/powerpoint/2010/main" val="40929930"/>
       </p:ext>
     </p:extLst>
   </p:cSld>
@@ -23844,29 +23932,40 @@
           </a:p>
         </p:txBody>
       </p:sp>
-      <p:sp>
-        <p:nvSpPr>
-          <p:cNvPr id="3" name="Espace réservé du contenu 2"/>
-          <p:cNvSpPr>
-            <a:spLocks noGrp="1"/>
-          </p:cNvSpPr>
-          <p:nvPr>
-            <p:ph idx="1"/>
-          </p:nvPr>
-        </p:nvSpPr>
-        <p:spPr/>
-        <p:txBody>
-          <a:bodyPr/>
-          <a:lstStyle/>
-          <a:p>
-            <a:endParaRPr lang="en-US" dirty="0"/>
-          </a:p>
-        </p:txBody>
-      </p:sp>
+      <p:pic>
+        <p:nvPicPr>
+          <p:cNvPr id="4" name="Image 3"/>
+          <p:cNvPicPr>
+            <a:picLocks noChangeAspect="1"/>
+          </p:cNvPicPr>
+          <p:nvPr/>
+        </p:nvPicPr>
+        <p:blipFill>
+          <a:blip r:embed="rId2" cstate="print">
+            <a:extLst>
+              <a:ext uri="{28A0092B-C50C-407E-A947-70E740481C1C}">
+                <a14:useLocalDpi xmlns:a14="http://schemas.microsoft.com/office/drawing/2010/main" val="0"/>
+              </a:ext>
+            </a:extLst>
+          </a:blip>
+          <a:stretch>
+            <a:fillRect/>
+          </a:stretch>
+        </p:blipFill>
+        <p:spPr>
+          <a:xfrm>
+            <a:off x="609600" y="1371600"/>
+            <a:ext cx="8153400" cy="5246712"/>
+          </a:xfrm>
+          <a:prstGeom prst="rect">
+            <a:avLst/>
+          </a:prstGeom>
+        </p:spPr>
+      </p:pic>
     </p:spTree>
     <p:extLst>
       <p:ext uri="{BB962C8B-B14F-4D97-AF65-F5344CB8AC3E}">
-        <p14:creationId xmlns="" xmlns:p14="http://schemas.microsoft.com/office/powerpoint/2010/main" val="1336479164"/>
+        <p14:creationId xmlns:p14="http://schemas.microsoft.com/office/powerpoint/2010/main" val="1336479164"/>
       </p:ext>
     </p:extLst>
   </p:cSld>
@@ -23972,7 +24071,7 @@
     </p:spTree>
     <p:extLst>
       <p:ext uri="{BB962C8B-B14F-4D97-AF65-F5344CB8AC3E}">
-        <p14:creationId xmlns="" xmlns:p14="http://schemas.microsoft.com/office/powerpoint/2010/main" val="4014343169"/>
+        <p14:creationId xmlns:p14="http://schemas.microsoft.com/office/powerpoint/2010/main" val="4014343169"/>
       </p:ext>
     </p:extLst>
   </p:cSld>
@@ -24123,7 +24222,7 @@
     </p:spTree>
     <p:extLst>
       <p:ext uri="{BB962C8B-B14F-4D97-AF65-F5344CB8AC3E}">
-        <p14:creationId xmlns="" xmlns:p14="http://schemas.microsoft.com/office/powerpoint/2010/main" val="2781303602"/>
+        <p14:creationId xmlns:p14="http://schemas.microsoft.com/office/powerpoint/2010/main" val="2781303602"/>
       </p:ext>
     </p:extLst>
   </p:cSld>
@@ -24310,7 +24409,7 @@
     </p:spTree>
     <p:extLst>
       <p:ext uri="{BB962C8B-B14F-4D97-AF65-F5344CB8AC3E}">
-        <p14:creationId xmlns="" xmlns:p14="http://schemas.microsoft.com/office/powerpoint/2010/main" val="4255503392"/>
+        <p14:creationId xmlns:p14="http://schemas.microsoft.com/office/powerpoint/2010/main" val="4255503392"/>
       </p:ext>
     </p:extLst>
   </p:cSld>
@@ -24470,7 +24569,7 @@
     </p:spTree>
     <p:extLst>
       <p:ext uri="{BB962C8B-B14F-4D97-AF65-F5344CB8AC3E}">
-        <p14:creationId xmlns="" xmlns:p14="http://schemas.microsoft.com/office/powerpoint/2010/main" val="2375505937"/>
+        <p14:creationId xmlns:p14="http://schemas.microsoft.com/office/powerpoint/2010/main" val="2375505937"/>
       </p:ext>
     </p:extLst>
   </p:cSld>
@@ -24601,18 +24700,18 @@
     </p:spTree>
     <p:extLst>
       <p:ext uri="{BB962C8B-B14F-4D97-AF65-F5344CB8AC3E}">
-        <p14:creationId xmlns="" xmlns:p14="http://schemas.microsoft.com/office/powerpoint/2010/main" val="1618189430"/>
+        <p14:creationId xmlns:p14="http://schemas.microsoft.com/office/powerpoint/2010/main" val="1618189430"/>
       </p:ext>
     </p:extLst>
   </p:cSld>
   <p:clrMapOvr>
     <a:masterClrMapping/>
   </p:clrMapOvr>
-  <mc:AlternateContent xmlns:mc="http://schemas.openxmlformats.org/markup-compatibility/2006">
-    <mc:Choice xmlns="" xmlns:p14="http://schemas.microsoft.com/office/powerpoint/2010/main" Requires="p14">
+  <mc:AlternateContent xmlns:mc="http://schemas.openxmlformats.org/markup-compatibility/2006" xmlns:p14="http://schemas.microsoft.com/office/powerpoint/2010/main">
+    <mc:Choice Requires="p14">
       <p:transition spd="slow" p14:dur="2000"/>
     </mc:Choice>
-    <mc:Fallback>
+    <mc:Fallback xmlns="">
       <p:transition spd="slow"/>
     </mc:Fallback>
   </mc:AlternateContent>

</xml_diff>

<commit_message>
update slides with screenshot with new group rendering
</commit_message>
<xml_diff>
--- a/mdl4ui-docs/mdl4ui_cg2013.pptx
+++ b/mdl4ui-docs/mdl4ui_cg2013.pptx
@@ -335,7 +335,7 @@
     </p:spTree>
     <p:extLst>
       <p:ext uri="{BB962C8B-B14F-4D97-AF65-F5344CB8AC3E}">
-        <p14:creationId xmlns="" xmlns:p14="http://schemas.microsoft.com/office/powerpoint/2010/main" val="70803672"/>
+        <p14:creationId xmlns:p14="http://schemas.microsoft.com/office/powerpoint/2010/main" xmlns="" val="70803672"/>
       </p:ext>
     </p:extLst>
   </p:cSld>
@@ -595,7 +595,7 @@
     </p:spTree>
     <p:extLst>
       <p:ext uri="{BB962C8B-B14F-4D97-AF65-F5344CB8AC3E}">
-        <p14:creationId xmlns="" xmlns:p14="http://schemas.microsoft.com/office/powerpoint/2010/main" val="1701488114"/>
+        <p14:creationId xmlns:p14="http://schemas.microsoft.com/office/powerpoint/2010/main" xmlns="" val="1701488114"/>
       </p:ext>
     </p:extLst>
   </p:cSld>
@@ -770,7 +770,7 @@
     </p:spTree>
     <p:extLst>
       <p:ext uri="{BB962C8B-B14F-4D97-AF65-F5344CB8AC3E}">
-        <p14:creationId xmlns="" xmlns:p14="http://schemas.microsoft.com/office/powerpoint/2010/main" val="2091590988"/>
+        <p14:creationId xmlns:p14="http://schemas.microsoft.com/office/powerpoint/2010/main" xmlns="" val="2091590988"/>
       </p:ext>
     </p:extLst>
   </p:cSld>
@@ -855,7 +855,7 @@
     </p:spTree>
     <p:extLst>
       <p:ext uri="{BB962C8B-B14F-4D97-AF65-F5344CB8AC3E}">
-        <p14:creationId xmlns="" xmlns:p14="http://schemas.microsoft.com/office/powerpoint/2010/main" val="3047004223"/>
+        <p14:creationId xmlns:p14="http://schemas.microsoft.com/office/powerpoint/2010/main" xmlns="" val="3047004223"/>
       </p:ext>
     </p:extLst>
   </p:cSld>
@@ -940,7 +940,7 @@
     </p:spTree>
     <p:extLst>
       <p:ext uri="{BB962C8B-B14F-4D97-AF65-F5344CB8AC3E}">
-        <p14:creationId xmlns="" xmlns:p14="http://schemas.microsoft.com/office/powerpoint/2010/main" val="3280979232"/>
+        <p14:creationId xmlns:p14="http://schemas.microsoft.com/office/powerpoint/2010/main" xmlns="" val="3280979232"/>
       </p:ext>
     </p:extLst>
   </p:cSld>
@@ -1025,7 +1025,7 @@
     </p:spTree>
     <p:extLst>
       <p:ext uri="{BB962C8B-B14F-4D97-AF65-F5344CB8AC3E}">
-        <p14:creationId xmlns="" xmlns:p14="http://schemas.microsoft.com/office/powerpoint/2010/main" val="1987381696"/>
+        <p14:creationId xmlns:p14="http://schemas.microsoft.com/office/powerpoint/2010/main" xmlns="" val="1987381696"/>
       </p:ext>
     </p:extLst>
   </p:cSld>
@@ -1351,7 +1351,7 @@
     </p:spTree>
     <p:extLst>
       <p:ext uri="{BB962C8B-B14F-4D97-AF65-F5344CB8AC3E}">
-        <p14:creationId xmlns="" xmlns:p14="http://schemas.microsoft.com/office/powerpoint/2010/main" val="322609761"/>
+        <p14:creationId xmlns:p14="http://schemas.microsoft.com/office/powerpoint/2010/main" xmlns="" val="322609761"/>
       </p:ext>
     </p:extLst>
   </p:cSld>
@@ -1523,7 +1523,7 @@
     </p:spTree>
     <p:extLst>
       <p:ext uri="{BB962C8B-B14F-4D97-AF65-F5344CB8AC3E}">
-        <p14:creationId xmlns="" xmlns:p14="http://schemas.microsoft.com/office/powerpoint/2010/main" val="1248456722"/>
+        <p14:creationId xmlns:p14="http://schemas.microsoft.com/office/powerpoint/2010/main" xmlns="" val="1248456722"/>
       </p:ext>
     </p:extLst>
   </p:cSld>
@@ -1705,7 +1705,7 @@
     </p:spTree>
     <p:extLst>
       <p:ext uri="{BB962C8B-B14F-4D97-AF65-F5344CB8AC3E}">
-        <p14:creationId xmlns="" xmlns:p14="http://schemas.microsoft.com/office/powerpoint/2010/main" val="4236232986"/>
+        <p14:creationId xmlns:p14="http://schemas.microsoft.com/office/powerpoint/2010/main" xmlns="" val="4236232986"/>
       </p:ext>
     </p:extLst>
   </p:cSld>
@@ -1877,7 +1877,7 @@
     </p:spTree>
     <p:extLst>
       <p:ext uri="{BB962C8B-B14F-4D97-AF65-F5344CB8AC3E}">
-        <p14:creationId xmlns="" xmlns:p14="http://schemas.microsoft.com/office/powerpoint/2010/main" val="3454835055"/>
+        <p14:creationId xmlns:p14="http://schemas.microsoft.com/office/powerpoint/2010/main" xmlns="" val="3454835055"/>
       </p:ext>
     </p:extLst>
   </p:cSld>
@@ -2132,7 +2132,7 @@
     </p:spTree>
     <p:extLst>
       <p:ext uri="{BB962C8B-B14F-4D97-AF65-F5344CB8AC3E}">
-        <p14:creationId xmlns="" xmlns:p14="http://schemas.microsoft.com/office/powerpoint/2010/main" val="804127244"/>
+        <p14:creationId xmlns:p14="http://schemas.microsoft.com/office/powerpoint/2010/main" xmlns="" val="804127244"/>
       </p:ext>
     </p:extLst>
   </p:cSld>
@@ -2422,7 +2422,7 @@
     </p:spTree>
     <p:extLst>
       <p:ext uri="{BB962C8B-B14F-4D97-AF65-F5344CB8AC3E}">
-        <p14:creationId xmlns="" xmlns:p14="http://schemas.microsoft.com/office/powerpoint/2010/main" val="586698658"/>
+        <p14:creationId xmlns:p14="http://schemas.microsoft.com/office/powerpoint/2010/main" xmlns="" val="586698658"/>
       </p:ext>
     </p:extLst>
   </p:cSld>
@@ -2846,7 +2846,7 @@
     </p:spTree>
     <p:extLst>
       <p:ext uri="{BB962C8B-B14F-4D97-AF65-F5344CB8AC3E}">
-        <p14:creationId xmlns="" xmlns:p14="http://schemas.microsoft.com/office/powerpoint/2010/main" val="19144436"/>
+        <p14:creationId xmlns:p14="http://schemas.microsoft.com/office/powerpoint/2010/main" xmlns="" val="19144436"/>
       </p:ext>
     </p:extLst>
   </p:cSld>
@@ -2966,7 +2966,7 @@
     </p:spTree>
     <p:extLst>
       <p:ext uri="{BB962C8B-B14F-4D97-AF65-F5344CB8AC3E}">
-        <p14:creationId xmlns="" xmlns:p14="http://schemas.microsoft.com/office/powerpoint/2010/main" val="202749597"/>
+        <p14:creationId xmlns:p14="http://schemas.microsoft.com/office/powerpoint/2010/main" xmlns="" val="202749597"/>
       </p:ext>
     </p:extLst>
   </p:cSld>
@@ -3063,7 +3063,7 @@
     </p:spTree>
     <p:extLst>
       <p:ext uri="{BB962C8B-B14F-4D97-AF65-F5344CB8AC3E}">
-        <p14:creationId xmlns="" xmlns:p14="http://schemas.microsoft.com/office/powerpoint/2010/main" val="2898363528"/>
+        <p14:creationId xmlns:p14="http://schemas.microsoft.com/office/powerpoint/2010/main" xmlns="" val="2898363528"/>
       </p:ext>
     </p:extLst>
   </p:cSld>
@@ -3342,7 +3342,7 @@
     </p:spTree>
     <p:extLst>
       <p:ext uri="{BB962C8B-B14F-4D97-AF65-F5344CB8AC3E}">
-        <p14:creationId xmlns="" xmlns:p14="http://schemas.microsoft.com/office/powerpoint/2010/main" val="4010598191"/>
+        <p14:creationId xmlns:p14="http://schemas.microsoft.com/office/powerpoint/2010/main" xmlns="" val="4010598191"/>
       </p:ext>
     </p:extLst>
   </p:cSld>
@@ -3597,7 +3597,7 @@
     </p:spTree>
     <p:extLst>
       <p:ext uri="{BB962C8B-B14F-4D97-AF65-F5344CB8AC3E}">
-        <p14:creationId xmlns="" xmlns:p14="http://schemas.microsoft.com/office/powerpoint/2010/main" val="1433498939"/>
+        <p14:creationId xmlns:p14="http://schemas.microsoft.com/office/powerpoint/2010/main" xmlns="" val="1433498939"/>
       </p:ext>
     </p:extLst>
   </p:cSld>
@@ -3857,7 +3857,7 @@
           <a:blip r:embed="rId13" cstate="print">
             <a:extLst>
               <a:ext uri="{28A0092B-C50C-407E-A947-70E740481C1C}">
-                <a14:useLocalDpi xmlns="" xmlns:a14="http://schemas.microsoft.com/office/drawing/2010/main" val="0"/>
+                <a14:useLocalDpi xmlns:a14="http://schemas.microsoft.com/office/drawing/2010/main" xmlns="" val="0"/>
               </a:ext>
             </a:extLst>
           </a:blip>
@@ -3878,7 +3878,7 @@
     </p:spTree>
     <p:extLst>
       <p:ext uri="{BB962C8B-B14F-4D97-AF65-F5344CB8AC3E}">
-        <p14:creationId xmlns="" xmlns:p14="http://schemas.microsoft.com/office/powerpoint/2010/main" val="2684825788"/>
+        <p14:creationId xmlns:p14="http://schemas.microsoft.com/office/powerpoint/2010/main" xmlns="" val="2684825788"/>
       </p:ext>
     </p:extLst>
   </p:cSld>
@@ -4249,7 +4249,7 @@
     </p:spTree>
     <p:extLst>
       <p:ext uri="{BB962C8B-B14F-4D97-AF65-F5344CB8AC3E}">
-        <p14:creationId xmlns="" xmlns:p14="http://schemas.microsoft.com/office/powerpoint/2010/main" val="3955344790"/>
+        <p14:creationId xmlns:p14="http://schemas.microsoft.com/office/powerpoint/2010/main" xmlns="" val="3955344790"/>
       </p:ext>
     </p:extLst>
   </p:cSld>
@@ -4257,7 +4257,7 @@
     <a:masterClrMapping/>
   </p:clrMapOvr>
   <mc:AlternateContent xmlns:mc="http://schemas.openxmlformats.org/markup-compatibility/2006">
-    <mc:Choice xmlns="" xmlns:p14="http://schemas.microsoft.com/office/powerpoint/2010/main" Requires="p14">
+    <mc:Choice xmlns:p14="http://schemas.microsoft.com/office/powerpoint/2010/main" xmlns="" Requires="p14">
       <p:transition spd="slow" p14:dur="2000"/>
     </mc:Choice>
     <mc:Fallback>
@@ -4430,7 +4430,7 @@
     </p:spTree>
     <p:extLst>
       <p:ext uri="{BB962C8B-B14F-4D97-AF65-F5344CB8AC3E}">
-        <p14:creationId xmlns="" xmlns:p14="http://schemas.microsoft.com/office/powerpoint/2010/main" val="3644490438"/>
+        <p14:creationId xmlns:p14="http://schemas.microsoft.com/office/powerpoint/2010/main" xmlns="" val="3644490438"/>
       </p:ext>
     </p:extLst>
   </p:cSld>
@@ -5047,111 +5047,6 @@
       </p:sp>
       <p:grpSp>
         <p:nvGrpSpPr>
-          <p:cNvPr id="36" name="Groupe 35"/>
-          <p:cNvGrpSpPr/>
-          <p:nvPr/>
-        </p:nvGrpSpPr>
-        <p:grpSpPr>
-          <a:xfrm>
-            <a:off x="228600" y="1418944"/>
-            <a:ext cx="8228471" cy="4830728"/>
-            <a:chOff x="228600" y="1418944"/>
-            <a:chExt cx="8228471" cy="4830728"/>
-          </a:xfrm>
-        </p:grpSpPr>
-        <p:pic>
-          <p:nvPicPr>
-            <p:cNvPr id="4" name="Image 3"/>
-            <p:cNvPicPr>
-              <a:picLocks noChangeAspect="1"/>
-            </p:cNvPicPr>
-            <p:nvPr/>
-          </p:nvPicPr>
-          <p:blipFill>
-            <a:blip r:embed="rId2" cstate="print">
-              <a:extLst>
-                <a:ext uri="{28A0092B-C50C-407E-A947-70E740481C1C}">
-                  <a14:useLocalDpi xmlns="" xmlns:a14="http://schemas.microsoft.com/office/drawing/2010/main" val="0"/>
-                </a:ext>
-              </a:extLst>
-            </a:blip>
-            <a:stretch>
-              <a:fillRect/>
-            </a:stretch>
-          </p:blipFill>
-          <p:spPr>
-            <a:xfrm>
-              <a:off x="610729" y="1418944"/>
-              <a:ext cx="5561471" cy="2814078"/>
-            </a:xfrm>
-            <a:prstGeom prst="rect">
-              <a:avLst/>
-            </a:prstGeom>
-          </p:spPr>
-        </p:pic>
-        <p:pic>
-          <p:nvPicPr>
-            <p:cNvPr id="7" name="Image 6"/>
-            <p:cNvPicPr>
-              <a:picLocks noChangeAspect="1"/>
-            </p:cNvPicPr>
-            <p:nvPr/>
-          </p:nvPicPr>
-          <p:blipFill>
-            <a:blip r:embed="rId3" cstate="print">
-              <a:extLst>
-                <a:ext uri="{28A0092B-C50C-407E-A947-70E740481C1C}">
-                  <a14:useLocalDpi xmlns="" xmlns:a14="http://schemas.microsoft.com/office/drawing/2010/main" val="0"/>
-                </a:ext>
-              </a:extLst>
-            </a:blip>
-            <a:stretch>
-              <a:fillRect/>
-            </a:stretch>
-          </p:blipFill>
-          <p:spPr>
-            <a:xfrm>
-              <a:off x="228600" y="3962400"/>
-              <a:ext cx="3974385" cy="2287272"/>
-            </a:xfrm>
-            <a:prstGeom prst="rect">
-              <a:avLst/>
-            </a:prstGeom>
-          </p:spPr>
-        </p:pic>
-        <p:pic>
-          <p:nvPicPr>
-            <p:cNvPr id="5" name="Image 4"/>
-            <p:cNvPicPr>
-              <a:picLocks noChangeAspect="1"/>
-            </p:cNvPicPr>
-            <p:nvPr/>
-          </p:nvPicPr>
-          <p:blipFill>
-            <a:blip r:embed="rId4" cstate="print">
-              <a:extLst>
-                <a:ext uri="{28A0092B-C50C-407E-A947-70E740481C1C}">
-                  <a14:useLocalDpi xmlns="" xmlns:a14="http://schemas.microsoft.com/office/drawing/2010/main" val="0"/>
-                </a:ext>
-              </a:extLst>
-            </a:blip>
-            <a:stretch>
-              <a:fillRect/>
-            </a:stretch>
-          </p:blipFill>
-          <p:spPr>
-            <a:xfrm>
-              <a:off x="2895600" y="2618711"/>
-              <a:ext cx="5561471" cy="2487325"/>
-            </a:xfrm>
-            <a:prstGeom prst="rect">
-              <a:avLst/>
-            </a:prstGeom>
-          </p:spPr>
-        </p:pic>
-      </p:grpSp>
-      <p:grpSp>
-        <p:nvGrpSpPr>
           <p:cNvPr id="37" name="Groupe 36"/>
           <p:cNvGrpSpPr/>
           <p:nvPr/>
@@ -5159,7 +5054,7 @@
         <p:grpSpPr>
           <a:xfrm>
             <a:off x="228600" y="1295400"/>
-            <a:ext cx="8228471" cy="5105400"/>
+            <a:ext cx="8305800" cy="5410200"/>
             <a:chOff x="228600" y="1295400"/>
             <a:chExt cx="8228471" cy="5105400"/>
           </a:xfrm>
@@ -5251,10 +5146,111 @@
           </p:txBody>
         </p:sp>
       </p:grpSp>
+      <p:grpSp>
+        <p:nvGrpSpPr>
+          <p:cNvPr id="12" name="Groupe 11"/>
+          <p:cNvGrpSpPr/>
+          <p:nvPr/>
+        </p:nvGrpSpPr>
+        <p:grpSpPr>
+          <a:xfrm>
+            <a:off x="304800" y="1371600"/>
+            <a:ext cx="8153400" cy="5306725"/>
+            <a:chOff x="304800" y="1371600"/>
+            <a:chExt cx="8153400" cy="5306725"/>
+          </a:xfrm>
+        </p:grpSpPr>
+        <p:pic>
+          <p:nvPicPr>
+            <p:cNvPr id="4" name="Image 3"/>
+            <p:cNvPicPr>
+              <a:picLocks noChangeAspect="1"/>
+            </p:cNvPicPr>
+            <p:nvPr/>
+          </p:nvPicPr>
+          <p:blipFill>
+            <a:blip r:embed="rId2" cstate="print">
+              <a:extLst>
+                <a:ext uri="{28A0092B-C50C-407E-A947-70E740481C1C}">
+                  <a14:useLocalDpi xmlns:a14="http://schemas.microsoft.com/office/drawing/2010/main" xmlns="" val="0"/>
+                </a:ext>
+              </a:extLst>
+            </a:blip>
+            <a:stretch>
+              <a:fillRect/>
+            </a:stretch>
+          </p:blipFill>
+          <p:spPr>
+            <a:xfrm>
+              <a:off x="686929" y="1371600"/>
+              <a:ext cx="5561471" cy="2814078"/>
+            </a:xfrm>
+            <a:prstGeom prst="rect">
+              <a:avLst/>
+            </a:prstGeom>
+          </p:spPr>
+        </p:pic>
+        <p:pic>
+          <p:nvPicPr>
+            <p:cNvPr id="5" name="Image 4"/>
+            <p:cNvPicPr>
+              <a:picLocks noChangeAspect="1"/>
+            </p:cNvPicPr>
+            <p:nvPr/>
+          </p:nvPicPr>
+          <p:blipFill>
+            <a:blip r:embed="rId3" cstate="print">
+              <a:extLst>
+                <a:ext uri="{28A0092B-C50C-407E-A947-70E740481C1C}">
+                  <a14:useLocalDpi xmlns:a14="http://schemas.microsoft.com/office/drawing/2010/main" xmlns="" val="0"/>
+                </a:ext>
+              </a:extLst>
+            </a:blip>
+            <a:stretch>
+              <a:fillRect/>
+            </a:stretch>
+          </p:blipFill>
+          <p:spPr>
+            <a:xfrm>
+              <a:off x="304800" y="4191000"/>
+              <a:ext cx="5561471" cy="2487325"/>
+            </a:xfrm>
+            <a:prstGeom prst="rect">
+              <a:avLst/>
+            </a:prstGeom>
+          </p:spPr>
+        </p:pic>
+        <p:pic>
+          <p:nvPicPr>
+            <p:cNvPr id="2050" name="Picture 2" descr="C:\work\mdl4ui\mdl4ui-docs\my_settings_and_email_screenshot.png"/>
+            <p:cNvPicPr>
+              <a:picLocks noChangeAspect="1" noChangeArrowheads="1"/>
+            </p:cNvPicPr>
+            <p:nvPr/>
+          </p:nvPicPr>
+          <p:blipFill>
+            <a:blip r:embed="rId4" cstate="print"/>
+            <a:srcRect/>
+            <a:stretch>
+              <a:fillRect/>
+            </a:stretch>
+          </p:blipFill>
+          <p:spPr bwMode="auto">
+            <a:xfrm>
+              <a:off x="3276600" y="2432909"/>
+              <a:ext cx="5181600" cy="3183639"/>
+            </a:xfrm>
+            <a:prstGeom prst="rect">
+              <a:avLst/>
+            </a:prstGeom>
+            <a:noFill/>
+          </p:spPr>
+        </p:pic>
+      </p:grpSp>
     </p:spTree>
     <p:extLst>
       <p:ext uri="{BB962C8B-B14F-4D97-AF65-F5344CB8AC3E}">
-        <p14:creationId xmlns="" xmlns:p14="http://schemas.microsoft.com/office/powerpoint/2010/main" val="1377264780"/>
+        <p14:creationId xmlns:p14="http://schemas.microsoft.com/office/powerpoint/2010/main" xmlns="" val="1377264780"/>
       </p:ext>
     </p:extLst>
   </p:cSld>
@@ -5417,32 +5413,9 @@
           <a:chExt cx="0" cy="0"/>
         </a:xfrm>
       </p:grpSpPr>
-      <p:sp>
-        <p:nvSpPr>
-          <p:cNvPr id="2" name="Titre 1"/>
-          <p:cNvSpPr>
-            <a:spLocks noGrp="1"/>
-          </p:cNvSpPr>
-          <p:nvPr>
-            <p:ph type="title"/>
-          </p:nvPr>
-        </p:nvSpPr>
-        <p:spPr/>
-        <p:txBody>
-          <a:bodyPr/>
-          <a:lstStyle/>
-          <a:p>
-            <a:r>
-              <a:rPr lang="en-US" dirty="0" smtClean="0"/>
-              <a:t>MDL4UI model concepts</a:t>
-            </a:r>
-            <a:endParaRPr lang="en-US" dirty="0"/>
-          </a:p>
-        </p:txBody>
-      </p:sp>
       <p:pic>
         <p:nvPicPr>
-          <p:cNvPr id="4" name="Image 3"/>
+          <p:cNvPr id="17" name="Image 16"/>
           <p:cNvPicPr>
             <a:picLocks noChangeAspect="1"/>
           </p:cNvPicPr>
@@ -5452,7 +5425,7 @@
           <a:blip r:embed="rId2" cstate="print">
             <a:extLst>
               <a:ext uri="{28A0092B-C50C-407E-A947-70E740481C1C}">
-                <a14:useLocalDpi xmlns="" xmlns:a14="http://schemas.microsoft.com/office/drawing/2010/main" val="0"/>
+                <a14:useLocalDpi xmlns:a14="http://schemas.microsoft.com/office/drawing/2010/main" xmlns="" val="0"/>
               </a:ext>
             </a:extLst>
           </a:blip>
@@ -5462,7 +5435,7 @@
         </p:blipFill>
         <p:spPr>
           <a:xfrm>
-            <a:off x="610729" y="1418944"/>
+            <a:off x="686929" y="1371600"/>
             <a:ext cx="5561471" cy="2814078"/>
           </a:xfrm>
           <a:prstGeom prst="rect">
@@ -5472,7 +5445,7 @@
       </p:pic>
       <p:pic>
         <p:nvPicPr>
-          <p:cNvPr id="7" name="Image 6"/>
+          <p:cNvPr id="18" name="Image 17"/>
           <p:cNvPicPr>
             <a:picLocks noChangeAspect="1"/>
           </p:cNvPicPr>
@@ -5482,7 +5455,7 @@
           <a:blip r:embed="rId3" cstate="print">
             <a:extLst>
               <a:ext uri="{28A0092B-C50C-407E-A947-70E740481C1C}">
-                <a14:useLocalDpi xmlns="" xmlns:a14="http://schemas.microsoft.com/office/drawing/2010/main" val="0"/>
+                <a14:useLocalDpi xmlns:a14="http://schemas.microsoft.com/office/drawing/2010/main" xmlns="" val="0"/>
               </a:ext>
             </a:extLst>
           </a:blip>
@@ -5492,8 +5465,8 @@
         </p:blipFill>
         <p:spPr>
           <a:xfrm>
-            <a:off x="228600" y="3962400"/>
-            <a:ext cx="3974385" cy="2287272"/>
+            <a:off x="304800" y="4191000"/>
+            <a:ext cx="5561471" cy="2487325"/>
           </a:xfrm>
           <a:prstGeom prst="rect">
             <a:avLst/>
@@ -5502,14 +5475,37 @@
       </p:pic>
       <p:sp>
         <p:nvSpPr>
+          <p:cNvPr id="2" name="Titre 1"/>
+          <p:cNvSpPr>
+            <a:spLocks noGrp="1"/>
+          </p:cNvSpPr>
+          <p:nvPr>
+            <p:ph type="title"/>
+          </p:nvPr>
+        </p:nvSpPr>
+        <p:spPr/>
+        <p:txBody>
+          <a:bodyPr/>
+          <a:lstStyle/>
+          <a:p>
+            <a:r>
+              <a:rPr lang="en-US" dirty="0" smtClean="0"/>
+              <a:t>MDL4UI model concepts</a:t>
+            </a:r>
+            <a:endParaRPr lang="en-US" dirty="0"/>
+          </a:p>
+        </p:txBody>
+      </p:sp>
+      <p:sp>
+        <p:nvSpPr>
           <p:cNvPr id="14" name="Rectangle 13"/>
           <p:cNvSpPr/>
           <p:nvPr/>
         </p:nvSpPr>
         <p:spPr>
           <a:xfrm>
-            <a:off x="304800" y="4038601"/>
-            <a:ext cx="3898186" cy="2211072"/>
+            <a:off x="304800" y="4191000"/>
+            <a:ext cx="5562600" cy="2438400"/>
           </a:xfrm>
           <a:prstGeom prst="rect">
             <a:avLst/>
@@ -5556,8 +5552,8 @@
         </p:nvSpPr>
         <p:spPr>
           <a:xfrm>
-            <a:off x="685800" y="1447800"/>
-            <a:ext cx="5410200" cy="2514600"/>
+            <a:off x="685800" y="1371600"/>
+            <a:ext cx="5562600" cy="2743200"/>
           </a:xfrm>
           <a:prstGeom prst="rect">
             <a:avLst/>
@@ -5598,32 +5594,28 @@
       </p:sp>
       <p:pic>
         <p:nvPicPr>
-          <p:cNvPr id="5" name="Image 4"/>
+          <p:cNvPr id="19" name="Picture 2" descr="C:\work\mdl4ui\mdl4ui-docs\my_settings_and_email_screenshot.png"/>
           <p:cNvPicPr>
-            <a:picLocks noChangeAspect="1"/>
+            <a:picLocks noChangeAspect="1" noChangeArrowheads="1"/>
           </p:cNvPicPr>
           <p:nvPr/>
         </p:nvPicPr>
         <p:blipFill>
-          <a:blip r:embed="rId4" cstate="print">
-            <a:extLst>
-              <a:ext uri="{28A0092B-C50C-407E-A947-70E740481C1C}">
-                <a14:useLocalDpi xmlns="" xmlns:a14="http://schemas.microsoft.com/office/drawing/2010/main" val="0"/>
-              </a:ext>
-            </a:extLst>
-          </a:blip>
+          <a:blip r:embed="rId4" cstate="print"/>
+          <a:srcRect/>
           <a:stretch>
             <a:fillRect/>
           </a:stretch>
         </p:blipFill>
-        <p:spPr>
+        <p:spPr bwMode="auto">
           <a:xfrm>
-            <a:off x="2895600" y="2618711"/>
-            <a:ext cx="5561471" cy="2487325"/>
+            <a:off x="3276600" y="2432909"/>
+            <a:ext cx="5181600" cy="3183639"/>
           </a:xfrm>
           <a:prstGeom prst="rect">
             <a:avLst/>
           </a:prstGeom>
+          <a:noFill/>
         </p:spPr>
       </p:pic>
       <p:sp>
@@ -5634,8 +5626,8 @@
         </p:nvSpPr>
         <p:spPr>
           <a:xfrm>
-            <a:off x="2971801" y="2705100"/>
-            <a:ext cx="5410200" cy="2324100"/>
+            <a:off x="3276599" y="2438400"/>
+            <a:ext cx="5181601" cy="3200400"/>
           </a:xfrm>
           <a:prstGeom prst="rect">
             <a:avLst/>
@@ -5721,7 +5713,7 @@
     </p:spTree>
     <p:extLst>
       <p:ext uri="{BB962C8B-B14F-4D97-AF65-F5344CB8AC3E}">
-        <p14:creationId xmlns="" xmlns:p14="http://schemas.microsoft.com/office/powerpoint/2010/main" val="3336203041"/>
+        <p14:creationId xmlns:p14="http://schemas.microsoft.com/office/powerpoint/2010/main" xmlns="" val="3336203041"/>
       </p:ext>
     </p:extLst>
   </p:cSld>
@@ -6104,32 +6096,9 @@
           <a:chExt cx="0" cy="0"/>
         </a:xfrm>
       </p:grpSpPr>
-      <p:sp>
-        <p:nvSpPr>
-          <p:cNvPr id="2" name="Titre 1"/>
-          <p:cNvSpPr>
-            <a:spLocks noGrp="1"/>
-          </p:cNvSpPr>
-          <p:nvPr>
-            <p:ph type="title"/>
-          </p:nvPr>
-        </p:nvSpPr>
-        <p:spPr/>
-        <p:txBody>
-          <a:bodyPr/>
-          <a:lstStyle/>
-          <a:p>
-            <a:r>
-              <a:rPr lang="en-US" dirty="0" smtClean="0"/>
-              <a:t>MDL4UI model concepts</a:t>
-            </a:r>
-            <a:endParaRPr lang="en-US" dirty="0"/>
-          </a:p>
-        </p:txBody>
-      </p:sp>
       <p:pic>
         <p:nvPicPr>
-          <p:cNvPr id="4" name="Image 3"/>
+          <p:cNvPr id="8" name="Image 7"/>
           <p:cNvPicPr>
             <a:picLocks noChangeAspect="1"/>
           </p:cNvPicPr>
@@ -6139,7 +6108,7 @@
           <a:blip r:embed="rId2" cstate="print">
             <a:extLst>
               <a:ext uri="{28A0092B-C50C-407E-A947-70E740481C1C}">
-                <a14:useLocalDpi xmlns="" xmlns:a14="http://schemas.microsoft.com/office/drawing/2010/main" val="0"/>
+                <a14:useLocalDpi xmlns:a14="http://schemas.microsoft.com/office/drawing/2010/main" xmlns="" val="0"/>
               </a:ext>
             </a:extLst>
           </a:blip>
@@ -6149,7 +6118,7 @@
         </p:blipFill>
         <p:spPr>
           <a:xfrm>
-            <a:off x="610729" y="1418944"/>
+            <a:off x="686929" y="1371600"/>
             <a:ext cx="5561471" cy="2814078"/>
           </a:xfrm>
           <a:prstGeom prst="rect">
@@ -6159,7 +6128,7 @@
       </p:pic>
       <p:pic>
         <p:nvPicPr>
-          <p:cNvPr id="7" name="Image 6"/>
+          <p:cNvPr id="9" name="Image 8"/>
           <p:cNvPicPr>
             <a:picLocks noChangeAspect="1"/>
           </p:cNvPicPr>
@@ -6169,7 +6138,7 @@
           <a:blip r:embed="rId3" cstate="print">
             <a:extLst>
               <a:ext uri="{28A0092B-C50C-407E-A947-70E740481C1C}">
-                <a14:useLocalDpi xmlns="" xmlns:a14="http://schemas.microsoft.com/office/drawing/2010/main" val="0"/>
+                <a14:useLocalDpi xmlns:a14="http://schemas.microsoft.com/office/drawing/2010/main" xmlns="" val="0"/>
               </a:ext>
             </a:extLst>
           </a:blip>
@@ -6179,8 +6148,8 @@
         </p:blipFill>
         <p:spPr>
           <a:xfrm>
-            <a:off x="228600" y="3962400"/>
-            <a:ext cx="3974385" cy="2287272"/>
+            <a:off x="304800" y="4191000"/>
+            <a:ext cx="5561471" cy="2487325"/>
           </a:xfrm>
           <a:prstGeom prst="rect">
             <a:avLst/>
@@ -6189,34 +6158,53 @@
       </p:pic>
       <p:pic>
         <p:nvPicPr>
-          <p:cNvPr id="5" name="Image 4"/>
+          <p:cNvPr id="10" name="Picture 2" descr="C:\work\mdl4ui\mdl4ui-docs\my_settings_and_email_screenshot.png"/>
           <p:cNvPicPr>
-            <a:picLocks noChangeAspect="1"/>
+            <a:picLocks noChangeAspect="1" noChangeArrowheads="1"/>
           </p:cNvPicPr>
           <p:nvPr/>
         </p:nvPicPr>
         <p:blipFill>
-          <a:blip r:embed="rId4" cstate="print">
-            <a:extLst>
-              <a:ext uri="{28A0092B-C50C-407E-A947-70E740481C1C}">
-                <a14:useLocalDpi xmlns="" xmlns:a14="http://schemas.microsoft.com/office/drawing/2010/main" val="0"/>
-              </a:ext>
-            </a:extLst>
-          </a:blip>
+          <a:blip r:embed="rId4" cstate="print"/>
+          <a:srcRect/>
           <a:stretch>
             <a:fillRect/>
           </a:stretch>
         </p:blipFill>
-        <p:spPr>
+        <p:spPr bwMode="auto">
           <a:xfrm>
-            <a:off x="2895600" y="2618711"/>
-            <a:ext cx="5561471" cy="2487325"/>
+            <a:off x="3276600" y="2432909"/>
+            <a:ext cx="5181600" cy="3183639"/>
           </a:xfrm>
           <a:prstGeom prst="rect">
             <a:avLst/>
           </a:prstGeom>
+          <a:noFill/>
         </p:spPr>
       </p:pic>
+      <p:sp>
+        <p:nvSpPr>
+          <p:cNvPr id="2" name="Titre 1"/>
+          <p:cNvSpPr>
+            <a:spLocks noGrp="1"/>
+          </p:cNvSpPr>
+          <p:nvPr>
+            <p:ph type="title"/>
+          </p:nvPr>
+        </p:nvSpPr>
+        <p:spPr/>
+        <p:txBody>
+          <a:bodyPr/>
+          <a:lstStyle/>
+          <a:p>
+            <a:r>
+              <a:rPr lang="en-US" dirty="0" smtClean="0"/>
+              <a:t>MDL4UI model concepts</a:t>
+            </a:r>
+            <a:endParaRPr lang="en-US" dirty="0"/>
+          </a:p>
+        </p:txBody>
+      </p:sp>
       <p:sp>
         <p:nvSpPr>
           <p:cNvPr id="17" name="Rectangle 16"/>
@@ -6225,8 +6213,8 @@
         </p:nvSpPr>
         <p:spPr>
           <a:xfrm>
-            <a:off x="990600" y="5257800"/>
-            <a:ext cx="3124200" cy="609600"/>
+            <a:off x="4495800" y="3581400"/>
+            <a:ext cx="3581400" cy="914400"/>
           </a:xfrm>
           <a:prstGeom prst="rect">
             <a:avLst/>
@@ -6312,7 +6300,7 @@
     </p:spTree>
     <p:extLst>
       <p:ext uri="{BB962C8B-B14F-4D97-AF65-F5344CB8AC3E}">
-        <p14:creationId xmlns="" xmlns:p14="http://schemas.microsoft.com/office/powerpoint/2010/main" val="864210357"/>
+        <p14:creationId xmlns:p14="http://schemas.microsoft.com/office/powerpoint/2010/main" xmlns="" val="864210357"/>
       </p:ext>
     </p:extLst>
   </p:cSld>
@@ -6576,7 +6564,7 @@
       </p:sp>
       <p:pic>
         <p:nvPicPr>
-          <p:cNvPr id="4" name="Image 3"/>
+          <p:cNvPr id="36" name="Image 35"/>
           <p:cNvPicPr>
             <a:picLocks noChangeAspect="1"/>
           </p:cNvPicPr>
@@ -6586,7 +6574,7 @@
           <a:blip r:embed="rId2" cstate="print">
             <a:extLst>
               <a:ext uri="{28A0092B-C50C-407E-A947-70E740481C1C}">
-                <a14:useLocalDpi xmlns="" xmlns:a14="http://schemas.microsoft.com/office/drawing/2010/main" val="0"/>
+                <a14:useLocalDpi xmlns:a14="http://schemas.microsoft.com/office/drawing/2010/main" xmlns="" val="0"/>
               </a:ext>
             </a:extLst>
           </a:blip>
@@ -6596,7 +6584,7 @@
         </p:blipFill>
         <p:spPr>
           <a:xfrm>
-            <a:off x="610729" y="1418944"/>
+            <a:off x="686929" y="1371600"/>
             <a:ext cx="5561471" cy="2814078"/>
           </a:xfrm>
           <a:prstGeom prst="rect">
@@ -6606,7 +6594,7 @@
       </p:pic>
       <p:pic>
         <p:nvPicPr>
-          <p:cNvPr id="7" name="Image 6"/>
+          <p:cNvPr id="37" name="Image 36"/>
           <p:cNvPicPr>
             <a:picLocks noChangeAspect="1"/>
           </p:cNvPicPr>
@@ -6616,7 +6604,7 @@
           <a:blip r:embed="rId3" cstate="print">
             <a:extLst>
               <a:ext uri="{28A0092B-C50C-407E-A947-70E740481C1C}">
-                <a14:useLocalDpi xmlns="" xmlns:a14="http://schemas.microsoft.com/office/drawing/2010/main" val="0"/>
+                <a14:useLocalDpi xmlns:a14="http://schemas.microsoft.com/office/drawing/2010/main" xmlns="" val="0"/>
               </a:ext>
             </a:extLst>
           </a:blip>
@@ -6626,8 +6614,8 @@
         </p:blipFill>
         <p:spPr>
           <a:xfrm>
-            <a:off x="228600" y="3962400"/>
-            <a:ext cx="3974385" cy="2287272"/>
+            <a:off x="304800" y="4191000"/>
+            <a:ext cx="5561471" cy="2487325"/>
           </a:xfrm>
           <a:prstGeom prst="rect">
             <a:avLst/>
@@ -6636,16 +6624,16 @@
       </p:pic>
       <p:grpSp>
         <p:nvGrpSpPr>
-          <p:cNvPr id="34" name="Groupe 33"/>
+          <p:cNvPr id="41" name="Groupe 40"/>
           <p:cNvGrpSpPr/>
           <p:nvPr/>
         </p:nvGrpSpPr>
         <p:grpSpPr>
           <a:xfrm>
             <a:off x="1295400" y="1981200"/>
-            <a:ext cx="2209800" cy="1295400"/>
+            <a:ext cx="2209800" cy="1219200"/>
             <a:chOff x="1295400" y="1981200"/>
-            <a:chExt cx="2209800" cy="1295400"/>
+            <a:chExt cx="2209800" cy="1219200"/>
           </a:xfrm>
         </p:grpSpPr>
         <p:sp>
@@ -6752,7 +6740,7 @@
           </p:nvSpPr>
           <p:spPr>
             <a:xfrm>
-              <a:off x="1295400" y="2667000"/>
+              <a:off x="1295400" y="2590800"/>
               <a:ext cx="2209800" cy="304800"/>
             </a:xfrm>
             <a:prstGeom prst="rect">
@@ -6800,7 +6788,7 @@
           </p:nvSpPr>
           <p:spPr>
             <a:xfrm>
-              <a:off x="1295400" y="2971800"/>
+              <a:off x="1295400" y="2895600"/>
               <a:ext cx="2209800" cy="304800"/>
             </a:xfrm>
             <a:prstGeom prst="rect">
@@ -6841,36 +6829,6 @@
           </p:txBody>
         </p:sp>
       </p:grpSp>
-      <p:pic>
-        <p:nvPicPr>
-          <p:cNvPr id="5" name="Image 4"/>
-          <p:cNvPicPr>
-            <a:picLocks noChangeAspect="1"/>
-          </p:cNvPicPr>
-          <p:nvPr/>
-        </p:nvPicPr>
-        <p:blipFill>
-          <a:blip r:embed="rId4" cstate="print">
-            <a:extLst>
-              <a:ext uri="{28A0092B-C50C-407E-A947-70E740481C1C}">
-                <a14:useLocalDpi xmlns="" xmlns:a14="http://schemas.microsoft.com/office/drawing/2010/main" val="0"/>
-              </a:ext>
-            </a:extLst>
-          </a:blip>
-          <a:stretch>
-            <a:fillRect/>
-          </a:stretch>
-        </p:blipFill>
-        <p:spPr>
-          <a:xfrm>
-            <a:off x="2895600" y="2618711"/>
-            <a:ext cx="5561471" cy="2487325"/>
-          </a:xfrm>
-          <a:prstGeom prst="rect">
-            <a:avLst/>
-          </a:prstGeom>
-        </p:spPr>
-      </p:pic>
       <p:grpSp>
         <p:nvGrpSpPr>
           <p:cNvPr id="33" name="Groupe 32"/>
@@ -6879,7 +6837,7 @@
         </p:nvGrpSpPr>
         <p:grpSpPr>
           <a:xfrm>
-            <a:off x="3048000" y="3200400"/>
+            <a:off x="457200" y="4775200"/>
             <a:ext cx="2807264" cy="939800"/>
             <a:chOff x="3048000" y="3200400"/>
             <a:chExt cx="2807264" cy="939800"/>
@@ -7030,18 +6988,44 @@
           </p:txBody>
         </p:sp>
       </p:grpSp>
+      <p:pic>
+        <p:nvPicPr>
+          <p:cNvPr id="38" name="Picture 2" descr="C:\work\mdl4ui\mdl4ui-docs\my_settings_and_email_screenshot.png"/>
+          <p:cNvPicPr>
+            <a:picLocks noChangeAspect="1" noChangeArrowheads="1"/>
+          </p:cNvPicPr>
+          <p:nvPr/>
+        </p:nvPicPr>
+        <p:blipFill>
+          <a:blip r:embed="rId4" cstate="print"/>
+          <a:srcRect/>
+          <a:stretch>
+            <a:fillRect/>
+          </a:stretch>
+        </p:blipFill>
+        <p:spPr bwMode="auto">
+          <a:xfrm>
+            <a:off x="3276600" y="2432909"/>
+            <a:ext cx="5181600" cy="3183639"/>
+          </a:xfrm>
+          <a:prstGeom prst="rect">
+            <a:avLst/>
+          </a:prstGeom>
+          <a:noFill/>
+        </p:spPr>
+      </p:pic>
       <p:grpSp>
         <p:nvGrpSpPr>
-          <p:cNvPr id="32" name="Groupe 31"/>
+          <p:cNvPr id="40" name="Groupe 39"/>
           <p:cNvGrpSpPr/>
           <p:nvPr/>
         </p:nvGrpSpPr>
         <p:grpSpPr>
           <a:xfrm>
-            <a:off x="457200" y="4495800"/>
-            <a:ext cx="3657600" cy="1670050"/>
-            <a:chOff x="457200" y="4495800"/>
-            <a:chExt cx="3657600" cy="1670050"/>
+            <a:off x="3352800" y="2971800"/>
+            <a:ext cx="4495800" cy="1905000"/>
+            <a:chOff x="3352800" y="2971800"/>
+            <a:chExt cx="4495800" cy="1905000"/>
           </a:xfrm>
         </p:grpSpPr>
         <p:sp>
@@ -7052,7 +7036,7 @@
           </p:nvSpPr>
           <p:spPr>
             <a:xfrm>
-              <a:off x="457200" y="4495800"/>
+              <a:off x="3352800" y="2971800"/>
               <a:ext cx="2273864" cy="304800"/>
             </a:xfrm>
             <a:prstGeom prst="rect">
@@ -7100,7 +7084,7 @@
           </p:nvSpPr>
           <p:spPr>
             <a:xfrm>
-              <a:off x="457200" y="4800600"/>
+              <a:off x="3352800" y="3276600"/>
               <a:ext cx="2273864" cy="304800"/>
             </a:xfrm>
             <a:prstGeom prst="rect">
@@ -7148,8 +7132,8 @@
           </p:nvSpPr>
           <p:spPr>
             <a:xfrm>
-              <a:off x="1078860" y="5181600"/>
-              <a:ext cx="3035940" cy="304800"/>
+              <a:off x="4724400" y="3657600"/>
+              <a:ext cx="3124200" cy="304800"/>
             </a:xfrm>
             <a:prstGeom prst="rect">
               <a:avLst/>
@@ -7196,8 +7180,8 @@
           </p:nvSpPr>
           <p:spPr>
             <a:xfrm>
-              <a:off x="1078860" y="5486400"/>
-              <a:ext cx="3035940" cy="304800"/>
+              <a:off x="4724400" y="3962400"/>
+              <a:ext cx="3124200" cy="304800"/>
             </a:xfrm>
             <a:prstGeom prst="rect">
               <a:avLst/>
@@ -7244,7 +7228,7 @@
           </p:nvSpPr>
           <p:spPr>
             <a:xfrm>
-              <a:off x="774136" y="5861050"/>
+              <a:off x="3733800" y="4572000"/>
               <a:ext cx="2273864" cy="304800"/>
             </a:xfrm>
             <a:prstGeom prst="rect">
@@ -7332,7 +7316,7 @@
     </p:spTree>
     <p:extLst>
       <p:ext uri="{BB962C8B-B14F-4D97-AF65-F5344CB8AC3E}">
-        <p14:creationId xmlns="" xmlns:p14="http://schemas.microsoft.com/office/powerpoint/2010/main" val="3336203041"/>
+        <p14:creationId xmlns:p14="http://schemas.microsoft.com/office/powerpoint/2010/main" xmlns="" val="3336203041"/>
       </p:ext>
     </p:extLst>
   </p:cSld>
@@ -7408,7 +7392,7 @@
                                           </p:stCondLst>
                                         </p:cTn>
                                         <p:tgtEl>
-                                          <p:spTgt spid="32"/>
+                                          <p:spTgt spid="33"/>
                                         </p:tgtEl>
                                         <p:attrNameLst>
                                           <p:attrName>style.visibility</p:attrName>
@@ -7422,7 +7406,7 @@
                                       <p:cBhvr>
                                         <p:cTn id="10" dur="500"/>
                                         <p:tgtEl>
-                                          <p:spTgt spid="32"/>
+                                          <p:spTgt spid="33"/>
                                         </p:tgtEl>
                                       </p:cBhvr>
                                     </p:animEffect>
@@ -7443,7 +7427,7 @@
                                           </p:stCondLst>
                                         </p:cTn>
                                         <p:tgtEl>
-                                          <p:spTgt spid="33"/>
+                                          <p:spTgt spid="40"/>
                                         </p:tgtEl>
                                         <p:attrNameLst>
                                           <p:attrName>style.visibility</p:attrName>
@@ -7457,7 +7441,7 @@
                                       <p:cBhvr>
                                         <p:cTn id="13" dur="500"/>
                                         <p:tgtEl>
-                                          <p:spTgt spid="33"/>
+                                          <p:spTgt spid="40"/>
                                         </p:tgtEl>
                                       </p:cBhvr>
                                     </p:animEffect>
@@ -7478,7 +7462,7 @@
                                           </p:stCondLst>
                                         </p:cTn>
                                         <p:tgtEl>
-                                          <p:spTgt spid="34"/>
+                                          <p:spTgt spid="41"/>
                                         </p:tgtEl>
                                         <p:attrNameLst>
                                           <p:attrName>style.visibility</p:attrName>
@@ -7492,7 +7476,7 @@
                                       <p:cBhvr>
                                         <p:cTn id="16" dur="500"/>
                                         <p:tgtEl>
-                                          <p:spTgt spid="34"/>
+                                          <p:spTgt spid="41"/>
                                         </p:tgtEl>
                                       </p:cBhvr>
                                     </p:animEffect>
@@ -8024,7 +8008,7 @@
     </p:spTree>
     <p:extLst>
       <p:ext uri="{BB962C8B-B14F-4D97-AF65-F5344CB8AC3E}">
-        <p14:creationId xmlns="" xmlns:p14="http://schemas.microsoft.com/office/powerpoint/2010/main" val="3627640579"/>
+        <p14:creationId xmlns:p14="http://schemas.microsoft.com/office/powerpoint/2010/main" xmlns="" val="3627640579"/>
       </p:ext>
     </p:extLst>
   </p:cSld>
@@ -8234,7 +8218,7 @@
     </p:spTree>
     <p:extLst>
       <p:ext uri="{BB962C8B-B14F-4D97-AF65-F5344CB8AC3E}">
-        <p14:creationId xmlns="" xmlns:p14="http://schemas.microsoft.com/office/powerpoint/2010/main" val="171061288"/>
+        <p14:creationId xmlns:p14="http://schemas.microsoft.com/office/powerpoint/2010/main" xmlns="" val="171061288"/>
       </p:ext>
     </p:extLst>
   </p:cSld>
@@ -8511,7 +8495,7 @@
     </p:spTree>
     <p:extLst>
       <p:ext uri="{BB962C8B-B14F-4D97-AF65-F5344CB8AC3E}">
-        <p14:creationId xmlns="" xmlns:p14="http://schemas.microsoft.com/office/powerpoint/2010/main" val="394514968"/>
+        <p14:creationId xmlns:p14="http://schemas.microsoft.com/office/powerpoint/2010/main" xmlns="" val="394514968"/>
       </p:ext>
     </p:extLst>
   </p:cSld>
@@ -8781,7 +8765,7 @@
           <a:blip r:embed="rId2" cstate="print">
             <a:extLst>
               <a:ext uri="{28A0092B-C50C-407E-A947-70E740481C1C}">
-                <a14:useLocalDpi xmlns="" xmlns:a14="http://schemas.microsoft.com/office/drawing/2010/main"/>
+                <a14:useLocalDpi xmlns:a14="http://schemas.microsoft.com/office/drawing/2010/main" xmlns=""/>
               </a:ext>
             </a:extLst>
           </a:blip>
@@ -8806,7 +8790,7 @@
     </p:spTree>
     <p:extLst>
       <p:ext uri="{BB962C8B-B14F-4D97-AF65-F5344CB8AC3E}">
-        <p14:creationId xmlns="" xmlns:p14="http://schemas.microsoft.com/office/powerpoint/2010/main" val="1630604182"/>
+        <p14:creationId xmlns:p14="http://schemas.microsoft.com/office/powerpoint/2010/main" xmlns="" val="1630604182"/>
       </p:ext>
     </p:extLst>
   </p:cSld>
@@ -9017,7 +9001,7 @@
     </p:spTree>
     <p:extLst>
       <p:ext uri="{BB962C8B-B14F-4D97-AF65-F5344CB8AC3E}">
-        <p14:creationId xmlns="" xmlns:p14="http://schemas.microsoft.com/office/powerpoint/2010/main" val="3593113261"/>
+        <p14:creationId xmlns:p14="http://schemas.microsoft.com/office/powerpoint/2010/main" xmlns="" val="3593113261"/>
       </p:ext>
     </p:extLst>
   </p:cSld>
@@ -9247,7 +9231,7 @@
     </p:spTree>
     <p:extLst>
       <p:ext uri="{BB962C8B-B14F-4D97-AF65-F5344CB8AC3E}">
-        <p14:creationId xmlns="" xmlns:p14="http://schemas.microsoft.com/office/powerpoint/2010/main" val="451913240"/>
+        <p14:creationId xmlns:p14="http://schemas.microsoft.com/office/powerpoint/2010/main" xmlns="" val="451913240"/>
       </p:ext>
     </p:extLst>
   </p:cSld>
@@ -9509,7 +9493,7 @@
     </p:spTree>
     <p:extLst>
       <p:ext uri="{BB962C8B-B14F-4D97-AF65-F5344CB8AC3E}">
-        <p14:creationId xmlns="" xmlns:p14="http://schemas.microsoft.com/office/powerpoint/2010/main" val="2009636028"/>
+        <p14:creationId xmlns:p14="http://schemas.microsoft.com/office/powerpoint/2010/main" xmlns="" val="2009636028"/>
       </p:ext>
     </p:extLst>
   </p:cSld>
@@ -9771,7 +9755,7 @@
     </p:spTree>
     <p:extLst>
       <p:ext uri="{BB962C8B-B14F-4D97-AF65-F5344CB8AC3E}">
-        <p14:creationId xmlns="" xmlns:p14="http://schemas.microsoft.com/office/powerpoint/2010/main" val="1131833659"/>
+        <p14:creationId xmlns:p14="http://schemas.microsoft.com/office/powerpoint/2010/main" xmlns="" val="1131833659"/>
       </p:ext>
     </p:extLst>
   </p:cSld>
@@ -9840,7 +9824,7 @@
           <a:blip r:embed="rId2" cstate="print">
             <a:extLst>
               <a:ext uri="{28A0092B-C50C-407E-A947-70E740481C1C}">
-                <a14:useLocalDpi xmlns="" xmlns:a14="http://schemas.microsoft.com/office/drawing/2010/main" val="0"/>
+                <a14:useLocalDpi xmlns:a14="http://schemas.microsoft.com/office/drawing/2010/main" xmlns="" val="0"/>
               </a:ext>
             </a:extLst>
           </a:blip>
@@ -9861,7 +9845,7 @@
     </p:spTree>
     <p:extLst>
       <p:ext uri="{BB962C8B-B14F-4D97-AF65-F5344CB8AC3E}">
-        <p14:creationId xmlns="" xmlns:p14="http://schemas.microsoft.com/office/powerpoint/2010/main" val="1848404178"/>
+        <p14:creationId xmlns:p14="http://schemas.microsoft.com/office/powerpoint/2010/main" xmlns="" val="1848404178"/>
       </p:ext>
     </p:extLst>
   </p:cSld>
@@ -10045,7 +10029,7 @@
     </p:spTree>
     <p:extLst>
       <p:ext uri="{BB962C8B-B14F-4D97-AF65-F5344CB8AC3E}">
-        <p14:creationId xmlns="" xmlns:p14="http://schemas.microsoft.com/office/powerpoint/2010/main" val="1155854373"/>
+        <p14:creationId xmlns:p14="http://schemas.microsoft.com/office/powerpoint/2010/main" xmlns="" val="1155854373"/>
       </p:ext>
     </p:extLst>
   </p:cSld>
@@ -10511,7 +10495,7 @@
     </p:spTree>
     <p:extLst>
       <p:ext uri="{BB962C8B-B14F-4D97-AF65-F5344CB8AC3E}">
-        <p14:creationId xmlns="" xmlns:p14="http://schemas.microsoft.com/office/powerpoint/2010/main" val="1027356186"/>
+        <p14:creationId xmlns:p14="http://schemas.microsoft.com/office/powerpoint/2010/main" xmlns="" val="1027356186"/>
       </p:ext>
     </p:extLst>
   </p:cSld>
@@ -10580,7 +10564,7 @@
           <a:blip r:embed="rId2" cstate="print">
             <a:extLst>
               <a:ext uri="{28A0092B-C50C-407E-A947-70E740481C1C}">
-                <a14:useLocalDpi xmlns="" xmlns:a14="http://schemas.microsoft.com/office/drawing/2010/main" val="0"/>
+                <a14:useLocalDpi xmlns:a14="http://schemas.microsoft.com/office/drawing/2010/main" xmlns="" val="0"/>
               </a:ext>
             </a:extLst>
           </a:blip>
@@ -10610,7 +10594,7 @@
           <a:blip r:embed="rId3" cstate="print">
             <a:extLst>
               <a:ext uri="{28A0092B-C50C-407E-A947-70E740481C1C}">
-                <a14:useLocalDpi xmlns="" xmlns:a14="http://schemas.microsoft.com/office/drawing/2010/main" val="0"/>
+                <a14:useLocalDpi xmlns:a14="http://schemas.microsoft.com/office/drawing/2010/main" xmlns="" val="0"/>
               </a:ext>
             </a:extLst>
           </a:blip>
@@ -10634,7 +10618,7 @@
     </p:spTree>
     <p:extLst>
       <p:ext uri="{BB962C8B-B14F-4D97-AF65-F5344CB8AC3E}">
-        <p14:creationId xmlns="" xmlns:p14="http://schemas.microsoft.com/office/powerpoint/2010/main" val="2369171751"/>
+        <p14:creationId xmlns:p14="http://schemas.microsoft.com/office/powerpoint/2010/main" xmlns="" val="2369171751"/>
       </p:ext>
     </p:extLst>
   </p:cSld>
@@ -10670,7 +10654,7 @@
       </p:grpSpPr>
       <p:pic>
         <p:nvPicPr>
-          <p:cNvPr id="1028" name="Picture 4" descr="C:\work\mdl4ui\mdl4ui-docs\my_settings_and_email_YES_screenshot.png"/>
+          <p:cNvPr id="1026" name="Picture 2" descr="C:\work\mdl4ui\mdl4ui-docs\my_settings_and_email_YES_screenshot.png"/>
           <p:cNvPicPr>
             <a:picLocks noChangeAspect="1" noChangeArrowheads="1"/>
           </p:cNvPicPr>
@@ -10685,8 +10669,8 @@
         </p:blipFill>
         <p:spPr bwMode="auto">
           <a:xfrm>
-            <a:off x="3733044" y="4191000"/>
-            <a:ext cx="5410956" cy="1733792"/>
+            <a:off x="685800" y="4571681"/>
+            <a:ext cx="6811326" cy="2286319"/>
           </a:xfrm>
           <a:prstGeom prst="rect">
             <a:avLst/>
@@ -10711,7 +10695,7 @@
         </p:blipFill>
         <p:spPr bwMode="auto">
           <a:xfrm>
-            <a:off x="0" y="4191000"/>
+            <a:off x="685800" y="3657600"/>
             <a:ext cx="3810532" cy="857370"/>
           </a:xfrm>
           <a:prstGeom prst="rect">
@@ -10755,7 +10739,7 @@
           <a:blip r:embed="rId4" cstate="print">
             <a:extLst>
               <a:ext uri="{28A0092B-C50C-407E-A947-70E740481C1C}">
-                <a14:useLocalDpi xmlns="" xmlns:a14="http://schemas.microsoft.com/office/drawing/2010/main" val="0"/>
+                <a14:useLocalDpi xmlns:a14="http://schemas.microsoft.com/office/drawing/2010/main" xmlns="" val="0"/>
               </a:ext>
             </a:extLst>
           </a:blip>
@@ -10765,7 +10749,7 @@
         </p:blipFill>
         <p:spPr>
           <a:xfrm>
-            <a:off x="654538" y="1371600"/>
+            <a:off x="654538" y="1295400"/>
             <a:ext cx="7834921" cy="2234921"/>
           </a:xfrm>
           <a:prstGeom prst="rect">
@@ -10784,7 +10768,7 @@
         </p:nvSpPr>
         <p:spPr>
           <a:xfrm>
-            <a:off x="1600200" y="4191000"/>
+            <a:off x="2286000" y="3657600"/>
             <a:ext cx="838200" cy="381000"/>
           </a:xfrm>
           <a:prstGeom prst="roundRect">
@@ -10830,7 +10814,7 @@
         </p:nvSpPr>
         <p:spPr>
           <a:xfrm>
-            <a:off x="5257800" y="4191000"/>
+            <a:off x="2209800" y="4572000"/>
             <a:ext cx="914400" cy="381000"/>
           </a:xfrm>
           <a:prstGeom prst="roundRect">
@@ -10871,7 +10855,7 @@
     </p:spTree>
     <p:extLst>
       <p:ext uri="{BB962C8B-B14F-4D97-AF65-F5344CB8AC3E}">
-        <p14:creationId xmlns="" xmlns:p14="http://schemas.microsoft.com/office/powerpoint/2010/main" val="3216378839"/>
+        <p14:creationId xmlns:p14="http://schemas.microsoft.com/office/powerpoint/2010/main" xmlns="" val="3216378839"/>
       </p:ext>
     </p:extLst>
   </p:cSld>
@@ -11190,7 +11174,7 @@
           <a:blip r:embed="rId2" cstate="print">
             <a:extLst>
               <a:ext uri="{28A0092B-C50C-407E-A947-70E740481C1C}">
-                <a14:useLocalDpi xmlns="" xmlns:a14="http://schemas.microsoft.com/office/drawing/2010/main" val="0"/>
+                <a14:useLocalDpi xmlns:a14="http://schemas.microsoft.com/office/drawing/2010/main" xmlns="" val="0"/>
               </a:ext>
             </a:extLst>
           </a:blip>
@@ -11299,7 +11283,7 @@
     </p:spTree>
     <p:extLst>
       <p:ext uri="{BB962C8B-B14F-4D97-AF65-F5344CB8AC3E}">
-        <p14:creationId xmlns="" xmlns:p14="http://schemas.microsoft.com/office/powerpoint/2010/main" val="2527117896"/>
+        <p14:creationId xmlns:p14="http://schemas.microsoft.com/office/powerpoint/2010/main" xmlns="" val="2527117896"/>
       </p:ext>
     </p:extLst>
   </p:cSld>
@@ -12013,7 +11997,7 @@
     </p:spTree>
     <p:extLst>
       <p:ext uri="{BB962C8B-B14F-4D97-AF65-F5344CB8AC3E}">
-        <p14:creationId xmlns="" xmlns:p14="http://schemas.microsoft.com/office/powerpoint/2010/main" val="1994743043"/>
+        <p14:creationId xmlns:p14="http://schemas.microsoft.com/office/powerpoint/2010/main" xmlns="" val="1994743043"/>
       </p:ext>
     </p:extLst>
   </p:cSld>
@@ -12199,7 +12183,7 @@
     </p:spTree>
     <p:extLst>
       <p:ext uri="{BB962C8B-B14F-4D97-AF65-F5344CB8AC3E}">
-        <p14:creationId xmlns="" xmlns:p14="http://schemas.microsoft.com/office/powerpoint/2010/main" val="3098398089"/>
+        <p14:creationId xmlns:p14="http://schemas.microsoft.com/office/powerpoint/2010/main" xmlns="" val="3098398089"/>
       </p:ext>
     </p:extLst>
   </p:cSld>
@@ -12480,7 +12464,7 @@
     </p:spTree>
     <p:extLst>
       <p:ext uri="{BB962C8B-B14F-4D97-AF65-F5344CB8AC3E}">
-        <p14:creationId xmlns="" xmlns:p14="http://schemas.microsoft.com/office/powerpoint/2010/main" val="3449390454"/>
+        <p14:creationId xmlns:p14="http://schemas.microsoft.com/office/powerpoint/2010/main" xmlns="" val="3449390454"/>
       </p:ext>
     </p:extLst>
   </p:cSld>
@@ -13181,7 +13165,7 @@
     </p:spTree>
     <p:extLst>
       <p:ext uri="{BB962C8B-B14F-4D97-AF65-F5344CB8AC3E}">
-        <p14:creationId xmlns="" xmlns:p14="http://schemas.microsoft.com/office/powerpoint/2010/main" val="4006469721"/>
+        <p14:creationId xmlns:p14="http://schemas.microsoft.com/office/powerpoint/2010/main" xmlns="" val="4006469721"/>
       </p:ext>
     </p:extLst>
   </p:cSld>
@@ -13489,7 +13473,7 @@
     </p:spTree>
     <p:extLst>
       <p:ext uri="{BB962C8B-B14F-4D97-AF65-F5344CB8AC3E}">
-        <p14:creationId xmlns="" xmlns:p14="http://schemas.microsoft.com/office/powerpoint/2010/main" val="1678422724"/>
+        <p14:creationId xmlns:p14="http://schemas.microsoft.com/office/powerpoint/2010/main" xmlns="" val="1678422724"/>
       </p:ext>
     </p:extLst>
   </p:cSld>
@@ -14102,7 +14086,7 @@
     </p:spTree>
     <p:extLst>
       <p:ext uri="{BB962C8B-B14F-4D97-AF65-F5344CB8AC3E}">
-        <p14:creationId xmlns="" xmlns:p14="http://schemas.microsoft.com/office/powerpoint/2010/main" val="2792941284"/>
+        <p14:creationId xmlns:p14="http://schemas.microsoft.com/office/powerpoint/2010/main" xmlns="" val="2792941284"/>
       </p:ext>
     </p:extLst>
   </p:cSld>
@@ -14561,7 +14545,7 @@
     </p:spTree>
     <p:extLst>
       <p:ext uri="{BB962C8B-B14F-4D97-AF65-F5344CB8AC3E}">
-        <p14:creationId xmlns="" xmlns:p14="http://schemas.microsoft.com/office/powerpoint/2010/main" val="3220083538"/>
+        <p14:creationId xmlns:p14="http://schemas.microsoft.com/office/powerpoint/2010/main" xmlns="" val="3220083538"/>
       </p:ext>
     </p:extLst>
   </p:cSld>
@@ -14780,7 +14764,7 @@
     </p:spTree>
     <p:extLst>
       <p:ext uri="{BB962C8B-B14F-4D97-AF65-F5344CB8AC3E}">
-        <p14:creationId xmlns="" xmlns:p14="http://schemas.microsoft.com/office/powerpoint/2010/main" val="856396653"/>
+        <p14:creationId xmlns:p14="http://schemas.microsoft.com/office/powerpoint/2010/main" xmlns="" val="856396653"/>
       </p:ext>
     </p:extLst>
   </p:cSld>
@@ -14941,7 +14925,7 @@
     </p:spTree>
     <p:extLst>
       <p:ext uri="{BB962C8B-B14F-4D97-AF65-F5344CB8AC3E}">
-        <p14:creationId xmlns="" xmlns:p14="http://schemas.microsoft.com/office/powerpoint/2010/main" val="3312784383"/>
+        <p14:creationId xmlns:p14="http://schemas.microsoft.com/office/powerpoint/2010/main" xmlns="" val="3312784383"/>
       </p:ext>
     </p:extLst>
   </p:cSld>
@@ -15159,7 +15143,7 @@
     </p:spTree>
     <p:extLst>
       <p:ext uri="{BB962C8B-B14F-4D97-AF65-F5344CB8AC3E}">
-        <p14:creationId xmlns="" xmlns:p14="http://schemas.microsoft.com/office/powerpoint/2010/main" val="3443329555"/>
+        <p14:creationId xmlns:p14="http://schemas.microsoft.com/office/powerpoint/2010/main" xmlns="" val="3443329555"/>
       </p:ext>
     </p:extLst>
   </p:cSld>
@@ -15671,7 +15655,7 @@
     </p:spTree>
     <p:extLst>
       <p:ext uri="{BB962C8B-B14F-4D97-AF65-F5344CB8AC3E}">
-        <p14:creationId xmlns="" xmlns:p14="http://schemas.microsoft.com/office/powerpoint/2010/main" val="1556099287"/>
+        <p14:creationId xmlns:p14="http://schemas.microsoft.com/office/powerpoint/2010/main" xmlns="" val="1556099287"/>
       </p:ext>
     </p:extLst>
   </p:cSld>
@@ -16024,7 +16008,7 @@
     </p:spTree>
     <p:extLst>
       <p:ext uri="{BB962C8B-B14F-4D97-AF65-F5344CB8AC3E}">
-        <p14:creationId xmlns="" xmlns:p14="http://schemas.microsoft.com/office/powerpoint/2010/main" val="2948210574"/>
+        <p14:creationId xmlns:p14="http://schemas.microsoft.com/office/powerpoint/2010/main" xmlns="" val="2948210574"/>
       </p:ext>
     </p:extLst>
   </p:cSld>
@@ -16487,7 +16471,7 @@
     </p:spTree>
     <p:extLst>
       <p:ext uri="{BB962C8B-B14F-4D97-AF65-F5344CB8AC3E}">
-        <p14:creationId xmlns="" xmlns:p14="http://schemas.microsoft.com/office/powerpoint/2010/main" val="977874982"/>
+        <p14:creationId xmlns:p14="http://schemas.microsoft.com/office/powerpoint/2010/main" xmlns="" val="977874982"/>
       </p:ext>
     </p:extLst>
   </p:cSld>
@@ -16555,7 +16539,7 @@
           <p:nvPr>
             <p:extLst>
               <p:ext uri="{D42A27DB-BD31-4B8C-83A1-F6EECF244321}">
-                <p14:modId xmlns="" xmlns:p14="http://schemas.microsoft.com/office/powerpoint/2010/main" val="2181104498"/>
+                <p14:modId xmlns:p14="http://schemas.microsoft.com/office/powerpoint/2010/main" xmlns="" val="2181104498"/>
               </p:ext>
             </p:extLst>
           </p:nvPr>
@@ -17539,7 +17523,7 @@
     </p:spTree>
     <p:extLst>
       <p:ext uri="{BB962C8B-B14F-4D97-AF65-F5344CB8AC3E}">
-        <p14:creationId xmlns="" xmlns:p14="http://schemas.microsoft.com/office/powerpoint/2010/main" val="2197364214"/>
+        <p14:creationId xmlns:p14="http://schemas.microsoft.com/office/powerpoint/2010/main" xmlns="" val="2197364214"/>
       </p:ext>
     </p:extLst>
   </p:cSld>
@@ -17715,7 +17699,7 @@
     </p:spTree>
     <p:extLst>
       <p:ext uri="{BB962C8B-B14F-4D97-AF65-F5344CB8AC3E}">
-        <p14:creationId xmlns="" xmlns:p14="http://schemas.microsoft.com/office/powerpoint/2010/main" val="2092776985"/>
+        <p14:creationId xmlns:p14="http://schemas.microsoft.com/office/powerpoint/2010/main" xmlns="" val="2092776985"/>
       </p:ext>
     </p:extLst>
   </p:cSld>
@@ -17935,7 +17919,7 @@
     </p:spTree>
     <p:extLst>
       <p:ext uri="{BB962C8B-B14F-4D97-AF65-F5344CB8AC3E}">
-        <p14:creationId xmlns="" xmlns:p14="http://schemas.microsoft.com/office/powerpoint/2010/main" val="318706902"/>
+        <p14:creationId xmlns:p14="http://schemas.microsoft.com/office/powerpoint/2010/main" xmlns="" val="318706902"/>
       </p:ext>
     </p:extLst>
   </p:cSld>
@@ -18018,7 +18002,7 @@
           <p:nvPr>
             <p:extLst>
               <p:ext uri="{D42A27DB-BD31-4B8C-83A1-F6EECF244321}">
-                <p14:modId xmlns="" xmlns:p14="http://schemas.microsoft.com/office/powerpoint/2010/main" val="3075550189"/>
+                <p14:modId xmlns:p14="http://schemas.microsoft.com/office/powerpoint/2010/main" xmlns="" val="3075550189"/>
               </p:ext>
             </p:extLst>
           </p:nvPr>
@@ -18389,7 +18373,7 @@
           <a:blip r:embed="rId3" cstate="print">
             <a:extLst>
               <a:ext uri="{28A0092B-C50C-407E-A947-70E740481C1C}">
-                <a14:useLocalDpi xmlns="" xmlns:a14="http://schemas.microsoft.com/office/drawing/2010/main" val="0"/>
+                <a14:useLocalDpi xmlns:a14="http://schemas.microsoft.com/office/drawing/2010/main" xmlns="" val="0"/>
               </a:ext>
             </a:extLst>
           </a:blip>
@@ -18419,7 +18403,7 @@
           <a:blip r:embed="rId4" cstate="print">
             <a:extLst>
               <a:ext uri="{28A0092B-C50C-407E-A947-70E740481C1C}">
-                <a14:useLocalDpi xmlns="" xmlns:a14="http://schemas.microsoft.com/office/drawing/2010/main" val="0"/>
+                <a14:useLocalDpi xmlns:a14="http://schemas.microsoft.com/office/drawing/2010/main" xmlns="" val="0"/>
               </a:ext>
             </a:extLst>
           </a:blip>
@@ -18449,7 +18433,7 @@
           <a:blip r:embed="rId5" cstate="print">
             <a:extLst>
               <a:ext uri="{28A0092B-C50C-407E-A947-70E740481C1C}">
-                <a14:useLocalDpi xmlns="" xmlns:a14="http://schemas.microsoft.com/office/drawing/2010/main" val="0"/>
+                <a14:useLocalDpi xmlns:a14="http://schemas.microsoft.com/office/drawing/2010/main" xmlns="" val="0"/>
               </a:ext>
             </a:extLst>
           </a:blip>
@@ -18479,7 +18463,7 @@
           <a:blip r:embed="rId6" cstate="print">
             <a:extLst>
               <a:ext uri="{28A0092B-C50C-407E-A947-70E740481C1C}">
-                <a14:useLocalDpi xmlns="" xmlns:a14="http://schemas.microsoft.com/office/drawing/2010/main" val="0"/>
+                <a14:useLocalDpi xmlns:a14="http://schemas.microsoft.com/office/drawing/2010/main" xmlns="" val="0"/>
               </a:ext>
             </a:extLst>
           </a:blip>
@@ -18509,7 +18493,7 @@
           <a:blip r:embed="rId7" cstate="print">
             <a:extLst>
               <a:ext uri="{28A0092B-C50C-407E-A947-70E740481C1C}">
-                <a14:useLocalDpi xmlns="" xmlns:a14="http://schemas.microsoft.com/office/drawing/2010/main" val="0"/>
+                <a14:useLocalDpi xmlns:a14="http://schemas.microsoft.com/office/drawing/2010/main" xmlns="" val="0"/>
               </a:ext>
             </a:extLst>
           </a:blip>
@@ -18539,7 +18523,7 @@
           <a:blip r:embed="rId8" cstate="print">
             <a:extLst>
               <a:ext uri="{28A0092B-C50C-407E-A947-70E740481C1C}">
-                <a14:useLocalDpi xmlns="" xmlns:a14="http://schemas.microsoft.com/office/drawing/2010/main" val="0"/>
+                <a14:useLocalDpi xmlns:a14="http://schemas.microsoft.com/office/drawing/2010/main" xmlns="" val="0"/>
               </a:ext>
             </a:extLst>
           </a:blip>
@@ -18560,7 +18544,7 @@
     </p:spTree>
     <p:extLst>
       <p:ext uri="{BB962C8B-B14F-4D97-AF65-F5344CB8AC3E}">
-        <p14:creationId xmlns="" xmlns:p14="http://schemas.microsoft.com/office/powerpoint/2010/main" val="949325302"/>
+        <p14:creationId xmlns:p14="http://schemas.microsoft.com/office/powerpoint/2010/main" xmlns="" val="949325302"/>
       </p:ext>
     </p:extLst>
   </p:cSld>
@@ -19241,7 +19225,7 @@
     </p:spTree>
     <p:extLst>
       <p:ext uri="{BB962C8B-B14F-4D97-AF65-F5344CB8AC3E}">
-        <p14:creationId xmlns="" xmlns:p14="http://schemas.microsoft.com/office/powerpoint/2010/main" val="1728169033"/>
+        <p14:creationId xmlns:p14="http://schemas.microsoft.com/office/powerpoint/2010/main" xmlns="" val="1728169033"/>
       </p:ext>
     </p:extLst>
   </p:cSld>
@@ -19486,7 +19470,7 @@
     </p:spTree>
     <p:extLst>
       <p:ext uri="{BB962C8B-B14F-4D97-AF65-F5344CB8AC3E}">
-        <p14:creationId xmlns="" xmlns:p14="http://schemas.microsoft.com/office/powerpoint/2010/main" val="2834344091"/>
+        <p14:creationId xmlns:p14="http://schemas.microsoft.com/office/powerpoint/2010/main" xmlns="" val="2834344091"/>
       </p:ext>
     </p:extLst>
   </p:cSld>
@@ -19878,7 +19862,7 @@
           <p:nvPr>
             <p:extLst>
               <p:ext uri="{D42A27DB-BD31-4B8C-83A1-F6EECF244321}">
-                <p14:modId xmlns="" xmlns:p14="http://schemas.microsoft.com/office/powerpoint/2010/main" val="3204736979"/>
+                <p14:modId xmlns:p14="http://schemas.microsoft.com/office/powerpoint/2010/main" xmlns="" val="3204736979"/>
               </p:ext>
             </p:extLst>
           </p:nvPr>
@@ -20206,7 +20190,7 @@
     </p:spTree>
     <p:extLst>
       <p:ext uri="{BB962C8B-B14F-4D97-AF65-F5344CB8AC3E}">
-        <p14:creationId xmlns="" xmlns:p14="http://schemas.microsoft.com/office/powerpoint/2010/main" val="3195513628"/>
+        <p14:creationId xmlns:p14="http://schemas.microsoft.com/office/powerpoint/2010/main" xmlns="" val="3195513628"/>
       </p:ext>
     </p:extLst>
   </p:cSld>
@@ -20344,7 +20328,7 @@
     </p:spTree>
     <p:extLst>
       <p:ext uri="{BB962C8B-B14F-4D97-AF65-F5344CB8AC3E}">
-        <p14:creationId xmlns="" xmlns:p14="http://schemas.microsoft.com/office/powerpoint/2010/main" val="2674396190"/>
+        <p14:creationId xmlns:p14="http://schemas.microsoft.com/office/powerpoint/2010/main" xmlns="" val="2674396190"/>
       </p:ext>
     </p:extLst>
   </p:cSld>
@@ -20486,7 +20470,7 @@
     </p:spTree>
     <p:extLst>
       <p:ext uri="{BB962C8B-B14F-4D97-AF65-F5344CB8AC3E}">
-        <p14:creationId xmlns="" xmlns:p14="http://schemas.microsoft.com/office/powerpoint/2010/main" val="2713826086"/>
+        <p14:creationId xmlns:p14="http://schemas.microsoft.com/office/powerpoint/2010/main" xmlns="" val="2713826086"/>
       </p:ext>
     </p:extLst>
   </p:cSld>
@@ -20678,7 +20662,7 @@
     </p:spTree>
     <p:extLst>
       <p:ext uri="{BB962C8B-B14F-4D97-AF65-F5344CB8AC3E}">
-        <p14:creationId xmlns="" xmlns:p14="http://schemas.microsoft.com/office/powerpoint/2010/main" val="714747940"/>
+        <p14:creationId xmlns:p14="http://schemas.microsoft.com/office/powerpoint/2010/main" xmlns="" val="714747940"/>
       </p:ext>
     </p:extLst>
   </p:cSld>
@@ -21217,7 +21201,7 @@
     </p:spTree>
     <p:extLst>
       <p:ext uri="{BB962C8B-B14F-4D97-AF65-F5344CB8AC3E}">
-        <p14:creationId xmlns="" xmlns:p14="http://schemas.microsoft.com/office/powerpoint/2010/main" val="3760395846"/>
+        <p14:creationId xmlns:p14="http://schemas.microsoft.com/office/powerpoint/2010/main" xmlns="" val="3760395846"/>
       </p:ext>
     </p:extLst>
   </p:cSld>
@@ -22050,7 +22034,7 @@
     </p:spTree>
     <p:extLst>
       <p:ext uri="{BB962C8B-B14F-4D97-AF65-F5344CB8AC3E}">
-        <p14:creationId xmlns="" xmlns:p14="http://schemas.microsoft.com/office/powerpoint/2010/main" val="1422967000"/>
+        <p14:creationId xmlns:p14="http://schemas.microsoft.com/office/powerpoint/2010/main" xmlns="" val="1422967000"/>
       </p:ext>
     </p:extLst>
   </p:cSld>
@@ -22201,7 +22185,7 @@
     </p:spTree>
     <p:extLst>
       <p:ext uri="{BB962C8B-B14F-4D97-AF65-F5344CB8AC3E}">
-        <p14:creationId xmlns="" xmlns:p14="http://schemas.microsoft.com/office/powerpoint/2010/main" val="2654585083"/>
+        <p14:creationId xmlns:p14="http://schemas.microsoft.com/office/powerpoint/2010/main" xmlns="" val="2654585083"/>
       </p:ext>
     </p:extLst>
   </p:cSld>
@@ -22361,7 +22345,7 @@
     </p:spTree>
     <p:extLst>
       <p:ext uri="{BB962C8B-B14F-4D97-AF65-F5344CB8AC3E}">
-        <p14:creationId xmlns="" xmlns:p14="http://schemas.microsoft.com/office/powerpoint/2010/main" val="1683021932"/>
+        <p14:creationId xmlns:p14="http://schemas.microsoft.com/office/powerpoint/2010/main" xmlns="" val="1683021932"/>
       </p:ext>
     </p:extLst>
   </p:cSld>
@@ -22435,7 +22419,7 @@
           <a:blip r:embed="rId2" cstate="print">
             <a:extLst>
               <a:ext uri="{28A0092B-C50C-407E-A947-70E740481C1C}">
-                <a14:useLocalDpi xmlns="" xmlns:a14="http://schemas.microsoft.com/office/drawing/2010/main" val="0"/>
+                <a14:useLocalDpi xmlns:a14="http://schemas.microsoft.com/office/drawing/2010/main" xmlns="" val="0"/>
               </a:ext>
             </a:extLst>
           </a:blip>
@@ -23071,7 +23055,7 @@
     </p:spTree>
     <p:extLst>
       <p:ext uri="{BB962C8B-B14F-4D97-AF65-F5344CB8AC3E}">
-        <p14:creationId xmlns="" xmlns:p14="http://schemas.microsoft.com/office/powerpoint/2010/main" val="3007787296"/>
+        <p14:creationId xmlns:p14="http://schemas.microsoft.com/office/powerpoint/2010/main" xmlns="" val="3007787296"/>
       </p:ext>
     </p:extLst>
   </p:cSld>
@@ -23489,7 +23473,7 @@
     </p:spTree>
     <p:extLst>
       <p:ext uri="{BB962C8B-B14F-4D97-AF65-F5344CB8AC3E}">
-        <p14:creationId xmlns="" xmlns:p14="http://schemas.microsoft.com/office/powerpoint/2010/main" val="13878138"/>
+        <p14:creationId xmlns:p14="http://schemas.microsoft.com/office/powerpoint/2010/main" xmlns="" val="13878138"/>
       </p:ext>
     </p:extLst>
   </p:cSld>
@@ -23877,7 +23861,7 @@
     </p:spTree>
     <p:extLst>
       <p:ext uri="{BB962C8B-B14F-4D97-AF65-F5344CB8AC3E}">
-        <p14:creationId xmlns="" xmlns:p14="http://schemas.microsoft.com/office/powerpoint/2010/main" val="40929930"/>
+        <p14:creationId xmlns:p14="http://schemas.microsoft.com/office/powerpoint/2010/main" xmlns="" val="40929930"/>
       </p:ext>
     </p:extLst>
   </p:cSld>
@@ -23946,7 +23930,7 @@
           <a:blip r:embed="rId2" cstate="print">
             <a:extLst>
               <a:ext uri="{28A0092B-C50C-407E-A947-70E740481C1C}">
-                <a14:useLocalDpi xmlns="" xmlns:a14="http://schemas.microsoft.com/office/drawing/2010/main" val="0"/>
+                <a14:useLocalDpi xmlns:a14="http://schemas.microsoft.com/office/drawing/2010/main" xmlns="" val="0"/>
               </a:ext>
             </a:extLst>
           </a:blip>
@@ -23967,7 +23951,7 @@
     </p:spTree>
     <p:extLst>
       <p:ext uri="{BB962C8B-B14F-4D97-AF65-F5344CB8AC3E}">
-        <p14:creationId xmlns="" xmlns:p14="http://schemas.microsoft.com/office/powerpoint/2010/main" val="1336479164"/>
+        <p14:creationId xmlns:p14="http://schemas.microsoft.com/office/powerpoint/2010/main" xmlns="" val="1336479164"/>
       </p:ext>
     </p:extLst>
   </p:cSld>
@@ -24073,7 +24057,7 @@
     </p:spTree>
     <p:extLst>
       <p:ext uri="{BB962C8B-B14F-4D97-AF65-F5344CB8AC3E}">
-        <p14:creationId xmlns="" xmlns:p14="http://schemas.microsoft.com/office/powerpoint/2010/main" val="4014343169"/>
+        <p14:creationId xmlns:p14="http://schemas.microsoft.com/office/powerpoint/2010/main" xmlns="" val="4014343169"/>
       </p:ext>
     </p:extLst>
   </p:cSld>
@@ -24224,7 +24208,7 @@
     </p:spTree>
     <p:extLst>
       <p:ext uri="{BB962C8B-B14F-4D97-AF65-F5344CB8AC3E}">
-        <p14:creationId xmlns="" xmlns:p14="http://schemas.microsoft.com/office/powerpoint/2010/main" val="2781303602"/>
+        <p14:creationId xmlns:p14="http://schemas.microsoft.com/office/powerpoint/2010/main" xmlns="" val="2781303602"/>
       </p:ext>
     </p:extLst>
   </p:cSld>
@@ -24411,7 +24395,7 @@
     </p:spTree>
     <p:extLst>
       <p:ext uri="{BB962C8B-B14F-4D97-AF65-F5344CB8AC3E}">
-        <p14:creationId xmlns="" xmlns:p14="http://schemas.microsoft.com/office/powerpoint/2010/main" val="4255503392"/>
+        <p14:creationId xmlns:p14="http://schemas.microsoft.com/office/powerpoint/2010/main" xmlns="" val="4255503392"/>
       </p:ext>
     </p:extLst>
   </p:cSld>
@@ -24571,7 +24555,7 @@
     </p:spTree>
     <p:extLst>
       <p:ext uri="{BB962C8B-B14F-4D97-AF65-F5344CB8AC3E}">
-        <p14:creationId xmlns="" xmlns:p14="http://schemas.microsoft.com/office/powerpoint/2010/main" val="2375505937"/>
+        <p14:creationId xmlns:p14="http://schemas.microsoft.com/office/powerpoint/2010/main" xmlns="" val="2375505937"/>
       </p:ext>
     </p:extLst>
   </p:cSld>
@@ -24702,7 +24686,7 @@
     </p:spTree>
     <p:extLst>
       <p:ext uri="{BB962C8B-B14F-4D97-AF65-F5344CB8AC3E}">
-        <p14:creationId xmlns="" xmlns:p14="http://schemas.microsoft.com/office/powerpoint/2010/main" val="1618189430"/>
+        <p14:creationId xmlns:p14="http://schemas.microsoft.com/office/powerpoint/2010/main" xmlns="" val="1618189430"/>
       </p:ext>
     </p:extLst>
   </p:cSld>
@@ -24710,7 +24694,7 @@
     <a:masterClrMapping/>
   </p:clrMapOvr>
   <mc:AlternateContent xmlns:mc="http://schemas.openxmlformats.org/markup-compatibility/2006">
-    <mc:Choice xmlns="" xmlns:p14="http://schemas.microsoft.com/office/powerpoint/2010/main" Requires="p14">
+    <mc:Choice xmlns:p14="http://schemas.microsoft.com/office/powerpoint/2010/main" xmlns="" Requires="p14">
       <p:transition spd="slow" p14:dur="2000"/>
     </mc:Choice>
     <mc:Fallback>

</xml_diff>

<commit_message>
ajour de quelques remarques, à corriger.
</commit_message>
<xml_diff>
--- a/mdl4ui-docs/mdl4ui_cg2013.pptx
+++ b/mdl4ui-docs/mdl4ui_cg2013.pptx
@@ -259,7 +259,7 @@
             <a:fld id="{9F3D9D59-C69D-478D-98BA-46DD69AE3241}" type="datetimeFigureOut">
               <a:rPr lang="en-US" smtClean="0"/>
               <a:pPr/>
-              <a:t>4/5/2013</a:t>
+              <a:t>4/7/2013</a:t>
             </a:fld>
             <a:endParaRPr lang="en-US"/>
           </a:p>
@@ -335,7 +335,7 @@
     </p:spTree>
     <p:extLst>
       <p:ext uri="{BB962C8B-B14F-4D97-AF65-F5344CB8AC3E}">
-        <p14:creationId xmlns:p14="http://schemas.microsoft.com/office/powerpoint/2010/main" xmlns="" val="70803672"/>
+        <p14:creationId xmlns="" xmlns:p14="http://schemas.microsoft.com/office/powerpoint/2010/main" val="70803672"/>
       </p:ext>
     </p:extLst>
   </p:cSld>
@@ -426,7 +426,7 @@
             <a:fld id="{724035F6-A10F-4A2D-A4E3-1D4F59E0F1A1}" type="datetimeFigureOut">
               <a:rPr lang="en-US" smtClean="0"/>
               <a:pPr/>
-              <a:t>4/5/2013</a:t>
+              <a:t>4/7/2013</a:t>
             </a:fld>
             <a:endParaRPr lang="en-US"/>
           </a:p>
@@ -595,7 +595,7 @@
     </p:spTree>
     <p:extLst>
       <p:ext uri="{BB962C8B-B14F-4D97-AF65-F5344CB8AC3E}">
-        <p14:creationId xmlns:p14="http://schemas.microsoft.com/office/powerpoint/2010/main" xmlns="" val="1701488114"/>
+        <p14:creationId xmlns="" xmlns:p14="http://schemas.microsoft.com/office/powerpoint/2010/main" val="1701488114"/>
       </p:ext>
     </p:extLst>
   </p:cSld>
@@ -770,7 +770,7 @@
     </p:spTree>
     <p:extLst>
       <p:ext uri="{BB962C8B-B14F-4D97-AF65-F5344CB8AC3E}">
-        <p14:creationId xmlns:p14="http://schemas.microsoft.com/office/powerpoint/2010/main" xmlns="" val="2091590988"/>
+        <p14:creationId xmlns="" xmlns:p14="http://schemas.microsoft.com/office/powerpoint/2010/main" val="2091590988"/>
       </p:ext>
     </p:extLst>
   </p:cSld>
@@ -821,10 +821,36 @@
         </p:nvSpPr>
         <p:spPr/>
         <p:txBody>
-          <a:bodyPr/>
+          <a:bodyPr>
+            <a:normAutofit/>
+          </a:bodyPr>
           <a:lstStyle/>
           <a:p>
-            <a:endParaRPr lang="en-US" dirty="0"/>
+            <a:r>
+              <a:rPr lang="fr-FR" dirty="0" smtClean="0"/>
+              <a:t>Supprimer</a:t>
+            </a:r>
+            <a:r>
+              <a:rPr lang="fr-FR" baseline="0" dirty="0" smtClean="0"/>
+              <a:t> le scénario Mail de ce </a:t>
+            </a:r>
+            <a:r>
+              <a:rPr lang="fr-FR" baseline="0" dirty="0" err="1" smtClean="0"/>
+              <a:t>slide</a:t>
+            </a:r>
+            <a:r>
+              <a:rPr lang="fr-FR" baseline="0" dirty="0" smtClean="0"/>
+              <a:t>, pour plus avoir un </a:t>
+            </a:r>
+            <a:r>
+              <a:rPr lang="fr-FR" baseline="0" dirty="0" err="1" smtClean="0"/>
+              <a:t>slide</a:t>
+            </a:r>
+            <a:r>
+              <a:rPr lang="fr-FR" baseline="0" dirty="0" smtClean="0"/>
+              <a:t> plus simple.</a:t>
+            </a:r>
+            <a:endParaRPr lang="fr-FR" dirty="0"/>
           </a:p>
         </p:txBody>
       </p:sp>
@@ -846,18 +872,13 @@
             <a:fld id="{1C995A55-B5EF-47FB-BCEC-1018828F2E10}" type="slidenum">
               <a:rPr lang="en-US" smtClean="0"/>
               <a:pPr/>
-              <a:t>41</a:t>
+              <a:t>24</a:t>
             </a:fld>
             <a:endParaRPr lang="en-US"/>
           </a:p>
         </p:txBody>
       </p:sp>
     </p:spTree>
-    <p:extLst>
-      <p:ext uri="{BB962C8B-B14F-4D97-AF65-F5344CB8AC3E}">
-        <p14:creationId xmlns:p14="http://schemas.microsoft.com/office/powerpoint/2010/main" xmlns="" val="3047004223"/>
-      </p:ext>
-    </p:extLst>
   </p:cSld>
   <p:clrMapOvr>
     <a:masterClrMapping/>
@@ -931,7 +952,7 @@
             <a:fld id="{1C995A55-B5EF-47FB-BCEC-1018828F2E10}" type="slidenum">
               <a:rPr lang="en-US" smtClean="0"/>
               <a:pPr/>
-              <a:t>43</a:t>
+              <a:t>41</a:t>
             </a:fld>
             <a:endParaRPr lang="en-US"/>
           </a:p>
@@ -940,7 +961,7 @@
     </p:spTree>
     <p:extLst>
       <p:ext uri="{BB962C8B-B14F-4D97-AF65-F5344CB8AC3E}">
-        <p14:creationId xmlns:p14="http://schemas.microsoft.com/office/powerpoint/2010/main" xmlns="" val="3280979232"/>
+        <p14:creationId xmlns="" xmlns:p14="http://schemas.microsoft.com/office/powerpoint/2010/main" val="3047004223"/>
       </p:ext>
     </p:extLst>
   </p:cSld>
@@ -994,6 +1015,30 @@
           <a:bodyPr/>
           <a:lstStyle/>
           <a:p>
+            <a:r>
+              <a:rPr lang="en-US" dirty="0" smtClean="0"/>
+              <a:t>Animation</a:t>
+            </a:r>
+            <a:r>
+              <a:rPr lang="en-US" baseline="0" dirty="0" smtClean="0"/>
+              <a:t> pour </a:t>
+            </a:r>
+            <a:r>
+              <a:rPr lang="en-US" baseline="0" dirty="0" err="1" smtClean="0"/>
+              <a:t>introduire</a:t>
+            </a:r>
+            <a:r>
+              <a:rPr lang="en-US" baseline="0" dirty="0" smtClean="0"/>
+              <a:t> </a:t>
+            </a:r>
+            <a:r>
+              <a:rPr lang="en-US" baseline="0" dirty="0" err="1" smtClean="0"/>
+              <a:t>l’annotation</a:t>
+            </a:r>
+            <a:r>
+              <a:rPr lang="en-US" baseline="0" smtClean="0"/>
+              <a:t>?</a:t>
+            </a:r>
             <a:endParaRPr lang="en-US" dirty="0"/>
           </a:p>
         </p:txBody>
@@ -1016,7 +1061,7 @@
             <a:fld id="{1C995A55-B5EF-47FB-BCEC-1018828F2E10}" type="slidenum">
               <a:rPr lang="en-US" smtClean="0"/>
               <a:pPr/>
-              <a:t>47</a:t>
+              <a:t>43</a:t>
             </a:fld>
             <a:endParaRPr lang="en-US"/>
           </a:p>
@@ -1025,7 +1070,7 @@
     </p:spTree>
     <p:extLst>
       <p:ext uri="{BB962C8B-B14F-4D97-AF65-F5344CB8AC3E}">
-        <p14:creationId xmlns:p14="http://schemas.microsoft.com/office/powerpoint/2010/main" xmlns="" val="1987381696"/>
+        <p14:creationId xmlns="" xmlns:p14="http://schemas.microsoft.com/office/powerpoint/2010/main" val="3280979232"/>
       </p:ext>
     </p:extLst>
   </p:cSld>
@@ -1076,6 +1121,91 @@
         </p:nvSpPr>
         <p:spPr/>
         <p:txBody>
+          <a:bodyPr/>
+          <a:lstStyle/>
+          <a:p>
+            <a:endParaRPr lang="en-US" dirty="0"/>
+          </a:p>
+        </p:txBody>
+      </p:sp>
+      <p:sp>
+        <p:nvSpPr>
+          <p:cNvPr id="4" name="Espace réservé du numéro de diapositive 3"/>
+          <p:cNvSpPr>
+            <a:spLocks noGrp="1"/>
+          </p:cNvSpPr>
+          <p:nvPr>
+            <p:ph type="sldNum" sz="quarter" idx="10"/>
+          </p:nvPr>
+        </p:nvSpPr>
+        <p:spPr/>
+        <p:txBody>
+          <a:bodyPr/>
+          <a:lstStyle/>
+          <a:p>
+            <a:fld id="{1C995A55-B5EF-47FB-BCEC-1018828F2E10}" type="slidenum">
+              <a:rPr lang="en-US" smtClean="0"/>
+              <a:pPr/>
+              <a:t>47</a:t>
+            </a:fld>
+            <a:endParaRPr lang="en-US"/>
+          </a:p>
+        </p:txBody>
+      </p:sp>
+    </p:spTree>
+    <p:extLst>
+      <p:ext uri="{BB962C8B-B14F-4D97-AF65-F5344CB8AC3E}">
+        <p14:creationId xmlns="" xmlns:p14="http://schemas.microsoft.com/office/powerpoint/2010/main" val="1987381696"/>
+      </p:ext>
+    </p:extLst>
+  </p:cSld>
+  <p:clrMapOvr>
+    <a:masterClrMapping/>
+  </p:clrMapOvr>
+</p:notes>
+</file>
+
+<file path=ppt/notesSlides/notesSlide6.xml><?xml version="1.0" encoding="utf-8"?>
+<p:notes xmlns:a="http://schemas.openxmlformats.org/drawingml/2006/main" xmlns:r="http://schemas.openxmlformats.org/officeDocument/2006/relationships" xmlns:p="http://schemas.openxmlformats.org/presentationml/2006/main">
+  <p:cSld>
+    <p:spTree>
+      <p:nvGrpSpPr>
+        <p:cNvPr id="1" name=""/>
+        <p:cNvGrpSpPr/>
+        <p:nvPr/>
+      </p:nvGrpSpPr>
+      <p:grpSpPr>
+        <a:xfrm>
+          <a:off x="0" y="0"/>
+          <a:ext cx="0" cy="0"/>
+          <a:chOff x="0" y="0"/>
+          <a:chExt cx="0" cy="0"/>
+        </a:xfrm>
+      </p:grpSpPr>
+      <p:sp>
+        <p:nvSpPr>
+          <p:cNvPr id="2" name="Espace réservé de l'image des diapositives 1"/>
+          <p:cNvSpPr>
+            <a:spLocks noGrp="1" noRot="1" noChangeAspect="1"/>
+          </p:cNvSpPr>
+          <p:nvPr>
+            <p:ph type="sldImg"/>
+          </p:nvPr>
+        </p:nvSpPr>
+        <p:spPr/>
+      </p:sp>
+      <p:sp>
+        <p:nvSpPr>
+          <p:cNvPr id="3" name="Espace réservé des commentaires 2"/>
+          <p:cNvSpPr>
+            <a:spLocks noGrp="1"/>
+          </p:cNvSpPr>
+          <p:nvPr>
+            <p:ph type="body" idx="1"/>
+          </p:nvPr>
+        </p:nvSpPr>
+        <p:spPr/>
+        <p:txBody>
           <a:bodyPr>
             <a:normAutofit/>
           </a:bodyPr>
@@ -1299,7 +1429,7 @@
             <a:fld id="{1B5268FF-0D67-4269-9FD2-93B489DF800A}" type="datetimeFigureOut">
               <a:rPr lang="fr-FR" smtClean="0"/>
               <a:pPr/>
-              <a:t>05/04/2013</a:t>
+              <a:t>07/04/2013</a:t>
             </a:fld>
             <a:endParaRPr lang="fr-FR"/>
           </a:p>
@@ -1351,7 +1481,7 @@
     </p:spTree>
     <p:extLst>
       <p:ext uri="{BB962C8B-B14F-4D97-AF65-F5344CB8AC3E}">
-        <p14:creationId xmlns:p14="http://schemas.microsoft.com/office/powerpoint/2010/main" xmlns="" val="322609761"/>
+        <p14:creationId xmlns="" xmlns:p14="http://schemas.microsoft.com/office/powerpoint/2010/main" val="322609761"/>
       </p:ext>
     </p:extLst>
   </p:cSld>
@@ -1471,7 +1601,7 @@
             <a:fld id="{1B5268FF-0D67-4269-9FD2-93B489DF800A}" type="datetimeFigureOut">
               <a:rPr lang="fr-FR" smtClean="0"/>
               <a:pPr/>
-              <a:t>05/04/2013</a:t>
+              <a:t>07/04/2013</a:t>
             </a:fld>
             <a:endParaRPr lang="fr-FR"/>
           </a:p>
@@ -1523,7 +1653,7 @@
     </p:spTree>
     <p:extLst>
       <p:ext uri="{BB962C8B-B14F-4D97-AF65-F5344CB8AC3E}">
-        <p14:creationId xmlns:p14="http://schemas.microsoft.com/office/powerpoint/2010/main" xmlns="" val="1248456722"/>
+        <p14:creationId xmlns="" xmlns:p14="http://schemas.microsoft.com/office/powerpoint/2010/main" val="1248456722"/>
       </p:ext>
     </p:extLst>
   </p:cSld>
@@ -1653,7 +1783,7 @@
             <a:fld id="{1B5268FF-0D67-4269-9FD2-93B489DF800A}" type="datetimeFigureOut">
               <a:rPr lang="fr-FR" smtClean="0"/>
               <a:pPr/>
-              <a:t>05/04/2013</a:t>
+              <a:t>07/04/2013</a:t>
             </a:fld>
             <a:endParaRPr lang="fr-FR"/>
           </a:p>
@@ -1705,7 +1835,7 @@
     </p:spTree>
     <p:extLst>
       <p:ext uri="{BB962C8B-B14F-4D97-AF65-F5344CB8AC3E}">
-        <p14:creationId xmlns:p14="http://schemas.microsoft.com/office/powerpoint/2010/main" xmlns="" val="4236232986"/>
+        <p14:creationId xmlns="" xmlns:p14="http://schemas.microsoft.com/office/powerpoint/2010/main" val="4236232986"/>
       </p:ext>
     </p:extLst>
   </p:cSld>
@@ -1825,7 +1955,7 @@
             <a:fld id="{1B5268FF-0D67-4269-9FD2-93B489DF800A}" type="datetimeFigureOut">
               <a:rPr lang="fr-FR" smtClean="0"/>
               <a:pPr/>
-              <a:t>05/04/2013</a:t>
+              <a:t>07/04/2013</a:t>
             </a:fld>
             <a:endParaRPr lang="fr-FR"/>
           </a:p>
@@ -1877,7 +2007,7 @@
     </p:spTree>
     <p:extLst>
       <p:ext uri="{BB962C8B-B14F-4D97-AF65-F5344CB8AC3E}">
-        <p14:creationId xmlns:p14="http://schemas.microsoft.com/office/powerpoint/2010/main" xmlns="" val="3454835055"/>
+        <p14:creationId xmlns="" xmlns:p14="http://schemas.microsoft.com/office/powerpoint/2010/main" val="3454835055"/>
       </p:ext>
     </p:extLst>
   </p:cSld>
@@ -2080,7 +2210,7 @@
             <a:fld id="{1B5268FF-0D67-4269-9FD2-93B489DF800A}" type="datetimeFigureOut">
               <a:rPr lang="fr-FR" smtClean="0"/>
               <a:pPr/>
-              <a:t>05/04/2013</a:t>
+              <a:t>07/04/2013</a:t>
             </a:fld>
             <a:endParaRPr lang="fr-FR"/>
           </a:p>
@@ -2132,7 +2262,7 @@
     </p:spTree>
     <p:extLst>
       <p:ext uri="{BB962C8B-B14F-4D97-AF65-F5344CB8AC3E}">
-        <p14:creationId xmlns:p14="http://schemas.microsoft.com/office/powerpoint/2010/main" xmlns="" val="804127244"/>
+        <p14:creationId xmlns="" xmlns:p14="http://schemas.microsoft.com/office/powerpoint/2010/main" val="804127244"/>
       </p:ext>
     </p:extLst>
   </p:cSld>
@@ -2370,7 +2500,7 @@
             <a:fld id="{1B5268FF-0D67-4269-9FD2-93B489DF800A}" type="datetimeFigureOut">
               <a:rPr lang="fr-FR" smtClean="0"/>
               <a:pPr/>
-              <a:t>05/04/2013</a:t>
+              <a:t>07/04/2013</a:t>
             </a:fld>
             <a:endParaRPr lang="fr-FR"/>
           </a:p>
@@ -2422,7 +2552,7 @@
     </p:spTree>
     <p:extLst>
       <p:ext uri="{BB962C8B-B14F-4D97-AF65-F5344CB8AC3E}">
-        <p14:creationId xmlns:p14="http://schemas.microsoft.com/office/powerpoint/2010/main" xmlns="" val="586698658"/>
+        <p14:creationId xmlns="" xmlns:p14="http://schemas.microsoft.com/office/powerpoint/2010/main" val="586698658"/>
       </p:ext>
     </p:extLst>
   </p:cSld>
@@ -2794,7 +2924,7 @@
             <a:fld id="{1B5268FF-0D67-4269-9FD2-93B489DF800A}" type="datetimeFigureOut">
               <a:rPr lang="fr-FR" smtClean="0"/>
               <a:pPr/>
-              <a:t>05/04/2013</a:t>
+              <a:t>07/04/2013</a:t>
             </a:fld>
             <a:endParaRPr lang="fr-FR"/>
           </a:p>
@@ -2846,7 +2976,7 @@
     </p:spTree>
     <p:extLst>
       <p:ext uri="{BB962C8B-B14F-4D97-AF65-F5344CB8AC3E}">
-        <p14:creationId xmlns:p14="http://schemas.microsoft.com/office/powerpoint/2010/main" xmlns="" val="19144436"/>
+        <p14:creationId xmlns="" xmlns:p14="http://schemas.microsoft.com/office/powerpoint/2010/main" val="19144436"/>
       </p:ext>
     </p:extLst>
   </p:cSld>
@@ -2914,7 +3044,7 @@
             <a:fld id="{1B5268FF-0D67-4269-9FD2-93B489DF800A}" type="datetimeFigureOut">
               <a:rPr lang="fr-FR" smtClean="0"/>
               <a:pPr/>
-              <a:t>05/04/2013</a:t>
+              <a:t>07/04/2013</a:t>
             </a:fld>
             <a:endParaRPr lang="fr-FR"/>
           </a:p>
@@ -2966,7 +3096,7 @@
     </p:spTree>
     <p:extLst>
       <p:ext uri="{BB962C8B-B14F-4D97-AF65-F5344CB8AC3E}">
-        <p14:creationId xmlns:p14="http://schemas.microsoft.com/office/powerpoint/2010/main" xmlns="" val="202749597"/>
+        <p14:creationId xmlns="" xmlns:p14="http://schemas.microsoft.com/office/powerpoint/2010/main" val="202749597"/>
       </p:ext>
     </p:extLst>
   </p:cSld>
@@ -3011,7 +3141,7 @@
             <a:fld id="{1B5268FF-0D67-4269-9FD2-93B489DF800A}" type="datetimeFigureOut">
               <a:rPr lang="fr-FR" smtClean="0"/>
               <a:pPr/>
-              <a:t>05/04/2013</a:t>
+              <a:t>07/04/2013</a:t>
             </a:fld>
             <a:endParaRPr lang="fr-FR"/>
           </a:p>
@@ -3063,7 +3193,7 @@
     </p:spTree>
     <p:extLst>
       <p:ext uri="{BB962C8B-B14F-4D97-AF65-F5344CB8AC3E}">
-        <p14:creationId xmlns:p14="http://schemas.microsoft.com/office/powerpoint/2010/main" xmlns="" val="2898363528"/>
+        <p14:creationId xmlns="" xmlns:p14="http://schemas.microsoft.com/office/powerpoint/2010/main" val="2898363528"/>
       </p:ext>
     </p:extLst>
   </p:cSld>
@@ -3290,7 +3420,7 @@
             <a:fld id="{1B5268FF-0D67-4269-9FD2-93B489DF800A}" type="datetimeFigureOut">
               <a:rPr lang="fr-FR" smtClean="0"/>
               <a:pPr/>
-              <a:t>05/04/2013</a:t>
+              <a:t>07/04/2013</a:t>
             </a:fld>
             <a:endParaRPr lang="fr-FR"/>
           </a:p>
@@ -3342,7 +3472,7 @@
     </p:spTree>
     <p:extLst>
       <p:ext uri="{BB962C8B-B14F-4D97-AF65-F5344CB8AC3E}">
-        <p14:creationId xmlns:p14="http://schemas.microsoft.com/office/powerpoint/2010/main" xmlns="" val="4010598191"/>
+        <p14:creationId xmlns="" xmlns:p14="http://schemas.microsoft.com/office/powerpoint/2010/main" val="4010598191"/>
       </p:ext>
     </p:extLst>
   </p:cSld>
@@ -3545,7 +3675,7 @@
             <a:fld id="{1B5268FF-0D67-4269-9FD2-93B489DF800A}" type="datetimeFigureOut">
               <a:rPr lang="fr-FR" smtClean="0"/>
               <a:pPr/>
-              <a:t>05/04/2013</a:t>
+              <a:t>07/04/2013</a:t>
             </a:fld>
             <a:endParaRPr lang="fr-FR"/>
           </a:p>
@@ -3597,7 +3727,7 @@
     </p:spTree>
     <p:extLst>
       <p:ext uri="{BB962C8B-B14F-4D97-AF65-F5344CB8AC3E}">
-        <p14:creationId xmlns:p14="http://schemas.microsoft.com/office/powerpoint/2010/main" xmlns="" val="1433498939"/>
+        <p14:creationId xmlns="" xmlns:p14="http://schemas.microsoft.com/office/powerpoint/2010/main" val="1433498939"/>
       </p:ext>
     </p:extLst>
   </p:cSld>
@@ -3760,7 +3890,7 @@
             <a:fld id="{1B5268FF-0D67-4269-9FD2-93B489DF800A}" type="datetimeFigureOut">
               <a:rPr lang="fr-FR" smtClean="0"/>
               <a:pPr/>
-              <a:t>05/04/2013</a:t>
+              <a:t>07/04/2013</a:t>
             </a:fld>
             <a:endParaRPr lang="fr-FR"/>
           </a:p>
@@ -3857,7 +3987,7 @@
           <a:blip r:embed="rId13" cstate="print">
             <a:extLst>
               <a:ext uri="{28A0092B-C50C-407E-A947-70E740481C1C}">
-                <a14:useLocalDpi xmlns:a14="http://schemas.microsoft.com/office/drawing/2010/main" xmlns="" val="0"/>
+                <a14:useLocalDpi xmlns="" xmlns:a14="http://schemas.microsoft.com/office/drawing/2010/main" val="0"/>
               </a:ext>
             </a:extLst>
           </a:blip>
@@ -3878,7 +4008,7 @@
     </p:spTree>
     <p:extLst>
       <p:ext uri="{BB962C8B-B14F-4D97-AF65-F5344CB8AC3E}">
-        <p14:creationId xmlns:p14="http://schemas.microsoft.com/office/powerpoint/2010/main" xmlns="" val="2684825788"/>
+        <p14:creationId xmlns="" xmlns:p14="http://schemas.microsoft.com/office/powerpoint/2010/main" val="2684825788"/>
       </p:ext>
     </p:extLst>
   </p:cSld>
@@ -4249,7 +4379,7 @@
     </p:spTree>
     <p:extLst>
       <p:ext uri="{BB962C8B-B14F-4D97-AF65-F5344CB8AC3E}">
-        <p14:creationId xmlns:p14="http://schemas.microsoft.com/office/powerpoint/2010/main" xmlns="" val="3955344790"/>
+        <p14:creationId xmlns="" xmlns:p14="http://schemas.microsoft.com/office/powerpoint/2010/main" val="3955344790"/>
       </p:ext>
     </p:extLst>
   </p:cSld>
@@ -4257,7 +4387,7 @@
     <a:masterClrMapping/>
   </p:clrMapOvr>
   <mc:AlternateContent xmlns:mc="http://schemas.openxmlformats.org/markup-compatibility/2006">
-    <mc:Choice xmlns:p14="http://schemas.microsoft.com/office/powerpoint/2010/main" xmlns="" Requires="p14">
+    <mc:Choice xmlns="" xmlns:p14="http://schemas.microsoft.com/office/powerpoint/2010/main" Requires="p14">
       <p:transition spd="slow" p14:dur="2000"/>
     </mc:Choice>
     <mc:Fallback>
@@ -4430,7 +4560,7 @@
     </p:spTree>
     <p:extLst>
       <p:ext uri="{BB962C8B-B14F-4D97-AF65-F5344CB8AC3E}">
-        <p14:creationId xmlns:p14="http://schemas.microsoft.com/office/powerpoint/2010/main" xmlns="" val="3644490438"/>
+        <p14:creationId xmlns="" xmlns:p14="http://schemas.microsoft.com/office/powerpoint/2010/main" val="3644490438"/>
       </p:ext>
     </p:extLst>
   </p:cSld>
@@ -5172,7 +5302,7 @@
             <a:blip r:embed="rId2" cstate="print">
               <a:extLst>
                 <a:ext uri="{28A0092B-C50C-407E-A947-70E740481C1C}">
-                  <a14:useLocalDpi xmlns:a14="http://schemas.microsoft.com/office/drawing/2010/main" xmlns="" val="0"/>
+                  <a14:useLocalDpi xmlns="" xmlns:a14="http://schemas.microsoft.com/office/drawing/2010/main" val="0"/>
                 </a:ext>
               </a:extLst>
             </a:blip>
@@ -5202,7 +5332,7 @@
             <a:blip r:embed="rId3" cstate="print">
               <a:extLst>
                 <a:ext uri="{28A0092B-C50C-407E-A947-70E740481C1C}">
-                  <a14:useLocalDpi xmlns:a14="http://schemas.microsoft.com/office/drawing/2010/main" xmlns="" val="0"/>
+                  <a14:useLocalDpi xmlns="" xmlns:a14="http://schemas.microsoft.com/office/drawing/2010/main" val="0"/>
                 </a:ext>
               </a:extLst>
             </a:blip>
@@ -5250,7 +5380,7 @@
     </p:spTree>
     <p:extLst>
       <p:ext uri="{BB962C8B-B14F-4D97-AF65-F5344CB8AC3E}">
-        <p14:creationId xmlns:p14="http://schemas.microsoft.com/office/powerpoint/2010/main" xmlns="" val="1377264780"/>
+        <p14:creationId xmlns="" xmlns:p14="http://schemas.microsoft.com/office/powerpoint/2010/main" val="1377264780"/>
       </p:ext>
     </p:extLst>
   </p:cSld>
@@ -5425,7 +5555,7 @@
           <a:blip r:embed="rId2" cstate="print">
             <a:extLst>
               <a:ext uri="{28A0092B-C50C-407E-A947-70E740481C1C}">
-                <a14:useLocalDpi xmlns:a14="http://schemas.microsoft.com/office/drawing/2010/main" xmlns="" val="0"/>
+                <a14:useLocalDpi xmlns="" xmlns:a14="http://schemas.microsoft.com/office/drawing/2010/main" val="0"/>
               </a:ext>
             </a:extLst>
           </a:blip>
@@ -5455,7 +5585,7 @@
           <a:blip r:embed="rId3" cstate="print">
             <a:extLst>
               <a:ext uri="{28A0092B-C50C-407E-A947-70E740481C1C}">
-                <a14:useLocalDpi xmlns:a14="http://schemas.microsoft.com/office/drawing/2010/main" xmlns="" val="0"/>
+                <a14:useLocalDpi xmlns="" xmlns:a14="http://schemas.microsoft.com/office/drawing/2010/main" val="0"/>
               </a:ext>
             </a:extLst>
           </a:blip>
@@ -5713,7 +5843,7 @@
     </p:spTree>
     <p:extLst>
       <p:ext uri="{BB962C8B-B14F-4D97-AF65-F5344CB8AC3E}">
-        <p14:creationId xmlns:p14="http://schemas.microsoft.com/office/powerpoint/2010/main" xmlns="" val="3336203041"/>
+        <p14:creationId xmlns="" xmlns:p14="http://schemas.microsoft.com/office/powerpoint/2010/main" val="3336203041"/>
       </p:ext>
     </p:extLst>
   </p:cSld>
@@ -6108,7 +6238,7 @@
           <a:blip r:embed="rId2" cstate="print">
             <a:extLst>
               <a:ext uri="{28A0092B-C50C-407E-A947-70E740481C1C}">
-                <a14:useLocalDpi xmlns:a14="http://schemas.microsoft.com/office/drawing/2010/main" xmlns="" val="0"/>
+                <a14:useLocalDpi xmlns="" xmlns:a14="http://schemas.microsoft.com/office/drawing/2010/main" val="0"/>
               </a:ext>
             </a:extLst>
           </a:blip>
@@ -6138,7 +6268,7 @@
           <a:blip r:embed="rId3" cstate="print">
             <a:extLst>
               <a:ext uri="{28A0092B-C50C-407E-A947-70E740481C1C}">
-                <a14:useLocalDpi xmlns:a14="http://schemas.microsoft.com/office/drawing/2010/main" xmlns="" val="0"/>
+                <a14:useLocalDpi xmlns="" xmlns:a14="http://schemas.microsoft.com/office/drawing/2010/main" val="0"/>
               </a:ext>
             </a:extLst>
           </a:blip>
@@ -6300,7 +6430,7 @@
     </p:spTree>
     <p:extLst>
       <p:ext uri="{BB962C8B-B14F-4D97-AF65-F5344CB8AC3E}">
-        <p14:creationId xmlns:p14="http://schemas.microsoft.com/office/powerpoint/2010/main" xmlns="" val="864210357"/>
+        <p14:creationId xmlns="" xmlns:p14="http://schemas.microsoft.com/office/powerpoint/2010/main" val="864210357"/>
       </p:ext>
     </p:extLst>
   </p:cSld>
@@ -6574,7 +6704,7 @@
           <a:blip r:embed="rId2" cstate="print">
             <a:extLst>
               <a:ext uri="{28A0092B-C50C-407E-A947-70E740481C1C}">
-                <a14:useLocalDpi xmlns:a14="http://schemas.microsoft.com/office/drawing/2010/main" xmlns="" val="0"/>
+                <a14:useLocalDpi xmlns="" xmlns:a14="http://schemas.microsoft.com/office/drawing/2010/main" val="0"/>
               </a:ext>
             </a:extLst>
           </a:blip>
@@ -6604,7 +6734,7 @@
           <a:blip r:embed="rId3" cstate="print">
             <a:extLst>
               <a:ext uri="{28A0092B-C50C-407E-A947-70E740481C1C}">
-                <a14:useLocalDpi xmlns:a14="http://schemas.microsoft.com/office/drawing/2010/main" xmlns="" val="0"/>
+                <a14:useLocalDpi xmlns="" xmlns:a14="http://schemas.microsoft.com/office/drawing/2010/main" val="0"/>
               </a:ext>
             </a:extLst>
           </a:blip>
@@ -7316,7 +7446,7 @@
     </p:spTree>
     <p:extLst>
       <p:ext uri="{BB962C8B-B14F-4D97-AF65-F5344CB8AC3E}">
-        <p14:creationId xmlns:p14="http://schemas.microsoft.com/office/powerpoint/2010/main" xmlns="" val="3336203041"/>
+        <p14:creationId xmlns="" xmlns:p14="http://schemas.microsoft.com/office/powerpoint/2010/main" val="3336203041"/>
       </p:ext>
     </p:extLst>
   </p:cSld>
@@ -8008,7 +8138,7 @@
     </p:spTree>
     <p:extLst>
       <p:ext uri="{BB962C8B-B14F-4D97-AF65-F5344CB8AC3E}">
-        <p14:creationId xmlns:p14="http://schemas.microsoft.com/office/powerpoint/2010/main" xmlns="" val="3627640579"/>
+        <p14:creationId xmlns="" xmlns:p14="http://schemas.microsoft.com/office/powerpoint/2010/main" val="3627640579"/>
       </p:ext>
     </p:extLst>
   </p:cSld>
@@ -8218,7 +8348,7 @@
     </p:spTree>
     <p:extLst>
       <p:ext uri="{BB962C8B-B14F-4D97-AF65-F5344CB8AC3E}">
-        <p14:creationId xmlns:p14="http://schemas.microsoft.com/office/powerpoint/2010/main" xmlns="" val="171061288"/>
+        <p14:creationId xmlns="" xmlns:p14="http://schemas.microsoft.com/office/powerpoint/2010/main" val="171061288"/>
       </p:ext>
     </p:extLst>
   </p:cSld>
@@ -8495,7 +8625,7 @@
     </p:spTree>
     <p:extLst>
       <p:ext uri="{BB962C8B-B14F-4D97-AF65-F5344CB8AC3E}">
-        <p14:creationId xmlns:p14="http://schemas.microsoft.com/office/powerpoint/2010/main" xmlns="" val="394514968"/>
+        <p14:creationId xmlns="" xmlns:p14="http://schemas.microsoft.com/office/powerpoint/2010/main" val="394514968"/>
       </p:ext>
     </p:extLst>
   </p:cSld>
@@ -8765,7 +8895,7 @@
           <a:blip r:embed="rId2" cstate="print">
             <a:extLst>
               <a:ext uri="{28A0092B-C50C-407E-A947-70E740481C1C}">
-                <a14:useLocalDpi xmlns:a14="http://schemas.microsoft.com/office/drawing/2010/main" xmlns=""/>
+                <a14:useLocalDpi xmlns="" xmlns:a14="http://schemas.microsoft.com/office/drawing/2010/main"/>
               </a:ext>
             </a:extLst>
           </a:blip>
@@ -8790,7 +8920,7 @@
     </p:spTree>
     <p:extLst>
       <p:ext uri="{BB962C8B-B14F-4D97-AF65-F5344CB8AC3E}">
-        <p14:creationId xmlns:p14="http://schemas.microsoft.com/office/powerpoint/2010/main" xmlns="" val="1630604182"/>
+        <p14:creationId xmlns="" xmlns:p14="http://schemas.microsoft.com/office/powerpoint/2010/main" val="1630604182"/>
       </p:ext>
     </p:extLst>
   </p:cSld>
@@ -9001,7 +9131,7 @@
     </p:spTree>
     <p:extLst>
       <p:ext uri="{BB962C8B-B14F-4D97-AF65-F5344CB8AC3E}">
-        <p14:creationId xmlns:p14="http://schemas.microsoft.com/office/powerpoint/2010/main" xmlns="" val="3593113261"/>
+        <p14:creationId xmlns="" xmlns:p14="http://schemas.microsoft.com/office/powerpoint/2010/main" val="3593113261"/>
       </p:ext>
     </p:extLst>
   </p:cSld>
@@ -9231,7 +9361,7 @@
     </p:spTree>
     <p:extLst>
       <p:ext uri="{BB962C8B-B14F-4D97-AF65-F5344CB8AC3E}">
-        <p14:creationId xmlns:p14="http://schemas.microsoft.com/office/powerpoint/2010/main" xmlns="" val="451913240"/>
+        <p14:creationId xmlns="" xmlns:p14="http://schemas.microsoft.com/office/powerpoint/2010/main" val="451913240"/>
       </p:ext>
     </p:extLst>
   </p:cSld>
@@ -9493,7 +9623,7 @@
     </p:spTree>
     <p:extLst>
       <p:ext uri="{BB962C8B-B14F-4D97-AF65-F5344CB8AC3E}">
-        <p14:creationId xmlns:p14="http://schemas.microsoft.com/office/powerpoint/2010/main" xmlns="" val="2009636028"/>
+        <p14:creationId xmlns="" xmlns:p14="http://schemas.microsoft.com/office/powerpoint/2010/main" val="2009636028"/>
       </p:ext>
     </p:extLst>
   </p:cSld>
@@ -9755,7 +9885,7 @@
     </p:spTree>
     <p:extLst>
       <p:ext uri="{BB962C8B-B14F-4D97-AF65-F5344CB8AC3E}">
-        <p14:creationId xmlns:p14="http://schemas.microsoft.com/office/powerpoint/2010/main" xmlns="" val="1131833659"/>
+        <p14:creationId xmlns="" xmlns:p14="http://schemas.microsoft.com/office/powerpoint/2010/main" val="1131833659"/>
       </p:ext>
     </p:extLst>
   </p:cSld>
@@ -9821,10 +9951,10 @@
           <p:nvPr/>
         </p:nvPicPr>
         <p:blipFill>
-          <a:blip r:embed="rId2" cstate="print">
+          <a:blip r:embed="rId3" cstate="print">
             <a:extLst>
               <a:ext uri="{28A0092B-C50C-407E-A947-70E740481C1C}">
-                <a14:useLocalDpi xmlns:a14="http://schemas.microsoft.com/office/drawing/2010/main" xmlns="" val="0"/>
+                <a14:useLocalDpi xmlns="" xmlns:a14="http://schemas.microsoft.com/office/drawing/2010/main" val="0"/>
               </a:ext>
             </a:extLst>
           </a:blip>
@@ -9845,7 +9975,7 @@
     </p:spTree>
     <p:extLst>
       <p:ext uri="{BB962C8B-B14F-4D97-AF65-F5344CB8AC3E}">
-        <p14:creationId xmlns:p14="http://schemas.microsoft.com/office/powerpoint/2010/main" xmlns="" val="1848404178"/>
+        <p14:creationId xmlns="" xmlns:p14="http://schemas.microsoft.com/office/powerpoint/2010/main" val="1848404178"/>
       </p:ext>
     </p:extLst>
   </p:cSld>
@@ -10029,7 +10159,7 @@
     </p:spTree>
     <p:extLst>
       <p:ext uri="{BB962C8B-B14F-4D97-AF65-F5344CB8AC3E}">
-        <p14:creationId xmlns:p14="http://schemas.microsoft.com/office/powerpoint/2010/main" xmlns="" val="1155854373"/>
+        <p14:creationId xmlns="" xmlns:p14="http://schemas.microsoft.com/office/powerpoint/2010/main" val="1155854373"/>
       </p:ext>
     </p:extLst>
   </p:cSld>
@@ -10495,7 +10625,7 @@
     </p:spTree>
     <p:extLst>
       <p:ext uri="{BB962C8B-B14F-4D97-AF65-F5344CB8AC3E}">
-        <p14:creationId xmlns:p14="http://schemas.microsoft.com/office/powerpoint/2010/main" xmlns="" val="1027356186"/>
+        <p14:creationId xmlns="" xmlns:p14="http://schemas.microsoft.com/office/powerpoint/2010/main" val="1027356186"/>
       </p:ext>
     </p:extLst>
   </p:cSld>
@@ -10564,7 +10694,7 @@
           <a:blip r:embed="rId2" cstate="print">
             <a:extLst>
               <a:ext uri="{28A0092B-C50C-407E-A947-70E740481C1C}">
-                <a14:useLocalDpi xmlns:a14="http://schemas.microsoft.com/office/drawing/2010/main" xmlns="" val="0"/>
+                <a14:useLocalDpi xmlns="" xmlns:a14="http://schemas.microsoft.com/office/drawing/2010/main" val="0"/>
               </a:ext>
             </a:extLst>
           </a:blip>
@@ -10594,7 +10724,7 @@
           <a:blip r:embed="rId3" cstate="print">
             <a:extLst>
               <a:ext uri="{28A0092B-C50C-407E-A947-70E740481C1C}">
-                <a14:useLocalDpi xmlns:a14="http://schemas.microsoft.com/office/drawing/2010/main" xmlns="" val="0"/>
+                <a14:useLocalDpi xmlns="" xmlns:a14="http://schemas.microsoft.com/office/drawing/2010/main" val="0"/>
               </a:ext>
             </a:extLst>
           </a:blip>
@@ -10618,7 +10748,7 @@
     </p:spTree>
     <p:extLst>
       <p:ext uri="{BB962C8B-B14F-4D97-AF65-F5344CB8AC3E}">
-        <p14:creationId xmlns:p14="http://schemas.microsoft.com/office/powerpoint/2010/main" xmlns="" val="2369171751"/>
+        <p14:creationId xmlns="" xmlns:p14="http://schemas.microsoft.com/office/powerpoint/2010/main" val="2369171751"/>
       </p:ext>
     </p:extLst>
   </p:cSld>
@@ -10739,7 +10869,7 @@
           <a:blip r:embed="rId4" cstate="print">
             <a:extLst>
               <a:ext uri="{28A0092B-C50C-407E-A947-70E740481C1C}">
-                <a14:useLocalDpi xmlns:a14="http://schemas.microsoft.com/office/drawing/2010/main" xmlns="" val="0"/>
+                <a14:useLocalDpi xmlns="" xmlns:a14="http://schemas.microsoft.com/office/drawing/2010/main" val="0"/>
               </a:ext>
             </a:extLst>
           </a:blip>
@@ -10855,7 +10985,7 @@
     </p:spTree>
     <p:extLst>
       <p:ext uri="{BB962C8B-B14F-4D97-AF65-F5344CB8AC3E}">
-        <p14:creationId xmlns:p14="http://schemas.microsoft.com/office/powerpoint/2010/main" xmlns="" val="3216378839"/>
+        <p14:creationId xmlns="" xmlns:p14="http://schemas.microsoft.com/office/powerpoint/2010/main" val="3216378839"/>
       </p:ext>
     </p:extLst>
   </p:cSld>
@@ -11174,7 +11304,7 @@
           <a:blip r:embed="rId2" cstate="print">
             <a:extLst>
               <a:ext uri="{28A0092B-C50C-407E-A947-70E740481C1C}">
-                <a14:useLocalDpi xmlns:a14="http://schemas.microsoft.com/office/drawing/2010/main" xmlns="" val="0"/>
+                <a14:useLocalDpi xmlns="" xmlns:a14="http://schemas.microsoft.com/office/drawing/2010/main" val="0"/>
               </a:ext>
             </a:extLst>
           </a:blip>
@@ -11283,7 +11413,7 @@
     </p:spTree>
     <p:extLst>
       <p:ext uri="{BB962C8B-B14F-4D97-AF65-F5344CB8AC3E}">
-        <p14:creationId xmlns:p14="http://schemas.microsoft.com/office/powerpoint/2010/main" xmlns="" val="2527117896"/>
+        <p14:creationId xmlns="" xmlns:p14="http://schemas.microsoft.com/office/powerpoint/2010/main" val="2527117896"/>
       </p:ext>
     </p:extLst>
   </p:cSld>
@@ -11997,7 +12127,7 @@
     </p:spTree>
     <p:extLst>
       <p:ext uri="{BB962C8B-B14F-4D97-AF65-F5344CB8AC3E}">
-        <p14:creationId xmlns:p14="http://schemas.microsoft.com/office/powerpoint/2010/main" xmlns="" val="1994743043"/>
+        <p14:creationId xmlns="" xmlns:p14="http://schemas.microsoft.com/office/powerpoint/2010/main" val="1994743043"/>
       </p:ext>
     </p:extLst>
   </p:cSld>
@@ -12183,7 +12313,7 @@
     </p:spTree>
     <p:extLst>
       <p:ext uri="{BB962C8B-B14F-4D97-AF65-F5344CB8AC3E}">
-        <p14:creationId xmlns:p14="http://schemas.microsoft.com/office/powerpoint/2010/main" xmlns="" val="3098398089"/>
+        <p14:creationId xmlns="" xmlns:p14="http://schemas.microsoft.com/office/powerpoint/2010/main" val="3098398089"/>
       </p:ext>
     </p:extLst>
   </p:cSld>
@@ -12464,7 +12594,7 @@
     </p:spTree>
     <p:extLst>
       <p:ext uri="{BB962C8B-B14F-4D97-AF65-F5344CB8AC3E}">
-        <p14:creationId xmlns:p14="http://schemas.microsoft.com/office/powerpoint/2010/main" xmlns="" val="3449390454"/>
+        <p14:creationId xmlns="" xmlns:p14="http://schemas.microsoft.com/office/powerpoint/2010/main" val="3449390454"/>
       </p:ext>
     </p:extLst>
   </p:cSld>
@@ -13165,7 +13295,7 @@
     </p:spTree>
     <p:extLst>
       <p:ext uri="{BB962C8B-B14F-4D97-AF65-F5344CB8AC3E}">
-        <p14:creationId xmlns:p14="http://schemas.microsoft.com/office/powerpoint/2010/main" xmlns="" val="4006469721"/>
+        <p14:creationId xmlns="" xmlns:p14="http://schemas.microsoft.com/office/powerpoint/2010/main" val="4006469721"/>
       </p:ext>
     </p:extLst>
   </p:cSld>
@@ -13473,7 +13603,7 @@
     </p:spTree>
     <p:extLst>
       <p:ext uri="{BB962C8B-B14F-4D97-AF65-F5344CB8AC3E}">
-        <p14:creationId xmlns:p14="http://schemas.microsoft.com/office/powerpoint/2010/main" xmlns="" val="1678422724"/>
+        <p14:creationId xmlns="" xmlns:p14="http://schemas.microsoft.com/office/powerpoint/2010/main" val="1678422724"/>
       </p:ext>
     </p:extLst>
   </p:cSld>
@@ -14086,7 +14216,7 @@
     </p:spTree>
     <p:extLst>
       <p:ext uri="{BB962C8B-B14F-4D97-AF65-F5344CB8AC3E}">
-        <p14:creationId xmlns:p14="http://schemas.microsoft.com/office/powerpoint/2010/main" xmlns="" val="2792941284"/>
+        <p14:creationId xmlns="" xmlns:p14="http://schemas.microsoft.com/office/powerpoint/2010/main" val="2792941284"/>
       </p:ext>
     </p:extLst>
   </p:cSld>
@@ -14545,7 +14675,7 @@
     </p:spTree>
     <p:extLst>
       <p:ext uri="{BB962C8B-B14F-4D97-AF65-F5344CB8AC3E}">
-        <p14:creationId xmlns:p14="http://schemas.microsoft.com/office/powerpoint/2010/main" xmlns="" val="3220083538"/>
+        <p14:creationId xmlns="" xmlns:p14="http://schemas.microsoft.com/office/powerpoint/2010/main" val="3220083538"/>
       </p:ext>
     </p:extLst>
   </p:cSld>
@@ -14764,7 +14894,7 @@
     </p:spTree>
     <p:extLst>
       <p:ext uri="{BB962C8B-B14F-4D97-AF65-F5344CB8AC3E}">
-        <p14:creationId xmlns:p14="http://schemas.microsoft.com/office/powerpoint/2010/main" xmlns="" val="856396653"/>
+        <p14:creationId xmlns="" xmlns:p14="http://schemas.microsoft.com/office/powerpoint/2010/main" val="856396653"/>
       </p:ext>
     </p:extLst>
   </p:cSld>
@@ -14925,7 +15055,7 @@
     </p:spTree>
     <p:extLst>
       <p:ext uri="{BB962C8B-B14F-4D97-AF65-F5344CB8AC3E}">
-        <p14:creationId xmlns:p14="http://schemas.microsoft.com/office/powerpoint/2010/main" xmlns="" val="3312784383"/>
+        <p14:creationId xmlns="" xmlns:p14="http://schemas.microsoft.com/office/powerpoint/2010/main" val="3312784383"/>
       </p:ext>
     </p:extLst>
   </p:cSld>
@@ -15143,7 +15273,7 @@
     </p:spTree>
     <p:extLst>
       <p:ext uri="{BB962C8B-B14F-4D97-AF65-F5344CB8AC3E}">
-        <p14:creationId xmlns:p14="http://schemas.microsoft.com/office/powerpoint/2010/main" xmlns="" val="3443329555"/>
+        <p14:creationId xmlns="" xmlns:p14="http://schemas.microsoft.com/office/powerpoint/2010/main" val="3443329555"/>
       </p:ext>
     </p:extLst>
   </p:cSld>
@@ -15655,7 +15785,7 @@
     </p:spTree>
     <p:extLst>
       <p:ext uri="{BB962C8B-B14F-4D97-AF65-F5344CB8AC3E}">
-        <p14:creationId xmlns:p14="http://schemas.microsoft.com/office/powerpoint/2010/main" xmlns="" val="1556099287"/>
+        <p14:creationId xmlns="" xmlns:p14="http://schemas.microsoft.com/office/powerpoint/2010/main" val="1556099287"/>
       </p:ext>
     </p:extLst>
   </p:cSld>
@@ -16008,7 +16138,7 @@
     </p:spTree>
     <p:extLst>
       <p:ext uri="{BB962C8B-B14F-4D97-AF65-F5344CB8AC3E}">
-        <p14:creationId xmlns:p14="http://schemas.microsoft.com/office/powerpoint/2010/main" xmlns="" val="2948210574"/>
+        <p14:creationId xmlns="" xmlns:p14="http://schemas.microsoft.com/office/powerpoint/2010/main" val="2948210574"/>
       </p:ext>
     </p:extLst>
   </p:cSld>
@@ -16471,7 +16601,7 @@
     </p:spTree>
     <p:extLst>
       <p:ext uri="{BB962C8B-B14F-4D97-AF65-F5344CB8AC3E}">
-        <p14:creationId xmlns:p14="http://schemas.microsoft.com/office/powerpoint/2010/main" xmlns="" val="977874982"/>
+        <p14:creationId xmlns="" xmlns:p14="http://schemas.microsoft.com/office/powerpoint/2010/main" val="977874982"/>
       </p:ext>
     </p:extLst>
   </p:cSld>
@@ -16539,7 +16669,7 @@
           <p:nvPr>
             <p:extLst>
               <p:ext uri="{D42A27DB-BD31-4B8C-83A1-F6EECF244321}">
-                <p14:modId xmlns:p14="http://schemas.microsoft.com/office/powerpoint/2010/main" xmlns="" val="2181104498"/>
+                <p14:modId xmlns="" xmlns:p14="http://schemas.microsoft.com/office/powerpoint/2010/main" val="2181104498"/>
               </p:ext>
             </p:extLst>
           </p:nvPr>
@@ -17523,7 +17653,7 @@
     </p:spTree>
     <p:extLst>
       <p:ext uri="{BB962C8B-B14F-4D97-AF65-F5344CB8AC3E}">
-        <p14:creationId xmlns:p14="http://schemas.microsoft.com/office/powerpoint/2010/main" xmlns="" val="2197364214"/>
+        <p14:creationId xmlns="" xmlns:p14="http://schemas.microsoft.com/office/powerpoint/2010/main" val="2197364214"/>
       </p:ext>
     </p:extLst>
   </p:cSld>
@@ -17699,7 +17829,7 @@
     </p:spTree>
     <p:extLst>
       <p:ext uri="{BB962C8B-B14F-4D97-AF65-F5344CB8AC3E}">
-        <p14:creationId xmlns:p14="http://schemas.microsoft.com/office/powerpoint/2010/main" xmlns="" val="2092776985"/>
+        <p14:creationId xmlns="" xmlns:p14="http://schemas.microsoft.com/office/powerpoint/2010/main" val="2092776985"/>
       </p:ext>
     </p:extLst>
   </p:cSld>
@@ -17919,7 +18049,7 @@
     </p:spTree>
     <p:extLst>
       <p:ext uri="{BB962C8B-B14F-4D97-AF65-F5344CB8AC3E}">
-        <p14:creationId xmlns:p14="http://schemas.microsoft.com/office/powerpoint/2010/main" xmlns="" val="318706902"/>
+        <p14:creationId xmlns="" xmlns:p14="http://schemas.microsoft.com/office/powerpoint/2010/main" val="318706902"/>
       </p:ext>
     </p:extLst>
   </p:cSld>
@@ -18002,7 +18132,7 @@
           <p:nvPr>
             <p:extLst>
               <p:ext uri="{D42A27DB-BD31-4B8C-83A1-F6EECF244321}">
-                <p14:modId xmlns:p14="http://schemas.microsoft.com/office/powerpoint/2010/main" xmlns="" val="3075550189"/>
+                <p14:modId xmlns="" xmlns:p14="http://schemas.microsoft.com/office/powerpoint/2010/main" val="3075550189"/>
               </p:ext>
             </p:extLst>
           </p:nvPr>
@@ -18373,7 +18503,7 @@
           <a:blip r:embed="rId3" cstate="print">
             <a:extLst>
               <a:ext uri="{28A0092B-C50C-407E-A947-70E740481C1C}">
-                <a14:useLocalDpi xmlns:a14="http://schemas.microsoft.com/office/drawing/2010/main" xmlns="" val="0"/>
+                <a14:useLocalDpi xmlns="" xmlns:a14="http://schemas.microsoft.com/office/drawing/2010/main" val="0"/>
               </a:ext>
             </a:extLst>
           </a:blip>
@@ -18403,7 +18533,7 @@
           <a:blip r:embed="rId4" cstate="print">
             <a:extLst>
               <a:ext uri="{28A0092B-C50C-407E-A947-70E740481C1C}">
-                <a14:useLocalDpi xmlns:a14="http://schemas.microsoft.com/office/drawing/2010/main" xmlns="" val="0"/>
+                <a14:useLocalDpi xmlns="" xmlns:a14="http://schemas.microsoft.com/office/drawing/2010/main" val="0"/>
               </a:ext>
             </a:extLst>
           </a:blip>
@@ -18433,7 +18563,7 @@
           <a:blip r:embed="rId5" cstate="print">
             <a:extLst>
               <a:ext uri="{28A0092B-C50C-407E-A947-70E740481C1C}">
-                <a14:useLocalDpi xmlns:a14="http://schemas.microsoft.com/office/drawing/2010/main" xmlns="" val="0"/>
+                <a14:useLocalDpi xmlns="" xmlns:a14="http://schemas.microsoft.com/office/drawing/2010/main" val="0"/>
               </a:ext>
             </a:extLst>
           </a:blip>
@@ -18463,7 +18593,7 @@
           <a:blip r:embed="rId6" cstate="print">
             <a:extLst>
               <a:ext uri="{28A0092B-C50C-407E-A947-70E740481C1C}">
-                <a14:useLocalDpi xmlns:a14="http://schemas.microsoft.com/office/drawing/2010/main" xmlns="" val="0"/>
+                <a14:useLocalDpi xmlns="" xmlns:a14="http://schemas.microsoft.com/office/drawing/2010/main" val="0"/>
               </a:ext>
             </a:extLst>
           </a:blip>
@@ -18493,7 +18623,7 @@
           <a:blip r:embed="rId7" cstate="print">
             <a:extLst>
               <a:ext uri="{28A0092B-C50C-407E-A947-70E740481C1C}">
-                <a14:useLocalDpi xmlns:a14="http://schemas.microsoft.com/office/drawing/2010/main" xmlns="" val="0"/>
+                <a14:useLocalDpi xmlns="" xmlns:a14="http://schemas.microsoft.com/office/drawing/2010/main" val="0"/>
               </a:ext>
             </a:extLst>
           </a:blip>
@@ -18523,7 +18653,7 @@
           <a:blip r:embed="rId8" cstate="print">
             <a:extLst>
               <a:ext uri="{28A0092B-C50C-407E-A947-70E740481C1C}">
-                <a14:useLocalDpi xmlns:a14="http://schemas.microsoft.com/office/drawing/2010/main" xmlns="" val="0"/>
+                <a14:useLocalDpi xmlns="" xmlns:a14="http://schemas.microsoft.com/office/drawing/2010/main" val="0"/>
               </a:ext>
             </a:extLst>
           </a:blip>
@@ -18544,7 +18674,7 @@
     </p:spTree>
     <p:extLst>
       <p:ext uri="{BB962C8B-B14F-4D97-AF65-F5344CB8AC3E}">
-        <p14:creationId xmlns:p14="http://schemas.microsoft.com/office/powerpoint/2010/main" xmlns="" val="949325302"/>
+        <p14:creationId xmlns="" xmlns:p14="http://schemas.microsoft.com/office/powerpoint/2010/main" val="949325302"/>
       </p:ext>
     </p:extLst>
   </p:cSld>
@@ -19225,7 +19355,7 @@
     </p:spTree>
     <p:extLst>
       <p:ext uri="{BB962C8B-B14F-4D97-AF65-F5344CB8AC3E}">
-        <p14:creationId xmlns:p14="http://schemas.microsoft.com/office/powerpoint/2010/main" xmlns="" val="1728169033"/>
+        <p14:creationId xmlns="" xmlns:p14="http://schemas.microsoft.com/office/powerpoint/2010/main" val="1728169033"/>
       </p:ext>
     </p:extLst>
   </p:cSld>
@@ -19470,7 +19600,7 @@
     </p:spTree>
     <p:extLst>
       <p:ext uri="{BB962C8B-B14F-4D97-AF65-F5344CB8AC3E}">
-        <p14:creationId xmlns:p14="http://schemas.microsoft.com/office/powerpoint/2010/main" xmlns="" val="2834344091"/>
+        <p14:creationId xmlns="" xmlns:p14="http://schemas.microsoft.com/office/powerpoint/2010/main" val="2834344091"/>
       </p:ext>
     </p:extLst>
   </p:cSld>
@@ -19862,7 +19992,7 @@
           <p:nvPr>
             <p:extLst>
               <p:ext uri="{D42A27DB-BD31-4B8C-83A1-F6EECF244321}">
-                <p14:modId xmlns:p14="http://schemas.microsoft.com/office/powerpoint/2010/main" xmlns="" val="3204736979"/>
+                <p14:modId xmlns="" xmlns:p14="http://schemas.microsoft.com/office/powerpoint/2010/main" val="3204736979"/>
               </p:ext>
             </p:extLst>
           </p:nvPr>
@@ -20190,7 +20320,7 @@
     </p:spTree>
     <p:extLst>
       <p:ext uri="{BB962C8B-B14F-4D97-AF65-F5344CB8AC3E}">
-        <p14:creationId xmlns:p14="http://schemas.microsoft.com/office/powerpoint/2010/main" xmlns="" val="3195513628"/>
+        <p14:creationId xmlns="" xmlns:p14="http://schemas.microsoft.com/office/powerpoint/2010/main" val="3195513628"/>
       </p:ext>
     </p:extLst>
   </p:cSld>
@@ -20328,7 +20458,7 @@
     </p:spTree>
     <p:extLst>
       <p:ext uri="{BB962C8B-B14F-4D97-AF65-F5344CB8AC3E}">
-        <p14:creationId xmlns:p14="http://schemas.microsoft.com/office/powerpoint/2010/main" xmlns="" val="2674396190"/>
+        <p14:creationId xmlns="" xmlns:p14="http://schemas.microsoft.com/office/powerpoint/2010/main" val="2674396190"/>
       </p:ext>
     </p:extLst>
   </p:cSld>
@@ -20470,7 +20600,7 @@
     </p:spTree>
     <p:extLst>
       <p:ext uri="{BB962C8B-B14F-4D97-AF65-F5344CB8AC3E}">
-        <p14:creationId xmlns:p14="http://schemas.microsoft.com/office/powerpoint/2010/main" xmlns="" val="2713826086"/>
+        <p14:creationId xmlns="" xmlns:p14="http://schemas.microsoft.com/office/powerpoint/2010/main" val="2713826086"/>
       </p:ext>
     </p:extLst>
   </p:cSld>
@@ -20662,7 +20792,7 @@
     </p:spTree>
     <p:extLst>
       <p:ext uri="{BB962C8B-B14F-4D97-AF65-F5344CB8AC3E}">
-        <p14:creationId xmlns:p14="http://schemas.microsoft.com/office/powerpoint/2010/main" xmlns="" val="714747940"/>
+        <p14:creationId xmlns="" xmlns:p14="http://schemas.microsoft.com/office/powerpoint/2010/main" val="714747940"/>
       </p:ext>
     </p:extLst>
   </p:cSld>
@@ -21201,7 +21331,7 @@
     </p:spTree>
     <p:extLst>
       <p:ext uri="{BB962C8B-B14F-4D97-AF65-F5344CB8AC3E}">
-        <p14:creationId xmlns:p14="http://schemas.microsoft.com/office/powerpoint/2010/main" xmlns="" val="3760395846"/>
+        <p14:creationId xmlns="" xmlns:p14="http://schemas.microsoft.com/office/powerpoint/2010/main" val="3760395846"/>
       </p:ext>
     </p:extLst>
   </p:cSld>
@@ -22034,7 +22164,7 @@
     </p:spTree>
     <p:extLst>
       <p:ext uri="{BB962C8B-B14F-4D97-AF65-F5344CB8AC3E}">
-        <p14:creationId xmlns:p14="http://schemas.microsoft.com/office/powerpoint/2010/main" xmlns="" val="1422967000"/>
+        <p14:creationId xmlns="" xmlns:p14="http://schemas.microsoft.com/office/powerpoint/2010/main" val="1422967000"/>
       </p:ext>
     </p:extLst>
   </p:cSld>
@@ -22185,7 +22315,7 @@
     </p:spTree>
     <p:extLst>
       <p:ext uri="{BB962C8B-B14F-4D97-AF65-F5344CB8AC3E}">
-        <p14:creationId xmlns:p14="http://schemas.microsoft.com/office/powerpoint/2010/main" xmlns="" val="2654585083"/>
+        <p14:creationId xmlns="" xmlns:p14="http://schemas.microsoft.com/office/powerpoint/2010/main" val="2654585083"/>
       </p:ext>
     </p:extLst>
   </p:cSld>
@@ -22345,7 +22475,7 @@
     </p:spTree>
     <p:extLst>
       <p:ext uri="{BB962C8B-B14F-4D97-AF65-F5344CB8AC3E}">
-        <p14:creationId xmlns:p14="http://schemas.microsoft.com/office/powerpoint/2010/main" xmlns="" val="1683021932"/>
+        <p14:creationId xmlns="" xmlns:p14="http://schemas.microsoft.com/office/powerpoint/2010/main" val="1683021932"/>
       </p:ext>
     </p:extLst>
   </p:cSld>
@@ -22419,7 +22549,7 @@
           <a:blip r:embed="rId2" cstate="print">
             <a:extLst>
               <a:ext uri="{28A0092B-C50C-407E-A947-70E740481C1C}">
-                <a14:useLocalDpi xmlns:a14="http://schemas.microsoft.com/office/drawing/2010/main" xmlns="" val="0"/>
+                <a14:useLocalDpi xmlns="" xmlns:a14="http://schemas.microsoft.com/office/drawing/2010/main" val="0"/>
               </a:ext>
             </a:extLst>
           </a:blip>
@@ -23055,7 +23185,7 @@
     </p:spTree>
     <p:extLst>
       <p:ext uri="{BB962C8B-B14F-4D97-AF65-F5344CB8AC3E}">
-        <p14:creationId xmlns:p14="http://schemas.microsoft.com/office/powerpoint/2010/main" xmlns="" val="3007787296"/>
+        <p14:creationId xmlns="" xmlns:p14="http://schemas.microsoft.com/office/powerpoint/2010/main" val="3007787296"/>
       </p:ext>
     </p:extLst>
   </p:cSld>
@@ -23473,7 +23603,7 @@
     </p:spTree>
     <p:extLst>
       <p:ext uri="{BB962C8B-B14F-4D97-AF65-F5344CB8AC3E}">
-        <p14:creationId xmlns:p14="http://schemas.microsoft.com/office/powerpoint/2010/main" xmlns="" val="13878138"/>
+        <p14:creationId xmlns="" xmlns:p14="http://schemas.microsoft.com/office/powerpoint/2010/main" val="13878138"/>
       </p:ext>
     </p:extLst>
   </p:cSld>
@@ -23861,7 +23991,7 @@
     </p:spTree>
     <p:extLst>
       <p:ext uri="{BB962C8B-B14F-4D97-AF65-F5344CB8AC3E}">
-        <p14:creationId xmlns:p14="http://schemas.microsoft.com/office/powerpoint/2010/main" xmlns="" val="40929930"/>
+        <p14:creationId xmlns="" xmlns:p14="http://schemas.microsoft.com/office/powerpoint/2010/main" val="40929930"/>
       </p:ext>
     </p:extLst>
   </p:cSld>
@@ -23930,7 +24060,7 @@
           <a:blip r:embed="rId2" cstate="print">
             <a:extLst>
               <a:ext uri="{28A0092B-C50C-407E-A947-70E740481C1C}">
-                <a14:useLocalDpi xmlns:a14="http://schemas.microsoft.com/office/drawing/2010/main" xmlns="" val="0"/>
+                <a14:useLocalDpi xmlns="" xmlns:a14="http://schemas.microsoft.com/office/drawing/2010/main" val="0"/>
               </a:ext>
             </a:extLst>
           </a:blip>
@@ -23951,7 +24081,7 @@
     </p:spTree>
     <p:extLst>
       <p:ext uri="{BB962C8B-B14F-4D97-AF65-F5344CB8AC3E}">
-        <p14:creationId xmlns:p14="http://schemas.microsoft.com/office/powerpoint/2010/main" xmlns="" val="1336479164"/>
+        <p14:creationId xmlns="" xmlns:p14="http://schemas.microsoft.com/office/powerpoint/2010/main" val="1336479164"/>
       </p:ext>
     </p:extLst>
   </p:cSld>
@@ -24057,7 +24187,7 @@
     </p:spTree>
     <p:extLst>
       <p:ext uri="{BB962C8B-B14F-4D97-AF65-F5344CB8AC3E}">
-        <p14:creationId xmlns:p14="http://schemas.microsoft.com/office/powerpoint/2010/main" xmlns="" val="4014343169"/>
+        <p14:creationId xmlns="" xmlns:p14="http://schemas.microsoft.com/office/powerpoint/2010/main" val="4014343169"/>
       </p:ext>
     </p:extLst>
   </p:cSld>
@@ -24208,7 +24338,7 @@
     </p:spTree>
     <p:extLst>
       <p:ext uri="{BB962C8B-B14F-4D97-AF65-F5344CB8AC3E}">
-        <p14:creationId xmlns:p14="http://schemas.microsoft.com/office/powerpoint/2010/main" xmlns="" val="2781303602"/>
+        <p14:creationId xmlns="" xmlns:p14="http://schemas.microsoft.com/office/powerpoint/2010/main" val="2781303602"/>
       </p:ext>
     </p:extLst>
   </p:cSld>
@@ -24395,7 +24525,7 @@
     </p:spTree>
     <p:extLst>
       <p:ext uri="{BB962C8B-B14F-4D97-AF65-F5344CB8AC3E}">
-        <p14:creationId xmlns:p14="http://schemas.microsoft.com/office/powerpoint/2010/main" xmlns="" val="4255503392"/>
+        <p14:creationId xmlns="" xmlns:p14="http://schemas.microsoft.com/office/powerpoint/2010/main" val="4255503392"/>
       </p:ext>
     </p:extLst>
   </p:cSld>
@@ -24555,7 +24685,7 @@
     </p:spTree>
     <p:extLst>
       <p:ext uri="{BB962C8B-B14F-4D97-AF65-F5344CB8AC3E}">
-        <p14:creationId xmlns:p14="http://schemas.microsoft.com/office/powerpoint/2010/main" xmlns="" val="2375505937"/>
+        <p14:creationId xmlns="" xmlns:p14="http://schemas.microsoft.com/office/powerpoint/2010/main" val="2375505937"/>
       </p:ext>
     </p:extLst>
   </p:cSld>
@@ -24686,7 +24816,7 @@
     </p:spTree>
     <p:extLst>
       <p:ext uri="{BB962C8B-B14F-4D97-AF65-F5344CB8AC3E}">
-        <p14:creationId xmlns:p14="http://schemas.microsoft.com/office/powerpoint/2010/main" xmlns="" val="1618189430"/>
+        <p14:creationId xmlns="" xmlns:p14="http://schemas.microsoft.com/office/powerpoint/2010/main" val="1618189430"/>
       </p:ext>
     </p:extLst>
   </p:cSld>
@@ -24694,7 +24824,7 @@
     <a:masterClrMapping/>
   </p:clrMapOvr>
   <mc:AlternateContent xmlns:mc="http://schemas.openxmlformats.org/markup-compatibility/2006">
-    <mc:Choice xmlns:p14="http://schemas.microsoft.com/office/powerpoint/2010/main" xmlns="" Requires="p14">
+    <mc:Choice xmlns="" xmlns:p14="http://schemas.microsoft.com/office/powerpoint/2010/main" Requires="p14">
       <p:transition spd="slow" p14:dur="2000"/>
     </mc:Choice>
     <mc:Fallback>

</xml_diff>

<commit_message>
fixe a few typo
</commit_message>
<xml_diff>
--- a/mdl4ui-docs/mdl4ui_cg2013.pptx
+++ b/mdl4ui-docs/mdl4ui_cg2013.pptx
@@ -259,7 +259,7 @@
             <a:fld id="{9F3D9D59-C69D-478D-98BA-46DD69AE3241}" type="datetimeFigureOut">
               <a:rPr lang="en-US" smtClean="0"/>
               <a:pPr/>
-              <a:t>4/8/2013</a:t>
+              <a:t>4/12/2013</a:t>
             </a:fld>
             <a:endParaRPr lang="en-US"/>
           </a:p>
@@ -335,7 +335,7 @@
     </p:spTree>
     <p:extLst>
       <p:ext uri="{BB962C8B-B14F-4D97-AF65-F5344CB8AC3E}">
-        <p14:creationId xmlns:p14="http://schemas.microsoft.com/office/powerpoint/2010/main" xmlns="" val="70803672"/>
+        <p14:creationId xmlns:p14="http://schemas.microsoft.com/office/powerpoint/2010/main" val="70803672"/>
       </p:ext>
     </p:extLst>
   </p:cSld>
@@ -426,7 +426,7 @@
             <a:fld id="{724035F6-A10F-4A2D-A4E3-1D4F59E0F1A1}" type="datetimeFigureOut">
               <a:rPr lang="en-US" smtClean="0"/>
               <a:pPr/>
-              <a:t>4/8/2013</a:t>
+              <a:t>4/12/2013</a:t>
             </a:fld>
             <a:endParaRPr lang="en-US"/>
           </a:p>
@@ -595,7 +595,7 @@
     </p:spTree>
     <p:extLst>
       <p:ext uri="{BB962C8B-B14F-4D97-AF65-F5344CB8AC3E}">
-        <p14:creationId xmlns:p14="http://schemas.microsoft.com/office/powerpoint/2010/main" xmlns="" val="1701488114"/>
+        <p14:creationId xmlns:p14="http://schemas.microsoft.com/office/powerpoint/2010/main" val="1701488114"/>
       </p:ext>
     </p:extLst>
   </p:cSld>
@@ -761,7 +761,7 @@
             <a:fld id="{1C995A55-B5EF-47FB-BCEC-1018828F2E10}" type="slidenum">
               <a:rPr lang="en-US" smtClean="0"/>
               <a:pPr/>
-              <a:t>19</a:t>
+              <a:t>1</a:t>
             </a:fld>
             <a:endParaRPr lang="en-US"/>
           </a:p>
@@ -770,7 +770,611 @@
     </p:spTree>
     <p:extLst>
       <p:ext uri="{BB962C8B-B14F-4D97-AF65-F5344CB8AC3E}">
-        <p14:creationId xmlns:p14="http://schemas.microsoft.com/office/powerpoint/2010/main" xmlns="" val="2091590988"/>
+        <p14:creationId xmlns:p14="http://schemas.microsoft.com/office/powerpoint/2010/main" val="1930402387"/>
+      </p:ext>
+    </p:extLst>
+  </p:cSld>
+  <p:clrMapOvr>
+    <a:masterClrMapping/>
+  </p:clrMapOvr>
+</p:notes>
+</file>
+
+<file path=ppt/notesSlides/notesSlide10.xml><?xml version="1.0" encoding="utf-8"?>
+<p:notes xmlns:a="http://schemas.openxmlformats.org/drawingml/2006/main" xmlns:r="http://schemas.openxmlformats.org/officeDocument/2006/relationships" xmlns:p="http://schemas.openxmlformats.org/presentationml/2006/main">
+  <p:cSld>
+    <p:spTree>
+      <p:nvGrpSpPr>
+        <p:cNvPr id="1" name=""/>
+        <p:cNvGrpSpPr/>
+        <p:nvPr/>
+      </p:nvGrpSpPr>
+      <p:grpSpPr>
+        <a:xfrm>
+          <a:off x="0" y="0"/>
+          <a:ext cx="0" cy="0"/>
+          <a:chOff x="0" y="0"/>
+          <a:chExt cx="0" cy="0"/>
+        </a:xfrm>
+      </p:grpSpPr>
+      <p:sp>
+        <p:nvSpPr>
+          <p:cNvPr id="2" name="Espace réservé de l'image des diapositives 1"/>
+          <p:cNvSpPr>
+            <a:spLocks noGrp="1" noRot="1" noChangeAspect="1"/>
+          </p:cNvSpPr>
+          <p:nvPr>
+            <p:ph type="sldImg"/>
+          </p:nvPr>
+        </p:nvSpPr>
+        <p:spPr/>
+      </p:sp>
+      <p:sp>
+        <p:nvSpPr>
+          <p:cNvPr id="3" name="Espace réservé des commentaires 2"/>
+          <p:cNvSpPr>
+            <a:spLocks noGrp="1"/>
+          </p:cNvSpPr>
+          <p:nvPr>
+            <p:ph type="body" idx="1"/>
+          </p:nvPr>
+        </p:nvSpPr>
+        <p:spPr/>
+        <p:txBody>
+          <a:bodyPr/>
+          <a:lstStyle/>
+          <a:p>
+            <a:endParaRPr lang="en-US" dirty="0"/>
+          </a:p>
+        </p:txBody>
+      </p:sp>
+      <p:sp>
+        <p:nvSpPr>
+          <p:cNvPr id="4" name="Espace réservé du numéro de diapositive 3"/>
+          <p:cNvSpPr>
+            <a:spLocks noGrp="1"/>
+          </p:cNvSpPr>
+          <p:nvPr>
+            <p:ph type="sldNum" sz="quarter" idx="10"/>
+          </p:nvPr>
+        </p:nvSpPr>
+        <p:spPr/>
+        <p:txBody>
+          <a:bodyPr/>
+          <a:lstStyle/>
+          <a:p>
+            <a:fld id="{1C995A55-B5EF-47FB-BCEC-1018828F2E10}" type="slidenum">
+              <a:rPr lang="en-US" smtClean="0"/>
+              <a:pPr/>
+              <a:t>41</a:t>
+            </a:fld>
+            <a:endParaRPr lang="en-US"/>
+          </a:p>
+        </p:txBody>
+      </p:sp>
+    </p:spTree>
+    <p:extLst>
+      <p:ext uri="{BB962C8B-B14F-4D97-AF65-F5344CB8AC3E}">
+        <p14:creationId xmlns:p14="http://schemas.microsoft.com/office/powerpoint/2010/main" val="3047004223"/>
+      </p:ext>
+    </p:extLst>
+  </p:cSld>
+  <p:clrMapOvr>
+    <a:masterClrMapping/>
+  </p:clrMapOvr>
+</p:notes>
+</file>
+
+<file path=ppt/notesSlides/notesSlide11.xml><?xml version="1.0" encoding="utf-8"?>
+<p:notes xmlns:a="http://schemas.openxmlformats.org/drawingml/2006/main" xmlns:r="http://schemas.openxmlformats.org/officeDocument/2006/relationships" xmlns:p="http://schemas.openxmlformats.org/presentationml/2006/main">
+  <p:cSld>
+    <p:spTree>
+      <p:nvGrpSpPr>
+        <p:cNvPr id="1" name=""/>
+        <p:cNvGrpSpPr/>
+        <p:nvPr/>
+      </p:nvGrpSpPr>
+      <p:grpSpPr>
+        <a:xfrm>
+          <a:off x="0" y="0"/>
+          <a:ext cx="0" cy="0"/>
+          <a:chOff x="0" y="0"/>
+          <a:chExt cx="0" cy="0"/>
+        </a:xfrm>
+      </p:grpSpPr>
+      <p:sp>
+        <p:nvSpPr>
+          <p:cNvPr id="2" name="Espace réservé de l'image des diapositives 1"/>
+          <p:cNvSpPr>
+            <a:spLocks noGrp="1" noRot="1" noChangeAspect="1"/>
+          </p:cNvSpPr>
+          <p:nvPr>
+            <p:ph type="sldImg"/>
+          </p:nvPr>
+        </p:nvSpPr>
+        <p:spPr/>
+      </p:sp>
+      <p:sp>
+        <p:nvSpPr>
+          <p:cNvPr id="3" name="Espace réservé des commentaires 2"/>
+          <p:cNvSpPr>
+            <a:spLocks noGrp="1"/>
+          </p:cNvSpPr>
+          <p:nvPr>
+            <p:ph type="body" idx="1"/>
+          </p:nvPr>
+        </p:nvSpPr>
+        <p:spPr/>
+        <p:txBody>
+          <a:bodyPr/>
+          <a:lstStyle/>
+          <a:p>
+            <a:endParaRPr lang="en-US" dirty="0"/>
+          </a:p>
+        </p:txBody>
+      </p:sp>
+      <p:sp>
+        <p:nvSpPr>
+          <p:cNvPr id="4" name="Espace réservé du numéro de diapositive 3"/>
+          <p:cNvSpPr>
+            <a:spLocks noGrp="1"/>
+          </p:cNvSpPr>
+          <p:nvPr>
+            <p:ph type="sldNum" sz="quarter" idx="10"/>
+          </p:nvPr>
+        </p:nvSpPr>
+        <p:spPr/>
+        <p:txBody>
+          <a:bodyPr/>
+          <a:lstStyle/>
+          <a:p>
+            <a:fld id="{1C995A55-B5EF-47FB-BCEC-1018828F2E10}" type="slidenum">
+              <a:rPr lang="en-US" smtClean="0"/>
+              <a:pPr/>
+              <a:t>43</a:t>
+            </a:fld>
+            <a:endParaRPr lang="en-US"/>
+          </a:p>
+        </p:txBody>
+      </p:sp>
+    </p:spTree>
+    <p:extLst>
+      <p:ext uri="{BB962C8B-B14F-4D97-AF65-F5344CB8AC3E}">
+        <p14:creationId xmlns:p14="http://schemas.microsoft.com/office/powerpoint/2010/main" val="3280979232"/>
+      </p:ext>
+    </p:extLst>
+  </p:cSld>
+  <p:clrMapOvr>
+    <a:masterClrMapping/>
+  </p:clrMapOvr>
+</p:notes>
+</file>
+
+<file path=ppt/notesSlides/notesSlide12.xml><?xml version="1.0" encoding="utf-8"?>
+<p:notes xmlns:a="http://schemas.openxmlformats.org/drawingml/2006/main" xmlns:r="http://schemas.openxmlformats.org/officeDocument/2006/relationships" xmlns:p="http://schemas.openxmlformats.org/presentationml/2006/main">
+  <p:cSld>
+    <p:spTree>
+      <p:nvGrpSpPr>
+        <p:cNvPr id="1" name=""/>
+        <p:cNvGrpSpPr/>
+        <p:nvPr/>
+      </p:nvGrpSpPr>
+      <p:grpSpPr>
+        <a:xfrm>
+          <a:off x="0" y="0"/>
+          <a:ext cx="0" cy="0"/>
+          <a:chOff x="0" y="0"/>
+          <a:chExt cx="0" cy="0"/>
+        </a:xfrm>
+      </p:grpSpPr>
+      <p:sp>
+        <p:nvSpPr>
+          <p:cNvPr id="2" name="Espace réservé de l'image des diapositives 1"/>
+          <p:cNvSpPr>
+            <a:spLocks noGrp="1" noRot="1" noChangeAspect="1"/>
+          </p:cNvSpPr>
+          <p:nvPr>
+            <p:ph type="sldImg"/>
+          </p:nvPr>
+        </p:nvSpPr>
+        <p:spPr/>
+      </p:sp>
+      <p:sp>
+        <p:nvSpPr>
+          <p:cNvPr id="3" name="Espace réservé des commentaires 2"/>
+          <p:cNvSpPr>
+            <a:spLocks noGrp="1"/>
+          </p:cNvSpPr>
+          <p:nvPr>
+            <p:ph type="body" idx="1"/>
+          </p:nvPr>
+        </p:nvSpPr>
+        <p:spPr/>
+        <p:txBody>
+          <a:bodyPr/>
+          <a:lstStyle/>
+          <a:p>
+            <a:r>
+              <a:rPr lang="en-US" dirty="0" smtClean="0"/>
+              <a:t>GDU starts</a:t>
+            </a:r>
+            <a:endParaRPr lang="en-US" dirty="0"/>
+          </a:p>
+        </p:txBody>
+      </p:sp>
+      <p:sp>
+        <p:nvSpPr>
+          <p:cNvPr id="4" name="Espace réservé du numéro de diapositive 3"/>
+          <p:cNvSpPr>
+            <a:spLocks noGrp="1"/>
+          </p:cNvSpPr>
+          <p:nvPr>
+            <p:ph type="sldNum" sz="quarter" idx="10"/>
+          </p:nvPr>
+        </p:nvSpPr>
+        <p:spPr/>
+        <p:txBody>
+          <a:bodyPr/>
+          <a:lstStyle/>
+          <a:p>
+            <a:fld id="{1C995A55-B5EF-47FB-BCEC-1018828F2E10}" type="slidenum">
+              <a:rPr lang="en-US" smtClean="0"/>
+              <a:pPr/>
+              <a:t>44</a:t>
+            </a:fld>
+            <a:endParaRPr lang="en-US"/>
+          </a:p>
+        </p:txBody>
+      </p:sp>
+    </p:spTree>
+    <p:extLst>
+      <p:ext uri="{BB962C8B-B14F-4D97-AF65-F5344CB8AC3E}">
+        <p14:creationId xmlns:p14="http://schemas.microsoft.com/office/powerpoint/2010/main" val="4003299204"/>
+      </p:ext>
+    </p:extLst>
+  </p:cSld>
+  <p:clrMapOvr>
+    <a:masterClrMapping/>
+  </p:clrMapOvr>
+</p:notes>
+</file>
+
+<file path=ppt/notesSlides/notesSlide13.xml><?xml version="1.0" encoding="utf-8"?>
+<p:notes xmlns:a="http://schemas.openxmlformats.org/drawingml/2006/main" xmlns:r="http://schemas.openxmlformats.org/officeDocument/2006/relationships" xmlns:p="http://schemas.openxmlformats.org/presentationml/2006/main">
+  <p:cSld>
+    <p:spTree>
+      <p:nvGrpSpPr>
+        <p:cNvPr id="1" name=""/>
+        <p:cNvGrpSpPr/>
+        <p:nvPr/>
+      </p:nvGrpSpPr>
+      <p:grpSpPr>
+        <a:xfrm>
+          <a:off x="0" y="0"/>
+          <a:ext cx="0" cy="0"/>
+          <a:chOff x="0" y="0"/>
+          <a:chExt cx="0" cy="0"/>
+        </a:xfrm>
+      </p:grpSpPr>
+      <p:sp>
+        <p:nvSpPr>
+          <p:cNvPr id="2" name="Espace réservé de l'image des diapositives 1"/>
+          <p:cNvSpPr>
+            <a:spLocks noGrp="1" noRot="1" noChangeAspect="1"/>
+          </p:cNvSpPr>
+          <p:nvPr>
+            <p:ph type="sldImg"/>
+          </p:nvPr>
+        </p:nvSpPr>
+        <p:spPr/>
+      </p:sp>
+      <p:sp>
+        <p:nvSpPr>
+          <p:cNvPr id="3" name="Espace réservé des commentaires 2"/>
+          <p:cNvSpPr>
+            <a:spLocks noGrp="1"/>
+          </p:cNvSpPr>
+          <p:nvPr>
+            <p:ph type="body" idx="1"/>
+          </p:nvPr>
+        </p:nvSpPr>
+        <p:spPr/>
+        <p:txBody>
+          <a:bodyPr/>
+          <a:lstStyle/>
+          <a:p>
+            <a:endParaRPr lang="en-US" dirty="0"/>
+          </a:p>
+        </p:txBody>
+      </p:sp>
+      <p:sp>
+        <p:nvSpPr>
+          <p:cNvPr id="4" name="Espace réservé du numéro de diapositive 3"/>
+          <p:cNvSpPr>
+            <a:spLocks noGrp="1"/>
+          </p:cNvSpPr>
+          <p:nvPr>
+            <p:ph type="sldNum" sz="quarter" idx="10"/>
+          </p:nvPr>
+        </p:nvSpPr>
+        <p:spPr/>
+        <p:txBody>
+          <a:bodyPr/>
+          <a:lstStyle/>
+          <a:p>
+            <a:fld id="{1C995A55-B5EF-47FB-BCEC-1018828F2E10}" type="slidenum">
+              <a:rPr lang="en-US" smtClean="0"/>
+              <a:pPr/>
+              <a:t>47</a:t>
+            </a:fld>
+            <a:endParaRPr lang="en-US"/>
+          </a:p>
+        </p:txBody>
+      </p:sp>
+    </p:spTree>
+    <p:extLst>
+      <p:ext uri="{BB962C8B-B14F-4D97-AF65-F5344CB8AC3E}">
+        <p14:creationId xmlns:p14="http://schemas.microsoft.com/office/powerpoint/2010/main" val="1987381696"/>
+      </p:ext>
+    </p:extLst>
+  </p:cSld>
+  <p:clrMapOvr>
+    <a:masterClrMapping/>
+  </p:clrMapOvr>
+</p:notes>
+</file>
+
+<file path=ppt/notesSlides/notesSlide14.xml><?xml version="1.0" encoding="utf-8"?>
+<p:notes xmlns:a="http://schemas.openxmlformats.org/drawingml/2006/main" xmlns:r="http://schemas.openxmlformats.org/officeDocument/2006/relationships" xmlns:p="http://schemas.openxmlformats.org/presentationml/2006/main">
+  <p:cSld>
+    <p:spTree>
+      <p:nvGrpSpPr>
+        <p:cNvPr id="1" name=""/>
+        <p:cNvGrpSpPr/>
+        <p:nvPr/>
+      </p:nvGrpSpPr>
+      <p:grpSpPr>
+        <a:xfrm>
+          <a:off x="0" y="0"/>
+          <a:ext cx="0" cy="0"/>
+          <a:chOff x="0" y="0"/>
+          <a:chExt cx="0" cy="0"/>
+        </a:xfrm>
+      </p:grpSpPr>
+      <p:sp>
+        <p:nvSpPr>
+          <p:cNvPr id="2" name="Espace réservé de l'image des diapositives 1"/>
+          <p:cNvSpPr>
+            <a:spLocks noGrp="1" noRot="1" noChangeAspect="1"/>
+          </p:cNvSpPr>
+          <p:nvPr>
+            <p:ph type="sldImg"/>
+          </p:nvPr>
+        </p:nvSpPr>
+        <p:spPr/>
+      </p:sp>
+      <p:sp>
+        <p:nvSpPr>
+          <p:cNvPr id="3" name="Espace réservé des commentaires 2"/>
+          <p:cNvSpPr>
+            <a:spLocks noGrp="1"/>
+          </p:cNvSpPr>
+          <p:nvPr>
+            <p:ph type="body" idx="1"/>
+          </p:nvPr>
+        </p:nvSpPr>
+        <p:spPr/>
+        <p:txBody>
+          <a:bodyPr>
+            <a:normAutofit/>
+          </a:bodyPr>
+          <a:lstStyle/>
+          <a:p>
+            <a:endParaRPr lang="en-US" dirty="0"/>
+          </a:p>
+        </p:txBody>
+      </p:sp>
+      <p:sp>
+        <p:nvSpPr>
+          <p:cNvPr id="4" name="Espace réservé du numéro de diapositive 3"/>
+          <p:cNvSpPr>
+            <a:spLocks noGrp="1"/>
+          </p:cNvSpPr>
+          <p:nvPr>
+            <p:ph type="sldNum" sz="quarter" idx="10"/>
+          </p:nvPr>
+        </p:nvSpPr>
+        <p:spPr/>
+        <p:txBody>
+          <a:bodyPr/>
+          <a:lstStyle/>
+          <a:p>
+            <a:fld id="{1C995A55-B5EF-47FB-BCEC-1018828F2E10}" type="slidenum">
+              <a:rPr lang="en-US" smtClean="0"/>
+              <a:pPr/>
+              <a:t>52</a:t>
+            </a:fld>
+            <a:endParaRPr lang="en-US"/>
+          </a:p>
+        </p:txBody>
+      </p:sp>
+    </p:spTree>
+  </p:cSld>
+  <p:clrMapOvr>
+    <a:masterClrMapping/>
+  </p:clrMapOvr>
+</p:notes>
+</file>
+
+<file path=ppt/notesSlides/notesSlide15.xml><?xml version="1.0" encoding="utf-8"?>
+<p:notes xmlns:a="http://schemas.openxmlformats.org/drawingml/2006/main" xmlns:r="http://schemas.openxmlformats.org/officeDocument/2006/relationships" xmlns:p="http://schemas.openxmlformats.org/presentationml/2006/main">
+  <p:cSld>
+    <p:spTree>
+      <p:nvGrpSpPr>
+        <p:cNvPr id="1" name=""/>
+        <p:cNvGrpSpPr/>
+        <p:nvPr/>
+      </p:nvGrpSpPr>
+      <p:grpSpPr>
+        <a:xfrm>
+          <a:off x="0" y="0"/>
+          <a:ext cx="0" cy="0"/>
+          <a:chOff x="0" y="0"/>
+          <a:chExt cx="0" cy="0"/>
+        </a:xfrm>
+      </p:grpSpPr>
+      <p:sp>
+        <p:nvSpPr>
+          <p:cNvPr id="2" name="Espace réservé de l'image des diapositives 1"/>
+          <p:cNvSpPr>
+            <a:spLocks noGrp="1" noRot="1" noChangeAspect="1"/>
+          </p:cNvSpPr>
+          <p:nvPr>
+            <p:ph type="sldImg"/>
+          </p:nvPr>
+        </p:nvSpPr>
+        <p:spPr/>
+      </p:sp>
+      <p:sp>
+        <p:nvSpPr>
+          <p:cNvPr id="3" name="Espace réservé des commentaires 2"/>
+          <p:cNvSpPr>
+            <a:spLocks noGrp="1"/>
+          </p:cNvSpPr>
+          <p:nvPr>
+            <p:ph type="body" idx="1"/>
+          </p:nvPr>
+        </p:nvSpPr>
+        <p:spPr/>
+        <p:txBody>
+          <a:bodyPr/>
+          <a:lstStyle/>
+          <a:p>
+            <a:r>
+              <a:rPr lang="en-US" dirty="0" smtClean="0"/>
+              <a:t>JBA starts</a:t>
+            </a:r>
+            <a:endParaRPr lang="en-US" dirty="0"/>
+          </a:p>
+        </p:txBody>
+      </p:sp>
+      <p:sp>
+        <p:nvSpPr>
+          <p:cNvPr id="4" name="Espace réservé du numéro de diapositive 3"/>
+          <p:cNvSpPr>
+            <a:spLocks noGrp="1"/>
+          </p:cNvSpPr>
+          <p:nvPr>
+            <p:ph type="sldNum" sz="quarter" idx="10"/>
+          </p:nvPr>
+        </p:nvSpPr>
+        <p:spPr/>
+        <p:txBody>
+          <a:bodyPr/>
+          <a:lstStyle/>
+          <a:p>
+            <a:fld id="{1C995A55-B5EF-47FB-BCEC-1018828F2E10}" type="slidenum">
+              <a:rPr lang="en-US" smtClean="0"/>
+              <a:pPr/>
+              <a:t>53</a:t>
+            </a:fld>
+            <a:endParaRPr lang="en-US"/>
+          </a:p>
+        </p:txBody>
+      </p:sp>
+    </p:spTree>
+    <p:extLst>
+      <p:ext uri="{BB962C8B-B14F-4D97-AF65-F5344CB8AC3E}">
+        <p14:creationId xmlns:p14="http://schemas.microsoft.com/office/powerpoint/2010/main" val="2622818044"/>
+      </p:ext>
+    </p:extLst>
+  </p:cSld>
+  <p:clrMapOvr>
+    <a:masterClrMapping/>
+  </p:clrMapOvr>
+</p:notes>
+</file>
+
+<file path=ppt/notesSlides/notesSlide16.xml><?xml version="1.0" encoding="utf-8"?>
+<p:notes xmlns:a="http://schemas.openxmlformats.org/drawingml/2006/main" xmlns:r="http://schemas.openxmlformats.org/officeDocument/2006/relationships" xmlns:p="http://schemas.openxmlformats.org/presentationml/2006/main">
+  <p:cSld>
+    <p:spTree>
+      <p:nvGrpSpPr>
+        <p:cNvPr id="1" name=""/>
+        <p:cNvGrpSpPr/>
+        <p:nvPr/>
+      </p:nvGrpSpPr>
+      <p:grpSpPr>
+        <a:xfrm>
+          <a:off x="0" y="0"/>
+          <a:ext cx="0" cy="0"/>
+          <a:chOff x="0" y="0"/>
+          <a:chExt cx="0" cy="0"/>
+        </a:xfrm>
+      </p:grpSpPr>
+      <p:sp>
+        <p:nvSpPr>
+          <p:cNvPr id="2" name="Espace réservé de l'image des diapositives 1"/>
+          <p:cNvSpPr>
+            <a:spLocks noGrp="1" noRot="1" noChangeAspect="1"/>
+          </p:cNvSpPr>
+          <p:nvPr>
+            <p:ph type="sldImg"/>
+          </p:nvPr>
+        </p:nvSpPr>
+        <p:spPr/>
+      </p:sp>
+      <p:sp>
+        <p:nvSpPr>
+          <p:cNvPr id="3" name="Espace réservé des commentaires 2"/>
+          <p:cNvSpPr>
+            <a:spLocks noGrp="1"/>
+          </p:cNvSpPr>
+          <p:nvPr>
+            <p:ph type="body" idx="1"/>
+          </p:nvPr>
+        </p:nvSpPr>
+        <p:spPr/>
+        <p:txBody>
+          <a:bodyPr/>
+          <a:lstStyle/>
+          <a:p>
+            <a:r>
+              <a:rPr lang="en-US" dirty="0" smtClean="0"/>
+              <a:t>GDU starts</a:t>
+            </a:r>
+            <a:endParaRPr lang="en-US" dirty="0"/>
+          </a:p>
+        </p:txBody>
+      </p:sp>
+      <p:sp>
+        <p:nvSpPr>
+          <p:cNvPr id="4" name="Espace réservé du numéro de diapositive 3"/>
+          <p:cNvSpPr>
+            <a:spLocks noGrp="1"/>
+          </p:cNvSpPr>
+          <p:nvPr>
+            <p:ph type="sldNum" sz="quarter" idx="10"/>
+          </p:nvPr>
+        </p:nvSpPr>
+        <p:spPr/>
+        <p:txBody>
+          <a:bodyPr/>
+          <a:lstStyle/>
+          <a:p>
+            <a:fld id="{1C995A55-B5EF-47FB-BCEC-1018828F2E10}" type="slidenum">
+              <a:rPr lang="en-US" smtClean="0"/>
+              <a:pPr/>
+              <a:t>61</a:t>
+            </a:fld>
+            <a:endParaRPr lang="en-US"/>
+          </a:p>
+        </p:txBody>
+      </p:sp>
+    </p:spTree>
+    <p:extLst>
+      <p:ext uri="{BB962C8B-B14F-4D97-AF65-F5344CB8AC3E}">
+        <p14:creationId xmlns:p14="http://schemas.microsoft.com/office/powerpoint/2010/main" val="3848866699"/>
       </p:ext>
     </p:extLst>
   </p:cSld>
@@ -821,12 +1425,10 @@
         </p:nvSpPr>
         <p:spPr/>
         <p:txBody>
-          <a:bodyPr>
-            <a:normAutofit/>
-          </a:bodyPr>
+          <a:bodyPr/>
           <a:lstStyle/>
           <a:p>
-            <a:endParaRPr lang="fr-FR" dirty="0"/>
+            <a:endParaRPr lang="en-US" dirty="0"/>
           </a:p>
         </p:txBody>
       </p:sp>
@@ -848,13 +1450,18 @@
             <a:fld id="{1C995A55-B5EF-47FB-BCEC-1018828F2E10}" type="slidenum">
               <a:rPr lang="en-US" smtClean="0"/>
               <a:pPr/>
-              <a:t>24</a:t>
+              <a:t>2</a:t>
             </a:fld>
             <a:endParaRPr lang="en-US"/>
           </a:p>
         </p:txBody>
       </p:sp>
     </p:spTree>
+    <p:extLst>
+      <p:ext uri="{BB962C8B-B14F-4D97-AF65-F5344CB8AC3E}">
+        <p14:creationId xmlns:p14="http://schemas.microsoft.com/office/powerpoint/2010/main" val="1723799457"/>
+      </p:ext>
+    </p:extLst>
   </p:cSld>
   <p:clrMapOvr>
     <a:masterClrMapping/>
@@ -906,6 +1513,10 @@
           <a:bodyPr/>
           <a:lstStyle/>
           <a:p>
+            <a:r>
+              <a:rPr lang="en-US" baseline="0" dirty="0" smtClean="0"/>
+              <a:t>JBA starts</a:t>
+            </a:r>
             <a:endParaRPr lang="en-US" dirty="0"/>
           </a:p>
         </p:txBody>
@@ -928,7 +1539,7 @@
             <a:fld id="{1C995A55-B5EF-47FB-BCEC-1018828F2E10}" type="slidenum">
               <a:rPr lang="en-US" smtClean="0"/>
               <a:pPr/>
-              <a:t>41</a:t>
+              <a:t>11</a:t>
             </a:fld>
             <a:endParaRPr lang="en-US"/>
           </a:p>
@@ -937,7 +1548,7 @@
     </p:spTree>
     <p:extLst>
       <p:ext uri="{BB962C8B-B14F-4D97-AF65-F5344CB8AC3E}">
-        <p14:creationId xmlns:p14="http://schemas.microsoft.com/office/powerpoint/2010/main" xmlns="" val="3047004223"/>
+        <p14:creationId xmlns:p14="http://schemas.microsoft.com/office/powerpoint/2010/main" val="2615589008"/>
       </p:ext>
     </p:extLst>
   </p:cSld>
@@ -991,6 +1602,10 @@
           <a:bodyPr/>
           <a:lstStyle/>
           <a:p>
+            <a:r>
+              <a:rPr lang="en-US" dirty="0" smtClean="0"/>
+              <a:t>GDU starts</a:t>
+            </a:r>
             <a:endParaRPr lang="en-US" dirty="0"/>
           </a:p>
         </p:txBody>
@@ -1013,7 +1628,7 @@
             <a:fld id="{1C995A55-B5EF-47FB-BCEC-1018828F2E10}" type="slidenum">
               <a:rPr lang="en-US" smtClean="0"/>
               <a:pPr/>
-              <a:t>43</a:t>
+              <a:t>17</a:t>
             </a:fld>
             <a:endParaRPr lang="en-US"/>
           </a:p>
@@ -1022,7 +1637,7 @@
     </p:spTree>
     <p:extLst>
       <p:ext uri="{BB962C8B-B14F-4D97-AF65-F5344CB8AC3E}">
-        <p14:creationId xmlns:p14="http://schemas.microsoft.com/office/powerpoint/2010/main" xmlns="" val="3280979232"/>
+        <p14:creationId xmlns:p14="http://schemas.microsoft.com/office/powerpoint/2010/main" val="805948727"/>
       </p:ext>
     </p:extLst>
   </p:cSld>
@@ -1098,7 +1713,7 @@
             <a:fld id="{1C995A55-B5EF-47FB-BCEC-1018828F2E10}" type="slidenum">
               <a:rPr lang="en-US" smtClean="0"/>
               <a:pPr/>
-              <a:t>47</a:t>
+              <a:t>19</a:t>
             </a:fld>
             <a:endParaRPr lang="en-US"/>
           </a:p>
@@ -1107,7 +1722,7 @@
     </p:spTree>
     <p:extLst>
       <p:ext uri="{BB962C8B-B14F-4D97-AF65-F5344CB8AC3E}">
-        <p14:creationId xmlns:p14="http://schemas.microsoft.com/office/powerpoint/2010/main" xmlns="" val="1987381696"/>
+        <p14:creationId xmlns:p14="http://schemas.microsoft.com/office/powerpoint/2010/main" val="2091590988"/>
       </p:ext>
     </p:extLst>
   </p:cSld>
@@ -1163,7 +1778,7 @@
           </a:bodyPr>
           <a:lstStyle/>
           <a:p>
-            <a:endParaRPr lang="en-US" dirty="0"/>
+            <a:endParaRPr lang="fr-FR" dirty="0"/>
           </a:p>
         </p:txBody>
       </p:sp>
@@ -1185,13 +1800,284 @@
             <a:fld id="{1C995A55-B5EF-47FB-BCEC-1018828F2E10}" type="slidenum">
               <a:rPr lang="en-US" smtClean="0"/>
               <a:pPr/>
-              <a:t>52</a:t>
+              <a:t>24</a:t>
             </a:fld>
             <a:endParaRPr lang="en-US"/>
           </a:p>
         </p:txBody>
       </p:sp>
     </p:spTree>
+  </p:cSld>
+  <p:clrMapOvr>
+    <a:masterClrMapping/>
+  </p:clrMapOvr>
+</p:notes>
+</file>
+
+<file path=ppt/notesSlides/notesSlide7.xml><?xml version="1.0" encoding="utf-8"?>
+<p:notes xmlns:a="http://schemas.openxmlformats.org/drawingml/2006/main" xmlns:r="http://schemas.openxmlformats.org/officeDocument/2006/relationships" xmlns:p="http://schemas.openxmlformats.org/presentationml/2006/main">
+  <p:cSld>
+    <p:spTree>
+      <p:nvGrpSpPr>
+        <p:cNvPr id="1" name=""/>
+        <p:cNvGrpSpPr/>
+        <p:nvPr/>
+      </p:nvGrpSpPr>
+      <p:grpSpPr>
+        <a:xfrm>
+          <a:off x="0" y="0"/>
+          <a:ext cx="0" cy="0"/>
+          <a:chOff x="0" y="0"/>
+          <a:chExt cx="0" cy="0"/>
+        </a:xfrm>
+      </p:grpSpPr>
+      <p:sp>
+        <p:nvSpPr>
+          <p:cNvPr id="2" name="Espace réservé de l'image des diapositives 1"/>
+          <p:cNvSpPr>
+            <a:spLocks noGrp="1" noRot="1" noChangeAspect="1"/>
+          </p:cNvSpPr>
+          <p:nvPr>
+            <p:ph type="sldImg"/>
+          </p:nvPr>
+        </p:nvSpPr>
+        <p:spPr/>
+      </p:sp>
+      <p:sp>
+        <p:nvSpPr>
+          <p:cNvPr id="3" name="Espace réservé des commentaires 2"/>
+          <p:cNvSpPr>
+            <a:spLocks noGrp="1"/>
+          </p:cNvSpPr>
+          <p:nvPr>
+            <p:ph type="body" idx="1"/>
+          </p:nvPr>
+        </p:nvSpPr>
+        <p:spPr/>
+        <p:txBody>
+          <a:bodyPr/>
+          <a:lstStyle/>
+          <a:p>
+            <a:r>
+              <a:rPr lang="en-US" dirty="0" smtClean="0"/>
+              <a:t>JBA starts</a:t>
+            </a:r>
+            <a:endParaRPr lang="en-US" dirty="0"/>
+          </a:p>
+        </p:txBody>
+      </p:sp>
+      <p:sp>
+        <p:nvSpPr>
+          <p:cNvPr id="4" name="Espace réservé du numéro de diapositive 3"/>
+          <p:cNvSpPr>
+            <a:spLocks noGrp="1"/>
+          </p:cNvSpPr>
+          <p:nvPr>
+            <p:ph type="sldNum" sz="quarter" idx="10"/>
+          </p:nvPr>
+        </p:nvSpPr>
+        <p:spPr/>
+        <p:txBody>
+          <a:bodyPr/>
+          <a:lstStyle/>
+          <a:p>
+            <a:fld id="{1C995A55-B5EF-47FB-BCEC-1018828F2E10}" type="slidenum">
+              <a:rPr lang="en-US" smtClean="0"/>
+              <a:pPr/>
+              <a:t>26</a:t>
+            </a:fld>
+            <a:endParaRPr lang="en-US"/>
+          </a:p>
+        </p:txBody>
+      </p:sp>
+    </p:spTree>
+    <p:extLst>
+      <p:ext uri="{BB962C8B-B14F-4D97-AF65-F5344CB8AC3E}">
+        <p14:creationId xmlns:p14="http://schemas.microsoft.com/office/powerpoint/2010/main" val="3883449842"/>
+      </p:ext>
+    </p:extLst>
+  </p:cSld>
+  <p:clrMapOvr>
+    <a:masterClrMapping/>
+  </p:clrMapOvr>
+</p:notes>
+</file>
+
+<file path=ppt/notesSlides/notesSlide8.xml><?xml version="1.0" encoding="utf-8"?>
+<p:notes xmlns:a="http://schemas.openxmlformats.org/drawingml/2006/main" xmlns:r="http://schemas.openxmlformats.org/officeDocument/2006/relationships" xmlns:p="http://schemas.openxmlformats.org/presentationml/2006/main">
+  <p:cSld>
+    <p:spTree>
+      <p:nvGrpSpPr>
+        <p:cNvPr id="1" name=""/>
+        <p:cNvGrpSpPr/>
+        <p:nvPr/>
+      </p:nvGrpSpPr>
+      <p:grpSpPr>
+        <a:xfrm>
+          <a:off x="0" y="0"/>
+          <a:ext cx="0" cy="0"/>
+          <a:chOff x="0" y="0"/>
+          <a:chExt cx="0" cy="0"/>
+        </a:xfrm>
+      </p:grpSpPr>
+      <p:sp>
+        <p:nvSpPr>
+          <p:cNvPr id="2" name="Espace réservé de l'image des diapositives 1"/>
+          <p:cNvSpPr>
+            <a:spLocks noGrp="1" noRot="1" noChangeAspect="1"/>
+          </p:cNvSpPr>
+          <p:nvPr>
+            <p:ph type="sldImg"/>
+          </p:nvPr>
+        </p:nvSpPr>
+        <p:spPr/>
+      </p:sp>
+      <p:sp>
+        <p:nvSpPr>
+          <p:cNvPr id="3" name="Espace réservé des commentaires 2"/>
+          <p:cNvSpPr>
+            <a:spLocks noGrp="1"/>
+          </p:cNvSpPr>
+          <p:nvPr>
+            <p:ph type="body" idx="1"/>
+          </p:nvPr>
+        </p:nvSpPr>
+        <p:spPr/>
+        <p:txBody>
+          <a:bodyPr/>
+          <a:lstStyle/>
+          <a:p>
+            <a:r>
+              <a:rPr lang="en-US" dirty="0" smtClean="0"/>
+              <a:t>GDU starts</a:t>
+            </a:r>
+            <a:endParaRPr lang="en-US" dirty="0"/>
+          </a:p>
+        </p:txBody>
+      </p:sp>
+      <p:sp>
+        <p:nvSpPr>
+          <p:cNvPr id="4" name="Espace réservé du numéro de diapositive 3"/>
+          <p:cNvSpPr>
+            <a:spLocks noGrp="1"/>
+          </p:cNvSpPr>
+          <p:nvPr>
+            <p:ph type="sldNum" sz="quarter" idx="10"/>
+          </p:nvPr>
+        </p:nvSpPr>
+        <p:spPr/>
+        <p:txBody>
+          <a:bodyPr/>
+          <a:lstStyle/>
+          <a:p>
+            <a:fld id="{1C995A55-B5EF-47FB-BCEC-1018828F2E10}" type="slidenum">
+              <a:rPr lang="en-US" smtClean="0"/>
+              <a:pPr/>
+              <a:t>32</a:t>
+            </a:fld>
+            <a:endParaRPr lang="en-US"/>
+          </a:p>
+        </p:txBody>
+      </p:sp>
+    </p:spTree>
+    <p:extLst>
+      <p:ext uri="{BB962C8B-B14F-4D97-AF65-F5344CB8AC3E}">
+        <p14:creationId xmlns:p14="http://schemas.microsoft.com/office/powerpoint/2010/main" val="1197186210"/>
+      </p:ext>
+    </p:extLst>
+  </p:cSld>
+  <p:clrMapOvr>
+    <a:masterClrMapping/>
+  </p:clrMapOvr>
+</p:notes>
+</file>
+
+<file path=ppt/notesSlides/notesSlide9.xml><?xml version="1.0" encoding="utf-8"?>
+<p:notes xmlns:a="http://schemas.openxmlformats.org/drawingml/2006/main" xmlns:r="http://schemas.openxmlformats.org/officeDocument/2006/relationships" xmlns:p="http://schemas.openxmlformats.org/presentationml/2006/main">
+  <p:cSld>
+    <p:spTree>
+      <p:nvGrpSpPr>
+        <p:cNvPr id="1" name=""/>
+        <p:cNvGrpSpPr/>
+        <p:nvPr/>
+      </p:nvGrpSpPr>
+      <p:grpSpPr>
+        <a:xfrm>
+          <a:off x="0" y="0"/>
+          <a:ext cx="0" cy="0"/>
+          <a:chOff x="0" y="0"/>
+          <a:chExt cx="0" cy="0"/>
+        </a:xfrm>
+      </p:grpSpPr>
+      <p:sp>
+        <p:nvSpPr>
+          <p:cNvPr id="2" name="Espace réservé de l'image des diapositives 1"/>
+          <p:cNvSpPr>
+            <a:spLocks noGrp="1" noRot="1" noChangeAspect="1"/>
+          </p:cNvSpPr>
+          <p:nvPr>
+            <p:ph type="sldImg"/>
+          </p:nvPr>
+        </p:nvSpPr>
+        <p:spPr/>
+      </p:sp>
+      <p:sp>
+        <p:nvSpPr>
+          <p:cNvPr id="3" name="Espace réservé des commentaires 2"/>
+          <p:cNvSpPr>
+            <a:spLocks noGrp="1"/>
+          </p:cNvSpPr>
+          <p:nvPr>
+            <p:ph type="body" idx="1"/>
+          </p:nvPr>
+        </p:nvSpPr>
+        <p:spPr/>
+        <p:txBody>
+          <a:bodyPr/>
+          <a:lstStyle/>
+          <a:p>
+            <a:r>
+              <a:rPr lang="en-US" dirty="0" smtClean="0"/>
+              <a:t>JBA</a:t>
+            </a:r>
+            <a:r>
+              <a:rPr lang="en-US" baseline="0" dirty="0" smtClean="0"/>
+              <a:t> starts</a:t>
+            </a:r>
+            <a:endParaRPr lang="en-US" dirty="0"/>
+          </a:p>
+        </p:txBody>
+      </p:sp>
+      <p:sp>
+        <p:nvSpPr>
+          <p:cNvPr id="4" name="Espace réservé du numéro de diapositive 3"/>
+          <p:cNvSpPr>
+            <a:spLocks noGrp="1"/>
+          </p:cNvSpPr>
+          <p:nvPr>
+            <p:ph type="sldNum" sz="quarter" idx="10"/>
+          </p:nvPr>
+        </p:nvSpPr>
+        <p:spPr/>
+        <p:txBody>
+          <a:bodyPr/>
+          <a:lstStyle/>
+          <a:p>
+            <a:fld id="{1C995A55-B5EF-47FB-BCEC-1018828F2E10}" type="slidenum">
+              <a:rPr lang="en-US" smtClean="0"/>
+              <a:pPr/>
+              <a:t>37</a:t>
+            </a:fld>
+            <a:endParaRPr lang="en-US"/>
+          </a:p>
+        </p:txBody>
+      </p:sp>
+    </p:spTree>
+    <p:extLst>
+      <p:ext uri="{BB962C8B-B14F-4D97-AF65-F5344CB8AC3E}">
+        <p14:creationId xmlns:p14="http://schemas.microsoft.com/office/powerpoint/2010/main" val="1927629519"/>
+      </p:ext>
+    </p:extLst>
   </p:cSld>
   <p:clrMapOvr>
     <a:masterClrMapping/>
@@ -1381,7 +2267,7 @@
             <a:fld id="{1B5268FF-0D67-4269-9FD2-93B489DF800A}" type="datetimeFigureOut">
               <a:rPr lang="fr-FR" smtClean="0"/>
               <a:pPr/>
-              <a:t>08/04/2013</a:t>
+              <a:t>12/04/2013</a:t>
             </a:fld>
             <a:endParaRPr lang="fr-FR"/>
           </a:p>
@@ -1433,7 +2319,7 @@
     </p:spTree>
     <p:extLst>
       <p:ext uri="{BB962C8B-B14F-4D97-AF65-F5344CB8AC3E}">
-        <p14:creationId xmlns:p14="http://schemas.microsoft.com/office/powerpoint/2010/main" xmlns="" val="322609761"/>
+        <p14:creationId xmlns:p14="http://schemas.microsoft.com/office/powerpoint/2010/main" val="322609761"/>
       </p:ext>
     </p:extLst>
   </p:cSld>
@@ -1553,7 +2439,7 @@
             <a:fld id="{1B5268FF-0D67-4269-9FD2-93B489DF800A}" type="datetimeFigureOut">
               <a:rPr lang="fr-FR" smtClean="0"/>
               <a:pPr/>
-              <a:t>08/04/2013</a:t>
+              <a:t>12/04/2013</a:t>
             </a:fld>
             <a:endParaRPr lang="fr-FR"/>
           </a:p>
@@ -1605,7 +2491,7 @@
     </p:spTree>
     <p:extLst>
       <p:ext uri="{BB962C8B-B14F-4D97-AF65-F5344CB8AC3E}">
-        <p14:creationId xmlns:p14="http://schemas.microsoft.com/office/powerpoint/2010/main" xmlns="" val="1248456722"/>
+        <p14:creationId xmlns:p14="http://schemas.microsoft.com/office/powerpoint/2010/main" val="1248456722"/>
       </p:ext>
     </p:extLst>
   </p:cSld>
@@ -1735,7 +2621,7 @@
             <a:fld id="{1B5268FF-0D67-4269-9FD2-93B489DF800A}" type="datetimeFigureOut">
               <a:rPr lang="fr-FR" smtClean="0"/>
               <a:pPr/>
-              <a:t>08/04/2013</a:t>
+              <a:t>12/04/2013</a:t>
             </a:fld>
             <a:endParaRPr lang="fr-FR"/>
           </a:p>
@@ -1787,7 +2673,7 @@
     </p:spTree>
     <p:extLst>
       <p:ext uri="{BB962C8B-B14F-4D97-AF65-F5344CB8AC3E}">
-        <p14:creationId xmlns:p14="http://schemas.microsoft.com/office/powerpoint/2010/main" xmlns="" val="4236232986"/>
+        <p14:creationId xmlns:p14="http://schemas.microsoft.com/office/powerpoint/2010/main" val="4236232986"/>
       </p:ext>
     </p:extLst>
   </p:cSld>
@@ -1907,7 +2793,7 @@
             <a:fld id="{1B5268FF-0D67-4269-9FD2-93B489DF800A}" type="datetimeFigureOut">
               <a:rPr lang="fr-FR" smtClean="0"/>
               <a:pPr/>
-              <a:t>08/04/2013</a:t>
+              <a:t>12/04/2013</a:t>
             </a:fld>
             <a:endParaRPr lang="fr-FR"/>
           </a:p>
@@ -1959,7 +2845,7 @@
     </p:spTree>
     <p:extLst>
       <p:ext uri="{BB962C8B-B14F-4D97-AF65-F5344CB8AC3E}">
-        <p14:creationId xmlns:p14="http://schemas.microsoft.com/office/powerpoint/2010/main" xmlns="" val="3454835055"/>
+        <p14:creationId xmlns:p14="http://schemas.microsoft.com/office/powerpoint/2010/main" val="3454835055"/>
       </p:ext>
     </p:extLst>
   </p:cSld>
@@ -2162,7 +3048,7 @@
             <a:fld id="{1B5268FF-0D67-4269-9FD2-93B489DF800A}" type="datetimeFigureOut">
               <a:rPr lang="fr-FR" smtClean="0"/>
               <a:pPr/>
-              <a:t>08/04/2013</a:t>
+              <a:t>12/04/2013</a:t>
             </a:fld>
             <a:endParaRPr lang="fr-FR"/>
           </a:p>
@@ -2214,7 +3100,7 @@
     </p:spTree>
     <p:extLst>
       <p:ext uri="{BB962C8B-B14F-4D97-AF65-F5344CB8AC3E}">
-        <p14:creationId xmlns:p14="http://schemas.microsoft.com/office/powerpoint/2010/main" xmlns="" val="804127244"/>
+        <p14:creationId xmlns:p14="http://schemas.microsoft.com/office/powerpoint/2010/main" val="804127244"/>
       </p:ext>
     </p:extLst>
   </p:cSld>
@@ -2452,7 +3338,7 @@
             <a:fld id="{1B5268FF-0D67-4269-9FD2-93B489DF800A}" type="datetimeFigureOut">
               <a:rPr lang="fr-FR" smtClean="0"/>
               <a:pPr/>
-              <a:t>08/04/2013</a:t>
+              <a:t>12/04/2013</a:t>
             </a:fld>
             <a:endParaRPr lang="fr-FR"/>
           </a:p>
@@ -2504,7 +3390,7 @@
     </p:spTree>
     <p:extLst>
       <p:ext uri="{BB962C8B-B14F-4D97-AF65-F5344CB8AC3E}">
-        <p14:creationId xmlns:p14="http://schemas.microsoft.com/office/powerpoint/2010/main" xmlns="" val="586698658"/>
+        <p14:creationId xmlns:p14="http://schemas.microsoft.com/office/powerpoint/2010/main" val="586698658"/>
       </p:ext>
     </p:extLst>
   </p:cSld>
@@ -2876,7 +3762,7 @@
             <a:fld id="{1B5268FF-0D67-4269-9FD2-93B489DF800A}" type="datetimeFigureOut">
               <a:rPr lang="fr-FR" smtClean="0"/>
               <a:pPr/>
-              <a:t>08/04/2013</a:t>
+              <a:t>12/04/2013</a:t>
             </a:fld>
             <a:endParaRPr lang="fr-FR"/>
           </a:p>
@@ -2928,7 +3814,7 @@
     </p:spTree>
     <p:extLst>
       <p:ext uri="{BB962C8B-B14F-4D97-AF65-F5344CB8AC3E}">
-        <p14:creationId xmlns:p14="http://schemas.microsoft.com/office/powerpoint/2010/main" xmlns="" val="19144436"/>
+        <p14:creationId xmlns:p14="http://schemas.microsoft.com/office/powerpoint/2010/main" val="19144436"/>
       </p:ext>
     </p:extLst>
   </p:cSld>
@@ -2996,7 +3882,7 @@
             <a:fld id="{1B5268FF-0D67-4269-9FD2-93B489DF800A}" type="datetimeFigureOut">
               <a:rPr lang="fr-FR" smtClean="0"/>
               <a:pPr/>
-              <a:t>08/04/2013</a:t>
+              <a:t>12/04/2013</a:t>
             </a:fld>
             <a:endParaRPr lang="fr-FR"/>
           </a:p>
@@ -3048,7 +3934,7 @@
     </p:spTree>
     <p:extLst>
       <p:ext uri="{BB962C8B-B14F-4D97-AF65-F5344CB8AC3E}">
-        <p14:creationId xmlns:p14="http://schemas.microsoft.com/office/powerpoint/2010/main" xmlns="" val="202749597"/>
+        <p14:creationId xmlns:p14="http://schemas.microsoft.com/office/powerpoint/2010/main" val="202749597"/>
       </p:ext>
     </p:extLst>
   </p:cSld>
@@ -3093,7 +3979,7 @@
             <a:fld id="{1B5268FF-0D67-4269-9FD2-93B489DF800A}" type="datetimeFigureOut">
               <a:rPr lang="fr-FR" smtClean="0"/>
               <a:pPr/>
-              <a:t>08/04/2013</a:t>
+              <a:t>12/04/2013</a:t>
             </a:fld>
             <a:endParaRPr lang="fr-FR"/>
           </a:p>
@@ -3145,7 +4031,7 @@
     </p:spTree>
     <p:extLst>
       <p:ext uri="{BB962C8B-B14F-4D97-AF65-F5344CB8AC3E}">
-        <p14:creationId xmlns:p14="http://schemas.microsoft.com/office/powerpoint/2010/main" xmlns="" val="2898363528"/>
+        <p14:creationId xmlns:p14="http://schemas.microsoft.com/office/powerpoint/2010/main" val="2898363528"/>
       </p:ext>
     </p:extLst>
   </p:cSld>
@@ -3372,7 +4258,7 @@
             <a:fld id="{1B5268FF-0D67-4269-9FD2-93B489DF800A}" type="datetimeFigureOut">
               <a:rPr lang="fr-FR" smtClean="0"/>
               <a:pPr/>
-              <a:t>08/04/2013</a:t>
+              <a:t>12/04/2013</a:t>
             </a:fld>
             <a:endParaRPr lang="fr-FR"/>
           </a:p>
@@ -3424,7 +4310,7 @@
     </p:spTree>
     <p:extLst>
       <p:ext uri="{BB962C8B-B14F-4D97-AF65-F5344CB8AC3E}">
-        <p14:creationId xmlns:p14="http://schemas.microsoft.com/office/powerpoint/2010/main" xmlns="" val="4010598191"/>
+        <p14:creationId xmlns:p14="http://schemas.microsoft.com/office/powerpoint/2010/main" val="4010598191"/>
       </p:ext>
     </p:extLst>
   </p:cSld>
@@ -3627,7 +4513,7 @@
             <a:fld id="{1B5268FF-0D67-4269-9FD2-93B489DF800A}" type="datetimeFigureOut">
               <a:rPr lang="fr-FR" smtClean="0"/>
               <a:pPr/>
-              <a:t>08/04/2013</a:t>
+              <a:t>12/04/2013</a:t>
             </a:fld>
             <a:endParaRPr lang="fr-FR"/>
           </a:p>
@@ -3679,7 +4565,7 @@
     </p:spTree>
     <p:extLst>
       <p:ext uri="{BB962C8B-B14F-4D97-AF65-F5344CB8AC3E}">
-        <p14:creationId xmlns:p14="http://schemas.microsoft.com/office/powerpoint/2010/main" xmlns="" val="1433498939"/>
+        <p14:creationId xmlns:p14="http://schemas.microsoft.com/office/powerpoint/2010/main" val="1433498939"/>
       </p:ext>
     </p:extLst>
   </p:cSld>
@@ -3842,7 +4728,7 @@
             <a:fld id="{1B5268FF-0D67-4269-9FD2-93B489DF800A}" type="datetimeFigureOut">
               <a:rPr lang="fr-FR" smtClean="0"/>
               <a:pPr/>
-              <a:t>08/04/2013</a:t>
+              <a:t>12/04/2013</a:t>
             </a:fld>
             <a:endParaRPr lang="fr-FR"/>
           </a:p>
@@ -3939,7 +4825,7 @@
           <a:blip r:embed="rId13" cstate="print">
             <a:extLst>
               <a:ext uri="{28A0092B-C50C-407E-A947-70E740481C1C}">
-                <a14:useLocalDpi xmlns:a14="http://schemas.microsoft.com/office/drawing/2010/main" xmlns="" val="0"/>
+                <a14:useLocalDpi xmlns:a14="http://schemas.microsoft.com/office/drawing/2010/main" val="0"/>
               </a:ext>
             </a:extLst>
           </a:blip>
@@ -3960,7 +4846,7 @@
     </p:spTree>
     <p:extLst>
       <p:ext uri="{BB962C8B-B14F-4D97-AF65-F5344CB8AC3E}">
-        <p14:creationId xmlns:p14="http://schemas.microsoft.com/office/powerpoint/2010/main" xmlns="" val="2684825788"/>
+        <p14:creationId xmlns:p14="http://schemas.microsoft.com/office/powerpoint/2010/main" val="2684825788"/>
       </p:ext>
     </p:extLst>
   </p:cSld>
@@ -4331,18 +5217,18 @@
     </p:spTree>
     <p:extLst>
       <p:ext uri="{BB962C8B-B14F-4D97-AF65-F5344CB8AC3E}">
-        <p14:creationId xmlns:p14="http://schemas.microsoft.com/office/powerpoint/2010/main" xmlns="" val="3955344790"/>
+        <p14:creationId xmlns:p14="http://schemas.microsoft.com/office/powerpoint/2010/main" val="3955344790"/>
       </p:ext>
     </p:extLst>
   </p:cSld>
   <p:clrMapOvr>
     <a:masterClrMapping/>
   </p:clrMapOvr>
-  <mc:AlternateContent xmlns:mc="http://schemas.openxmlformats.org/markup-compatibility/2006">
-    <mc:Choice xmlns:p14="http://schemas.microsoft.com/office/powerpoint/2010/main" xmlns="" Requires="p14">
+  <mc:AlternateContent xmlns:mc="http://schemas.openxmlformats.org/markup-compatibility/2006" xmlns:p14="http://schemas.microsoft.com/office/powerpoint/2010/main">
+    <mc:Choice Requires="p14">
       <p:transition spd="slow" p14:dur="2000"/>
     </mc:Choice>
-    <mc:Fallback>
+    <mc:Fallback xmlns="">
       <p:transition spd="slow"/>
     </mc:Fallback>
   </mc:AlternateContent>
@@ -4512,7 +5398,7 @@
     </p:spTree>
     <p:extLst>
       <p:ext uri="{BB962C8B-B14F-4D97-AF65-F5344CB8AC3E}">
-        <p14:creationId xmlns:p14="http://schemas.microsoft.com/office/powerpoint/2010/main" xmlns="" val="3644490438"/>
+        <p14:creationId xmlns:p14="http://schemas.microsoft.com/office/powerpoint/2010/main" val="3644490438"/>
       </p:ext>
     </p:extLst>
   </p:cSld>
@@ -5254,7 +6140,7 @@
             <a:blip r:embed="rId2" cstate="print">
               <a:extLst>
                 <a:ext uri="{28A0092B-C50C-407E-A947-70E740481C1C}">
-                  <a14:useLocalDpi xmlns:a14="http://schemas.microsoft.com/office/drawing/2010/main" xmlns="" val="0"/>
+                  <a14:useLocalDpi xmlns:a14="http://schemas.microsoft.com/office/drawing/2010/main" val="0"/>
                 </a:ext>
               </a:extLst>
             </a:blip>
@@ -5284,7 +6170,7 @@
             <a:blip r:embed="rId3" cstate="print">
               <a:extLst>
                 <a:ext uri="{28A0092B-C50C-407E-A947-70E740481C1C}">
-                  <a14:useLocalDpi xmlns:a14="http://schemas.microsoft.com/office/drawing/2010/main" xmlns="" val="0"/>
+                  <a14:useLocalDpi xmlns:a14="http://schemas.microsoft.com/office/drawing/2010/main" val="0"/>
                 </a:ext>
               </a:extLst>
             </a:blip>
@@ -5332,7 +6218,7 @@
     </p:spTree>
     <p:extLst>
       <p:ext uri="{BB962C8B-B14F-4D97-AF65-F5344CB8AC3E}">
-        <p14:creationId xmlns:p14="http://schemas.microsoft.com/office/powerpoint/2010/main" xmlns="" val="1377264780"/>
+        <p14:creationId xmlns:p14="http://schemas.microsoft.com/office/powerpoint/2010/main" val="1377264780"/>
       </p:ext>
     </p:extLst>
   </p:cSld>
@@ -5507,7 +6393,7 @@
           <a:blip r:embed="rId2" cstate="print">
             <a:extLst>
               <a:ext uri="{28A0092B-C50C-407E-A947-70E740481C1C}">
-                <a14:useLocalDpi xmlns:a14="http://schemas.microsoft.com/office/drawing/2010/main" xmlns="" val="0"/>
+                <a14:useLocalDpi xmlns:a14="http://schemas.microsoft.com/office/drawing/2010/main" val="0"/>
               </a:ext>
             </a:extLst>
           </a:blip>
@@ -5537,7 +6423,7 @@
           <a:blip r:embed="rId3" cstate="print">
             <a:extLst>
               <a:ext uri="{28A0092B-C50C-407E-A947-70E740481C1C}">
-                <a14:useLocalDpi xmlns:a14="http://schemas.microsoft.com/office/drawing/2010/main" xmlns="" val="0"/>
+                <a14:useLocalDpi xmlns:a14="http://schemas.microsoft.com/office/drawing/2010/main" val="0"/>
               </a:ext>
             </a:extLst>
           </a:blip>
@@ -5795,7 +6681,7 @@
     </p:spTree>
     <p:extLst>
       <p:ext uri="{BB962C8B-B14F-4D97-AF65-F5344CB8AC3E}">
-        <p14:creationId xmlns:p14="http://schemas.microsoft.com/office/powerpoint/2010/main" xmlns="" val="3336203041"/>
+        <p14:creationId xmlns:p14="http://schemas.microsoft.com/office/powerpoint/2010/main" val="3336203041"/>
       </p:ext>
     </p:extLst>
   </p:cSld>
@@ -6190,7 +7076,7 @@
           <a:blip r:embed="rId2" cstate="print">
             <a:extLst>
               <a:ext uri="{28A0092B-C50C-407E-A947-70E740481C1C}">
-                <a14:useLocalDpi xmlns:a14="http://schemas.microsoft.com/office/drawing/2010/main" xmlns="" val="0"/>
+                <a14:useLocalDpi xmlns:a14="http://schemas.microsoft.com/office/drawing/2010/main" val="0"/>
               </a:ext>
             </a:extLst>
           </a:blip>
@@ -6220,7 +7106,7 @@
           <a:blip r:embed="rId3" cstate="print">
             <a:extLst>
               <a:ext uri="{28A0092B-C50C-407E-A947-70E740481C1C}">
-                <a14:useLocalDpi xmlns:a14="http://schemas.microsoft.com/office/drawing/2010/main" xmlns="" val="0"/>
+                <a14:useLocalDpi xmlns:a14="http://schemas.microsoft.com/office/drawing/2010/main" val="0"/>
               </a:ext>
             </a:extLst>
           </a:blip>
@@ -6382,7 +7268,7 @@
     </p:spTree>
     <p:extLst>
       <p:ext uri="{BB962C8B-B14F-4D97-AF65-F5344CB8AC3E}">
-        <p14:creationId xmlns:p14="http://schemas.microsoft.com/office/powerpoint/2010/main" xmlns="" val="864210357"/>
+        <p14:creationId xmlns:p14="http://schemas.microsoft.com/office/powerpoint/2010/main" val="864210357"/>
       </p:ext>
     </p:extLst>
   </p:cSld>
@@ -6656,7 +7542,7 @@
           <a:blip r:embed="rId2" cstate="print">
             <a:extLst>
               <a:ext uri="{28A0092B-C50C-407E-A947-70E740481C1C}">
-                <a14:useLocalDpi xmlns:a14="http://schemas.microsoft.com/office/drawing/2010/main" xmlns="" val="0"/>
+                <a14:useLocalDpi xmlns:a14="http://schemas.microsoft.com/office/drawing/2010/main" val="0"/>
               </a:ext>
             </a:extLst>
           </a:blip>
@@ -6686,7 +7572,7 @@
           <a:blip r:embed="rId3" cstate="print">
             <a:extLst>
               <a:ext uri="{28A0092B-C50C-407E-A947-70E740481C1C}">
-                <a14:useLocalDpi xmlns:a14="http://schemas.microsoft.com/office/drawing/2010/main" xmlns="" val="0"/>
+                <a14:useLocalDpi xmlns:a14="http://schemas.microsoft.com/office/drawing/2010/main" val="0"/>
               </a:ext>
             </a:extLst>
           </a:blip>
@@ -7398,7 +8284,7 @@
     </p:spTree>
     <p:extLst>
       <p:ext uri="{BB962C8B-B14F-4D97-AF65-F5344CB8AC3E}">
-        <p14:creationId xmlns:p14="http://schemas.microsoft.com/office/powerpoint/2010/main" xmlns="" val="3336203041"/>
+        <p14:creationId xmlns:p14="http://schemas.microsoft.com/office/powerpoint/2010/main" val="3336203041"/>
       </p:ext>
     </p:extLst>
   </p:cSld>
@@ -8090,7 +8976,7 @@
     </p:spTree>
     <p:extLst>
       <p:ext uri="{BB962C8B-B14F-4D97-AF65-F5344CB8AC3E}">
-        <p14:creationId xmlns:p14="http://schemas.microsoft.com/office/powerpoint/2010/main" xmlns="" val="3627640579"/>
+        <p14:creationId xmlns:p14="http://schemas.microsoft.com/office/powerpoint/2010/main" val="3627640579"/>
       </p:ext>
     </p:extLst>
   </p:cSld>
@@ -8300,7 +9186,7 @@
     </p:spTree>
     <p:extLst>
       <p:ext uri="{BB962C8B-B14F-4D97-AF65-F5344CB8AC3E}">
-        <p14:creationId xmlns:p14="http://schemas.microsoft.com/office/powerpoint/2010/main" xmlns="" val="171061288"/>
+        <p14:creationId xmlns:p14="http://schemas.microsoft.com/office/powerpoint/2010/main" val="171061288"/>
       </p:ext>
     </p:extLst>
   </p:cSld>
@@ -8577,7 +9463,7 @@
     </p:spTree>
     <p:extLst>
       <p:ext uri="{BB962C8B-B14F-4D97-AF65-F5344CB8AC3E}">
-        <p14:creationId xmlns:p14="http://schemas.microsoft.com/office/powerpoint/2010/main" xmlns="" val="394514968"/>
+        <p14:creationId xmlns:p14="http://schemas.microsoft.com/office/powerpoint/2010/main" val="394514968"/>
       </p:ext>
     </p:extLst>
   </p:cSld>
@@ -8844,10 +9730,10 @@
           <p:nvPr/>
         </p:nvPicPr>
         <p:blipFill>
-          <a:blip r:embed="rId2" cstate="print">
+          <a:blip r:embed="rId3" cstate="print">
             <a:extLst>
               <a:ext uri="{28A0092B-C50C-407E-A947-70E740481C1C}">
-                <a14:useLocalDpi xmlns:a14="http://schemas.microsoft.com/office/drawing/2010/main" xmlns=""/>
+                <a14:useLocalDpi xmlns:a14="http://schemas.microsoft.com/office/drawing/2010/main"/>
               </a:ext>
             </a:extLst>
           </a:blip>
@@ -8872,7 +9758,7 @@
     </p:spTree>
     <p:extLst>
       <p:ext uri="{BB962C8B-B14F-4D97-AF65-F5344CB8AC3E}">
-        <p14:creationId xmlns:p14="http://schemas.microsoft.com/office/powerpoint/2010/main" xmlns="" val="1630604182"/>
+        <p14:creationId xmlns:p14="http://schemas.microsoft.com/office/powerpoint/2010/main" val="1630604182"/>
       </p:ext>
     </p:extLst>
   </p:cSld>
@@ -9083,7 +9969,7 @@
     </p:spTree>
     <p:extLst>
       <p:ext uri="{BB962C8B-B14F-4D97-AF65-F5344CB8AC3E}">
-        <p14:creationId xmlns:p14="http://schemas.microsoft.com/office/powerpoint/2010/main" xmlns="" val="3593113261"/>
+        <p14:creationId xmlns:p14="http://schemas.microsoft.com/office/powerpoint/2010/main" val="3593113261"/>
       </p:ext>
     </p:extLst>
   </p:cSld>
@@ -9313,7 +10199,7 @@
     </p:spTree>
     <p:extLst>
       <p:ext uri="{BB962C8B-B14F-4D97-AF65-F5344CB8AC3E}">
-        <p14:creationId xmlns:p14="http://schemas.microsoft.com/office/powerpoint/2010/main" xmlns="" val="451913240"/>
+        <p14:creationId xmlns:p14="http://schemas.microsoft.com/office/powerpoint/2010/main" val="451913240"/>
       </p:ext>
     </p:extLst>
   </p:cSld>
@@ -9575,7 +10461,7 @@
     </p:spTree>
     <p:extLst>
       <p:ext uri="{BB962C8B-B14F-4D97-AF65-F5344CB8AC3E}">
-        <p14:creationId xmlns:p14="http://schemas.microsoft.com/office/powerpoint/2010/main" xmlns="" val="2009636028"/>
+        <p14:creationId xmlns:p14="http://schemas.microsoft.com/office/powerpoint/2010/main" val="2009636028"/>
       </p:ext>
     </p:extLst>
   </p:cSld>
@@ -9837,7 +10723,7 @@
     </p:spTree>
     <p:extLst>
       <p:ext uri="{BB962C8B-B14F-4D97-AF65-F5344CB8AC3E}">
-        <p14:creationId xmlns:p14="http://schemas.microsoft.com/office/powerpoint/2010/main" xmlns="" val="1131833659"/>
+        <p14:creationId xmlns:p14="http://schemas.microsoft.com/office/powerpoint/2010/main" val="1131833659"/>
       </p:ext>
     </p:extLst>
   </p:cSld>
@@ -9906,7 +10792,7 @@
           <a:blip r:embed="rId3" cstate="print">
             <a:extLst>
               <a:ext uri="{28A0092B-C50C-407E-A947-70E740481C1C}">
-                <a14:useLocalDpi xmlns:a14="http://schemas.microsoft.com/office/drawing/2010/main" xmlns="" val="0"/>
+                <a14:useLocalDpi xmlns:a14="http://schemas.microsoft.com/office/drawing/2010/main" val="0"/>
               </a:ext>
             </a:extLst>
           </a:blip>
@@ -9927,7 +10813,7 @@
     </p:spTree>
     <p:extLst>
       <p:ext uri="{BB962C8B-B14F-4D97-AF65-F5344CB8AC3E}">
-        <p14:creationId xmlns:p14="http://schemas.microsoft.com/office/powerpoint/2010/main" xmlns="" val="1848404178"/>
+        <p14:creationId xmlns:p14="http://schemas.microsoft.com/office/powerpoint/2010/main" val="1848404178"/>
       </p:ext>
     </p:extLst>
   </p:cSld>
@@ -10112,7 +10998,7 @@
     </p:spTree>
     <p:extLst>
       <p:ext uri="{BB962C8B-B14F-4D97-AF65-F5344CB8AC3E}">
-        <p14:creationId xmlns:p14="http://schemas.microsoft.com/office/powerpoint/2010/main" xmlns="" val="1155854373"/>
+        <p14:creationId xmlns:p14="http://schemas.microsoft.com/office/powerpoint/2010/main" val="1155854373"/>
       </p:ext>
     </p:extLst>
   </p:cSld>
@@ -10578,7 +11464,7 @@
     </p:spTree>
     <p:extLst>
       <p:ext uri="{BB962C8B-B14F-4D97-AF65-F5344CB8AC3E}">
-        <p14:creationId xmlns:p14="http://schemas.microsoft.com/office/powerpoint/2010/main" xmlns="" val="1027356186"/>
+        <p14:creationId xmlns:p14="http://schemas.microsoft.com/office/powerpoint/2010/main" val="1027356186"/>
       </p:ext>
     </p:extLst>
   </p:cSld>
@@ -10647,7 +11533,7 @@
           <a:blip r:embed="rId2" cstate="print">
             <a:extLst>
               <a:ext uri="{28A0092B-C50C-407E-A947-70E740481C1C}">
-                <a14:useLocalDpi xmlns:a14="http://schemas.microsoft.com/office/drawing/2010/main" xmlns="" val="0"/>
+                <a14:useLocalDpi xmlns:a14="http://schemas.microsoft.com/office/drawing/2010/main" val="0"/>
               </a:ext>
             </a:extLst>
           </a:blip>
@@ -10677,7 +11563,7 @@
           <a:blip r:embed="rId3" cstate="print">
             <a:extLst>
               <a:ext uri="{28A0092B-C50C-407E-A947-70E740481C1C}">
-                <a14:useLocalDpi xmlns:a14="http://schemas.microsoft.com/office/drawing/2010/main" xmlns="" val="0"/>
+                <a14:useLocalDpi xmlns:a14="http://schemas.microsoft.com/office/drawing/2010/main" val="0"/>
               </a:ext>
             </a:extLst>
           </a:blip>
@@ -10701,7 +11587,7 @@
     </p:spTree>
     <p:extLst>
       <p:ext uri="{BB962C8B-B14F-4D97-AF65-F5344CB8AC3E}">
-        <p14:creationId xmlns:p14="http://schemas.microsoft.com/office/powerpoint/2010/main" xmlns="" val="2369171751"/>
+        <p14:creationId xmlns:p14="http://schemas.microsoft.com/office/powerpoint/2010/main" val="2369171751"/>
       </p:ext>
     </p:extLst>
   </p:cSld>
@@ -10822,7 +11708,7 @@
           <a:blip r:embed="rId4" cstate="print">
             <a:extLst>
               <a:ext uri="{28A0092B-C50C-407E-A947-70E740481C1C}">
-                <a14:useLocalDpi xmlns:a14="http://schemas.microsoft.com/office/drawing/2010/main" xmlns="" val="0"/>
+                <a14:useLocalDpi xmlns:a14="http://schemas.microsoft.com/office/drawing/2010/main" val="0"/>
               </a:ext>
             </a:extLst>
           </a:blip>
@@ -10938,7 +11824,7 @@
     </p:spTree>
     <p:extLst>
       <p:ext uri="{BB962C8B-B14F-4D97-AF65-F5344CB8AC3E}">
-        <p14:creationId xmlns:p14="http://schemas.microsoft.com/office/powerpoint/2010/main" xmlns="" val="3216378839"/>
+        <p14:creationId xmlns:p14="http://schemas.microsoft.com/office/powerpoint/2010/main" val="3216378839"/>
       </p:ext>
     </p:extLst>
   </p:cSld>
@@ -11257,7 +12143,7 @@
           <a:blip r:embed="rId2" cstate="print">
             <a:extLst>
               <a:ext uri="{28A0092B-C50C-407E-A947-70E740481C1C}">
-                <a14:useLocalDpi xmlns:a14="http://schemas.microsoft.com/office/drawing/2010/main" xmlns="" val="0"/>
+                <a14:useLocalDpi xmlns:a14="http://schemas.microsoft.com/office/drawing/2010/main" val="0"/>
               </a:ext>
             </a:extLst>
           </a:blip>
@@ -11366,7 +12252,7 @@
     </p:spTree>
     <p:extLst>
       <p:ext uri="{BB962C8B-B14F-4D97-AF65-F5344CB8AC3E}">
-        <p14:creationId xmlns:p14="http://schemas.microsoft.com/office/powerpoint/2010/main" xmlns="" val="2527117896"/>
+        <p14:creationId xmlns:p14="http://schemas.microsoft.com/office/powerpoint/2010/main" val="2527117896"/>
       </p:ext>
     </p:extLst>
   </p:cSld>
@@ -12080,7 +12966,7 @@
     </p:spTree>
     <p:extLst>
       <p:ext uri="{BB962C8B-B14F-4D97-AF65-F5344CB8AC3E}">
-        <p14:creationId xmlns:p14="http://schemas.microsoft.com/office/powerpoint/2010/main" xmlns="" val="1994743043"/>
+        <p14:creationId xmlns:p14="http://schemas.microsoft.com/office/powerpoint/2010/main" val="1994743043"/>
       </p:ext>
     </p:extLst>
   </p:cSld>
@@ -12266,7 +13152,7 @@
     </p:spTree>
     <p:extLst>
       <p:ext uri="{BB962C8B-B14F-4D97-AF65-F5344CB8AC3E}">
-        <p14:creationId xmlns:p14="http://schemas.microsoft.com/office/powerpoint/2010/main" xmlns="" val="3098398089"/>
+        <p14:creationId xmlns:p14="http://schemas.microsoft.com/office/powerpoint/2010/main" val="3098398089"/>
       </p:ext>
     </p:extLst>
   </p:cSld>
@@ -12547,7 +13433,7 @@
     </p:spTree>
     <p:extLst>
       <p:ext uri="{BB962C8B-B14F-4D97-AF65-F5344CB8AC3E}">
-        <p14:creationId xmlns:p14="http://schemas.microsoft.com/office/powerpoint/2010/main" xmlns="" val="3449390454"/>
+        <p14:creationId xmlns:p14="http://schemas.microsoft.com/office/powerpoint/2010/main" val="3449390454"/>
       </p:ext>
     </p:extLst>
   </p:cSld>
@@ -13248,7 +14134,7 @@
     </p:spTree>
     <p:extLst>
       <p:ext uri="{BB962C8B-B14F-4D97-AF65-F5344CB8AC3E}">
-        <p14:creationId xmlns:p14="http://schemas.microsoft.com/office/powerpoint/2010/main" xmlns="" val="4006469721"/>
+        <p14:creationId xmlns:p14="http://schemas.microsoft.com/office/powerpoint/2010/main" val="4006469721"/>
       </p:ext>
     </p:extLst>
   </p:cSld>
@@ -13556,7 +14442,7 @@
     </p:spTree>
     <p:extLst>
       <p:ext uri="{BB962C8B-B14F-4D97-AF65-F5344CB8AC3E}">
-        <p14:creationId xmlns:p14="http://schemas.microsoft.com/office/powerpoint/2010/main" xmlns="" val="1678422724"/>
+        <p14:creationId xmlns:p14="http://schemas.microsoft.com/office/powerpoint/2010/main" val="1678422724"/>
       </p:ext>
     </p:extLst>
   </p:cSld>
@@ -14169,7 +15055,7 @@
     </p:spTree>
     <p:extLst>
       <p:ext uri="{BB962C8B-B14F-4D97-AF65-F5344CB8AC3E}">
-        <p14:creationId xmlns:p14="http://schemas.microsoft.com/office/powerpoint/2010/main" xmlns="" val="2792941284"/>
+        <p14:creationId xmlns:p14="http://schemas.microsoft.com/office/powerpoint/2010/main" val="2792941284"/>
       </p:ext>
     </p:extLst>
   </p:cSld>
@@ -14628,7 +15514,7 @@
     </p:spTree>
     <p:extLst>
       <p:ext uri="{BB962C8B-B14F-4D97-AF65-F5344CB8AC3E}">
-        <p14:creationId xmlns:p14="http://schemas.microsoft.com/office/powerpoint/2010/main" xmlns="" val="3220083538"/>
+        <p14:creationId xmlns:p14="http://schemas.microsoft.com/office/powerpoint/2010/main" val="3220083538"/>
       </p:ext>
     </p:extLst>
   </p:cSld>
@@ -14847,7 +15733,7 @@
     </p:spTree>
     <p:extLst>
       <p:ext uri="{BB962C8B-B14F-4D97-AF65-F5344CB8AC3E}">
-        <p14:creationId xmlns:p14="http://schemas.microsoft.com/office/powerpoint/2010/main" xmlns="" val="856396653"/>
+        <p14:creationId xmlns:p14="http://schemas.microsoft.com/office/powerpoint/2010/main" val="856396653"/>
       </p:ext>
     </p:extLst>
   </p:cSld>
@@ -15008,7 +15894,7 @@
     </p:spTree>
     <p:extLst>
       <p:ext uri="{BB962C8B-B14F-4D97-AF65-F5344CB8AC3E}">
-        <p14:creationId xmlns:p14="http://schemas.microsoft.com/office/powerpoint/2010/main" xmlns="" val="3312784383"/>
+        <p14:creationId xmlns:p14="http://schemas.microsoft.com/office/powerpoint/2010/main" val="3312784383"/>
       </p:ext>
     </p:extLst>
   </p:cSld>
@@ -15226,7 +16112,7 @@
     </p:spTree>
     <p:extLst>
       <p:ext uri="{BB962C8B-B14F-4D97-AF65-F5344CB8AC3E}">
-        <p14:creationId xmlns:p14="http://schemas.microsoft.com/office/powerpoint/2010/main" xmlns="" val="3443329555"/>
+        <p14:creationId xmlns:p14="http://schemas.microsoft.com/office/powerpoint/2010/main" val="3443329555"/>
       </p:ext>
     </p:extLst>
   </p:cSld>
@@ -15738,7 +16624,7 @@
     </p:spTree>
     <p:extLst>
       <p:ext uri="{BB962C8B-B14F-4D97-AF65-F5344CB8AC3E}">
-        <p14:creationId xmlns:p14="http://schemas.microsoft.com/office/powerpoint/2010/main" xmlns="" val="1556099287"/>
+        <p14:creationId xmlns:p14="http://schemas.microsoft.com/office/powerpoint/2010/main" val="1556099287"/>
       </p:ext>
     </p:extLst>
   </p:cSld>
@@ -16091,7 +16977,7 @@
     </p:spTree>
     <p:extLst>
       <p:ext uri="{BB962C8B-B14F-4D97-AF65-F5344CB8AC3E}">
-        <p14:creationId xmlns:p14="http://schemas.microsoft.com/office/powerpoint/2010/main" xmlns="" val="2948210574"/>
+        <p14:creationId xmlns:p14="http://schemas.microsoft.com/office/powerpoint/2010/main" val="2948210574"/>
       </p:ext>
     </p:extLst>
   </p:cSld>
@@ -16736,7 +17622,7 @@
     </p:spTree>
     <p:extLst>
       <p:ext uri="{BB962C8B-B14F-4D97-AF65-F5344CB8AC3E}">
-        <p14:creationId xmlns:p14="http://schemas.microsoft.com/office/powerpoint/2010/main" xmlns="" val="977874982"/>
+        <p14:creationId xmlns:p14="http://schemas.microsoft.com/office/powerpoint/2010/main" val="977874982"/>
       </p:ext>
     </p:extLst>
   </p:cSld>
@@ -16977,7 +17863,7 @@
           <p:nvPr>
             <p:extLst>
               <p:ext uri="{D42A27DB-BD31-4B8C-83A1-F6EECF244321}">
-                <p14:modId xmlns:p14="http://schemas.microsoft.com/office/powerpoint/2010/main" xmlns="" val="2181104498"/>
+                <p14:modId xmlns:p14="http://schemas.microsoft.com/office/powerpoint/2010/main" val="2181104498"/>
               </p:ext>
             </p:extLst>
           </p:nvPr>
@@ -17961,7 +18847,7 @@
     </p:spTree>
     <p:extLst>
       <p:ext uri="{BB962C8B-B14F-4D97-AF65-F5344CB8AC3E}">
-        <p14:creationId xmlns:p14="http://schemas.microsoft.com/office/powerpoint/2010/main" xmlns="" val="2197364214"/>
+        <p14:creationId xmlns:p14="http://schemas.microsoft.com/office/powerpoint/2010/main" val="2197364214"/>
       </p:ext>
     </p:extLst>
   </p:cSld>
@@ -18137,7 +19023,7 @@
     </p:spTree>
     <p:extLst>
       <p:ext uri="{BB962C8B-B14F-4D97-AF65-F5344CB8AC3E}">
-        <p14:creationId xmlns:p14="http://schemas.microsoft.com/office/powerpoint/2010/main" xmlns="" val="2092776985"/>
+        <p14:creationId xmlns:p14="http://schemas.microsoft.com/office/powerpoint/2010/main" val="2092776985"/>
       </p:ext>
     </p:extLst>
   </p:cSld>
@@ -18357,7 +19243,7 @@
     </p:spTree>
     <p:extLst>
       <p:ext uri="{BB962C8B-B14F-4D97-AF65-F5344CB8AC3E}">
-        <p14:creationId xmlns:p14="http://schemas.microsoft.com/office/powerpoint/2010/main" xmlns="" val="318706902"/>
+        <p14:creationId xmlns:p14="http://schemas.microsoft.com/office/powerpoint/2010/main" val="318706902"/>
       </p:ext>
     </p:extLst>
   </p:cSld>
@@ -18440,7 +19326,7 @@
           <p:nvPr>
             <p:extLst>
               <p:ext uri="{D42A27DB-BD31-4B8C-83A1-F6EECF244321}">
-                <p14:modId xmlns:p14="http://schemas.microsoft.com/office/powerpoint/2010/main" xmlns="" val="3075550189"/>
+                <p14:modId xmlns:p14="http://schemas.microsoft.com/office/powerpoint/2010/main" val="3075550189"/>
               </p:ext>
             </p:extLst>
           </p:nvPr>
@@ -18811,7 +19697,7 @@
           <a:blip r:embed="rId3" cstate="print">
             <a:extLst>
               <a:ext uri="{28A0092B-C50C-407E-A947-70E740481C1C}">
-                <a14:useLocalDpi xmlns:a14="http://schemas.microsoft.com/office/drawing/2010/main" xmlns="" val="0"/>
+                <a14:useLocalDpi xmlns:a14="http://schemas.microsoft.com/office/drawing/2010/main" val="0"/>
               </a:ext>
             </a:extLst>
           </a:blip>
@@ -18841,7 +19727,7 @@
           <a:blip r:embed="rId4" cstate="print">
             <a:extLst>
               <a:ext uri="{28A0092B-C50C-407E-A947-70E740481C1C}">
-                <a14:useLocalDpi xmlns:a14="http://schemas.microsoft.com/office/drawing/2010/main" xmlns="" val="0"/>
+                <a14:useLocalDpi xmlns:a14="http://schemas.microsoft.com/office/drawing/2010/main" val="0"/>
               </a:ext>
             </a:extLst>
           </a:blip>
@@ -18871,7 +19757,7 @@
           <a:blip r:embed="rId5" cstate="print">
             <a:extLst>
               <a:ext uri="{28A0092B-C50C-407E-A947-70E740481C1C}">
-                <a14:useLocalDpi xmlns:a14="http://schemas.microsoft.com/office/drawing/2010/main" xmlns="" val="0"/>
+                <a14:useLocalDpi xmlns:a14="http://schemas.microsoft.com/office/drawing/2010/main" val="0"/>
               </a:ext>
             </a:extLst>
           </a:blip>
@@ -18901,7 +19787,7 @@
           <a:blip r:embed="rId6" cstate="print">
             <a:extLst>
               <a:ext uri="{28A0092B-C50C-407E-A947-70E740481C1C}">
-                <a14:useLocalDpi xmlns:a14="http://schemas.microsoft.com/office/drawing/2010/main" xmlns="" val="0"/>
+                <a14:useLocalDpi xmlns:a14="http://schemas.microsoft.com/office/drawing/2010/main" val="0"/>
               </a:ext>
             </a:extLst>
           </a:blip>
@@ -18931,7 +19817,7 @@
           <a:blip r:embed="rId7" cstate="print">
             <a:extLst>
               <a:ext uri="{28A0092B-C50C-407E-A947-70E740481C1C}">
-                <a14:useLocalDpi xmlns:a14="http://schemas.microsoft.com/office/drawing/2010/main" xmlns="" val="0"/>
+                <a14:useLocalDpi xmlns:a14="http://schemas.microsoft.com/office/drawing/2010/main" val="0"/>
               </a:ext>
             </a:extLst>
           </a:blip>
@@ -18961,7 +19847,7 @@
           <a:blip r:embed="rId8" cstate="print">
             <a:extLst>
               <a:ext uri="{28A0092B-C50C-407E-A947-70E740481C1C}">
-                <a14:useLocalDpi xmlns:a14="http://schemas.microsoft.com/office/drawing/2010/main" xmlns="" val="0"/>
+                <a14:useLocalDpi xmlns:a14="http://schemas.microsoft.com/office/drawing/2010/main" val="0"/>
               </a:ext>
             </a:extLst>
           </a:blip>
@@ -18982,7 +19868,7 @@
     </p:spTree>
     <p:extLst>
       <p:ext uri="{BB962C8B-B14F-4D97-AF65-F5344CB8AC3E}">
-        <p14:creationId xmlns:p14="http://schemas.microsoft.com/office/powerpoint/2010/main" xmlns="" val="949325302"/>
+        <p14:creationId xmlns:p14="http://schemas.microsoft.com/office/powerpoint/2010/main" val="949325302"/>
       </p:ext>
     </p:extLst>
   </p:cSld>
@@ -19663,7 +20549,7 @@
     </p:spTree>
     <p:extLst>
       <p:ext uri="{BB962C8B-B14F-4D97-AF65-F5344CB8AC3E}">
-        <p14:creationId xmlns:p14="http://schemas.microsoft.com/office/powerpoint/2010/main" xmlns="" val="1728169033"/>
+        <p14:creationId xmlns:p14="http://schemas.microsoft.com/office/powerpoint/2010/main" val="1728169033"/>
       </p:ext>
     </p:extLst>
   </p:cSld>
@@ -19908,7 +20794,7 @@
     </p:spTree>
     <p:extLst>
       <p:ext uri="{BB962C8B-B14F-4D97-AF65-F5344CB8AC3E}">
-        <p14:creationId xmlns:p14="http://schemas.microsoft.com/office/powerpoint/2010/main" xmlns="" val="2834344091"/>
+        <p14:creationId xmlns:p14="http://schemas.microsoft.com/office/powerpoint/2010/main" val="2834344091"/>
       </p:ext>
     </p:extLst>
   </p:cSld>
@@ -20252,8 +21138,8 @@
         </p:blipFill>
         <p:spPr bwMode="auto">
           <a:xfrm>
-            <a:off x="76200" y="2438400"/>
-            <a:ext cx="4887929" cy="4495800"/>
+            <a:off x="244057" y="2743200"/>
+            <a:ext cx="4390851" cy="4038600"/>
           </a:xfrm>
           <a:prstGeom prst="rect">
             <a:avLst/>
@@ -20300,7 +21186,7 @@
           <p:nvPr>
             <p:extLst>
               <p:ext uri="{D42A27DB-BD31-4B8C-83A1-F6EECF244321}">
-                <p14:modId xmlns:p14="http://schemas.microsoft.com/office/powerpoint/2010/main" xmlns="" val="3204736979"/>
+                <p14:modId xmlns:p14="http://schemas.microsoft.com/office/powerpoint/2010/main" val="3204736979"/>
               </p:ext>
             </p:extLst>
           </p:nvPr>
@@ -20555,8 +21441,8 @@
         </p:nvSpPr>
         <p:spPr>
           <a:xfrm>
-            <a:off x="1752600" y="1498937"/>
-            <a:ext cx="6096000" cy="1015663"/>
+            <a:off x="304800" y="1358205"/>
+            <a:ext cx="8458200" cy="1384995"/>
           </a:xfrm>
           <a:prstGeom prst="rect">
             <a:avLst/>
@@ -20574,23 +21460,23 @@
               <a:buChar char="•"/>
             </a:pPr>
             <a:r>
-              <a:rPr lang="en-US" sz="2000" dirty="0" smtClean="0"/>
+              <a:rPr lang="en-US" sz="2800" dirty="0" smtClean="0"/>
               <a:t>Use to </a:t>
             </a:r>
             <a:r>
-              <a:rPr lang="en-US" sz="2000" b="1" dirty="0"/>
+              <a:rPr lang="en-US" sz="2800" b="1" dirty="0"/>
               <a:t>d</a:t>
             </a:r>
             <a:r>
-              <a:rPr lang="en-US" sz="2000" b="1" dirty="0" smtClean="0"/>
+              <a:rPr lang="en-US" sz="2800" b="1" dirty="0" smtClean="0"/>
               <a:t>ocument</a:t>
             </a:r>
             <a:r>
-              <a:rPr lang="en-US" sz="2000" dirty="0" smtClean="0"/>
+              <a:rPr lang="en-US" sz="2800" dirty="0" smtClean="0"/>
               <a:t> the model and specify </a:t>
             </a:r>
             <a:r>
-              <a:rPr lang="en-US" sz="2000" b="1" dirty="0" smtClean="0"/>
+              <a:rPr lang="en-US" sz="2800" b="1" dirty="0" smtClean="0"/>
               <a:t>evolution </a:t>
             </a:r>
           </a:p>
@@ -20600,11 +21486,11 @@
               <a:buChar char="•"/>
             </a:pPr>
             <a:r>
-              <a:rPr lang="en-US" sz="2000" b="1" dirty="0" smtClean="0"/>
+              <a:rPr lang="en-US" sz="2800" b="1" dirty="0" smtClean="0"/>
               <a:t>Visualize</a:t>
             </a:r>
             <a:r>
-              <a:rPr lang="en-US" sz="2000" dirty="0" smtClean="0"/>
+              <a:rPr lang="en-US" sz="2800" dirty="0" smtClean="0"/>
               <a:t> the dependency graph</a:t>
             </a:r>
           </a:p>
@@ -20614,21 +21500,21 @@
               <a:buChar char="•"/>
             </a:pPr>
             <a:r>
-              <a:rPr lang="en-US" sz="2000" dirty="0" smtClean="0"/>
+              <a:rPr lang="en-US" sz="2800" dirty="0" smtClean="0"/>
               <a:t>Artifact Generated during the </a:t>
             </a:r>
             <a:r>
-              <a:rPr lang="en-US" sz="2000" b="1" dirty="0" smtClean="0"/>
+              <a:rPr lang="en-US" sz="2800" b="1" dirty="0" smtClean="0"/>
               <a:t>continuous integration</a:t>
             </a:r>
-            <a:endParaRPr lang="en-US" sz="2000" dirty="0"/>
+            <a:endParaRPr lang="en-US" sz="2800" dirty="0"/>
           </a:p>
         </p:txBody>
       </p:sp>
     </p:spTree>
     <p:extLst>
       <p:ext uri="{BB962C8B-B14F-4D97-AF65-F5344CB8AC3E}">
-        <p14:creationId xmlns:p14="http://schemas.microsoft.com/office/powerpoint/2010/main" xmlns="" val="3195513628"/>
+        <p14:creationId xmlns:p14="http://schemas.microsoft.com/office/powerpoint/2010/main" val="3195513628"/>
       </p:ext>
     </p:extLst>
   </p:cSld>
@@ -20766,7 +21652,7 @@
     </p:spTree>
     <p:extLst>
       <p:ext uri="{BB962C8B-B14F-4D97-AF65-F5344CB8AC3E}">
-        <p14:creationId xmlns:p14="http://schemas.microsoft.com/office/powerpoint/2010/main" xmlns="" val="2674396190"/>
+        <p14:creationId xmlns:p14="http://schemas.microsoft.com/office/powerpoint/2010/main" val="2674396190"/>
       </p:ext>
     </p:extLst>
   </p:cSld>
@@ -20908,7 +21794,7 @@
     </p:spTree>
     <p:extLst>
       <p:ext uri="{BB962C8B-B14F-4D97-AF65-F5344CB8AC3E}">
-        <p14:creationId xmlns:p14="http://schemas.microsoft.com/office/powerpoint/2010/main" xmlns="" val="2713826086"/>
+        <p14:creationId xmlns:p14="http://schemas.microsoft.com/office/powerpoint/2010/main" val="2713826086"/>
       </p:ext>
     </p:extLst>
   </p:cSld>
@@ -21100,7 +21986,7 @@
     </p:spTree>
     <p:extLst>
       <p:ext uri="{BB962C8B-B14F-4D97-AF65-F5344CB8AC3E}">
-        <p14:creationId xmlns:p14="http://schemas.microsoft.com/office/powerpoint/2010/main" xmlns="" val="714747940"/>
+        <p14:creationId xmlns:p14="http://schemas.microsoft.com/office/powerpoint/2010/main" val="714747940"/>
       </p:ext>
     </p:extLst>
   </p:cSld>
@@ -21639,7 +22525,7 @@
     </p:spTree>
     <p:extLst>
       <p:ext uri="{BB962C8B-B14F-4D97-AF65-F5344CB8AC3E}">
-        <p14:creationId xmlns:p14="http://schemas.microsoft.com/office/powerpoint/2010/main" xmlns="" val="3760395846"/>
+        <p14:creationId xmlns:p14="http://schemas.microsoft.com/office/powerpoint/2010/main" val="3760395846"/>
       </p:ext>
     </p:extLst>
   </p:cSld>
@@ -22472,7 +23358,7 @@
     </p:spTree>
     <p:extLst>
       <p:ext uri="{BB962C8B-B14F-4D97-AF65-F5344CB8AC3E}">
-        <p14:creationId xmlns:p14="http://schemas.microsoft.com/office/powerpoint/2010/main" xmlns="" val="1422967000"/>
+        <p14:creationId xmlns:p14="http://schemas.microsoft.com/office/powerpoint/2010/main" val="1422967000"/>
       </p:ext>
     </p:extLst>
   </p:cSld>
@@ -22623,7 +23509,7 @@
     </p:spTree>
     <p:extLst>
       <p:ext uri="{BB962C8B-B14F-4D97-AF65-F5344CB8AC3E}">
-        <p14:creationId xmlns:p14="http://schemas.microsoft.com/office/powerpoint/2010/main" xmlns="" val="2654585083"/>
+        <p14:creationId xmlns:p14="http://schemas.microsoft.com/office/powerpoint/2010/main" val="2654585083"/>
       </p:ext>
     </p:extLst>
   </p:cSld>
@@ -22783,7 +23669,7 @@
     </p:spTree>
     <p:extLst>
       <p:ext uri="{BB962C8B-B14F-4D97-AF65-F5344CB8AC3E}">
-        <p14:creationId xmlns:p14="http://schemas.microsoft.com/office/powerpoint/2010/main" xmlns="" val="1683021932"/>
+        <p14:creationId xmlns:p14="http://schemas.microsoft.com/office/powerpoint/2010/main" val="1683021932"/>
       </p:ext>
     </p:extLst>
   </p:cSld>
@@ -22857,7 +23743,7 @@
           <a:blip r:embed="rId2" cstate="print">
             <a:extLst>
               <a:ext uri="{28A0092B-C50C-407E-A947-70E740481C1C}">
-                <a14:useLocalDpi xmlns:a14="http://schemas.microsoft.com/office/drawing/2010/main" xmlns="" val="0"/>
+                <a14:useLocalDpi xmlns:a14="http://schemas.microsoft.com/office/drawing/2010/main" val="0"/>
               </a:ext>
             </a:extLst>
           </a:blip>
@@ -23493,7 +24379,7 @@
     </p:spTree>
     <p:extLst>
       <p:ext uri="{BB962C8B-B14F-4D97-AF65-F5344CB8AC3E}">
-        <p14:creationId xmlns:p14="http://schemas.microsoft.com/office/powerpoint/2010/main" xmlns="" val="3007787296"/>
+        <p14:creationId xmlns:p14="http://schemas.microsoft.com/office/powerpoint/2010/main" val="3007787296"/>
       </p:ext>
     </p:extLst>
   </p:cSld>
@@ -23858,8 +24744,13 @@
             </a:pPr>
             <a:r>
               <a:rPr lang="en-US" dirty="0" smtClean="0"/>
-              <a:t>I declare a claim -&gt; question set for this child appears</a:t>
-            </a:r>
+              <a:t>I declare a claim -&gt; question set for this </a:t>
+            </a:r>
+            <a:r>
+              <a:rPr lang="en-US" dirty="0" smtClean="0"/>
+              <a:t>claim appears</a:t>
+            </a:r>
+            <a:endParaRPr lang="en-US" dirty="0" smtClean="0"/>
           </a:p>
           <a:p>
             <a:r>
@@ -23911,7 +24802,7 @@
     </p:spTree>
     <p:extLst>
       <p:ext uri="{BB962C8B-B14F-4D97-AF65-F5344CB8AC3E}">
-        <p14:creationId xmlns:p14="http://schemas.microsoft.com/office/powerpoint/2010/main" xmlns="" val="13878138"/>
+        <p14:creationId xmlns:p14="http://schemas.microsoft.com/office/powerpoint/2010/main" val="13878138"/>
       </p:ext>
     </p:extLst>
   </p:cSld>
@@ -24299,7 +25190,7 @@
     </p:spTree>
     <p:extLst>
       <p:ext uri="{BB962C8B-B14F-4D97-AF65-F5344CB8AC3E}">
-        <p14:creationId xmlns:p14="http://schemas.microsoft.com/office/powerpoint/2010/main" xmlns="" val="40929930"/>
+        <p14:creationId xmlns:p14="http://schemas.microsoft.com/office/powerpoint/2010/main" val="40929930"/>
       </p:ext>
     </p:extLst>
   </p:cSld>
@@ -24368,7 +25259,7 @@
           <a:blip r:embed="rId2" cstate="print">
             <a:extLst>
               <a:ext uri="{28A0092B-C50C-407E-A947-70E740481C1C}">
-                <a14:useLocalDpi xmlns:a14="http://schemas.microsoft.com/office/drawing/2010/main" xmlns="" val="0"/>
+                <a14:useLocalDpi xmlns:a14="http://schemas.microsoft.com/office/drawing/2010/main" val="0"/>
               </a:ext>
             </a:extLst>
           </a:blip>
@@ -24389,7 +25280,7 @@
     </p:spTree>
     <p:extLst>
       <p:ext uri="{BB962C8B-B14F-4D97-AF65-F5344CB8AC3E}">
-        <p14:creationId xmlns:p14="http://schemas.microsoft.com/office/powerpoint/2010/main" xmlns="" val="1336479164"/>
+        <p14:creationId xmlns:p14="http://schemas.microsoft.com/office/powerpoint/2010/main" val="1336479164"/>
       </p:ext>
     </p:extLst>
   </p:cSld>
@@ -24495,7 +25386,7 @@
     </p:spTree>
     <p:extLst>
       <p:ext uri="{BB962C8B-B14F-4D97-AF65-F5344CB8AC3E}">
-        <p14:creationId xmlns:p14="http://schemas.microsoft.com/office/powerpoint/2010/main" xmlns="" val="4014343169"/>
+        <p14:creationId xmlns:p14="http://schemas.microsoft.com/office/powerpoint/2010/main" val="4014343169"/>
       </p:ext>
     </p:extLst>
   </p:cSld>
@@ -24646,7 +25537,7 @@
     </p:spTree>
     <p:extLst>
       <p:ext uri="{BB962C8B-B14F-4D97-AF65-F5344CB8AC3E}">
-        <p14:creationId xmlns:p14="http://schemas.microsoft.com/office/powerpoint/2010/main" xmlns="" val="2781303602"/>
+        <p14:creationId xmlns:p14="http://schemas.microsoft.com/office/powerpoint/2010/main" val="2781303602"/>
       </p:ext>
     </p:extLst>
   </p:cSld>
@@ -24833,7 +25724,7 @@
     </p:spTree>
     <p:extLst>
       <p:ext uri="{BB962C8B-B14F-4D97-AF65-F5344CB8AC3E}">
-        <p14:creationId xmlns:p14="http://schemas.microsoft.com/office/powerpoint/2010/main" xmlns="" val="4255503392"/>
+        <p14:creationId xmlns:p14="http://schemas.microsoft.com/office/powerpoint/2010/main" val="4255503392"/>
       </p:ext>
     </p:extLst>
   </p:cSld>
@@ -24993,7 +25884,7 @@
     </p:spTree>
     <p:extLst>
       <p:ext uri="{BB962C8B-B14F-4D97-AF65-F5344CB8AC3E}">
-        <p14:creationId xmlns:p14="http://schemas.microsoft.com/office/powerpoint/2010/main" xmlns="" val="2375505937"/>
+        <p14:creationId xmlns:p14="http://schemas.microsoft.com/office/powerpoint/2010/main" val="2375505937"/>
       </p:ext>
     </p:extLst>
   </p:cSld>
@@ -25124,18 +26015,18 @@
     </p:spTree>
     <p:extLst>
       <p:ext uri="{BB962C8B-B14F-4D97-AF65-F5344CB8AC3E}">
-        <p14:creationId xmlns:p14="http://schemas.microsoft.com/office/powerpoint/2010/main" xmlns="" val="1618189430"/>
+        <p14:creationId xmlns:p14="http://schemas.microsoft.com/office/powerpoint/2010/main" val="1618189430"/>
       </p:ext>
     </p:extLst>
   </p:cSld>
   <p:clrMapOvr>
     <a:masterClrMapping/>
   </p:clrMapOvr>
-  <mc:AlternateContent xmlns:mc="http://schemas.openxmlformats.org/markup-compatibility/2006">
-    <mc:Choice xmlns:p14="http://schemas.microsoft.com/office/powerpoint/2010/main" xmlns="" Requires="p14">
+  <mc:AlternateContent xmlns:mc="http://schemas.openxmlformats.org/markup-compatibility/2006" xmlns:p14="http://schemas.microsoft.com/office/powerpoint/2010/main">
+    <mc:Choice Requires="p14">
       <p:transition spd="slow" p14:dur="2000"/>
     </mc:Choice>
-    <mc:Fallback>
+    <mc:Fallback xmlns="">
       <p:transition spd="slow"/>
     </mc:Fallback>
   </mc:AlternateContent>

</xml_diff>